<commit_message>
first specs on the specs tour
</commit_message>
<xml_diff>
--- a/src/main/resources/oscon_2010_specs.pptx
+++ b/src/main/resources/oscon_2010_specs.pptx
@@ -6,7 +6,7 @@
     <p:sldMasterId id="2147483651" r:id="rId2"/>
   </p:sldMasterIdLst>
   <p:notesMasterIdLst>
-    <p:notesMasterId r:id="rId9"/>
+    <p:notesMasterId r:id="rId12"/>
   </p:notesMasterIdLst>
   <p:sldIdLst>
     <p:sldId id="258" r:id="rId3"/>
@@ -15,6 +15,9 @@
     <p:sldId id="261" r:id="rId6"/>
     <p:sldId id="262" r:id="rId7"/>
     <p:sldId id="263" r:id="rId8"/>
+    <p:sldId id="264" r:id="rId9"/>
+    <p:sldId id="265" r:id="rId10"/>
+    <p:sldId id="266" r:id="rId11"/>
   </p:sldIdLst>
   <p:sldSz cx="13004800" cy="9753600"/>
   <p:notesSz cx="6858000" cy="9144000"/>
@@ -1044,6 +1047,258 @@
               <a:rPr lang="en-US"/>
               <a:pPr/>
               <a:t>6</a:t>
+            </a:fld>
+            <a:endParaRPr lang="en-US"/>
+          </a:p>
+        </p:txBody>
+      </p:sp>
+      <p:sp>
+        <p:nvSpPr>
+          <p:cNvPr id="19458" name="Rectangle 2"/>
+          <p:cNvSpPr>
+            <a:spLocks noGrp="1" noRot="1" noChangeAspect="1" noChangeArrowheads="1" noTextEdit="1"/>
+          </p:cNvSpPr>
+          <p:nvPr>
+            <p:ph type="sldImg"/>
+          </p:nvPr>
+        </p:nvSpPr>
+        <p:spPr>
+          <a:ln/>
+        </p:spPr>
+      </p:sp>
+      <p:sp>
+        <p:nvSpPr>
+          <p:cNvPr id="19459" name="Rectangle 3"/>
+          <p:cNvSpPr>
+            <a:spLocks noGrp="1"/>
+          </p:cNvSpPr>
+          <p:nvPr>
+            <p:ph type="body" idx="1"/>
+          </p:nvPr>
+        </p:nvSpPr>
+        <p:spPr/>
+        <p:txBody>
+          <a:bodyPr/>
+          <a:lstStyle/>
+          <a:p>
+            <a:endParaRPr lang="en-US"/>
+          </a:p>
+        </p:txBody>
+      </p:sp>
+    </p:spTree>
+  </p:cSld>
+  <p:clrMapOvr>
+    <a:masterClrMapping/>
+  </p:clrMapOvr>
+</p:notes>
+</file>
+
+<file path=ppt/notesSlides/notesSlide7.xml><?xml version="1.0" encoding="utf-8"?>
+<p:notes xmlns:a="http://schemas.openxmlformats.org/drawingml/2006/main" xmlns:r="http://schemas.openxmlformats.org/officeDocument/2006/relationships" xmlns:p="http://schemas.openxmlformats.org/presentationml/2006/main">
+  <p:cSld>
+    <p:spTree>
+      <p:nvGrpSpPr>
+        <p:cNvPr id="1" name=""/>
+        <p:cNvGrpSpPr/>
+        <p:nvPr/>
+      </p:nvGrpSpPr>
+      <p:grpSpPr>
+        <a:xfrm>
+          <a:off x="0" y="0"/>
+          <a:ext cx="0" cy="0"/>
+          <a:chOff x="0" y="0"/>
+          <a:chExt cx="0" cy="0"/>
+        </a:xfrm>
+      </p:grpSpPr>
+      <p:sp>
+        <p:nvSpPr>
+          <p:cNvPr id="7" name="Rectangle 7"/>
+          <p:cNvSpPr>
+            <a:spLocks noGrp="1"/>
+          </p:cNvSpPr>
+          <p:nvPr>
+            <p:ph type="sldNum" sz="quarter" idx="5"/>
+          </p:nvPr>
+        </p:nvSpPr>
+        <p:spPr>
+          <a:ln/>
+        </p:spPr>
+        <p:txBody>
+          <a:bodyPr/>
+          <a:lstStyle/>
+          <a:p>
+            <a:fld id="{27AEA7DA-096A-4FB7-B4B3-D12717EF4BDD}" type="slidenum">
+              <a:rPr lang="en-US"/>
+              <a:pPr/>
+              <a:t>7</a:t>
+            </a:fld>
+            <a:endParaRPr lang="en-US"/>
+          </a:p>
+        </p:txBody>
+      </p:sp>
+      <p:sp>
+        <p:nvSpPr>
+          <p:cNvPr id="19458" name="Rectangle 2"/>
+          <p:cNvSpPr>
+            <a:spLocks noGrp="1" noRot="1" noChangeAspect="1" noChangeArrowheads="1" noTextEdit="1"/>
+          </p:cNvSpPr>
+          <p:nvPr>
+            <p:ph type="sldImg"/>
+          </p:nvPr>
+        </p:nvSpPr>
+        <p:spPr>
+          <a:ln/>
+        </p:spPr>
+      </p:sp>
+      <p:sp>
+        <p:nvSpPr>
+          <p:cNvPr id="19459" name="Rectangle 3"/>
+          <p:cNvSpPr>
+            <a:spLocks noGrp="1"/>
+          </p:cNvSpPr>
+          <p:nvPr>
+            <p:ph type="body" idx="1"/>
+          </p:nvPr>
+        </p:nvSpPr>
+        <p:spPr/>
+        <p:txBody>
+          <a:bodyPr/>
+          <a:lstStyle/>
+          <a:p>
+            <a:endParaRPr lang="en-US"/>
+          </a:p>
+        </p:txBody>
+      </p:sp>
+    </p:spTree>
+  </p:cSld>
+  <p:clrMapOvr>
+    <a:masterClrMapping/>
+  </p:clrMapOvr>
+</p:notes>
+</file>
+
+<file path=ppt/notesSlides/notesSlide8.xml><?xml version="1.0" encoding="utf-8"?>
+<p:notes xmlns:a="http://schemas.openxmlformats.org/drawingml/2006/main" xmlns:r="http://schemas.openxmlformats.org/officeDocument/2006/relationships" xmlns:p="http://schemas.openxmlformats.org/presentationml/2006/main">
+  <p:cSld>
+    <p:spTree>
+      <p:nvGrpSpPr>
+        <p:cNvPr id="1" name=""/>
+        <p:cNvGrpSpPr/>
+        <p:nvPr/>
+      </p:nvGrpSpPr>
+      <p:grpSpPr>
+        <a:xfrm>
+          <a:off x="0" y="0"/>
+          <a:ext cx="0" cy="0"/>
+          <a:chOff x="0" y="0"/>
+          <a:chExt cx="0" cy="0"/>
+        </a:xfrm>
+      </p:grpSpPr>
+      <p:sp>
+        <p:nvSpPr>
+          <p:cNvPr id="7" name="Rectangle 7"/>
+          <p:cNvSpPr>
+            <a:spLocks noGrp="1"/>
+          </p:cNvSpPr>
+          <p:nvPr>
+            <p:ph type="sldNum" sz="quarter" idx="5"/>
+          </p:nvPr>
+        </p:nvSpPr>
+        <p:spPr>
+          <a:ln/>
+        </p:spPr>
+        <p:txBody>
+          <a:bodyPr/>
+          <a:lstStyle/>
+          <a:p>
+            <a:fld id="{27AEA7DA-096A-4FB7-B4B3-D12717EF4BDD}" type="slidenum">
+              <a:rPr lang="en-US"/>
+              <a:pPr/>
+              <a:t>8</a:t>
+            </a:fld>
+            <a:endParaRPr lang="en-US"/>
+          </a:p>
+        </p:txBody>
+      </p:sp>
+      <p:sp>
+        <p:nvSpPr>
+          <p:cNvPr id="19458" name="Rectangle 2"/>
+          <p:cNvSpPr>
+            <a:spLocks noGrp="1" noRot="1" noChangeAspect="1" noChangeArrowheads="1" noTextEdit="1"/>
+          </p:cNvSpPr>
+          <p:nvPr>
+            <p:ph type="sldImg"/>
+          </p:nvPr>
+        </p:nvSpPr>
+        <p:spPr>
+          <a:ln/>
+        </p:spPr>
+      </p:sp>
+      <p:sp>
+        <p:nvSpPr>
+          <p:cNvPr id="19459" name="Rectangle 3"/>
+          <p:cNvSpPr>
+            <a:spLocks noGrp="1"/>
+          </p:cNvSpPr>
+          <p:nvPr>
+            <p:ph type="body" idx="1"/>
+          </p:nvPr>
+        </p:nvSpPr>
+        <p:spPr/>
+        <p:txBody>
+          <a:bodyPr/>
+          <a:lstStyle/>
+          <a:p>
+            <a:endParaRPr lang="en-US"/>
+          </a:p>
+        </p:txBody>
+      </p:sp>
+    </p:spTree>
+  </p:cSld>
+  <p:clrMapOvr>
+    <a:masterClrMapping/>
+  </p:clrMapOvr>
+</p:notes>
+</file>
+
+<file path=ppt/notesSlides/notesSlide9.xml><?xml version="1.0" encoding="utf-8"?>
+<p:notes xmlns:a="http://schemas.openxmlformats.org/drawingml/2006/main" xmlns:r="http://schemas.openxmlformats.org/officeDocument/2006/relationships" xmlns:p="http://schemas.openxmlformats.org/presentationml/2006/main">
+  <p:cSld>
+    <p:spTree>
+      <p:nvGrpSpPr>
+        <p:cNvPr id="1" name=""/>
+        <p:cNvGrpSpPr/>
+        <p:nvPr/>
+      </p:nvGrpSpPr>
+      <p:grpSpPr>
+        <a:xfrm>
+          <a:off x="0" y="0"/>
+          <a:ext cx="0" cy="0"/>
+          <a:chOff x="0" y="0"/>
+          <a:chExt cx="0" cy="0"/>
+        </a:xfrm>
+      </p:grpSpPr>
+      <p:sp>
+        <p:nvSpPr>
+          <p:cNvPr id="7" name="Rectangle 7"/>
+          <p:cNvSpPr>
+            <a:spLocks noGrp="1"/>
+          </p:cNvSpPr>
+          <p:nvPr>
+            <p:ph type="sldNum" sz="quarter" idx="5"/>
+          </p:nvPr>
+        </p:nvSpPr>
+        <p:spPr>
+          <a:ln/>
+        </p:spPr>
+        <p:txBody>
+          <a:bodyPr/>
+          <a:lstStyle/>
+          <a:p>
+            <a:fld id="{27AEA7DA-096A-4FB7-B4B3-D12717EF4BDD}" type="slidenum">
+              <a:rPr lang="en-US"/>
+              <a:pPr/>
+              <a:t>9</a:t>
             </a:fld>
             <a:endParaRPr lang="en-US"/>
           </a:p>
@@ -7143,6 +7398,1441 @@
           <a:noFill/>
         </p:spPr>
       </p:pic>
+    </p:spTree>
+  </p:cSld>
+  <p:clrMapOvr>
+    <a:masterClrMapping/>
+  </p:clrMapOvr>
+  <p:transition>
+    <p:fade/>
+  </p:transition>
+  <p:timing>
+    <p:tnLst>
+      <p:par>
+        <p:cTn id="1" dur="indefinite" restart="never" nodeType="tmRoot"/>
+      </p:par>
+    </p:tnLst>
+  </p:timing>
+</p:sld>
+</file>
+
+<file path=ppt/slides/slide7.xml><?xml version="1.0" encoding="utf-8"?>
+<p:sld xmlns:a="http://schemas.openxmlformats.org/drawingml/2006/main" xmlns:r="http://schemas.openxmlformats.org/officeDocument/2006/relationships" xmlns:p="http://schemas.openxmlformats.org/presentationml/2006/main">
+  <p:cSld>
+    <p:spTree>
+      <p:nvGrpSpPr>
+        <p:cNvPr id="1" name=""/>
+        <p:cNvGrpSpPr/>
+        <p:nvPr/>
+      </p:nvGrpSpPr>
+      <p:grpSpPr>
+        <a:xfrm>
+          <a:off x="0" y="0"/>
+          <a:ext cx="0" cy="0"/>
+          <a:chOff x="0" y="0"/>
+          <a:chExt cx="0" cy="0"/>
+        </a:xfrm>
+      </p:grpSpPr>
+      <p:sp>
+        <p:nvSpPr>
+          <p:cNvPr id="8193" name="Rectangle 1"/>
+          <p:cNvSpPr>
+            <a:spLocks noGrp="1" noChangeArrowheads="1"/>
+          </p:cNvSpPr>
+          <p:nvPr>
+            <p:ph type="title"/>
+          </p:nvPr>
+        </p:nvSpPr>
+        <p:spPr>
+          <a:ln/>
+        </p:spPr>
+        <p:txBody>
+          <a:bodyPr/>
+          <a:lstStyle/>
+          <a:p>
+            <a:pPr lvl="0"/>
+            <a:r>
+              <a:rPr lang="en-US" sz="5400" dirty="0" smtClean="0">
+                <a:latin typeface="Lucida Handwriting" pitchFamily="66" charset="0"/>
+              </a:rPr>
+              <a:t>     </a:t>
+            </a:r>
+            <a:r>
+              <a:rPr lang="en-US" sz="5400" dirty="0" smtClean="0">
+                <a:latin typeface="Lucida Handwriting" pitchFamily="66" charset="0"/>
+              </a:rPr>
+              <a:t>  tour</a:t>
+            </a:r>
+            <a:endParaRPr lang="en-US" dirty="0"/>
+          </a:p>
+        </p:txBody>
+      </p:sp>
+      <p:pic>
+        <p:nvPicPr>
+          <p:cNvPr id="39938" name="Picture 2" descr="Logo"/>
+          <p:cNvPicPr>
+            <a:picLocks noChangeAspect="1" noChangeArrowheads="1"/>
+          </p:cNvPicPr>
+          <p:nvPr/>
+        </p:nvPicPr>
+        <p:blipFill>
+          <a:blip r:embed="rId3"/>
+          <a:srcRect/>
+          <a:stretch>
+            <a:fillRect/>
+          </a:stretch>
+        </p:blipFill>
+        <p:spPr bwMode="auto">
+          <a:xfrm>
+            <a:off x="3833628" y="228600"/>
+            <a:ext cx="2287772" cy="642969"/>
+          </a:xfrm>
+          <a:prstGeom prst="rect">
+            <a:avLst/>
+          </a:prstGeom>
+          <a:noFill/>
+        </p:spPr>
+      </p:pic>
+      <p:sp>
+        <p:nvSpPr>
+          <p:cNvPr id="6" name="Rectangle 5"/>
+          <p:cNvSpPr/>
+          <p:nvPr/>
+        </p:nvSpPr>
+        <p:spPr>
+          <a:xfrm>
+            <a:off x="711200" y="1295400"/>
+            <a:ext cx="11734800" cy="6370975"/>
+          </a:xfrm>
+          <a:prstGeom prst="rect">
+            <a:avLst/>
+          </a:prstGeom>
+          <a:ln>
+            <a:solidFill>
+              <a:schemeClr val="tx1"/>
+            </a:solidFill>
+            <a:prstDash val="dash"/>
+          </a:ln>
+        </p:spPr>
+        <p:txBody>
+          <a:bodyPr wrap="square">
+            <a:spAutoFit/>
+          </a:bodyPr>
+          <a:lstStyle/>
+          <a:p>
+            <a:r>
+              <a:rPr lang="en-US" sz="2400" b="1" dirty="0" smtClean="0">
+                <a:solidFill>
+                  <a:srgbClr val="7F0055"/>
+                </a:solidFill>
+                <a:latin typeface="Courier New"/>
+              </a:rPr>
+              <a:t>import</a:t>
+            </a:r>
+            <a:r>
+              <a:rPr lang="en-US" sz="2400" b="1" dirty="0" smtClean="0">
+                <a:latin typeface="Courier New"/>
+              </a:rPr>
+              <a:t> </a:t>
+            </a:r>
+            <a:r>
+              <a:rPr lang="en-US" sz="2400" b="1" dirty="0" err="1" smtClean="0">
+                <a:latin typeface="Courier New"/>
+              </a:rPr>
+              <a:t>org.specs</a:t>
+            </a:r>
+            <a:r>
+              <a:rPr lang="en-US" sz="2400" b="1" dirty="0" smtClean="0">
+                <a:latin typeface="Courier New"/>
+              </a:rPr>
+              <a:t>._</a:t>
+            </a:r>
+          </a:p>
+          <a:p>
+            <a:r>
+              <a:rPr lang="en-US" sz="2400" b="1" dirty="0" smtClean="0">
+                <a:solidFill>
+                  <a:srgbClr val="7F0055"/>
+                </a:solidFill>
+                <a:latin typeface="Courier New"/>
+              </a:rPr>
+              <a:t>import</a:t>
+            </a:r>
+            <a:r>
+              <a:rPr lang="en-US" sz="2400" b="1" dirty="0" smtClean="0">
+                <a:latin typeface="Courier New"/>
+              </a:rPr>
+              <a:t> </a:t>
+            </a:r>
+            <a:r>
+              <a:rPr lang="en-US" sz="2400" b="1" dirty="0" err="1" smtClean="0">
+                <a:latin typeface="Courier New"/>
+              </a:rPr>
+              <a:t>IncredibleStringReverser</a:t>
+            </a:r>
+            <a:r>
+              <a:rPr lang="en-US" sz="2400" b="1" dirty="0" smtClean="0">
+                <a:latin typeface="Courier New"/>
+              </a:rPr>
+              <a:t>._</a:t>
+            </a:r>
+          </a:p>
+          <a:p>
+            <a:endParaRPr lang="en-US" sz="2400" b="1" dirty="0" smtClean="0">
+              <a:solidFill>
+                <a:srgbClr val="7F0055"/>
+              </a:solidFill>
+              <a:latin typeface="Courier New"/>
+            </a:endParaRPr>
+          </a:p>
+          <a:p>
+            <a:r>
+              <a:rPr lang="en-US" sz="2400" b="1" dirty="0" smtClean="0">
+                <a:solidFill>
+                  <a:srgbClr val="7F0055"/>
+                </a:solidFill>
+                <a:latin typeface="Courier New"/>
+              </a:rPr>
+              <a:t>class</a:t>
+            </a:r>
+            <a:r>
+              <a:rPr lang="en-US" sz="2400" b="1" dirty="0" smtClean="0">
+                <a:latin typeface="Courier New"/>
+              </a:rPr>
+              <a:t> </a:t>
+            </a:r>
+            <a:r>
+              <a:rPr lang="en-US" sz="2400" b="1" dirty="0" err="1" smtClean="0">
+                <a:latin typeface="Courier New"/>
+              </a:rPr>
+              <a:t>ReverserSpec</a:t>
+            </a:r>
+            <a:r>
+              <a:rPr lang="en-US" sz="2400" b="1" dirty="0" smtClean="0">
+                <a:latin typeface="Courier New"/>
+              </a:rPr>
+              <a:t> </a:t>
+            </a:r>
+            <a:r>
+              <a:rPr lang="en-US" sz="2400" b="1" dirty="0" smtClean="0">
+                <a:solidFill>
+                  <a:srgbClr val="7F0055"/>
+                </a:solidFill>
+                <a:latin typeface="Courier New"/>
+              </a:rPr>
+              <a:t>extends</a:t>
+            </a:r>
+            <a:r>
+              <a:rPr lang="en-US" sz="2400" b="1" dirty="0" smtClean="0">
+                <a:latin typeface="Courier New"/>
+              </a:rPr>
+              <a:t> Specification {</a:t>
+            </a:r>
+          </a:p>
+          <a:p>
+            <a:r>
+              <a:rPr lang="en-US" sz="2400" dirty="0" smtClean="0">
+                <a:latin typeface="Courier New"/>
+              </a:rPr>
+              <a:t>  </a:t>
+            </a:r>
+            <a:r>
+              <a:rPr lang="en-US" sz="2400" dirty="0" smtClean="0">
+                <a:solidFill>
+                  <a:srgbClr val="2A00FF"/>
+                </a:solidFill>
+                <a:latin typeface="Courier New"/>
+              </a:rPr>
+              <a:t>"a reversed empty string must be empty"</a:t>
+            </a:r>
+            <a:r>
+              <a:rPr lang="en-US" sz="2400" dirty="0" smtClean="0">
+                <a:latin typeface="Courier New"/>
+              </a:rPr>
+              <a:t> in {</a:t>
+            </a:r>
+          </a:p>
+          <a:p>
+            <a:r>
+              <a:rPr lang="en-US" sz="2400" dirty="0" smtClean="0">
+                <a:latin typeface="Courier New"/>
+              </a:rPr>
+              <a:t>    reverse(</a:t>
+            </a:r>
+            <a:r>
+              <a:rPr lang="en-US" sz="2400" dirty="0" smtClean="0">
+                <a:solidFill>
+                  <a:srgbClr val="2A00FF"/>
+                </a:solidFill>
+                <a:latin typeface="Courier New"/>
+              </a:rPr>
+              <a:t>""</a:t>
+            </a:r>
+            <a:r>
+              <a:rPr lang="en-US" sz="2400" dirty="0" smtClean="0">
+                <a:latin typeface="Courier New"/>
+              </a:rPr>
+              <a:t>) must_== </a:t>
+            </a:r>
+            <a:r>
+              <a:rPr lang="en-US" sz="2400" dirty="0" smtClean="0">
+                <a:solidFill>
+                  <a:srgbClr val="2A00FF"/>
+                </a:solidFill>
+                <a:latin typeface="Courier New"/>
+              </a:rPr>
+              <a:t>""</a:t>
+            </a:r>
+            <a:r>
+              <a:rPr lang="en-US" sz="2400" dirty="0" smtClean="0">
+                <a:latin typeface="Courier New"/>
+              </a:rPr>
+              <a:t>  </a:t>
+            </a:r>
+          </a:p>
+          <a:p>
+            <a:r>
+              <a:rPr lang="en-US" sz="2400" dirty="0" smtClean="0">
+                <a:latin typeface="Courier New"/>
+              </a:rPr>
+              <a:t>  }</a:t>
+            </a:r>
+          </a:p>
+          <a:p>
+            <a:r>
+              <a:rPr lang="en-US" sz="2400" dirty="0" smtClean="0">
+                <a:latin typeface="Courier New"/>
+              </a:rPr>
+              <a:t>  </a:t>
+            </a:r>
+            <a:r>
+              <a:rPr lang="en-US" sz="2400" dirty="0" smtClean="0">
+                <a:solidFill>
+                  <a:srgbClr val="2A00FF"/>
+                </a:solidFill>
+                <a:latin typeface="Courier New"/>
+              </a:rPr>
+              <a:t>"a reversed empty string must really *be empty*"</a:t>
+            </a:r>
+            <a:r>
+              <a:rPr lang="en-US" sz="2400" dirty="0" smtClean="0">
+                <a:latin typeface="Courier New"/>
+              </a:rPr>
+              <a:t> in {</a:t>
+            </a:r>
+          </a:p>
+          <a:p>
+            <a:r>
+              <a:rPr lang="en-US" sz="2400" dirty="0" smtClean="0">
+                <a:latin typeface="Courier New"/>
+              </a:rPr>
+              <a:t>    reverse(</a:t>
+            </a:r>
+            <a:r>
+              <a:rPr lang="en-US" sz="2400" dirty="0" smtClean="0">
+                <a:solidFill>
+                  <a:srgbClr val="2A00FF"/>
+                </a:solidFill>
+                <a:latin typeface="Courier New"/>
+              </a:rPr>
+              <a:t>""</a:t>
+            </a:r>
+            <a:r>
+              <a:rPr lang="en-US" sz="2400" dirty="0" smtClean="0">
+                <a:latin typeface="Courier New"/>
+              </a:rPr>
+              <a:t>) must be empty</a:t>
+            </a:r>
+          </a:p>
+          <a:p>
+            <a:r>
+              <a:rPr lang="en-US" sz="2400" dirty="0" smtClean="0">
+                <a:latin typeface="Courier New"/>
+              </a:rPr>
+              <a:t>  }</a:t>
+            </a:r>
+          </a:p>
+          <a:p>
+            <a:r>
+              <a:rPr lang="en-US" sz="2400" dirty="0" smtClean="0">
+                <a:latin typeface="Courier New"/>
+              </a:rPr>
+              <a:t>  </a:t>
+            </a:r>
+            <a:r>
+              <a:rPr lang="en-US" sz="2400" dirty="0" smtClean="0">
+                <a:solidFill>
+                  <a:srgbClr val="2A00FF"/>
+                </a:solidFill>
+                <a:latin typeface="Courier New"/>
+              </a:rPr>
+              <a:t>"a reversed string must be reversed </a:t>
+            </a:r>
+            <a:r>
+              <a:rPr lang="en-US" sz="2400" dirty="0" err="1" smtClean="0">
+                <a:solidFill>
+                  <a:srgbClr val="2A00FF"/>
+                </a:solidFill>
+                <a:latin typeface="Courier New"/>
+              </a:rPr>
+              <a:t>abc</a:t>
+            </a:r>
+            <a:r>
+              <a:rPr lang="en-US" sz="2400" dirty="0" smtClean="0">
+                <a:solidFill>
+                  <a:srgbClr val="2A00FF"/>
+                </a:solidFill>
+                <a:latin typeface="Courier New"/>
+              </a:rPr>
+              <a:t> -&gt; </a:t>
+            </a:r>
+            <a:r>
+              <a:rPr lang="en-US" sz="2400" dirty="0" err="1" smtClean="0">
+                <a:solidFill>
+                  <a:srgbClr val="2A00FF"/>
+                </a:solidFill>
+                <a:latin typeface="Courier New"/>
+              </a:rPr>
+              <a:t>cba</a:t>
+            </a:r>
+            <a:r>
+              <a:rPr lang="en-US" sz="2400" dirty="0" smtClean="0">
+                <a:solidFill>
+                  <a:srgbClr val="2A00FF"/>
+                </a:solidFill>
+                <a:latin typeface="Courier New"/>
+              </a:rPr>
+              <a:t>"</a:t>
+            </a:r>
+            <a:r>
+              <a:rPr lang="en-US" sz="2400" dirty="0" smtClean="0">
+                <a:latin typeface="Courier New"/>
+              </a:rPr>
+              <a:t> in {</a:t>
+            </a:r>
+          </a:p>
+          <a:p>
+            <a:r>
+              <a:rPr lang="en-US" sz="2400" dirty="0" smtClean="0">
+                <a:latin typeface="Courier New"/>
+              </a:rPr>
+              <a:t>    reverse(</a:t>
+            </a:r>
+            <a:r>
+              <a:rPr lang="en-US" sz="2400" dirty="0" smtClean="0">
+                <a:solidFill>
+                  <a:srgbClr val="2A00FF"/>
+                </a:solidFill>
+                <a:latin typeface="Courier New"/>
+              </a:rPr>
+              <a:t>"</a:t>
+            </a:r>
+            <a:r>
+              <a:rPr lang="en-US" sz="2400" dirty="0" err="1" smtClean="0">
+                <a:solidFill>
+                  <a:srgbClr val="2A00FF"/>
+                </a:solidFill>
+                <a:latin typeface="Courier New"/>
+              </a:rPr>
+              <a:t>abc</a:t>
+            </a:r>
+            <a:r>
+              <a:rPr lang="en-US" sz="2400" dirty="0" smtClean="0">
+                <a:solidFill>
+                  <a:srgbClr val="2A00FF"/>
+                </a:solidFill>
+                <a:latin typeface="Courier New"/>
+              </a:rPr>
+              <a:t>"</a:t>
+            </a:r>
+            <a:r>
+              <a:rPr lang="en-US" sz="2400" dirty="0" smtClean="0">
+                <a:latin typeface="Courier New"/>
+              </a:rPr>
+              <a:t>) must be_==(</a:t>
+            </a:r>
+            <a:r>
+              <a:rPr lang="en-US" sz="2400" dirty="0" smtClean="0">
+                <a:solidFill>
+                  <a:srgbClr val="2A00FF"/>
+                </a:solidFill>
+                <a:latin typeface="Courier New"/>
+              </a:rPr>
+              <a:t>"</a:t>
+            </a:r>
+            <a:r>
+              <a:rPr lang="en-US" sz="2400" dirty="0" err="1" smtClean="0">
+                <a:solidFill>
+                  <a:srgbClr val="2A00FF"/>
+                </a:solidFill>
+                <a:latin typeface="Courier New"/>
+              </a:rPr>
+              <a:t>cba</a:t>
+            </a:r>
+            <a:r>
+              <a:rPr lang="en-US" sz="2400" dirty="0" smtClean="0">
+                <a:solidFill>
+                  <a:srgbClr val="2A00FF"/>
+                </a:solidFill>
+                <a:latin typeface="Courier New"/>
+              </a:rPr>
+              <a:t>"</a:t>
+            </a:r>
+            <a:r>
+              <a:rPr lang="en-US" sz="2400" dirty="0" smtClean="0">
+                <a:latin typeface="Courier New"/>
+              </a:rPr>
+              <a:t>)</a:t>
+            </a:r>
+          </a:p>
+          <a:p>
+            <a:r>
+              <a:rPr lang="en-US" sz="2400" dirty="0" smtClean="0">
+                <a:latin typeface="Courier New"/>
+              </a:rPr>
+              <a:t>  }</a:t>
+            </a:r>
+          </a:p>
+          <a:p>
+            <a:r>
+              <a:rPr lang="en-US" sz="2400" dirty="0" smtClean="0">
+                <a:latin typeface="Courier New"/>
+              </a:rPr>
+              <a:t>  </a:t>
+            </a:r>
+            <a:r>
+              <a:rPr lang="en-US" sz="2400" dirty="0" smtClean="0">
+                <a:solidFill>
+                  <a:srgbClr val="2A00FF"/>
+                </a:solidFill>
+                <a:latin typeface="Courier New"/>
+              </a:rPr>
+              <a:t>"a longer reversed string must also be reversed. Woops!"</a:t>
+            </a:r>
+            <a:r>
+              <a:rPr lang="en-US" sz="2400" dirty="0" smtClean="0">
+                <a:latin typeface="Courier New"/>
+              </a:rPr>
+              <a:t> in {</a:t>
+            </a:r>
+          </a:p>
+          <a:p>
+            <a:r>
+              <a:rPr lang="en-US" sz="2400" dirty="0" smtClean="0">
+                <a:latin typeface="Courier New"/>
+              </a:rPr>
+              <a:t>    reverse(</a:t>
+            </a:r>
+            <a:r>
+              <a:rPr lang="en-US" sz="2400" dirty="0" smtClean="0">
+                <a:solidFill>
+                  <a:srgbClr val="2A00FF"/>
+                </a:solidFill>
+                <a:latin typeface="Courier New"/>
+              </a:rPr>
+              <a:t>"</a:t>
+            </a:r>
+            <a:r>
+              <a:rPr lang="en-US" sz="2400" dirty="0" err="1" smtClean="0">
+                <a:solidFill>
+                  <a:srgbClr val="2A00FF"/>
+                </a:solidFill>
+                <a:latin typeface="Courier New"/>
+              </a:rPr>
+              <a:t>abcdef</a:t>
+            </a:r>
+            <a:r>
+              <a:rPr lang="en-US" sz="2400" dirty="0" smtClean="0">
+                <a:solidFill>
+                  <a:srgbClr val="2A00FF"/>
+                </a:solidFill>
+                <a:latin typeface="Courier New"/>
+              </a:rPr>
+              <a:t>"</a:t>
+            </a:r>
+            <a:r>
+              <a:rPr lang="en-US" sz="2400" dirty="0" smtClean="0">
+                <a:latin typeface="Courier New"/>
+              </a:rPr>
+              <a:t>) must be_==(</a:t>
+            </a:r>
+            <a:r>
+              <a:rPr lang="en-US" sz="2400" dirty="0" smtClean="0">
+                <a:solidFill>
+                  <a:srgbClr val="2A00FF"/>
+                </a:solidFill>
+                <a:latin typeface="Courier New"/>
+              </a:rPr>
+              <a:t>"</a:t>
+            </a:r>
+            <a:r>
+              <a:rPr lang="en-US" sz="2400" dirty="0" err="1" smtClean="0">
+                <a:solidFill>
+                  <a:srgbClr val="2A00FF"/>
+                </a:solidFill>
+                <a:latin typeface="Courier New"/>
+              </a:rPr>
+              <a:t>xxxxx</a:t>
+            </a:r>
+            <a:r>
+              <a:rPr lang="en-US" sz="2400" dirty="0" smtClean="0">
+                <a:solidFill>
+                  <a:srgbClr val="2A00FF"/>
+                </a:solidFill>
+                <a:latin typeface="Courier New"/>
+              </a:rPr>
+              <a:t>"</a:t>
+            </a:r>
+            <a:r>
+              <a:rPr lang="en-US" sz="2400" dirty="0" smtClean="0">
+                <a:latin typeface="Courier New"/>
+              </a:rPr>
+              <a:t>)</a:t>
+            </a:r>
+          </a:p>
+          <a:p>
+            <a:r>
+              <a:rPr lang="en-US" sz="2400" dirty="0" smtClean="0">
+                <a:latin typeface="Courier New"/>
+              </a:rPr>
+              <a:t>  }</a:t>
+            </a:r>
+          </a:p>
+          <a:p>
+            <a:r>
+              <a:rPr lang="en-US" sz="2400" dirty="0" smtClean="0">
+                <a:latin typeface="Courier New"/>
+              </a:rPr>
+              <a:t>}</a:t>
+            </a:r>
+            <a:endParaRPr lang="en-US" sz="2400" dirty="0"/>
+          </a:p>
+        </p:txBody>
+      </p:sp>
+    </p:spTree>
+  </p:cSld>
+  <p:clrMapOvr>
+    <a:masterClrMapping/>
+  </p:clrMapOvr>
+  <p:transition>
+    <p:fade/>
+  </p:transition>
+  <p:timing>
+    <p:tnLst>
+      <p:par>
+        <p:cTn id="1" dur="indefinite" restart="never" nodeType="tmRoot"/>
+      </p:par>
+    </p:tnLst>
+  </p:timing>
+</p:sld>
+</file>
+
+<file path=ppt/slides/slide8.xml><?xml version="1.0" encoding="utf-8"?>
+<p:sld xmlns:a="http://schemas.openxmlformats.org/drawingml/2006/main" xmlns:r="http://schemas.openxmlformats.org/officeDocument/2006/relationships" xmlns:p="http://schemas.openxmlformats.org/presentationml/2006/main">
+  <p:cSld>
+    <p:spTree>
+      <p:nvGrpSpPr>
+        <p:cNvPr id="1" name=""/>
+        <p:cNvGrpSpPr/>
+        <p:nvPr/>
+      </p:nvGrpSpPr>
+      <p:grpSpPr>
+        <a:xfrm>
+          <a:off x="0" y="0"/>
+          <a:ext cx="0" cy="0"/>
+          <a:chOff x="0" y="0"/>
+          <a:chExt cx="0" cy="0"/>
+        </a:xfrm>
+      </p:grpSpPr>
+      <p:sp>
+        <p:nvSpPr>
+          <p:cNvPr id="8193" name="Rectangle 1"/>
+          <p:cNvSpPr>
+            <a:spLocks noGrp="1" noChangeArrowheads="1"/>
+          </p:cNvSpPr>
+          <p:nvPr>
+            <p:ph type="title"/>
+          </p:nvPr>
+        </p:nvSpPr>
+        <p:spPr>
+          <a:ln/>
+        </p:spPr>
+        <p:txBody>
+          <a:bodyPr/>
+          <a:lstStyle/>
+          <a:p>
+            <a:pPr lvl="0"/>
+            <a:r>
+              <a:rPr lang="en-US" sz="5400" dirty="0" smtClean="0">
+                <a:latin typeface="Lucida Handwriting" pitchFamily="66" charset="0"/>
+              </a:rPr>
+              <a:t>     </a:t>
+            </a:r>
+            <a:r>
+              <a:rPr lang="en-US" sz="5400" dirty="0" smtClean="0">
+                <a:latin typeface="Lucida Handwriting" pitchFamily="66" charset="0"/>
+              </a:rPr>
+              <a:t>  tour</a:t>
+            </a:r>
+            <a:endParaRPr lang="en-US" dirty="0"/>
+          </a:p>
+        </p:txBody>
+      </p:sp>
+      <p:pic>
+        <p:nvPicPr>
+          <p:cNvPr id="39938" name="Picture 2" descr="Logo"/>
+          <p:cNvPicPr>
+            <a:picLocks noChangeAspect="1" noChangeArrowheads="1"/>
+          </p:cNvPicPr>
+          <p:nvPr/>
+        </p:nvPicPr>
+        <p:blipFill>
+          <a:blip r:embed="rId3"/>
+          <a:srcRect/>
+          <a:stretch>
+            <a:fillRect/>
+          </a:stretch>
+        </p:blipFill>
+        <p:spPr bwMode="auto">
+          <a:xfrm>
+            <a:off x="3833628" y="228600"/>
+            <a:ext cx="2287772" cy="642969"/>
+          </a:xfrm>
+          <a:prstGeom prst="rect">
+            <a:avLst/>
+          </a:prstGeom>
+          <a:noFill/>
+        </p:spPr>
+      </p:pic>
+      <p:sp>
+        <p:nvSpPr>
+          <p:cNvPr id="6" name="Rectangle 5"/>
+          <p:cNvSpPr/>
+          <p:nvPr/>
+        </p:nvSpPr>
+        <p:spPr>
+          <a:xfrm>
+            <a:off x="711200" y="1295400"/>
+            <a:ext cx="11734800" cy="4154984"/>
+          </a:xfrm>
+          <a:prstGeom prst="rect">
+            <a:avLst/>
+          </a:prstGeom>
+          <a:ln>
+            <a:solidFill>
+              <a:schemeClr val="tx1"/>
+            </a:solidFill>
+            <a:prstDash val="dash"/>
+          </a:ln>
+        </p:spPr>
+        <p:txBody>
+          <a:bodyPr wrap="square">
+            <a:spAutoFit/>
+          </a:bodyPr>
+          <a:lstStyle/>
+          <a:p>
+            <a:r>
+              <a:rPr lang="en-US" sz="2400" dirty="0" smtClean="0"/>
+              <a:t>Specification "</a:t>
+            </a:r>
+            <a:r>
+              <a:rPr lang="en-US" sz="2400" dirty="0" err="1" smtClean="0"/>
+              <a:t>ReverserSpec</a:t>
+            </a:r>
+            <a:r>
+              <a:rPr lang="en-US" sz="2400" dirty="0" smtClean="0"/>
+              <a:t>"</a:t>
+            </a:r>
+          </a:p>
+          <a:p>
+            <a:r>
+              <a:rPr lang="en-US" sz="2400" dirty="0" smtClean="0"/>
+              <a:t>  </a:t>
+            </a:r>
+          </a:p>
+          <a:p>
+            <a:r>
+              <a:rPr lang="en-US" sz="2400" dirty="0" smtClean="0"/>
+              <a:t>  + a reversed empty string must be empty</a:t>
+            </a:r>
+          </a:p>
+          <a:p>
+            <a:r>
+              <a:rPr lang="en-US" sz="2400" dirty="0" smtClean="0"/>
+              <a:t>  + a reversed empty string must really *be empty*</a:t>
+            </a:r>
+          </a:p>
+          <a:p>
+            <a:r>
+              <a:rPr lang="en-US" sz="2400" dirty="0" smtClean="0"/>
+              <a:t>  + a reversed string must be reversed </a:t>
+            </a:r>
+            <a:r>
+              <a:rPr lang="en-US" sz="2400" dirty="0" err="1" smtClean="0"/>
+              <a:t>abc</a:t>
+            </a:r>
+            <a:r>
+              <a:rPr lang="en-US" sz="2400" dirty="0" smtClean="0"/>
+              <a:t> -&gt; </a:t>
+            </a:r>
+            <a:r>
+              <a:rPr lang="en-US" sz="2400" dirty="0" err="1" smtClean="0"/>
+              <a:t>cba</a:t>
+            </a:r>
+            <a:endParaRPr lang="en-US" sz="2400" dirty="0" smtClean="0"/>
+          </a:p>
+          <a:p>
+            <a:r>
+              <a:rPr lang="en-US" sz="2400" dirty="0" smtClean="0"/>
+              <a:t>  x a longer reversed string must also be reversed. Woops!</a:t>
+            </a:r>
+          </a:p>
+          <a:p>
+            <a:r>
+              <a:rPr lang="en-US" sz="2400" dirty="0" smtClean="0"/>
+              <a:t>    '</a:t>
+            </a:r>
+            <a:r>
+              <a:rPr lang="en-US" sz="2400" dirty="0" err="1" smtClean="0"/>
+              <a:t>fedcba</a:t>
+            </a:r>
+            <a:r>
+              <a:rPr lang="en-US" sz="2400" dirty="0" smtClean="0"/>
+              <a:t>' is not equal to '</a:t>
+            </a:r>
+            <a:r>
+              <a:rPr lang="en-US" sz="2400" dirty="0" err="1" smtClean="0"/>
+              <a:t>xxxxx</a:t>
+            </a:r>
+            <a:r>
+              <a:rPr lang="en-US" sz="2400" dirty="0" smtClean="0"/>
+              <a:t>' (</a:t>
+            </a:r>
+            <a:r>
+              <a:rPr lang="en-US" sz="2400" u="sng" dirty="0" smtClean="0"/>
+              <a:t>ReverserSpec.scala:17)</a:t>
+            </a:r>
+          </a:p>
+          <a:p>
+            <a:endParaRPr lang="en-US" sz="2400" dirty="0" smtClean="0"/>
+          </a:p>
+          <a:p>
+            <a:r>
+              <a:rPr lang="en-US" sz="2400" dirty="0" smtClean="0"/>
+              <a:t>Total for specification "</a:t>
+            </a:r>
+            <a:r>
+              <a:rPr lang="en-US" sz="2400" dirty="0" err="1" smtClean="0"/>
+              <a:t>ReverserSpec</a:t>
+            </a:r>
+            <a:r>
+              <a:rPr lang="en-US" sz="2400" dirty="0" smtClean="0"/>
+              <a:t>":</a:t>
+            </a:r>
+          </a:p>
+          <a:p>
+            <a:r>
+              <a:rPr lang="en-US" sz="2400" dirty="0" smtClean="0"/>
+              <a:t>Finished in 0 second, 140 ms</a:t>
+            </a:r>
+          </a:p>
+          <a:p>
+            <a:r>
+              <a:rPr lang="en-US" sz="2400" dirty="0" smtClean="0"/>
+              <a:t>4 examples, 4 expectations, 1 failure, 0 </a:t>
+            </a:r>
+            <a:r>
+              <a:rPr lang="en-US" sz="2400" dirty="0" smtClean="0"/>
+              <a:t>error</a:t>
+            </a:r>
+            <a:endParaRPr lang="en-US" sz="2400" dirty="0"/>
+          </a:p>
+        </p:txBody>
+      </p:sp>
+    </p:spTree>
+  </p:cSld>
+  <p:clrMapOvr>
+    <a:masterClrMapping/>
+  </p:clrMapOvr>
+  <p:transition>
+    <p:fade/>
+  </p:transition>
+  <p:timing>
+    <p:tnLst>
+      <p:par>
+        <p:cTn id="1" dur="indefinite" restart="never" nodeType="tmRoot"/>
+      </p:par>
+    </p:tnLst>
+  </p:timing>
+</p:sld>
+</file>
+
+<file path=ppt/slides/slide9.xml><?xml version="1.0" encoding="utf-8"?>
+<p:sld xmlns:a="http://schemas.openxmlformats.org/drawingml/2006/main" xmlns:r="http://schemas.openxmlformats.org/officeDocument/2006/relationships" xmlns:p="http://schemas.openxmlformats.org/presentationml/2006/main">
+  <p:cSld>
+    <p:spTree>
+      <p:nvGrpSpPr>
+        <p:cNvPr id="1" name=""/>
+        <p:cNvGrpSpPr/>
+        <p:nvPr/>
+      </p:nvGrpSpPr>
+      <p:grpSpPr>
+        <a:xfrm>
+          <a:off x="0" y="0"/>
+          <a:ext cx="0" cy="0"/>
+          <a:chOff x="0" y="0"/>
+          <a:chExt cx="0" cy="0"/>
+        </a:xfrm>
+      </p:grpSpPr>
+      <p:sp>
+        <p:nvSpPr>
+          <p:cNvPr id="8193" name="Rectangle 1"/>
+          <p:cNvSpPr>
+            <a:spLocks noGrp="1" noChangeArrowheads="1"/>
+          </p:cNvSpPr>
+          <p:nvPr>
+            <p:ph type="title"/>
+          </p:nvPr>
+        </p:nvSpPr>
+        <p:spPr>
+          <a:ln/>
+        </p:spPr>
+        <p:txBody>
+          <a:bodyPr/>
+          <a:lstStyle/>
+          <a:p>
+            <a:pPr lvl="0"/>
+            <a:r>
+              <a:rPr lang="en-US" sz="5400" dirty="0" smtClean="0">
+                <a:latin typeface="Lucida Handwriting" pitchFamily="66" charset="0"/>
+              </a:rPr>
+              <a:t>     </a:t>
+            </a:r>
+            <a:r>
+              <a:rPr lang="en-US" sz="5400" dirty="0" smtClean="0">
+                <a:latin typeface="Lucida Handwriting" pitchFamily="66" charset="0"/>
+              </a:rPr>
+              <a:t>  tour</a:t>
+            </a:r>
+            <a:endParaRPr lang="en-US" dirty="0"/>
+          </a:p>
+        </p:txBody>
+      </p:sp>
+      <p:pic>
+        <p:nvPicPr>
+          <p:cNvPr id="39938" name="Picture 2" descr="Logo"/>
+          <p:cNvPicPr>
+            <a:picLocks noChangeAspect="1" noChangeArrowheads="1"/>
+          </p:cNvPicPr>
+          <p:nvPr/>
+        </p:nvPicPr>
+        <p:blipFill>
+          <a:blip r:embed="rId3"/>
+          <a:srcRect/>
+          <a:stretch>
+            <a:fillRect/>
+          </a:stretch>
+        </p:blipFill>
+        <p:spPr bwMode="auto">
+          <a:xfrm>
+            <a:off x="3833628" y="228600"/>
+            <a:ext cx="2287772" cy="642969"/>
+          </a:xfrm>
+          <a:prstGeom prst="rect">
+            <a:avLst/>
+          </a:prstGeom>
+          <a:noFill/>
+        </p:spPr>
+      </p:pic>
+      <p:sp>
+        <p:nvSpPr>
+          <p:cNvPr id="6" name="Rectangle 5"/>
+          <p:cNvSpPr/>
+          <p:nvPr/>
+        </p:nvSpPr>
+        <p:spPr>
+          <a:xfrm>
+            <a:off x="711200" y="1143000"/>
+            <a:ext cx="11734800" cy="7478970"/>
+          </a:xfrm>
+          <a:prstGeom prst="rect">
+            <a:avLst/>
+          </a:prstGeom>
+          <a:ln>
+            <a:solidFill>
+              <a:schemeClr val="tx1"/>
+            </a:solidFill>
+            <a:prstDash val="dash"/>
+          </a:ln>
+        </p:spPr>
+        <p:txBody>
+          <a:bodyPr wrap="square">
+            <a:spAutoFit/>
+          </a:bodyPr>
+          <a:lstStyle/>
+          <a:p>
+            <a:r>
+              <a:rPr lang="en-US" sz="2400" b="1" dirty="0" smtClean="0">
+                <a:solidFill>
+                  <a:srgbClr val="7F0055"/>
+                </a:solidFill>
+                <a:latin typeface="Courier New"/>
+              </a:rPr>
+              <a:t>class</a:t>
+            </a:r>
+            <a:r>
+              <a:rPr lang="en-US" sz="2400" b="1" dirty="0" smtClean="0">
+                <a:latin typeface="Courier New"/>
+              </a:rPr>
+              <a:t> </a:t>
+            </a:r>
+            <a:r>
+              <a:rPr lang="en-US" sz="2400" b="1" dirty="0" smtClean="0">
+                <a:latin typeface="Courier New"/>
+              </a:rPr>
+              <a:t>Reverser2Spec </a:t>
+            </a:r>
+            <a:r>
+              <a:rPr lang="en-US" sz="2400" b="1" dirty="0" smtClean="0">
+                <a:solidFill>
+                  <a:srgbClr val="7F0055"/>
+                </a:solidFill>
+                <a:latin typeface="Courier New"/>
+              </a:rPr>
+              <a:t>extends</a:t>
+            </a:r>
+            <a:r>
+              <a:rPr lang="en-US" sz="2400" b="1" dirty="0" smtClean="0">
+                <a:latin typeface="Courier New"/>
+              </a:rPr>
+              <a:t> Specification {</a:t>
+            </a:r>
+          </a:p>
+          <a:p>
+            <a:r>
+              <a:rPr lang="en-US" sz="2400" dirty="0" smtClean="0">
+                <a:latin typeface="Courier New"/>
+              </a:rPr>
+              <a:t>  </a:t>
+            </a:r>
+            <a:r>
+              <a:rPr lang="en-US" sz="2400" dirty="0" smtClean="0">
+                <a:solidFill>
+                  <a:srgbClr val="2A00FF"/>
+                </a:solidFill>
+                <a:latin typeface="Courier New"/>
+              </a:rPr>
+              <a:t>"a reversed empty string"</a:t>
+            </a:r>
+            <a:r>
+              <a:rPr lang="en-US" sz="2400" dirty="0" smtClean="0">
+                <a:latin typeface="Courier New"/>
+              </a:rPr>
+              <a:t> should {</a:t>
+            </a:r>
+          </a:p>
+          <a:p>
+            <a:r>
+              <a:rPr lang="en-US" sz="2400" b="1" dirty="0" smtClean="0">
+                <a:solidFill>
+                  <a:srgbClr val="7F0055"/>
+                </a:solidFill>
+                <a:latin typeface="Courier New"/>
+              </a:rPr>
+              <a:t>    </a:t>
+            </a:r>
+            <a:r>
+              <a:rPr lang="en-US" sz="2400" b="1" dirty="0" err="1" smtClean="0">
+                <a:solidFill>
+                  <a:srgbClr val="7F0055"/>
+                </a:solidFill>
+                <a:latin typeface="Courier New"/>
+              </a:rPr>
+              <a:t>val</a:t>
+            </a:r>
+            <a:r>
+              <a:rPr lang="en-US" sz="2400" b="1" dirty="0" smtClean="0">
+                <a:latin typeface="Courier New"/>
+              </a:rPr>
+              <a:t> </a:t>
+            </a:r>
+            <a:r>
+              <a:rPr lang="en-US" sz="2400" b="1" dirty="0" smtClean="0">
+                <a:latin typeface="Courier New"/>
+              </a:rPr>
+              <a:t>reversed = reverse(</a:t>
+            </a:r>
+            <a:r>
+              <a:rPr lang="en-US" sz="2400" b="1" dirty="0" smtClean="0">
+                <a:solidFill>
+                  <a:srgbClr val="2A00FF"/>
+                </a:solidFill>
+                <a:latin typeface="Courier New"/>
+              </a:rPr>
+              <a:t>""</a:t>
+            </a:r>
+            <a:r>
+              <a:rPr lang="en-US" sz="2400" b="1" dirty="0" smtClean="0">
+                <a:latin typeface="Courier New"/>
+              </a:rPr>
+              <a:t>)  </a:t>
+            </a:r>
+          </a:p>
+          <a:p>
+            <a:r>
+              <a:rPr lang="en-US" sz="2400" dirty="0" smtClean="0">
+                <a:latin typeface="Courier New"/>
+              </a:rPr>
+              <a:t>    </a:t>
+            </a:r>
+            <a:r>
+              <a:rPr lang="en-US" sz="2400" dirty="0" smtClean="0">
+                <a:solidFill>
+                  <a:srgbClr val="2A00FF"/>
+                </a:solidFill>
+                <a:latin typeface="Courier New"/>
+              </a:rPr>
+              <a:t>"be empty"</a:t>
+            </a:r>
+            <a:r>
+              <a:rPr lang="en-US" sz="2400" dirty="0" smtClean="0">
+                <a:latin typeface="Courier New"/>
+              </a:rPr>
+              <a:t> in {</a:t>
+            </a:r>
+          </a:p>
+          <a:p>
+            <a:r>
+              <a:rPr lang="en-US" sz="2400" dirty="0" smtClean="0">
+                <a:latin typeface="Courier New"/>
+              </a:rPr>
+              <a:t>      reversed must_== </a:t>
+            </a:r>
+            <a:r>
+              <a:rPr lang="en-US" sz="2400" dirty="0" smtClean="0">
+                <a:solidFill>
+                  <a:srgbClr val="2A00FF"/>
+                </a:solidFill>
+                <a:latin typeface="Courier New"/>
+              </a:rPr>
+              <a:t>""</a:t>
+            </a:r>
+            <a:r>
+              <a:rPr lang="en-US" sz="2400" dirty="0" smtClean="0">
+                <a:latin typeface="Courier New"/>
+              </a:rPr>
+              <a:t>  </a:t>
+            </a:r>
+          </a:p>
+          <a:p>
+            <a:r>
+              <a:rPr lang="en-US" sz="2400" dirty="0" smtClean="0">
+                <a:latin typeface="Courier New"/>
+              </a:rPr>
+              <a:t>    }</a:t>
+            </a:r>
+          </a:p>
+          <a:p>
+            <a:r>
+              <a:rPr lang="en-US" sz="2400" dirty="0" smtClean="0">
+                <a:latin typeface="Courier New"/>
+              </a:rPr>
+              <a:t>    </a:t>
+            </a:r>
+            <a:r>
+              <a:rPr lang="en-US" sz="2400" dirty="0" smtClean="0">
+                <a:solidFill>
+                  <a:srgbClr val="2A00FF"/>
+                </a:solidFill>
+                <a:latin typeface="Courier New"/>
+              </a:rPr>
+              <a:t>"really *be empty*"</a:t>
+            </a:r>
+            <a:r>
+              <a:rPr lang="en-US" sz="2400" dirty="0" smtClean="0">
+                <a:latin typeface="Courier New"/>
+              </a:rPr>
+              <a:t> in {</a:t>
+            </a:r>
+          </a:p>
+          <a:p>
+            <a:r>
+              <a:rPr lang="en-US" sz="2400" dirty="0" smtClean="0">
+                <a:latin typeface="Courier New"/>
+              </a:rPr>
+              <a:t>      reversed must be empty</a:t>
+            </a:r>
+          </a:p>
+          <a:p>
+            <a:r>
+              <a:rPr lang="en-US" sz="2400" dirty="0" smtClean="0">
+                <a:latin typeface="Courier New"/>
+              </a:rPr>
+              <a:t>    }</a:t>
+            </a:r>
+          </a:p>
+          <a:p>
+            <a:r>
+              <a:rPr lang="en-US" sz="2400" dirty="0" smtClean="0">
+                <a:latin typeface="Courier New"/>
+              </a:rPr>
+              <a:t>  }</a:t>
+            </a:r>
+          </a:p>
+          <a:p>
+            <a:r>
+              <a:rPr lang="en-US" sz="2400" dirty="0" smtClean="0">
+                <a:latin typeface="Courier New"/>
+              </a:rPr>
+              <a:t>  </a:t>
+            </a:r>
+            <a:r>
+              <a:rPr lang="en-US" sz="2400" dirty="0" smtClean="0">
+                <a:solidFill>
+                  <a:srgbClr val="2A00FF"/>
+                </a:solidFill>
+                <a:latin typeface="Courier New"/>
+              </a:rPr>
+              <a:t>"a reversed non-empty string"</a:t>
+            </a:r>
+            <a:r>
+              <a:rPr lang="en-US" sz="2400" dirty="0" smtClean="0">
+                <a:latin typeface="Courier New"/>
+              </a:rPr>
+              <a:t> should {</a:t>
+            </a:r>
+          </a:p>
+          <a:p>
+            <a:r>
+              <a:rPr lang="en-US" sz="2400" b="1" dirty="0" smtClean="0">
+                <a:solidFill>
+                  <a:srgbClr val="7F0055"/>
+                </a:solidFill>
+                <a:latin typeface="Courier New"/>
+              </a:rPr>
+              <a:t>    </a:t>
+            </a:r>
+            <a:r>
+              <a:rPr lang="en-US" sz="2400" b="1" dirty="0" err="1" smtClean="0">
+                <a:solidFill>
+                  <a:srgbClr val="7F0055"/>
+                </a:solidFill>
+                <a:latin typeface="Courier New"/>
+              </a:rPr>
+              <a:t>val</a:t>
+            </a:r>
+            <a:r>
+              <a:rPr lang="en-US" sz="2400" b="1" dirty="0" smtClean="0">
+                <a:latin typeface="Courier New"/>
+              </a:rPr>
+              <a:t> </a:t>
+            </a:r>
+            <a:r>
+              <a:rPr lang="en-US" sz="2400" b="1" dirty="0" smtClean="0">
+                <a:latin typeface="Courier New"/>
+              </a:rPr>
+              <a:t>reversed = reverse(</a:t>
+            </a:r>
+            <a:r>
+              <a:rPr lang="en-US" sz="2400" b="1" dirty="0" smtClean="0">
+                <a:solidFill>
+                  <a:srgbClr val="2A00FF"/>
+                </a:solidFill>
+                <a:latin typeface="Courier New"/>
+              </a:rPr>
+              <a:t>"</a:t>
+            </a:r>
+            <a:r>
+              <a:rPr lang="en-US" sz="2400" b="1" dirty="0" err="1" smtClean="0">
+                <a:solidFill>
+                  <a:srgbClr val="2A00FF"/>
+                </a:solidFill>
+                <a:latin typeface="Courier New"/>
+              </a:rPr>
+              <a:t>abc</a:t>
+            </a:r>
+            <a:r>
+              <a:rPr lang="en-US" sz="2400" b="1" dirty="0" smtClean="0">
+                <a:solidFill>
+                  <a:srgbClr val="2A00FF"/>
+                </a:solidFill>
+                <a:latin typeface="Courier New"/>
+              </a:rPr>
+              <a:t>"</a:t>
+            </a:r>
+            <a:r>
+              <a:rPr lang="en-US" sz="2400" b="1" dirty="0" smtClean="0">
+                <a:latin typeface="Courier New"/>
+              </a:rPr>
+              <a:t>)  </a:t>
+            </a:r>
+          </a:p>
+          <a:p>
+            <a:r>
+              <a:rPr lang="en-US" sz="2400" dirty="0" smtClean="0">
+                <a:latin typeface="Courier New"/>
+              </a:rPr>
+              <a:t>    </a:t>
+            </a:r>
+            <a:r>
+              <a:rPr lang="en-US" sz="2400" dirty="0" smtClean="0">
+                <a:solidFill>
+                  <a:srgbClr val="2A00FF"/>
+                </a:solidFill>
+                <a:latin typeface="Courier New"/>
+              </a:rPr>
+              <a:t>"be reversed </a:t>
+            </a:r>
+            <a:r>
+              <a:rPr lang="en-US" sz="2400" dirty="0" err="1" smtClean="0">
+                <a:solidFill>
+                  <a:srgbClr val="2A00FF"/>
+                </a:solidFill>
+                <a:latin typeface="Courier New"/>
+              </a:rPr>
+              <a:t>abc</a:t>
+            </a:r>
+            <a:r>
+              <a:rPr lang="en-US" sz="2400" dirty="0" smtClean="0">
+                <a:solidFill>
+                  <a:srgbClr val="2A00FF"/>
+                </a:solidFill>
+                <a:latin typeface="Courier New"/>
+              </a:rPr>
+              <a:t> -&gt; </a:t>
+            </a:r>
+            <a:r>
+              <a:rPr lang="en-US" sz="2400" dirty="0" err="1" smtClean="0">
+                <a:solidFill>
+                  <a:srgbClr val="2A00FF"/>
+                </a:solidFill>
+                <a:latin typeface="Courier New"/>
+              </a:rPr>
+              <a:t>cba</a:t>
+            </a:r>
+            <a:r>
+              <a:rPr lang="en-US" sz="2400" dirty="0" smtClean="0">
+                <a:solidFill>
+                  <a:srgbClr val="2A00FF"/>
+                </a:solidFill>
+                <a:latin typeface="Courier New"/>
+              </a:rPr>
+              <a:t>"</a:t>
+            </a:r>
+            <a:r>
+              <a:rPr lang="en-US" sz="2400" dirty="0" smtClean="0">
+                <a:latin typeface="Courier New"/>
+              </a:rPr>
+              <a:t> in {</a:t>
+            </a:r>
+          </a:p>
+          <a:p>
+            <a:r>
+              <a:rPr lang="en-US" sz="2400" dirty="0" smtClean="0">
+                <a:latin typeface="Courier New"/>
+              </a:rPr>
+              <a:t>      reversed must be_==(</a:t>
+            </a:r>
+            <a:r>
+              <a:rPr lang="en-US" sz="2400" dirty="0" smtClean="0">
+                <a:solidFill>
+                  <a:srgbClr val="2A00FF"/>
+                </a:solidFill>
+                <a:latin typeface="Courier New"/>
+              </a:rPr>
+              <a:t>"</a:t>
+            </a:r>
+            <a:r>
+              <a:rPr lang="en-US" sz="2400" dirty="0" err="1" smtClean="0">
+                <a:solidFill>
+                  <a:srgbClr val="2A00FF"/>
+                </a:solidFill>
+                <a:latin typeface="Courier New"/>
+              </a:rPr>
+              <a:t>cba</a:t>
+            </a:r>
+            <a:r>
+              <a:rPr lang="en-US" sz="2400" dirty="0" smtClean="0">
+                <a:solidFill>
+                  <a:srgbClr val="2A00FF"/>
+                </a:solidFill>
+                <a:latin typeface="Courier New"/>
+              </a:rPr>
+              <a:t>"</a:t>
+            </a:r>
+            <a:r>
+              <a:rPr lang="en-US" sz="2400" dirty="0" smtClean="0">
+                <a:latin typeface="Courier New"/>
+              </a:rPr>
+              <a:t>)</a:t>
+            </a:r>
+          </a:p>
+          <a:p>
+            <a:r>
+              <a:rPr lang="en-US" sz="2400" dirty="0" smtClean="0">
+                <a:latin typeface="Courier New"/>
+              </a:rPr>
+              <a:t>    }</a:t>
+            </a:r>
+          </a:p>
+          <a:p>
+            <a:r>
+              <a:rPr lang="en-US" sz="2400" dirty="0" smtClean="0">
+                <a:latin typeface="Courier New"/>
+              </a:rPr>
+              <a:t>    </a:t>
+            </a:r>
+            <a:r>
+              <a:rPr lang="en-US" sz="2400" dirty="0" smtClean="0">
+                <a:solidFill>
+                  <a:srgbClr val="2A00FF"/>
+                </a:solidFill>
+                <a:latin typeface="Courier New"/>
+              </a:rPr>
+              <a:t>"have the same size as the original string"</a:t>
+            </a:r>
+            <a:r>
+              <a:rPr lang="en-US" sz="2400" dirty="0" smtClean="0">
+                <a:latin typeface="Courier New"/>
+              </a:rPr>
+              <a:t> in {</a:t>
+            </a:r>
+          </a:p>
+          <a:p>
+            <a:r>
+              <a:rPr lang="en-US" sz="2400" dirty="0" smtClean="0">
+                <a:latin typeface="Courier New"/>
+              </a:rPr>
+              <a:t>      reversed must have size(3)</a:t>
+            </a:r>
+          </a:p>
+          <a:p>
+            <a:r>
+              <a:rPr lang="en-US" sz="2400" dirty="0" smtClean="0">
+                <a:latin typeface="Courier New"/>
+              </a:rPr>
+              <a:t>    }</a:t>
+            </a:r>
+          </a:p>
+          <a:p>
+            <a:r>
+              <a:rPr lang="en-US" sz="2400" dirty="0" smtClean="0">
+                <a:latin typeface="Courier New"/>
+              </a:rPr>
+              <a:t>  }</a:t>
+            </a:r>
+          </a:p>
+          <a:p>
+            <a:r>
+              <a:rPr lang="en-US" sz="2400" dirty="0" smtClean="0">
+                <a:latin typeface="Courier New"/>
+              </a:rPr>
+              <a:t>}</a:t>
+            </a:r>
+            <a:endParaRPr lang="en-US" sz="2400" dirty="0"/>
+          </a:p>
+        </p:txBody>
+      </p:sp>
     </p:spTree>
   </p:cSld>
   <p:clrMapOvr>

</xml_diff>

<commit_message>
added an xml spec
</commit_message>
<xml_diff>
--- a/src/main/resources/oscon_2010_specs.pptx
+++ b/src/main/resources/oscon_2010_specs.pptx
@@ -6,7 +6,7 @@
     <p:sldMasterId id="2147483651" r:id="rId2"/>
   </p:sldMasterIdLst>
   <p:notesMasterIdLst>
-    <p:notesMasterId r:id="rId12"/>
+    <p:notesMasterId r:id="rId14"/>
   </p:notesMasterIdLst>
   <p:sldIdLst>
     <p:sldId id="258" r:id="rId3"/>
@@ -18,6 +18,8 @@
     <p:sldId id="264" r:id="rId9"/>
     <p:sldId id="265" r:id="rId10"/>
     <p:sldId id="266" r:id="rId11"/>
+    <p:sldId id="267" r:id="rId12"/>
+    <p:sldId id="268" r:id="rId13"/>
   </p:sldIdLst>
   <p:sldSz cx="13004800" cy="9753600"/>
   <p:notesSz cx="6858000" cy="9144000"/>
@@ -649,6 +651,174 @@
       <p:sp>
         <p:nvSpPr>
           <p:cNvPr id="18435" name="Rectangle 3"/>
+          <p:cNvSpPr>
+            <a:spLocks noGrp="1"/>
+          </p:cNvSpPr>
+          <p:nvPr>
+            <p:ph type="body" idx="1"/>
+          </p:nvPr>
+        </p:nvSpPr>
+        <p:spPr/>
+        <p:txBody>
+          <a:bodyPr/>
+          <a:lstStyle/>
+          <a:p>
+            <a:endParaRPr lang="en-US"/>
+          </a:p>
+        </p:txBody>
+      </p:sp>
+    </p:spTree>
+  </p:cSld>
+  <p:clrMapOvr>
+    <a:masterClrMapping/>
+  </p:clrMapOvr>
+</p:notes>
+</file>
+
+<file path=ppt/notesSlides/notesSlide10.xml><?xml version="1.0" encoding="utf-8"?>
+<p:notes xmlns:a="http://schemas.openxmlformats.org/drawingml/2006/main" xmlns:r="http://schemas.openxmlformats.org/officeDocument/2006/relationships" xmlns:p="http://schemas.openxmlformats.org/presentationml/2006/main">
+  <p:cSld>
+    <p:spTree>
+      <p:nvGrpSpPr>
+        <p:cNvPr id="1" name=""/>
+        <p:cNvGrpSpPr/>
+        <p:nvPr/>
+      </p:nvGrpSpPr>
+      <p:grpSpPr>
+        <a:xfrm>
+          <a:off x="0" y="0"/>
+          <a:ext cx="0" cy="0"/>
+          <a:chOff x="0" y="0"/>
+          <a:chExt cx="0" cy="0"/>
+        </a:xfrm>
+      </p:grpSpPr>
+      <p:sp>
+        <p:nvSpPr>
+          <p:cNvPr id="7" name="Rectangle 7"/>
+          <p:cNvSpPr>
+            <a:spLocks noGrp="1"/>
+          </p:cNvSpPr>
+          <p:nvPr>
+            <p:ph type="sldNum" sz="quarter" idx="5"/>
+          </p:nvPr>
+        </p:nvSpPr>
+        <p:spPr>
+          <a:ln/>
+        </p:spPr>
+        <p:txBody>
+          <a:bodyPr/>
+          <a:lstStyle/>
+          <a:p>
+            <a:fld id="{27AEA7DA-096A-4FB7-B4B3-D12717EF4BDD}" type="slidenum">
+              <a:rPr lang="en-US"/>
+              <a:pPr/>
+              <a:t>10</a:t>
+            </a:fld>
+            <a:endParaRPr lang="en-US"/>
+          </a:p>
+        </p:txBody>
+      </p:sp>
+      <p:sp>
+        <p:nvSpPr>
+          <p:cNvPr id="19458" name="Rectangle 2"/>
+          <p:cNvSpPr>
+            <a:spLocks noGrp="1" noRot="1" noChangeAspect="1" noChangeArrowheads="1" noTextEdit="1"/>
+          </p:cNvSpPr>
+          <p:nvPr>
+            <p:ph type="sldImg"/>
+          </p:nvPr>
+        </p:nvSpPr>
+        <p:spPr>
+          <a:ln/>
+        </p:spPr>
+      </p:sp>
+      <p:sp>
+        <p:nvSpPr>
+          <p:cNvPr id="19459" name="Rectangle 3"/>
+          <p:cNvSpPr>
+            <a:spLocks noGrp="1"/>
+          </p:cNvSpPr>
+          <p:nvPr>
+            <p:ph type="body" idx="1"/>
+          </p:nvPr>
+        </p:nvSpPr>
+        <p:spPr/>
+        <p:txBody>
+          <a:bodyPr/>
+          <a:lstStyle/>
+          <a:p>
+            <a:endParaRPr lang="en-US"/>
+          </a:p>
+        </p:txBody>
+      </p:sp>
+    </p:spTree>
+  </p:cSld>
+  <p:clrMapOvr>
+    <a:masterClrMapping/>
+  </p:clrMapOvr>
+</p:notes>
+</file>
+
+<file path=ppt/notesSlides/notesSlide11.xml><?xml version="1.0" encoding="utf-8"?>
+<p:notes xmlns:a="http://schemas.openxmlformats.org/drawingml/2006/main" xmlns:r="http://schemas.openxmlformats.org/officeDocument/2006/relationships" xmlns:p="http://schemas.openxmlformats.org/presentationml/2006/main">
+  <p:cSld>
+    <p:spTree>
+      <p:nvGrpSpPr>
+        <p:cNvPr id="1" name=""/>
+        <p:cNvGrpSpPr/>
+        <p:nvPr/>
+      </p:nvGrpSpPr>
+      <p:grpSpPr>
+        <a:xfrm>
+          <a:off x="0" y="0"/>
+          <a:ext cx="0" cy="0"/>
+          <a:chOff x="0" y="0"/>
+          <a:chExt cx="0" cy="0"/>
+        </a:xfrm>
+      </p:grpSpPr>
+      <p:sp>
+        <p:nvSpPr>
+          <p:cNvPr id="7" name="Rectangle 7"/>
+          <p:cNvSpPr>
+            <a:spLocks noGrp="1"/>
+          </p:cNvSpPr>
+          <p:nvPr>
+            <p:ph type="sldNum" sz="quarter" idx="5"/>
+          </p:nvPr>
+        </p:nvSpPr>
+        <p:spPr>
+          <a:ln/>
+        </p:spPr>
+        <p:txBody>
+          <a:bodyPr/>
+          <a:lstStyle/>
+          <a:p>
+            <a:fld id="{27AEA7DA-096A-4FB7-B4B3-D12717EF4BDD}" type="slidenum">
+              <a:rPr lang="en-US"/>
+              <a:pPr/>
+              <a:t>11</a:t>
+            </a:fld>
+            <a:endParaRPr lang="en-US"/>
+          </a:p>
+        </p:txBody>
+      </p:sp>
+      <p:sp>
+        <p:nvSpPr>
+          <p:cNvPr id="19458" name="Rectangle 2"/>
+          <p:cNvSpPr>
+            <a:spLocks noGrp="1" noRot="1" noChangeAspect="1" noChangeArrowheads="1" noTextEdit="1"/>
+          </p:cNvSpPr>
+          <p:nvPr>
+            <p:ph type="sldImg"/>
+          </p:nvPr>
+        </p:nvSpPr>
+        <p:spPr>
+          <a:ln/>
+        </p:spPr>
+      </p:sp>
+      <p:sp>
+        <p:nvSpPr>
+          <p:cNvPr id="19459" name="Rectangle 3"/>
           <p:cNvSpPr>
             <a:spLocks noGrp="1"/>
           </p:cNvSpPr>
@@ -5870,6 +6040,635 @@
               <a:t>Tips and tricks for a successful DSL</a:t>
             </a:r>
             <a:endParaRPr lang="en-US" dirty="0"/>
+          </a:p>
+        </p:txBody>
+      </p:sp>
+    </p:spTree>
+  </p:cSld>
+  <p:clrMapOvr>
+    <a:masterClrMapping/>
+  </p:clrMapOvr>
+  <p:transition>
+    <p:fade/>
+  </p:transition>
+  <p:timing>
+    <p:tnLst>
+      <p:par>
+        <p:cTn id="1" dur="indefinite" restart="never" nodeType="tmRoot"/>
+      </p:par>
+    </p:tnLst>
+  </p:timing>
+</p:sld>
+</file>
+
+<file path=ppt/slides/slide10.xml><?xml version="1.0" encoding="utf-8"?>
+<p:sld xmlns:a="http://schemas.openxmlformats.org/drawingml/2006/main" xmlns:r="http://schemas.openxmlformats.org/officeDocument/2006/relationships" xmlns:p="http://schemas.openxmlformats.org/presentationml/2006/main">
+  <p:cSld>
+    <p:spTree>
+      <p:nvGrpSpPr>
+        <p:cNvPr id="1" name=""/>
+        <p:cNvGrpSpPr/>
+        <p:nvPr/>
+      </p:nvGrpSpPr>
+      <p:grpSpPr>
+        <a:xfrm>
+          <a:off x="0" y="0"/>
+          <a:ext cx="0" cy="0"/>
+          <a:chOff x="0" y="0"/>
+          <a:chExt cx="0" cy="0"/>
+        </a:xfrm>
+      </p:grpSpPr>
+      <p:sp>
+        <p:nvSpPr>
+          <p:cNvPr id="8193" name="Rectangle 1"/>
+          <p:cNvSpPr>
+            <a:spLocks noGrp="1" noChangeArrowheads="1"/>
+          </p:cNvSpPr>
+          <p:nvPr>
+            <p:ph type="title"/>
+          </p:nvPr>
+        </p:nvSpPr>
+        <p:spPr>
+          <a:ln/>
+        </p:spPr>
+        <p:txBody>
+          <a:bodyPr/>
+          <a:lstStyle/>
+          <a:p>
+            <a:pPr lvl="0"/>
+            <a:r>
+              <a:rPr lang="en-US" sz="5400" dirty="0" smtClean="0">
+                <a:latin typeface="Lucida Handwriting" pitchFamily="66" charset="0"/>
+              </a:rPr>
+              <a:t>       tour</a:t>
+            </a:r>
+            <a:endParaRPr lang="en-US" dirty="0"/>
+          </a:p>
+        </p:txBody>
+      </p:sp>
+      <p:pic>
+        <p:nvPicPr>
+          <p:cNvPr id="39938" name="Picture 2" descr="Logo"/>
+          <p:cNvPicPr>
+            <a:picLocks noChangeAspect="1" noChangeArrowheads="1"/>
+          </p:cNvPicPr>
+          <p:nvPr/>
+        </p:nvPicPr>
+        <p:blipFill>
+          <a:blip r:embed="rId3"/>
+          <a:srcRect/>
+          <a:stretch>
+            <a:fillRect/>
+          </a:stretch>
+        </p:blipFill>
+        <p:spPr bwMode="auto">
+          <a:xfrm>
+            <a:off x="3833628" y="228600"/>
+            <a:ext cx="2287772" cy="642969"/>
+          </a:xfrm>
+          <a:prstGeom prst="rect">
+            <a:avLst/>
+          </a:prstGeom>
+          <a:noFill/>
+        </p:spPr>
+      </p:pic>
+      <p:pic>
+        <p:nvPicPr>
+          <p:cNvPr id="1026" name="Picture 2"/>
+          <p:cNvPicPr>
+            <a:picLocks noChangeAspect="1" noChangeArrowheads="1"/>
+          </p:cNvPicPr>
+          <p:nvPr/>
+        </p:nvPicPr>
+        <p:blipFill>
+          <a:blip r:embed="rId4"/>
+          <a:srcRect l="2477" t="18307" r="71667" b="65217"/>
+          <a:stretch>
+            <a:fillRect/>
+          </a:stretch>
+        </p:blipFill>
+        <p:spPr bwMode="auto">
+          <a:xfrm>
+            <a:off x="1122947" y="2362200"/>
+            <a:ext cx="10836220" cy="4191000"/>
+          </a:xfrm>
+          <a:prstGeom prst="rect">
+            <a:avLst/>
+          </a:prstGeom>
+          <a:noFill/>
+          <a:ln w="9525">
+            <a:noFill/>
+            <a:miter lim="800000"/>
+            <a:headEnd/>
+            <a:tailEnd/>
+          </a:ln>
+          <a:effectLst/>
+        </p:spPr>
+      </p:pic>
+    </p:spTree>
+  </p:cSld>
+  <p:clrMapOvr>
+    <a:masterClrMapping/>
+  </p:clrMapOvr>
+  <p:transition>
+    <p:fade/>
+  </p:transition>
+  <p:timing>
+    <p:tnLst>
+      <p:par>
+        <p:cTn id="1" dur="indefinite" restart="never" nodeType="tmRoot"/>
+      </p:par>
+    </p:tnLst>
+  </p:timing>
+</p:sld>
+</file>
+
+<file path=ppt/slides/slide11.xml><?xml version="1.0" encoding="utf-8"?>
+<p:sld xmlns:a="http://schemas.openxmlformats.org/drawingml/2006/main" xmlns:r="http://schemas.openxmlformats.org/officeDocument/2006/relationships" xmlns:p="http://schemas.openxmlformats.org/presentationml/2006/main">
+  <p:cSld>
+    <p:spTree>
+      <p:nvGrpSpPr>
+        <p:cNvPr id="1" name=""/>
+        <p:cNvGrpSpPr/>
+        <p:nvPr/>
+      </p:nvGrpSpPr>
+      <p:grpSpPr>
+        <a:xfrm>
+          <a:off x="0" y="0"/>
+          <a:ext cx="0" cy="0"/>
+          <a:chOff x="0" y="0"/>
+          <a:chExt cx="0" cy="0"/>
+        </a:xfrm>
+      </p:grpSpPr>
+      <p:sp>
+        <p:nvSpPr>
+          <p:cNvPr id="8193" name="Rectangle 1"/>
+          <p:cNvSpPr>
+            <a:spLocks noGrp="1" noChangeArrowheads="1"/>
+          </p:cNvSpPr>
+          <p:nvPr>
+            <p:ph type="title"/>
+          </p:nvPr>
+        </p:nvSpPr>
+        <p:spPr>
+          <a:ln/>
+        </p:spPr>
+        <p:txBody>
+          <a:bodyPr/>
+          <a:lstStyle/>
+          <a:p>
+            <a:pPr lvl="0"/>
+            <a:r>
+              <a:rPr lang="en-US" sz="5400" dirty="0" smtClean="0">
+                <a:latin typeface="Lucida Handwriting" pitchFamily="66" charset="0"/>
+              </a:rPr>
+              <a:t>       tour</a:t>
+            </a:r>
+            <a:endParaRPr lang="en-US" dirty="0"/>
+          </a:p>
+        </p:txBody>
+      </p:sp>
+      <p:pic>
+        <p:nvPicPr>
+          <p:cNvPr id="39938" name="Picture 2" descr="Logo"/>
+          <p:cNvPicPr>
+            <a:picLocks noChangeAspect="1" noChangeArrowheads="1"/>
+          </p:cNvPicPr>
+          <p:nvPr/>
+        </p:nvPicPr>
+        <p:blipFill>
+          <a:blip r:embed="rId3"/>
+          <a:srcRect/>
+          <a:stretch>
+            <a:fillRect/>
+          </a:stretch>
+        </p:blipFill>
+        <p:spPr bwMode="auto">
+          <a:xfrm>
+            <a:off x="3833628" y="228600"/>
+            <a:ext cx="2287772" cy="642969"/>
+          </a:xfrm>
+          <a:prstGeom prst="rect">
+            <a:avLst/>
+          </a:prstGeom>
+          <a:noFill/>
+        </p:spPr>
+      </p:pic>
+      <p:sp>
+        <p:nvSpPr>
+          <p:cNvPr id="6" name="Rectangle 5"/>
+          <p:cNvSpPr/>
+          <p:nvPr/>
+        </p:nvSpPr>
+        <p:spPr>
+          <a:xfrm>
+            <a:off x="558800" y="1143000"/>
+            <a:ext cx="12115800" cy="4893647"/>
+          </a:xfrm>
+          <a:prstGeom prst="rect">
+            <a:avLst/>
+          </a:prstGeom>
+          <a:ln>
+            <a:solidFill>
+              <a:schemeClr val="tx1"/>
+            </a:solidFill>
+            <a:prstDash val="dash"/>
+          </a:ln>
+        </p:spPr>
+        <p:txBody>
+          <a:bodyPr wrap="square">
+            <a:spAutoFit/>
+          </a:bodyPr>
+          <a:lstStyle/>
+          <a:p>
+            <a:r>
+              <a:rPr lang="en-US" sz="2400" b="1" dirty="0" smtClean="0">
+                <a:solidFill>
+                  <a:srgbClr val="7F0055"/>
+                </a:solidFill>
+                <a:latin typeface="Courier New"/>
+              </a:rPr>
+              <a:t>class</a:t>
+            </a:r>
+            <a:r>
+              <a:rPr lang="en-US" sz="2400" b="1" dirty="0" smtClean="0">
+                <a:latin typeface="Courier New"/>
+              </a:rPr>
+              <a:t> </a:t>
+            </a:r>
+            <a:r>
+              <a:rPr lang="en-US" sz="2400" b="1" dirty="0" err="1" smtClean="0">
+                <a:latin typeface="Courier New"/>
+              </a:rPr>
+              <a:t>HelloWorldSnippetSpec</a:t>
+            </a:r>
+            <a:r>
+              <a:rPr lang="en-US" sz="2400" b="1" dirty="0" smtClean="0">
+                <a:latin typeface="Courier New"/>
+              </a:rPr>
+              <a:t> </a:t>
+            </a:r>
+            <a:r>
+              <a:rPr lang="en-US" sz="2400" b="1" dirty="0" smtClean="0">
+                <a:solidFill>
+                  <a:srgbClr val="7F0055"/>
+                </a:solidFill>
+                <a:latin typeface="Courier New"/>
+              </a:rPr>
+              <a:t>extends</a:t>
+            </a:r>
+            <a:r>
+              <a:rPr lang="en-US" sz="2400" b="1" dirty="0" smtClean="0">
+                <a:latin typeface="Courier New"/>
+              </a:rPr>
+              <a:t> </a:t>
+            </a:r>
+            <a:r>
+              <a:rPr lang="en-US" sz="2400" b="1" dirty="0" err="1" smtClean="0">
+                <a:latin typeface="Courier New"/>
+              </a:rPr>
+              <a:t>SpecificationWithJUnit</a:t>
+            </a:r>
+            <a:r>
+              <a:rPr lang="en-US" sz="2400" b="1" dirty="0" smtClean="0">
+                <a:latin typeface="Courier New"/>
+              </a:rPr>
+              <a:t> </a:t>
+            </a:r>
+            <a:r>
+              <a:rPr lang="en-US" sz="2400" b="1" dirty="0" smtClean="0">
+                <a:solidFill>
+                  <a:srgbClr val="7F0055"/>
+                </a:solidFill>
+                <a:latin typeface="Courier New"/>
+              </a:rPr>
+              <a:t>with</a:t>
+            </a:r>
+            <a:r>
+              <a:rPr lang="en-US" sz="2400" b="1" dirty="0" smtClean="0">
+                <a:latin typeface="Courier New"/>
+              </a:rPr>
+              <a:t> </a:t>
+            </a:r>
+            <a:r>
+              <a:rPr lang="en-US" sz="2400" b="1" dirty="0" smtClean="0">
+                <a:latin typeface="Courier New"/>
+              </a:rPr>
+              <a:t>   </a:t>
+            </a:r>
+          </a:p>
+          <a:p>
+            <a:r>
+              <a:rPr lang="en-US" sz="2400" b="1" dirty="0" smtClean="0">
+                <a:latin typeface="Courier New"/>
+              </a:rPr>
+              <a:t> </a:t>
+            </a:r>
+            <a:r>
+              <a:rPr lang="en-US" sz="2400" b="1" dirty="0" smtClean="0">
+                <a:latin typeface="Courier New"/>
+              </a:rPr>
+              <a:t>                                   </a:t>
+            </a:r>
+            <a:r>
+              <a:rPr lang="en-US" sz="2400" b="1" dirty="0" err="1" smtClean="0">
+                <a:latin typeface="Courier New"/>
+              </a:rPr>
+              <a:t>HelloWorldSnippet</a:t>
+            </a:r>
+            <a:r>
+              <a:rPr lang="en-US" sz="2400" b="1" dirty="0" smtClean="0">
+                <a:latin typeface="Courier New"/>
+              </a:rPr>
+              <a:t> {</a:t>
+            </a:r>
+          </a:p>
+          <a:p>
+            <a:endParaRPr lang="en-US" sz="2400" b="1" dirty="0" smtClean="0">
+              <a:latin typeface="Courier New"/>
+            </a:endParaRPr>
+          </a:p>
+          <a:p>
+            <a:r>
+              <a:rPr lang="en-US" sz="2400" dirty="0" smtClean="0">
+                <a:latin typeface="Courier New"/>
+              </a:rPr>
+              <a:t>  </a:t>
+            </a:r>
+            <a:r>
+              <a:rPr lang="en-US" sz="2400" dirty="0" smtClean="0">
+                <a:solidFill>
+                  <a:srgbClr val="2A00FF"/>
+                </a:solidFill>
+                <a:latin typeface="Courier New"/>
+              </a:rPr>
+              <a:t>"the snippet must output a div element"</a:t>
+            </a:r>
+            <a:r>
+              <a:rPr lang="en-US" sz="2400" dirty="0" smtClean="0">
+                <a:latin typeface="Courier New"/>
+              </a:rPr>
+              <a:t> &gt;&gt; {</a:t>
+            </a:r>
+          </a:p>
+          <a:p>
+            <a:r>
+              <a:rPr lang="en-US" sz="2400" dirty="0" smtClean="0">
+                <a:latin typeface="Courier New"/>
+              </a:rPr>
+              <a:t>    hello</a:t>
+            </a:r>
+            <a:r>
+              <a:rPr lang="en-US" sz="2400" dirty="0" smtClean="0">
+                <a:latin typeface="Courier New"/>
+              </a:rPr>
+              <a:t>(</a:t>
+            </a:r>
+            <a:r>
+              <a:rPr lang="en-US" sz="2400" dirty="0" smtClean="0">
+                <a:solidFill>
+                  <a:srgbClr val="2A00FF"/>
+                </a:solidFill>
+                <a:latin typeface="Courier New"/>
+              </a:rPr>
+              <a:t>"Eric"</a:t>
+            </a:r>
+            <a:r>
+              <a:rPr lang="en-US" sz="2400" dirty="0" smtClean="0">
+                <a:latin typeface="Courier New"/>
+              </a:rPr>
+              <a:t>) must \\(&lt;div/&gt;)</a:t>
+            </a:r>
+          </a:p>
+          <a:p>
+            <a:r>
+              <a:rPr lang="en-US" sz="2400" dirty="0" smtClean="0">
+                <a:latin typeface="Courier New"/>
+              </a:rPr>
+              <a:t>  }</a:t>
+            </a:r>
+          </a:p>
+          <a:p>
+            <a:r>
+              <a:rPr lang="en-US" sz="2400" dirty="0" smtClean="0">
+                <a:latin typeface="Courier New"/>
+              </a:rPr>
+              <a:t>  </a:t>
+            </a:r>
+            <a:r>
+              <a:rPr lang="en-US" sz="2400" dirty="0" smtClean="0">
+                <a:solidFill>
+                  <a:srgbClr val="2A00FF"/>
+                </a:solidFill>
+                <a:latin typeface="Courier New"/>
+              </a:rPr>
+              <a:t>"it </a:t>
+            </a:r>
+            <a:r>
+              <a:rPr lang="en-US" sz="2400" dirty="0" smtClean="0">
+                <a:solidFill>
+                  <a:srgbClr val="2A00FF"/>
+                </a:solidFill>
+                <a:latin typeface="Courier New"/>
+              </a:rPr>
+              <a:t>must have a 'class' attribute with a 'text' value"</a:t>
+            </a:r>
+            <a:r>
+              <a:rPr lang="en-US" sz="2400" dirty="0" smtClean="0">
+                <a:latin typeface="Courier New"/>
+              </a:rPr>
+              <a:t> &gt;&gt; {</a:t>
+            </a:r>
+          </a:p>
+          <a:p>
+            <a:r>
+              <a:rPr lang="en-US" sz="2400" dirty="0" smtClean="0">
+                <a:latin typeface="Courier New"/>
+              </a:rPr>
+              <a:t>    hello</a:t>
+            </a:r>
+            <a:r>
+              <a:rPr lang="en-US" sz="2400" dirty="0" smtClean="0">
+                <a:latin typeface="Courier New"/>
+              </a:rPr>
+              <a:t>(</a:t>
+            </a:r>
+            <a:r>
+              <a:rPr lang="en-US" sz="2400" dirty="0" smtClean="0">
+                <a:solidFill>
+                  <a:srgbClr val="2A00FF"/>
+                </a:solidFill>
+                <a:latin typeface="Courier New"/>
+              </a:rPr>
+              <a:t>"Eric"</a:t>
+            </a:r>
+            <a:r>
+              <a:rPr lang="en-US" sz="2400" dirty="0" smtClean="0">
+                <a:latin typeface="Courier New"/>
+              </a:rPr>
+              <a:t>) must \\(&lt;div/&gt;, </a:t>
+            </a:r>
+            <a:r>
+              <a:rPr lang="en-US" sz="2400" dirty="0" smtClean="0">
+                <a:solidFill>
+                  <a:srgbClr val="2A00FF"/>
+                </a:solidFill>
+                <a:latin typeface="Courier New"/>
+              </a:rPr>
+              <a:t>"class"</a:t>
+            </a:r>
+            <a:r>
+              <a:rPr lang="en-US" sz="2400" dirty="0" smtClean="0">
+                <a:latin typeface="Courier New"/>
+              </a:rPr>
+              <a:t> -&gt; </a:t>
+            </a:r>
+            <a:r>
+              <a:rPr lang="en-US" sz="2400" dirty="0" smtClean="0">
+                <a:solidFill>
+                  <a:srgbClr val="2A00FF"/>
+                </a:solidFill>
+                <a:latin typeface="Courier New"/>
+              </a:rPr>
+              <a:t>"text"</a:t>
+            </a:r>
+            <a:r>
+              <a:rPr lang="en-US" sz="2400" dirty="0" smtClean="0">
+                <a:latin typeface="Courier New"/>
+              </a:rPr>
+              <a:t>)</a:t>
+            </a:r>
+          </a:p>
+          <a:p>
+            <a:r>
+              <a:rPr lang="en-US" sz="2400" dirty="0" smtClean="0">
+                <a:latin typeface="Courier New"/>
+              </a:rPr>
+              <a:t>  }</a:t>
+            </a:r>
+          </a:p>
+          <a:p>
+            <a:r>
+              <a:rPr lang="en-US" sz="2400" dirty="0" smtClean="0">
+                <a:latin typeface="Courier New"/>
+              </a:rPr>
+              <a:t>  </a:t>
+            </a:r>
+            <a:r>
+              <a:rPr lang="en-US" sz="2400" dirty="0" smtClean="0">
+                <a:solidFill>
+                  <a:srgbClr val="2A00FF"/>
+                </a:solidFill>
+                <a:latin typeface="Courier New"/>
+              </a:rPr>
+              <a:t>"the snippet must output the user name"</a:t>
+            </a:r>
+            <a:r>
+              <a:rPr lang="en-US" sz="2400" dirty="0" smtClean="0">
+                <a:latin typeface="Courier New"/>
+              </a:rPr>
+              <a:t> &gt;&gt; {</a:t>
+            </a:r>
+          </a:p>
+          <a:p>
+            <a:r>
+              <a:rPr lang="en-US" sz="2400" dirty="0" smtClean="0">
+                <a:latin typeface="Courier New"/>
+              </a:rPr>
+              <a:t>    hello</a:t>
+            </a:r>
+            <a:r>
+              <a:rPr lang="en-US" sz="2400" dirty="0" smtClean="0">
+                <a:latin typeface="Courier New"/>
+              </a:rPr>
+              <a:t>(</a:t>
+            </a:r>
+            <a:r>
+              <a:rPr lang="en-US" sz="2400" dirty="0" smtClean="0">
+                <a:solidFill>
+                  <a:srgbClr val="2A00FF"/>
+                </a:solidFill>
+                <a:latin typeface="Courier New"/>
+              </a:rPr>
+              <a:t>"Eric"</a:t>
+            </a:r>
+            <a:r>
+              <a:rPr lang="en-US" sz="2400" dirty="0" smtClean="0">
+                <a:latin typeface="Courier New"/>
+              </a:rPr>
+              <a:t>).</a:t>
+            </a:r>
+            <a:r>
+              <a:rPr lang="en-US" sz="2400" dirty="0" err="1" smtClean="0">
+                <a:latin typeface="Courier New"/>
+              </a:rPr>
+              <a:t>flatMap</a:t>
+            </a:r>
+            <a:r>
+              <a:rPr lang="en-US" sz="2400" dirty="0" smtClean="0">
+                <a:latin typeface="Courier New"/>
+              </a:rPr>
+              <a:t>(_.child) </a:t>
+            </a:r>
+            <a:r>
+              <a:rPr lang="en-US" sz="2400" dirty="0" smtClean="0">
+                <a:latin typeface="Courier New"/>
+              </a:rPr>
+              <a:t>must contain(</a:t>
+            </a:r>
+            <a:r>
+              <a:rPr lang="en-US" sz="2400" b="1" dirty="0" smtClean="0">
+                <a:solidFill>
+                  <a:srgbClr val="7F0055"/>
+                </a:solidFill>
+                <a:latin typeface="Courier New"/>
+              </a:rPr>
+              <a:t>new</a:t>
+            </a:r>
+            <a:r>
+              <a:rPr lang="en-US" sz="2400" b="1" dirty="0" smtClean="0">
+                <a:latin typeface="Courier New"/>
+              </a:rPr>
+              <a:t> </a:t>
+            </a:r>
+            <a:r>
+              <a:rPr lang="en-US" sz="2400" b="1" dirty="0" smtClean="0">
+                <a:latin typeface="Courier New"/>
+              </a:rPr>
+              <a:t>Atom(</a:t>
+            </a:r>
+            <a:r>
+              <a:rPr lang="en-US" sz="2400" b="1" dirty="0" smtClean="0">
+                <a:solidFill>
+                  <a:srgbClr val="2A00FF"/>
+                </a:solidFill>
+                <a:latin typeface="Courier New"/>
+              </a:rPr>
+              <a:t>"Eric"</a:t>
+            </a:r>
+            <a:r>
+              <a:rPr lang="en-US" sz="2400" b="1" dirty="0" smtClean="0">
+                <a:latin typeface="Courier New"/>
+              </a:rPr>
+              <a:t>))</a:t>
+            </a:r>
+          </a:p>
+          <a:p>
+            <a:r>
+              <a:rPr lang="en-US" sz="2400" dirty="0" smtClean="0">
+                <a:latin typeface="Courier New"/>
+              </a:rPr>
+              <a:t>  }</a:t>
+            </a:r>
+          </a:p>
+          <a:p>
+            <a:r>
+              <a:rPr lang="en-US" sz="2400" dirty="0" smtClean="0">
+                <a:latin typeface="Courier New"/>
+              </a:rPr>
+              <a:t>}</a:t>
+            </a:r>
+            <a:endParaRPr lang="en-US" sz="2400" dirty="0"/>
           </a:p>
         </p:txBody>
       </p:sp>

</xml_diff>

<commit_message>
added a scalacheck spec
</commit_message>
<xml_diff>
--- a/src/main/resources/oscon_2010_specs.pptx
+++ b/src/main/resources/oscon_2010_specs.pptx
@@ -6,7 +6,7 @@
     <p:sldMasterId id="2147483651" r:id="rId2"/>
   </p:sldMasterIdLst>
   <p:notesMasterIdLst>
-    <p:notesMasterId r:id="rId14"/>
+    <p:notesMasterId r:id="rId16"/>
   </p:notesMasterIdLst>
   <p:sldIdLst>
     <p:sldId id="258" r:id="rId3"/>
@@ -20,6 +20,8 @@
     <p:sldId id="266" r:id="rId11"/>
     <p:sldId id="267" r:id="rId12"/>
     <p:sldId id="268" r:id="rId13"/>
+    <p:sldId id="269" r:id="rId14"/>
+    <p:sldId id="270" r:id="rId15"/>
   </p:sldIdLst>
   <p:sldSz cx="13004800" cy="9753600"/>
   <p:notesSz cx="6858000" cy="9144000"/>
@@ -797,6 +799,174 @@
               <a:rPr lang="en-US"/>
               <a:pPr/>
               <a:t>11</a:t>
+            </a:fld>
+            <a:endParaRPr lang="en-US"/>
+          </a:p>
+        </p:txBody>
+      </p:sp>
+      <p:sp>
+        <p:nvSpPr>
+          <p:cNvPr id="19458" name="Rectangle 2"/>
+          <p:cNvSpPr>
+            <a:spLocks noGrp="1" noRot="1" noChangeAspect="1" noChangeArrowheads="1" noTextEdit="1"/>
+          </p:cNvSpPr>
+          <p:nvPr>
+            <p:ph type="sldImg"/>
+          </p:nvPr>
+        </p:nvSpPr>
+        <p:spPr>
+          <a:ln/>
+        </p:spPr>
+      </p:sp>
+      <p:sp>
+        <p:nvSpPr>
+          <p:cNvPr id="19459" name="Rectangle 3"/>
+          <p:cNvSpPr>
+            <a:spLocks noGrp="1"/>
+          </p:cNvSpPr>
+          <p:nvPr>
+            <p:ph type="body" idx="1"/>
+          </p:nvPr>
+        </p:nvSpPr>
+        <p:spPr/>
+        <p:txBody>
+          <a:bodyPr/>
+          <a:lstStyle/>
+          <a:p>
+            <a:endParaRPr lang="en-US"/>
+          </a:p>
+        </p:txBody>
+      </p:sp>
+    </p:spTree>
+  </p:cSld>
+  <p:clrMapOvr>
+    <a:masterClrMapping/>
+  </p:clrMapOvr>
+</p:notes>
+</file>
+
+<file path=ppt/notesSlides/notesSlide12.xml><?xml version="1.0" encoding="utf-8"?>
+<p:notes xmlns:a="http://schemas.openxmlformats.org/drawingml/2006/main" xmlns:r="http://schemas.openxmlformats.org/officeDocument/2006/relationships" xmlns:p="http://schemas.openxmlformats.org/presentationml/2006/main">
+  <p:cSld>
+    <p:spTree>
+      <p:nvGrpSpPr>
+        <p:cNvPr id="1" name=""/>
+        <p:cNvGrpSpPr/>
+        <p:nvPr/>
+      </p:nvGrpSpPr>
+      <p:grpSpPr>
+        <a:xfrm>
+          <a:off x="0" y="0"/>
+          <a:ext cx="0" cy="0"/>
+          <a:chOff x="0" y="0"/>
+          <a:chExt cx="0" cy="0"/>
+        </a:xfrm>
+      </p:grpSpPr>
+      <p:sp>
+        <p:nvSpPr>
+          <p:cNvPr id="7" name="Rectangle 7"/>
+          <p:cNvSpPr>
+            <a:spLocks noGrp="1"/>
+          </p:cNvSpPr>
+          <p:nvPr>
+            <p:ph type="sldNum" sz="quarter" idx="5"/>
+          </p:nvPr>
+        </p:nvSpPr>
+        <p:spPr>
+          <a:ln/>
+        </p:spPr>
+        <p:txBody>
+          <a:bodyPr/>
+          <a:lstStyle/>
+          <a:p>
+            <a:fld id="{27AEA7DA-096A-4FB7-B4B3-D12717EF4BDD}" type="slidenum">
+              <a:rPr lang="en-US"/>
+              <a:pPr/>
+              <a:t>12</a:t>
+            </a:fld>
+            <a:endParaRPr lang="en-US"/>
+          </a:p>
+        </p:txBody>
+      </p:sp>
+      <p:sp>
+        <p:nvSpPr>
+          <p:cNvPr id="19458" name="Rectangle 2"/>
+          <p:cNvSpPr>
+            <a:spLocks noGrp="1" noRot="1" noChangeAspect="1" noChangeArrowheads="1" noTextEdit="1"/>
+          </p:cNvSpPr>
+          <p:nvPr>
+            <p:ph type="sldImg"/>
+          </p:nvPr>
+        </p:nvSpPr>
+        <p:spPr>
+          <a:ln/>
+        </p:spPr>
+      </p:sp>
+      <p:sp>
+        <p:nvSpPr>
+          <p:cNvPr id="19459" name="Rectangle 3"/>
+          <p:cNvSpPr>
+            <a:spLocks noGrp="1"/>
+          </p:cNvSpPr>
+          <p:nvPr>
+            <p:ph type="body" idx="1"/>
+          </p:nvPr>
+        </p:nvSpPr>
+        <p:spPr/>
+        <p:txBody>
+          <a:bodyPr/>
+          <a:lstStyle/>
+          <a:p>
+            <a:endParaRPr lang="en-US"/>
+          </a:p>
+        </p:txBody>
+      </p:sp>
+    </p:spTree>
+  </p:cSld>
+  <p:clrMapOvr>
+    <a:masterClrMapping/>
+  </p:clrMapOvr>
+</p:notes>
+</file>
+
+<file path=ppt/notesSlides/notesSlide13.xml><?xml version="1.0" encoding="utf-8"?>
+<p:notes xmlns:a="http://schemas.openxmlformats.org/drawingml/2006/main" xmlns:r="http://schemas.openxmlformats.org/officeDocument/2006/relationships" xmlns:p="http://schemas.openxmlformats.org/presentationml/2006/main">
+  <p:cSld>
+    <p:spTree>
+      <p:nvGrpSpPr>
+        <p:cNvPr id="1" name=""/>
+        <p:cNvGrpSpPr/>
+        <p:nvPr/>
+      </p:nvGrpSpPr>
+      <p:grpSpPr>
+        <a:xfrm>
+          <a:off x="0" y="0"/>
+          <a:ext cx="0" cy="0"/>
+          <a:chOff x="0" y="0"/>
+          <a:chExt cx="0" cy="0"/>
+        </a:xfrm>
+      </p:grpSpPr>
+      <p:sp>
+        <p:nvSpPr>
+          <p:cNvPr id="7" name="Rectangle 7"/>
+          <p:cNvSpPr>
+            <a:spLocks noGrp="1"/>
+          </p:cNvSpPr>
+          <p:nvPr>
+            <p:ph type="sldNum" sz="quarter" idx="5"/>
+          </p:nvPr>
+        </p:nvSpPr>
+        <p:spPr>
+          <a:ln/>
+        </p:spPr>
+        <p:txBody>
+          <a:bodyPr/>
+          <a:lstStyle/>
+          <a:p>
+            <a:fld id="{27AEA7DA-096A-4FB7-B4B3-D12717EF4BDD}" type="slidenum">
+              <a:rPr lang="en-US"/>
+              <a:pPr/>
+              <a:t>13</a:t>
             </a:fld>
             <a:endParaRPr lang="en-US"/>
           </a:p>
@@ -6263,7 +6433,7 @@
         <p:spPr>
           <a:xfrm>
             <a:off x="558800" y="1143000"/>
-            <a:ext cx="12115800" cy="4893647"/>
+            <a:ext cx="12115800" cy="6370975"/>
           </a:xfrm>
           <a:prstGeom prst="rect">
             <a:avLst/>
@@ -6288,7 +6458,7 @@
                 </a:solidFill>
                 <a:latin typeface="Courier New"/>
               </a:rPr>
-              <a:t>class</a:t>
+              <a:t>trait</a:t>
             </a:r>
             <a:r>
               <a:rPr lang="en-US" sz="2400" b="1" dirty="0" smtClean="0">
@@ -6300,13 +6470,21 @@
               <a:rPr lang="en-US" sz="2400" b="1" dirty="0" err="1" smtClean="0">
                 <a:latin typeface="Courier New"/>
               </a:rPr>
-              <a:t>HelloWorldSnippetSpec</a:t>
+              <a:t>HelloWorldSnippet</a:t>
             </a:r>
             <a:r>
               <a:rPr lang="en-US" sz="2400" b="1" dirty="0" smtClean="0">
                 <a:latin typeface="Courier New"/>
               </a:rPr>
-              <a:t> </a:t>
+              <a:t> {</a:t>
+            </a:r>
+          </a:p>
+          <a:p>
+            <a:r>
+              <a:rPr lang="en-US" sz="2400" dirty="0" smtClean="0">
+                <a:latin typeface="Courier New"/>
+              </a:rPr>
+              <a:t>  </a:t>
             </a:r>
             <a:r>
               <a:rPr lang="en-US" sz="2400" b="1" dirty="0" smtClean="0">
@@ -6315,25 +6493,13 @@
                 </a:solidFill>
                 <a:latin typeface="Courier New"/>
               </a:rPr>
-              <a:t>extends</a:t>
+              <a:t>def</a:t>
             </a:r>
             <a:r>
               <a:rPr lang="en-US" sz="2400" b="1" dirty="0" smtClean="0">
                 <a:latin typeface="Courier New"/>
               </a:rPr>
-              <a:t> </a:t>
-            </a:r>
-            <a:r>
-              <a:rPr lang="en-US" sz="2400" b="1" dirty="0" err="1" smtClean="0">
-                <a:latin typeface="Courier New"/>
-              </a:rPr>
-              <a:t>SpecificationWithJUnit</a:t>
-            </a:r>
-            <a:r>
-              <a:rPr lang="en-US" sz="2400" b="1" dirty="0" smtClean="0">
-                <a:latin typeface="Courier New"/>
-              </a:rPr>
-              <a:t> </a:t>
+              <a:t> hello(s: String): Elem = &lt;div </a:t>
             </a:r>
             <a:r>
               <a:rPr lang="en-US" sz="2400" b="1" dirty="0" smtClean="0">
@@ -6342,280 +6508,53 @@
                 </a:solidFill>
                 <a:latin typeface="Courier New"/>
               </a:rPr>
-              <a:t>with</a:t>
+              <a:t>class</a:t>
             </a:r>
             <a:r>
               <a:rPr lang="en-US" sz="2400" b="1" dirty="0" smtClean="0">
                 <a:latin typeface="Courier New"/>
               </a:rPr>
-              <a:t> </a:t>
+              <a:t>=</a:t>
             </a:r>
             <a:r>
               <a:rPr lang="en-US" sz="2400" b="1" dirty="0" smtClean="0">
-                <a:latin typeface="Courier New"/>
-              </a:rPr>
-              <a:t>   </a:t>
-            </a:r>
-          </a:p>
-          <a:p>
-            <a:r>
-              <a:rPr lang="en-US" sz="2400" b="1" dirty="0" smtClean="0">
-                <a:latin typeface="Courier New"/>
-              </a:rPr>
-              <a:t> </a:t>
-            </a:r>
-            <a:r>
-              <a:rPr lang="en-US" sz="2400" b="1" dirty="0" smtClean="0">
-                <a:latin typeface="Courier New"/>
-              </a:rPr>
-              <a:t>                                   </a:t>
-            </a:r>
-            <a:r>
-              <a:rPr lang="en-US" sz="2400" b="1" dirty="0" err="1" smtClean="0">
-                <a:latin typeface="Courier New"/>
-              </a:rPr>
-              <a:t>HelloWorldSnippet</a:t>
-            </a:r>
-            <a:r>
-              <a:rPr lang="en-US" sz="2400" b="1" dirty="0" smtClean="0">
-                <a:latin typeface="Courier New"/>
-              </a:rPr>
-              <a:t> {</a:t>
-            </a:r>
-          </a:p>
-          <a:p>
-            <a:endParaRPr lang="en-US" sz="2400" b="1" dirty="0" smtClean="0">
-              <a:latin typeface="Courier New"/>
-            </a:endParaRPr>
-          </a:p>
-          <a:p>
-            <a:r>
-              <a:rPr lang="en-US" sz="2400" dirty="0" smtClean="0">
-                <a:latin typeface="Courier New"/>
-              </a:rPr>
-              <a:t>  </a:t>
-            </a:r>
-            <a:r>
-              <a:rPr lang="en-US" sz="2400" dirty="0" smtClean="0">
                 <a:solidFill>
                   <a:srgbClr val="2A00FF"/>
                 </a:solidFill>
                 <a:latin typeface="Courier New"/>
               </a:rPr>
-              <a:t>"the snippet must output a div element"</a:t>
-            </a:r>
-            <a:r>
-              <a:rPr lang="en-US" sz="2400" dirty="0" smtClean="0">
-                <a:latin typeface="Courier New"/>
-              </a:rPr>
-              <a:t> &gt;&gt; {</a:t>
-            </a:r>
-          </a:p>
-          <a:p>
-            <a:r>
-              <a:rPr lang="en-US" sz="2400" dirty="0" smtClean="0">
-                <a:latin typeface="Courier New"/>
-              </a:rPr>
-              <a:t>    hello</a:t>
-            </a:r>
-            <a:r>
-              <a:rPr lang="en-US" sz="2400" dirty="0" smtClean="0">
-                <a:latin typeface="Courier New"/>
-              </a:rPr>
-              <a:t>(</a:t>
-            </a:r>
-            <a:r>
-              <a:rPr lang="en-US" sz="2400" dirty="0" smtClean="0">
-                <a:solidFill>
-                  <a:srgbClr val="2A00FF"/>
-                </a:solidFill>
-                <a:latin typeface="Courier New"/>
-              </a:rPr>
-              <a:t>"Eric"</a:t>
-            </a:r>
-            <a:r>
-              <a:rPr lang="en-US" sz="2400" dirty="0" smtClean="0">
-                <a:latin typeface="Courier New"/>
-              </a:rPr>
-              <a:t>) must \\(&lt;div/&gt;)</a:t>
-            </a:r>
-          </a:p>
-          <a:p>
-            <a:r>
-              <a:rPr lang="en-US" sz="2400" dirty="0" smtClean="0">
-                <a:latin typeface="Courier New"/>
-              </a:rPr>
-              <a:t>  }</a:t>
-            </a:r>
-          </a:p>
-          <a:p>
-            <a:r>
-              <a:rPr lang="en-US" sz="2400" dirty="0" smtClean="0">
-                <a:latin typeface="Courier New"/>
-              </a:rPr>
-              <a:t>  </a:t>
-            </a:r>
-            <a:r>
-              <a:rPr lang="en-US" sz="2400" dirty="0" smtClean="0">
-                <a:solidFill>
-                  <a:srgbClr val="2A00FF"/>
-                </a:solidFill>
-                <a:latin typeface="Courier New"/>
-              </a:rPr>
-              <a:t>"it </a:t>
-            </a:r>
-            <a:r>
-              <a:rPr lang="en-US" sz="2400" dirty="0" smtClean="0">
-                <a:solidFill>
-                  <a:srgbClr val="2A00FF"/>
-                </a:solidFill>
-                <a:latin typeface="Courier New"/>
-              </a:rPr>
-              <a:t>must have a 'class' attribute with a 'text' value"</a:t>
-            </a:r>
-            <a:r>
-              <a:rPr lang="en-US" sz="2400" dirty="0" smtClean="0">
-                <a:latin typeface="Courier New"/>
-              </a:rPr>
-              <a:t> &gt;&gt; {</a:t>
-            </a:r>
-          </a:p>
-          <a:p>
-            <a:r>
-              <a:rPr lang="en-US" sz="2400" dirty="0" smtClean="0">
-                <a:latin typeface="Courier New"/>
-              </a:rPr>
-              <a:t>    hello</a:t>
-            </a:r>
-            <a:r>
-              <a:rPr lang="en-US" sz="2400" dirty="0" smtClean="0">
-                <a:latin typeface="Courier New"/>
-              </a:rPr>
-              <a:t>(</a:t>
-            </a:r>
-            <a:r>
-              <a:rPr lang="en-US" sz="2400" dirty="0" smtClean="0">
-                <a:solidFill>
-                  <a:srgbClr val="2A00FF"/>
-                </a:solidFill>
-                <a:latin typeface="Courier New"/>
-              </a:rPr>
-              <a:t>"Eric"</a:t>
-            </a:r>
-            <a:r>
-              <a:rPr lang="en-US" sz="2400" dirty="0" smtClean="0">
-                <a:latin typeface="Courier New"/>
-              </a:rPr>
-              <a:t>) must \\(&lt;div/&gt;, </a:t>
-            </a:r>
-            <a:r>
-              <a:rPr lang="en-US" sz="2400" dirty="0" smtClean="0">
-                <a:solidFill>
-                  <a:srgbClr val="2A00FF"/>
-                </a:solidFill>
-                <a:latin typeface="Courier New"/>
-              </a:rPr>
-              <a:t>"class"</a:t>
-            </a:r>
-            <a:r>
-              <a:rPr lang="en-US" sz="2400" dirty="0" smtClean="0">
-                <a:latin typeface="Courier New"/>
-              </a:rPr>
-              <a:t> -&gt; </a:t>
-            </a:r>
-            <a:r>
-              <a:rPr lang="en-US" sz="2400" dirty="0" smtClean="0">
-                <a:solidFill>
-                  <a:srgbClr val="2A00FF"/>
-                </a:solidFill>
-                <a:latin typeface="Courier New"/>
-              </a:rPr>
               <a:t>"text"</a:t>
             </a:r>
             <a:r>
-              <a:rPr lang="en-US" sz="2400" dirty="0" smtClean="0">
-                <a:latin typeface="Courier New"/>
-              </a:rPr>
-              <a:t>)</a:t>
-            </a:r>
-          </a:p>
-          <a:p>
-            <a:r>
-              <a:rPr lang="en-US" sz="2400" dirty="0" smtClean="0">
-                <a:latin typeface="Courier New"/>
-              </a:rPr>
-              <a:t>  }</a:t>
-            </a:r>
-          </a:p>
-          <a:p>
-            <a:r>
-              <a:rPr lang="en-US" sz="2400" dirty="0" smtClean="0">
-                <a:latin typeface="Courier New"/>
-              </a:rPr>
-              <a:t>  </a:t>
-            </a:r>
-            <a:r>
-              <a:rPr lang="en-US" sz="2400" dirty="0" smtClean="0">
-                <a:solidFill>
-                  <a:srgbClr val="2A00FF"/>
-                </a:solidFill>
-                <a:latin typeface="Courier New"/>
-              </a:rPr>
-              <a:t>"the snippet must output the user name"</a:t>
-            </a:r>
-            <a:r>
-              <a:rPr lang="en-US" sz="2400" dirty="0" smtClean="0">
-                <a:latin typeface="Courier New"/>
-              </a:rPr>
-              <a:t> &gt;&gt; {</a:t>
-            </a:r>
-          </a:p>
-          <a:p>
-            <a:r>
-              <a:rPr lang="en-US" sz="2400" dirty="0" smtClean="0">
-                <a:latin typeface="Courier New"/>
-              </a:rPr>
-              <a:t>    hello</a:t>
-            </a:r>
-            <a:r>
-              <a:rPr lang="en-US" sz="2400" dirty="0" smtClean="0">
-                <a:latin typeface="Courier New"/>
-              </a:rPr>
-              <a:t>(</a:t>
-            </a:r>
-            <a:r>
-              <a:rPr lang="en-US" sz="2400" dirty="0" smtClean="0">
-                <a:solidFill>
-                  <a:srgbClr val="2A00FF"/>
-                </a:solidFill>
-                <a:latin typeface="Courier New"/>
-              </a:rPr>
-              <a:t>"Eric"</a:t>
-            </a:r>
-            <a:r>
-              <a:rPr lang="en-US" sz="2400" dirty="0" smtClean="0">
-                <a:latin typeface="Courier New"/>
-              </a:rPr>
-              <a:t>).</a:t>
-            </a:r>
-            <a:r>
-              <a:rPr lang="en-US" sz="2400" dirty="0" err="1" smtClean="0">
-                <a:latin typeface="Courier New"/>
-              </a:rPr>
-              <a:t>flatMap</a:t>
-            </a:r>
-            <a:r>
-              <a:rPr lang="en-US" sz="2400" dirty="0" smtClean="0">
-                <a:latin typeface="Courier New"/>
-              </a:rPr>
-              <a:t>(_.child) </a:t>
-            </a:r>
-            <a:r>
-              <a:rPr lang="en-US" sz="2400" dirty="0" smtClean="0">
-                <a:latin typeface="Courier New"/>
-              </a:rPr>
-              <a:t>must contain(</a:t>
-            </a:r>
+              <a:rPr lang="en-US" sz="2400" b="1" dirty="0" smtClean="0">
+                <a:latin typeface="Courier New"/>
+              </a:rPr>
+              <a:t>&gt;Hello {s}&lt;/div&gt;</a:t>
+            </a:r>
+          </a:p>
+          <a:p>
+            <a:r>
+              <a:rPr lang="en-US" sz="2400" dirty="0" smtClean="0">
+                <a:latin typeface="Courier New"/>
+              </a:rPr>
+              <a:t>}</a:t>
+            </a:r>
+            <a:endParaRPr lang="en-US" sz="2400" b="1" dirty="0" smtClean="0">
+              <a:solidFill>
+                <a:srgbClr val="7F0055"/>
+              </a:solidFill>
+              <a:latin typeface="Courier New"/>
+            </a:endParaRPr>
+          </a:p>
+          <a:p>
+            <a:endParaRPr lang="en-US" sz="2400" b="1" dirty="0" smtClean="0">
+              <a:solidFill>
+                <a:srgbClr val="7F0055"/>
+              </a:solidFill>
+              <a:latin typeface="Courier New"/>
+            </a:endParaRPr>
+          </a:p>
+          <a:p>
             <a:r>
               <a:rPr lang="en-US" sz="2400" b="1" dirty="0" smtClean="0">
                 <a:solidFill>
@@ -6623,19 +6562,303 @@
                 </a:solidFill>
                 <a:latin typeface="Courier New"/>
               </a:rPr>
+              <a:t>class</a:t>
+            </a:r>
+            <a:r>
+              <a:rPr lang="en-US" sz="2400" b="1" dirty="0" smtClean="0">
+                <a:latin typeface="Courier New"/>
+              </a:rPr>
+              <a:t> </a:t>
+            </a:r>
+            <a:r>
+              <a:rPr lang="en-US" sz="2400" b="1" dirty="0" err="1" smtClean="0">
+                <a:latin typeface="Courier New"/>
+              </a:rPr>
+              <a:t>HelloWorldSnippetSpec</a:t>
+            </a:r>
+            <a:r>
+              <a:rPr lang="en-US" sz="2400" b="1" dirty="0" smtClean="0">
+                <a:latin typeface="Courier New"/>
+              </a:rPr>
+              <a:t> </a:t>
+            </a:r>
+            <a:r>
+              <a:rPr lang="en-US" sz="2400" b="1" dirty="0" smtClean="0">
+                <a:solidFill>
+                  <a:srgbClr val="7F0055"/>
+                </a:solidFill>
+                <a:latin typeface="Courier New"/>
+              </a:rPr>
+              <a:t>extends</a:t>
+            </a:r>
+            <a:r>
+              <a:rPr lang="en-US" sz="2400" b="1" dirty="0" smtClean="0">
+                <a:latin typeface="Courier New"/>
+              </a:rPr>
+              <a:t> </a:t>
+            </a:r>
+            <a:r>
+              <a:rPr lang="en-US" sz="2400" b="1" dirty="0" err="1" smtClean="0">
+                <a:latin typeface="Courier New"/>
+              </a:rPr>
+              <a:t>SpecificationWithJUnit</a:t>
+            </a:r>
+            <a:r>
+              <a:rPr lang="en-US" sz="2400" b="1" dirty="0" smtClean="0">
+                <a:latin typeface="Courier New"/>
+              </a:rPr>
+              <a:t> </a:t>
+            </a:r>
+            <a:r>
+              <a:rPr lang="en-US" sz="2400" b="1" dirty="0" smtClean="0">
+                <a:solidFill>
+                  <a:srgbClr val="7F0055"/>
+                </a:solidFill>
+                <a:latin typeface="Courier New"/>
+              </a:rPr>
+              <a:t>with</a:t>
+            </a:r>
+            <a:r>
+              <a:rPr lang="en-US" sz="2400" b="1" dirty="0" smtClean="0">
+                <a:latin typeface="Courier New"/>
+              </a:rPr>
+              <a:t>    </a:t>
+            </a:r>
+          </a:p>
+          <a:p>
+            <a:r>
+              <a:rPr lang="en-US" sz="2400" b="1" dirty="0" smtClean="0">
+                <a:latin typeface="Courier New"/>
+              </a:rPr>
+              <a:t>                                    </a:t>
+            </a:r>
+            <a:r>
+              <a:rPr lang="en-US" sz="2400" b="1" dirty="0" err="1" smtClean="0">
+                <a:latin typeface="Courier New"/>
+              </a:rPr>
+              <a:t>HelloWorldSnippet</a:t>
+            </a:r>
+            <a:r>
+              <a:rPr lang="en-US" sz="2400" b="1" dirty="0" smtClean="0">
+                <a:latin typeface="Courier New"/>
+              </a:rPr>
+              <a:t> {</a:t>
+            </a:r>
+          </a:p>
+          <a:p>
+            <a:endParaRPr lang="en-US" sz="2400" b="1" dirty="0" smtClean="0">
+              <a:latin typeface="Courier New"/>
+            </a:endParaRPr>
+          </a:p>
+          <a:p>
+            <a:r>
+              <a:rPr lang="en-US" sz="2400" dirty="0" smtClean="0">
+                <a:latin typeface="Courier New"/>
+              </a:rPr>
+              <a:t>  </a:t>
+            </a:r>
+            <a:r>
+              <a:rPr lang="en-US" sz="2400" dirty="0" smtClean="0">
+                <a:solidFill>
+                  <a:srgbClr val="2A00FF"/>
+                </a:solidFill>
+                <a:latin typeface="Courier New"/>
+              </a:rPr>
+              <a:t>"the snippet must output a div element"</a:t>
+            </a:r>
+            <a:r>
+              <a:rPr lang="en-US" sz="2400" dirty="0" smtClean="0">
+                <a:latin typeface="Courier New"/>
+              </a:rPr>
+              <a:t> &gt;&gt; {</a:t>
+            </a:r>
+          </a:p>
+          <a:p>
+            <a:r>
+              <a:rPr lang="en-US" sz="2400" dirty="0" smtClean="0">
+                <a:latin typeface="Courier New"/>
+              </a:rPr>
+              <a:t>    hello(</a:t>
+            </a:r>
+            <a:r>
+              <a:rPr lang="en-US" sz="2400" dirty="0" smtClean="0">
+                <a:solidFill>
+                  <a:srgbClr val="2A00FF"/>
+                </a:solidFill>
+                <a:latin typeface="Courier New"/>
+              </a:rPr>
+              <a:t>"Eric"</a:t>
+            </a:r>
+            <a:r>
+              <a:rPr lang="en-US" sz="2400" dirty="0" smtClean="0">
+                <a:latin typeface="Courier New"/>
+              </a:rPr>
+              <a:t>) must \\(&lt;div/&gt;)</a:t>
+            </a:r>
+          </a:p>
+          <a:p>
+            <a:r>
+              <a:rPr lang="en-US" sz="2400" dirty="0" smtClean="0">
+                <a:latin typeface="Courier New"/>
+              </a:rPr>
+              <a:t>  }</a:t>
+            </a:r>
+          </a:p>
+          <a:p>
+            <a:r>
+              <a:rPr lang="en-US" sz="2400" dirty="0" smtClean="0">
+                <a:latin typeface="Courier New"/>
+              </a:rPr>
+              <a:t>  </a:t>
+            </a:r>
+            <a:r>
+              <a:rPr lang="en-US" sz="2400" dirty="0" smtClean="0">
+                <a:solidFill>
+                  <a:srgbClr val="2A00FF"/>
+                </a:solidFill>
+                <a:latin typeface="Courier New"/>
+              </a:rPr>
+              <a:t>"it must have a 'class' attribute with a 'text' value"</a:t>
+            </a:r>
+            <a:r>
+              <a:rPr lang="en-US" sz="2400" dirty="0" smtClean="0">
+                <a:latin typeface="Courier New"/>
+              </a:rPr>
+              <a:t> &gt;&gt; {</a:t>
+            </a:r>
+          </a:p>
+          <a:p>
+            <a:r>
+              <a:rPr lang="en-US" sz="2400" dirty="0" smtClean="0">
+                <a:latin typeface="Courier New"/>
+              </a:rPr>
+              <a:t>    hello(</a:t>
+            </a:r>
+            <a:r>
+              <a:rPr lang="en-US" sz="2400" dirty="0" smtClean="0">
+                <a:solidFill>
+                  <a:srgbClr val="2A00FF"/>
+                </a:solidFill>
+                <a:latin typeface="Courier New"/>
+              </a:rPr>
+              <a:t>"Eric"</a:t>
+            </a:r>
+            <a:r>
+              <a:rPr lang="en-US" sz="2400" dirty="0" smtClean="0">
+                <a:latin typeface="Courier New"/>
+              </a:rPr>
+              <a:t>) must \\(&lt;div/&gt;, </a:t>
+            </a:r>
+            <a:r>
+              <a:rPr lang="en-US" sz="2400" dirty="0" smtClean="0">
+                <a:solidFill>
+                  <a:srgbClr val="2A00FF"/>
+                </a:solidFill>
+                <a:latin typeface="Courier New"/>
+              </a:rPr>
+              <a:t>"class"</a:t>
+            </a:r>
+            <a:r>
+              <a:rPr lang="en-US" sz="2400" dirty="0" smtClean="0">
+                <a:latin typeface="Courier New"/>
+              </a:rPr>
+              <a:t> -&gt; </a:t>
+            </a:r>
+            <a:r>
+              <a:rPr lang="en-US" sz="2400" dirty="0" smtClean="0">
+                <a:solidFill>
+                  <a:srgbClr val="2A00FF"/>
+                </a:solidFill>
+                <a:latin typeface="Courier New"/>
+              </a:rPr>
+              <a:t>"text"</a:t>
+            </a:r>
+            <a:r>
+              <a:rPr lang="en-US" sz="2400" dirty="0" smtClean="0">
+                <a:latin typeface="Courier New"/>
+              </a:rPr>
+              <a:t>)</a:t>
+            </a:r>
+          </a:p>
+          <a:p>
+            <a:r>
+              <a:rPr lang="en-US" sz="2400" dirty="0" smtClean="0">
+                <a:latin typeface="Courier New"/>
+              </a:rPr>
+              <a:t>  }</a:t>
+            </a:r>
+          </a:p>
+          <a:p>
+            <a:r>
+              <a:rPr lang="en-US" sz="2400" dirty="0" smtClean="0">
+                <a:latin typeface="Courier New"/>
+              </a:rPr>
+              <a:t>  </a:t>
+            </a:r>
+            <a:r>
+              <a:rPr lang="en-US" sz="2400" dirty="0" smtClean="0">
+                <a:solidFill>
+                  <a:srgbClr val="2A00FF"/>
+                </a:solidFill>
+                <a:latin typeface="Courier New"/>
+              </a:rPr>
+              <a:t>"the snippet must output the user name"</a:t>
+            </a:r>
+            <a:r>
+              <a:rPr lang="en-US" sz="2400" dirty="0" smtClean="0">
+                <a:latin typeface="Courier New"/>
+              </a:rPr>
+              <a:t> &gt;&gt; {</a:t>
+            </a:r>
+          </a:p>
+          <a:p>
+            <a:r>
+              <a:rPr lang="en-US" sz="2400" dirty="0" smtClean="0">
+                <a:latin typeface="Courier New"/>
+              </a:rPr>
+              <a:t>    hello(</a:t>
+            </a:r>
+            <a:r>
+              <a:rPr lang="en-US" sz="2400" dirty="0" smtClean="0">
+                <a:solidFill>
+                  <a:srgbClr val="2A00FF"/>
+                </a:solidFill>
+                <a:latin typeface="Courier New"/>
+              </a:rPr>
+              <a:t>"Eric"</a:t>
+            </a:r>
+            <a:r>
+              <a:rPr lang="en-US" sz="2400" dirty="0" smtClean="0">
+                <a:latin typeface="Courier New"/>
+              </a:rPr>
+              <a:t>).</a:t>
+            </a:r>
+            <a:r>
+              <a:rPr lang="en-US" sz="2400" dirty="0" err="1" smtClean="0">
+                <a:latin typeface="Courier New"/>
+              </a:rPr>
+              <a:t>flatMap</a:t>
+            </a:r>
+            <a:r>
+              <a:rPr lang="en-US" sz="2400" dirty="0" smtClean="0">
+                <a:latin typeface="Courier New"/>
+              </a:rPr>
+              <a:t>(_.child) must contain(</a:t>
+            </a:r>
+            <a:r>
+              <a:rPr lang="en-US" sz="2400" b="1" dirty="0" smtClean="0">
+                <a:solidFill>
+                  <a:srgbClr val="7F0055"/>
+                </a:solidFill>
+                <a:latin typeface="Courier New"/>
+              </a:rPr>
               <a:t>new</a:t>
             </a:r>
             <a:r>
               <a:rPr lang="en-US" sz="2400" b="1" dirty="0" smtClean="0">
                 <a:latin typeface="Courier New"/>
               </a:rPr>
-              <a:t> </a:t>
-            </a:r>
-            <a:r>
-              <a:rPr lang="en-US" sz="2400" b="1" dirty="0" smtClean="0">
-                <a:latin typeface="Courier New"/>
-              </a:rPr>
-              <a:t>Atom(</a:t>
+              <a:t> Atom(</a:t>
             </a:r>
             <a:r>
               <a:rPr lang="en-US" sz="2400" b="1" dirty="0" smtClean="0">
@@ -6669,6 +6892,645 @@
               <a:t>}</a:t>
             </a:r>
             <a:endParaRPr lang="en-US" sz="2400" dirty="0"/>
+          </a:p>
+        </p:txBody>
+      </p:sp>
+    </p:spTree>
+  </p:cSld>
+  <p:clrMapOvr>
+    <a:masterClrMapping/>
+  </p:clrMapOvr>
+  <p:transition>
+    <p:fade/>
+  </p:transition>
+  <p:timing>
+    <p:tnLst>
+      <p:par>
+        <p:cTn id="1" dur="indefinite" restart="never" nodeType="tmRoot"/>
+      </p:par>
+    </p:tnLst>
+  </p:timing>
+</p:sld>
+</file>
+
+<file path=ppt/slides/slide12.xml><?xml version="1.0" encoding="utf-8"?>
+<p:sld xmlns:a="http://schemas.openxmlformats.org/drawingml/2006/main" xmlns:r="http://schemas.openxmlformats.org/officeDocument/2006/relationships" xmlns:p="http://schemas.openxmlformats.org/presentationml/2006/main">
+  <p:cSld>
+    <p:spTree>
+      <p:nvGrpSpPr>
+        <p:cNvPr id="1" name=""/>
+        <p:cNvGrpSpPr/>
+        <p:nvPr/>
+      </p:nvGrpSpPr>
+      <p:grpSpPr>
+        <a:xfrm>
+          <a:off x="0" y="0"/>
+          <a:ext cx="0" cy="0"/>
+          <a:chOff x="0" y="0"/>
+          <a:chExt cx="0" cy="0"/>
+        </a:xfrm>
+      </p:grpSpPr>
+      <p:sp>
+        <p:nvSpPr>
+          <p:cNvPr id="8193" name="Rectangle 1"/>
+          <p:cNvSpPr>
+            <a:spLocks noGrp="1" noChangeArrowheads="1"/>
+          </p:cNvSpPr>
+          <p:nvPr>
+            <p:ph type="title"/>
+          </p:nvPr>
+        </p:nvSpPr>
+        <p:spPr>
+          <a:ln/>
+        </p:spPr>
+        <p:txBody>
+          <a:bodyPr/>
+          <a:lstStyle/>
+          <a:p>
+            <a:pPr lvl="0"/>
+            <a:r>
+              <a:rPr lang="en-US" sz="5400" dirty="0" smtClean="0">
+                <a:latin typeface="Lucida Handwriting" pitchFamily="66" charset="0"/>
+              </a:rPr>
+              <a:t>       tour</a:t>
+            </a:r>
+            <a:endParaRPr lang="en-US" dirty="0"/>
+          </a:p>
+        </p:txBody>
+      </p:sp>
+      <p:pic>
+        <p:nvPicPr>
+          <p:cNvPr id="39938" name="Picture 2" descr="Logo"/>
+          <p:cNvPicPr>
+            <a:picLocks noChangeAspect="1" noChangeArrowheads="1"/>
+          </p:cNvPicPr>
+          <p:nvPr/>
+        </p:nvPicPr>
+        <p:blipFill>
+          <a:blip r:embed="rId3"/>
+          <a:srcRect/>
+          <a:stretch>
+            <a:fillRect/>
+          </a:stretch>
+        </p:blipFill>
+        <p:spPr bwMode="auto">
+          <a:xfrm>
+            <a:off x="3833628" y="228600"/>
+            <a:ext cx="2287772" cy="642969"/>
+          </a:xfrm>
+          <a:prstGeom prst="rect">
+            <a:avLst/>
+          </a:prstGeom>
+          <a:noFill/>
+        </p:spPr>
+      </p:pic>
+      <p:sp>
+        <p:nvSpPr>
+          <p:cNvPr id="6" name="Rectangle 5"/>
+          <p:cNvSpPr/>
+          <p:nvPr/>
+        </p:nvSpPr>
+        <p:spPr>
+          <a:xfrm>
+            <a:off x="330200" y="1143000"/>
+            <a:ext cx="12344400" cy="7109639"/>
+          </a:xfrm>
+          <a:prstGeom prst="rect">
+            <a:avLst/>
+          </a:prstGeom>
+          <a:ln>
+            <a:solidFill>
+              <a:schemeClr val="tx1"/>
+            </a:solidFill>
+            <a:prstDash val="dash"/>
+          </a:ln>
+        </p:spPr>
+        <p:txBody>
+          <a:bodyPr wrap="square">
+            <a:spAutoFit/>
+          </a:bodyPr>
+          <a:lstStyle/>
+          <a:p>
+            <a:r>
+              <a:rPr lang="en-US" sz="2400" b="1" dirty="0" smtClean="0">
+                <a:solidFill>
+                  <a:srgbClr val="7F0055"/>
+                </a:solidFill>
+                <a:latin typeface="Courier New"/>
+              </a:rPr>
+              <a:t>class</a:t>
+            </a:r>
+            <a:r>
+              <a:rPr lang="en-US" sz="2400" b="1" dirty="0" smtClean="0">
+                <a:latin typeface="Courier New"/>
+              </a:rPr>
+              <a:t> Reverser3Spec </a:t>
+            </a:r>
+            <a:r>
+              <a:rPr lang="en-US" sz="2400" b="1" dirty="0" smtClean="0">
+                <a:solidFill>
+                  <a:srgbClr val="7F0055"/>
+                </a:solidFill>
+                <a:latin typeface="Courier New"/>
+              </a:rPr>
+              <a:t>extends</a:t>
+            </a:r>
+            <a:r>
+              <a:rPr lang="en-US" sz="2400" b="1" dirty="0" smtClean="0">
+                <a:latin typeface="Courier New"/>
+              </a:rPr>
+              <a:t> </a:t>
+            </a:r>
+            <a:r>
+              <a:rPr lang="en-US" sz="2400" b="1" dirty="0" err="1" smtClean="0">
+                <a:latin typeface="Courier New"/>
+              </a:rPr>
+              <a:t>SpecificationWithJUnit</a:t>
+            </a:r>
+            <a:r>
+              <a:rPr lang="en-US" sz="2400" b="1" dirty="0" smtClean="0">
+                <a:latin typeface="Courier New"/>
+              </a:rPr>
+              <a:t> </a:t>
+            </a:r>
+          </a:p>
+          <a:p>
+            <a:r>
+              <a:rPr lang="en-US" sz="2400" b="1" dirty="0" smtClean="0">
+                <a:solidFill>
+                  <a:srgbClr val="7F0055"/>
+                </a:solidFill>
+                <a:latin typeface="Courier New"/>
+              </a:rPr>
+              <a:t>                            with</a:t>
+            </a:r>
+            <a:r>
+              <a:rPr lang="en-US" sz="2400" b="1" dirty="0" smtClean="0">
+                <a:latin typeface="Courier New"/>
+              </a:rPr>
+              <a:t> </a:t>
+            </a:r>
+            <a:r>
+              <a:rPr lang="en-US" sz="2400" b="1" dirty="0" err="1" smtClean="0">
+                <a:latin typeface="Courier New"/>
+              </a:rPr>
+              <a:t>ScalaCheck</a:t>
+            </a:r>
+            <a:r>
+              <a:rPr lang="en-US" sz="2400" b="1" dirty="0" smtClean="0">
+                <a:latin typeface="Courier New"/>
+              </a:rPr>
+              <a:t> {</a:t>
+            </a:r>
+          </a:p>
+          <a:p>
+            <a:endParaRPr lang="en-US" sz="2400" dirty="0" smtClean="0">
+              <a:solidFill>
+                <a:srgbClr val="2A00FF"/>
+              </a:solidFill>
+              <a:latin typeface="Courier New"/>
+            </a:endParaRPr>
+          </a:p>
+          <a:p>
+            <a:r>
+              <a:rPr lang="en-US" sz="2400" dirty="0" smtClean="0">
+                <a:solidFill>
+                  <a:srgbClr val="2A00FF"/>
+                </a:solidFill>
+                <a:latin typeface="Courier New"/>
+              </a:rPr>
+              <a:t>  "reverse must preserve the length of a string"</a:t>
+            </a:r>
+            <a:r>
+              <a:rPr lang="en-US" sz="2400" dirty="0" smtClean="0">
+                <a:latin typeface="Courier New"/>
+              </a:rPr>
+              <a:t> verifies { </a:t>
+            </a:r>
+          </a:p>
+          <a:p>
+            <a:r>
+              <a:rPr lang="en-US" sz="2400" dirty="0" smtClean="0">
+                <a:latin typeface="Courier New"/>
+              </a:rPr>
+              <a:t>    s: String =&gt; reverse(s).size == </a:t>
+            </a:r>
+            <a:r>
+              <a:rPr lang="en-US" sz="2400" dirty="0" err="1" smtClean="0">
+                <a:latin typeface="Courier New"/>
+              </a:rPr>
+              <a:t>s.size</a:t>
+            </a:r>
+            <a:r>
+              <a:rPr lang="en-US" sz="2400" dirty="0" smtClean="0">
+                <a:latin typeface="Courier New"/>
+              </a:rPr>
+              <a:t> </a:t>
+            </a:r>
+          </a:p>
+          <a:p>
+            <a:r>
+              <a:rPr lang="en-US" sz="2400" dirty="0" smtClean="0">
+                <a:latin typeface="Courier New"/>
+              </a:rPr>
+              <a:t>  }</a:t>
+            </a:r>
+          </a:p>
+          <a:p>
+            <a:r>
+              <a:rPr lang="en-US" sz="2400" dirty="0" smtClean="0">
+                <a:solidFill>
+                  <a:srgbClr val="2A00FF"/>
+                </a:solidFill>
+                <a:latin typeface="Courier New"/>
+              </a:rPr>
+              <a:t>  "reverse applied twice must return the same string"</a:t>
+            </a:r>
+            <a:r>
+              <a:rPr lang="en-US" sz="2400" dirty="0" smtClean="0">
+                <a:latin typeface="Courier New"/>
+              </a:rPr>
+              <a:t> verifies {   </a:t>
+            </a:r>
+          </a:p>
+          <a:p>
+            <a:r>
+              <a:rPr lang="en-US" sz="2400" dirty="0" smtClean="0">
+                <a:latin typeface="Courier New"/>
+              </a:rPr>
+              <a:t>    s: String =&gt; reverse(reverse(s)) == s </a:t>
+            </a:r>
+          </a:p>
+          <a:p>
+            <a:r>
+              <a:rPr lang="en-US" sz="2400" dirty="0" smtClean="0">
+                <a:latin typeface="Courier New"/>
+              </a:rPr>
+              <a:t>  }</a:t>
+            </a:r>
+          </a:p>
+          <a:p>
+            <a:r>
+              <a:rPr lang="en-US" sz="2400" dirty="0" smtClean="0">
+                <a:solidFill>
+                  <a:srgbClr val="2A00FF"/>
+                </a:solidFill>
+                <a:latin typeface="Courier New"/>
+              </a:rPr>
+              <a:t>  "reverse 2 concatenated strings must return the reversed second </a:t>
+            </a:r>
+          </a:p>
+          <a:p>
+            <a:r>
+              <a:rPr lang="en-US" sz="2400" dirty="0" smtClean="0">
+                <a:solidFill>
+                  <a:srgbClr val="2A00FF"/>
+                </a:solidFill>
+                <a:latin typeface="Courier New"/>
+              </a:rPr>
+              <a:t>   string concatenated with the reversed first one"</a:t>
+            </a:r>
+            <a:r>
+              <a:rPr lang="en-US" sz="2400" dirty="0" smtClean="0">
+                <a:latin typeface="Courier New"/>
+              </a:rPr>
+              <a:t> verifies {</a:t>
+            </a:r>
+          </a:p>
+          <a:p>
+            <a:r>
+              <a:rPr lang="en-US" sz="2400" dirty="0" smtClean="0">
+                <a:latin typeface="Courier New"/>
+              </a:rPr>
+              <a:t>    (s1: String, s2: String) =&gt; reverse(s1 + s2) == </a:t>
+            </a:r>
+          </a:p>
+          <a:p>
+            <a:r>
+              <a:rPr lang="en-US" sz="2400" dirty="0" smtClean="0">
+                <a:latin typeface="Courier New"/>
+              </a:rPr>
+              <a:t>                                reverse(s2) + reverse(s1) </a:t>
+            </a:r>
+          </a:p>
+          <a:p>
+            <a:r>
+              <a:rPr lang="en-US" sz="2400" dirty="0" smtClean="0">
+                <a:latin typeface="Courier New"/>
+              </a:rPr>
+              <a:t>  }</a:t>
+            </a:r>
+          </a:p>
+          <a:p>
+            <a:r>
+              <a:rPr lang="en-US" sz="2400" dirty="0" smtClean="0">
+                <a:latin typeface="Courier New"/>
+              </a:rPr>
+              <a:t>  </a:t>
+            </a:r>
+            <a:r>
+              <a:rPr lang="en-US" sz="2400" b="1" dirty="0" smtClean="0">
+                <a:solidFill>
+                  <a:srgbClr val="7F0055"/>
+                </a:solidFill>
+                <a:latin typeface="Courier New"/>
+              </a:rPr>
+              <a:t>def</a:t>
+            </a:r>
+            <a:r>
+              <a:rPr lang="en-US" sz="2400" b="1" dirty="0" smtClean="0">
+                <a:latin typeface="Courier New"/>
+              </a:rPr>
+              <a:t> </a:t>
+            </a:r>
+            <a:r>
+              <a:rPr lang="en-US" sz="2400" dirty="0" smtClean="0">
+                <a:latin typeface="Courier New"/>
+              </a:rPr>
+              <a:t>center(s: String) = s(</a:t>
+            </a:r>
+            <a:r>
+              <a:rPr lang="en-US" sz="2400" dirty="0" err="1" smtClean="0">
+                <a:latin typeface="Courier New"/>
+              </a:rPr>
+              <a:t>s.size</a:t>
+            </a:r>
+            <a:r>
+              <a:rPr lang="en-US" sz="2400" dirty="0" smtClean="0">
+                <a:latin typeface="Courier New"/>
+              </a:rPr>
+              <a:t> / 2)</a:t>
+            </a:r>
+          </a:p>
+          <a:p>
+            <a:r>
+              <a:rPr lang="en-US" sz="2400" dirty="0" smtClean="0">
+                <a:solidFill>
+                  <a:srgbClr val="2A00FF"/>
+                </a:solidFill>
+                <a:latin typeface="Courier New"/>
+              </a:rPr>
+              <a:t>  "keep the same 'center' character - Woops!"</a:t>
+            </a:r>
+            <a:r>
+              <a:rPr lang="en-US" sz="2400" dirty="0" smtClean="0">
+                <a:latin typeface="Courier New"/>
+              </a:rPr>
+              <a:t> verifies { </a:t>
+            </a:r>
+          </a:p>
+          <a:p>
+            <a:r>
+              <a:rPr lang="en-US" sz="2400" dirty="0" smtClean="0">
+                <a:latin typeface="Courier New"/>
+              </a:rPr>
+              <a:t>    s: String =&gt; </a:t>
+            </a:r>
+            <a:r>
+              <a:rPr lang="en-US" sz="2400" dirty="0" err="1" smtClean="0">
+                <a:latin typeface="Courier New"/>
+              </a:rPr>
+              <a:t>s.isEmpty</a:t>
+            </a:r>
+            <a:r>
+              <a:rPr lang="en-US" sz="2400" dirty="0" smtClean="0">
+                <a:latin typeface="Courier New"/>
+              </a:rPr>
+              <a:t> || center(reverse(s)) == center(s) </a:t>
+            </a:r>
+          </a:p>
+          <a:p>
+            <a:r>
+              <a:rPr lang="en-US" sz="2400" dirty="0" smtClean="0">
+                <a:latin typeface="Courier New"/>
+              </a:rPr>
+              <a:t>  }.display(</a:t>
+            </a:r>
+            <a:r>
+              <a:rPr lang="en-US" sz="2400" dirty="0" err="1" smtClean="0">
+                <a:latin typeface="Courier New"/>
+              </a:rPr>
+              <a:t>minTestsOk</a:t>
+            </a:r>
+            <a:r>
+              <a:rPr lang="en-US" sz="2400" dirty="0" smtClean="0">
+                <a:latin typeface="Courier New"/>
+              </a:rPr>
+              <a:t> -&gt; 5)</a:t>
+            </a:r>
+          </a:p>
+          <a:p>
+            <a:r>
+              <a:rPr lang="en-US" sz="2400" dirty="0" smtClean="0">
+                <a:latin typeface="Courier New"/>
+              </a:rPr>
+              <a:t>}</a:t>
+            </a:r>
+            <a:endParaRPr lang="en-US" sz="2400" dirty="0"/>
+          </a:p>
+        </p:txBody>
+      </p:sp>
+    </p:spTree>
+  </p:cSld>
+  <p:clrMapOvr>
+    <a:masterClrMapping/>
+  </p:clrMapOvr>
+  <p:transition>
+    <p:fade/>
+  </p:transition>
+  <p:timing>
+    <p:tnLst>
+      <p:par>
+        <p:cTn id="1" dur="indefinite" restart="never" nodeType="tmRoot"/>
+      </p:par>
+    </p:tnLst>
+  </p:timing>
+</p:sld>
+</file>
+
+<file path=ppt/slides/slide13.xml><?xml version="1.0" encoding="utf-8"?>
+<p:sld xmlns:a="http://schemas.openxmlformats.org/drawingml/2006/main" xmlns:r="http://schemas.openxmlformats.org/officeDocument/2006/relationships" xmlns:p="http://schemas.openxmlformats.org/presentationml/2006/main">
+  <p:cSld>
+    <p:spTree>
+      <p:nvGrpSpPr>
+        <p:cNvPr id="1" name=""/>
+        <p:cNvGrpSpPr/>
+        <p:nvPr/>
+      </p:nvGrpSpPr>
+      <p:grpSpPr>
+        <a:xfrm>
+          <a:off x="0" y="0"/>
+          <a:ext cx="0" cy="0"/>
+          <a:chOff x="0" y="0"/>
+          <a:chExt cx="0" cy="0"/>
+        </a:xfrm>
+      </p:grpSpPr>
+      <p:sp>
+        <p:nvSpPr>
+          <p:cNvPr id="8193" name="Rectangle 1"/>
+          <p:cNvSpPr>
+            <a:spLocks noGrp="1" noChangeArrowheads="1"/>
+          </p:cNvSpPr>
+          <p:nvPr>
+            <p:ph type="title"/>
+          </p:nvPr>
+        </p:nvSpPr>
+        <p:spPr>
+          <a:ln/>
+        </p:spPr>
+        <p:txBody>
+          <a:bodyPr/>
+          <a:lstStyle/>
+          <a:p>
+            <a:pPr lvl="0"/>
+            <a:r>
+              <a:rPr lang="en-US" sz="5400" dirty="0" smtClean="0">
+                <a:latin typeface="Lucida Handwriting" pitchFamily="66" charset="0"/>
+              </a:rPr>
+              <a:t>       tour</a:t>
+            </a:r>
+            <a:endParaRPr lang="en-US" dirty="0"/>
+          </a:p>
+        </p:txBody>
+      </p:sp>
+      <p:pic>
+        <p:nvPicPr>
+          <p:cNvPr id="39938" name="Picture 2" descr="Logo"/>
+          <p:cNvPicPr>
+            <a:picLocks noChangeAspect="1" noChangeArrowheads="1"/>
+          </p:cNvPicPr>
+          <p:nvPr/>
+        </p:nvPicPr>
+        <p:blipFill>
+          <a:blip r:embed="rId3"/>
+          <a:srcRect/>
+          <a:stretch>
+            <a:fillRect/>
+          </a:stretch>
+        </p:blipFill>
+        <p:spPr bwMode="auto">
+          <a:xfrm>
+            <a:off x="3833628" y="228600"/>
+            <a:ext cx="2287772" cy="642969"/>
+          </a:xfrm>
+          <a:prstGeom prst="rect">
+            <a:avLst/>
+          </a:prstGeom>
+          <a:noFill/>
+        </p:spPr>
+      </p:pic>
+      <p:sp>
+        <p:nvSpPr>
+          <p:cNvPr id="6" name="Rectangle 5"/>
+          <p:cNvSpPr/>
+          <p:nvPr/>
+        </p:nvSpPr>
+        <p:spPr>
+          <a:xfrm>
+            <a:off x="330200" y="1143000"/>
+            <a:ext cx="12344400" cy="2308324"/>
+          </a:xfrm>
+          <a:prstGeom prst="rect">
+            <a:avLst/>
+          </a:prstGeom>
+          <a:ln>
+            <a:solidFill>
+              <a:schemeClr val="tx1"/>
+            </a:solidFill>
+            <a:prstDash val="dash"/>
+          </a:ln>
+        </p:spPr>
+        <p:txBody>
+          <a:bodyPr wrap="square">
+            <a:spAutoFit/>
+          </a:bodyPr>
+          <a:lstStyle/>
+          <a:p>
+            <a:r>
+              <a:rPr lang="en-US" sz="2400" dirty="0" smtClean="0">
+                <a:latin typeface="Courier New"/>
+              </a:rPr>
+              <a:t>Passed 1 tests</a:t>
+            </a:r>
+          </a:p>
+          <a:p>
+            <a:r>
+              <a:rPr lang="en-US" sz="2400" dirty="0" smtClean="0">
+                <a:latin typeface="Courier New"/>
+              </a:rPr>
+              <a:t>! Falsified after 1 passed tests.</a:t>
+            </a:r>
+          </a:p>
+          <a:p>
+            <a:r>
+              <a:rPr lang="nn-NO" sz="2400" dirty="0" smtClean="0">
+                <a:latin typeface="Courier New"/>
+              </a:rPr>
+              <a:t>&gt; ARG_0: ac (orig arg: acbb)          </a:t>
+            </a:r>
+          </a:p>
+          <a:p>
+            <a:r>
+              <a:rPr lang="en-US" sz="2400" dirty="0" smtClean="0">
+                <a:latin typeface="Courier New"/>
+              </a:rPr>
+              <a:t>  x keep the same 'center' character - Woops!</a:t>
+            </a:r>
+          </a:p>
+          <a:p>
+            <a:r>
+              <a:rPr lang="en-US" sz="2400" dirty="0" smtClean="0">
+                <a:latin typeface="Courier New"/>
+              </a:rPr>
+              <a:t>    A counter-example is 'ac' (after 1 try </a:t>
+            </a:r>
+            <a:r>
+              <a:rPr lang="en-US" sz="2400" dirty="0" smtClean="0">
+                <a:latin typeface="Courier New"/>
+              </a:rPr>
+              <a:t>– </a:t>
+            </a:r>
+          </a:p>
+          <a:p>
+            <a:r>
+              <a:rPr lang="en-US" sz="2400" smtClean="0">
+                <a:latin typeface="Courier New"/>
+              </a:rPr>
+              <a:t> </a:t>
+            </a:r>
+            <a:r>
+              <a:rPr lang="en-US" sz="2400" smtClean="0">
+                <a:latin typeface="Courier New"/>
+              </a:rPr>
+              <a:t>                              shrinked</a:t>
+            </a:r>
+            <a:r>
+              <a:rPr lang="en-US" sz="2400" dirty="0" smtClean="0">
+                <a:latin typeface="Courier New"/>
+              </a:rPr>
+              <a:t> </a:t>
+            </a:r>
+            <a:r>
+              <a:rPr lang="en-US" sz="2400" dirty="0" smtClean="0">
+                <a:latin typeface="Courier New"/>
+              </a:rPr>
+              <a:t>('</a:t>
+            </a:r>
+            <a:r>
+              <a:rPr lang="en-US" sz="2400" dirty="0" err="1" smtClean="0">
+                <a:latin typeface="Courier New"/>
+              </a:rPr>
+              <a:t>acbb</a:t>
+            </a:r>
+            <a:r>
+              <a:rPr lang="en-US" sz="2400" dirty="0" smtClean="0">
+                <a:latin typeface="Courier New"/>
+              </a:rPr>
+              <a:t>' -&gt; 'ac'))</a:t>
+            </a:r>
+            <a:endParaRPr lang="en-US" sz="2400" u="sng" dirty="0" smtClean="0">
+              <a:latin typeface="Courier New"/>
+            </a:endParaRPr>
           </a:p>
         </p:txBody>
       </p:sp>

</xml_diff>

<commit_message>
finished the scalacheck example and added a mockito example
</commit_message>
<xml_diff>
--- a/src/main/resources/oscon_2010_specs.pptx
+++ b/src/main/resources/oscon_2010_specs.pptx
@@ -6,7 +6,7 @@
     <p:sldMasterId id="2147483651" r:id="rId2"/>
   </p:sldMasterIdLst>
   <p:notesMasterIdLst>
-    <p:notesMasterId r:id="rId19"/>
+    <p:notesMasterId r:id="rId23"/>
   </p:notesMasterIdLst>
   <p:sldIdLst>
     <p:sldId id="258" r:id="rId3"/>
@@ -23,8 +23,12 @@
     <p:sldId id="267" r:id="rId14"/>
     <p:sldId id="273" r:id="rId15"/>
     <p:sldId id="268" r:id="rId16"/>
-    <p:sldId id="269" r:id="rId17"/>
-    <p:sldId id="270" r:id="rId18"/>
+    <p:sldId id="274" r:id="rId17"/>
+    <p:sldId id="269" r:id="rId18"/>
+    <p:sldId id="270" r:id="rId19"/>
+    <p:sldId id="275" r:id="rId20"/>
+    <p:sldId id="277" r:id="rId21"/>
+    <p:sldId id="276" r:id="rId22"/>
   </p:sldIdLst>
   <p:sldSz cx="13004800" cy="9753600"/>
   <p:notesSz cx="6858000" cy="9144000"/>
@@ -1268,6 +1272,258 @@
 </p:notes>
 </file>
 
+<file path=ppt/notesSlides/notesSlide17.xml><?xml version="1.0" encoding="utf-8"?>
+<p:notes xmlns:a="http://schemas.openxmlformats.org/drawingml/2006/main" xmlns:r="http://schemas.openxmlformats.org/officeDocument/2006/relationships" xmlns:p="http://schemas.openxmlformats.org/presentationml/2006/main">
+  <p:cSld>
+    <p:spTree>
+      <p:nvGrpSpPr>
+        <p:cNvPr id="1" name=""/>
+        <p:cNvGrpSpPr/>
+        <p:nvPr/>
+      </p:nvGrpSpPr>
+      <p:grpSpPr>
+        <a:xfrm>
+          <a:off x="0" y="0"/>
+          <a:ext cx="0" cy="0"/>
+          <a:chOff x="0" y="0"/>
+          <a:chExt cx="0" cy="0"/>
+        </a:xfrm>
+      </p:grpSpPr>
+      <p:sp>
+        <p:nvSpPr>
+          <p:cNvPr id="7" name="Rectangle 7"/>
+          <p:cNvSpPr>
+            <a:spLocks noGrp="1"/>
+          </p:cNvSpPr>
+          <p:nvPr>
+            <p:ph type="sldNum" sz="quarter" idx="5"/>
+          </p:nvPr>
+        </p:nvSpPr>
+        <p:spPr>
+          <a:ln/>
+        </p:spPr>
+        <p:txBody>
+          <a:bodyPr/>
+          <a:lstStyle/>
+          <a:p>
+            <a:fld id="{27AEA7DA-096A-4FB7-B4B3-D12717EF4BDD}" type="slidenum">
+              <a:rPr lang="en-US"/>
+              <a:pPr/>
+              <a:t>17</a:t>
+            </a:fld>
+            <a:endParaRPr lang="en-US"/>
+          </a:p>
+        </p:txBody>
+      </p:sp>
+      <p:sp>
+        <p:nvSpPr>
+          <p:cNvPr id="19458" name="Rectangle 2"/>
+          <p:cNvSpPr>
+            <a:spLocks noGrp="1" noRot="1" noChangeAspect="1" noChangeArrowheads="1" noTextEdit="1"/>
+          </p:cNvSpPr>
+          <p:nvPr>
+            <p:ph type="sldImg"/>
+          </p:nvPr>
+        </p:nvSpPr>
+        <p:spPr>
+          <a:ln/>
+        </p:spPr>
+      </p:sp>
+      <p:sp>
+        <p:nvSpPr>
+          <p:cNvPr id="19459" name="Rectangle 3"/>
+          <p:cNvSpPr>
+            <a:spLocks noGrp="1"/>
+          </p:cNvSpPr>
+          <p:nvPr>
+            <p:ph type="body" idx="1"/>
+          </p:nvPr>
+        </p:nvSpPr>
+        <p:spPr/>
+        <p:txBody>
+          <a:bodyPr/>
+          <a:lstStyle/>
+          <a:p>
+            <a:endParaRPr lang="en-US"/>
+          </a:p>
+        </p:txBody>
+      </p:sp>
+    </p:spTree>
+  </p:cSld>
+  <p:clrMapOvr>
+    <a:masterClrMapping/>
+  </p:clrMapOvr>
+</p:notes>
+</file>
+
+<file path=ppt/notesSlides/notesSlide18.xml><?xml version="1.0" encoding="utf-8"?>
+<p:notes xmlns:a="http://schemas.openxmlformats.org/drawingml/2006/main" xmlns:r="http://schemas.openxmlformats.org/officeDocument/2006/relationships" xmlns:p="http://schemas.openxmlformats.org/presentationml/2006/main">
+  <p:cSld>
+    <p:spTree>
+      <p:nvGrpSpPr>
+        <p:cNvPr id="1" name=""/>
+        <p:cNvGrpSpPr/>
+        <p:nvPr/>
+      </p:nvGrpSpPr>
+      <p:grpSpPr>
+        <a:xfrm>
+          <a:off x="0" y="0"/>
+          <a:ext cx="0" cy="0"/>
+          <a:chOff x="0" y="0"/>
+          <a:chExt cx="0" cy="0"/>
+        </a:xfrm>
+      </p:grpSpPr>
+      <p:sp>
+        <p:nvSpPr>
+          <p:cNvPr id="7" name="Rectangle 7"/>
+          <p:cNvSpPr>
+            <a:spLocks noGrp="1"/>
+          </p:cNvSpPr>
+          <p:nvPr>
+            <p:ph type="sldNum" sz="quarter" idx="5"/>
+          </p:nvPr>
+        </p:nvSpPr>
+        <p:spPr>
+          <a:ln/>
+        </p:spPr>
+        <p:txBody>
+          <a:bodyPr/>
+          <a:lstStyle/>
+          <a:p>
+            <a:fld id="{27AEA7DA-096A-4FB7-B4B3-D12717EF4BDD}" type="slidenum">
+              <a:rPr lang="en-US"/>
+              <a:pPr/>
+              <a:t>18</a:t>
+            </a:fld>
+            <a:endParaRPr lang="en-US"/>
+          </a:p>
+        </p:txBody>
+      </p:sp>
+      <p:sp>
+        <p:nvSpPr>
+          <p:cNvPr id="19458" name="Rectangle 2"/>
+          <p:cNvSpPr>
+            <a:spLocks noGrp="1" noRot="1" noChangeAspect="1" noChangeArrowheads="1" noTextEdit="1"/>
+          </p:cNvSpPr>
+          <p:nvPr>
+            <p:ph type="sldImg"/>
+          </p:nvPr>
+        </p:nvSpPr>
+        <p:spPr>
+          <a:ln/>
+        </p:spPr>
+      </p:sp>
+      <p:sp>
+        <p:nvSpPr>
+          <p:cNvPr id="19459" name="Rectangle 3"/>
+          <p:cNvSpPr>
+            <a:spLocks noGrp="1"/>
+          </p:cNvSpPr>
+          <p:nvPr>
+            <p:ph type="body" idx="1"/>
+          </p:nvPr>
+        </p:nvSpPr>
+        <p:spPr/>
+        <p:txBody>
+          <a:bodyPr/>
+          <a:lstStyle/>
+          <a:p>
+            <a:endParaRPr lang="en-US"/>
+          </a:p>
+        </p:txBody>
+      </p:sp>
+    </p:spTree>
+  </p:cSld>
+  <p:clrMapOvr>
+    <a:masterClrMapping/>
+  </p:clrMapOvr>
+</p:notes>
+</file>
+
+<file path=ppt/notesSlides/notesSlide19.xml><?xml version="1.0" encoding="utf-8"?>
+<p:notes xmlns:a="http://schemas.openxmlformats.org/drawingml/2006/main" xmlns:r="http://schemas.openxmlformats.org/officeDocument/2006/relationships" xmlns:p="http://schemas.openxmlformats.org/presentationml/2006/main">
+  <p:cSld>
+    <p:spTree>
+      <p:nvGrpSpPr>
+        <p:cNvPr id="1" name=""/>
+        <p:cNvGrpSpPr/>
+        <p:nvPr/>
+      </p:nvGrpSpPr>
+      <p:grpSpPr>
+        <a:xfrm>
+          <a:off x="0" y="0"/>
+          <a:ext cx="0" cy="0"/>
+          <a:chOff x="0" y="0"/>
+          <a:chExt cx="0" cy="0"/>
+        </a:xfrm>
+      </p:grpSpPr>
+      <p:sp>
+        <p:nvSpPr>
+          <p:cNvPr id="7" name="Rectangle 7"/>
+          <p:cNvSpPr>
+            <a:spLocks noGrp="1"/>
+          </p:cNvSpPr>
+          <p:nvPr>
+            <p:ph type="sldNum" sz="quarter" idx="5"/>
+          </p:nvPr>
+        </p:nvSpPr>
+        <p:spPr>
+          <a:ln/>
+        </p:spPr>
+        <p:txBody>
+          <a:bodyPr/>
+          <a:lstStyle/>
+          <a:p>
+            <a:fld id="{27AEA7DA-096A-4FB7-B4B3-D12717EF4BDD}" type="slidenum">
+              <a:rPr lang="en-US"/>
+              <a:pPr/>
+              <a:t>19</a:t>
+            </a:fld>
+            <a:endParaRPr lang="en-US"/>
+          </a:p>
+        </p:txBody>
+      </p:sp>
+      <p:sp>
+        <p:nvSpPr>
+          <p:cNvPr id="19458" name="Rectangle 2"/>
+          <p:cNvSpPr>
+            <a:spLocks noGrp="1" noRot="1" noChangeAspect="1" noChangeArrowheads="1" noTextEdit="1"/>
+          </p:cNvSpPr>
+          <p:nvPr>
+            <p:ph type="sldImg"/>
+          </p:nvPr>
+        </p:nvSpPr>
+        <p:spPr>
+          <a:ln/>
+        </p:spPr>
+      </p:sp>
+      <p:sp>
+        <p:nvSpPr>
+          <p:cNvPr id="19459" name="Rectangle 3"/>
+          <p:cNvSpPr>
+            <a:spLocks noGrp="1"/>
+          </p:cNvSpPr>
+          <p:nvPr>
+            <p:ph type="body" idx="1"/>
+          </p:nvPr>
+        </p:nvSpPr>
+        <p:spPr/>
+        <p:txBody>
+          <a:bodyPr/>
+          <a:lstStyle/>
+          <a:p>
+            <a:endParaRPr lang="en-US"/>
+          </a:p>
+        </p:txBody>
+      </p:sp>
+    </p:spTree>
+  </p:cSld>
+  <p:clrMapOvr>
+    <a:masterClrMapping/>
+  </p:clrMapOvr>
+</p:notes>
+</file>
+
 <file path=ppt/notesSlides/notesSlide2.xml><?xml version="1.0" encoding="utf-8"?>
 <p:notes xmlns:a="http://schemas.openxmlformats.org/drawingml/2006/main" xmlns:r="http://schemas.openxmlformats.org/officeDocument/2006/relationships" xmlns:p="http://schemas.openxmlformats.org/presentationml/2006/main">
   <p:cSld>
@@ -1306,6 +1562,90 @@
               <a:rPr lang="en-US"/>
               <a:pPr/>
               <a:t>2</a:t>
+            </a:fld>
+            <a:endParaRPr lang="en-US"/>
+          </a:p>
+        </p:txBody>
+      </p:sp>
+      <p:sp>
+        <p:nvSpPr>
+          <p:cNvPr id="19458" name="Rectangle 2"/>
+          <p:cNvSpPr>
+            <a:spLocks noGrp="1" noRot="1" noChangeAspect="1" noChangeArrowheads="1" noTextEdit="1"/>
+          </p:cNvSpPr>
+          <p:nvPr>
+            <p:ph type="sldImg"/>
+          </p:nvPr>
+        </p:nvSpPr>
+        <p:spPr>
+          <a:ln/>
+        </p:spPr>
+      </p:sp>
+      <p:sp>
+        <p:nvSpPr>
+          <p:cNvPr id="19459" name="Rectangle 3"/>
+          <p:cNvSpPr>
+            <a:spLocks noGrp="1"/>
+          </p:cNvSpPr>
+          <p:nvPr>
+            <p:ph type="body" idx="1"/>
+          </p:nvPr>
+        </p:nvSpPr>
+        <p:spPr/>
+        <p:txBody>
+          <a:bodyPr/>
+          <a:lstStyle/>
+          <a:p>
+            <a:endParaRPr lang="en-US"/>
+          </a:p>
+        </p:txBody>
+      </p:sp>
+    </p:spTree>
+  </p:cSld>
+  <p:clrMapOvr>
+    <a:masterClrMapping/>
+  </p:clrMapOvr>
+</p:notes>
+</file>
+
+<file path=ppt/notesSlides/notesSlide20.xml><?xml version="1.0" encoding="utf-8"?>
+<p:notes xmlns:a="http://schemas.openxmlformats.org/drawingml/2006/main" xmlns:r="http://schemas.openxmlformats.org/officeDocument/2006/relationships" xmlns:p="http://schemas.openxmlformats.org/presentationml/2006/main">
+  <p:cSld>
+    <p:spTree>
+      <p:nvGrpSpPr>
+        <p:cNvPr id="1" name=""/>
+        <p:cNvGrpSpPr/>
+        <p:nvPr/>
+      </p:nvGrpSpPr>
+      <p:grpSpPr>
+        <a:xfrm>
+          <a:off x="0" y="0"/>
+          <a:ext cx="0" cy="0"/>
+          <a:chOff x="0" y="0"/>
+          <a:chExt cx="0" cy="0"/>
+        </a:xfrm>
+      </p:grpSpPr>
+      <p:sp>
+        <p:nvSpPr>
+          <p:cNvPr id="7" name="Rectangle 7"/>
+          <p:cNvSpPr>
+            <a:spLocks noGrp="1"/>
+          </p:cNvSpPr>
+          <p:nvPr>
+            <p:ph type="sldNum" sz="quarter" idx="5"/>
+          </p:nvPr>
+        </p:nvSpPr>
+        <p:spPr>
+          <a:ln/>
+        </p:spPr>
+        <p:txBody>
+          <a:bodyPr/>
+          <a:lstStyle/>
+          <a:p>
+            <a:fld id="{27AEA7DA-096A-4FB7-B4B3-D12717EF4BDD}" type="slidenum">
+              <a:rPr lang="en-US"/>
+              <a:pPr/>
+              <a:t>20</a:t>
             </a:fld>
             <a:endParaRPr lang="en-US"/>
           </a:p>
@@ -1760,7 +2100,42 @@
           <a:bodyPr/>
           <a:lstStyle/>
           <a:p>
-            <a:endParaRPr lang="en-US"/>
+            <a:r>
+              <a:rPr lang="en-US" dirty="0" smtClean="0"/>
+              <a:t>BDD </a:t>
+            </a:r>
+            <a:r>
+              <a:rPr lang="en-US" dirty="0" err="1" smtClean="0"/>
+              <a:t>linguo</a:t>
+            </a:r>
+            <a:r>
+              <a:rPr lang="en-US" dirty="0" smtClean="0"/>
+              <a:t>:</a:t>
+            </a:r>
+          </a:p>
+          <a:p>
+            <a:endParaRPr lang="en-US" dirty="0" smtClean="0"/>
+          </a:p>
+          <a:p>
+            <a:pPr>
+              <a:buFontTx/>
+              <a:buChar char="-"/>
+            </a:pPr>
+            <a:r>
+              <a:rPr lang="en-US" baseline="0" dirty="0" smtClean="0"/>
+              <a:t> Tests come after the fact so TDD is more like specifying the behavior to implement</a:t>
+            </a:r>
+          </a:p>
+          <a:p>
+            <a:pPr>
+              <a:buFontTx/>
+              <a:buNone/>
+            </a:pPr>
+            <a:r>
+              <a:rPr lang="en-US" baseline="0" dirty="0" smtClean="0"/>
+              <a:t>-  Then what is a specification? At the most basic level it is a bunch of examples</a:t>
+            </a:r>
+            <a:endParaRPr lang="en-US" dirty="0"/>
           </a:p>
         </p:txBody>
       </p:sp>
@@ -6567,8 +6942,8 @@
         </p:nvSpPr>
         <p:spPr bwMode="auto">
           <a:xfrm>
-            <a:off x="7416800" y="6477000"/>
-            <a:ext cx="5410200" cy="914400"/>
+            <a:off x="7874000" y="6629400"/>
+            <a:ext cx="4876800" cy="914400"/>
           </a:xfrm>
           <a:prstGeom prst="rect">
             <a:avLst/>
@@ -6608,7 +6983,7 @@
               <a:defRPr/>
             </a:pPr>
             <a:r>
-              <a:rPr lang="en-US" sz="5400" b="1" kern="0" dirty="0" smtClean="0">
+              <a:rPr lang="en-US" sz="4800" b="1" kern="0" dirty="0" smtClean="0">
                 <a:solidFill>
                   <a:srgbClr val="00CC66"/>
                 </a:solidFill>
@@ -6639,7 +7014,7 @@
               <a:defRPr/>
             </a:pPr>
             <a:r>
-              <a:rPr kumimoji="0" lang="en-US" sz="5400" b="1" i="0" u="none" strike="noStrike" kern="0" cap="none" spc="0" normalizeH="0" baseline="0" noProof="0" dirty="0" smtClean="0">
+              <a:rPr kumimoji="0" lang="en-US" sz="4800" b="1" i="0" u="none" strike="noStrike" kern="0" cap="none" spc="0" normalizeH="0" baseline="0" noProof="0" dirty="0" smtClean="0">
                 <a:ln>
                   <a:noFill/>
                 </a:ln>
@@ -6676,7 +7051,7 @@
               <a:defRPr/>
             </a:pPr>
             <a:r>
-              <a:rPr lang="en-US" sz="5400" b="1" kern="0" dirty="0" smtClean="0">
+              <a:rPr lang="en-US" sz="4800" b="1" kern="0" dirty="0" smtClean="0">
                 <a:solidFill>
                   <a:srgbClr val="00CC66"/>
                 </a:solidFill>
@@ -6685,21 +7060,9 @@
                 <a:cs typeface="+mj-cs"/>
                 <a:sym typeface="Arial" charset="0"/>
               </a:rPr>
-              <a:t>S</a:t>
-            </a:r>
-            <a:r>
-              <a:rPr lang="en-US" sz="5400" b="1" kern="0" dirty="0" smtClean="0">
-                <a:solidFill>
-                  <a:srgbClr val="00CC66"/>
-                </a:solidFill>
-                <a:latin typeface="Lucida Handwriting" pitchFamily="66" charset="0"/>
-                <a:ea typeface="+mj-ea"/>
-                <a:cs typeface="+mj-cs"/>
-                <a:sym typeface="Arial" charset="0"/>
-              </a:rPr>
-              <a:t>pecification</a:t>
-            </a:r>
-            <a:endParaRPr kumimoji="0" lang="en-US" sz="5000" b="1" i="0" u="none" strike="noStrike" kern="0" cap="none" spc="0" normalizeH="0" baseline="0" noProof="0" dirty="0">
+              <a:t>Specification</a:t>
+            </a:r>
+            <a:endParaRPr kumimoji="0" lang="en-US" sz="4800" b="1" i="0" u="none" strike="noStrike" kern="0" cap="none" spc="0" normalizeH="0" baseline="0" noProof="0" dirty="0">
               <a:ln>
                 <a:noFill/>
               </a:ln>
@@ -6804,7 +7167,7 @@
         </p:blipFill>
         <p:spPr bwMode="auto">
           <a:xfrm>
-            <a:off x="4597400" y="3200400"/>
+            <a:off x="4597400" y="2667000"/>
             <a:ext cx="2362200" cy="2362202"/>
           </a:xfrm>
           <a:prstGeom prst="rect">
@@ -7160,6 +7523,43 @@
               <a:cs typeface="+mj-cs"/>
               <a:sym typeface="Arial" charset="0"/>
             </a:endParaRPr>
+          </a:p>
+        </p:txBody>
+      </p:sp>
+      <p:sp>
+        <p:nvSpPr>
+          <p:cNvPr id="27" name="Rectangle 26"/>
+          <p:cNvSpPr/>
+          <p:nvPr/>
+        </p:nvSpPr>
+        <p:spPr>
+          <a:xfrm>
+            <a:off x="3911600" y="4724400"/>
+            <a:ext cx="3639138" cy="923330"/>
+          </a:xfrm>
+          <a:prstGeom prst="rect">
+            <a:avLst/>
+          </a:prstGeom>
+        </p:spPr>
+        <p:txBody>
+          <a:bodyPr wrap="none">
+            <a:spAutoFit/>
+          </a:bodyPr>
+          <a:lstStyle/>
+          <a:p>
+            <a:pPr algn="ctr"/>
+            <a:r>
+              <a:rPr lang="en-US" sz="5400" b="1" kern="0" dirty="0" err="1" smtClean="0">
+                <a:solidFill>
+                  <a:srgbClr val="0C0F20"/>
+                </a:solidFill>
+                <a:latin typeface="Lucida Handwriting" pitchFamily="66" charset="0"/>
+                <a:cs typeface="+mj-cs"/>
+                <a:sym typeface="Arial" charset="0"/>
+              </a:rPr>
+              <a:t>organise</a:t>
+            </a:r>
+            <a:endParaRPr lang="en-US" dirty="0"/>
           </a:p>
         </p:txBody>
       </p:sp>
@@ -7944,8 +8344,8 @@
         </p:nvSpPr>
         <p:spPr bwMode="auto">
           <a:xfrm>
-            <a:off x="7416800" y="6477000"/>
-            <a:ext cx="5410200" cy="914400"/>
+            <a:off x="8178800" y="6858000"/>
+            <a:ext cx="4038600" cy="914400"/>
           </a:xfrm>
           <a:prstGeom prst="rect">
             <a:avLst/>
@@ -8014,426 +8414,6 @@
           </a:p>
         </p:txBody>
       </p:sp>
-      <p:sp>
-        <p:nvSpPr>
-          <p:cNvPr id="17" name="Rectangle 1"/>
-          <p:cNvSpPr txBox="1">
-            <a:spLocks noChangeArrowheads="1"/>
-          </p:cNvSpPr>
-          <p:nvPr/>
-        </p:nvSpPr>
-        <p:spPr bwMode="auto">
-          <a:xfrm>
-            <a:off x="939800" y="1752600"/>
-            <a:ext cx="1676400" cy="685800"/>
-          </a:xfrm>
-          <a:prstGeom prst="rect">
-            <a:avLst/>
-          </a:prstGeom>
-          <a:noFill/>
-          <a:ln w="12700">
-            <a:noFill/>
-            <a:miter lim="800000"/>
-            <a:headEnd/>
-            <a:tailEnd/>
-          </a:ln>
-          <a:effectLst/>
-        </p:spPr>
-        <p:txBody>
-          <a:bodyPr vert="horz" wrap="square" lIns="50800" tIns="50800" rIns="50800" bIns="50800" numCol="1" anchor="ctr" anchorCtr="0" compatLnSpc="1">
-            <a:prstTxWarp prst="textNoShape">
-              <a:avLst/>
-            </a:prstTxWarp>
-          </a:bodyPr>
-          <a:lstStyle/>
-          <a:p>
-            <a:pPr lvl="0"/>
-            <a:r>
-              <a:rPr kumimoji="0" lang="en-US" sz="2800" b="1" i="0" u="none" strike="noStrike" kern="0" cap="none" spc="0" normalizeH="0" baseline="0" noProof="0" dirty="0" smtClean="0">
-                <a:ln>
-                  <a:noFill/>
-                </a:ln>
-                <a:solidFill>
-                  <a:srgbClr val="FF0000"/>
-                </a:solidFill>
-                <a:effectLst/>
-                <a:uLnTx/>
-                <a:uFillTx/>
-                <a:latin typeface="Candara" pitchFamily="34" charset="0"/>
-                <a:ea typeface="+mj-ea"/>
-                <a:cs typeface="+mj-cs"/>
-                <a:sym typeface="Arial" charset="0"/>
-              </a:rPr>
-              <a:t>repetition</a:t>
-            </a:r>
-            <a:endParaRPr kumimoji="0" lang="en-US" sz="2800" b="1" i="0" u="none" strike="noStrike" kern="0" cap="none" spc="0" normalizeH="0" baseline="0" noProof="0" dirty="0">
-              <a:ln>
-                <a:noFill/>
-              </a:ln>
-              <a:solidFill>
-                <a:srgbClr val="E75145"/>
-              </a:solidFill>
-              <a:effectLst/>
-              <a:uLnTx/>
-              <a:uFillTx/>
-              <a:latin typeface="Candara" pitchFamily="34" charset="0"/>
-              <a:ea typeface="+mj-ea"/>
-              <a:cs typeface="+mj-cs"/>
-              <a:sym typeface="Arial" charset="0"/>
-            </a:endParaRPr>
-          </a:p>
-        </p:txBody>
-      </p:sp>
-      <p:sp>
-        <p:nvSpPr>
-          <p:cNvPr id="22" name="Rectangle 1"/>
-          <p:cNvSpPr txBox="1">
-            <a:spLocks noChangeArrowheads="1"/>
-          </p:cNvSpPr>
-          <p:nvPr/>
-        </p:nvSpPr>
-        <p:spPr bwMode="auto">
-          <a:xfrm>
-            <a:off x="1092200" y="2057400"/>
-            <a:ext cx="1676400" cy="685800"/>
-          </a:xfrm>
-          <a:prstGeom prst="rect">
-            <a:avLst/>
-          </a:prstGeom>
-          <a:noFill/>
-          <a:ln w="12700">
-            <a:noFill/>
-            <a:miter lim="800000"/>
-            <a:headEnd/>
-            <a:tailEnd/>
-          </a:ln>
-          <a:effectLst/>
-        </p:spPr>
-        <p:txBody>
-          <a:bodyPr vert="horz" wrap="square" lIns="50800" tIns="50800" rIns="50800" bIns="50800" numCol="1" anchor="ctr" anchorCtr="0" compatLnSpc="1">
-            <a:prstTxWarp prst="textNoShape">
-              <a:avLst/>
-            </a:prstTxWarp>
-          </a:bodyPr>
-          <a:lstStyle/>
-          <a:p>
-            <a:pPr lvl="0"/>
-            <a:r>
-              <a:rPr kumimoji="0" lang="en-US" sz="2800" b="1" i="0" u="none" strike="noStrike" kern="0" cap="none" spc="0" normalizeH="0" baseline="0" noProof="0" dirty="0" smtClean="0">
-                <a:ln>
-                  <a:noFill/>
-                </a:ln>
-                <a:solidFill>
-                  <a:srgbClr val="FF0000"/>
-                </a:solidFill>
-                <a:effectLst/>
-                <a:uLnTx/>
-                <a:uFillTx/>
-                <a:latin typeface="Candara" pitchFamily="34" charset="0"/>
-                <a:ea typeface="+mj-ea"/>
-                <a:cs typeface="+mj-cs"/>
-                <a:sym typeface="Arial" charset="0"/>
-              </a:rPr>
-              <a:t>repetition</a:t>
-            </a:r>
-            <a:endParaRPr kumimoji="0" lang="en-US" sz="2800" b="1" i="0" u="none" strike="noStrike" kern="0" cap="none" spc="0" normalizeH="0" baseline="0" noProof="0" dirty="0">
-              <a:ln>
-                <a:noFill/>
-              </a:ln>
-              <a:solidFill>
-                <a:srgbClr val="E75145"/>
-              </a:solidFill>
-              <a:effectLst/>
-              <a:uLnTx/>
-              <a:uFillTx/>
-              <a:latin typeface="Candara" pitchFamily="34" charset="0"/>
-              <a:ea typeface="+mj-ea"/>
-              <a:cs typeface="+mj-cs"/>
-              <a:sym typeface="Arial" charset="0"/>
-            </a:endParaRPr>
-          </a:p>
-        </p:txBody>
-      </p:sp>
-      <p:sp>
-        <p:nvSpPr>
-          <p:cNvPr id="23" name="Rectangle 1"/>
-          <p:cNvSpPr txBox="1">
-            <a:spLocks noChangeArrowheads="1"/>
-          </p:cNvSpPr>
-          <p:nvPr/>
-        </p:nvSpPr>
-        <p:spPr bwMode="auto">
-          <a:xfrm>
-            <a:off x="1244600" y="1447800"/>
-            <a:ext cx="1676400" cy="685800"/>
-          </a:xfrm>
-          <a:prstGeom prst="rect">
-            <a:avLst/>
-          </a:prstGeom>
-          <a:noFill/>
-          <a:ln w="12700">
-            <a:noFill/>
-            <a:miter lim="800000"/>
-            <a:headEnd/>
-            <a:tailEnd/>
-          </a:ln>
-          <a:effectLst/>
-        </p:spPr>
-        <p:txBody>
-          <a:bodyPr vert="horz" wrap="square" lIns="50800" tIns="50800" rIns="50800" bIns="50800" numCol="1" anchor="ctr" anchorCtr="0" compatLnSpc="1">
-            <a:prstTxWarp prst="textNoShape">
-              <a:avLst/>
-            </a:prstTxWarp>
-          </a:bodyPr>
-          <a:lstStyle/>
-          <a:p>
-            <a:pPr lvl="0"/>
-            <a:r>
-              <a:rPr kumimoji="0" lang="en-US" sz="2800" b="1" i="0" u="none" strike="noStrike" kern="0" cap="none" spc="0" normalizeH="0" baseline="0" noProof="0" dirty="0" smtClean="0">
-                <a:ln>
-                  <a:noFill/>
-                </a:ln>
-                <a:solidFill>
-                  <a:srgbClr val="FF0000"/>
-                </a:solidFill>
-                <a:effectLst/>
-                <a:uLnTx/>
-                <a:uFillTx/>
-                <a:latin typeface="Candara" pitchFamily="34" charset="0"/>
-                <a:ea typeface="+mj-ea"/>
-                <a:cs typeface="+mj-cs"/>
-                <a:sym typeface="Arial" charset="0"/>
-              </a:rPr>
-              <a:t>repetition</a:t>
-            </a:r>
-            <a:endParaRPr kumimoji="0" lang="en-US" sz="2800" b="1" i="0" u="none" strike="noStrike" kern="0" cap="none" spc="0" normalizeH="0" baseline="0" noProof="0" dirty="0">
-              <a:ln>
-                <a:noFill/>
-              </a:ln>
-              <a:solidFill>
-                <a:srgbClr val="E75145"/>
-              </a:solidFill>
-              <a:effectLst/>
-              <a:uLnTx/>
-              <a:uFillTx/>
-              <a:latin typeface="Candara" pitchFamily="34" charset="0"/>
-              <a:ea typeface="+mj-ea"/>
-              <a:cs typeface="+mj-cs"/>
-              <a:sym typeface="Arial" charset="0"/>
-            </a:endParaRPr>
-          </a:p>
-        </p:txBody>
-      </p:sp>
-      <p:sp>
-        <p:nvSpPr>
-          <p:cNvPr id="24" name="Rectangle 1"/>
-          <p:cNvSpPr txBox="1">
-            <a:spLocks noChangeArrowheads="1"/>
-          </p:cNvSpPr>
-          <p:nvPr/>
-        </p:nvSpPr>
-        <p:spPr bwMode="auto">
-          <a:xfrm>
-            <a:off x="1397000" y="2286000"/>
-            <a:ext cx="1676400" cy="685800"/>
-          </a:xfrm>
-          <a:prstGeom prst="rect">
-            <a:avLst/>
-          </a:prstGeom>
-          <a:noFill/>
-          <a:ln w="12700">
-            <a:noFill/>
-            <a:miter lim="800000"/>
-            <a:headEnd/>
-            <a:tailEnd/>
-          </a:ln>
-          <a:effectLst/>
-        </p:spPr>
-        <p:txBody>
-          <a:bodyPr vert="horz" wrap="square" lIns="50800" tIns="50800" rIns="50800" bIns="50800" numCol="1" anchor="ctr" anchorCtr="0" compatLnSpc="1">
-            <a:prstTxWarp prst="textNoShape">
-              <a:avLst/>
-            </a:prstTxWarp>
-          </a:bodyPr>
-          <a:lstStyle/>
-          <a:p>
-            <a:pPr lvl="0"/>
-            <a:r>
-              <a:rPr kumimoji="0" lang="en-US" sz="2800" b="1" i="0" u="none" strike="noStrike" kern="0" cap="none" spc="0" normalizeH="0" baseline="0" noProof="0" dirty="0" smtClean="0">
-                <a:ln>
-                  <a:noFill/>
-                </a:ln>
-                <a:solidFill>
-                  <a:srgbClr val="FF0000"/>
-                </a:solidFill>
-                <a:effectLst/>
-                <a:uLnTx/>
-                <a:uFillTx/>
-                <a:latin typeface="Candara" pitchFamily="34" charset="0"/>
-                <a:ea typeface="+mj-ea"/>
-                <a:cs typeface="+mj-cs"/>
-                <a:sym typeface="Arial" charset="0"/>
-              </a:rPr>
-              <a:t>repetition</a:t>
-            </a:r>
-            <a:endParaRPr kumimoji="0" lang="en-US" sz="2800" b="1" i="0" u="none" strike="noStrike" kern="0" cap="none" spc="0" normalizeH="0" baseline="0" noProof="0" dirty="0">
-              <a:ln>
-                <a:noFill/>
-              </a:ln>
-              <a:solidFill>
-                <a:srgbClr val="E75145"/>
-              </a:solidFill>
-              <a:effectLst/>
-              <a:uLnTx/>
-              <a:uFillTx/>
-              <a:latin typeface="Candara" pitchFamily="34" charset="0"/>
-              <a:ea typeface="+mj-ea"/>
-              <a:cs typeface="+mj-cs"/>
-              <a:sym typeface="Arial" charset="0"/>
-            </a:endParaRPr>
-          </a:p>
-        </p:txBody>
-      </p:sp>
-      <p:sp>
-        <p:nvSpPr>
-          <p:cNvPr id="25" name="Rectangle 1"/>
-          <p:cNvSpPr txBox="1">
-            <a:spLocks noChangeArrowheads="1"/>
-          </p:cNvSpPr>
-          <p:nvPr/>
-        </p:nvSpPr>
-        <p:spPr bwMode="auto">
-          <a:xfrm>
-            <a:off x="787400" y="2590800"/>
-            <a:ext cx="1676400" cy="685800"/>
-          </a:xfrm>
-          <a:prstGeom prst="rect">
-            <a:avLst/>
-          </a:prstGeom>
-          <a:noFill/>
-          <a:ln w="12700">
-            <a:noFill/>
-            <a:miter lim="800000"/>
-            <a:headEnd/>
-            <a:tailEnd/>
-          </a:ln>
-          <a:effectLst/>
-        </p:spPr>
-        <p:txBody>
-          <a:bodyPr vert="horz" wrap="square" lIns="50800" tIns="50800" rIns="50800" bIns="50800" numCol="1" anchor="ctr" anchorCtr="0" compatLnSpc="1">
-            <a:prstTxWarp prst="textNoShape">
-              <a:avLst/>
-            </a:prstTxWarp>
-          </a:bodyPr>
-          <a:lstStyle/>
-          <a:p>
-            <a:pPr lvl="0"/>
-            <a:r>
-              <a:rPr kumimoji="0" lang="en-US" sz="2800" b="1" i="0" u="none" strike="noStrike" kern="0" cap="none" spc="0" normalizeH="0" baseline="0" noProof="0" dirty="0" smtClean="0">
-                <a:ln>
-                  <a:noFill/>
-                </a:ln>
-                <a:solidFill>
-                  <a:srgbClr val="FF0000"/>
-                </a:solidFill>
-                <a:effectLst/>
-                <a:uLnTx/>
-                <a:uFillTx/>
-                <a:latin typeface="Candara" pitchFamily="34" charset="0"/>
-                <a:ea typeface="+mj-ea"/>
-                <a:cs typeface="+mj-cs"/>
-                <a:sym typeface="Arial" charset="0"/>
-              </a:rPr>
-              <a:t>repetition</a:t>
-            </a:r>
-            <a:endParaRPr kumimoji="0" lang="en-US" sz="2800" b="1" i="0" u="none" strike="noStrike" kern="0" cap="none" spc="0" normalizeH="0" baseline="0" noProof="0" dirty="0">
-              <a:ln>
-                <a:noFill/>
-              </a:ln>
-              <a:solidFill>
-                <a:srgbClr val="E75145"/>
-              </a:solidFill>
-              <a:effectLst/>
-              <a:uLnTx/>
-              <a:uFillTx/>
-              <a:latin typeface="Candara" pitchFamily="34" charset="0"/>
-              <a:ea typeface="+mj-ea"/>
-              <a:cs typeface="+mj-cs"/>
-              <a:sym typeface="Arial" charset="0"/>
-            </a:endParaRPr>
-          </a:p>
-        </p:txBody>
-      </p:sp>
-      <p:sp>
-        <p:nvSpPr>
-          <p:cNvPr id="26" name="Rectangle 1"/>
-          <p:cNvSpPr txBox="1">
-            <a:spLocks noChangeArrowheads="1"/>
-          </p:cNvSpPr>
-          <p:nvPr/>
-        </p:nvSpPr>
-        <p:spPr bwMode="auto">
-          <a:xfrm>
-            <a:off x="635000" y="1219200"/>
-            <a:ext cx="1676400" cy="685800"/>
-          </a:xfrm>
-          <a:prstGeom prst="rect">
-            <a:avLst/>
-          </a:prstGeom>
-          <a:noFill/>
-          <a:ln w="12700">
-            <a:noFill/>
-            <a:miter lim="800000"/>
-            <a:headEnd/>
-            <a:tailEnd/>
-          </a:ln>
-          <a:effectLst/>
-        </p:spPr>
-        <p:txBody>
-          <a:bodyPr vert="horz" wrap="square" lIns="50800" tIns="50800" rIns="50800" bIns="50800" numCol="1" anchor="ctr" anchorCtr="0" compatLnSpc="1">
-            <a:prstTxWarp prst="textNoShape">
-              <a:avLst/>
-            </a:prstTxWarp>
-          </a:bodyPr>
-          <a:lstStyle/>
-          <a:p>
-            <a:pPr lvl="0"/>
-            <a:r>
-              <a:rPr kumimoji="0" lang="en-US" sz="2800" b="1" i="0" u="none" strike="noStrike" kern="0" cap="none" spc="0" normalizeH="0" baseline="0" noProof="0" dirty="0" smtClean="0">
-                <a:ln>
-                  <a:noFill/>
-                </a:ln>
-                <a:solidFill>
-                  <a:srgbClr val="FF0000"/>
-                </a:solidFill>
-                <a:effectLst/>
-                <a:uLnTx/>
-                <a:uFillTx/>
-                <a:latin typeface="Candara" pitchFamily="34" charset="0"/>
-                <a:ea typeface="+mj-ea"/>
-                <a:cs typeface="+mj-cs"/>
-                <a:sym typeface="Arial" charset="0"/>
-              </a:rPr>
-              <a:t>repetition</a:t>
-            </a:r>
-            <a:endParaRPr kumimoji="0" lang="en-US" sz="2800" b="1" i="0" u="none" strike="noStrike" kern="0" cap="none" spc="0" normalizeH="0" baseline="0" noProof="0" dirty="0">
-              <a:ln>
-                <a:noFill/>
-              </a:ln>
-              <a:solidFill>
-                <a:srgbClr val="E75145"/>
-              </a:solidFill>
-              <a:effectLst/>
-              <a:uLnTx/>
-              <a:uFillTx/>
-              <a:latin typeface="Candara" pitchFamily="34" charset="0"/>
-              <a:ea typeface="+mj-ea"/>
-              <a:cs typeface="+mj-cs"/>
-              <a:sym typeface="Arial" charset="0"/>
-            </a:endParaRPr>
-          </a:p>
-        </p:txBody>
-      </p:sp>
       <p:pic>
         <p:nvPicPr>
           <p:cNvPr id="58370" name="Picture 2" descr="application, code, html, xml icon"/>
@@ -8444,6 +8424,32 @@
         </p:nvPicPr>
         <p:blipFill>
           <a:blip r:embed="rId4"/>
+          <a:srcRect l="17647" t="35294" r="17647" b="35294"/>
+          <a:stretch>
+            <a:fillRect/>
+          </a:stretch>
+        </p:blipFill>
+        <p:spPr bwMode="auto">
+          <a:xfrm>
+            <a:off x="558800" y="1447800"/>
+            <a:ext cx="1676400" cy="762000"/>
+          </a:xfrm>
+          <a:prstGeom prst="rect">
+            <a:avLst/>
+          </a:prstGeom>
+          <a:noFill/>
+        </p:spPr>
+      </p:pic>
+      <p:pic>
+        <p:nvPicPr>
+          <p:cNvPr id="58373" name="Picture 5" descr="microscope icon"/>
+          <p:cNvPicPr>
+            <a:picLocks noChangeAspect="1" noChangeArrowheads="1"/>
+          </p:cNvPicPr>
+          <p:nvPr/>
+        </p:nvPicPr>
+        <p:blipFill>
+          <a:blip r:embed="rId5"/>
           <a:srcRect/>
           <a:stretch>
             <a:fillRect/>
@@ -8451,8 +8457,8 @@
         </p:blipFill>
         <p:spPr bwMode="auto">
           <a:xfrm>
-            <a:off x="4902200" y="3124200"/>
-            <a:ext cx="2590800" cy="2590802"/>
+            <a:off x="4902200" y="2743200"/>
+            <a:ext cx="2743200" cy="2743202"/>
           </a:xfrm>
           <a:prstGeom prst="rect">
             <a:avLst/>
@@ -8460,6 +8466,95 @@
           <a:noFill/>
         </p:spPr>
       </p:pic>
+      <p:pic>
+        <p:nvPicPr>
+          <p:cNvPr id="15" name="Picture 2" descr="application, code, html, xml icon"/>
+          <p:cNvPicPr>
+            <a:picLocks noChangeAspect="1" noChangeArrowheads="1"/>
+          </p:cNvPicPr>
+          <p:nvPr/>
+        </p:nvPicPr>
+        <p:blipFill>
+          <a:blip r:embed="rId4"/>
+          <a:srcRect l="17647" t="35294" r="17647" b="35294"/>
+          <a:stretch>
+            <a:fillRect/>
+          </a:stretch>
+        </p:blipFill>
+        <p:spPr bwMode="auto">
+          <a:xfrm>
+            <a:off x="863600" y="2362200"/>
+            <a:ext cx="1676400" cy="762000"/>
+          </a:xfrm>
+          <a:prstGeom prst="rect">
+            <a:avLst/>
+          </a:prstGeom>
+          <a:noFill/>
+        </p:spPr>
+      </p:pic>
+      <p:pic>
+        <p:nvPicPr>
+          <p:cNvPr id="16" name="Picture 2" descr="application, code, html, xml icon"/>
+          <p:cNvPicPr>
+            <a:picLocks noChangeAspect="1" noChangeArrowheads="1"/>
+          </p:cNvPicPr>
+          <p:nvPr/>
+        </p:nvPicPr>
+        <p:blipFill>
+          <a:blip r:embed="rId4"/>
+          <a:srcRect l="17647" t="35294" r="17647" b="35294"/>
+          <a:stretch>
+            <a:fillRect/>
+          </a:stretch>
+        </p:blipFill>
+        <p:spPr bwMode="auto">
+          <a:xfrm>
+            <a:off x="2235200" y="1828800"/>
+            <a:ext cx="1676400" cy="762000"/>
+          </a:xfrm>
+          <a:prstGeom prst="rect">
+            <a:avLst/>
+          </a:prstGeom>
+          <a:noFill/>
+        </p:spPr>
+      </p:pic>
+      <p:sp>
+        <p:nvSpPr>
+          <p:cNvPr id="18" name="Rectangle 17"/>
+          <p:cNvSpPr/>
+          <p:nvPr/>
+        </p:nvSpPr>
+        <p:spPr>
+          <a:xfrm>
+            <a:off x="4276141" y="5257800"/>
+            <a:ext cx="4131259" cy="923330"/>
+          </a:xfrm>
+          <a:prstGeom prst="rect">
+            <a:avLst/>
+          </a:prstGeom>
+        </p:spPr>
+        <p:txBody>
+          <a:bodyPr wrap="none">
+            <a:spAutoFit/>
+          </a:bodyPr>
+          <a:lstStyle/>
+          <a:p>
+            <a:pPr algn="ctr"/>
+            <a:r>
+              <a:rPr lang="en-US" sz="5400" b="1" kern="0" dirty="0" smtClean="0">
+                <a:solidFill>
+                  <a:srgbClr val="0C0F20"/>
+                </a:solidFill>
+                <a:latin typeface="Lucida Handwriting" pitchFamily="66" charset="0"/>
+                <a:cs typeface="+mj-cs"/>
+                <a:sym typeface="Arial" charset="0"/>
+              </a:rPr>
+              <a:t>Be specific</a:t>
+            </a:r>
+            <a:endParaRPr lang="en-US" dirty="0"/>
+          </a:p>
+        </p:txBody>
+      </p:sp>
     </p:spTree>
   </p:cSld>
   <p:clrMapOvr>
@@ -9111,344 +9206,173 @@
       </p:pic>
       <p:sp>
         <p:nvSpPr>
-          <p:cNvPr id="6" name="Rectangle 5"/>
-          <p:cNvSpPr/>
+          <p:cNvPr id="8" name="Rectangle 1"/>
+          <p:cNvSpPr txBox="1">
+            <a:spLocks noChangeArrowheads="1"/>
+          </p:cNvSpPr>
           <p:nvPr/>
         </p:nvSpPr>
-        <p:spPr>
+        <p:spPr bwMode="auto">
           <a:xfrm>
-            <a:off x="330200" y="1143000"/>
-            <a:ext cx="12344400" cy="7109639"/>
+            <a:off x="8178800" y="6858000"/>
+            <a:ext cx="4038600" cy="914400"/>
           </a:xfrm>
           <a:prstGeom prst="rect">
             <a:avLst/>
           </a:prstGeom>
-          <a:ln>
-            <a:solidFill>
-              <a:schemeClr val="tx1"/>
-            </a:solidFill>
-            <a:prstDash val="dash"/>
+          <a:noFill/>
+          <a:ln w="12700">
+            <a:noFill/>
+            <a:miter lim="800000"/>
+            <a:headEnd/>
+            <a:tailEnd/>
           </a:ln>
+          <a:effectLst/>
         </p:spPr>
         <p:txBody>
-          <a:bodyPr wrap="square">
+          <a:bodyPr vert="horz" wrap="square" lIns="50800" tIns="50800" rIns="50800" bIns="50800" numCol="1" anchor="ctr" anchorCtr="0" compatLnSpc="1">
+            <a:prstTxWarp prst="textNoShape">
+              <a:avLst/>
+            </a:prstTxWarp>
+          </a:bodyPr>
+          <a:lstStyle/>
+          <a:p>
+            <a:pPr marL="0" marR="0" lvl="0" indent="0" defTabSz="914400" rtl="0" eaLnBrk="1" fontAlgn="base" latinLnBrk="0" hangingPunct="1">
+              <a:lnSpc>
+                <a:spcPct val="100000"/>
+              </a:lnSpc>
+              <a:spcBef>
+                <a:spcPct val="0"/>
+              </a:spcBef>
+              <a:spcAft>
+                <a:spcPct val="0"/>
+              </a:spcAft>
+              <a:buClrTx/>
+              <a:buSzTx/>
+              <a:buFontTx/>
+              <a:buNone/>
+              <a:tabLst/>
+              <a:defRPr/>
+            </a:pPr>
+            <a:r>
+              <a:rPr lang="en-US" sz="5400" b="1" kern="0" dirty="0" smtClean="0">
+                <a:solidFill>
+                  <a:srgbClr val="00CC66"/>
+                </a:solidFill>
+                <a:latin typeface="Lucida Handwriting" pitchFamily="66" charset="0"/>
+                <a:ea typeface="+mj-ea"/>
+                <a:cs typeface="+mj-cs"/>
+                <a:sym typeface="Arial" charset="0"/>
+              </a:rPr>
+              <a:t>Properties</a:t>
+            </a:r>
+            <a:endParaRPr kumimoji="0" lang="en-US" sz="5000" b="1" i="0" u="none" strike="noStrike" kern="0" cap="none" spc="0" normalizeH="0" baseline="0" noProof="0" dirty="0">
+              <a:ln>
+                <a:noFill/>
+              </a:ln>
+              <a:solidFill>
+                <a:srgbClr val="00CC66"/>
+              </a:solidFill>
+              <a:effectLst/>
+              <a:uLnTx/>
+              <a:uFillTx/>
+              <a:latin typeface="+mj-lt"/>
+              <a:ea typeface="+mj-ea"/>
+              <a:cs typeface="+mj-cs"/>
+              <a:sym typeface="Arial" charset="0"/>
+            </a:endParaRPr>
+          </a:p>
+        </p:txBody>
+      </p:sp>
+      <p:sp>
+        <p:nvSpPr>
+          <p:cNvPr id="18" name="Rectangle 17"/>
+          <p:cNvSpPr/>
+          <p:nvPr/>
+        </p:nvSpPr>
+        <p:spPr>
+          <a:xfrm>
+            <a:off x="3606800" y="5257800"/>
+            <a:ext cx="5514650" cy="923330"/>
+          </a:xfrm>
+          <a:prstGeom prst="rect">
+            <a:avLst/>
+          </a:prstGeom>
+        </p:spPr>
+        <p:txBody>
+          <a:bodyPr wrap="none">
             <a:spAutoFit/>
           </a:bodyPr>
           <a:lstStyle/>
           <a:p>
-            <a:r>
-              <a:rPr lang="en-US" sz="2400" b="1" dirty="0" smtClean="0">
+            <a:pPr algn="ctr"/>
+            <a:r>
+              <a:rPr lang="en-US" sz="5400" b="1" kern="0" dirty="0" smtClean="0">
                 <a:solidFill>
-                  <a:srgbClr val="7F0055"/>
+                  <a:srgbClr val="0C0F20"/>
                 </a:solidFill>
-                <a:latin typeface="Courier New"/>
-              </a:rPr>
-              <a:t>class</a:t>
-            </a:r>
-            <a:r>
-              <a:rPr lang="en-US" sz="2400" b="1" dirty="0" smtClean="0">
-                <a:latin typeface="Courier New"/>
-              </a:rPr>
-              <a:t> Reverser3Spec </a:t>
-            </a:r>
-            <a:r>
-              <a:rPr lang="en-US" sz="2400" b="1" dirty="0" smtClean="0">
-                <a:solidFill>
-                  <a:srgbClr val="7F0055"/>
-                </a:solidFill>
-                <a:latin typeface="Courier New"/>
-              </a:rPr>
-              <a:t>extends</a:t>
-            </a:r>
-            <a:r>
-              <a:rPr lang="en-US" sz="2400" b="1" dirty="0" smtClean="0">
-                <a:latin typeface="Courier New"/>
-              </a:rPr>
-              <a:t> </a:t>
-            </a:r>
-            <a:r>
-              <a:rPr lang="en-US" sz="2400" b="1" dirty="0" err="1" smtClean="0">
-                <a:latin typeface="Courier New"/>
-              </a:rPr>
-              <a:t>SpecificationWithJUnit</a:t>
-            </a:r>
-            <a:r>
-              <a:rPr lang="en-US" sz="2400" b="1" dirty="0" smtClean="0">
-                <a:latin typeface="Courier New"/>
-              </a:rPr>
-              <a:t> </a:t>
-            </a:r>
-          </a:p>
-          <a:p>
-            <a:r>
-              <a:rPr lang="en-US" sz="2400" b="1" dirty="0" smtClean="0">
-                <a:solidFill>
-                  <a:srgbClr val="7F0055"/>
-                </a:solidFill>
-                <a:latin typeface="Courier New"/>
-              </a:rPr>
-              <a:t>                            with</a:t>
-            </a:r>
-            <a:r>
-              <a:rPr lang="en-US" sz="2400" b="1" dirty="0" smtClean="0">
-                <a:latin typeface="Courier New"/>
-              </a:rPr>
-              <a:t> </a:t>
-            </a:r>
-            <a:r>
-              <a:rPr lang="en-US" sz="2400" b="1" dirty="0" err="1" smtClean="0">
-                <a:latin typeface="Courier New"/>
-              </a:rPr>
-              <a:t>ScalaCheck</a:t>
-            </a:r>
-            <a:r>
-              <a:rPr lang="en-US" sz="2400" b="1" dirty="0" smtClean="0">
-                <a:latin typeface="Courier New"/>
-              </a:rPr>
-              <a:t> {</a:t>
-            </a:r>
-          </a:p>
-          <a:p>
-            <a:endParaRPr lang="en-US" sz="2400" dirty="0" smtClean="0">
-              <a:solidFill>
-                <a:srgbClr val="2A00FF"/>
-              </a:solidFill>
-              <a:latin typeface="Courier New"/>
-            </a:endParaRPr>
-          </a:p>
-          <a:p>
-            <a:r>
-              <a:rPr lang="en-US" sz="2400" dirty="0" smtClean="0">
-                <a:solidFill>
-                  <a:srgbClr val="2A00FF"/>
-                </a:solidFill>
-                <a:latin typeface="Courier New"/>
-              </a:rPr>
-              <a:t>  "reverse must preserve the length of a string"</a:t>
-            </a:r>
-            <a:r>
-              <a:rPr lang="en-US" sz="2400" dirty="0" smtClean="0">
-                <a:latin typeface="Courier New"/>
-              </a:rPr>
-              <a:t> verifies { </a:t>
-            </a:r>
-          </a:p>
-          <a:p>
-            <a:r>
-              <a:rPr lang="en-US" sz="2400" dirty="0" smtClean="0">
-                <a:latin typeface="Courier New"/>
-              </a:rPr>
-              <a:t>    s: String =&gt; reverse(s).size == </a:t>
-            </a:r>
-            <a:r>
-              <a:rPr lang="en-US" sz="2400" dirty="0" err="1" smtClean="0">
-                <a:latin typeface="Courier New"/>
-              </a:rPr>
-              <a:t>s.size</a:t>
-            </a:r>
-            <a:r>
-              <a:rPr lang="en-US" sz="2400" dirty="0" smtClean="0">
-                <a:latin typeface="Courier New"/>
-              </a:rPr>
-              <a:t> </a:t>
-            </a:r>
-          </a:p>
-          <a:p>
-            <a:r>
-              <a:rPr lang="en-US" sz="2400" dirty="0" smtClean="0">
-                <a:latin typeface="Courier New"/>
-              </a:rPr>
-              <a:t>  }</a:t>
-            </a:r>
-          </a:p>
-          <a:p>
-            <a:r>
-              <a:rPr lang="en-US" sz="2400" dirty="0" smtClean="0">
-                <a:solidFill>
-                  <a:srgbClr val="2A00FF"/>
-                </a:solidFill>
-                <a:latin typeface="Courier New"/>
-              </a:rPr>
-              <a:t>  "reverse applied twice must return the same string"</a:t>
-            </a:r>
-            <a:r>
-              <a:rPr lang="en-US" sz="2400" dirty="0" smtClean="0">
-                <a:latin typeface="Courier New"/>
-              </a:rPr>
-              <a:t> verifies {   </a:t>
-            </a:r>
-          </a:p>
-          <a:p>
-            <a:r>
-              <a:rPr lang="en-US" sz="2400" dirty="0" smtClean="0">
-                <a:latin typeface="Courier New"/>
-              </a:rPr>
-              <a:t>    s: String =&gt; reverse(reverse(s)) == s </a:t>
-            </a:r>
-          </a:p>
-          <a:p>
-            <a:r>
-              <a:rPr lang="en-US" sz="2400" dirty="0" smtClean="0">
-                <a:latin typeface="Courier New"/>
-              </a:rPr>
-              <a:t>  }</a:t>
-            </a:r>
-          </a:p>
-          <a:p>
-            <a:r>
-              <a:rPr lang="en-US" sz="2400" dirty="0" smtClean="0">
-                <a:solidFill>
-                  <a:srgbClr val="2A00FF"/>
-                </a:solidFill>
-                <a:latin typeface="Courier New"/>
-              </a:rPr>
-              <a:t>  "reverse 2 concatenated strings must return the reversed second </a:t>
-            </a:r>
-          </a:p>
-          <a:p>
-            <a:r>
-              <a:rPr lang="en-US" sz="2400" dirty="0" smtClean="0">
-                <a:solidFill>
-                  <a:srgbClr val="2A00FF"/>
-                </a:solidFill>
-                <a:latin typeface="Courier New"/>
-              </a:rPr>
-              <a:t>   string concatenated with the reversed first one"</a:t>
-            </a:r>
-            <a:r>
-              <a:rPr lang="en-US" sz="2400" dirty="0" smtClean="0">
-                <a:latin typeface="Courier New"/>
-              </a:rPr>
-              <a:t> verifies {</a:t>
-            </a:r>
-          </a:p>
-          <a:p>
-            <a:r>
-              <a:rPr lang="en-US" sz="2400" dirty="0" smtClean="0">
-                <a:latin typeface="Courier New"/>
-              </a:rPr>
-              <a:t>    (s1: String, s2: String) =&gt; reverse(s1 + s2) == </a:t>
-            </a:r>
-          </a:p>
-          <a:p>
-            <a:r>
-              <a:rPr lang="en-US" sz="2400" dirty="0" smtClean="0">
-                <a:latin typeface="Courier New"/>
-              </a:rPr>
-              <a:t>                                reverse(s2) + reverse(s1) </a:t>
-            </a:r>
-          </a:p>
-          <a:p>
-            <a:r>
-              <a:rPr lang="en-US" sz="2400" dirty="0" smtClean="0">
-                <a:latin typeface="Courier New"/>
-              </a:rPr>
-              <a:t>  }</a:t>
-            </a:r>
-          </a:p>
-          <a:p>
-            <a:r>
-              <a:rPr lang="en-US" sz="2400" dirty="0" smtClean="0">
-                <a:latin typeface="Courier New"/>
-              </a:rPr>
-              <a:t>  </a:t>
-            </a:r>
-            <a:r>
-              <a:rPr lang="en-US" sz="2400" b="1" dirty="0" smtClean="0">
-                <a:solidFill>
-                  <a:srgbClr val="7F0055"/>
-                </a:solidFill>
-                <a:latin typeface="Courier New"/>
-              </a:rPr>
-              <a:t>def</a:t>
-            </a:r>
-            <a:r>
-              <a:rPr lang="en-US" sz="2400" b="1" dirty="0" smtClean="0">
-                <a:latin typeface="Courier New"/>
-              </a:rPr>
-              <a:t> </a:t>
-            </a:r>
-            <a:r>
-              <a:rPr lang="en-US" sz="2400" dirty="0" smtClean="0">
-                <a:latin typeface="Courier New"/>
-              </a:rPr>
-              <a:t>center(s: String) = s(</a:t>
-            </a:r>
-            <a:r>
-              <a:rPr lang="en-US" sz="2400" dirty="0" err="1" smtClean="0">
-                <a:latin typeface="Courier New"/>
-              </a:rPr>
-              <a:t>s.size</a:t>
-            </a:r>
-            <a:r>
-              <a:rPr lang="en-US" sz="2400" dirty="0" smtClean="0">
-                <a:latin typeface="Courier New"/>
-              </a:rPr>
-              <a:t> / 2)</a:t>
-            </a:r>
-          </a:p>
-          <a:p>
-            <a:r>
-              <a:rPr lang="en-US" sz="2400" dirty="0" smtClean="0">
-                <a:solidFill>
-                  <a:srgbClr val="2A00FF"/>
-                </a:solidFill>
-                <a:latin typeface="Courier New"/>
-              </a:rPr>
-              <a:t>  "keep the same 'center' character - Woops!"</a:t>
-            </a:r>
-            <a:r>
-              <a:rPr lang="en-US" sz="2400" dirty="0" smtClean="0">
-                <a:latin typeface="Courier New"/>
-              </a:rPr>
-              <a:t> verifies { </a:t>
-            </a:r>
-          </a:p>
-          <a:p>
-            <a:r>
-              <a:rPr lang="en-US" sz="2400" dirty="0" smtClean="0">
-                <a:latin typeface="Courier New"/>
-              </a:rPr>
-              <a:t>    s: String =&gt; </a:t>
-            </a:r>
-            <a:r>
-              <a:rPr lang="en-US" sz="2400" dirty="0" err="1" smtClean="0">
-                <a:latin typeface="Courier New"/>
-              </a:rPr>
-              <a:t>s.isEmpty</a:t>
-            </a:r>
-            <a:r>
-              <a:rPr lang="en-US" sz="2400" dirty="0" smtClean="0">
-                <a:latin typeface="Courier New"/>
-              </a:rPr>
-              <a:t> || center(reverse(s)) == center(s) </a:t>
-            </a:r>
-          </a:p>
-          <a:p>
-            <a:r>
-              <a:rPr lang="en-US" sz="2400" dirty="0" smtClean="0">
-                <a:latin typeface="Courier New"/>
-              </a:rPr>
-              <a:t>  </a:t>
-            </a:r>
-            <a:r>
-              <a:rPr lang="en-US" sz="2400" dirty="0" smtClean="0">
-                <a:latin typeface="Courier New"/>
-              </a:rPr>
-              <a:t>}</a:t>
-            </a:r>
-          </a:p>
-          <a:p>
-            <a:r>
-              <a:rPr lang="en-US" sz="2400" dirty="0" smtClean="0">
-                <a:latin typeface="Courier New"/>
-              </a:rPr>
-              <a:t>}</a:t>
-            </a:r>
-            <a:endParaRPr lang="en-US" sz="2400" dirty="0"/>
+                <a:latin typeface="Lucida Handwriting" pitchFamily="66" charset="0"/>
+                <a:cs typeface="+mj-cs"/>
+                <a:sym typeface="Arial" charset="0"/>
+              </a:rPr>
+              <a:t>Be exhaustive</a:t>
+            </a:r>
+            <a:endParaRPr lang="en-US" dirty="0"/>
           </a:p>
         </p:txBody>
       </p:sp>
+      <p:pic>
+        <p:nvPicPr>
+          <p:cNvPr id="60418" name="Picture 2" descr="binary, tree icon"/>
+          <p:cNvPicPr>
+            <a:picLocks noChangeAspect="1" noChangeArrowheads="1"/>
+          </p:cNvPicPr>
+          <p:nvPr/>
+        </p:nvPicPr>
+        <p:blipFill>
+          <a:blip r:embed="rId4"/>
+          <a:srcRect/>
+          <a:stretch>
+            <a:fillRect/>
+          </a:stretch>
+        </p:blipFill>
+        <p:spPr bwMode="auto">
+          <a:xfrm>
+            <a:off x="558800" y="1219200"/>
+            <a:ext cx="2438400" cy="2438402"/>
+          </a:xfrm>
+          <a:prstGeom prst="rect">
+            <a:avLst/>
+          </a:prstGeom>
+          <a:noFill/>
+        </p:spPr>
+      </p:pic>
+      <p:pic>
+        <p:nvPicPr>
+          <p:cNvPr id="60428" name="Picture 12" descr="http://cdn.iconfinder.net/data/icons/humano2/128x128/apps/stock_task.png"/>
+          <p:cNvPicPr>
+            <a:picLocks noChangeAspect="1" noChangeArrowheads="1"/>
+          </p:cNvPicPr>
+          <p:nvPr/>
+        </p:nvPicPr>
+        <p:blipFill>
+          <a:blip r:embed="rId5"/>
+          <a:srcRect/>
+          <a:stretch>
+            <a:fillRect/>
+          </a:stretch>
+        </p:blipFill>
+        <p:spPr bwMode="auto">
+          <a:xfrm>
+            <a:off x="5054600" y="2895600"/>
+            <a:ext cx="2286000" cy="2286002"/>
+          </a:xfrm>
+          <a:prstGeom prst="rect">
+            <a:avLst/>
+          </a:prstGeom>
+          <a:noFill/>
+        </p:spPr>
+      </p:pic>
     </p:spTree>
   </p:cSld>
   <p:clrMapOvr>
@@ -9547,6 +9471,435 @@
         <p:spPr>
           <a:xfrm>
             <a:off x="330200" y="1143000"/>
+            <a:ext cx="12344400" cy="7109639"/>
+          </a:xfrm>
+          <a:prstGeom prst="rect">
+            <a:avLst/>
+          </a:prstGeom>
+          <a:ln>
+            <a:solidFill>
+              <a:schemeClr val="tx1"/>
+            </a:solidFill>
+            <a:prstDash val="dash"/>
+          </a:ln>
+        </p:spPr>
+        <p:txBody>
+          <a:bodyPr wrap="square">
+            <a:spAutoFit/>
+          </a:bodyPr>
+          <a:lstStyle/>
+          <a:p>
+            <a:r>
+              <a:rPr lang="en-US" sz="2400" b="1" dirty="0" smtClean="0">
+                <a:solidFill>
+                  <a:srgbClr val="7F0055"/>
+                </a:solidFill>
+                <a:latin typeface="Courier New"/>
+              </a:rPr>
+              <a:t>class</a:t>
+            </a:r>
+            <a:r>
+              <a:rPr lang="en-US" sz="2400" b="1" dirty="0" smtClean="0">
+                <a:latin typeface="Courier New"/>
+              </a:rPr>
+              <a:t> Reverser3Spec </a:t>
+            </a:r>
+            <a:r>
+              <a:rPr lang="en-US" sz="2400" b="1" dirty="0" smtClean="0">
+                <a:solidFill>
+                  <a:srgbClr val="7F0055"/>
+                </a:solidFill>
+                <a:latin typeface="Courier New"/>
+              </a:rPr>
+              <a:t>extends</a:t>
+            </a:r>
+            <a:r>
+              <a:rPr lang="en-US" sz="2400" b="1" dirty="0" smtClean="0">
+                <a:latin typeface="Courier New"/>
+              </a:rPr>
+              <a:t> </a:t>
+            </a:r>
+            <a:r>
+              <a:rPr lang="en-US" sz="2400" b="1" dirty="0" err="1" smtClean="0">
+                <a:latin typeface="Courier New"/>
+              </a:rPr>
+              <a:t>SpecificationWithJUnit</a:t>
+            </a:r>
+            <a:r>
+              <a:rPr lang="en-US" sz="2400" b="1" dirty="0" smtClean="0">
+                <a:latin typeface="Courier New"/>
+              </a:rPr>
+              <a:t> </a:t>
+            </a:r>
+          </a:p>
+          <a:p>
+            <a:r>
+              <a:rPr lang="en-US" sz="2400" b="1" dirty="0" smtClean="0">
+                <a:solidFill>
+                  <a:srgbClr val="7F0055"/>
+                </a:solidFill>
+                <a:latin typeface="Courier New"/>
+              </a:rPr>
+              <a:t>                            with</a:t>
+            </a:r>
+            <a:r>
+              <a:rPr lang="en-US" sz="2400" b="1" dirty="0" smtClean="0">
+                <a:latin typeface="Courier New"/>
+              </a:rPr>
+              <a:t> </a:t>
+            </a:r>
+            <a:r>
+              <a:rPr lang="en-US" sz="2400" b="1" dirty="0" err="1" smtClean="0">
+                <a:latin typeface="Courier New"/>
+              </a:rPr>
+              <a:t>ScalaCheck</a:t>
+            </a:r>
+            <a:r>
+              <a:rPr lang="en-US" sz="2400" b="1" dirty="0" smtClean="0">
+                <a:latin typeface="Courier New"/>
+              </a:rPr>
+              <a:t> {</a:t>
+            </a:r>
+          </a:p>
+          <a:p>
+            <a:endParaRPr lang="en-US" sz="2400" dirty="0" smtClean="0">
+              <a:solidFill>
+                <a:srgbClr val="2A00FF"/>
+              </a:solidFill>
+              <a:latin typeface="Courier New"/>
+            </a:endParaRPr>
+          </a:p>
+          <a:p>
+            <a:r>
+              <a:rPr lang="en-US" sz="2400" dirty="0" smtClean="0">
+                <a:solidFill>
+                  <a:srgbClr val="2A00FF"/>
+                </a:solidFill>
+                <a:latin typeface="Courier New"/>
+              </a:rPr>
+              <a:t>  "reverse must preserve the length of a string"</a:t>
+            </a:r>
+            <a:r>
+              <a:rPr lang="en-US" sz="2400" dirty="0" smtClean="0">
+                <a:latin typeface="Courier New"/>
+              </a:rPr>
+              <a:t> verifies { </a:t>
+            </a:r>
+          </a:p>
+          <a:p>
+            <a:r>
+              <a:rPr lang="en-US" sz="2400" dirty="0" smtClean="0">
+                <a:latin typeface="Courier New"/>
+              </a:rPr>
+              <a:t>    s: String =&gt; reverse(s).size == </a:t>
+            </a:r>
+            <a:r>
+              <a:rPr lang="en-US" sz="2400" dirty="0" err="1" smtClean="0">
+                <a:latin typeface="Courier New"/>
+              </a:rPr>
+              <a:t>s.size</a:t>
+            </a:r>
+            <a:r>
+              <a:rPr lang="en-US" sz="2400" dirty="0" smtClean="0">
+                <a:latin typeface="Courier New"/>
+              </a:rPr>
+              <a:t> </a:t>
+            </a:r>
+          </a:p>
+          <a:p>
+            <a:r>
+              <a:rPr lang="en-US" sz="2400" dirty="0" smtClean="0">
+                <a:latin typeface="Courier New"/>
+              </a:rPr>
+              <a:t>  }</a:t>
+            </a:r>
+          </a:p>
+          <a:p>
+            <a:r>
+              <a:rPr lang="en-US" sz="2400" dirty="0" smtClean="0">
+                <a:solidFill>
+                  <a:srgbClr val="2A00FF"/>
+                </a:solidFill>
+                <a:latin typeface="Courier New"/>
+              </a:rPr>
+              <a:t>  "reverse applied twice must return the same string"</a:t>
+            </a:r>
+            <a:r>
+              <a:rPr lang="en-US" sz="2400" dirty="0" smtClean="0">
+                <a:latin typeface="Courier New"/>
+              </a:rPr>
+              <a:t> verifies {   </a:t>
+            </a:r>
+          </a:p>
+          <a:p>
+            <a:r>
+              <a:rPr lang="en-US" sz="2400" dirty="0" smtClean="0">
+                <a:latin typeface="Courier New"/>
+              </a:rPr>
+              <a:t>    s: String =&gt; reverse(reverse(s)) == s </a:t>
+            </a:r>
+          </a:p>
+          <a:p>
+            <a:r>
+              <a:rPr lang="en-US" sz="2400" dirty="0" smtClean="0">
+                <a:latin typeface="Courier New"/>
+              </a:rPr>
+              <a:t>  }</a:t>
+            </a:r>
+          </a:p>
+          <a:p>
+            <a:r>
+              <a:rPr lang="en-US" sz="2400" dirty="0" smtClean="0">
+                <a:solidFill>
+                  <a:srgbClr val="2A00FF"/>
+                </a:solidFill>
+                <a:latin typeface="Courier New"/>
+              </a:rPr>
+              <a:t>  "reverse 2 concatenated strings must return the reversed second </a:t>
+            </a:r>
+          </a:p>
+          <a:p>
+            <a:r>
+              <a:rPr lang="en-US" sz="2400" dirty="0" smtClean="0">
+                <a:solidFill>
+                  <a:srgbClr val="2A00FF"/>
+                </a:solidFill>
+                <a:latin typeface="Courier New"/>
+              </a:rPr>
+              <a:t>   string concatenated with the reversed first one"</a:t>
+            </a:r>
+            <a:r>
+              <a:rPr lang="en-US" sz="2400" dirty="0" smtClean="0">
+                <a:latin typeface="Courier New"/>
+              </a:rPr>
+              <a:t> verifies {</a:t>
+            </a:r>
+          </a:p>
+          <a:p>
+            <a:r>
+              <a:rPr lang="en-US" sz="2400" dirty="0" smtClean="0">
+                <a:latin typeface="Courier New"/>
+              </a:rPr>
+              <a:t>    (s1: String, s2: String) =&gt; reverse(s1 + s2) == </a:t>
+            </a:r>
+          </a:p>
+          <a:p>
+            <a:r>
+              <a:rPr lang="en-US" sz="2400" dirty="0" smtClean="0">
+                <a:latin typeface="Courier New"/>
+              </a:rPr>
+              <a:t>                                reverse(s2) + reverse(s1) </a:t>
+            </a:r>
+          </a:p>
+          <a:p>
+            <a:r>
+              <a:rPr lang="en-US" sz="2400" dirty="0" smtClean="0">
+                <a:latin typeface="Courier New"/>
+              </a:rPr>
+              <a:t>  }</a:t>
+            </a:r>
+          </a:p>
+          <a:p>
+            <a:r>
+              <a:rPr lang="en-US" sz="2400" dirty="0" smtClean="0">
+                <a:latin typeface="Courier New"/>
+              </a:rPr>
+              <a:t>  </a:t>
+            </a:r>
+            <a:r>
+              <a:rPr lang="en-US" sz="2400" b="1" dirty="0" smtClean="0">
+                <a:solidFill>
+                  <a:srgbClr val="7F0055"/>
+                </a:solidFill>
+                <a:latin typeface="Courier New"/>
+              </a:rPr>
+              <a:t>def</a:t>
+            </a:r>
+            <a:r>
+              <a:rPr lang="en-US" sz="2400" b="1" dirty="0" smtClean="0">
+                <a:latin typeface="Courier New"/>
+              </a:rPr>
+              <a:t> </a:t>
+            </a:r>
+            <a:r>
+              <a:rPr lang="en-US" sz="2400" dirty="0" smtClean="0">
+                <a:latin typeface="Courier New"/>
+              </a:rPr>
+              <a:t>center(s: String) = s(</a:t>
+            </a:r>
+            <a:r>
+              <a:rPr lang="en-US" sz="2400" dirty="0" err="1" smtClean="0">
+                <a:latin typeface="Courier New"/>
+              </a:rPr>
+              <a:t>s.size</a:t>
+            </a:r>
+            <a:r>
+              <a:rPr lang="en-US" sz="2400" dirty="0" smtClean="0">
+                <a:latin typeface="Courier New"/>
+              </a:rPr>
+              <a:t> / 2)</a:t>
+            </a:r>
+          </a:p>
+          <a:p>
+            <a:r>
+              <a:rPr lang="en-US" sz="2400" dirty="0" smtClean="0">
+                <a:solidFill>
+                  <a:srgbClr val="2A00FF"/>
+                </a:solidFill>
+                <a:latin typeface="Courier New"/>
+              </a:rPr>
+              <a:t>  "keep the same 'center' character - Woops!"</a:t>
+            </a:r>
+            <a:r>
+              <a:rPr lang="en-US" sz="2400" dirty="0" smtClean="0">
+                <a:latin typeface="Courier New"/>
+              </a:rPr>
+              <a:t> verifies { </a:t>
+            </a:r>
+          </a:p>
+          <a:p>
+            <a:r>
+              <a:rPr lang="en-US" sz="2400" dirty="0" smtClean="0">
+                <a:latin typeface="Courier New"/>
+              </a:rPr>
+              <a:t>    s: String =&gt; </a:t>
+            </a:r>
+            <a:r>
+              <a:rPr lang="en-US" sz="2400" dirty="0" err="1" smtClean="0">
+                <a:latin typeface="Courier New"/>
+              </a:rPr>
+              <a:t>s.isEmpty</a:t>
+            </a:r>
+            <a:r>
+              <a:rPr lang="en-US" sz="2400" dirty="0" smtClean="0">
+                <a:latin typeface="Courier New"/>
+              </a:rPr>
+              <a:t> || center(reverse(s)) == center(s) </a:t>
+            </a:r>
+          </a:p>
+          <a:p>
+            <a:r>
+              <a:rPr lang="en-US" sz="2400" dirty="0" smtClean="0">
+                <a:latin typeface="Courier New"/>
+              </a:rPr>
+              <a:t>  </a:t>
+            </a:r>
+            <a:r>
+              <a:rPr lang="en-US" sz="2400" dirty="0" smtClean="0">
+                <a:latin typeface="Courier New"/>
+              </a:rPr>
+              <a:t>}</a:t>
+            </a:r>
+          </a:p>
+          <a:p>
+            <a:r>
+              <a:rPr lang="en-US" sz="2400" dirty="0" smtClean="0">
+                <a:latin typeface="Courier New"/>
+              </a:rPr>
+              <a:t>}</a:t>
+            </a:r>
+            <a:endParaRPr lang="en-US" sz="2400" dirty="0"/>
+          </a:p>
+        </p:txBody>
+      </p:sp>
+    </p:spTree>
+  </p:cSld>
+  <p:clrMapOvr>
+    <a:masterClrMapping/>
+  </p:clrMapOvr>
+  <p:transition>
+    <p:fade/>
+  </p:transition>
+  <p:timing>
+    <p:tnLst>
+      <p:par>
+        <p:cTn id="1" dur="indefinite" restart="never" nodeType="tmRoot"/>
+      </p:par>
+    </p:tnLst>
+  </p:timing>
+</p:sld>
+</file>
+
+<file path=ppt/slides/slide17.xml><?xml version="1.0" encoding="utf-8"?>
+<p:sld xmlns:a="http://schemas.openxmlformats.org/drawingml/2006/main" xmlns:r="http://schemas.openxmlformats.org/officeDocument/2006/relationships" xmlns:p="http://schemas.openxmlformats.org/presentationml/2006/main">
+  <p:cSld>
+    <p:spTree>
+      <p:nvGrpSpPr>
+        <p:cNvPr id="1" name=""/>
+        <p:cNvGrpSpPr/>
+        <p:nvPr/>
+      </p:nvGrpSpPr>
+      <p:grpSpPr>
+        <a:xfrm>
+          <a:off x="0" y="0"/>
+          <a:ext cx="0" cy="0"/>
+          <a:chOff x="0" y="0"/>
+          <a:chExt cx="0" cy="0"/>
+        </a:xfrm>
+      </p:grpSpPr>
+      <p:sp>
+        <p:nvSpPr>
+          <p:cNvPr id="8193" name="Rectangle 1"/>
+          <p:cNvSpPr>
+            <a:spLocks noGrp="1" noChangeArrowheads="1"/>
+          </p:cNvSpPr>
+          <p:nvPr>
+            <p:ph type="title"/>
+          </p:nvPr>
+        </p:nvSpPr>
+        <p:spPr>
+          <a:ln/>
+        </p:spPr>
+        <p:txBody>
+          <a:bodyPr/>
+          <a:lstStyle/>
+          <a:p>
+            <a:pPr lvl="0"/>
+            <a:r>
+              <a:rPr lang="en-US" sz="5400" dirty="0" smtClean="0">
+                <a:latin typeface="Lucida Handwriting" pitchFamily="66" charset="0"/>
+              </a:rPr>
+              <a:t>       tour</a:t>
+            </a:r>
+            <a:endParaRPr lang="en-US" dirty="0"/>
+          </a:p>
+        </p:txBody>
+      </p:sp>
+      <p:pic>
+        <p:nvPicPr>
+          <p:cNvPr id="39938" name="Picture 2" descr="Logo"/>
+          <p:cNvPicPr>
+            <a:picLocks noChangeAspect="1" noChangeArrowheads="1"/>
+          </p:cNvPicPr>
+          <p:nvPr/>
+        </p:nvPicPr>
+        <p:blipFill>
+          <a:blip r:embed="rId3"/>
+          <a:srcRect/>
+          <a:stretch>
+            <a:fillRect/>
+          </a:stretch>
+        </p:blipFill>
+        <p:spPr bwMode="auto">
+          <a:xfrm>
+            <a:off x="3833628" y="228600"/>
+            <a:ext cx="2287772" cy="642969"/>
+          </a:xfrm>
+          <a:prstGeom prst="rect">
+            <a:avLst/>
+          </a:prstGeom>
+          <a:noFill/>
+        </p:spPr>
+      </p:pic>
+      <p:sp>
+        <p:nvSpPr>
+          <p:cNvPr id="6" name="Rectangle 5"/>
+          <p:cNvSpPr/>
+          <p:nvPr/>
+        </p:nvSpPr>
+        <p:spPr>
+          <a:xfrm>
+            <a:off x="330200" y="1143000"/>
             <a:ext cx="12344400" cy="1200329"/>
           </a:xfrm>
           <a:prstGeom prst="rect">
@@ -9668,6 +10021,644 @@
             <a:endParaRPr lang="en-US" sz="2400" u="sng" dirty="0" smtClean="0">
               <a:latin typeface="Courier New"/>
             </a:endParaRPr>
+          </a:p>
+        </p:txBody>
+      </p:sp>
+    </p:spTree>
+  </p:cSld>
+  <p:clrMapOvr>
+    <a:masterClrMapping/>
+  </p:clrMapOvr>
+  <p:transition>
+    <p:fade/>
+  </p:transition>
+  <p:timing>
+    <p:tnLst>
+      <p:par>
+        <p:cTn id="1" dur="indefinite" restart="never" nodeType="tmRoot"/>
+      </p:par>
+    </p:tnLst>
+  </p:timing>
+</p:sld>
+</file>
+
+<file path=ppt/slides/slide18.xml><?xml version="1.0" encoding="utf-8"?>
+<p:sld xmlns:a="http://schemas.openxmlformats.org/drawingml/2006/main" xmlns:r="http://schemas.openxmlformats.org/officeDocument/2006/relationships" xmlns:p="http://schemas.openxmlformats.org/presentationml/2006/main">
+  <p:cSld>
+    <p:spTree>
+      <p:nvGrpSpPr>
+        <p:cNvPr id="1" name=""/>
+        <p:cNvGrpSpPr/>
+        <p:nvPr/>
+      </p:nvGrpSpPr>
+      <p:grpSpPr>
+        <a:xfrm>
+          <a:off x="0" y="0"/>
+          <a:ext cx="0" cy="0"/>
+          <a:chOff x="0" y="0"/>
+          <a:chExt cx="0" cy="0"/>
+        </a:xfrm>
+      </p:grpSpPr>
+      <p:sp>
+        <p:nvSpPr>
+          <p:cNvPr id="8193" name="Rectangle 1"/>
+          <p:cNvSpPr>
+            <a:spLocks noGrp="1" noChangeArrowheads="1"/>
+          </p:cNvSpPr>
+          <p:nvPr>
+            <p:ph type="title"/>
+          </p:nvPr>
+        </p:nvSpPr>
+        <p:spPr>
+          <a:ln/>
+        </p:spPr>
+        <p:txBody>
+          <a:bodyPr/>
+          <a:lstStyle/>
+          <a:p>
+            <a:pPr lvl="0"/>
+            <a:r>
+              <a:rPr lang="en-US" sz="5400" dirty="0" smtClean="0">
+                <a:latin typeface="Lucida Handwriting" pitchFamily="66" charset="0"/>
+              </a:rPr>
+              <a:t>       tour</a:t>
+            </a:r>
+            <a:endParaRPr lang="en-US" dirty="0"/>
+          </a:p>
+        </p:txBody>
+      </p:sp>
+      <p:pic>
+        <p:nvPicPr>
+          <p:cNvPr id="39938" name="Picture 2" descr="Logo"/>
+          <p:cNvPicPr>
+            <a:picLocks noChangeAspect="1" noChangeArrowheads="1"/>
+          </p:cNvPicPr>
+          <p:nvPr/>
+        </p:nvPicPr>
+        <p:blipFill>
+          <a:blip r:embed="rId3"/>
+          <a:srcRect/>
+          <a:stretch>
+            <a:fillRect/>
+          </a:stretch>
+        </p:blipFill>
+        <p:spPr bwMode="auto">
+          <a:xfrm>
+            <a:off x="3833628" y="228600"/>
+            <a:ext cx="2287772" cy="642969"/>
+          </a:xfrm>
+          <a:prstGeom prst="rect">
+            <a:avLst/>
+          </a:prstGeom>
+          <a:noFill/>
+        </p:spPr>
+      </p:pic>
+      <p:sp>
+        <p:nvSpPr>
+          <p:cNvPr id="8" name="Rectangle 1"/>
+          <p:cNvSpPr txBox="1">
+            <a:spLocks noChangeArrowheads="1"/>
+          </p:cNvSpPr>
+          <p:nvPr/>
+        </p:nvSpPr>
+        <p:spPr bwMode="auto">
+          <a:xfrm>
+            <a:off x="8178800" y="6858000"/>
+            <a:ext cx="4038600" cy="914400"/>
+          </a:xfrm>
+          <a:prstGeom prst="rect">
+            <a:avLst/>
+          </a:prstGeom>
+          <a:noFill/>
+          <a:ln w="12700">
+            <a:noFill/>
+            <a:miter lim="800000"/>
+            <a:headEnd/>
+            <a:tailEnd/>
+          </a:ln>
+          <a:effectLst/>
+        </p:spPr>
+        <p:txBody>
+          <a:bodyPr vert="horz" wrap="square" lIns="50800" tIns="50800" rIns="50800" bIns="50800" numCol="1" anchor="ctr" anchorCtr="0" compatLnSpc="1">
+            <a:prstTxWarp prst="textNoShape">
+              <a:avLst/>
+            </a:prstTxWarp>
+          </a:bodyPr>
+          <a:lstStyle/>
+          <a:p>
+            <a:pPr marL="0" marR="0" lvl="0" indent="0" algn="ctr" defTabSz="914400" rtl="0" eaLnBrk="1" fontAlgn="base" latinLnBrk="0" hangingPunct="1">
+              <a:lnSpc>
+                <a:spcPct val="100000"/>
+              </a:lnSpc>
+              <a:spcBef>
+                <a:spcPct val="0"/>
+              </a:spcBef>
+              <a:spcAft>
+                <a:spcPct val="0"/>
+              </a:spcAft>
+              <a:buClrTx/>
+              <a:buSzTx/>
+              <a:buFontTx/>
+              <a:buNone/>
+              <a:tabLst/>
+              <a:defRPr/>
+            </a:pPr>
+            <a:r>
+              <a:rPr lang="en-US" sz="5400" b="1" kern="0" dirty="0" smtClean="0">
+                <a:solidFill>
+                  <a:srgbClr val="00CC66"/>
+                </a:solidFill>
+                <a:latin typeface="Lucida Handwriting" pitchFamily="66" charset="0"/>
+                <a:ea typeface="+mj-ea"/>
+                <a:cs typeface="+mj-cs"/>
+                <a:sym typeface="Arial" charset="0"/>
+              </a:rPr>
+              <a:t>Mocks</a:t>
+            </a:r>
+            <a:endParaRPr kumimoji="0" lang="en-US" sz="5000" b="1" i="0" u="none" strike="noStrike" kern="0" cap="none" spc="0" normalizeH="0" baseline="0" noProof="0" dirty="0">
+              <a:ln>
+                <a:noFill/>
+              </a:ln>
+              <a:solidFill>
+                <a:srgbClr val="00CC66"/>
+              </a:solidFill>
+              <a:effectLst/>
+              <a:uLnTx/>
+              <a:uFillTx/>
+              <a:latin typeface="+mj-lt"/>
+              <a:ea typeface="+mj-ea"/>
+              <a:cs typeface="+mj-cs"/>
+              <a:sym typeface="Arial" charset="0"/>
+            </a:endParaRPr>
+          </a:p>
+        </p:txBody>
+      </p:sp>
+      <p:sp>
+        <p:nvSpPr>
+          <p:cNvPr id="18" name="Rectangle 17"/>
+          <p:cNvSpPr/>
+          <p:nvPr/>
+        </p:nvSpPr>
+        <p:spPr>
+          <a:xfrm>
+            <a:off x="4931310" y="5257800"/>
+            <a:ext cx="2866490" cy="923330"/>
+          </a:xfrm>
+          <a:prstGeom prst="rect">
+            <a:avLst/>
+          </a:prstGeom>
+        </p:spPr>
+        <p:txBody>
+          <a:bodyPr wrap="none">
+            <a:spAutoFit/>
+          </a:bodyPr>
+          <a:lstStyle/>
+          <a:p>
+            <a:pPr algn="ctr"/>
+            <a:r>
+              <a:rPr lang="en-US" sz="5400" b="1" kern="0" dirty="0" smtClean="0">
+                <a:solidFill>
+                  <a:srgbClr val="0C0F20"/>
+                </a:solidFill>
+                <a:latin typeface="Lucida Handwriting" pitchFamily="66" charset="0"/>
+                <a:cs typeface="+mj-cs"/>
+                <a:sym typeface="Arial" charset="0"/>
+              </a:rPr>
+              <a:t>Isolate</a:t>
+            </a:r>
+            <a:endParaRPr lang="en-US" dirty="0"/>
+          </a:p>
+        </p:txBody>
+      </p:sp>
+      <p:pic>
+        <p:nvPicPr>
+          <p:cNvPr id="60428" name="Picture 12" descr="http://cdn.iconfinder.net/data/icons/humano2/128x128/apps/stock_task.png"/>
+          <p:cNvPicPr>
+            <a:picLocks noChangeAspect="1" noChangeArrowheads="1"/>
+          </p:cNvPicPr>
+          <p:nvPr/>
+        </p:nvPicPr>
+        <p:blipFill>
+          <a:blip r:embed="rId4"/>
+          <a:srcRect/>
+          <a:stretch>
+            <a:fillRect/>
+          </a:stretch>
+        </p:blipFill>
+        <p:spPr bwMode="auto">
+          <a:xfrm>
+            <a:off x="5054600" y="2895600"/>
+            <a:ext cx="2286000" cy="2286002"/>
+          </a:xfrm>
+          <a:prstGeom prst="rect">
+            <a:avLst/>
+          </a:prstGeom>
+          <a:noFill/>
+        </p:spPr>
+      </p:pic>
+      <p:pic>
+        <p:nvPicPr>
+          <p:cNvPr id="62468" name="Picture 4" descr="box, brick, file, format, lego, module icon"/>
+          <p:cNvPicPr>
+            <a:picLocks noChangeAspect="1" noChangeArrowheads="1"/>
+          </p:cNvPicPr>
+          <p:nvPr/>
+        </p:nvPicPr>
+        <p:blipFill>
+          <a:blip r:embed="rId5"/>
+          <a:srcRect/>
+          <a:stretch>
+            <a:fillRect/>
+          </a:stretch>
+        </p:blipFill>
+        <p:spPr bwMode="auto">
+          <a:xfrm>
+            <a:off x="1168400" y="1447800"/>
+            <a:ext cx="2133600" cy="2133602"/>
+          </a:xfrm>
+          <a:prstGeom prst="rect">
+            <a:avLst/>
+          </a:prstGeom>
+          <a:noFill/>
+        </p:spPr>
+      </p:pic>
+    </p:spTree>
+  </p:cSld>
+  <p:clrMapOvr>
+    <a:masterClrMapping/>
+  </p:clrMapOvr>
+  <p:transition>
+    <p:fade/>
+  </p:transition>
+  <p:timing>
+    <p:tnLst>
+      <p:par>
+        <p:cTn id="1" dur="indefinite" restart="never" nodeType="tmRoot"/>
+      </p:par>
+    </p:tnLst>
+  </p:timing>
+</p:sld>
+</file>
+
+<file path=ppt/slides/slide19.xml><?xml version="1.0" encoding="utf-8"?>
+<p:sld xmlns:a="http://schemas.openxmlformats.org/drawingml/2006/main" xmlns:r="http://schemas.openxmlformats.org/officeDocument/2006/relationships" xmlns:p="http://schemas.openxmlformats.org/presentationml/2006/main">
+  <p:cSld>
+    <p:spTree>
+      <p:nvGrpSpPr>
+        <p:cNvPr id="1" name=""/>
+        <p:cNvGrpSpPr/>
+        <p:nvPr/>
+      </p:nvGrpSpPr>
+      <p:grpSpPr>
+        <a:xfrm>
+          <a:off x="0" y="0"/>
+          <a:ext cx="0" cy="0"/>
+          <a:chOff x="0" y="0"/>
+          <a:chExt cx="0" cy="0"/>
+        </a:xfrm>
+      </p:grpSpPr>
+      <p:sp>
+        <p:nvSpPr>
+          <p:cNvPr id="8193" name="Rectangle 1"/>
+          <p:cNvSpPr>
+            <a:spLocks noGrp="1" noChangeArrowheads="1"/>
+          </p:cNvSpPr>
+          <p:nvPr>
+            <p:ph type="title"/>
+          </p:nvPr>
+        </p:nvSpPr>
+        <p:spPr>
+          <a:ln/>
+        </p:spPr>
+        <p:txBody>
+          <a:bodyPr/>
+          <a:lstStyle/>
+          <a:p>
+            <a:pPr lvl="0"/>
+            <a:r>
+              <a:rPr lang="en-US" sz="5400" dirty="0" smtClean="0">
+                <a:latin typeface="Lucida Handwriting" pitchFamily="66" charset="0"/>
+              </a:rPr>
+              <a:t>       tour</a:t>
+            </a:r>
+            <a:endParaRPr lang="en-US" dirty="0"/>
+          </a:p>
+        </p:txBody>
+      </p:sp>
+      <p:pic>
+        <p:nvPicPr>
+          <p:cNvPr id="39938" name="Picture 2" descr="Logo"/>
+          <p:cNvPicPr>
+            <a:picLocks noChangeAspect="1" noChangeArrowheads="1"/>
+          </p:cNvPicPr>
+          <p:nvPr/>
+        </p:nvPicPr>
+        <p:blipFill>
+          <a:blip r:embed="rId3"/>
+          <a:srcRect/>
+          <a:stretch>
+            <a:fillRect/>
+          </a:stretch>
+        </p:blipFill>
+        <p:spPr bwMode="auto">
+          <a:xfrm>
+            <a:off x="3833628" y="228600"/>
+            <a:ext cx="2287772" cy="642969"/>
+          </a:xfrm>
+          <a:prstGeom prst="rect">
+            <a:avLst/>
+          </a:prstGeom>
+          <a:noFill/>
+        </p:spPr>
+      </p:pic>
+      <p:sp>
+        <p:nvSpPr>
+          <p:cNvPr id="6" name="Rectangle 5"/>
+          <p:cNvSpPr/>
+          <p:nvPr/>
+        </p:nvSpPr>
+        <p:spPr>
+          <a:xfrm>
+            <a:off x="330200" y="1143000"/>
+            <a:ext cx="12344400" cy="5262979"/>
+          </a:xfrm>
+          <a:prstGeom prst="rect">
+            <a:avLst/>
+          </a:prstGeom>
+          <a:ln>
+            <a:solidFill>
+              <a:schemeClr val="tx1"/>
+            </a:solidFill>
+            <a:prstDash val="dash"/>
+          </a:ln>
+        </p:spPr>
+        <p:txBody>
+          <a:bodyPr wrap="square">
+            <a:spAutoFit/>
+          </a:bodyPr>
+          <a:lstStyle/>
+          <a:p>
+            <a:r>
+              <a:rPr lang="en-US" sz="2400" dirty="0" smtClean="0">
+                <a:solidFill>
+                  <a:srgbClr val="3F5FBF"/>
+                </a:solidFill>
+                <a:latin typeface="Courier New"/>
+              </a:rPr>
+              <a:t>/**</a:t>
+            </a:r>
+          </a:p>
+          <a:p>
+            <a:r>
+              <a:rPr lang="en-US" sz="2400" dirty="0" smtClean="0">
+                <a:solidFill>
+                  <a:srgbClr val="3F5FBF"/>
+                </a:solidFill>
+                <a:latin typeface="Courier New"/>
+              </a:rPr>
+              <a:t> * A simple Observable</a:t>
+            </a:r>
+            <a:r>
+              <a:rPr lang="en-US" sz="2400" dirty="0" smtClean="0">
+                <a:solidFill>
+                  <a:srgbClr val="7F7F9F"/>
+                </a:solidFill>
+                <a:latin typeface="Courier New"/>
+              </a:rPr>
+              <a:t>-</a:t>
+            </a:r>
+            <a:r>
+              <a:rPr lang="en-US" sz="2400" dirty="0" smtClean="0">
+                <a:solidFill>
+                  <a:srgbClr val="3F5FBF"/>
+                </a:solidFill>
+                <a:latin typeface="Courier New"/>
+              </a:rPr>
+              <a:t>Observer pattern implementation</a:t>
+            </a:r>
+          </a:p>
+          <a:p>
+            <a:r>
+              <a:rPr lang="en-US" sz="2400" dirty="0" smtClean="0">
+                <a:solidFill>
+                  <a:srgbClr val="3F5FBF"/>
+                </a:solidFill>
+                <a:latin typeface="Courier New"/>
+              </a:rPr>
+              <a:t> */</a:t>
+            </a:r>
+          </a:p>
+          <a:p>
+            <a:r>
+              <a:rPr lang="en-US" sz="2400" b="1" dirty="0" smtClean="0">
+                <a:solidFill>
+                  <a:srgbClr val="7F0055"/>
+                </a:solidFill>
+                <a:latin typeface="Courier New"/>
+              </a:rPr>
+              <a:t>trait</a:t>
+            </a:r>
+            <a:r>
+              <a:rPr lang="en-US" sz="2400" b="1" dirty="0" smtClean="0">
+                <a:latin typeface="Courier New"/>
+              </a:rPr>
+              <a:t> </a:t>
+            </a:r>
+            <a:r>
+              <a:rPr lang="en-US" sz="2400" b="1" dirty="0" smtClean="0">
+                <a:latin typeface="Courier New"/>
+              </a:rPr>
+              <a:t>Observable {</a:t>
+            </a:r>
+          </a:p>
+          <a:p>
+            <a:r>
+              <a:rPr lang="nb-NO" sz="2400" dirty="0" smtClean="0">
+                <a:latin typeface="Courier New"/>
+              </a:rPr>
+              <a:t>  </a:t>
+            </a:r>
+            <a:r>
+              <a:rPr lang="nb-NO" sz="2400" b="1" dirty="0" smtClean="0">
+                <a:solidFill>
+                  <a:srgbClr val="7F0055"/>
+                </a:solidFill>
+                <a:latin typeface="Courier New"/>
+              </a:rPr>
+              <a:t>private</a:t>
+            </a:r>
+            <a:r>
+              <a:rPr lang="nb-NO" sz="2400" b="1" dirty="0" smtClean="0">
+                <a:latin typeface="Courier New"/>
+              </a:rPr>
+              <a:t> </a:t>
+            </a:r>
+            <a:r>
+              <a:rPr lang="nb-NO" sz="2400" b="1" dirty="0" smtClean="0">
+                <a:solidFill>
+                  <a:srgbClr val="7F0055"/>
+                </a:solidFill>
+                <a:latin typeface="Courier New"/>
+              </a:rPr>
+              <a:t>var</a:t>
+            </a:r>
+            <a:r>
+              <a:rPr lang="nb-NO" sz="2400" b="1" dirty="0" smtClean="0">
+                <a:latin typeface="Courier New"/>
+              </a:rPr>
+              <a:t> observers: List[Observer] = </a:t>
+            </a:r>
+            <a:r>
+              <a:rPr lang="nb-NO" sz="2400" b="1" dirty="0" smtClean="0">
+                <a:latin typeface="Courier New"/>
+              </a:rPr>
+              <a:t>Nil</a:t>
+            </a:r>
+          </a:p>
+          <a:p>
+            <a:endParaRPr lang="nb-NO" sz="2400" b="1" dirty="0" smtClean="0">
+              <a:latin typeface="Courier New"/>
+            </a:endParaRPr>
+          </a:p>
+          <a:p>
+            <a:r>
+              <a:rPr lang="pt-BR" sz="2400" dirty="0" smtClean="0">
+                <a:latin typeface="Courier New"/>
+              </a:rPr>
+              <a:t>  </a:t>
+            </a:r>
+            <a:r>
+              <a:rPr lang="pt-BR" sz="2400" b="1" dirty="0" smtClean="0">
+                <a:solidFill>
+                  <a:srgbClr val="7F0055"/>
+                </a:solidFill>
+                <a:latin typeface="Courier New"/>
+              </a:rPr>
+              <a:t>def</a:t>
+            </a:r>
+            <a:r>
+              <a:rPr lang="pt-BR" sz="2400" b="1" dirty="0" smtClean="0">
+                <a:latin typeface="Courier New"/>
+              </a:rPr>
+              <a:t> add(o: Observer) = observers = o :: </a:t>
+            </a:r>
+            <a:r>
+              <a:rPr lang="pt-BR" sz="2400" b="1" dirty="0" smtClean="0">
+                <a:latin typeface="Courier New"/>
+              </a:rPr>
+              <a:t>observers</a:t>
+            </a:r>
+          </a:p>
+          <a:p>
+            <a:endParaRPr lang="pt-BR" sz="2400" b="1" dirty="0" smtClean="0">
+              <a:latin typeface="Courier New"/>
+            </a:endParaRPr>
+          </a:p>
+          <a:p>
+            <a:r>
+              <a:rPr lang="en-US" sz="2400" dirty="0" smtClean="0">
+                <a:latin typeface="Courier New"/>
+              </a:rPr>
+              <a:t>  </a:t>
+            </a:r>
+            <a:r>
+              <a:rPr lang="en-US" sz="2400" b="1" dirty="0" smtClean="0">
+                <a:solidFill>
+                  <a:srgbClr val="7F0055"/>
+                </a:solidFill>
+                <a:latin typeface="Courier New"/>
+              </a:rPr>
+              <a:t>def</a:t>
+            </a:r>
+            <a:r>
+              <a:rPr lang="en-US" sz="2400" b="1" dirty="0" smtClean="0">
+                <a:latin typeface="Courier New"/>
+              </a:rPr>
+              <a:t> changed(event: String) = observers </a:t>
+            </a:r>
+            <a:r>
+              <a:rPr lang="en-US" sz="2400" b="1" dirty="0" err="1" smtClean="0">
+                <a:latin typeface="Courier New"/>
+              </a:rPr>
+              <a:t>foreach</a:t>
+            </a:r>
+            <a:r>
+              <a:rPr lang="en-US" sz="2400" b="1" dirty="0" smtClean="0">
+                <a:latin typeface="Courier New"/>
+              </a:rPr>
+              <a:t> (_.notify(event))</a:t>
+            </a:r>
+          </a:p>
+          <a:p>
+            <a:r>
+              <a:rPr lang="en-US" sz="2400" dirty="0" smtClean="0">
+                <a:latin typeface="Courier New"/>
+              </a:rPr>
+              <a:t>}</a:t>
+            </a:r>
+          </a:p>
+          <a:p>
+            <a:endParaRPr lang="en-US" sz="2400" b="1" dirty="0" smtClean="0">
+              <a:solidFill>
+                <a:srgbClr val="7F0055"/>
+              </a:solidFill>
+              <a:latin typeface="Courier New"/>
+            </a:endParaRPr>
+          </a:p>
+          <a:p>
+            <a:r>
+              <a:rPr lang="en-US" sz="2400" b="1" dirty="0" smtClean="0">
+                <a:solidFill>
+                  <a:srgbClr val="7F0055"/>
+                </a:solidFill>
+                <a:latin typeface="Courier New"/>
+              </a:rPr>
+              <a:t>trait</a:t>
+            </a:r>
+            <a:r>
+              <a:rPr lang="en-US" sz="2400" b="1" dirty="0" smtClean="0">
+                <a:latin typeface="Courier New"/>
+              </a:rPr>
+              <a:t> </a:t>
+            </a:r>
+            <a:r>
+              <a:rPr lang="en-US" sz="2400" b="1" dirty="0" smtClean="0">
+                <a:latin typeface="Courier New"/>
+              </a:rPr>
+              <a:t>Observer {</a:t>
+            </a:r>
+          </a:p>
+          <a:p>
+            <a:r>
+              <a:rPr lang="en-US" sz="2400" dirty="0" smtClean="0">
+                <a:latin typeface="Courier New"/>
+              </a:rPr>
+              <a:t>  </a:t>
+            </a:r>
+            <a:r>
+              <a:rPr lang="en-US" sz="2400" b="1" dirty="0" smtClean="0">
+                <a:solidFill>
+                  <a:srgbClr val="7F0055"/>
+                </a:solidFill>
+                <a:latin typeface="Courier New"/>
+              </a:rPr>
+              <a:t>def</a:t>
+            </a:r>
+            <a:r>
+              <a:rPr lang="en-US" sz="2400" b="1" dirty="0" smtClean="0">
+                <a:latin typeface="Courier New"/>
+              </a:rPr>
+              <a:t> notify(event: String)</a:t>
+            </a:r>
+          </a:p>
+          <a:p>
+            <a:r>
+              <a:rPr lang="en-US" sz="2400" dirty="0" smtClean="0">
+                <a:latin typeface="Courier New"/>
+              </a:rPr>
+              <a:t>}</a:t>
+            </a:r>
+            <a:endParaRPr lang="en-US" sz="2400" dirty="0"/>
           </a:p>
         </p:txBody>
       </p:sp>
@@ -10149,6 +11140,578 @@
               <a:ea typeface="ヒラギノ角ゴ ProN W3" pitchFamily="1" charset="-128"/>
               <a:sym typeface="Gill Sans" pitchFamily="1" charset="0"/>
             </a:endParaRPr>
+          </a:p>
+        </p:txBody>
+      </p:sp>
+    </p:spTree>
+  </p:cSld>
+  <p:clrMapOvr>
+    <a:masterClrMapping/>
+  </p:clrMapOvr>
+  <p:transition>
+    <p:fade/>
+  </p:transition>
+  <p:timing>
+    <p:tnLst>
+      <p:par>
+        <p:cTn id="1" dur="indefinite" restart="never" nodeType="tmRoot"/>
+      </p:par>
+    </p:tnLst>
+  </p:timing>
+</p:sld>
+</file>
+
+<file path=ppt/slides/slide20.xml><?xml version="1.0" encoding="utf-8"?>
+<p:sld xmlns:a="http://schemas.openxmlformats.org/drawingml/2006/main" xmlns:r="http://schemas.openxmlformats.org/officeDocument/2006/relationships" xmlns:p="http://schemas.openxmlformats.org/presentationml/2006/main">
+  <p:cSld>
+    <p:spTree>
+      <p:nvGrpSpPr>
+        <p:cNvPr id="1" name=""/>
+        <p:cNvGrpSpPr/>
+        <p:nvPr/>
+      </p:nvGrpSpPr>
+      <p:grpSpPr>
+        <a:xfrm>
+          <a:off x="0" y="0"/>
+          <a:ext cx="0" cy="0"/>
+          <a:chOff x="0" y="0"/>
+          <a:chExt cx="0" cy="0"/>
+        </a:xfrm>
+      </p:grpSpPr>
+      <p:sp>
+        <p:nvSpPr>
+          <p:cNvPr id="8193" name="Rectangle 1"/>
+          <p:cNvSpPr>
+            <a:spLocks noGrp="1" noChangeArrowheads="1"/>
+          </p:cNvSpPr>
+          <p:nvPr>
+            <p:ph type="title"/>
+          </p:nvPr>
+        </p:nvSpPr>
+        <p:spPr>
+          <a:ln/>
+        </p:spPr>
+        <p:txBody>
+          <a:bodyPr/>
+          <a:lstStyle/>
+          <a:p>
+            <a:pPr lvl="0"/>
+            <a:r>
+              <a:rPr lang="en-US" sz="5400" dirty="0" smtClean="0">
+                <a:latin typeface="Lucida Handwriting" pitchFamily="66" charset="0"/>
+              </a:rPr>
+              <a:t>       tour</a:t>
+            </a:r>
+            <a:endParaRPr lang="en-US" dirty="0"/>
+          </a:p>
+        </p:txBody>
+      </p:sp>
+      <p:pic>
+        <p:nvPicPr>
+          <p:cNvPr id="39938" name="Picture 2" descr="Logo"/>
+          <p:cNvPicPr>
+            <a:picLocks noChangeAspect="1" noChangeArrowheads="1"/>
+          </p:cNvPicPr>
+          <p:nvPr/>
+        </p:nvPicPr>
+        <p:blipFill>
+          <a:blip r:embed="rId3"/>
+          <a:srcRect/>
+          <a:stretch>
+            <a:fillRect/>
+          </a:stretch>
+        </p:blipFill>
+        <p:spPr bwMode="auto">
+          <a:xfrm>
+            <a:off x="3833628" y="228600"/>
+            <a:ext cx="2287772" cy="642969"/>
+          </a:xfrm>
+          <a:prstGeom prst="rect">
+            <a:avLst/>
+          </a:prstGeom>
+          <a:noFill/>
+        </p:spPr>
+      </p:pic>
+      <p:sp>
+        <p:nvSpPr>
+          <p:cNvPr id="6" name="Rectangle 5"/>
+          <p:cNvSpPr/>
+          <p:nvPr/>
+        </p:nvSpPr>
+        <p:spPr>
+          <a:xfrm>
+            <a:off x="330200" y="1143000"/>
+            <a:ext cx="12344400" cy="6370975"/>
+          </a:xfrm>
+          <a:prstGeom prst="rect">
+            <a:avLst/>
+          </a:prstGeom>
+          <a:ln>
+            <a:solidFill>
+              <a:schemeClr val="tx1"/>
+            </a:solidFill>
+            <a:prstDash val="dash"/>
+          </a:ln>
+        </p:spPr>
+        <p:txBody>
+          <a:bodyPr wrap="square">
+            <a:spAutoFit/>
+          </a:bodyPr>
+          <a:lstStyle/>
+          <a:p>
+            <a:r>
+              <a:rPr lang="en-US" sz="2400" b="1" dirty="0" smtClean="0">
+                <a:solidFill>
+                  <a:srgbClr val="7F0055"/>
+                </a:solidFill>
+                <a:latin typeface="Courier New"/>
+              </a:rPr>
+              <a:t>import</a:t>
+            </a:r>
+            <a:r>
+              <a:rPr lang="en-US" sz="2400" b="1" dirty="0" smtClean="0">
+                <a:latin typeface="Courier New"/>
+              </a:rPr>
+              <a:t> </a:t>
+            </a:r>
+            <a:r>
+              <a:rPr lang="en-US" sz="2400" b="1" dirty="0" err="1" smtClean="0">
+                <a:latin typeface="Courier New"/>
+              </a:rPr>
+              <a:t>org.specs.mock</a:t>
+            </a:r>
+            <a:r>
+              <a:rPr lang="en-US" sz="2400" b="1" dirty="0" smtClean="0">
+                <a:latin typeface="Courier New"/>
+              </a:rPr>
+              <a:t>._</a:t>
+            </a:r>
+          </a:p>
+          <a:p>
+            <a:endParaRPr lang="en-US" sz="2400" dirty="0" smtClean="0">
+              <a:latin typeface="Courier New"/>
+            </a:endParaRPr>
+          </a:p>
+          <a:p>
+            <a:r>
+              <a:rPr lang="en-US" sz="2400" b="1" dirty="0" smtClean="0">
+                <a:solidFill>
+                  <a:srgbClr val="7F0055"/>
+                </a:solidFill>
+                <a:latin typeface="Courier New"/>
+              </a:rPr>
+              <a:t>class</a:t>
+            </a:r>
+            <a:r>
+              <a:rPr lang="en-US" sz="2400" b="1" dirty="0" smtClean="0">
+                <a:latin typeface="Courier New"/>
+              </a:rPr>
+              <a:t> </a:t>
+            </a:r>
+            <a:r>
+              <a:rPr lang="en-US" sz="2400" b="1" dirty="0" err="1" smtClean="0">
+                <a:latin typeface="Courier New"/>
+              </a:rPr>
+              <a:t>ObservableSpec</a:t>
+            </a:r>
+            <a:r>
+              <a:rPr lang="en-US" sz="2400" b="1" dirty="0" smtClean="0">
+                <a:latin typeface="Courier New"/>
+              </a:rPr>
+              <a:t> </a:t>
+            </a:r>
+            <a:r>
+              <a:rPr lang="en-US" sz="2400" b="1" dirty="0" smtClean="0">
+                <a:solidFill>
+                  <a:srgbClr val="7F0055"/>
+                </a:solidFill>
+                <a:latin typeface="Courier New"/>
+              </a:rPr>
+              <a:t>extends</a:t>
+            </a:r>
+            <a:r>
+              <a:rPr lang="en-US" sz="2400" b="1" dirty="0" smtClean="0">
+                <a:latin typeface="Courier New"/>
+              </a:rPr>
+              <a:t> Specification </a:t>
+            </a:r>
+            <a:r>
+              <a:rPr lang="en-US" sz="2400" b="1" dirty="0" smtClean="0">
+                <a:solidFill>
+                  <a:srgbClr val="7F0055"/>
+                </a:solidFill>
+                <a:latin typeface="Courier New"/>
+              </a:rPr>
+              <a:t>with</a:t>
+            </a:r>
+            <a:r>
+              <a:rPr lang="en-US" sz="2400" b="1" dirty="0" smtClean="0">
+                <a:latin typeface="Courier New"/>
+              </a:rPr>
+              <a:t> </a:t>
+            </a:r>
+            <a:r>
+              <a:rPr lang="en-US" sz="2400" b="1" dirty="0" err="1" smtClean="0">
+                <a:latin typeface="Courier New"/>
+              </a:rPr>
+              <a:t>Mockito</a:t>
+            </a:r>
+            <a:r>
+              <a:rPr lang="en-US" sz="2400" b="1" dirty="0" smtClean="0">
+                <a:latin typeface="Courier New"/>
+              </a:rPr>
+              <a:t> {</a:t>
+            </a:r>
+          </a:p>
+          <a:p>
+            <a:r>
+              <a:rPr lang="en-US" sz="2400" dirty="0" smtClean="0">
+                <a:latin typeface="Courier New"/>
+              </a:rPr>
+              <a:t>  </a:t>
+            </a:r>
+            <a:r>
+              <a:rPr lang="en-US" sz="2400" b="1" dirty="0" err="1" smtClean="0">
+                <a:solidFill>
+                  <a:srgbClr val="7F0055"/>
+                </a:solidFill>
+                <a:latin typeface="Courier New"/>
+              </a:rPr>
+              <a:t>val</a:t>
+            </a:r>
+            <a:r>
+              <a:rPr lang="en-US" sz="2400" b="1" dirty="0" smtClean="0">
+                <a:latin typeface="Courier New"/>
+              </a:rPr>
+              <a:t> observer = mock[Observer]</a:t>
+            </a:r>
+          </a:p>
+          <a:p>
+            <a:r>
+              <a:rPr lang="en-US" sz="2400" dirty="0" smtClean="0">
+                <a:latin typeface="Courier New"/>
+              </a:rPr>
+              <a:t>  </a:t>
+            </a:r>
+            <a:r>
+              <a:rPr lang="en-US" sz="2400" b="1" dirty="0" err="1" smtClean="0">
+                <a:solidFill>
+                  <a:srgbClr val="7F0055"/>
+                </a:solidFill>
+                <a:latin typeface="Courier New"/>
+              </a:rPr>
+              <a:t>val</a:t>
+            </a:r>
+            <a:r>
+              <a:rPr lang="en-US" sz="2400" b="1" dirty="0" smtClean="0">
+                <a:latin typeface="Courier New"/>
+              </a:rPr>
+              <a:t> observable = </a:t>
+            </a:r>
+            <a:r>
+              <a:rPr lang="en-US" sz="2400" b="1" dirty="0" smtClean="0">
+                <a:solidFill>
+                  <a:srgbClr val="7F0055"/>
+                </a:solidFill>
+                <a:latin typeface="Courier New"/>
+              </a:rPr>
+              <a:t>new</a:t>
+            </a:r>
+            <a:r>
+              <a:rPr lang="en-US" sz="2400" b="1" dirty="0" smtClean="0">
+                <a:latin typeface="Courier New"/>
+              </a:rPr>
+              <a:t> Observable { add(observer) }</a:t>
+            </a:r>
+          </a:p>
+          <a:p>
+            <a:endParaRPr lang="en-US" sz="2400" dirty="0" smtClean="0">
+              <a:latin typeface="Courier New"/>
+            </a:endParaRPr>
+          </a:p>
+          <a:p>
+            <a:r>
+              <a:rPr lang="en-US" sz="2400" dirty="0" smtClean="0">
+                <a:latin typeface="Courier New"/>
+              </a:rPr>
+              <a:t>  </a:t>
+            </a:r>
+            <a:r>
+              <a:rPr lang="en-US" sz="2400" dirty="0" smtClean="0">
+                <a:solidFill>
+                  <a:srgbClr val="2A00FF"/>
+                </a:solidFill>
+                <a:latin typeface="Courier New"/>
+              </a:rPr>
+              <a:t>"An observable must notify its observers when changed"</a:t>
+            </a:r>
+            <a:r>
+              <a:rPr lang="en-US" sz="2400" dirty="0" smtClean="0">
+                <a:latin typeface="Courier New"/>
+              </a:rPr>
+              <a:t> &gt;&gt; {</a:t>
+            </a:r>
+          </a:p>
+          <a:p>
+            <a:r>
+              <a:rPr lang="en-US" sz="2400" dirty="0" smtClean="0">
+                <a:latin typeface="Courier New"/>
+              </a:rPr>
+              <a:t>    </a:t>
+            </a:r>
+            <a:r>
+              <a:rPr lang="en-US" sz="2400" dirty="0" err="1" smtClean="0">
+                <a:latin typeface="Courier New"/>
+              </a:rPr>
+              <a:t>observable.changed</a:t>
+            </a:r>
+            <a:r>
+              <a:rPr lang="en-US" sz="2400" dirty="0" smtClean="0">
+                <a:latin typeface="Courier New"/>
+              </a:rPr>
+              <a:t>(</a:t>
+            </a:r>
+            <a:r>
+              <a:rPr lang="en-US" sz="2400" dirty="0" smtClean="0">
+                <a:solidFill>
+                  <a:srgbClr val="2A00FF"/>
+                </a:solidFill>
+                <a:latin typeface="Courier New"/>
+              </a:rPr>
+              <a:t>"event"</a:t>
+            </a:r>
+            <a:r>
+              <a:rPr lang="en-US" sz="2400" dirty="0" smtClean="0">
+                <a:latin typeface="Courier New"/>
+              </a:rPr>
+              <a:t>)</a:t>
+            </a:r>
+          </a:p>
+          <a:p>
+            <a:r>
+              <a:rPr lang="en-US" sz="2400" dirty="0" smtClean="0">
+                <a:latin typeface="Courier New"/>
+              </a:rPr>
+              <a:t>    there </a:t>
+            </a:r>
+            <a:r>
+              <a:rPr lang="en-US" sz="2400" dirty="0" smtClean="0">
+                <a:latin typeface="Courier New"/>
+              </a:rPr>
+              <a:t>was one(observer).notify(</a:t>
+            </a:r>
+            <a:r>
+              <a:rPr lang="en-US" sz="2400" dirty="0" smtClean="0">
+                <a:solidFill>
+                  <a:srgbClr val="2A00FF"/>
+                </a:solidFill>
+                <a:latin typeface="Courier New"/>
+              </a:rPr>
+              <a:t>"event"</a:t>
+            </a:r>
+            <a:r>
+              <a:rPr lang="en-US" sz="2400" dirty="0" smtClean="0">
+                <a:latin typeface="Courier New"/>
+              </a:rPr>
+              <a:t>)</a:t>
+            </a:r>
+          </a:p>
+          <a:p>
+            <a:r>
+              <a:rPr lang="en-US" sz="2400" dirty="0" smtClean="0">
+                <a:latin typeface="Courier New"/>
+              </a:rPr>
+              <a:t>  }</a:t>
+            </a:r>
+          </a:p>
+          <a:p>
+            <a:r>
+              <a:rPr lang="en-US" sz="2400" dirty="0" smtClean="0">
+                <a:latin typeface="Courier New"/>
+              </a:rPr>
+              <a:t>  </a:t>
+            </a:r>
+            <a:r>
+              <a:rPr lang="en-US" sz="2400" dirty="0" smtClean="0">
+                <a:solidFill>
+                  <a:srgbClr val="2A00FF"/>
+                </a:solidFill>
+                <a:latin typeface="Courier New"/>
+              </a:rPr>
+              <a:t>"An observable must notify its observers with all events "</a:t>
+            </a:r>
+            <a:r>
+              <a:rPr lang="en-US" sz="2400" dirty="0" smtClean="0">
+                <a:solidFill>
+                  <a:srgbClr val="2A00FF"/>
+                </a:solidFill>
+                <a:latin typeface="Courier New"/>
+              </a:rPr>
+              <a:t> +</a:t>
+            </a:r>
+          </a:p>
+          <a:p>
+            <a:r>
+              <a:rPr lang="en-US" sz="2400" dirty="0" smtClean="0">
+                <a:solidFill>
+                  <a:srgbClr val="2A00FF"/>
+                </a:solidFill>
+                <a:latin typeface="Courier New"/>
+              </a:rPr>
+              <a:t> </a:t>
+            </a:r>
+            <a:r>
+              <a:rPr lang="en-US" sz="2400" dirty="0" smtClean="0">
+                <a:solidFill>
+                  <a:srgbClr val="2A00FF"/>
+                </a:solidFill>
+                <a:latin typeface="Courier New"/>
+              </a:rPr>
+              <a:t> "when </a:t>
+            </a:r>
+            <a:r>
+              <a:rPr lang="en-US" sz="2400" dirty="0" smtClean="0">
+                <a:solidFill>
+                  <a:srgbClr val="2A00FF"/>
+                </a:solidFill>
+                <a:latin typeface="Courier New"/>
+              </a:rPr>
+              <a:t>changed"</a:t>
+            </a:r>
+            <a:r>
+              <a:rPr lang="en-US" sz="2400" dirty="0" smtClean="0">
+                <a:latin typeface="Courier New"/>
+              </a:rPr>
+              <a:t> &gt;&gt; {</a:t>
+            </a:r>
+          </a:p>
+          <a:p>
+            <a:r>
+              <a:rPr lang="en-US" sz="2400" dirty="0" smtClean="0">
+                <a:latin typeface="Courier New"/>
+              </a:rPr>
+              <a:t>    </a:t>
+            </a:r>
+            <a:r>
+              <a:rPr lang="en-US" sz="2400" dirty="0" err="1" smtClean="0">
+                <a:latin typeface="Courier New"/>
+              </a:rPr>
+              <a:t>observable.changed</a:t>
+            </a:r>
+            <a:r>
+              <a:rPr lang="en-US" sz="2400" dirty="0" smtClean="0">
+                <a:latin typeface="Courier New"/>
+              </a:rPr>
+              <a:t>(</a:t>
+            </a:r>
+            <a:r>
+              <a:rPr lang="en-US" sz="2400" dirty="0" smtClean="0">
+                <a:solidFill>
+                  <a:srgbClr val="2A00FF"/>
+                </a:solidFill>
+                <a:latin typeface="Courier New"/>
+              </a:rPr>
+              <a:t>"event1"</a:t>
+            </a:r>
+            <a:r>
+              <a:rPr lang="en-US" sz="2400" dirty="0" smtClean="0">
+                <a:latin typeface="Courier New"/>
+              </a:rPr>
+              <a:t>)</a:t>
+            </a:r>
+          </a:p>
+          <a:p>
+            <a:r>
+              <a:rPr lang="en-US" sz="2400" dirty="0" smtClean="0">
+                <a:latin typeface="Courier New"/>
+              </a:rPr>
+              <a:t>    </a:t>
+            </a:r>
+            <a:r>
+              <a:rPr lang="en-US" sz="2400" dirty="0" err="1" smtClean="0">
+                <a:latin typeface="Courier New"/>
+              </a:rPr>
+              <a:t>observable.changed</a:t>
+            </a:r>
+            <a:r>
+              <a:rPr lang="en-US" sz="2400" dirty="0" smtClean="0">
+                <a:latin typeface="Courier New"/>
+              </a:rPr>
+              <a:t>(</a:t>
+            </a:r>
+            <a:r>
+              <a:rPr lang="en-US" sz="2400" dirty="0" smtClean="0">
+                <a:solidFill>
+                  <a:srgbClr val="2A00FF"/>
+                </a:solidFill>
+                <a:latin typeface="Courier New"/>
+              </a:rPr>
+              <a:t>"event2"</a:t>
+            </a:r>
+            <a:r>
+              <a:rPr lang="en-US" sz="2400" dirty="0" smtClean="0">
+                <a:latin typeface="Courier New"/>
+              </a:rPr>
+              <a:t>)</a:t>
+            </a:r>
+          </a:p>
+          <a:p>
+            <a:r>
+              <a:rPr lang="en-US" sz="2400" dirty="0" smtClean="0">
+                <a:latin typeface="Courier New"/>
+              </a:rPr>
+              <a:t>    there </a:t>
+            </a:r>
+            <a:r>
+              <a:rPr lang="en-US" sz="2400" dirty="0" smtClean="0">
+                <a:latin typeface="Courier New"/>
+              </a:rPr>
+              <a:t>was two(observer).notify(</a:t>
+            </a:r>
+            <a:r>
+              <a:rPr lang="en-US" sz="2400" dirty="0" err="1" smtClean="0">
+                <a:latin typeface="Courier New"/>
+              </a:rPr>
+              <a:t>startWith</a:t>
+            </a:r>
+            <a:r>
+              <a:rPr lang="en-US" sz="2400" dirty="0" smtClean="0">
+                <a:latin typeface="Courier New"/>
+              </a:rPr>
+              <a:t>(</a:t>
+            </a:r>
+            <a:r>
+              <a:rPr lang="en-US" sz="2400" dirty="0" smtClean="0">
+                <a:solidFill>
+                  <a:srgbClr val="2A00FF"/>
+                </a:solidFill>
+                <a:latin typeface="Courier New"/>
+              </a:rPr>
+              <a:t>"event"</a:t>
+            </a:r>
+            <a:r>
+              <a:rPr lang="en-US" sz="2400" dirty="0" smtClean="0">
+                <a:latin typeface="Courier New"/>
+              </a:rPr>
+              <a:t>))</a:t>
+            </a:r>
+          </a:p>
+          <a:p>
+            <a:r>
+              <a:rPr lang="en-US" sz="2400" dirty="0" smtClean="0">
+                <a:latin typeface="Courier New"/>
+              </a:rPr>
+              <a:t>  }</a:t>
+            </a:r>
+          </a:p>
+          <a:p>
+            <a:r>
+              <a:rPr lang="en-US" sz="2400" dirty="0" smtClean="0">
+                <a:latin typeface="Courier New"/>
+              </a:rPr>
+              <a:t>}</a:t>
+            </a:r>
+            <a:endParaRPr lang="en-US" sz="2400" dirty="0"/>
           </a:p>
         </p:txBody>
       </p:sp>
@@ -11302,7 +12865,7 @@
         </p:blipFill>
         <p:spPr bwMode="auto">
           <a:xfrm>
-            <a:off x="4749800" y="3429000"/>
+            <a:off x="4749800" y="3124200"/>
             <a:ext cx="2514600" cy="2514602"/>
           </a:xfrm>
           <a:prstGeom prst="rect">
@@ -11321,7 +12884,7 @@
         </p:nvSpPr>
         <p:spPr bwMode="auto">
           <a:xfrm>
-            <a:off x="6654800" y="2057400"/>
+            <a:off x="6654800" y="1752600"/>
             <a:ext cx="5410200" cy="914400"/>
           </a:xfrm>
           <a:prstGeom prst="rect">
@@ -12175,7 +13738,7 @@
         </p:nvSpPr>
         <p:spPr bwMode="auto">
           <a:xfrm>
-            <a:off x="1244600" y="1981200"/>
+            <a:off x="1244600" y="1676400"/>
             <a:ext cx="2032000" cy="914400"/>
           </a:xfrm>
           <a:prstGeom prst="rect">
@@ -12253,7 +13816,7 @@
         </p:nvSpPr>
         <p:spPr bwMode="auto">
           <a:xfrm rot="1855551">
-            <a:off x="1486578" y="2466618"/>
+            <a:off x="1486578" y="2161818"/>
             <a:ext cx="1524000" cy="76200"/>
           </a:xfrm>
           <a:prstGeom prst="rect">
@@ -12320,7 +13883,7 @@
         </p:nvSpPr>
         <p:spPr bwMode="auto">
           <a:xfrm rot="19739239">
-            <a:off x="1486578" y="2466618"/>
+            <a:off x="1486578" y="2161818"/>
             <a:ext cx="1524000" cy="76200"/>
           </a:xfrm>
           <a:prstGeom prst="rect">
@@ -12376,6 +13939,43 @@
               <a:ea typeface="ヒラギノ角ゴ ProN W3" pitchFamily="1" charset="-128"/>
               <a:sym typeface="Gill Sans" pitchFamily="1" charset="0"/>
             </a:endParaRPr>
+          </a:p>
+        </p:txBody>
+      </p:sp>
+      <p:sp>
+        <p:nvSpPr>
+          <p:cNvPr id="22" name="Rectangle 21"/>
+          <p:cNvSpPr/>
+          <p:nvPr/>
+        </p:nvSpPr>
+        <p:spPr>
+          <a:xfrm>
+            <a:off x="4597400" y="5257800"/>
+            <a:ext cx="2664512" cy="923330"/>
+          </a:xfrm>
+          <a:prstGeom prst="rect">
+            <a:avLst/>
+          </a:prstGeom>
+        </p:spPr>
+        <p:txBody>
+          <a:bodyPr wrap="none">
+            <a:spAutoFit/>
+          </a:bodyPr>
+          <a:lstStyle/>
+          <a:p>
+            <a:pPr algn="ctr"/>
+            <a:r>
+              <a:rPr lang="en-US" sz="5400" b="1" kern="0" dirty="0" smtClean="0">
+                <a:solidFill>
+                  <a:srgbClr val="0C0F20"/>
+                </a:solidFill>
+                <a:latin typeface="Lucida Handwriting" pitchFamily="66" charset="0"/>
+                <a:cs typeface="+mj-cs"/>
+                <a:sym typeface="Arial" charset="0"/>
+              </a:rPr>
+              <a:t>specify</a:t>
+            </a:r>
+            <a:endParaRPr lang="en-US" dirty="0"/>
           </a:p>
         </p:txBody>
       </p:sp>

</xml_diff>

<commit_message>
finished the mocks and started the implicit defs tips
</commit_message>
<xml_diff>
--- a/src/main/resources/oscon_2010_specs.pptx
+++ b/src/main/resources/oscon_2010_specs.pptx
@@ -6,7 +6,7 @@
     <p:sldMasterId id="2147483651" r:id="rId2"/>
   </p:sldMasterIdLst>
   <p:notesMasterIdLst>
-    <p:notesMasterId r:id="rId23"/>
+    <p:notesMasterId r:id="rId32"/>
   </p:notesMasterIdLst>
   <p:sldIdLst>
     <p:sldId id="258" r:id="rId3"/>
@@ -29,6 +29,15 @@
     <p:sldId id="275" r:id="rId20"/>
     <p:sldId id="277" r:id="rId21"/>
     <p:sldId id="276" r:id="rId22"/>
+    <p:sldId id="278" r:id="rId23"/>
+    <p:sldId id="279" r:id="rId24"/>
+    <p:sldId id="280" r:id="rId25"/>
+    <p:sldId id="281" r:id="rId26"/>
+    <p:sldId id="282" r:id="rId27"/>
+    <p:sldId id="283" r:id="rId28"/>
+    <p:sldId id="284" r:id="rId29"/>
+    <p:sldId id="285" r:id="rId30"/>
+    <p:sldId id="286" r:id="rId31"/>
   </p:sldIdLst>
   <p:sldSz cx="13004800" cy="9753600"/>
   <p:notesSz cx="6858000" cy="9144000"/>
@@ -1646,6 +1655,762 @@
               <a:rPr lang="en-US"/>
               <a:pPr/>
               <a:t>20</a:t>
+            </a:fld>
+            <a:endParaRPr lang="en-US"/>
+          </a:p>
+        </p:txBody>
+      </p:sp>
+      <p:sp>
+        <p:nvSpPr>
+          <p:cNvPr id="19458" name="Rectangle 2"/>
+          <p:cNvSpPr>
+            <a:spLocks noGrp="1" noRot="1" noChangeAspect="1" noChangeArrowheads="1" noTextEdit="1"/>
+          </p:cNvSpPr>
+          <p:nvPr>
+            <p:ph type="sldImg"/>
+          </p:nvPr>
+        </p:nvSpPr>
+        <p:spPr>
+          <a:ln/>
+        </p:spPr>
+      </p:sp>
+      <p:sp>
+        <p:nvSpPr>
+          <p:cNvPr id="19459" name="Rectangle 3"/>
+          <p:cNvSpPr>
+            <a:spLocks noGrp="1"/>
+          </p:cNvSpPr>
+          <p:nvPr>
+            <p:ph type="body" idx="1"/>
+          </p:nvPr>
+        </p:nvSpPr>
+        <p:spPr/>
+        <p:txBody>
+          <a:bodyPr/>
+          <a:lstStyle/>
+          <a:p>
+            <a:endParaRPr lang="en-US"/>
+          </a:p>
+        </p:txBody>
+      </p:sp>
+    </p:spTree>
+  </p:cSld>
+  <p:clrMapOvr>
+    <a:masterClrMapping/>
+  </p:clrMapOvr>
+</p:notes>
+</file>
+
+<file path=ppt/notesSlides/notesSlide21.xml><?xml version="1.0" encoding="utf-8"?>
+<p:notes xmlns:a="http://schemas.openxmlformats.org/drawingml/2006/main" xmlns:r="http://schemas.openxmlformats.org/officeDocument/2006/relationships" xmlns:p="http://schemas.openxmlformats.org/presentationml/2006/main">
+  <p:cSld>
+    <p:spTree>
+      <p:nvGrpSpPr>
+        <p:cNvPr id="1" name=""/>
+        <p:cNvGrpSpPr/>
+        <p:nvPr/>
+      </p:nvGrpSpPr>
+      <p:grpSpPr>
+        <a:xfrm>
+          <a:off x="0" y="0"/>
+          <a:ext cx="0" cy="0"/>
+          <a:chOff x="0" y="0"/>
+          <a:chExt cx="0" cy="0"/>
+        </a:xfrm>
+      </p:grpSpPr>
+      <p:sp>
+        <p:nvSpPr>
+          <p:cNvPr id="7" name="Rectangle 7"/>
+          <p:cNvSpPr>
+            <a:spLocks noGrp="1"/>
+          </p:cNvSpPr>
+          <p:nvPr>
+            <p:ph type="sldNum" sz="quarter" idx="5"/>
+          </p:nvPr>
+        </p:nvSpPr>
+        <p:spPr>
+          <a:ln/>
+        </p:spPr>
+        <p:txBody>
+          <a:bodyPr/>
+          <a:lstStyle/>
+          <a:p>
+            <a:fld id="{27AEA7DA-096A-4FB7-B4B3-D12717EF4BDD}" type="slidenum">
+              <a:rPr lang="en-US"/>
+              <a:pPr/>
+              <a:t>21</a:t>
+            </a:fld>
+            <a:endParaRPr lang="en-US"/>
+          </a:p>
+        </p:txBody>
+      </p:sp>
+      <p:sp>
+        <p:nvSpPr>
+          <p:cNvPr id="19458" name="Rectangle 2"/>
+          <p:cNvSpPr>
+            <a:spLocks noGrp="1" noRot="1" noChangeAspect="1" noChangeArrowheads="1" noTextEdit="1"/>
+          </p:cNvSpPr>
+          <p:nvPr>
+            <p:ph type="sldImg"/>
+          </p:nvPr>
+        </p:nvSpPr>
+        <p:spPr>
+          <a:ln/>
+        </p:spPr>
+      </p:sp>
+      <p:sp>
+        <p:nvSpPr>
+          <p:cNvPr id="19459" name="Rectangle 3"/>
+          <p:cNvSpPr>
+            <a:spLocks noGrp="1"/>
+          </p:cNvSpPr>
+          <p:nvPr>
+            <p:ph type="body" idx="1"/>
+          </p:nvPr>
+        </p:nvSpPr>
+        <p:spPr/>
+        <p:txBody>
+          <a:bodyPr/>
+          <a:lstStyle/>
+          <a:p>
+            <a:endParaRPr lang="en-US"/>
+          </a:p>
+        </p:txBody>
+      </p:sp>
+    </p:spTree>
+  </p:cSld>
+  <p:clrMapOvr>
+    <a:masterClrMapping/>
+  </p:clrMapOvr>
+</p:notes>
+</file>
+
+<file path=ppt/notesSlides/notesSlide22.xml><?xml version="1.0" encoding="utf-8"?>
+<p:notes xmlns:a="http://schemas.openxmlformats.org/drawingml/2006/main" xmlns:r="http://schemas.openxmlformats.org/officeDocument/2006/relationships" xmlns:p="http://schemas.openxmlformats.org/presentationml/2006/main">
+  <p:cSld>
+    <p:spTree>
+      <p:nvGrpSpPr>
+        <p:cNvPr id="1" name=""/>
+        <p:cNvGrpSpPr/>
+        <p:nvPr/>
+      </p:nvGrpSpPr>
+      <p:grpSpPr>
+        <a:xfrm>
+          <a:off x="0" y="0"/>
+          <a:ext cx="0" cy="0"/>
+          <a:chOff x="0" y="0"/>
+          <a:chExt cx="0" cy="0"/>
+        </a:xfrm>
+      </p:grpSpPr>
+      <p:sp>
+        <p:nvSpPr>
+          <p:cNvPr id="7" name="Rectangle 7"/>
+          <p:cNvSpPr>
+            <a:spLocks noGrp="1"/>
+          </p:cNvSpPr>
+          <p:nvPr>
+            <p:ph type="sldNum" sz="quarter" idx="5"/>
+          </p:nvPr>
+        </p:nvSpPr>
+        <p:spPr>
+          <a:ln/>
+        </p:spPr>
+        <p:txBody>
+          <a:bodyPr/>
+          <a:lstStyle/>
+          <a:p>
+            <a:fld id="{27AEA7DA-096A-4FB7-B4B3-D12717EF4BDD}" type="slidenum">
+              <a:rPr lang="en-US"/>
+              <a:pPr/>
+              <a:t>22</a:t>
+            </a:fld>
+            <a:endParaRPr lang="en-US"/>
+          </a:p>
+        </p:txBody>
+      </p:sp>
+      <p:sp>
+        <p:nvSpPr>
+          <p:cNvPr id="19458" name="Rectangle 2"/>
+          <p:cNvSpPr>
+            <a:spLocks noGrp="1" noRot="1" noChangeAspect="1" noChangeArrowheads="1" noTextEdit="1"/>
+          </p:cNvSpPr>
+          <p:nvPr>
+            <p:ph type="sldImg"/>
+          </p:nvPr>
+        </p:nvSpPr>
+        <p:spPr>
+          <a:ln/>
+        </p:spPr>
+      </p:sp>
+      <p:sp>
+        <p:nvSpPr>
+          <p:cNvPr id="19459" name="Rectangle 3"/>
+          <p:cNvSpPr>
+            <a:spLocks noGrp="1"/>
+          </p:cNvSpPr>
+          <p:nvPr>
+            <p:ph type="body" idx="1"/>
+          </p:nvPr>
+        </p:nvSpPr>
+        <p:spPr/>
+        <p:txBody>
+          <a:bodyPr/>
+          <a:lstStyle/>
+          <a:p>
+            <a:endParaRPr lang="en-US"/>
+          </a:p>
+        </p:txBody>
+      </p:sp>
+    </p:spTree>
+  </p:cSld>
+  <p:clrMapOvr>
+    <a:masterClrMapping/>
+  </p:clrMapOvr>
+</p:notes>
+</file>
+
+<file path=ppt/notesSlides/notesSlide23.xml><?xml version="1.0" encoding="utf-8"?>
+<p:notes xmlns:a="http://schemas.openxmlformats.org/drawingml/2006/main" xmlns:r="http://schemas.openxmlformats.org/officeDocument/2006/relationships" xmlns:p="http://schemas.openxmlformats.org/presentationml/2006/main">
+  <p:cSld>
+    <p:spTree>
+      <p:nvGrpSpPr>
+        <p:cNvPr id="1" name=""/>
+        <p:cNvGrpSpPr/>
+        <p:nvPr/>
+      </p:nvGrpSpPr>
+      <p:grpSpPr>
+        <a:xfrm>
+          <a:off x="0" y="0"/>
+          <a:ext cx="0" cy="0"/>
+          <a:chOff x="0" y="0"/>
+          <a:chExt cx="0" cy="0"/>
+        </a:xfrm>
+      </p:grpSpPr>
+      <p:sp>
+        <p:nvSpPr>
+          <p:cNvPr id="7" name="Rectangle 7"/>
+          <p:cNvSpPr>
+            <a:spLocks noGrp="1"/>
+          </p:cNvSpPr>
+          <p:nvPr>
+            <p:ph type="sldNum" sz="quarter" idx="5"/>
+          </p:nvPr>
+        </p:nvSpPr>
+        <p:spPr>
+          <a:ln/>
+        </p:spPr>
+        <p:txBody>
+          <a:bodyPr/>
+          <a:lstStyle/>
+          <a:p>
+            <a:fld id="{27AEA7DA-096A-4FB7-B4B3-D12717EF4BDD}" type="slidenum">
+              <a:rPr lang="en-US"/>
+              <a:pPr/>
+              <a:t>23</a:t>
+            </a:fld>
+            <a:endParaRPr lang="en-US"/>
+          </a:p>
+        </p:txBody>
+      </p:sp>
+      <p:sp>
+        <p:nvSpPr>
+          <p:cNvPr id="19458" name="Rectangle 2"/>
+          <p:cNvSpPr>
+            <a:spLocks noGrp="1" noRot="1" noChangeAspect="1" noChangeArrowheads="1" noTextEdit="1"/>
+          </p:cNvSpPr>
+          <p:nvPr>
+            <p:ph type="sldImg"/>
+          </p:nvPr>
+        </p:nvSpPr>
+        <p:spPr>
+          <a:ln/>
+        </p:spPr>
+      </p:sp>
+      <p:sp>
+        <p:nvSpPr>
+          <p:cNvPr id="19459" name="Rectangle 3"/>
+          <p:cNvSpPr>
+            <a:spLocks noGrp="1"/>
+          </p:cNvSpPr>
+          <p:nvPr>
+            <p:ph type="body" idx="1"/>
+          </p:nvPr>
+        </p:nvSpPr>
+        <p:spPr/>
+        <p:txBody>
+          <a:bodyPr/>
+          <a:lstStyle/>
+          <a:p>
+            <a:endParaRPr lang="en-US"/>
+          </a:p>
+        </p:txBody>
+      </p:sp>
+    </p:spTree>
+  </p:cSld>
+  <p:clrMapOvr>
+    <a:masterClrMapping/>
+  </p:clrMapOvr>
+</p:notes>
+</file>
+
+<file path=ppt/notesSlides/notesSlide24.xml><?xml version="1.0" encoding="utf-8"?>
+<p:notes xmlns:a="http://schemas.openxmlformats.org/drawingml/2006/main" xmlns:r="http://schemas.openxmlformats.org/officeDocument/2006/relationships" xmlns:p="http://schemas.openxmlformats.org/presentationml/2006/main">
+  <p:cSld>
+    <p:spTree>
+      <p:nvGrpSpPr>
+        <p:cNvPr id="1" name=""/>
+        <p:cNvGrpSpPr/>
+        <p:nvPr/>
+      </p:nvGrpSpPr>
+      <p:grpSpPr>
+        <a:xfrm>
+          <a:off x="0" y="0"/>
+          <a:ext cx="0" cy="0"/>
+          <a:chOff x="0" y="0"/>
+          <a:chExt cx="0" cy="0"/>
+        </a:xfrm>
+      </p:grpSpPr>
+      <p:sp>
+        <p:nvSpPr>
+          <p:cNvPr id="7" name="Rectangle 7"/>
+          <p:cNvSpPr>
+            <a:spLocks noGrp="1"/>
+          </p:cNvSpPr>
+          <p:nvPr>
+            <p:ph type="sldNum" sz="quarter" idx="5"/>
+          </p:nvPr>
+        </p:nvSpPr>
+        <p:spPr>
+          <a:ln/>
+        </p:spPr>
+        <p:txBody>
+          <a:bodyPr/>
+          <a:lstStyle/>
+          <a:p>
+            <a:fld id="{27AEA7DA-096A-4FB7-B4B3-D12717EF4BDD}" type="slidenum">
+              <a:rPr lang="en-US"/>
+              <a:pPr/>
+              <a:t>24</a:t>
+            </a:fld>
+            <a:endParaRPr lang="en-US"/>
+          </a:p>
+        </p:txBody>
+      </p:sp>
+      <p:sp>
+        <p:nvSpPr>
+          <p:cNvPr id="19458" name="Rectangle 2"/>
+          <p:cNvSpPr>
+            <a:spLocks noGrp="1" noRot="1" noChangeAspect="1" noChangeArrowheads="1" noTextEdit="1"/>
+          </p:cNvSpPr>
+          <p:nvPr>
+            <p:ph type="sldImg"/>
+          </p:nvPr>
+        </p:nvSpPr>
+        <p:spPr>
+          <a:ln/>
+        </p:spPr>
+      </p:sp>
+      <p:sp>
+        <p:nvSpPr>
+          <p:cNvPr id="19459" name="Rectangle 3"/>
+          <p:cNvSpPr>
+            <a:spLocks noGrp="1"/>
+          </p:cNvSpPr>
+          <p:nvPr>
+            <p:ph type="body" idx="1"/>
+          </p:nvPr>
+        </p:nvSpPr>
+        <p:spPr/>
+        <p:txBody>
+          <a:bodyPr/>
+          <a:lstStyle/>
+          <a:p>
+            <a:endParaRPr lang="en-US"/>
+          </a:p>
+        </p:txBody>
+      </p:sp>
+    </p:spTree>
+  </p:cSld>
+  <p:clrMapOvr>
+    <a:masterClrMapping/>
+  </p:clrMapOvr>
+</p:notes>
+</file>
+
+<file path=ppt/notesSlides/notesSlide25.xml><?xml version="1.0" encoding="utf-8"?>
+<p:notes xmlns:a="http://schemas.openxmlformats.org/drawingml/2006/main" xmlns:r="http://schemas.openxmlformats.org/officeDocument/2006/relationships" xmlns:p="http://schemas.openxmlformats.org/presentationml/2006/main">
+  <p:cSld>
+    <p:spTree>
+      <p:nvGrpSpPr>
+        <p:cNvPr id="1" name=""/>
+        <p:cNvGrpSpPr/>
+        <p:nvPr/>
+      </p:nvGrpSpPr>
+      <p:grpSpPr>
+        <a:xfrm>
+          <a:off x="0" y="0"/>
+          <a:ext cx="0" cy="0"/>
+          <a:chOff x="0" y="0"/>
+          <a:chExt cx="0" cy="0"/>
+        </a:xfrm>
+      </p:grpSpPr>
+      <p:sp>
+        <p:nvSpPr>
+          <p:cNvPr id="7" name="Rectangle 7"/>
+          <p:cNvSpPr>
+            <a:spLocks noGrp="1"/>
+          </p:cNvSpPr>
+          <p:nvPr>
+            <p:ph type="sldNum" sz="quarter" idx="5"/>
+          </p:nvPr>
+        </p:nvSpPr>
+        <p:spPr>
+          <a:ln/>
+        </p:spPr>
+        <p:txBody>
+          <a:bodyPr/>
+          <a:lstStyle/>
+          <a:p>
+            <a:fld id="{27AEA7DA-096A-4FB7-B4B3-D12717EF4BDD}" type="slidenum">
+              <a:rPr lang="en-US"/>
+              <a:pPr/>
+              <a:t>25</a:t>
+            </a:fld>
+            <a:endParaRPr lang="en-US"/>
+          </a:p>
+        </p:txBody>
+      </p:sp>
+      <p:sp>
+        <p:nvSpPr>
+          <p:cNvPr id="19458" name="Rectangle 2"/>
+          <p:cNvSpPr>
+            <a:spLocks noGrp="1" noRot="1" noChangeAspect="1" noChangeArrowheads="1" noTextEdit="1"/>
+          </p:cNvSpPr>
+          <p:nvPr>
+            <p:ph type="sldImg"/>
+          </p:nvPr>
+        </p:nvSpPr>
+        <p:spPr>
+          <a:ln/>
+        </p:spPr>
+      </p:sp>
+      <p:sp>
+        <p:nvSpPr>
+          <p:cNvPr id="19459" name="Rectangle 3"/>
+          <p:cNvSpPr>
+            <a:spLocks noGrp="1"/>
+          </p:cNvSpPr>
+          <p:nvPr>
+            <p:ph type="body" idx="1"/>
+          </p:nvPr>
+        </p:nvSpPr>
+        <p:spPr/>
+        <p:txBody>
+          <a:bodyPr/>
+          <a:lstStyle/>
+          <a:p>
+            <a:endParaRPr lang="en-US"/>
+          </a:p>
+        </p:txBody>
+      </p:sp>
+    </p:spTree>
+  </p:cSld>
+  <p:clrMapOvr>
+    <a:masterClrMapping/>
+  </p:clrMapOvr>
+</p:notes>
+</file>
+
+<file path=ppt/notesSlides/notesSlide26.xml><?xml version="1.0" encoding="utf-8"?>
+<p:notes xmlns:a="http://schemas.openxmlformats.org/drawingml/2006/main" xmlns:r="http://schemas.openxmlformats.org/officeDocument/2006/relationships" xmlns:p="http://schemas.openxmlformats.org/presentationml/2006/main">
+  <p:cSld>
+    <p:spTree>
+      <p:nvGrpSpPr>
+        <p:cNvPr id="1" name=""/>
+        <p:cNvGrpSpPr/>
+        <p:nvPr/>
+      </p:nvGrpSpPr>
+      <p:grpSpPr>
+        <a:xfrm>
+          <a:off x="0" y="0"/>
+          <a:ext cx="0" cy="0"/>
+          <a:chOff x="0" y="0"/>
+          <a:chExt cx="0" cy="0"/>
+        </a:xfrm>
+      </p:grpSpPr>
+      <p:sp>
+        <p:nvSpPr>
+          <p:cNvPr id="7" name="Rectangle 7"/>
+          <p:cNvSpPr>
+            <a:spLocks noGrp="1"/>
+          </p:cNvSpPr>
+          <p:nvPr>
+            <p:ph type="sldNum" sz="quarter" idx="5"/>
+          </p:nvPr>
+        </p:nvSpPr>
+        <p:spPr>
+          <a:ln/>
+        </p:spPr>
+        <p:txBody>
+          <a:bodyPr/>
+          <a:lstStyle/>
+          <a:p>
+            <a:fld id="{27AEA7DA-096A-4FB7-B4B3-D12717EF4BDD}" type="slidenum">
+              <a:rPr lang="en-US"/>
+              <a:pPr/>
+              <a:t>26</a:t>
+            </a:fld>
+            <a:endParaRPr lang="en-US"/>
+          </a:p>
+        </p:txBody>
+      </p:sp>
+      <p:sp>
+        <p:nvSpPr>
+          <p:cNvPr id="19458" name="Rectangle 2"/>
+          <p:cNvSpPr>
+            <a:spLocks noGrp="1" noRot="1" noChangeAspect="1" noChangeArrowheads="1" noTextEdit="1"/>
+          </p:cNvSpPr>
+          <p:nvPr>
+            <p:ph type="sldImg"/>
+          </p:nvPr>
+        </p:nvSpPr>
+        <p:spPr>
+          <a:ln/>
+        </p:spPr>
+      </p:sp>
+      <p:sp>
+        <p:nvSpPr>
+          <p:cNvPr id="19459" name="Rectangle 3"/>
+          <p:cNvSpPr>
+            <a:spLocks noGrp="1"/>
+          </p:cNvSpPr>
+          <p:nvPr>
+            <p:ph type="body" idx="1"/>
+          </p:nvPr>
+        </p:nvSpPr>
+        <p:spPr/>
+        <p:txBody>
+          <a:bodyPr/>
+          <a:lstStyle/>
+          <a:p>
+            <a:endParaRPr lang="en-US"/>
+          </a:p>
+        </p:txBody>
+      </p:sp>
+    </p:spTree>
+  </p:cSld>
+  <p:clrMapOvr>
+    <a:masterClrMapping/>
+  </p:clrMapOvr>
+</p:notes>
+</file>
+
+<file path=ppt/notesSlides/notesSlide27.xml><?xml version="1.0" encoding="utf-8"?>
+<p:notes xmlns:a="http://schemas.openxmlformats.org/drawingml/2006/main" xmlns:r="http://schemas.openxmlformats.org/officeDocument/2006/relationships" xmlns:p="http://schemas.openxmlformats.org/presentationml/2006/main">
+  <p:cSld>
+    <p:spTree>
+      <p:nvGrpSpPr>
+        <p:cNvPr id="1" name=""/>
+        <p:cNvGrpSpPr/>
+        <p:nvPr/>
+      </p:nvGrpSpPr>
+      <p:grpSpPr>
+        <a:xfrm>
+          <a:off x="0" y="0"/>
+          <a:ext cx="0" cy="0"/>
+          <a:chOff x="0" y="0"/>
+          <a:chExt cx="0" cy="0"/>
+        </a:xfrm>
+      </p:grpSpPr>
+      <p:sp>
+        <p:nvSpPr>
+          <p:cNvPr id="7" name="Rectangle 7"/>
+          <p:cNvSpPr>
+            <a:spLocks noGrp="1"/>
+          </p:cNvSpPr>
+          <p:nvPr>
+            <p:ph type="sldNum" sz="quarter" idx="5"/>
+          </p:nvPr>
+        </p:nvSpPr>
+        <p:spPr>
+          <a:ln/>
+        </p:spPr>
+        <p:txBody>
+          <a:bodyPr/>
+          <a:lstStyle/>
+          <a:p>
+            <a:fld id="{27AEA7DA-096A-4FB7-B4B3-D12717EF4BDD}" type="slidenum">
+              <a:rPr lang="en-US"/>
+              <a:pPr/>
+              <a:t>27</a:t>
+            </a:fld>
+            <a:endParaRPr lang="en-US"/>
+          </a:p>
+        </p:txBody>
+      </p:sp>
+      <p:sp>
+        <p:nvSpPr>
+          <p:cNvPr id="19458" name="Rectangle 2"/>
+          <p:cNvSpPr>
+            <a:spLocks noGrp="1" noRot="1" noChangeAspect="1" noChangeArrowheads="1" noTextEdit="1"/>
+          </p:cNvSpPr>
+          <p:nvPr>
+            <p:ph type="sldImg"/>
+          </p:nvPr>
+        </p:nvSpPr>
+        <p:spPr>
+          <a:ln/>
+        </p:spPr>
+      </p:sp>
+      <p:sp>
+        <p:nvSpPr>
+          <p:cNvPr id="19459" name="Rectangle 3"/>
+          <p:cNvSpPr>
+            <a:spLocks noGrp="1"/>
+          </p:cNvSpPr>
+          <p:nvPr>
+            <p:ph type="body" idx="1"/>
+          </p:nvPr>
+        </p:nvSpPr>
+        <p:spPr/>
+        <p:txBody>
+          <a:bodyPr/>
+          <a:lstStyle/>
+          <a:p>
+            <a:endParaRPr lang="en-US"/>
+          </a:p>
+        </p:txBody>
+      </p:sp>
+    </p:spTree>
+  </p:cSld>
+  <p:clrMapOvr>
+    <a:masterClrMapping/>
+  </p:clrMapOvr>
+</p:notes>
+</file>
+
+<file path=ppt/notesSlides/notesSlide28.xml><?xml version="1.0" encoding="utf-8"?>
+<p:notes xmlns:a="http://schemas.openxmlformats.org/drawingml/2006/main" xmlns:r="http://schemas.openxmlformats.org/officeDocument/2006/relationships" xmlns:p="http://schemas.openxmlformats.org/presentationml/2006/main">
+  <p:cSld>
+    <p:spTree>
+      <p:nvGrpSpPr>
+        <p:cNvPr id="1" name=""/>
+        <p:cNvGrpSpPr/>
+        <p:nvPr/>
+      </p:nvGrpSpPr>
+      <p:grpSpPr>
+        <a:xfrm>
+          <a:off x="0" y="0"/>
+          <a:ext cx="0" cy="0"/>
+          <a:chOff x="0" y="0"/>
+          <a:chExt cx="0" cy="0"/>
+        </a:xfrm>
+      </p:grpSpPr>
+      <p:sp>
+        <p:nvSpPr>
+          <p:cNvPr id="7" name="Rectangle 7"/>
+          <p:cNvSpPr>
+            <a:spLocks noGrp="1"/>
+          </p:cNvSpPr>
+          <p:nvPr>
+            <p:ph type="sldNum" sz="quarter" idx="5"/>
+          </p:nvPr>
+        </p:nvSpPr>
+        <p:spPr>
+          <a:ln/>
+        </p:spPr>
+        <p:txBody>
+          <a:bodyPr/>
+          <a:lstStyle/>
+          <a:p>
+            <a:fld id="{27AEA7DA-096A-4FB7-B4B3-D12717EF4BDD}" type="slidenum">
+              <a:rPr lang="en-US"/>
+              <a:pPr/>
+              <a:t>28</a:t>
+            </a:fld>
+            <a:endParaRPr lang="en-US"/>
+          </a:p>
+        </p:txBody>
+      </p:sp>
+      <p:sp>
+        <p:nvSpPr>
+          <p:cNvPr id="19458" name="Rectangle 2"/>
+          <p:cNvSpPr>
+            <a:spLocks noGrp="1" noRot="1" noChangeAspect="1" noChangeArrowheads="1" noTextEdit="1"/>
+          </p:cNvSpPr>
+          <p:nvPr>
+            <p:ph type="sldImg"/>
+          </p:nvPr>
+        </p:nvSpPr>
+        <p:spPr>
+          <a:ln/>
+        </p:spPr>
+      </p:sp>
+      <p:sp>
+        <p:nvSpPr>
+          <p:cNvPr id="19459" name="Rectangle 3"/>
+          <p:cNvSpPr>
+            <a:spLocks noGrp="1"/>
+          </p:cNvSpPr>
+          <p:nvPr>
+            <p:ph type="body" idx="1"/>
+          </p:nvPr>
+        </p:nvSpPr>
+        <p:spPr/>
+        <p:txBody>
+          <a:bodyPr/>
+          <a:lstStyle/>
+          <a:p>
+            <a:endParaRPr lang="en-US"/>
+          </a:p>
+        </p:txBody>
+      </p:sp>
+    </p:spTree>
+  </p:cSld>
+  <p:clrMapOvr>
+    <a:masterClrMapping/>
+  </p:clrMapOvr>
+</p:notes>
+</file>
+
+<file path=ppt/notesSlides/notesSlide29.xml><?xml version="1.0" encoding="utf-8"?>
+<p:notes xmlns:a="http://schemas.openxmlformats.org/drawingml/2006/main" xmlns:r="http://schemas.openxmlformats.org/officeDocument/2006/relationships" xmlns:p="http://schemas.openxmlformats.org/presentationml/2006/main">
+  <p:cSld>
+    <p:spTree>
+      <p:nvGrpSpPr>
+        <p:cNvPr id="1" name=""/>
+        <p:cNvGrpSpPr/>
+        <p:nvPr/>
+      </p:nvGrpSpPr>
+      <p:grpSpPr>
+        <a:xfrm>
+          <a:off x="0" y="0"/>
+          <a:ext cx="0" cy="0"/>
+          <a:chOff x="0" y="0"/>
+          <a:chExt cx="0" cy="0"/>
+        </a:xfrm>
+      </p:grpSpPr>
+      <p:sp>
+        <p:nvSpPr>
+          <p:cNvPr id="7" name="Rectangle 7"/>
+          <p:cNvSpPr>
+            <a:spLocks noGrp="1"/>
+          </p:cNvSpPr>
+          <p:nvPr>
+            <p:ph type="sldNum" sz="quarter" idx="5"/>
+          </p:nvPr>
+        </p:nvSpPr>
+        <p:spPr>
+          <a:ln/>
+        </p:spPr>
+        <p:txBody>
+          <a:bodyPr/>
+          <a:lstStyle/>
+          <a:p>
+            <a:fld id="{27AEA7DA-096A-4FB7-B4B3-D12717EF4BDD}" type="slidenum">
+              <a:rPr lang="en-US"/>
+              <a:pPr/>
+              <a:t>29</a:t>
             </a:fld>
             <a:endParaRPr lang="en-US"/>
           </a:p>
@@ -11538,7 +12303,25 @@
                 </a:solidFill>
                 <a:latin typeface="Courier New"/>
               </a:rPr>
-              <a:t>"An observable must notify its observers with all events "</a:t>
+              <a:t>"An observable must notify its observers </a:t>
+            </a:r>
+            <a:r>
+              <a:rPr lang="en-US" sz="2400" dirty="0" smtClean="0">
+                <a:solidFill>
+                  <a:srgbClr val="2A00FF"/>
+                </a:solidFill>
+                <a:latin typeface="Courier New"/>
+              </a:rPr>
+              <a:t>for each events </a:t>
+            </a:r>
+            <a:r>
+              <a:rPr lang="en-US" sz="2400" dirty="0" smtClean="0">
+                <a:solidFill>
+                  <a:srgbClr val="2A00FF"/>
+                </a:solidFill>
+                <a:latin typeface="Courier New"/>
+              </a:rPr>
+              <a:t>"</a:t>
             </a:r>
             <a:r>
               <a:rPr lang="en-US" sz="2400" dirty="0" smtClean="0">
@@ -11727,6 +12510,3949 @@
     <p:tnLst>
       <p:par>
         <p:cTn id="1" dur="indefinite" restart="never" nodeType="tmRoot"/>
+      </p:par>
+    </p:tnLst>
+  </p:timing>
+</p:sld>
+</file>
+
+<file path=ppt/slides/slide21.xml><?xml version="1.0" encoding="utf-8"?>
+<p:sld xmlns:a="http://schemas.openxmlformats.org/drawingml/2006/main" xmlns:r="http://schemas.openxmlformats.org/officeDocument/2006/relationships" xmlns:p="http://schemas.openxmlformats.org/presentationml/2006/main">
+  <p:cSld>
+    <p:spTree>
+      <p:nvGrpSpPr>
+        <p:cNvPr id="1" name=""/>
+        <p:cNvGrpSpPr/>
+        <p:nvPr/>
+      </p:nvGrpSpPr>
+      <p:grpSpPr>
+        <a:xfrm>
+          <a:off x="0" y="0"/>
+          <a:ext cx="0" cy="0"/>
+          <a:chOff x="0" y="0"/>
+          <a:chExt cx="0" cy="0"/>
+        </a:xfrm>
+      </p:grpSpPr>
+      <p:sp>
+        <p:nvSpPr>
+          <p:cNvPr id="8193" name="Rectangle 1"/>
+          <p:cNvSpPr>
+            <a:spLocks noGrp="1" noChangeArrowheads="1"/>
+          </p:cNvSpPr>
+          <p:nvPr>
+            <p:ph type="title"/>
+          </p:nvPr>
+        </p:nvSpPr>
+        <p:spPr>
+          <a:xfrm>
+            <a:off x="711200" y="0"/>
+            <a:ext cx="12509500" cy="914400"/>
+          </a:xfrm>
+          <a:ln/>
+        </p:spPr>
+        <p:txBody>
+          <a:bodyPr/>
+          <a:lstStyle/>
+          <a:p>
+            <a:pPr lvl="0"/>
+            <a:r>
+              <a:rPr lang="en-US" sz="5400" dirty="0" smtClean="0">
+                <a:latin typeface="Lucida Handwriting" pitchFamily="66" charset="0"/>
+              </a:rPr>
+              <a:t>     </a:t>
+            </a:r>
+            <a:r>
+              <a:rPr lang="en-US" sz="5400" dirty="0" smtClean="0">
+                <a:latin typeface="Lucida Handwriting" pitchFamily="66" charset="0"/>
+              </a:rPr>
+              <a:t>DSL</a:t>
+            </a:r>
+            <a:endParaRPr lang="en-US" dirty="0"/>
+          </a:p>
+        </p:txBody>
+      </p:sp>
+      <p:pic>
+        <p:nvPicPr>
+          <p:cNvPr id="64516" name="Picture 4" descr="help, question mark, support icon"/>
+          <p:cNvPicPr>
+            <a:picLocks noChangeAspect="1" noChangeArrowheads="1"/>
+          </p:cNvPicPr>
+          <p:nvPr/>
+        </p:nvPicPr>
+        <p:blipFill>
+          <a:blip r:embed="rId3"/>
+          <a:srcRect/>
+          <a:stretch>
+            <a:fillRect/>
+          </a:stretch>
+        </p:blipFill>
+        <p:spPr bwMode="auto">
+          <a:xfrm>
+            <a:off x="5359400" y="2514598"/>
+            <a:ext cx="2362200" cy="2362202"/>
+          </a:xfrm>
+          <a:prstGeom prst="rect">
+            <a:avLst/>
+          </a:prstGeom>
+          <a:noFill/>
+        </p:spPr>
+      </p:pic>
+      <p:sp>
+        <p:nvSpPr>
+          <p:cNvPr id="7" name="Rectangle 6"/>
+          <p:cNvSpPr/>
+          <p:nvPr/>
+        </p:nvSpPr>
+        <p:spPr>
+          <a:xfrm>
+            <a:off x="3936133" y="5257800"/>
+            <a:ext cx="5309467" cy="923330"/>
+          </a:xfrm>
+          <a:prstGeom prst="rect">
+            <a:avLst/>
+          </a:prstGeom>
+        </p:spPr>
+        <p:txBody>
+          <a:bodyPr wrap="none">
+            <a:spAutoFit/>
+          </a:bodyPr>
+          <a:lstStyle/>
+          <a:p>
+            <a:pPr algn="ctr"/>
+            <a:r>
+              <a:rPr lang="en-US" sz="5400" b="1" kern="0" dirty="0" smtClean="0">
+                <a:solidFill>
+                  <a:srgbClr val="0C0F20"/>
+                </a:solidFill>
+                <a:latin typeface="Lucida Handwriting" pitchFamily="66" charset="0"/>
+                <a:cs typeface="+mj-cs"/>
+                <a:sym typeface="Arial" charset="0"/>
+              </a:rPr>
+              <a:t>How to do it?</a:t>
+            </a:r>
+            <a:endParaRPr lang="en-US" dirty="0"/>
+          </a:p>
+        </p:txBody>
+      </p:sp>
+      <p:pic>
+        <p:nvPicPr>
+          <p:cNvPr id="8" name="Picture 10" descr="http://knowledgehub.zeus.com/media/Scala_Logo2008.png"/>
+          <p:cNvPicPr>
+            <a:picLocks noChangeAspect="1" noChangeArrowheads="1"/>
+          </p:cNvPicPr>
+          <p:nvPr/>
+        </p:nvPicPr>
+        <p:blipFill>
+          <a:blip r:embed="rId4"/>
+          <a:srcRect/>
+          <a:stretch>
+            <a:fillRect/>
+          </a:stretch>
+        </p:blipFill>
+        <p:spPr bwMode="auto">
+          <a:xfrm>
+            <a:off x="4140200" y="76200"/>
+            <a:ext cx="2279542" cy="679257"/>
+          </a:xfrm>
+          <a:prstGeom prst="rect">
+            <a:avLst/>
+          </a:prstGeom>
+          <a:noFill/>
+        </p:spPr>
+      </p:pic>
+    </p:spTree>
+  </p:cSld>
+  <p:clrMapOvr>
+    <a:masterClrMapping/>
+  </p:clrMapOvr>
+  <p:transition>
+    <p:fade/>
+  </p:transition>
+  <p:timing>
+    <p:tnLst>
+      <p:par>
+        <p:cTn id="1" dur="indefinite" restart="never" nodeType="tmRoot">
+          <p:childTnLst>
+            <p:seq concurrent="1" nextAc="seek">
+              <p:cTn id="2" dur="indefinite" nodeType="mainSeq">
+                <p:childTnLst>
+                  <p:par>
+                    <p:cTn id="3" fill="hold">
+                      <p:stCondLst>
+                        <p:cond delay="indefinite"/>
+                        <p:cond evt="onBegin" delay="0">
+                          <p:tn val="2"/>
+                        </p:cond>
+                      </p:stCondLst>
+                      <p:childTnLst>
+                        <p:par>
+                          <p:cTn id="4" fill="hold">
+                            <p:stCondLst>
+                              <p:cond delay="0"/>
+                            </p:stCondLst>
+                            <p:childTnLst>
+                              <p:par>
+                                <p:cTn id="5" presetID="1" presetClass="entr" presetSubtype="0" fill="hold" nodeType="withEffect">
+                                  <p:stCondLst>
+                                    <p:cond delay="0"/>
+                                  </p:stCondLst>
+                                  <p:childTnLst>
+                                    <p:set>
+                                      <p:cBhvr>
+                                        <p:cTn id="6" dur="1" fill="hold">
+                                          <p:stCondLst>
+                                            <p:cond delay="0"/>
+                                          </p:stCondLst>
+                                        </p:cTn>
+                                        <p:tgtEl>
+                                          <p:spTgt spid="8"/>
+                                        </p:tgtEl>
+                                        <p:attrNameLst>
+                                          <p:attrName>style.visibility</p:attrName>
+                                        </p:attrNameLst>
+                                      </p:cBhvr>
+                                      <p:to>
+                                        <p:strVal val="visible"/>
+                                      </p:to>
+                                    </p:set>
+                                  </p:childTnLst>
+                                </p:cTn>
+                              </p:par>
+                            </p:childTnLst>
+                          </p:cTn>
+                        </p:par>
+                      </p:childTnLst>
+                    </p:cTn>
+                  </p:par>
+                </p:childTnLst>
+              </p:cTn>
+              <p:prevCondLst>
+                <p:cond evt="onPrev" delay="0">
+                  <p:tgtEl>
+                    <p:sldTgt/>
+                  </p:tgtEl>
+                </p:cond>
+              </p:prevCondLst>
+              <p:nextCondLst>
+                <p:cond evt="onNext" delay="0">
+                  <p:tgtEl>
+                    <p:sldTgt/>
+                  </p:tgtEl>
+                </p:cond>
+              </p:nextCondLst>
+            </p:seq>
+          </p:childTnLst>
+        </p:cTn>
+      </p:par>
+    </p:tnLst>
+  </p:timing>
+</p:sld>
+</file>
+
+<file path=ppt/slides/slide22.xml><?xml version="1.0" encoding="utf-8"?>
+<p:sld xmlns:a="http://schemas.openxmlformats.org/drawingml/2006/main" xmlns:r="http://schemas.openxmlformats.org/officeDocument/2006/relationships" xmlns:p="http://schemas.openxmlformats.org/presentationml/2006/main">
+  <p:cSld>
+    <p:spTree>
+      <p:nvGrpSpPr>
+        <p:cNvPr id="1" name=""/>
+        <p:cNvGrpSpPr/>
+        <p:nvPr/>
+      </p:nvGrpSpPr>
+      <p:grpSpPr>
+        <a:xfrm>
+          <a:off x="0" y="0"/>
+          <a:ext cx="0" cy="0"/>
+          <a:chOff x="0" y="0"/>
+          <a:chExt cx="0" cy="0"/>
+        </a:xfrm>
+      </p:grpSpPr>
+      <p:sp>
+        <p:nvSpPr>
+          <p:cNvPr id="8193" name="Rectangle 1"/>
+          <p:cNvSpPr>
+            <a:spLocks noGrp="1" noChangeArrowheads="1"/>
+          </p:cNvSpPr>
+          <p:nvPr>
+            <p:ph type="title"/>
+          </p:nvPr>
+        </p:nvSpPr>
+        <p:spPr>
+          <a:xfrm>
+            <a:off x="711200" y="0"/>
+            <a:ext cx="12509500" cy="914400"/>
+          </a:xfrm>
+          <a:ln/>
+        </p:spPr>
+        <p:txBody>
+          <a:bodyPr/>
+          <a:lstStyle/>
+          <a:p>
+            <a:pPr lvl="0"/>
+            <a:r>
+              <a:rPr lang="en-US" sz="5400" dirty="0" smtClean="0">
+                <a:latin typeface="Lucida Handwriting" pitchFamily="66" charset="0"/>
+              </a:rPr>
+              <a:t>     </a:t>
+            </a:r>
+            <a:r>
+              <a:rPr lang="en-US" sz="5400" dirty="0" smtClean="0">
+                <a:latin typeface="Lucida Handwriting" pitchFamily="66" charset="0"/>
+              </a:rPr>
+              <a:t>DSL</a:t>
+            </a:r>
+            <a:endParaRPr lang="en-US" dirty="0"/>
+          </a:p>
+        </p:txBody>
+      </p:sp>
+      <p:sp>
+        <p:nvSpPr>
+          <p:cNvPr id="7" name="Rectangle 6"/>
+          <p:cNvSpPr/>
+          <p:nvPr/>
+        </p:nvSpPr>
+        <p:spPr>
+          <a:xfrm>
+            <a:off x="3073400" y="1600200"/>
+            <a:ext cx="8509061" cy="923330"/>
+          </a:xfrm>
+          <a:prstGeom prst="rect">
+            <a:avLst/>
+          </a:prstGeom>
+        </p:spPr>
+        <p:txBody>
+          <a:bodyPr wrap="none">
+            <a:spAutoFit/>
+          </a:bodyPr>
+          <a:lstStyle/>
+          <a:p>
+            <a:pPr algn="ctr"/>
+            <a:r>
+              <a:rPr lang="en-US" sz="5400" b="1" kern="0" dirty="0" smtClean="0">
+                <a:solidFill>
+                  <a:srgbClr val="0C0F20"/>
+                </a:solidFill>
+                <a:latin typeface="Lucida Handwriting" pitchFamily="66" charset="0"/>
+                <a:cs typeface="+mj-cs"/>
+                <a:sym typeface="Arial" charset="0"/>
+              </a:rPr>
+              <a:t>The  king of all tricks</a:t>
+            </a:r>
+            <a:endParaRPr lang="en-US" dirty="0"/>
+          </a:p>
+        </p:txBody>
+      </p:sp>
+      <p:pic>
+        <p:nvPicPr>
+          <p:cNvPr id="8" name="Picture 10" descr="http://knowledgehub.zeus.com/media/Scala_Logo2008.png"/>
+          <p:cNvPicPr>
+            <a:picLocks noChangeAspect="1" noChangeArrowheads="1"/>
+          </p:cNvPicPr>
+          <p:nvPr/>
+        </p:nvPicPr>
+        <p:blipFill>
+          <a:blip r:embed="rId3"/>
+          <a:srcRect/>
+          <a:stretch>
+            <a:fillRect/>
+          </a:stretch>
+        </p:blipFill>
+        <p:spPr bwMode="auto">
+          <a:xfrm>
+            <a:off x="4140200" y="76200"/>
+            <a:ext cx="2279542" cy="679257"/>
+          </a:xfrm>
+          <a:prstGeom prst="rect">
+            <a:avLst/>
+          </a:prstGeom>
+          <a:noFill/>
+        </p:spPr>
+      </p:pic>
+      <p:pic>
+        <p:nvPicPr>
+          <p:cNvPr id="9" name="Picture 2" descr="crown, king icon"/>
+          <p:cNvPicPr>
+            <a:picLocks noChangeAspect="1" noChangeArrowheads="1"/>
+          </p:cNvPicPr>
+          <p:nvPr/>
+        </p:nvPicPr>
+        <p:blipFill>
+          <a:blip r:embed="rId4"/>
+          <a:srcRect/>
+          <a:stretch>
+            <a:fillRect/>
+          </a:stretch>
+        </p:blipFill>
+        <p:spPr bwMode="auto">
+          <a:xfrm>
+            <a:off x="1168400" y="1295400"/>
+            <a:ext cx="1447800" cy="1447801"/>
+          </a:xfrm>
+          <a:prstGeom prst="rect">
+            <a:avLst/>
+          </a:prstGeom>
+          <a:noFill/>
+        </p:spPr>
+      </p:pic>
+      <p:sp>
+        <p:nvSpPr>
+          <p:cNvPr id="10" name="Rectangle 9"/>
+          <p:cNvSpPr/>
+          <p:nvPr/>
+        </p:nvSpPr>
+        <p:spPr>
+          <a:xfrm>
+            <a:off x="330200" y="3459301"/>
+            <a:ext cx="12344400" cy="3170099"/>
+          </a:xfrm>
+          <a:prstGeom prst="rect">
+            <a:avLst/>
+          </a:prstGeom>
+          <a:ln>
+            <a:solidFill>
+              <a:schemeClr val="tx1"/>
+            </a:solidFill>
+            <a:prstDash val="dash"/>
+          </a:ln>
+        </p:spPr>
+        <p:txBody>
+          <a:bodyPr wrap="square">
+            <a:spAutoFit/>
+          </a:bodyPr>
+          <a:lstStyle/>
+          <a:p>
+            <a:r>
+              <a:rPr lang="en-US" sz="4000" dirty="0" smtClean="0">
+                <a:solidFill>
+                  <a:srgbClr val="2A00FF"/>
+                </a:solidFill>
+                <a:latin typeface="Courier New"/>
+              </a:rPr>
+              <a:t>  "</a:t>
+            </a:r>
+            <a:r>
+              <a:rPr lang="en-US" sz="4000" dirty="0" smtClean="0">
+                <a:solidFill>
+                  <a:srgbClr val="2A00FF"/>
+                </a:solidFill>
+                <a:latin typeface="Courier New"/>
+              </a:rPr>
+              <a:t>This is ok"</a:t>
+            </a:r>
+            <a:r>
+              <a:rPr lang="en-US" sz="4000" dirty="0" smtClean="0">
+                <a:latin typeface="Courier New"/>
+              </a:rPr>
+              <a:t> in {</a:t>
+            </a:r>
+          </a:p>
+          <a:p>
+            <a:r>
+              <a:rPr lang="en-US" sz="4000" dirty="0" smtClean="0">
+                <a:latin typeface="Courier New"/>
+              </a:rPr>
+              <a:t>    1 + </a:t>
+            </a:r>
+            <a:r>
+              <a:rPr lang="en-US" sz="4000" dirty="0" smtClean="0">
+                <a:latin typeface="Courier New"/>
+              </a:rPr>
+              <a:t>1</a:t>
+            </a:r>
+          </a:p>
+          <a:p>
+            <a:r>
+              <a:rPr lang="en-US" sz="4000" dirty="0" smtClean="0">
+                <a:latin typeface="Courier New"/>
+              </a:rPr>
+              <a:t>  }</a:t>
+            </a:r>
+          </a:p>
+          <a:p>
+            <a:r>
+              <a:rPr lang="en-US" sz="4000" dirty="0" smtClean="0">
+                <a:latin typeface="Courier New"/>
+              </a:rPr>
+              <a:t>  </a:t>
+            </a:r>
+            <a:r>
+              <a:rPr lang="en-US" sz="4000" dirty="0" smtClean="0">
+                <a:solidFill>
+                  <a:srgbClr val="3F7F5F"/>
+                </a:solidFill>
+                <a:latin typeface="Courier New"/>
+              </a:rPr>
+              <a:t>// is the same as</a:t>
+            </a:r>
+          </a:p>
+          <a:p>
+            <a:r>
+              <a:rPr lang="en-US" sz="4000" dirty="0" smtClean="0">
+                <a:latin typeface="Courier New"/>
+              </a:rPr>
+              <a:t>  </a:t>
+            </a:r>
+            <a:r>
+              <a:rPr lang="en-US" sz="4000" dirty="0" smtClean="0">
+                <a:solidFill>
+                  <a:srgbClr val="2A00FF"/>
+                </a:solidFill>
+                <a:latin typeface="Courier New"/>
+              </a:rPr>
+              <a:t>"This is </a:t>
+            </a:r>
+            <a:r>
+              <a:rPr lang="en-US" sz="4000" dirty="0" err="1" smtClean="0">
+                <a:solidFill>
+                  <a:srgbClr val="2A00FF"/>
+                </a:solidFill>
+                <a:latin typeface="Courier New"/>
+              </a:rPr>
+              <a:t>ok"</a:t>
+            </a:r>
+            <a:r>
+              <a:rPr lang="en-US" sz="4000" dirty="0" err="1" smtClean="0">
+                <a:latin typeface="Courier New"/>
+              </a:rPr>
+              <a:t>.in</a:t>
+            </a:r>
+            <a:r>
+              <a:rPr lang="en-US" sz="4000" dirty="0" smtClean="0">
+                <a:latin typeface="Courier New"/>
+              </a:rPr>
+              <a:t>(1 + 1)</a:t>
+            </a:r>
+            <a:endParaRPr lang="en-US" sz="4000" b="1" dirty="0" smtClean="0">
+              <a:solidFill>
+                <a:srgbClr val="7F0055"/>
+              </a:solidFill>
+              <a:latin typeface="Courier New"/>
+            </a:endParaRPr>
+          </a:p>
+        </p:txBody>
+      </p:sp>
+      <p:sp>
+        <p:nvSpPr>
+          <p:cNvPr id="12" name="Rectangle 1"/>
+          <p:cNvSpPr txBox="1">
+            <a:spLocks noChangeArrowheads="1"/>
+          </p:cNvSpPr>
+          <p:nvPr/>
+        </p:nvSpPr>
+        <p:spPr bwMode="auto">
+          <a:xfrm>
+            <a:off x="4292600" y="7496003"/>
+            <a:ext cx="8382000" cy="685800"/>
+          </a:xfrm>
+          <a:prstGeom prst="rect">
+            <a:avLst/>
+          </a:prstGeom>
+          <a:noFill/>
+          <a:ln w="12700">
+            <a:noFill/>
+            <a:miter lim="800000"/>
+            <a:headEnd/>
+            <a:tailEnd/>
+          </a:ln>
+          <a:effectLst/>
+        </p:spPr>
+        <p:txBody>
+          <a:bodyPr vert="horz" wrap="square" lIns="50800" tIns="50800" rIns="50800" bIns="50800" numCol="1" anchor="ctr" anchorCtr="0" compatLnSpc="1">
+            <a:prstTxWarp prst="textNoShape">
+              <a:avLst/>
+            </a:prstTxWarp>
+          </a:bodyPr>
+          <a:lstStyle/>
+          <a:p>
+            <a:pPr lvl="0" algn="r"/>
+            <a:r>
+              <a:rPr lang="en-US" sz="4000" b="1" kern="0" dirty="0" smtClean="0">
+                <a:solidFill>
+                  <a:srgbClr val="E75145"/>
+                </a:solidFill>
+                <a:latin typeface="Courier New" pitchFamily="49" charset="0"/>
+                <a:ea typeface="+mj-ea"/>
+                <a:cs typeface="Courier New" pitchFamily="49" charset="0"/>
+                <a:sym typeface="Arial" charset="0"/>
+              </a:rPr>
+              <a:t>"</a:t>
+            </a:r>
+            <a:r>
+              <a:rPr kumimoji="0" lang="en-US" sz="4000" b="1" i="0" u="none" strike="noStrike" kern="0" cap="none" spc="0" normalizeH="0" baseline="0" noProof="0" dirty="0" smtClean="0">
+                <a:ln>
+                  <a:noFill/>
+                </a:ln>
+                <a:solidFill>
+                  <a:srgbClr val="E75145"/>
+                </a:solidFill>
+                <a:effectLst/>
+                <a:uLnTx/>
+                <a:uFillTx/>
+                <a:latin typeface="Courier New" pitchFamily="49" charset="0"/>
+                <a:ea typeface="+mj-ea"/>
+                <a:cs typeface="Courier New" pitchFamily="49" charset="0"/>
+                <a:sym typeface="Arial" charset="0"/>
+              </a:rPr>
+              <a:t>In</a:t>
+            </a:r>
+            <a:r>
+              <a:rPr lang="en-US" sz="4000" b="1" kern="0" dirty="0" smtClean="0">
+                <a:solidFill>
+                  <a:srgbClr val="E75145"/>
+                </a:solidFill>
+                <a:latin typeface="Courier New" pitchFamily="49" charset="0"/>
+                <a:cs typeface="Courier New" pitchFamily="49" charset="0"/>
+                <a:sym typeface="Arial" charset="0"/>
+              </a:rPr>
+              <a:t>"</a:t>
+            </a:r>
+            <a:r>
+              <a:rPr kumimoji="0" lang="en-US" sz="4000" b="1" i="0" u="none" strike="noStrike" kern="0" cap="none" spc="0" normalizeH="0" baseline="0" noProof="0" dirty="0" smtClean="0">
+                <a:ln>
+                  <a:noFill/>
+                </a:ln>
+                <a:solidFill>
+                  <a:srgbClr val="E75145"/>
+                </a:solidFill>
+                <a:effectLst/>
+                <a:uLnTx/>
+                <a:uFillTx/>
+                <a:latin typeface="Courier New" pitchFamily="49" charset="0"/>
+                <a:ea typeface="+mj-ea"/>
+                <a:cs typeface="Courier New" pitchFamily="49" charset="0"/>
+                <a:sym typeface="Arial" charset="0"/>
+              </a:rPr>
+              <a:t> </a:t>
+            </a:r>
+            <a:r>
+              <a:rPr kumimoji="0" lang="en-US" sz="4000" b="1" i="0" u="none" strike="noStrike" kern="0" cap="none" spc="0" normalizeH="0" baseline="0" noProof="0" dirty="0" smtClean="0">
+                <a:ln>
+                  <a:noFill/>
+                </a:ln>
+                <a:solidFill>
+                  <a:srgbClr val="E75145"/>
+                </a:solidFill>
+                <a:effectLst/>
+                <a:uLnTx/>
+                <a:uFillTx/>
+                <a:latin typeface="Lucida Handwriting" pitchFamily="66" charset="0"/>
+                <a:ea typeface="+mj-ea"/>
+                <a:cs typeface="+mj-cs"/>
+                <a:sym typeface="Arial" charset="0"/>
+              </a:rPr>
+              <a:t>method  on String ?!</a:t>
+            </a:r>
+            <a:endParaRPr kumimoji="0" lang="en-US" sz="4000" b="1" i="0" u="none" strike="noStrike" kern="0" cap="none" spc="0" normalizeH="0" baseline="0" noProof="0" dirty="0">
+              <a:ln>
+                <a:noFill/>
+              </a:ln>
+              <a:solidFill>
+                <a:srgbClr val="E75145"/>
+              </a:solidFill>
+              <a:effectLst/>
+              <a:uLnTx/>
+              <a:uFillTx/>
+              <a:latin typeface="+mj-lt"/>
+              <a:ea typeface="+mj-ea"/>
+              <a:cs typeface="+mj-cs"/>
+              <a:sym typeface="Arial" charset="0"/>
+            </a:endParaRPr>
+          </a:p>
+        </p:txBody>
+      </p:sp>
+    </p:spTree>
+  </p:cSld>
+  <p:clrMapOvr>
+    <a:masterClrMapping/>
+  </p:clrMapOvr>
+  <p:transition>
+    <p:fade/>
+  </p:transition>
+  <p:timing>
+    <p:tnLst>
+      <p:par>
+        <p:cTn id="1" dur="indefinite" restart="never" nodeType="tmRoot">
+          <p:childTnLst>
+            <p:seq concurrent="1" nextAc="seek">
+              <p:cTn id="2" dur="indefinite" nodeType="mainSeq">
+                <p:childTnLst>
+                  <p:par>
+                    <p:cTn id="3" fill="hold">
+                      <p:stCondLst>
+                        <p:cond delay="indefinite"/>
+                        <p:cond evt="onBegin" delay="0">
+                          <p:tn val="2"/>
+                        </p:cond>
+                      </p:stCondLst>
+                      <p:childTnLst>
+                        <p:par>
+                          <p:cTn id="4" fill="hold">
+                            <p:stCondLst>
+                              <p:cond delay="0"/>
+                            </p:stCondLst>
+                            <p:childTnLst>
+                              <p:par>
+                                <p:cTn id="5" presetID="1" presetClass="entr" presetSubtype="0" fill="hold" nodeType="withEffect">
+                                  <p:stCondLst>
+                                    <p:cond delay="0"/>
+                                  </p:stCondLst>
+                                  <p:childTnLst>
+                                    <p:set>
+                                      <p:cBhvr>
+                                        <p:cTn id="6" dur="1" fill="hold">
+                                          <p:stCondLst>
+                                            <p:cond delay="0"/>
+                                          </p:stCondLst>
+                                        </p:cTn>
+                                        <p:tgtEl>
+                                          <p:spTgt spid="8"/>
+                                        </p:tgtEl>
+                                        <p:attrNameLst>
+                                          <p:attrName>style.visibility</p:attrName>
+                                        </p:attrNameLst>
+                                      </p:cBhvr>
+                                      <p:to>
+                                        <p:strVal val="visible"/>
+                                      </p:to>
+                                    </p:set>
+                                  </p:childTnLst>
+                                </p:cTn>
+                              </p:par>
+                            </p:childTnLst>
+                          </p:cTn>
+                        </p:par>
+                      </p:childTnLst>
+                    </p:cTn>
+                  </p:par>
+                </p:childTnLst>
+              </p:cTn>
+              <p:prevCondLst>
+                <p:cond evt="onPrev" delay="0">
+                  <p:tgtEl>
+                    <p:sldTgt/>
+                  </p:tgtEl>
+                </p:cond>
+              </p:prevCondLst>
+              <p:nextCondLst>
+                <p:cond evt="onNext" delay="0">
+                  <p:tgtEl>
+                    <p:sldTgt/>
+                  </p:tgtEl>
+                </p:cond>
+              </p:nextCondLst>
+            </p:seq>
+          </p:childTnLst>
+        </p:cTn>
+      </p:par>
+    </p:tnLst>
+  </p:timing>
+</p:sld>
+</file>
+
+<file path=ppt/slides/slide23.xml><?xml version="1.0" encoding="utf-8"?>
+<p:sld xmlns:a="http://schemas.openxmlformats.org/drawingml/2006/main" xmlns:r="http://schemas.openxmlformats.org/officeDocument/2006/relationships" xmlns:p="http://schemas.openxmlformats.org/presentationml/2006/main">
+  <p:cSld>
+    <p:spTree>
+      <p:nvGrpSpPr>
+        <p:cNvPr id="1" name=""/>
+        <p:cNvGrpSpPr/>
+        <p:nvPr/>
+      </p:nvGrpSpPr>
+      <p:grpSpPr>
+        <a:xfrm>
+          <a:off x="0" y="0"/>
+          <a:ext cx="0" cy="0"/>
+          <a:chOff x="0" y="0"/>
+          <a:chExt cx="0" cy="0"/>
+        </a:xfrm>
+      </p:grpSpPr>
+      <p:sp>
+        <p:nvSpPr>
+          <p:cNvPr id="8193" name="Rectangle 1"/>
+          <p:cNvSpPr>
+            <a:spLocks noGrp="1" noChangeArrowheads="1"/>
+          </p:cNvSpPr>
+          <p:nvPr>
+            <p:ph type="title"/>
+          </p:nvPr>
+        </p:nvSpPr>
+        <p:spPr>
+          <a:xfrm>
+            <a:off x="711200" y="0"/>
+            <a:ext cx="12509500" cy="914400"/>
+          </a:xfrm>
+          <a:ln/>
+        </p:spPr>
+        <p:txBody>
+          <a:bodyPr/>
+          <a:lstStyle/>
+          <a:p>
+            <a:pPr lvl="0"/>
+            <a:r>
+              <a:rPr lang="en-US" sz="5400" dirty="0" smtClean="0">
+                <a:latin typeface="Lucida Handwriting" pitchFamily="66" charset="0"/>
+              </a:rPr>
+              <a:t>     </a:t>
+            </a:r>
+            <a:r>
+              <a:rPr lang="en-US" sz="5400" dirty="0" smtClean="0">
+                <a:latin typeface="Lucida Handwriting" pitchFamily="66" charset="0"/>
+              </a:rPr>
+              <a:t>DSL</a:t>
+            </a:r>
+            <a:endParaRPr lang="en-US" dirty="0"/>
+          </a:p>
+        </p:txBody>
+      </p:sp>
+      <p:sp>
+        <p:nvSpPr>
+          <p:cNvPr id="7" name="Rectangle 6"/>
+          <p:cNvSpPr/>
+          <p:nvPr/>
+        </p:nvSpPr>
+        <p:spPr>
+          <a:xfrm>
+            <a:off x="2870139" y="1438870"/>
+            <a:ext cx="8807219" cy="923330"/>
+          </a:xfrm>
+          <a:prstGeom prst="rect">
+            <a:avLst/>
+          </a:prstGeom>
+        </p:spPr>
+        <p:txBody>
+          <a:bodyPr wrap="none">
+            <a:spAutoFit/>
+          </a:bodyPr>
+          <a:lstStyle/>
+          <a:p>
+            <a:pPr algn="ctr"/>
+            <a:r>
+              <a:rPr lang="en-US" sz="5400" b="1" kern="0" dirty="0" smtClean="0">
+                <a:solidFill>
+                  <a:srgbClr val="0C0F20"/>
+                </a:solidFill>
+                <a:latin typeface="Lucida Handwriting" pitchFamily="66" charset="0"/>
+                <a:cs typeface="+mj-cs"/>
+                <a:sym typeface="Arial" charset="0"/>
+              </a:rPr>
+              <a:t>The  king of all tricks</a:t>
+            </a:r>
+            <a:endParaRPr lang="en-US" dirty="0"/>
+          </a:p>
+        </p:txBody>
+      </p:sp>
+      <p:pic>
+        <p:nvPicPr>
+          <p:cNvPr id="8" name="Picture 10" descr="http://knowledgehub.zeus.com/media/Scala_Logo2008.png"/>
+          <p:cNvPicPr>
+            <a:picLocks noChangeAspect="1" noChangeArrowheads="1"/>
+          </p:cNvPicPr>
+          <p:nvPr/>
+        </p:nvPicPr>
+        <p:blipFill>
+          <a:blip r:embed="rId3"/>
+          <a:srcRect/>
+          <a:stretch>
+            <a:fillRect/>
+          </a:stretch>
+        </p:blipFill>
+        <p:spPr bwMode="auto">
+          <a:xfrm>
+            <a:off x="4140200" y="76200"/>
+            <a:ext cx="2279542" cy="679257"/>
+          </a:xfrm>
+          <a:prstGeom prst="rect">
+            <a:avLst/>
+          </a:prstGeom>
+          <a:noFill/>
+        </p:spPr>
+      </p:pic>
+      <p:sp>
+        <p:nvSpPr>
+          <p:cNvPr id="11" name="Rectangle 10"/>
+          <p:cNvSpPr/>
+          <p:nvPr/>
+        </p:nvSpPr>
+        <p:spPr>
+          <a:xfrm>
+            <a:off x="330200" y="3459301"/>
+            <a:ext cx="12344400" cy="3970318"/>
+          </a:xfrm>
+          <a:prstGeom prst="rect">
+            <a:avLst/>
+          </a:prstGeom>
+          <a:ln>
+            <a:solidFill>
+              <a:schemeClr val="tx1"/>
+            </a:solidFill>
+            <a:prstDash val="dash"/>
+          </a:ln>
+        </p:spPr>
+        <p:txBody>
+          <a:bodyPr wrap="square">
+            <a:spAutoFit/>
+          </a:bodyPr>
+          <a:lstStyle/>
+          <a:p>
+            <a:r>
+              <a:rPr lang="en-US" sz="3600" b="1" dirty="0" smtClean="0">
+                <a:solidFill>
+                  <a:srgbClr val="7F0055"/>
+                </a:solidFill>
+                <a:latin typeface="Courier New"/>
+              </a:rPr>
+              <a:t>class</a:t>
+            </a:r>
+            <a:r>
+              <a:rPr lang="en-US" sz="3600" b="1" dirty="0" smtClean="0">
+                <a:latin typeface="Courier New"/>
+              </a:rPr>
+              <a:t> Example(description: String) {</a:t>
+            </a:r>
+          </a:p>
+          <a:p>
+            <a:r>
+              <a:rPr lang="en-US" sz="3600" b="1" dirty="0" smtClean="0">
+                <a:solidFill>
+                  <a:srgbClr val="7F0055"/>
+                </a:solidFill>
+                <a:latin typeface="Courier New"/>
+              </a:rPr>
+              <a:t>  def</a:t>
+            </a:r>
+            <a:r>
+              <a:rPr lang="en-US" sz="3600" b="1" dirty="0" smtClean="0">
+                <a:latin typeface="Courier New"/>
+              </a:rPr>
+              <a:t> in(e: </a:t>
+            </a:r>
+            <a:r>
+              <a:rPr lang="en-US" sz="3600" b="1" dirty="0" smtClean="0">
+                <a:solidFill>
+                  <a:srgbClr val="7F0055"/>
+                </a:solidFill>
+                <a:latin typeface="Courier New"/>
+              </a:rPr>
+              <a:t>Any</a:t>
+            </a:r>
+            <a:r>
+              <a:rPr lang="en-US" sz="3600" b="1" dirty="0" smtClean="0">
+                <a:latin typeface="Courier New"/>
+              </a:rPr>
+              <a:t>) = e</a:t>
+            </a:r>
+          </a:p>
+          <a:p>
+            <a:r>
+              <a:rPr lang="en-US" sz="3600" dirty="0" smtClean="0">
+                <a:latin typeface="Courier New"/>
+              </a:rPr>
+              <a:t>}</a:t>
+            </a:r>
+          </a:p>
+          <a:p>
+            <a:endParaRPr lang="en-US" sz="3600" dirty="0" smtClean="0">
+              <a:latin typeface="Courier New"/>
+            </a:endParaRPr>
+          </a:p>
+          <a:p>
+            <a:r>
+              <a:rPr lang="en-US" sz="3600" b="1" dirty="0" smtClean="0">
+                <a:solidFill>
+                  <a:srgbClr val="7F0055"/>
+                </a:solidFill>
+                <a:latin typeface="Courier New"/>
+              </a:rPr>
+              <a:t>implicit</a:t>
+            </a:r>
+            <a:r>
+              <a:rPr lang="en-US" sz="3600" b="1" dirty="0" smtClean="0">
+                <a:latin typeface="Courier New"/>
+              </a:rPr>
+              <a:t> </a:t>
+            </a:r>
+            <a:r>
+              <a:rPr lang="en-US" sz="3600" b="1" dirty="0" smtClean="0">
+                <a:solidFill>
+                  <a:srgbClr val="7F0055"/>
+                </a:solidFill>
+                <a:latin typeface="Courier New"/>
+              </a:rPr>
+              <a:t>def</a:t>
+            </a:r>
+            <a:r>
+              <a:rPr lang="en-US" sz="3600" b="1" dirty="0" smtClean="0">
+                <a:latin typeface="Courier New"/>
+              </a:rPr>
+              <a:t> </a:t>
+            </a:r>
+            <a:r>
+              <a:rPr lang="en-US" sz="3600" b="1" dirty="0" err="1" smtClean="0">
+                <a:latin typeface="Courier New"/>
+              </a:rPr>
+              <a:t>forExample</a:t>
+            </a:r>
+            <a:r>
+              <a:rPr lang="en-US" sz="3600" b="1" dirty="0" smtClean="0">
+                <a:latin typeface="Courier New"/>
+              </a:rPr>
+              <a:t>(d: String) = {</a:t>
+            </a:r>
+          </a:p>
+          <a:p>
+            <a:r>
+              <a:rPr lang="en-US" sz="3600" b="1" dirty="0" smtClean="0">
+                <a:solidFill>
+                  <a:srgbClr val="7F0055"/>
+                </a:solidFill>
+                <a:latin typeface="Courier New"/>
+              </a:rPr>
+              <a:t>  new</a:t>
+            </a:r>
+            <a:r>
+              <a:rPr lang="en-US" sz="3600" b="1" dirty="0" smtClean="0">
+                <a:latin typeface="Courier New"/>
+              </a:rPr>
+              <a:t> Example(d)</a:t>
+            </a:r>
+          </a:p>
+          <a:p>
+            <a:r>
+              <a:rPr lang="en-US" sz="3600" dirty="0" smtClean="0">
+                <a:latin typeface="Courier New"/>
+              </a:rPr>
+              <a:t>}</a:t>
+            </a:r>
+            <a:endParaRPr lang="en-US" sz="3600" b="1" dirty="0" smtClean="0">
+              <a:solidFill>
+                <a:srgbClr val="7F0055"/>
+              </a:solidFill>
+              <a:latin typeface="Courier New"/>
+            </a:endParaRPr>
+          </a:p>
+        </p:txBody>
+      </p:sp>
+      <p:pic>
+        <p:nvPicPr>
+          <p:cNvPr id="13" name="Picture 2" descr="crown, king icon"/>
+          <p:cNvPicPr>
+            <a:picLocks noChangeAspect="1" noChangeArrowheads="1"/>
+          </p:cNvPicPr>
+          <p:nvPr/>
+        </p:nvPicPr>
+        <p:blipFill>
+          <a:blip r:embed="rId4"/>
+          <a:srcRect/>
+          <a:stretch>
+            <a:fillRect/>
+          </a:stretch>
+        </p:blipFill>
+        <p:spPr bwMode="auto">
+          <a:xfrm>
+            <a:off x="1168400" y="1295400"/>
+            <a:ext cx="1447800" cy="1447801"/>
+          </a:xfrm>
+          <a:prstGeom prst="rect">
+            <a:avLst/>
+          </a:prstGeom>
+          <a:noFill/>
+        </p:spPr>
+      </p:pic>
+    </p:spTree>
+  </p:cSld>
+  <p:clrMapOvr>
+    <a:masterClrMapping/>
+  </p:clrMapOvr>
+  <p:transition>
+    <p:fade/>
+  </p:transition>
+  <p:timing>
+    <p:tnLst>
+      <p:par>
+        <p:cTn id="1" dur="indefinite" restart="never" nodeType="tmRoot">
+          <p:childTnLst>
+            <p:seq concurrent="1" nextAc="seek">
+              <p:cTn id="2" dur="indefinite" nodeType="mainSeq">
+                <p:childTnLst>
+                  <p:par>
+                    <p:cTn id="3" fill="hold">
+                      <p:stCondLst>
+                        <p:cond delay="indefinite"/>
+                        <p:cond evt="onBegin" delay="0">
+                          <p:tn val="2"/>
+                        </p:cond>
+                      </p:stCondLst>
+                      <p:childTnLst>
+                        <p:par>
+                          <p:cTn id="4" fill="hold">
+                            <p:stCondLst>
+                              <p:cond delay="0"/>
+                            </p:stCondLst>
+                            <p:childTnLst>
+                              <p:par>
+                                <p:cTn id="5" presetID="1" presetClass="entr" presetSubtype="0" fill="hold" nodeType="withEffect">
+                                  <p:stCondLst>
+                                    <p:cond delay="0"/>
+                                  </p:stCondLst>
+                                  <p:childTnLst>
+                                    <p:set>
+                                      <p:cBhvr>
+                                        <p:cTn id="6" dur="1" fill="hold">
+                                          <p:stCondLst>
+                                            <p:cond delay="0"/>
+                                          </p:stCondLst>
+                                        </p:cTn>
+                                        <p:tgtEl>
+                                          <p:spTgt spid="8"/>
+                                        </p:tgtEl>
+                                        <p:attrNameLst>
+                                          <p:attrName>style.visibility</p:attrName>
+                                        </p:attrNameLst>
+                                      </p:cBhvr>
+                                      <p:to>
+                                        <p:strVal val="visible"/>
+                                      </p:to>
+                                    </p:set>
+                                  </p:childTnLst>
+                                </p:cTn>
+                              </p:par>
+                            </p:childTnLst>
+                          </p:cTn>
+                        </p:par>
+                      </p:childTnLst>
+                    </p:cTn>
+                  </p:par>
+                </p:childTnLst>
+              </p:cTn>
+              <p:prevCondLst>
+                <p:cond evt="onPrev" delay="0">
+                  <p:tgtEl>
+                    <p:sldTgt/>
+                  </p:tgtEl>
+                </p:cond>
+              </p:prevCondLst>
+              <p:nextCondLst>
+                <p:cond evt="onNext" delay="0">
+                  <p:tgtEl>
+                    <p:sldTgt/>
+                  </p:tgtEl>
+                </p:cond>
+              </p:nextCondLst>
+            </p:seq>
+          </p:childTnLst>
+        </p:cTn>
+      </p:par>
+    </p:tnLst>
+  </p:timing>
+</p:sld>
+</file>
+
+<file path=ppt/slides/slide24.xml><?xml version="1.0" encoding="utf-8"?>
+<p:sld xmlns:a="http://schemas.openxmlformats.org/drawingml/2006/main" xmlns:r="http://schemas.openxmlformats.org/officeDocument/2006/relationships" xmlns:p="http://schemas.openxmlformats.org/presentationml/2006/main">
+  <p:cSld>
+    <p:spTree>
+      <p:nvGrpSpPr>
+        <p:cNvPr id="1" name=""/>
+        <p:cNvGrpSpPr/>
+        <p:nvPr/>
+      </p:nvGrpSpPr>
+      <p:grpSpPr>
+        <a:xfrm>
+          <a:off x="0" y="0"/>
+          <a:ext cx="0" cy="0"/>
+          <a:chOff x="0" y="0"/>
+          <a:chExt cx="0" cy="0"/>
+        </a:xfrm>
+      </p:grpSpPr>
+      <p:sp>
+        <p:nvSpPr>
+          <p:cNvPr id="8193" name="Rectangle 1"/>
+          <p:cNvSpPr>
+            <a:spLocks noGrp="1" noChangeArrowheads="1"/>
+          </p:cNvSpPr>
+          <p:nvPr>
+            <p:ph type="title"/>
+          </p:nvPr>
+        </p:nvSpPr>
+        <p:spPr>
+          <a:xfrm>
+            <a:off x="711200" y="0"/>
+            <a:ext cx="12509500" cy="914400"/>
+          </a:xfrm>
+          <a:ln/>
+        </p:spPr>
+        <p:txBody>
+          <a:bodyPr/>
+          <a:lstStyle/>
+          <a:p>
+            <a:pPr lvl="0"/>
+            <a:r>
+              <a:rPr lang="en-US" sz="5400" dirty="0" smtClean="0">
+                <a:latin typeface="Lucida Handwriting" pitchFamily="66" charset="0"/>
+              </a:rPr>
+              <a:t>     </a:t>
+            </a:r>
+            <a:r>
+              <a:rPr lang="en-US" sz="5400" dirty="0" smtClean="0">
+                <a:latin typeface="Lucida Handwriting" pitchFamily="66" charset="0"/>
+              </a:rPr>
+              <a:t>DSL</a:t>
+            </a:r>
+            <a:endParaRPr lang="en-US" dirty="0"/>
+          </a:p>
+        </p:txBody>
+      </p:sp>
+      <p:sp>
+        <p:nvSpPr>
+          <p:cNvPr id="7" name="Rectangle 6"/>
+          <p:cNvSpPr/>
+          <p:nvPr/>
+        </p:nvSpPr>
+        <p:spPr>
+          <a:xfrm>
+            <a:off x="2870139" y="1438870"/>
+            <a:ext cx="3398687" cy="923330"/>
+          </a:xfrm>
+          <a:prstGeom prst="rect">
+            <a:avLst/>
+          </a:prstGeom>
+        </p:spPr>
+        <p:txBody>
+          <a:bodyPr wrap="none">
+            <a:spAutoFit/>
+          </a:bodyPr>
+          <a:lstStyle/>
+          <a:p>
+            <a:pPr algn="ctr"/>
+            <a:r>
+              <a:rPr lang="en-US" sz="5400" b="1" kern="0" dirty="0" smtClean="0">
+                <a:solidFill>
+                  <a:srgbClr val="00CC66"/>
+                </a:solidFill>
+                <a:latin typeface="Lucida Handwriting" pitchFamily="66" charset="0"/>
+                <a:cs typeface="+mj-cs"/>
+                <a:sym typeface="Arial" charset="0"/>
+              </a:rPr>
+              <a:t>naming</a:t>
+            </a:r>
+            <a:endParaRPr lang="en-US" dirty="0">
+              <a:solidFill>
+                <a:srgbClr val="00CC66"/>
+              </a:solidFill>
+            </a:endParaRPr>
+          </a:p>
+        </p:txBody>
+      </p:sp>
+      <p:pic>
+        <p:nvPicPr>
+          <p:cNvPr id="8" name="Picture 10" descr="http://knowledgehub.zeus.com/media/Scala_Logo2008.png"/>
+          <p:cNvPicPr>
+            <a:picLocks noChangeAspect="1" noChangeArrowheads="1"/>
+          </p:cNvPicPr>
+          <p:nvPr/>
+        </p:nvPicPr>
+        <p:blipFill>
+          <a:blip r:embed="rId3"/>
+          <a:srcRect/>
+          <a:stretch>
+            <a:fillRect/>
+          </a:stretch>
+        </p:blipFill>
+        <p:spPr bwMode="auto">
+          <a:xfrm>
+            <a:off x="4140200" y="76200"/>
+            <a:ext cx="2279542" cy="679257"/>
+          </a:xfrm>
+          <a:prstGeom prst="rect">
+            <a:avLst/>
+          </a:prstGeom>
+          <a:noFill/>
+        </p:spPr>
+      </p:pic>
+      <p:sp>
+        <p:nvSpPr>
+          <p:cNvPr id="11" name="Rectangle 10"/>
+          <p:cNvSpPr/>
+          <p:nvPr/>
+        </p:nvSpPr>
+        <p:spPr>
+          <a:xfrm>
+            <a:off x="330200" y="3459301"/>
+            <a:ext cx="12344400" cy="707886"/>
+          </a:xfrm>
+          <a:prstGeom prst="rect">
+            <a:avLst/>
+          </a:prstGeom>
+          <a:ln>
+            <a:solidFill>
+              <a:schemeClr val="tx1"/>
+            </a:solidFill>
+            <a:prstDash val="dash"/>
+          </a:ln>
+        </p:spPr>
+        <p:txBody>
+          <a:bodyPr wrap="square">
+            <a:spAutoFit/>
+          </a:bodyPr>
+          <a:lstStyle/>
+          <a:p>
+            <a:r>
+              <a:rPr lang="en-US" sz="4000" dirty="0" err="1" smtClean="0">
+                <a:highlight>
+                  <a:srgbClr val="E8F2FE"/>
+                </a:highlight>
+                <a:latin typeface="Courier New"/>
+              </a:rPr>
+              <a:t>forExample</a:t>
+            </a:r>
+            <a:r>
+              <a:rPr lang="en-US" sz="4000" dirty="0" smtClean="0">
+                <a:highlight>
+                  <a:srgbClr val="E8F2FE"/>
+                </a:highlight>
+                <a:latin typeface="Courier New"/>
+              </a:rPr>
+              <a:t>(</a:t>
+            </a:r>
+            <a:r>
+              <a:rPr lang="en-US" sz="4000" dirty="0" smtClean="0">
+                <a:solidFill>
+                  <a:srgbClr val="2A00FF"/>
+                </a:solidFill>
+                <a:highlight>
+                  <a:srgbClr val="E8F2FE"/>
+                </a:highlight>
+                <a:latin typeface="Courier New"/>
+              </a:rPr>
+              <a:t>"this works"</a:t>
+            </a:r>
+            <a:r>
+              <a:rPr lang="en-US" sz="4000" dirty="0" smtClean="0">
+                <a:highlight>
+                  <a:srgbClr val="E8F2FE"/>
+                </a:highlight>
+                <a:latin typeface="Courier New"/>
+              </a:rPr>
+              <a:t>) in </a:t>
+            </a:r>
+            <a:r>
+              <a:rPr lang="en-US" sz="4000" dirty="0" smtClean="0">
+                <a:highlight>
+                  <a:srgbClr val="E8F2FE"/>
+                </a:highlight>
+                <a:latin typeface="Courier New"/>
+              </a:rPr>
+              <a:t>{ 1 + 1 }</a:t>
+            </a:r>
+            <a:endParaRPr lang="en-US" sz="4000" b="1" dirty="0" smtClean="0">
+              <a:solidFill>
+                <a:srgbClr val="7F0055"/>
+              </a:solidFill>
+              <a:latin typeface="Courier New"/>
+            </a:endParaRPr>
+          </a:p>
+        </p:txBody>
+      </p:sp>
+      <p:pic>
+        <p:nvPicPr>
+          <p:cNvPr id="70662" name="Picture 6" descr="magic, wizard icon"/>
+          <p:cNvPicPr>
+            <a:picLocks noChangeAspect="1" noChangeArrowheads="1"/>
+          </p:cNvPicPr>
+          <p:nvPr/>
+        </p:nvPicPr>
+        <p:blipFill>
+          <a:blip r:embed="rId4"/>
+          <a:srcRect/>
+          <a:stretch>
+            <a:fillRect/>
+          </a:stretch>
+        </p:blipFill>
+        <p:spPr bwMode="auto">
+          <a:xfrm>
+            <a:off x="635000" y="1143000"/>
+            <a:ext cx="1295400" cy="1295401"/>
+          </a:xfrm>
+          <a:prstGeom prst="rect">
+            <a:avLst/>
+          </a:prstGeom>
+          <a:noFill/>
+        </p:spPr>
+      </p:pic>
+    </p:spTree>
+  </p:cSld>
+  <p:clrMapOvr>
+    <a:masterClrMapping/>
+  </p:clrMapOvr>
+  <p:transition>
+    <p:fade/>
+  </p:transition>
+  <p:timing>
+    <p:tnLst>
+      <p:par>
+        <p:cTn id="1" dur="indefinite" restart="never" nodeType="tmRoot">
+          <p:childTnLst>
+            <p:seq concurrent="1" nextAc="seek">
+              <p:cTn id="2" dur="indefinite" nodeType="mainSeq">
+                <p:childTnLst>
+                  <p:par>
+                    <p:cTn id="3" fill="hold">
+                      <p:stCondLst>
+                        <p:cond delay="indefinite"/>
+                        <p:cond evt="onBegin" delay="0">
+                          <p:tn val="2"/>
+                        </p:cond>
+                      </p:stCondLst>
+                      <p:childTnLst>
+                        <p:par>
+                          <p:cTn id="4" fill="hold">
+                            <p:stCondLst>
+                              <p:cond delay="0"/>
+                            </p:stCondLst>
+                            <p:childTnLst>
+                              <p:par>
+                                <p:cTn id="5" presetID="1" presetClass="entr" presetSubtype="0" fill="hold" nodeType="withEffect">
+                                  <p:stCondLst>
+                                    <p:cond delay="0"/>
+                                  </p:stCondLst>
+                                  <p:childTnLst>
+                                    <p:set>
+                                      <p:cBhvr>
+                                        <p:cTn id="6" dur="1" fill="hold">
+                                          <p:stCondLst>
+                                            <p:cond delay="0"/>
+                                          </p:stCondLst>
+                                        </p:cTn>
+                                        <p:tgtEl>
+                                          <p:spTgt spid="8"/>
+                                        </p:tgtEl>
+                                        <p:attrNameLst>
+                                          <p:attrName>style.visibility</p:attrName>
+                                        </p:attrNameLst>
+                                      </p:cBhvr>
+                                      <p:to>
+                                        <p:strVal val="visible"/>
+                                      </p:to>
+                                    </p:set>
+                                  </p:childTnLst>
+                                </p:cTn>
+                              </p:par>
+                            </p:childTnLst>
+                          </p:cTn>
+                        </p:par>
+                      </p:childTnLst>
+                    </p:cTn>
+                  </p:par>
+                </p:childTnLst>
+              </p:cTn>
+              <p:prevCondLst>
+                <p:cond evt="onPrev" delay="0">
+                  <p:tgtEl>
+                    <p:sldTgt/>
+                  </p:tgtEl>
+                </p:cond>
+              </p:prevCondLst>
+              <p:nextCondLst>
+                <p:cond evt="onNext" delay="0">
+                  <p:tgtEl>
+                    <p:sldTgt/>
+                  </p:tgtEl>
+                </p:cond>
+              </p:nextCondLst>
+            </p:seq>
+          </p:childTnLst>
+        </p:cTn>
+      </p:par>
+    </p:tnLst>
+  </p:timing>
+</p:sld>
+</file>
+
+<file path=ppt/slides/slide25.xml><?xml version="1.0" encoding="utf-8"?>
+<p:sld xmlns:a="http://schemas.openxmlformats.org/drawingml/2006/main" xmlns:r="http://schemas.openxmlformats.org/officeDocument/2006/relationships" xmlns:p="http://schemas.openxmlformats.org/presentationml/2006/main">
+  <p:cSld>
+    <p:spTree>
+      <p:nvGrpSpPr>
+        <p:cNvPr id="1" name=""/>
+        <p:cNvGrpSpPr/>
+        <p:nvPr/>
+      </p:nvGrpSpPr>
+      <p:grpSpPr>
+        <a:xfrm>
+          <a:off x="0" y="0"/>
+          <a:ext cx="0" cy="0"/>
+          <a:chOff x="0" y="0"/>
+          <a:chExt cx="0" cy="0"/>
+        </a:xfrm>
+      </p:grpSpPr>
+      <p:sp>
+        <p:nvSpPr>
+          <p:cNvPr id="8193" name="Rectangle 1"/>
+          <p:cNvSpPr>
+            <a:spLocks noGrp="1" noChangeArrowheads="1"/>
+          </p:cNvSpPr>
+          <p:nvPr>
+            <p:ph type="title"/>
+          </p:nvPr>
+        </p:nvSpPr>
+        <p:spPr>
+          <a:xfrm>
+            <a:off x="711200" y="0"/>
+            <a:ext cx="12509500" cy="914400"/>
+          </a:xfrm>
+          <a:ln/>
+        </p:spPr>
+        <p:txBody>
+          <a:bodyPr/>
+          <a:lstStyle/>
+          <a:p>
+            <a:pPr lvl="0"/>
+            <a:r>
+              <a:rPr lang="en-US" sz="5400" dirty="0" smtClean="0">
+                <a:latin typeface="Lucida Handwriting" pitchFamily="66" charset="0"/>
+              </a:rPr>
+              <a:t>     </a:t>
+            </a:r>
+            <a:r>
+              <a:rPr lang="en-US" sz="5400" dirty="0" smtClean="0">
+                <a:latin typeface="Lucida Handwriting" pitchFamily="66" charset="0"/>
+              </a:rPr>
+              <a:t>DSL</a:t>
+            </a:r>
+            <a:endParaRPr lang="en-US" dirty="0"/>
+          </a:p>
+        </p:txBody>
+      </p:sp>
+      <p:sp>
+        <p:nvSpPr>
+          <p:cNvPr id="7" name="Rectangle 6"/>
+          <p:cNvSpPr/>
+          <p:nvPr/>
+        </p:nvSpPr>
+        <p:spPr>
+          <a:xfrm>
+            <a:off x="2870139" y="1438870"/>
+            <a:ext cx="2674130" cy="923330"/>
+          </a:xfrm>
+          <a:prstGeom prst="rect">
+            <a:avLst/>
+          </a:prstGeom>
+        </p:spPr>
+        <p:txBody>
+          <a:bodyPr wrap="none">
+            <a:spAutoFit/>
+          </a:bodyPr>
+          <a:lstStyle/>
+          <a:p>
+            <a:pPr algn="ctr"/>
+            <a:r>
+              <a:rPr lang="en-US" sz="5400" b="1" kern="0" dirty="0" smtClean="0">
+                <a:solidFill>
+                  <a:srgbClr val="00CC66"/>
+                </a:solidFill>
+                <a:latin typeface="Lucida Handwriting" pitchFamily="66" charset="0"/>
+                <a:cs typeface="+mj-cs"/>
+                <a:sym typeface="Arial" charset="0"/>
+              </a:rPr>
+              <a:t>typing</a:t>
+            </a:r>
+            <a:endParaRPr lang="en-US" dirty="0">
+              <a:solidFill>
+                <a:srgbClr val="00CC66"/>
+              </a:solidFill>
+            </a:endParaRPr>
+          </a:p>
+        </p:txBody>
+      </p:sp>
+      <p:pic>
+        <p:nvPicPr>
+          <p:cNvPr id="8" name="Picture 10" descr="http://knowledgehub.zeus.com/media/Scala_Logo2008.png"/>
+          <p:cNvPicPr>
+            <a:picLocks noChangeAspect="1" noChangeArrowheads="1"/>
+          </p:cNvPicPr>
+          <p:nvPr/>
+        </p:nvPicPr>
+        <p:blipFill>
+          <a:blip r:embed="rId3"/>
+          <a:srcRect/>
+          <a:stretch>
+            <a:fillRect/>
+          </a:stretch>
+        </p:blipFill>
+        <p:spPr bwMode="auto">
+          <a:xfrm>
+            <a:off x="4140200" y="76200"/>
+            <a:ext cx="2279542" cy="679257"/>
+          </a:xfrm>
+          <a:prstGeom prst="rect">
+            <a:avLst/>
+          </a:prstGeom>
+          <a:noFill/>
+        </p:spPr>
+      </p:pic>
+      <p:sp>
+        <p:nvSpPr>
+          <p:cNvPr id="11" name="Rectangle 10"/>
+          <p:cNvSpPr/>
+          <p:nvPr/>
+        </p:nvSpPr>
+        <p:spPr>
+          <a:xfrm>
+            <a:off x="330200" y="3459301"/>
+            <a:ext cx="12344400" cy="646331"/>
+          </a:xfrm>
+          <a:prstGeom prst="rect">
+            <a:avLst/>
+          </a:prstGeom>
+          <a:ln>
+            <a:solidFill>
+              <a:schemeClr val="tx1"/>
+            </a:solidFill>
+            <a:prstDash val="dash"/>
+          </a:ln>
+        </p:spPr>
+        <p:txBody>
+          <a:bodyPr wrap="square">
+            <a:spAutoFit/>
+          </a:bodyPr>
+          <a:lstStyle/>
+          <a:p>
+            <a:r>
+              <a:rPr lang="en-US" sz="3600" b="1" dirty="0" smtClean="0">
+                <a:solidFill>
+                  <a:srgbClr val="7F0055"/>
+                </a:solidFill>
+                <a:highlight>
+                  <a:srgbClr val="E8F2FE"/>
+                </a:highlight>
+                <a:latin typeface="Courier New"/>
+              </a:rPr>
+              <a:t>implicit</a:t>
+            </a:r>
+            <a:r>
+              <a:rPr lang="en-US" sz="3600" b="1" dirty="0" smtClean="0">
+                <a:highlight>
+                  <a:srgbClr val="E8F2FE"/>
+                </a:highlight>
+                <a:latin typeface="Courier New"/>
+              </a:rPr>
+              <a:t> </a:t>
+            </a:r>
+            <a:r>
+              <a:rPr lang="en-US" sz="3600" b="1" dirty="0" smtClean="0">
+                <a:solidFill>
+                  <a:srgbClr val="7F0055"/>
+                </a:solidFill>
+                <a:highlight>
+                  <a:srgbClr val="E8F2FE"/>
+                </a:highlight>
+                <a:latin typeface="Courier New"/>
+              </a:rPr>
+              <a:t>def</a:t>
+            </a:r>
+            <a:r>
+              <a:rPr lang="en-US" sz="3600" b="1" dirty="0" smtClean="0">
+                <a:highlight>
+                  <a:srgbClr val="E8F2FE"/>
+                </a:highlight>
+                <a:latin typeface="Courier New"/>
+              </a:rPr>
+              <a:t> </a:t>
+            </a:r>
+            <a:r>
+              <a:rPr lang="en-US" sz="3600" b="1" dirty="0" err="1" smtClean="0">
+                <a:highlight>
+                  <a:srgbClr val="E8F2FE"/>
+                </a:highlight>
+                <a:latin typeface="Courier New"/>
+              </a:rPr>
+              <a:t>forExample</a:t>
+            </a:r>
+            <a:r>
+              <a:rPr lang="en-US" sz="3600" b="1" dirty="0" smtClean="0">
+                <a:highlight>
+                  <a:srgbClr val="E8F2FE"/>
+                </a:highlight>
+                <a:latin typeface="Courier New"/>
+              </a:rPr>
+              <a:t>(d: String): </a:t>
+            </a:r>
+            <a:r>
+              <a:rPr lang="en-US" sz="3600" b="1" dirty="0" smtClean="0">
+                <a:highlight>
+                  <a:srgbClr val="E8F2FE"/>
+                </a:highlight>
+                <a:latin typeface="Courier New"/>
+              </a:rPr>
+              <a:t>Example</a:t>
+            </a:r>
+            <a:endParaRPr lang="en-US" sz="3600" b="1" dirty="0" smtClean="0">
+              <a:solidFill>
+                <a:srgbClr val="7F0055"/>
+              </a:solidFill>
+              <a:latin typeface="Courier New"/>
+            </a:endParaRPr>
+          </a:p>
+        </p:txBody>
+      </p:sp>
+      <p:pic>
+        <p:nvPicPr>
+          <p:cNvPr id="70662" name="Picture 6" descr="magic, wizard icon"/>
+          <p:cNvPicPr>
+            <a:picLocks noChangeAspect="1" noChangeArrowheads="1"/>
+          </p:cNvPicPr>
+          <p:nvPr/>
+        </p:nvPicPr>
+        <p:blipFill>
+          <a:blip r:embed="rId4"/>
+          <a:srcRect/>
+          <a:stretch>
+            <a:fillRect/>
+          </a:stretch>
+        </p:blipFill>
+        <p:spPr bwMode="auto">
+          <a:xfrm>
+            <a:off x="635000" y="1143000"/>
+            <a:ext cx="1295400" cy="1295401"/>
+          </a:xfrm>
+          <a:prstGeom prst="rect">
+            <a:avLst/>
+          </a:prstGeom>
+          <a:noFill/>
+        </p:spPr>
+      </p:pic>
+      <p:sp>
+        <p:nvSpPr>
+          <p:cNvPr id="9" name="Rectangle 8"/>
+          <p:cNvSpPr/>
+          <p:nvPr/>
+        </p:nvSpPr>
+        <p:spPr>
+          <a:xfrm>
+            <a:off x="3556000" y="4836855"/>
+            <a:ext cx="8813800" cy="2554545"/>
+          </a:xfrm>
+          <a:prstGeom prst="rect">
+            <a:avLst/>
+          </a:prstGeom>
+        </p:spPr>
+        <p:txBody>
+          <a:bodyPr wrap="square">
+            <a:spAutoFit/>
+          </a:bodyPr>
+          <a:lstStyle/>
+          <a:p>
+            <a:r>
+              <a:rPr lang="en-US" sz="4000" dirty="0" smtClean="0">
+                <a:latin typeface="Verdana"/>
+              </a:rPr>
+              <a:t>“An </a:t>
+            </a:r>
+            <a:r>
+              <a:rPr lang="en-US" sz="4000" dirty="0" smtClean="0">
+                <a:latin typeface="Verdana"/>
+              </a:rPr>
+              <a:t>implicit conversion without explicit result type is visible only in the text following its own </a:t>
+            </a:r>
+            <a:r>
+              <a:rPr lang="en-US" sz="4000" dirty="0" smtClean="0">
+                <a:latin typeface="Verdana"/>
+              </a:rPr>
+              <a:t>definition”</a:t>
+            </a:r>
+            <a:endParaRPr lang="en-US" sz="4000" dirty="0"/>
+          </a:p>
+        </p:txBody>
+      </p:sp>
+    </p:spTree>
+  </p:cSld>
+  <p:clrMapOvr>
+    <a:masterClrMapping/>
+  </p:clrMapOvr>
+  <p:transition>
+    <p:fade/>
+  </p:transition>
+  <p:timing>
+    <p:tnLst>
+      <p:par>
+        <p:cTn id="1" dur="indefinite" restart="never" nodeType="tmRoot">
+          <p:childTnLst>
+            <p:seq concurrent="1" nextAc="seek">
+              <p:cTn id="2" dur="indefinite" nodeType="mainSeq">
+                <p:childTnLst>
+                  <p:par>
+                    <p:cTn id="3" fill="hold">
+                      <p:stCondLst>
+                        <p:cond delay="indefinite"/>
+                        <p:cond evt="onBegin" delay="0">
+                          <p:tn val="2"/>
+                        </p:cond>
+                      </p:stCondLst>
+                      <p:childTnLst>
+                        <p:par>
+                          <p:cTn id="4" fill="hold">
+                            <p:stCondLst>
+                              <p:cond delay="0"/>
+                            </p:stCondLst>
+                            <p:childTnLst>
+                              <p:par>
+                                <p:cTn id="5" presetID="1" presetClass="entr" presetSubtype="0" fill="hold" nodeType="withEffect">
+                                  <p:stCondLst>
+                                    <p:cond delay="0"/>
+                                  </p:stCondLst>
+                                  <p:childTnLst>
+                                    <p:set>
+                                      <p:cBhvr>
+                                        <p:cTn id="6" dur="1" fill="hold">
+                                          <p:stCondLst>
+                                            <p:cond delay="0"/>
+                                          </p:stCondLst>
+                                        </p:cTn>
+                                        <p:tgtEl>
+                                          <p:spTgt spid="8"/>
+                                        </p:tgtEl>
+                                        <p:attrNameLst>
+                                          <p:attrName>style.visibility</p:attrName>
+                                        </p:attrNameLst>
+                                      </p:cBhvr>
+                                      <p:to>
+                                        <p:strVal val="visible"/>
+                                      </p:to>
+                                    </p:set>
+                                  </p:childTnLst>
+                                </p:cTn>
+                              </p:par>
+                            </p:childTnLst>
+                          </p:cTn>
+                        </p:par>
+                      </p:childTnLst>
+                    </p:cTn>
+                  </p:par>
+                </p:childTnLst>
+              </p:cTn>
+              <p:prevCondLst>
+                <p:cond evt="onPrev" delay="0">
+                  <p:tgtEl>
+                    <p:sldTgt/>
+                  </p:tgtEl>
+                </p:cond>
+              </p:prevCondLst>
+              <p:nextCondLst>
+                <p:cond evt="onNext" delay="0">
+                  <p:tgtEl>
+                    <p:sldTgt/>
+                  </p:tgtEl>
+                </p:cond>
+              </p:nextCondLst>
+            </p:seq>
+          </p:childTnLst>
+        </p:cTn>
+      </p:par>
+    </p:tnLst>
+  </p:timing>
+</p:sld>
+</file>
+
+<file path=ppt/slides/slide26.xml><?xml version="1.0" encoding="utf-8"?>
+<p:sld xmlns:a="http://schemas.openxmlformats.org/drawingml/2006/main" xmlns:r="http://schemas.openxmlformats.org/officeDocument/2006/relationships" xmlns:p="http://schemas.openxmlformats.org/presentationml/2006/main">
+  <p:cSld>
+    <p:spTree>
+      <p:nvGrpSpPr>
+        <p:cNvPr id="1" name=""/>
+        <p:cNvGrpSpPr/>
+        <p:nvPr/>
+      </p:nvGrpSpPr>
+      <p:grpSpPr>
+        <a:xfrm>
+          <a:off x="0" y="0"/>
+          <a:ext cx="0" cy="0"/>
+          <a:chOff x="0" y="0"/>
+          <a:chExt cx="0" cy="0"/>
+        </a:xfrm>
+      </p:grpSpPr>
+      <p:sp>
+        <p:nvSpPr>
+          <p:cNvPr id="8193" name="Rectangle 1"/>
+          <p:cNvSpPr>
+            <a:spLocks noGrp="1" noChangeArrowheads="1"/>
+          </p:cNvSpPr>
+          <p:nvPr>
+            <p:ph type="title"/>
+          </p:nvPr>
+        </p:nvSpPr>
+        <p:spPr>
+          <a:xfrm>
+            <a:off x="711200" y="0"/>
+            <a:ext cx="12509500" cy="914400"/>
+          </a:xfrm>
+          <a:ln/>
+        </p:spPr>
+        <p:txBody>
+          <a:bodyPr/>
+          <a:lstStyle/>
+          <a:p>
+            <a:pPr lvl="0"/>
+            <a:r>
+              <a:rPr lang="en-US" sz="5400" dirty="0" smtClean="0">
+                <a:latin typeface="Lucida Handwriting" pitchFamily="66" charset="0"/>
+              </a:rPr>
+              <a:t>     </a:t>
+            </a:r>
+            <a:r>
+              <a:rPr lang="en-US" sz="5400" dirty="0" smtClean="0">
+                <a:latin typeface="Lucida Handwriting" pitchFamily="66" charset="0"/>
+              </a:rPr>
+              <a:t>DSL</a:t>
+            </a:r>
+            <a:endParaRPr lang="en-US" dirty="0"/>
+          </a:p>
+        </p:txBody>
+      </p:sp>
+      <p:sp>
+        <p:nvSpPr>
+          <p:cNvPr id="7" name="Rectangle 6"/>
+          <p:cNvSpPr/>
+          <p:nvPr/>
+        </p:nvSpPr>
+        <p:spPr>
+          <a:xfrm>
+            <a:off x="2870139" y="1438870"/>
+            <a:ext cx="2951449" cy="923330"/>
+          </a:xfrm>
+          <a:prstGeom prst="rect">
+            <a:avLst/>
+          </a:prstGeom>
+        </p:spPr>
+        <p:txBody>
+          <a:bodyPr wrap="none">
+            <a:spAutoFit/>
+          </a:bodyPr>
+          <a:lstStyle/>
+          <a:p>
+            <a:pPr algn="ctr"/>
+            <a:r>
+              <a:rPr lang="en-US" sz="5400" b="1" kern="0" dirty="0" smtClean="0">
+                <a:solidFill>
+                  <a:srgbClr val="00CC66"/>
+                </a:solidFill>
+                <a:latin typeface="Lucida Handwriting" pitchFamily="66" charset="0"/>
+                <a:cs typeface="+mj-cs"/>
+                <a:sym typeface="Arial" charset="0"/>
+              </a:rPr>
+              <a:t>restrict</a:t>
+            </a:r>
+            <a:endParaRPr lang="en-US" dirty="0">
+              <a:solidFill>
+                <a:srgbClr val="00CC66"/>
+              </a:solidFill>
+            </a:endParaRPr>
+          </a:p>
+        </p:txBody>
+      </p:sp>
+      <p:pic>
+        <p:nvPicPr>
+          <p:cNvPr id="8" name="Picture 10" descr="http://knowledgehub.zeus.com/media/Scala_Logo2008.png"/>
+          <p:cNvPicPr>
+            <a:picLocks noChangeAspect="1" noChangeArrowheads="1"/>
+          </p:cNvPicPr>
+          <p:nvPr/>
+        </p:nvPicPr>
+        <p:blipFill>
+          <a:blip r:embed="rId3"/>
+          <a:srcRect/>
+          <a:stretch>
+            <a:fillRect/>
+          </a:stretch>
+        </p:blipFill>
+        <p:spPr bwMode="auto">
+          <a:xfrm>
+            <a:off x="4140200" y="76200"/>
+            <a:ext cx="2279542" cy="679257"/>
+          </a:xfrm>
+          <a:prstGeom prst="rect">
+            <a:avLst/>
+          </a:prstGeom>
+          <a:noFill/>
+        </p:spPr>
+      </p:pic>
+      <p:sp>
+        <p:nvSpPr>
+          <p:cNvPr id="11" name="Rectangle 10"/>
+          <p:cNvSpPr/>
+          <p:nvPr/>
+        </p:nvSpPr>
+        <p:spPr>
+          <a:xfrm>
+            <a:off x="330200" y="3459301"/>
+            <a:ext cx="12344400" cy="3416320"/>
+          </a:xfrm>
+          <a:prstGeom prst="rect">
+            <a:avLst/>
+          </a:prstGeom>
+          <a:solidFill>
+            <a:schemeClr val="bg1"/>
+          </a:solidFill>
+          <a:ln>
+            <a:solidFill>
+              <a:schemeClr val="tx1"/>
+            </a:solidFill>
+            <a:prstDash val="dash"/>
+          </a:ln>
+        </p:spPr>
+        <p:txBody>
+          <a:bodyPr wrap="square">
+            <a:spAutoFit/>
+          </a:bodyPr>
+          <a:lstStyle/>
+          <a:p>
+            <a:r>
+              <a:rPr lang="en-US" sz="3600" b="1" dirty="0" smtClean="0">
+                <a:solidFill>
+                  <a:srgbClr val="7F0055"/>
+                </a:solidFill>
+                <a:latin typeface="Courier New"/>
+              </a:rPr>
+              <a:t>class</a:t>
+            </a:r>
+            <a:r>
+              <a:rPr lang="en-US" sz="3600" b="1" dirty="0" smtClean="0">
+                <a:latin typeface="Courier New"/>
+              </a:rPr>
+              <a:t> </a:t>
+            </a:r>
+            <a:r>
+              <a:rPr lang="en-US" sz="3600" b="1" dirty="0" smtClean="0">
+                <a:latin typeface="Courier New"/>
+              </a:rPr>
+              <a:t>Example(description: String) {</a:t>
+            </a:r>
+          </a:p>
+          <a:p>
+            <a:r>
+              <a:rPr lang="en-US" sz="3600" b="1" dirty="0" smtClean="0">
+                <a:solidFill>
+                  <a:srgbClr val="7F0055"/>
+                </a:solidFill>
+                <a:latin typeface="Courier New"/>
+              </a:rPr>
+              <a:t>  def</a:t>
+            </a:r>
+            <a:r>
+              <a:rPr lang="en-US" sz="3600" b="1" dirty="0" smtClean="0">
+                <a:latin typeface="Courier New"/>
+              </a:rPr>
+              <a:t> in(e: </a:t>
+            </a:r>
+            <a:r>
+              <a:rPr lang="en-US" sz="3600" b="1" dirty="0" smtClean="0">
+                <a:latin typeface="Courier New"/>
+              </a:rPr>
+              <a:t>=&gt;</a:t>
+            </a:r>
+            <a:r>
+              <a:rPr lang="en-US" sz="3600" b="1" dirty="0" smtClean="0">
+                <a:solidFill>
+                  <a:srgbClr val="7F0055"/>
+                </a:solidFill>
+                <a:latin typeface="Courier New"/>
+              </a:rPr>
+              <a:t>Any</a:t>
+            </a:r>
+            <a:r>
+              <a:rPr lang="en-US" sz="3600" b="1" dirty="0" smtClean="0">
+                <a:latin typeface="Courier New"/>
+              </a:rPr>
+              <a:t>) = expectations</a:t>
+            </a:r>
+          </a:p>
+          <a:p>
+            <a:r>
+              <a:rPr lang="en-US" sz="3600" b="1" dirty="0" smtClean="0">
+                <a:solidFill>
+                  <a:srgbClr val="7F0055"/>
+                </a:solidFill>
+                <a:latin typeface="Courier New"/>
+              </a:rPr>
+              <a:t>  def</a:t>
+            </a:r>
+            <a:r>
+              <a:rPr lang="en-US" sz="3600" b="1" dirty="0" smtClean="0">
+                <a:latin typeface="Courier New"/>
+              </a:rPr>
+              <a:t> </a:t>
+            </a:r>
+            <a:r>
+              <a:rPr lang="en-US" sz="3600" b="1" dirty="0" smtClean="0">
+                <a:latin typeface="Courier New"/>
+              </a:rPr>
+              <a:t>tag(t: String) = ()</a:t>
+            </a:r>
+          </a:p>
+          <a:p>
+            <a:r>
+              <a:rPr lang="en-US" sz="3600" dirty="0" smtClean="0">
+                <a:latin typeface="Courier New"/>
+              </a:rPr>
+              <a:t>}</a:t>
+            </a:r>
+          </a:p>
+          <a:p>
+            <a:endParaRPr lang="en-US" sz="3600" b="1" dirty="0" smtClean="0">
+              <a:solidFill>
+                <a:srgbClr val="7F0055"/>
+              </a:solidFill>
+              <a:latin typeface="Courier New"/>
+            </a:endParaRPr>
+          </a:p>
+          <a:p>
+            <a:r>
+              <a:rPr lang="en-US" sz="3600" dirty="0" smtClean="0">
+                <a:solidFill>
+                  <a:srgbClr val="2A00FF"/>
+                </a:solidFill>
+                <a:highlight>
+                  <a:srgbClr val="E8F2FE"/>
+                </a:highlight>
+                <a:latin typeface="Courier New"/>
+              </a:rPr>
+              <a:t>"this is a </a:t>
+            </a:r>
+            <a:r>
+              <a:rPr lang="en-US" sz="3600" dirty="0" smtClean="0">
+                <a:solidFill>
+                  <a:srgbClr val="2A00FF"/>
+                </a:solidFill>
+                <a:highlight>
+                  <a:srgbClr val="E8F2FE"/>
+                </a:highlight>
+                <a:latin typeface="Courier New"/>
+              </a:rPr>
+              <a:t>" </a:t>
+            </a:r>
+            <a:r>
+              <a:rPr lang="en-US" sz="3600" dirty="0" smtClean="0">
+                <a:highlight>
+                  <a:srgbClr val="E8F2FE"/>
+                </a:highlight>
+                <a:latin typeface="Courier New"/>
+              </a:rPr>
+              <a:t>tag (</a:t>
+            </a:r>
+            <a:r>
+              <a:rPr lang="en-US" sz="3600" dirty="0" smtClean="0">
+                <a:solidFill>
+                  <a:srgbClr val="2A00FF"/>
+                </a:solidFill>
+                <a:highlight>
+                  <a:srgbClr val="E8F2FE"/>
+                </a:highlight>
+                <a:latin typeface="Courier New"/>
+              </a:rPr>
+              <a:t>"</a:t>
+            </a:r>
+            <a:r>
+              <a:rPr lang="en-US" sz="3600" dirty="0" smtClean="0">
+                <a:solidFill>
+                  <a:srgbClr val="2A00FF"/>
+                </a:solidFill>
+                <a:highlight>
+                  <a:srgbClr val="E8F2FE"/>
+                </a:highlight>
+                <a:latin typeface="Courier New"/>
+              </a:rPr>
+              <a:t>really?"</a:t>
+            </a:r>
+            <a:r>
+              <a:rPr lang="en-US" sz="3600" dirty="0" smtClean="0">
+                <a:highlight>
+                  <a:srgbClr val="E8F2FE"/>
+                </a:highlight>
+                <a:latin typeface="Courier New"/>
+              </a:rPr>
+              <a:t>)</a:t>
+            </a:r>
+            <a:endParaRPr lang="en-US" sz="3600" b="1" dirty="0" smtClean="0">
+              <a:solidFill>
+                <a:srgbClr val="7F0055"/>
+              </a:solidFill>
+              <a:latin typeface="Courier New"/>
+            </a:endParaRPr>
+          </a:p>
+        </p:txBody>
+      </p:sp>
+      <p:pic>
+        <p:nvPicPr>
+          <p:cNvPr id="70662" name="Picture 6" descr="magic, wizard icon"/>
+          <p:cNvPicPr>
+            <a:picLocks noChangeAspect="1" noChangeArrowheads="1"/>
+          </p:cNvPicPr>
+          <p:nvPr/>
+        </p:nvPicPr>
+        <p:blipFill>
+          <a:blip r:embed="rId4"/>
+          <a:srcRect/>
+          <a:stretch>
+            <a:fillRect/>
+          </a:stretch>
+        </p:blipFill>
+        <p:spPr bwMode="auto">
+          <a:xfrm>
+            <a:off x="635000" y="1143000"/>
+            <a:ext cx="1295400" cy="1295401"/>
+          </a:xfrm>
+          <a:prstGeom prst="rect">
+            <a:avLst/>
+          </a:prstGeom>
+          <a:noFill/>
+        </p:spPr>
+      </p:pic>
+    </p:spTree>
+  </p:cSld>
+  <p:clrMapOvr>
+    <a:masterClrMapping/>
+  </p:clrMapOvr>
+  <p:transition>
+    <p:fade/>
+  </p:transition>
+  <p:timing>
+    <p:tnLst>
+      <p:par>
+        <p:cTn id="1" dur="indefinite" restart="never" nodeType="tmRoot">
+          <p:childTnLst>
+            <p:seq concurrent="1" nextAc="seek">
+              <p:cTn id="2" dur="indefinite" nodeType="mainSeq">
+                <p:childTnLst>
+                  <p:par>
+                    <p:cTn id="3" fill="hold">
+                      <p:stCondLst>
+                        <p:cond delay="indefinite"/>
+                        <p:cond evt="onBegin" delay="0">
+                          <p:tn val="2"/>
+                        </p:cond>
+                      </p:stCondLst>
+                      <p:childTnLst>
+                        <p:par>
+                          <p:cTn id="4" fill="hold">
+                            <p:stCondLst>
+                              <p:cond delay="0"/>
+                            </p:stCondLst>
+                            <p:childTnLst>
+                              <p:par>
+                                <p:cTn id="5" presetID="1" presetClass="entr" presetSubtype="0" fill="hold" nodeType="withEffect">
+                                  <p:stCondLst>
+                                    <p:cond delay="0"/>
+                                  </p:stCondLst>
+                                  <p:childTnLst>
+                                    <p:set>
+                                      <p:cBhvr>
+                                        <p:cTn id="6" dur="1" fill="hold">
+                                          <p:stCondLst>
+                                            <p:cond delay="0"/>
+                                          </p:stCondLst>
+                                        </p:cTn>
+                                        <p:tgtEl>
+                                          <p:spTgt spid="8"/>
+                                        </p:tgtEl>
+                                        <p:attrNameLst>
+                                          <p:attrName>style.visibility</p:attrName>
+                                        </p:attrNameLst>
+                                      </p:cBhvr>
+                                      <p:to>
+                                        <p:strVal val="visible"/>
+                                      </p:to>
+                                    </p:set>
+                                  </p:childTnLst>
+                                </p:cTn>
+                              </p:par>
+                            </p:childTnLst>
+                          </p:cTn>
+                        </p:par>
+                      </p:childTnLst>
+                    </p:cTn>
+                  </p:par>
+                </p:childTnLst>
+              </p:cTn>
+              <p:prevCondLst>
+                <p:cond evt="onPrev" delay="0">
+                  <p:tgtEl>
+                    <p:sldTgt/>
+                  </p:tgtEl>
+                </p:cond>
+              </p:prevCondLst>
+              <p:nextCondLst>
+                <p:cond evt="onNext" delay="0">
+                  <p:tgtEl>
+                    <p:sldTgt/>
+                  </p:tgtEl>
+                </p:cond>
+              </p:nextCondLst>
+            </p:seq>
+          </p:childTnLst>
+        </p:cTn>
+      </p:par>
+    </p:tnLst>
+  </p:timing>
+</p:sld>
+</file>
+
+<file path=ppt/slides/slide27.xml><?xml version="1.0" encoding="utf-8"?>
+<p:sld xmlns:a="http://schemas.openxmlformats.org/drawingml/2006/main" xmlns:r="http://schemas.openxmlformats.org/officeDocument/2006/relationships" xmlns:p="http://schemas.openxmlformats.org/presentationml/2006/main">
+  <p:cSld>
+    <p:spTree>
+      <p:nvGrpSpPr>
+        <p:cNvPr id="1" name=""/>
+        <p:cNvGrpSpPr/>
+        <p:nvPr/>
+      </p:nvGrpSpPr>
+      <p:grpSpPr>
+        <a:xfrm>
+          <a:off x="0" y="0"/>
+          <a:ext cx="0" cy="0"/>
+          <a:chOff x="0" y="0"/>
+          <a:chExt cx="0" cy="0"/>
+        </a:xfrm>
+      </p:grpSpPr>
+      <p:sp>
+        <p:nvSpPr>
+          <p:cNvPr id="8193" name="Rectangle 1"/>
+          <p:cNvSpPr>
+            <a:spLocks noGrp="1" noChangeArrowheads="1"/>
+          </p:cNvSpPr>
+          <p:nvPr>
+            <p:ph type="title"/>
+          </p:nvPr>
+        </p:nvSpPr>
+        <p:spPr>
+          <a:xfrm>
+            <a:off x="711200" y="0"/>
+            <a:ext cx="12509500" cy="914400"/>
+          </a:xfrm>
+          <a:ln/>
+        </p:spPr>
+        <p:txBody>
+          <a:bodyPr/>
+          <a:lstStyle/>
+          <a:p>
+            <a:pPr lvl="0"/>
+            <a:r>
+              <a:rPr lang="en-US" sz="5400" dirty="0" smtClean="0">
+                <a:latin typeface="Lucida Handwriting" pitchFamily="66" charset="0"/>
+              </a:rPr>
+              <a:t>     </a:t>
+            </a:r>
+            <a:r>
+              <a:rPr lang="en-US" sz="5400" dirty="0" smtClean="0">
+                <a:latin typeface="Lucida Handwriting" pitchFamily="66" charset="0"/>
+              </a:rPr>
+              <a:t>DSL</a:t>
+            </a:r>
+            <a:endParaRPr lang="en-US" dirty="0"/>
+          </a:p>
+        </p:txBody>
+      </p:sp>
+      <p:sp>
+        <p:nvSpPr>
+          <p:cNvPr id="7" name="Rectangle 6"/>
+          <p:cNvSpPr/>
+          <p:nvPr/>
+        </p:nvSpPr>
+        <p:spPr>
+          <a:xfrm>
+            <a:off x="2870139" y="1438870"/>
+            <a:ext cx="2951449" cy="923330"/>
+          </a:xfrm>
+          <a:prstGeom prst="rect">
+            <a:avLst/>
+          </a:prstGeom>
+        </p:spPr>
+        <p:txBody>
+          <a:bodyPr wrap="none">
+            <a:spAutoFit/>
+          </a:bodyPr>
+          <a:lstStyle/>
+          <a:p>
+            <a:pPr algn="ctr"/>
+            <a:r>
+              <a:rPr lang="en-US" sz="5400" b="1" kern="0" dirty="0" smtClean="0">
+                <a:solidFill>
+                  <a:srgbClr val="00CC66"/>
+                </a:solidFill>
+                <a:latin typeface="Lucida Handwriting" pitchFamily="66" charset="0"/>
+                <a:cs typeface="+mj-cs"/>
+                <a:sym typeface="Arial" charset="0"/>
+              </a:rPr>
+              <a:t>restrict</a:t>
+            </a:r>
+            <a:endParaRPr lang="en-US" dirty="0">
+              <a:solidFill>
+                <a:srgbClr val="00CC66"/>
+              </a:solidFill>
+            </a:endParaRPr>
+          </a:p>
+        </p:txBody>
+      </p:sp>
+      <p:pic>
+        <p:nvPicPr>
+          <p:cNvPr id="8" name="Picture 10" descr="http://knowledgehub.zeus.com/media/Scala_Logo2008.png"/>
+          <p:cNvPicPr>
+            <a:picLocks noChangeAspect="1" noChangeArrowheads="1"/>
+          </p:cNvPicPr>
+          <p:nvPr/>
+        </p:nvPicPr>
+        <p:blipFill>
+          <a:blip r:embed="rId3"/>
+          <a:srcRect/>
+          <a:stretch>
+            <a:fillRect/>
+          </a:stretch>
+        </p:blipFill>
+        <p:spPr bwMode="auto">
+          <a:xfrm>
+            <a:off x="4140200" y="76200"/>
+            <a:ext cx="2279542" cy="679257"/>
+          </a:xfrm>
+          <a:prstGeom prst="rect">
+            <a:avLst/>
+          </a:prstGeom>
+          <a:noFill/>
+        </p:spPr>
+      </p:pic>
+      <p:sp>
+        <p:nvSpPr>
+          <p:cNvPr id="11" name="Rectangle 10"/>
+          <p:cNvSpPr/>
+          <p:nvPr/>
+        </p:nvSpPr>
+        <p:spPr>
+          <a:xfrm>
+            <a:off x="330200" y="3459301"/>
+            <a:ext cx="12344400" cy="3970318"/>
+          </a:xfrm>
+          <a:prstGeom prst="rect">
+            <a:avLst/>
+          </a:prstGeom>
+          <a:solidFill>
+            <a:schemeClr val="bg1"/>
+          </a:solidFill>
+          <a:ln>
+            <a:solidFill>
+              <a:schemeClr val="tx1"/>
+            </a:solidFill>
+            <a:prstDash val="dash"/>
+          </a:ln>
+        </p:spPr>
+        <p:txBody>
+          <a:bodyPr wrap="square">
+            <a:spAutoFit/>
+          </a:bodyPr>
+          <a:lstStyle/>
+          <a:p>
+            <a:r>
+              <a:rPr lang="en-US" sz="3600" b="1" dirty="0" smtClean="0">
+                <a:solidFill>
+                  <a:srgbClr val="7F0055"/>
+                </a:solidFill>
+                <a:latin typeface="Courier New"/>
+              </a:rPr>
+              <a:t>class</a:t>
+            </a:r>
+            <a:r>
+              <a:rPr lang="en-US" sz="3600" b="1" dirty="0" smtClean="0">
+                <a:latin typeface="Courier New"/>
+              </a:rPr>
+              <a:t> </a:t>
+            </a:r>
+            <a:r>
+              <a:rPr lang="en-US" sz="3600" b="1" dirty="0" err="1" smtClean="0">
+                <a:latin typeface="Courier New"/>
+              </a:rPr>
+              <a:t>ExampleDesc</a:t>
+            </a:r>
+            <a:r>
+              <a:rPr lang="en-US" sz="3600" b="1" dirty="0" smtClean="0">
+                <a:latin typeface="Courier New"/>
+              </a:rPr>
+              <a:t>(description: String) </a:t>
+            </a:r>
+            <a:r>
+              <a:rPr lang="en-US" sz="3600" b="1" dirty="0" smtClean="0">
+                <a:latin typeface="Courier New"/>
+              </a:rPr>
+              <a:t>{</a:t>
+            </a:r>
+            <a:r>
+              <a:rPr lang="en-US" sz="3600" b="1" dirty="0" smtClean="0">
+                <a:solidFill>
+                  <a:srgbClr val="7F0055"/>
+                </a:solidFill>
+                <a:latin typeface="Courier New"/>
+              </a:rPr>
+              <a:t>    </a:t>
+            </a:r>
+          </a:p>
+          <a:p>
+            <a:r>
+              <a:rPr lang="en-US" sz="3600" b="1" dirty="0" smtClean="0">
+                <a:solidFill>
+                  <a:srgbClr val="7F0055"/>
+                </a:solidFill>
+                <a:latin typeface="Courier New"/>
+              </a:rPr>
+              <a:t> </a:t>
+            </a:r>
+            <a:r>
+              <a:rPr lang="en-US" sz="3600" b="1" dirty="0" smtClean="0">
+                <a:solidFill>
+                  <a:srgbClr val="7F0055"/>
+                </a:solidFill>
+                <a:latin typeface="Courier New"/>
+              </a:rPr>
+              <a:t> def</a:t>
+            </a:r>
+            <a:r>
+              <a:rPr lang="en-US" sz="3600" b="1" dirty="0" smtClean="0">
+                <a:latin typeface="Courier New"/>
+              </a:rPr>
+              <a:t> </a:t>
+            </a:r>
+            <a:r>
+              <a:rPr lang="en-US" sz="3600" b="1" dirty="0" smtClean="0">
+                <a:latin typeface="Courier New"/>
+              </a:rPr>
+              <a:t>in(e: =&gt;</a:t>
+            </a:r>
+            <a:r>
+              <a:rPr lang="en-US" sz="3600" b="1" dirty="0" smtClean="0">
+                <a:solidFill>
+                  <a:srgbClr val="7F0055"/>
+                </a:solidFill>
+                <a:latin typeface="Courier New"/>
+              </a:rPr>
+              <a:t>Any</a:t>
+            </a:r>
+            <a:r>
+              <a:rPr lang="en-US" sz="3600" b="1" dirty="0" smtClean="0">
+                <a:latin typeface="Courier New"/>
+              </a:rPr>
+              <a:t>): Example = </a:t>
+            </a:r>
+            <a:r>
+              <a:rPr lang="en-US" sz="3600" b="1" dirty="0" smtClean="0">
+                <a:solidFill>
+                  <a:srgbClr val="7F0055"/>
+                </a:solidFill>
+                <a:latin typeface="Courier New"/>
+              </a:rPr>
+              <a:t>new</a:t>
+            </a:r>
+            <a:r>
+              <a:rPr lang="en-US" sz="3600" b="1" dirty="0" smtClean="0">
+                <a:latin typeface="Courier New"/>
+              </a:rPr>
+              <a:t> </a:t>
+            </a:r>
+            <a:r>
+              <a:rPr lang="en-US" sz="3600" b="1" dirty="0" smtClean="0">
+                <a:latin typeface="Courier New"/>
+              </a:rPr>
+              <a:t>  </a:t>
+            </a:r>
+          </a:p>
+          <a:p>
+            <a:r>
+              <a:rPr lang="en-US" sz="3600" b="1" dirty="0" smtClean="0">
+                <a:latin typeface="Courier New"/>
+              </a:rPr>
+              <a:t> </a:t>
+            </a:r>
+            <a:r>
+              <a:rPr lang="en-US" sz="3600" b="1" dirty="0" smtClean="0">
+                <a:latin typeface="Courier New"/>
+              </a:rPr>
+              <a:t>   Example(description</a:t>
+            </a:r>
+            <a:r>
+              <a:rPr lang="en-US" sz="3600" b="1" dirty="0" smtClean="0">
+                <a:latin typeface="Courier New"/>
+              </a:rPr>
+              <a:t>, e)</a:t>
+            </a:r>
+          </a:p>
+          <a:p>
+            <a:r>
+              <a:rPr lang="en-US" sz="3600" dirty="0" smtClean="0">
+                <a:latin typeface="Courier New"/>
+              </a:rPr>
+              <a:t>  </a:t>
+            </a:r>
+            <a:r>
+              <a:rPr lang="en-US" sz="3600" dirty="0" smtClean="0">
+                <a:latin typeface="Courier New"/>
+              </a:rPr>
+              <a:t>}</a:t>
+            </a:r>
+          </a:p>
+          <a:p>
+            <a:r>
+              <a:rPr lang="en-US" sz="3600" dirty="0" smtClean="0">
+                <a:latin typeface="Courier New"/>
+              </a:rPr>
+              <a:t>}</a:t>
+            </a:r>
+            <a:endParaRPr lang="en-US" sz="3600" dirty="0" smtClean="0">
+              <a:latin typeface="Courier New"/>
+            </a:endParaRPr>
+          </a:p>
+          <a:p>
+            <a:endParaRPr lang="en-US" sz="3600" b="1" dirty="0" smtClean="0">
+              <a:solidFill>
+                <a:srgbClr val="7F0055"/>
+              </a:solidFill>
+              <a:latin typeface="Courier New"/>
+            </a:endParaRPr>
+          </a:p>
+          <a:p>
+            <a:r>
+              <a:rPr lang="en-US" sz="3600" b="1" dirty="0" smtClean="0">
+                <a:solidFill>
+                  <a:srgbClr val="7F0055"/>
+                </a:solidFill>
+                <a:latin typeface="Courier New"/>
+              </a:rPr>
+              <a:t>class</a:t>
+            </a:r>
+            <a:r>
+              <a:rPr lang="en-US" sz="3600" b="1" dirty="0" smtClean="0">
+                <a:latin typeface="Courier New"/>
+              </a:rPr>
+              <a:t> Example(d: </a:t>
+            </a:r>
+            <a:r>
+              <a:rPr lang="en-US" sz="3600" b="1" dirty="0" smtClean="0">
+                <a:latin typeface="Courier New"/>
+              </a:rPr>
+              <a:t>String, </a:t>
+            </a:r>
+            <a:r>
+              <a:rPr lang="en-US" sz="3600" b="1" dirty="0" smtClean="0">
+                <a:latin typeface="Courier New"/>
+              </a:rPr>
+              <a:t>e: </a:t>
+            </a:r>
+            <a:r>
+              <a:rPr lang="en-US" sz="3600" b="1" dirty="0" smtClean="0">
+                <a:solidFill>
+                  <a:srgbClr val="7F0055"/>
+                </a:solidFill>
+                <a:latin typeface="Courier New"/>
+              </a:rPr>
+              <a:t>Any</a:t>
+            </a:r>
+            <a:r>
+              <a:rPr lang="en-US" sz="3600" b="1" dirty="0" smtClean="0">
+                <a:latin typeface="Courier New"/>
+              </a:rPr>
+              <a:t>)</a:t>
+            </a:r>
+            <a:endParaRPr lang="en-US" sz="3600" b="1" dirty="0" smtClean="0">
+              <a:solidFill>
+                <a:srgbClr val="7F0055"/>
+              </a:solidFill>
+              <a:latin typeface="Courier New"/>
+            </a:endParaRPr>
+          </a:p>
+        </p:txBody>
+      </p:sp>
+      <p:pic>
+        <p:nvPicPr>
+          <p:cNvPr id="70662" name="Picture 6" descr="magic, wizard icon"/>
+          <p:cNvPicPr>
+            <a:picLocks noChangeAspect="1" noChangeArrowheads="1"/>
+          </p:cNvPicPr>
+          <p:nvPr/>
+        </p:nvPicPr>
+        <p:blipFill>
+          <a:blip r:embed="rId4"/>
+          <a:srcRect/>
+          <a:stretch>
+            <a:fillRect/>
+          </a:stretch>
+        </p:blipFill>
+        <p:spPr bwMode="auto">
+          <a:xfrm>
+            <a:off x="635000" y="1143000"/>
+            <a:ext cx="1295400" cy="1295401"/>
+          </a:xfrm>
+          <a:prstGeom prst="rect">
+            <a:avLst/>
+          </a:prstGeom>
+          <a:noFill/>
+        </p:spPr>
+      </p:pic>
+    </p:spTree>
+  </p:cSld>
+  <p:clrMapOvr>
+    <a:masterClrMapping/>
+  </p:clrMapOvr>
+  <p:transition>
+    <p:fade/>
+  </p:transition>
+  <p:timing>
+    <p:tnLst>
+      <p:par>
+        <p:cTn id="1" dur="indefinite" restart="never" nodeType="tmRoot">
+          <p:childTnLst>
+            <p:seq concurrent="1" nextAc="seek">
+              <p:cTn id="2" dur="indefinite" nodeType="mainSeq">
+                <p:childTnLst>
+                  <p:par>
+                    <p:cTn id="3" fill="hold">
+                      <p:stCondLst>
+                        <p:cond delay="indefinite"/>
+                        <p:cond evt="onBegin" delay="0">
+                          <p:tn val="2"/>
+                        </p:cond>
+                      </p:stCondLst>
+                      <p:childTnLst>
+                        <p:par>
+                          <p:cTn id="4" fill="hold">
+                            <p:stCondLst>
+                              <p:cond delay="0"/>
+                            </p:stCondLst>
+                            <p:childTnLst>
+                              <p:par>
+                                <p:cTn id="5" presetID="1" presetClass="entr" presetSubtype="0" fill="hold" nodeType="withEffect">
+                                  <p:stCondLst>
+                                    <p:cond delay="0"/>
+                                  </p:stCondLst>
+                                  <p:childTnLst>
+                                    <p:set>
+                                      <p:cBhvr>
+                                        <p:cTn id="6" dur="1" fill="hold">
+                                          <p:stCondLst>
+                                            <p:cond delay="0"/>
+                                          </p:stCondLst>
+                                        </p:cTn>
+                                        <p:tgtEl>
+                                          <p:spTgt spid="8"/>
+                                        </p:tgtEl>
+                                        <p:attrNameLst>
+                                          <p:attrName>style.visibility</p:attrName>
+                                        </p:attrNameLst>
+                                      </p:cBhvr>
+                                      <p:to>
+                                        <p:strVal val="visible"/>
+                                      </p:to>
+                                    </p:set>
+                                  </p:childTnLst>
+                                </p:cTn>
+                              </p:par>
+                            </p:childTnLst>
+                          </p:cTn>
+                        </p:par>
+                      </p:childTnLst>
+                    </p:cTn>
+                  </p:par>
+                </p:childTnLst>
+              </p:cTn>
+              <p:prevCondLst>
+                <p:cond evt="onPrev" delay="0">
+                  <p:tgtEl>
+                    <p:sldTgt/>
+                  </p:tgtEl>
+                </p:cond>
+              </p:prevCondLst>
+              <p:nextCondLst>
+                <p:cond evt="onNext" delay="0">
+                  <p:tgtEl>
+                    <p:sldTgt/>
+                  </p:tgtEl>
+                </p:cond>
+              </p:nextCondLst>
+            </p:seq>
+          </p:childTnLst>
+        </p:cTn>
+      </p:par>
+    </p:tnLst>
+  </p:timing>
+</p:sld>
+</file>
+
+<file path=ppt/slides/slide28.xml><?xml version="1.0" encoding="utf-8"?>
+<p:sld xmlns:a="http://schemas.openxmlformats.org/drawingml/2006/main" xmlns:r="http://schemas.openxmlformats.org/officeDocument/2006/relationships" xmlns:p="http://schemas.openxmlformats.org/presentationml/2006/main">
+  <p:cSld>
+    <p:spTree>
+      <p:nvGrpSpPr>
+        <p:cNvPr id="1" name=""/>
+        <p:cNvGrpSpPr/>
+        <p:nvPr/>
+      </p:nvGrpSpPr>
+      <p:grpSpPr>
+        <a:xfrm>
+          <a:off x="0" y="0"/>
+          <a:ext cx="0" cy="0"/>
+          <a:chOff x="0" y="0"/>
+          <a:chExt cx="0" cy="0"/>
+        </a:xfrm>
+      </p:grpSpPr>
+      <p:sp>
+        <p:nvSpPr>
+          <p:cNvPr id="8193" name="Rectangle 1"/>
+          <p:cNvSpPr>
+            <a:spLocks noGrp="1" noChangeArrowheads="1"/>
+          </p:cNvSpPr>
+          <p:nvPr>
+            <p:ph type="title"/>
+          </p:nvPr>
+        </p:nvSpPr>
+        <p:spPr>
+          <a:xfrm>
+            <a:off x="711200" y="0"/>
+            <a:ext cx="12509500" cy="914400"/>
+          </a:xfrm>
+          <a:ln/>
+        </p:spPr>
+        <p:txBody>
+          <a:bodyPr/>
+          <a:lstStyle/>
+          <a:p>
+            <a:pPr lvl="0"/>
+            <a:r>
+              <a:rPr lang="en-US" sz="5400" dirty="0" smtClean="0">
+                <a:latin typeface="Lucida Handwriting" pitchFamily="66" charset="0"/>
+              </a:rPr>
+              <a:t>     </a:t>
+            </a:r>
+            <a:r>
+              <a:rPr lang="en-US" sz="5400" dirty="0" smtClean="0">
+                <a:latin typeface="Lucida Handwriting" pitchFamily="66" charset="0"/>
+              </a:rPr>
+              <a:t>DSL</a:t>
+            </a:r>
+            <a:endParaRPr lang="en-US" dirty="0"/>
+          </a:p>
+        </p:txBody>
+      </p:sp>
+      <p:sp>
+        <p:nvSpPr>
+          <p:cNvPr id="7" name="Rectangle 6"/>
+          <p:cNvSpPr/>
+          <p:nvPr/>
+        </p:nvSpPr>
+        <p:spPr>
+          <a:xfrm>
+            <a:off x="2870139" y="1438870"/>
+            <a:ext cx="8493031" cy="923330"/>
+          </a:xfrm>
+          <a:prstGeom prst="rect">
+            <a:avLst/>
+          </a:prstGeom>
+        </p:spPr>
+        <p:txBody>
+          <a:bodyPr wrap="none">
+            <a:spAutoFit/>
+          </a:bodyPr>
+          <a:lstStyle/>
+          <a:p>
+            <a:pPr algn="ctr"/>
+            <a:r>
+              <a:rPr lang="en-US" sz="5400" b="1" kern="0" dirty="0" smtClean="0">
+                <a:solidFill>
+                  <a:srgbClr val="00CC66"/>
+                </a:solidFill>
+                <a:latin typeface="Lucida Handwriting" pitchFamily="66" charset="0"/>
+                <a:cs typeface="+mj-cs"/>
+                <a:sym typeface="Arial" charset="0"/>
+              </a:rPr>
+              <a:t>By name  parameters</a:t>
+            </a:r>
+            <a:endParaRPr lang="en-US" dirty="0">
+              <a:solidFill>
+                <a:srgbClr val="00CC66"/>
+              </a:solidFill>
+            </a:endParaRPr>
+          </a:p>
+        </p:txBody>
+      </p:sp>
+      <p:pic>
+        <p:nvPicPr>
+          <p:cNvPr id="8" name="Picture 10" descr="http://knowledgehub.zeus.com/media/Scala_Logo2008.png"/>
+          <p:cNvPicPr>
+            <a:picLocks noChangeAspect="1" noChangeArrowheads="1"/>
+          </p:cNvPicPr>
+          <p:nvPr/>
+        </p:nvPicPr>
+        <p:blipFill>
+          <a:blip r:embed="rId3"/>
+          <a:srcRect/>
+          <a:stretch>
+            <a:fillRect/>
+          </a:stretch>
+        </p:blipFill>
+        <p:spPr bwMode="auto">
+          <a:xfrm>
+            <a:off x="4140200" y="76200"/>
+            <a:ext cx="2279542" cy="679257"/>
+          </a:xfrm>
+          <a:prstGeom prst="rect">
+            <a:avLst/>
+          </a:prstGeom>
+          <a:noFill/>
+        </p:spPr>
+      </p:pic>
+      <p:sp>
+        <p:nvSpPr>
+          <p:cNvPr id="11" name="Rectangle 10"/>
+          <p:cNvSpPr/>
+          <p:nvPr/>
+        </p:nvSpPr>
+        <p:spPr>
+          <a:xfrm>
+            <a:off x="330200" y="3459301"/>
+            <a:ext cx="12344400" cy="4031873"/>
+          </a:xfrm>
+          <a:prstGeom prst="rect">
+            <a:avLst/>
+          </a:prstGeom>
+          <a:solidFill>
+            <a:schemeClr val="bg1"/>
+          </a:solidFill>
+          <a:ln>
+            <a:solidFill>
+              <a:schemeClr val="tx1"/>
+            </a:solidFill>
+            <a:prstDash val="dash"/>
+          </a:ln>
+        </p:spPr>
+        <p:txBody>
+          <a:bodyPr wrap="square">
+            <a:spAutoFit/>
+          </a:bodyPr>
+          <a:lstStyle/>
+          <a:p>
+            <a:r>
+              <a:rPr lang="en-US" sz="3200" b="1" dirty="0" smtClean="0">
+                <a:solidFill>
+                  <a:srgbClr val="7F0055"/>
+                </a:solidFill>
+                <a:latin typeface="Courier New"/>
+              </a:rPr>
+              <a:t>class</a:t>
+            </a:r>
+            <a:r>
+              <a:rPr lang="en-US" sz="3200" b="1" dirty="0" smtClean="0">
+                <a:latin typeface="Courier New"/>
+              </a:rPr>
+              <a:t> </a:t>
+            </a:r>
+            <a:r>
+              <a:rPr lang="en-US" sz="3200" b="1" dirty="0" err="1" smtClean="0">
+                <a:latin typeface="Courier New"/>
+              </a:rPr>
+              <a:t>ExampleDesc</a:t>
+            </a:r>
+            <a:r>
+              <a:rPr lang="en-US" sz="3200" b="1" dirty="0" smtClean="0">
+                <a:latin typeface="Courier New"/>
+              </a:rPr>
+              <a:t>(d: </a:t>
+            </a:r>
+            <a:r>
+              <a:rPr lang="en-US" sz="3200" b="1" dirty="0" smtClean="0">
+                <a:latin typeface="Courier New"/>
+              </a:rPr>
+              <a:t>String) </a:t>
+            </a:r>
+            <a:r>
+              <a:rPr lang="en-US" sz="3200" b="1" dirty="0" smtClean="0">
+                <a:latin typeface="Courier New"/>
+              </a:rPr>
+              <a:t>{</a:t>
+            </a:r>
+          </a:p>
+          <a:p>
+            <a:r>
+              <a:rPr lang="en-US" sz="3200" b="1" dirty="0" smtClean="0">
+                <a:solidFill>
+                  <a:srgbClr val="7F0055"/>
+                </a:solidFill>
+                <a:latin typeface="Courier New"/>
+              </a:rPr>
+              <a:t>  def</a:t>
+            </a:r>
+            <a:r>
+              <a:rPr lang="en-US" sz="3200" b="1" dirty="0" smtClean="0">
+                <a:latin typeface="Courier New"/>
+              </a:rPr>
+              <a:t> </a:t>
+            </a:r>
+            <a:r>
+              <a:rPr lang="en-US" sz="3200" b="1" dirty="0" smtClean="0">
+                <a:latin typeface="Courier New"/>
+              </a:rPr>
+              <a:t>in(e: =&gt;</a:t>
+            </a:r>
+            <a:r>
+              <a:rPr lang="en-US" sz="3200" b="1" dirty="0" smtClean="0">
+                <a:solidFill>
+                  <a:srgbClr val="7F0055"/>
+                </a:solidFill>
+                <a:latin typeface="Courier New"/>
+              </a:rPr>
+              <a:t>Any</a:t>
+            </a:r>
+            <a:r>
+              <a:rPr lang="en-US" sz="3200" b="1" dirty="0" smtClean="0">
+                <a:latin typeface="Courier New"/>
+              </a:rPr>
+              <a:t>) = </a:t>
+            </a:r>
+            <a:r>
+              <a:rPr lang="en-US" sz="3200" b="1" dirty="0" smtClean="0">
+                <a:solidFill>
+                  <a:srgbClr val="7F0055"/>
+                </a:solidFill>
+                <a:latin typeface="Courier New"/>
+              </a:rPr>
+              <a:t>new</a:t>
+            </a:r>
+            <a:r>
+              <a:rPr lang="en-US" sz="3200" b="1" dirty="0" smtClean="0">
+                <a:solidFill>
+                  <a:srgbClr val="7F0055"/>
+                </a:solidFill>
+                <a:latin typeface="Courier New"/>
+              </a:rPr>
+              <a:t> </a:t>
+            </a:r>
+            <a:r>
+              <a:rPr lang="en-US" sz="3200" b="1" dirty="0" smtClean="0">
+                <a:latin typeface="Courier New"/>
+              </a:rPr>
+              <a:t>Example(description</a:t>
+            </a:r>
+            <a:r>
+              <a:rPr lang="en-US" sz="3200" b="1" dirty="0" smtClean="0">
+                <a:latin typeface="Courier New"/>
+              </a:rPr>
+              <a:t>, e)</a:t>
+            </a:r>
+          </a:p>
+          <a:p>
+            <a:r>
+              <a:rPr lang="en-US" sz="3200" dirty="0" smtClean="0">
+                <a:latin typeface="Courier New"/>
+              </a:rPr>
+              <a:t>}</a:t>
+            </a:r>
+            <a:endParaRPr lang="en-US" sz="3200" dirty="0" smtClean="0">
+              <a:latin typeface="Courier New"/>
+            </a:endParaRPr>
+          </a:p>
+          <a:p>
+            <a:r>
+              <a:rPr lang="en-US" sz="3200" b="1" dirty="0" smtClean="0">
+                <a:solidFill>
+                  <a:srgbClr val="7F0055"/>
+                </a:solidFill>
+                <a:latin typeface="Courier New"/>
+              </a:rPr>
+              <a:t>class</a:t>
+            </a:r>
+            <a:r>
+              <a:rPr lang="en-US" sz="3200" b="1" dirty="0" smtClean="0">
+                <a:latin typeface="Courier New"/>
+              </a:rPr>
+              <a:t> Example(d: </a:t>
+            </a:r>
+            <a:r>
+              <a:rPr lang="en-US" sz="3200" b="1" dirty="0" smtClean="0">
+                <a:latin typeface="Courier New"/>
+              </a:rPr>
+              <a:t>String, </a:t>
+            </a:r>
+            <a:r>
+              <a:rPr lang="en-US" sz="3200" b="1" dirty="0" smtClean="0">
+                <a:latin typeface="Courier New"/>
+              </a:rPr>
+              <a:t>e: </a:t>
+            </a:r>
+            <a:r>
+              <a:rPr lang="en-US" sz="3200" b="1" dirty="0" smtClean="0">
+                <a:latin typeface="Courier New"/>
+              </a:rPr>
+              <a:t>=&gt;</a:t>
+            </a:r>
+            <a:r>
+              <a:rPr lang="en-US" sz="3200" b="1" dirty="0" smtClean="0">
+                <a:solidFill>
+                  <a:srgbClr val="7F0055"/>
+                </a:solidFill>
+                <a:latin typeface="Courier New"/>
+              </a:rPr>
+              <a:t>Any</a:t>
+            </a:r>
+            <a:r>
+              <a:rPr lang="en-US" sz="3200" b="1" dirty="0" smtClean="0">
+                <a:latin typeface="Courier New"/>
+              </a:rPr>
+              <a:t>)</a:t>
+            </a:r>
+          </a:p>
+          <a:p>
+            <a:r>
+              <a:rPr lang="en-US" sz="3200" b="1" dirty="0" smtClean="0">
+                <a:solidFill>
+                  <a:srgbClr val="7F0055"/>
+                </a:solidFill>
+                <a:latin typeface="Courier New"/>
+              </a:rPr>
+              <a:t>implicit</a:t>
+            </a:r>
+            <a:r>
+              <a:rPr lang="en-US" sz="3200" b="1" dirty="0" smtClean="0">
+                <a:latin typeface="Courier New"/>
+              </a:rPr>
+              <a:t> </a:t>
+            </a:r>
+            <a:r>
+              <a:rPr lang="en-US" sz="3200" b="1" dirty="0" smtClean="0">
+                <a:solidFill>
+                  <a:srgbClr val="7F0055"/>
+                </a:solidFill>
+                <a:latin typeface="Courier New"/>
+              </a:rPr>
+              <a:t>def</a:t>
+            </a:r>
+            <a:r>
+              <a:rPr lang="en-US" sz="3200" b="1" dirty="0" smtClean="0">
+                <a:latin typeface="Courier New"/>
+              </a:rPr>
+              <a:t> </a:t>
+            </a:r>
+            <a:r>
+              <a:rPr lang="en-US" sz="3200" b="1" dirty="0" err="1" smtClean="0">
+                <a:latin typeface="Courier New"/>
+              </a:rPr>
+              <a:t>forExample</a:t>
+            </a:r>
+            <a:r>
+              <a:rPr lang="en-US" sz="3200" b="1" dirty="0" smtClean="0">
+                <a:latin typeface="Courier New"/>
+              </a:rPr>
+              <a:t>(d: String</a:t>
+            </a:r>
+            <a:r>
+              <a:rPr lang="en-US" sz="3200" b="1" dirty="0" smtClean="0">
+                <a:latin typeface="Courier New"/>
+              </a:rPr>
+              <a:t>): </a:t>
+            </a:r>
+            <a:r>
+              <a:rPr lang="en-US" sz="3200" b="1" dirty="0" err="1" smtClean="0">
+                <a:latin typeface="Courier New"/>
+              </a:rPr>
+              <a:t>ExampleDesc</a:t>
+            </a:r>
+            <a:r>
+              <a:rPr lang="en-US" sz="3200" b="1" dirty="0" smtClean="0">
+                <a:latin typeface="Courier New"/>
+              </a:rPr>
+              <a:t> </a:t>
+            </a:r>
+            <a:r>
+              <a:rPr lang="en-US" sz="3200" b="1" dirty="0" smtClean="0">
+                <a:latin typeface="Courier New"/>
+              </a:rPr>
+              <a:t>= </a:t>
+            </a:r>
+            <a:r>
+              <a:rPr lang="en-US" sz="3200" b="1" dirty="0" smtClean="0">
+                <a:latin typeface="Courier New"/>
+              </a:rPr>
+              <a:t>  </a:t>
+            </a:r>
+          </a:p>
+          <a:p>
+            <a:r>
+              <a:rPr lang="en-US" sz="3200" b="1" dirty="0" smtClean="0">
+                <a:solidFill>
+                  <a:srgbClr val="7F0055"/>
+                </a:solidFill>
+                <a:latin typeface="Courier New"/>
+              </a:rPr>
+              <a:t> </a:t>
+            </a:r>
+            <a:r>
+              <a:rPr lang="en-US" sz="3200" b="1" dirty="0" smtClean="0">
+                <a:solidFill>
+                  <a:srgbClr val="7F0055"/>
+                </a:solidFill>
+                <a:latin typeface="Courier New"/>
+              </a:rPr>
+              <a:t>                          new</a:t>
+            </a:r>
+            <a:r>
+              <a:rPr lang="en-US" sz="3200" b="1" dirty="0" smtClean="0">
+                <a:latin typeface="Courier New"/>
+              </a:rPr>
+              <a:t> </a:t>
+            </a:r>
+            <a:r>
+              <a:rPr lang="en-US" sz="3200" b="1" dirty="0" err="1" smtClean="0">
+                <a:latin typeface="Courier New"/>
+              </a:rPr>
+              <a:t>ExampleDesc</a:t>
+            </a:r>
+            <a:r>
+              <a:rPr lang="en-US" sz="3200" b="1" dirty="0" smtClean="0">
+                <a:latin typeface="Courier New"/>
+              </a:rPr>
+              <a:t>(d)</a:t>
+            </a:r>
+            <a:endParaRPr lang="en-US" sz="3200" dirty="0" smtClean="0">
+              <a:latin typeface="Courier New"/>
+            </a:endParaRPr>
+          </a:p>
+          <a:p>
+            <a:endParaRPr lang="en-US" sz="3200" b="1" dirty="0" smtClean="0">
+              <a:solidFill>
+                <a:srgbClr val="7F0055"/>
+              </a:solidFill>
+              <a:latin typeface="Courier New"/>
+            </a:endParaRPr>
+          </a:p>
+          <a:p>
+            <a:r>
+              <a:rPr lang="en-US" sz="3200" dirty="0" smtClean="0">
+                <a:solidFill>
+                  <a:srgbClr val="2A00FF"/>
+                </a:solidFill>
+                <a:highlight>
+                  <a:srgbClr val="E8F2FE"/>
+                </a:highlight>
+                <a:latin typeface="Courier New"/>
+              </a:rPr>
+              <a:t>"This will not explode"</a:t>
+            </a:r>
+            <a:r>
+              <a:rPr lang="en-US" sz="3200" dirty="0" smtClean="0">
+                <a:highlight>
+                  <a:srgbClr val="E8F2FE"/>
+                </a:highlight>
+                <a:latin typeface="Courier New"/>
+              </a:rPr>
+              <a:t> in error(</a:t>
+            </a:r>
+            <a:r>
+              <a:rPr lang="en-US" sz="3200" dirty="0" smtClean="0">
+                <a:solidFill>
+                  <a:srgbClr val="2A00FF"/>
+                </a:solidFill>
+                <a:highlight>
+                  <a:srgbClr val="E8F2FE"/>
+                </a:highlight>
+                <a:latin typeface="Courier New"/>
+              </a:rPr>
+              <a:t>"boom"</a:t>
+            </a:r>
+            <a:r>
+              <a:rPr lang="en-US" sz="3200" dirty="0" smtClean="0">
+                <a:highlight>
+                  <a:srgbClr val="E8F2FE"/>
+                </a:highlight>
+                <a:latin typeface="Courier New"/>
+              </a:rPr>
+              <a:t>)</a:t>
+            </a:r>
+            <a:endParaRPr lang="en-US" sz="3200" b="1" dirty="0" smtClean="0">
+              <a:solidFill>
+                <a:srgbClr val="7F0055"/>
+              </a:solidFill>
+              <a:latin typeface="Courier New"/>
+            </a:endParaRPr>
+          </a:p>
+        </p:txBody>
+      </p:sp>
+      <p:pic>
+        <p:nvPicPr>
+          <p:cNvPr id="70662" name="Picture 6" descr="magic, wizard icon"/>
+          <p:cNvPicPr>
+            <a:picLocks noChangeAspect="1" noChangeArrowheads="1"/>
+          </p:cNvPicPr>
+          <p:nvPr/>
+        </p:nvPicPr>
+        <p:blipFill>
+          <a:blip r:embed="rId4"/>
+          <a:srcRect/>
+          <a:stretch>
+            <a:fillRect/>
+          </a:stretch>
+        </p:blipFill>
+        <p:spPr bwMode="auto">
+          <a:xfrm>
+            <a:off x="635000" y="1143000"/>
+            <a:ext cx="1295400" cy="1295401"/>
+          </a:xfrm>
+          <a:prstGeom prst="rect">
+            <a:avLst/>
+          </a:prstGeom>
+          <a:noFill/>
+        </p:spPr>
+      </p:pic>
+    </p:spTree>
+  </p:cSld>
+  <p:clrMapOvr>
+    <a:masterClrMapping/>
+  </p:clrMapOvr>
+  <p:transition>
+    <p:fade/>
+  </p:transition>
+  <p:timing>
+    <p:tnLst>
+      <p:par>
+        <p:cTn id="1" dur="indefinite" restart="never" nodeType="tmRoot">
+          <p:childTnLst>
+            <p:seq concurrent="1" nextAc="seek">
+              <p:cTn id="2" dur="indefinite" nodeType="mainSeq">
+                <p:childTnLst>
+                  <p:par>
+                    <p:cTn id="3" fill="hold">
+                      <p:stCondLst>
+                        <p:cond delay="indefinite"/>
+                        <p:cond evt="onBegin" delay="0">
+                          <p:tn val="2"/>
+                        </p:cond>
+                      </p:stCondLst>
+                      <p:childTnLst>
+                        <p:par>
+                          <p:cTn id="4" fill="hold">
+                            <p:stCondLst>
+                              <p:cond delay="0"/>
+                            </p:stCondLst>
+                            <p:childTnLst>
+                              <p:par>
+                                <p:cTn id="5" presetID="1" presetClass="entr" presetSubtype="0" fill="hold" nodeType="withEffect">
+                                  <p:stCondLst>
+                                    <p:cond delay="0"/>
+                                  </p:stCondLst>
+                                  <p:childTnLst>
+                                    <p:set>
+                                      <p:cBhvr>
+                                        <p:cTn id="6" dur="1" fill="hold">
+                                          <p:stCondLst>
+                                            <p:cond delay="0"/>
+                                          </p:stCondLst>
+                                        </p:cTn>
+                                        <p:tgtEl>
+                                          <p:spTgt spid="8"/>
+                                        </p:tgtEl>
+                                        <p:attrNameLst>
+                                          <p:attrName>style.visibility</p:attrName>
+                                        </p:attrNameLst>
+                                      </p:cBhvr>
+                                      <p:to>
+                                        <p:strVal val="visible"/>
+                                      </p:to>
+                                    </p:set>
+                                  </p:childTnLst>
+                                </p:cTn>
+                              </p:par>
+                            </p:childTnLst>
+                          </p:cTn>
+                        </p:par>
+                      </p:childTnLst>
+                    </p:cTn>
+                  </p:par>
+                </p:childTnLst>
+              </p:cTn>
+              <p:prevCondLst>
+                <p:cond evt="onPrev" delay="0">
+                  <p:tgtEl>
+                    <p:sldTgt/>
+                  </p:tgtEl>
+                </p:cond>
+              </p:prevCondLst>
+              <p:nextCondLst>
+                <p:cond evt="onNext" delay="0">
+                  <p:tgtEl>
+                    <p:sldTgt/>
+                  </p:tgtEl>
+                </p:cond>
+              </p:nextCondLst>
+            </p:seq>
+          </p:childTnLst>
+        </p:cTn>
+      </p:par>
+    </p:tnLst>
+  </p:timing>
+</p:sld>
+</file>
+
+<file path=ppt/slides/slide29.xml><?xml version="1.0" encoding="utf-8"?>
+<p:sld xmlns:a="http://schemas.openxmlformats.org/drawingml/2006/main" xmlns:r="http://schemas.openxmlformats.org/officeDocument/2006/relationships" xmlns:p="http://schemas.openxmlformats.org/presentationml/2006/main">
+  <p:cSld>
+    <p:spTree>
+      <p:nvGrpSpPr>
+        <p:cNvPr id="1" name=""/>
+        <p:cNvGrpSpPr/>
+        <p:nvPr/>
+      </p:nvGrpSpPr>
+      <p:grpSpPr>
+        <a:xfrm>
+          <a:off x="0" y="0"/>
+          <a:ext cx="0" cy="0"/>
+          <a:chOff x="0" y="0"/>
+          <a:chExt cx="0" cy="0"/>
+        </a:xfrm>
+      </p:grpSpPr>
+      <p:sp>
+        <p:nvSpPr>
+          <p:cNvPr id="8193" name="Rectangle 1"/>
+          <p:cNvSpPr>
+            <a:spLocks noGrp="1" noChangeArrowheads="1"/>
+          </p:cNvSpPr>
+          <p:nvPr>
+            <p:ph type="title"/>
+          </p:nvPr>
+        </p:nvSpPr>
+        <p:spPr>
+          <a:xfrm>
+            <a:off x="711200" y="0"/>
+            <a:ext cx="12509500" cy="914400"/>
+          </a:xfrm>
+          <a:ln/>
+        </p:spPr>
+        <p:txBody>
+          <a:bodyPr/>
+          <a:lstStyle/>
+          <a:p>
+            <a:pPr lvl="0"/>
+            <a:r>
+              <a:rPr lang="en-US" sz="5400" dirty="0" smtClean="0">
+                <a:latin typeface="Lucida Handwriting" pitchFamily="66" charset="0"/>
+              </a:rPr>
+              <a:t>     </a:t>
+            </a:r>
+            <a:r>
+              <a:rPr lang="en-US" sz="5400" dirty="0" smtClean="0">
+                <a:latin typeface="Lucida Handwriting" pitchFamily="66" charset="0"/>
+              </a:rPr>
+              <a:t>DSL</a:t>
+            </a:r>
+            <a:endParaRPr lang="en-US" dirty="0"/>
+          </a:p>
+        </p:txBody>
+      </p:sp>
+      <p:sp>
+        <p:nvSpPr>
+          <p:cNvPr id="7" name="Rectangle 6"/>
+          <p:cNvSpPr/>
+          <p:nvPr/>
+        </p:nvSpPr>
+        <p:spPr>
+          <a:xfrm>
+            <a:off x="2870139" y="1438870"/>
+            <a:ext cx="8727069" cy="923330"/>
+          </a:xfrm>
+          <a:prstGeom prst="rect">
+            <a:avLst/>
+          </a:prstGeom>
+        </p:spPr>
+        <p:txBody>
+          <a:bodyPr wrap="none">
+            <a:spAutoFit/>
+          </a:bodyPr>
+          <a:lstStyle/>
+          <a:p>
+            <a:pPr algn="ctr"/>
+            <a:r>
+              <a:rPr lang="en-US" sz="5400" b="1" kern="0" dirty="0" smtClean="0">
+                <a:solidFill>
+                  <a:srgbClr val="00CC66"/>
+                </a:solidFill>
+                <a:latin typeface="Lucida Handwriting" pitchFamily="66" charset="0"/>
+                <a:cs typeface="+mj-cs"/>
+                <a:sym typeface="Arial" charset="0"/>
+              </a:rPr>
+              <a:t>By name  parameters </a:t>
+            </a:r>
+          </a:p>
+        </p:txBody>
+      </p:sp>
+      <p:pic>
+        <p:nvPicPr>
+          <p:cNvPr id="8" name="Picture 10" descr="http://knowledgehub.zeus.com/media/Scala_Logo2008.png"/>
+          <p:cNvPicPr>
+            <a:picLocks noChangeAspect="1" noChangeArrowheads="1"/>
+          </p:cNvPicPr>
+          <p:nvPr/>
+        </p:nvPicPr>
+        <p:blipFill>
+          <a:blip r:embed="rId3"/>
+          <a:srcRect/>
+          <a:stretch>
+            <a:fillRect/>
+          </a:stretch>
+        </p:blipFill>
+        <p:spPr bwMode="auto">
+          <a:xfrm>
+            <a:off x="4140200" y="76200"/>
+            <a:ext cx="2279542" cy="679257"/>
+          </a:xfrm>
+          <a:prstGeom prst="rect">
+            <a:avLst/>
+          </a:prstGeom>
+          <a:noFill/>
+        </p:spPr>
+      </p:pic>
+      <p:sp>
+        <p:nvSpPr>
+          <p:cNvPr id="11" name="Rectangle 10"/>
+          <p:cNvSpPr/>
+          <p:nvPr/>
+        </p:nvSpPr>
+        <p:spPr>
+          <a:xfrm>
+            <a:off x="330200" y="3200400"/>
+            <a:ext cx="12344400" cy="5016758"/>
+          </a:xfrm>
+          <a:prstGeom prst="rect">
+            <a:avLst/>
+          </a:prstGeom>
+          <a:solidFill>
+            <a:schemeClr val="bg1"/>
+          </a:solidFill>
+          <a:ln>
+            <a:solidFill>
+              <a:schemeClr val="tx1"/>
+            </a:solidFill>
+            <a:prstDash val="dash"/>
+          </a:ln>
+        </p:spPr>
+        <p:txBody>
+          <a:bodyPr wrap="square">
+            <a:spAutoFit/>
+          </a:bodyPr>
+          <a:lstStyle/>
+          <a:p>
+            <a:r>
+              <a:rPr lang="en-US" sz="3200" b="1" dirty="0" smtClean="0">
+                <a:solidFill>
+                  <a:srgbClr val="7F0055"/>
+                </a:solidFill>
+                <a:latin typeface="Courier New"/>
+              </a:rPr>
+              <a:t>class</a:t>
+            </a:r>
+            <a:r>
+              <a:rPr lang="en-US" sz="3200" b="1" dirty="0" smtClean="0">
+                <a:latin typeface="Courier New"/>
+              </a:rPr>
+              <a:t> </a:t>
+            </a:r>
+            <a:r>
+              <a:rPr lang="en-US" sz="3200" b="1" dirty="0" smtClean="0">
+                <a:latin typeface="Courier New"/>
+              </a:rPr>
+              <a:t>Matcher[-T] { </a:t>
+            </a:r>
+            <a:r>
+              <a:rPr lang="en-US" sz="3200" b="1" dirty="0" smtClean="0">
+                <a:solidFill>
+                  <a:srgbClr val="7F0055"/>
+                </a:solidFill>
+                <a:latin typeface="Courier New"/>
+              </a:rPr>
+              <a:t>def</a:t>
+            </a:r>
+            <a:r>
+              <a:rPr lang="en-US" sz="3200" b="1" dirty="0" smtClean="0">
+                <a:latin typeface="Courier New"/>
+              </a:rPr>
+              <a:t> apply(t: =&gt; T) = () }</a:t>
+            </a:r>
+          </a:p>
+          <a:p>
+            <a:r>
+              <a:rPr lang="en-US" sz="3200" b="1" dirty="0" smtClean="0">
+                <a:solidFill>
+                  <a:srgbClr val="7F0055"/>
+                </a:solidFill>
+                <a:latin typeface="Courier New"/>
+              </a:rPr>
+              <a:t>class</a:t>
+            </a:r>
+            <a:r>
+              <a:rPr lang="en-US" sz="3200" b="1" dirty="0" smtClean="0">
+                <a:latin typeface="Courier New"/>
+              </a:rPr>
+              <a:t> </a:t>
+            </a:r>
+            <a:r>
+              <a:rPr lang="en-US" sz="3200" b="1" dirty="0" smtClean="0">
+                <a:latin typeface="Courier New"/>
+              </a:rPr>
+              <a:t>Expectation[T](t: =&gt;T) {</a:t>
+            </a:r>
+          </a:p>
+          <a:p>
+            <a:r>
+              <a:rPr lang="en-US" sz="3200" dirty="0" smtClean="0">
+                <a:latin typeface="Courier New"/>
+              </a:rPr>
+              <a:t>  </a:t>
+            </a:r>
+            <a:r>
+              <a:rPr lang="en-US" sz="3200" b="1" dirty="0" smtClean="0">
+                <a:solidFill>
+                  <a:srgbClr val="7F0055"/>
+                </a:solidFill>
+                <a:latin typeface="Courier New"/>
+              </a:rPr>
+              <a:t>def</a:t>
+            </a:r>
+            <a:r>
+              <a:rPr lang="en-US" sz="3200" b="1" dirty="0" smtClean="0">
+                <a:latin typeface="Courier New"/>
+              </a:rPr>
+              <a:t> must(m: =&gt;Matcher[T]) = </a:t>
+            </a:r>
+            <a:r>
+              <a:rPr lang="en-US" sz="3200" b="1" dirty="0" err="1" smtClean="0">
+                <a:latin typeface="Courier New"/>
+              </a:rPr>
+              <a:t>m.apply</a:t>
+            </a:r>
+            <a:r>
+              <a:rPr lang="en-US" sz="3200" b="1" dirty="0" smtClean="0">
+                <a:latin typeface="Courier New"/>
+              </a:rPr>
+              <a:t>(t)</a:t>
+            </a:r>
+          </a:p>
+          <a:p>
+            <a:r>
+              <a:rPr lang="en-US" sz="3200" dirty="0" smtClean="0">
+                <a:latin typeface="Courier New"/>
+              </a:rPr>
+              <a:t>}</a:t>
+            </a:r>
+            <a:endParaRPr lang="en-US" sz="3200" dirty="0" smtClean="0">
+              <a:latin typeface="Courier New"/>
+            </a:endParaRPr>
+          </a:p>
+          <a:p>
+            <a:endParaRPr lang="fr-FR" sz="3200" b="1" dirty="0" smtClean="0">
+              <a:solidFill>
+                <a:srgbClr val="7F0055"/>
+              </a:solidFill>
+              <a:latin typeface="Courier New"/>
+            </a:endParaRPr>
+          </a:p>
+          <a:p>
+            <a:r>
+              <a:rPr lang="fr-FR" sz="3200" b="1" dirty="0" err="1" smtClean="0">
+                <a:solidFill>
+                  <a:srgbClr val="7F0055"/>
+                </a:solidFill>
+                <a:latin typeface="Courier New"/>
+              </a:rPr>
+              <a:t>implicit</a:t>
+            </a:r>
+            <a:r>
+              <a:rPr lang="fr-FR" sz="3200" b="1" dirty="0" smtClean="0">
+                <a:latin typeface="Courier New"/>
+              </a:rPr>
+              <a:t> </a:t>
+            </a:r>
+            <a:r>
+              <a:rPr lang="fr-FR" sz="3200" b="1" dirty="0" err="1" smtClean="0">
+                <a:solidFill>
+                  <a:srgbClr val="7F0055"/>
+                </a:solidFill>
+                <a:latin typeface="Courier New"/>
+              </a:rPr>
+              <a:t>def</a:t>
+            </a:r>
+            <a:r>
+              <a:rPr lang="fr-FR" sz="3200" b="1" dirty="0" smtClean="0">
+                <a:latin typeface="Courier New"/>
+              </a:rPr>
+              <a:t> </a:t>
+            </a:r>
+            <a:r>
+              <a:rPr lang="fr-FR" sz="3200" b="1" dirty="0" err="1" smtClean="0">
+                <a:latin typeface="Courier New"/>
+              </a:rPr>
+              <a:t>theValue</a:t>
+            </a:r>
+            <a:r>
+              <a:rPr lang="fr-FR" sz="3200" b="1" dirty="0" smtClean="0">
+                <a:latin typeface="Courier New"/>
+              </a:rPr>
+              <a:t>[T](t: T): Expectation[T] = </a:t>
+            </a:r>
+            <a:r>
+              <a:rPr lang="fr-FR" sz="3200" b="1" dirty="0" smtClean="0">
+                <a:latin typeface="Courier New"/>
+              </a:rPr>
+              <a:t> </a:t>
+            </a:r>
+          </a:p>
+          <a:p>
+            <a:r>
+              <a:rPr lang="fr-FR" sz="3200" b="1" dirty="0" smtClean="0">
+                <a:solidFill>
+                  <a:srgbClr val="7F0055"/>
+                </a:solidFill>
+                <a:latin typeface="Courier New"/>
+              </a:rPr>
+              <a:t> </a:t>
+            </a:r>
+            <a:r>
+              <a:rPr lang="fr-FR" sz="3200" b="1" dirty="0" smtClean="0">
+                <a:solidFill>
+                  <a:srgbClr val="7F0055"/>
+                </a:solidFill>
+                <a:latin typeface="Courier New"/>
+              </a:rPr>
+              <a:t>                              new</a:t>
+            </a:r>
+            <a:r>
+              <a:rPr lang="fr-FR" sz="3200" b="1" dirty="0" smtClean="0">
+                <a:latin typeface="Courier New"/>
+              </a:rPr>
+              <a:t> </a:t>
+            </a:r>
+            <a:r>
+              <a:rPr lang="fr-FR" sz="3200" b="1" dirty="0" smtClean="0">
+                <a:latin typeface="Courier New"/>
+              </a:rPr>
+              <a:t>Expectation(t)</a:t>
+            </a:r>
+          </a:p>
+          <a:p>
+            <a:r>
+              <a:rPr lang="en-US" sz="3200" b="1" dirty="0" err="1" smtClean="0">
+                <a:solidFill>
+                  <a:srgbClr val="7F0055"/>
+                </a:solidFill>
+                <a:latin typeface="Courier New"/>
+              </a:rPr>
+              <a:t>val</a:t>
+            </a:r>
+            <a:r>
+              <a:rPr lang="en-US" sz="3200" b="1" dirty="0" smtClean="0">
+                <a:latin typeface="Courier New"/>
+              </a:rPr>
+              <a:t> </a:t>
+            </a:r>
+            <a:r>
+              <a:rPr lang="en-US" sz="3200" b="1" dirty="0" err="1" smtClean="0">
+                <a:latin typeface="Courier New"/>
+              </a:rPr>
+              <a:t>notExplode</a:t>
+            </a:r>
+            <a:r>
+              <a:rPr lang="en-US" sz="3200" b="1" dirty="0" smtClean="0">
+                <a:latin typeface="Courier New"/>
+              </a:rPr>
+              <a:t> = </a:t>
+            </a:r>
+            <a:r>
+              <a:rPr lang="en-US" sz="3200" b="1" dirty="0" smtClean="0">
+                <a:solidFill>
+                  <a:srgbClr val="7F0055"/>
+                </a:solidFill>
+                <a:latin typeface="Courier New"/>
+              </a:rPr>
+              <a:t>new</a:t>
+            </a:r>
+            <a:r>
+              <a:rPr lang="en-US" sz="3200" b="1" dirty="0" smtClean="0">
+                <a:latin typeface="Courier New"/>
+              </a:rPr>
+              <a:t> Matcher[</a:t>
+            </a:r>
+            <a:r>
+              <a:rPr lang="en-US" sz="3200" b="1" dirty="0" smtClean="0">
+                <a:solidFill>
+                  <a:srgbClr val="7F0055"/>
+                </a:solidFill>
+                <a:latin typeface="Courier New"/>
+              </a:rPr>
+              <a:t>Any</a:t>
+            </a:r>
+            <a:r>
+              <a:rPr lang="en-US" sz="3200" b="1" dirty="0" smtClean="0">
+                <a:latin typeface="Courier New"/>
+              </a:rPr>
+              <a:t>]</a:t>
+            </a:r>
+          </a:p>
+          <a:p>
+            <a:r>
+              <a:rPr lang="en-US" sz="3200" dirty="0" smtClean="0">
+                <a:latin typeface="Courier New"/>
+              </a:rPr>
+              <a:t>  </a:t>
+            </a:r>
+            <a:endParaRPr lang="en-US" sz="3200" dirty="0" smtClean="0">
+              <a:latin typeface="Courier New"/>
+            </a:endParaRPr>
+          </a:p>
+          <a:p>
+            <a:r>
+              <a:rPr lang="en-US" sz="3200" dirty="0" smtClean="0">
+                <a:latin typeface="Courier New"/>
+              </a:rPr>
+              <a:t>{ </a:t>
+            </a:r>
+            <a:r>
+              <a:rPr lang="en-US" sz="3200" dirty="0" smtClean="0">
+                <a:latin typeface="Courier New"/>
+              </a:rPr>
+              <a:t>error(</a:t>
+            </a:r>
+            <a:r>
+              <a:rPr lang="en-US" sz="3200" dirty="0" smtClean="0">
+                <a:solidFill>
+                  <a:srgbClr val="2A00FF"/>
+                </a:solidFill>
+                <a:latin typeface="Courier New"/>
+              </a:rPr>
+              <a:t>"boom"</a:t>
+            </a:r>
+            <a:r>
+              <a:rPr lang="en-US" sz="3200" dirty="0" smtClean="0">
+                <a:latin typeface="Courier New"/>
+              </a:rPr>
+              <a:t>); () } must </a:t>
+            </a:r>
+            <a:r>
+              <a:rPr lang="en-US" sz="3200" dirty="0" err="1" smtClean="0">
+                <a:latin typeface="Courier New"/>
+              </a:rPr>
+              <a:t>notExplode</a:t>
+            </a:r>
+            <a:endParaRPr lang="en-US" sz="3200" b="1" dirty="0" smtClean="0">
+              <a:solidFill>
+                <a:srgbClr val="7F0055"/>
+              </a:solidFill>
+              <a:latin typeface="Courier New"/>
+            </a:endParaRPr>
+          </a:p>
+        </p:txBody>
+      </p:sp>
+      <p:pic>
+        <p:nvPicPr>
+          <p:cNvPr id="70662" name="Picture 6" descr="magic, wizard icon"/>
+          <p:cNvPicPr>
+            <a:picLocks noChangeAspect="1" noChangeArrowheads="1"/>
+          </p:cNvPicPr>
+          <p:nvPr/>
+        </p:nvPicPr>
+        <p:blipFill>
+          <a:blip r:embed="rId4"/>
+          <a:srcRect/>
+          <a:stretch>
+            <a:fillRect/>
+          </a:stretch>
+        </p:blipFill>
+        <p:spPr bwMode="auto">
+          <a:xfrm>
+            <a:off x="635000" y="1143000"/>
+            <a:ext cx="1295400" cy="1295401"/>
+          </a:xfrm>
+          <a:prstGeom prst="rect">
+            <a:avLst/>
+          </a:prstGeom>
+          <a:noFill/>
+        </p:spPr>
+      </p:pic>
+    </p:spTree>
+  </p:cSld>
+  <p:clrMapOvr>
+    <a:masterClrMapping/>
+  </p:clrMapOvr>
+  <p:transition>
+    <p:fade/>
+  </p:transition>
+  <p:timing>
+    <p:tnLst>
+      <p:par>
+        <p:cTn id="1" dur="indefinite" restart="never" nodeType="tmRoot">
+          <p:childTnLst>
+            <p:seq concurrent="1" nextAc="seek">
+              <p:cTn id="2" dur="indefinite" nodeType="mainSeq">
+                <p:childTnLst>
+                  <p:par>
+                    <p:cTn id="3" fill="hold">
+                      <p:stCondLst>
+                        <p:cond delay="indefinite"/>
+                        <p:cond evt="onBegin" delay="0">
+                          <p:tn val="2"/>
+                        </p:cond>
+                      </p:stCondLst>
+                      <p:childTnLst>
+                        <p:par>
+                          <p:cTn id="4" fill="hold">
+                            <p:stCondLst>
+                              <p:cond delay="0"/>
+                            </p:stCondLst>
+                            <p:childTnLst>
+                              <p:par>
+                                <p:cTn id="5" presetID="1" presetClass="entr" presetSubtype="0" fill="hold" nodeType="withEffect">
+                                  <p:stCondLst>
+                                    <p:cond delay="0"/>
+                                  </p:stCondLst>
+                                  <p:childTnLst>
+                                    <p:set>
+                                      <p:cBhvr>
+                                        <p:cTn id="6" dur="1" fill="hold">
+                                          <p:stCondLst>
+                                            <p:cond delay="0"/>
+                                          </p:stCondLst>
+                                        </p:cTn>
+                                        <p:tgtEl>
+                                          <p:spTgt spid="8"/>
+                                        </p:tgtEl>
+                                        <p:attrNameLst>
+                                          <p:attrName>style.visibility</p:attrName>
+                                        </p:attrNameLst>
+                                      </p:cBhvr>
+                                      <p:to>
+                                        <p:strVal val="visible"/>
+                                      </p:to>
+                                    </p:set>
+                                  </p:childTnLst>
+                                </p:cTn>
+                              </p:par>
+                            </p:childTnLst>
+                          </p:cTn>
+                        </p:par>
+                      </p:childTnLst>
+                    </p:cTn>
+                  </p:par>
+                </p:childTnLst>
+              </p:cTn>
+              <p:prevCondLst>
+                <p:cond evt="onPrev" delay="0">
+                  <p:tgtEl>
+                    <p:sldTgt/>
+                  </p:tgtEl>
+                </p:cond>
+              </p:prevCondLst>
+              <p:nextCondLst>
+                <p:cond evt="onNext" delay="0">
+                  <p:tgtEl>
+                    <p:sldTgt/>
+                  </p:tgtEl>
+                </p:cond>
+              </p:nextCondLst>
+            </p:seq>
+          </p:childTnLst>
+        </p:cTn>
       </p:par>
     </p:tnLst>
   </p:timing>

</xml_diff>

<commit_message>
more tips on by-name parameters
</commit_message>
<xml_diff>
--- a/src/main/resources/oscon_2010_specs.pptx
+++ b/src/main/resources/oscon_2010_specs.pptx
@@ -6,7 +6,7 @@
     <p:sldMasterId id="2147483651" r:id="rId2"/>
   </p:sldMasterIdLst>
   <p:notesMasterIdLst>
-    <p:notesMasterId r:id="rId32"/>
+    <p:notesMasterId r:id="rId35"/>
   </p:notesMasterIdLst>
   <p:sldIdLst>
     <p:sldId id="258" r:id="rId3"/>
@@ -38,6 +38,9 @@
     <p:sldId id="284" r:id="rId29"/>
     <p:sldId id="285" r:id="rId30"/>
     <p:sldId id="286" r:id="rId31"/>
+    <p:sldId id="288" r:id="rId32"/>
+    <p:sldId id="289" r:id="rId33"/>
+    <p:sldId id="287" r:id="rId34"/>
   </p:sldIdLst>
   <p:sldSz cx="13004800" cy="9753600"/>
   <p:notesSz cx="6858000" cy="9144000"/>
@@ -2495,6 +2498,258 @@
               <a:rPr lang="en-US"/>
               <a:pPr/>
               <a:t>3</a:t>
+            </a:fld>
+            <a:endParaRPr lang="en-US"/>
+          </a:p>
+        </p:txBody>
+      </p:sp>
+      <p:sp>
+        <p:nvSpPr>
+          <p:cNvPr id="19458" name="Rectangle 2"/>
+          <p:cNvSpPr>
+            <a:spLocks noGrp="1" noRot="1" noChangeAspect="1" noChangeArrowheads="1" noTextEdit="1"/>
+          </p:cNvSpPr>
+          <p:nvPr>
+            <p:ph type="sldImg"/>
+          </p:nvPr>
+        </p:nvSpPr>
+        <p:spPr>
+          <a:ln/>
+        </p:spPr>
+      </p:sp>
+      <p:sp>
+        <p:nvSpPr>
+          <p:cNvPr id="19459" name="Rectangle 3"/>
+          <p:cNvSpPr>
+            <a:spLocks noGrp="1"/>
+          </p:cNvSpPr>
+          <p:nvPr>
+            <p:ph type="body" idx="1"/>
+          </p:nvPr>
+        </p:nvSpPr>
+        <p:spPr/>
+        <p:txBody>
+          <a:bodyPr/>
+          <a:lstStyle/>
+          <a:p>
+            <a:endParaRPr lang="en-US"/>
+          </a:p>
+        </p:txBody>
+      </p:sp>
+    </p:spTree>
+  </p:cSld>
+  <p:clrMapOvr>
+    <a:masterClrMapping/>
+  </p:clrMapOvr>
+</p:notes>
+</file>
+
+<file path=ppt/notesSlides/notesSlide30.xml><?xml version="1.0" encoding="utf-8"?>
+<p:notes xmlns:a="http://schemas.openxmlformats.org/drawingml/2006/main" xmlns:r="http://schemas.openxmlformats.org/officeDocument/2006/relationships" xmlns:p="http://schemas.openxmlformats.org/presentationml/2006/main">
+  <p:cSld>
+    <p:spTree>
+      <p:nvGrpSpPr>
+        <p:cNvPr id="1" name=""/>
+        <p:cNvGrpSpPr/>
+        <p:nvPr/>
+      </p:nvGrpSpPr>
+      <p:grpSpPr>
+        <a:xfrm>
+          <a:off x="0" y="0"/>
+          <a:ext cx="0" cy="0"/>
+          <a:chOff x="0" y="0"/>
+          <a:chExt cx="0" cy="0"/>
+        </a:xfrm>
+      </p:grpSpPr>
+      <p:sp>
+        <p:nvSpPr>
+          <p:cNvPr id="7" name="Rectangle 7"/>
+          <p:cNvSpPr>
+            <a:spLocks noGrp="1"/>
+          </p:cNvSpPr>
+          <p:nvPr>
+            <p:ph type="sldNum" sz="quarter" idx="5"/>
+          </p:nvPr>
+        </p:nvSpPr>
+        <p:spPr>
+          <a:ln/>
+        </p:spPr>
+        <p:txBody>
+          <a:bodyPr/>
+          <a:lstStyle/>
+          <a:p>
+            <a:fld id="{27AEA7DA-096A-4FB7-B4B3-D12717EF4BDD}" type="slidenum">
+              <a:rPr lang="en-US"/>
+              <a:pPr/>
+              <a:t>30</a:t>
+            </a:fld>
+            <a:endParaRPr lang="en-US"/>
+          </a:p>
+        </p:txBody>
+      </p:sp>
+      <p:sp>
+        <p:nvSpPr>
+          <p:cNvPr id="19458" name="Rectangle 2"/>
+          <p:cNvSpPr>
+            <a:spLocks noGrp="1" noRot="1" noChangeAspect="1" noChangeArrowheads="1" noTextEdit="1"/>
+          </p:cNvSpPr>
+          <p:nvPr>
+            <p:ph type="sldImg"/>
+          </p:nvPr>
+        </p:nvSpPr>
+        <p:spPr>
+          <a:ln/>
+        </p:spPr>
+      </p:sp>
+      <p:sp>
+        <p:nvSpPr>
+          <p:cNvPr id="19459" name="Rectangle 3"/>
+          <p:cNvSpPr>
+            <a:spLocks noGrp="1"/>
+          </p:cNvSpPr>
+          <p:nvPr>
+            <p:ph type="body" idx="1"/>
+          </p:nvPr>
+        </p:nvSpPr>
+        <p:spPr/>
+        <p:txBody>
+          <a:bodyPr/>
+          <a:lstStyle/>
+          <a:p>
+            <a:endParaRPr lang="en-US"/>
+          </a:p>
+        </p:txBody>
+      </p:sp>
+    </p:spTree>
+  </p:cSld>
+  <p:clrMapOvr>
+    <a:masterClrMapping/>
+  </p:clrMapOvr>
+</p:notes>
+</file>
+
+<file path=ppt/notesSlides/notesSlide31.xml><?xml version="1.0" encoding="utf-8"?>
+<p:notes xmlns:a="http://schemas.openxmlformats.org/drawingml/2006/main" xmlns:r="http://schemas.openxmlformats.org/officeDocument/2006/relationships" xmlns:p="http://schemas.openxmlformats.org/presentationml/2006/main">
+  <p:cSld>
+    <p:spTree>
+      <p:nvGrpSpPr>
+        <p:cNvPr id="1" name=""/>
+        <p:cNvGrpSpPr/>
+        <p:nvPr/>
+      </p:nvGrpSpPr>
+      <p:grpSpPr>
+        <a:xfrm>
+          <a:off x="0" y="0"/>
+          <a:ext cx="0" cy="0"/>
+          <a:chOff x="0" y="0"/>
+          <a:chExt cx="0" cy="0"/>
+        </a:xfrm>
+      </p:grpSpPr>
+      <p:sp>
+        <p:nvSpPr>
+          <p:cNvPr id="7" name="Rectangle 7"/>
+          <p:cNvSpPr>
+            <a:spLocks noGrp="1"/>
+          </p:cNvSpPr>
+          <p:nvPr>
+            <p:ph type="sldNum" sz="quarter" idx="5"/>
+          </p:nvPr>
+        </p:nvSpPr>
+        <p:spPr>
+          <a:ln/>
+        </p:spPr>
+        <p:txBody>
+          <a:bodyPr/>
+          <a:lstStyle/>
+          <a:p>
+            <a:fld id="{27AEA7DA-096A-4FB7-B4B3-D12717EF4BDD}" type="slidenum">
+              <a:rPr lang="en-US"/>
+              <a:pPr/>
+              <a:t>31</a:t>
+            </a:fld>
+            <a:endParaRPr lang="en-US"/>
+          </a:p>
+        </p:txBody>
+      </p:sp>
+      <p:sp>
+        <p:nvSpPr>
+          <p:cNvPr id="19458" name="Rectangle 2"/>
+          <p:cNvSpPr>
+            <a:spLocks noGrp="1" noRot="1" noChangeAspect="1" noChangeArrowheads="1" noTextEdit="1"/>
+          </p:cNvSpPr>
+          <p:nvPr>
+            <p:ph type="sldImg"/>
+          </p:nvPr>
+        </p:nvSpPr>
+        <p:spPr>
+          <a:ln/>
+        </p:spPr>
+      </p:sp>
+      <p:sp>
+        <p:nvSpPr>
+          <p:cNvPr id="19459" name="Rectangle 3"/>
+          <p:cNvSpPr>
+            <a:spLocks noGrp="1"/>
+          </p:cNvSpPr>
+          <p:nvPr>
+            <p:ph type="body" idx="1"/>
+          </p:nvPr>
+        </p:nvSpPr>
+        <p:spPr/>
+        <p:txBody>
+          <a:bodyPr/>
+          <a:lstStyle/>
+          <a:p>
+            <a:endParaRPr lang="en-US"/>
+          </a:p>
+        </p:txBody>
+      </p:sp>
+    </p:spTree>
+  </p:cSld>
+  <p:clrMapOvr>
+    <a:masterClrMapping/>
+  </p:clrMapOvr>
+</p:notes>
+</file>
+
+<file path=ppt/notesSlides/notesSlide32.xml><?xml version="1.0" encoding="utf-8"?>
+<p:notes xmlns:a="http://schemas.openxmlformats.org/drawingml/2006/main" xmlns:r="http://schemas.openxmlformats.org/officeDocument/2006/relationships" xmlns:p="http://schemas.openxmlformats.org/presentationml/2006/main">
+  <p:cSld>
+    <p:spTree>
+      <p:nvGrpSpPr>
+        <p:cNvPr id="1" name=""/>
+        <p:cNvGrpSpPr/>
+        <p:nvPr/>
+      </p:nvGrpSpPr>
+      <p:grpSpPr>
+        <a:xfrm>
+          <a:off x="0" y="0"/>
+          <a:ext cx="0" cy="0"/>
+          <a:chOff x="0" y="0"/>
+          <a:chExt cx="0" cy="0"/>
+        </a:xfrm>
+      </p:grpSpPr>
+      <p:sp>
+        <p:nvSpPr>
+          <p:cNvPr id="7" name="Rectangle 7"/>
+          <p:cNvSpPr>
+            <a:spLocks noGrp="1"/>
+          </p:cNvSpPr>
+          <p:nvPr>
+            <p:ph type="sldNum" sz="quarter" idx="5"/>
+          </p:nvPr>
+        </p:nvSpPr>
+        <p:spPr>
+          <a:ln/>
+        </p:spPr>
+        <p:txBody>
+          <a:bodyPr/>
+          <a:lstStyle/>
+          <a:p>
+            <a:fld id="{27AEA7DA-096A-4FB7-B4B3-D12717EF4BDD}" type="slidenum">
+              <a:rPr lang="en-US"/>
+              <a:pPr/>
+              <a:t>32</a:t>
             </a:fld>
             <a:endParaRPr lang="en-US"/>
           </a:p>
@@ -12812,8 +13067,8 @@
         </p:nvSpPr>
         <p:spPr>
           <a:xfrm>
-            <a:off x="3073400" y="1600200"/>
-            <a:ext cx="8509061" cy="923330"/>
+            <a:off x="2572440" y="1600200"/>
+            <a:ext cx="9650399" cy="923330"/>
           </a:xfrm>
           <a:prstGeom prst="rect">
             <a:avLst/>
@@ -12835,7 +13090,7 @@
                 <a:cs typeface="+mj-cs"/>
                 <a:sym typeface="Arial" charset="0"/>
               </a:rPr>
-              <a:t>The  king of all tricks</a:t>
+              <a:t>The  best tool in the box</a:t>
             </a:r>
             <a:endParaRPr lang="en-US" dirty="0"/>
           </a:p>
@@ -12867,32 +13122,6 @@
           <a:noFill/>
         </p:spPr>
       </p:pic>
-      <p:pic>
-        <p:nvPicPr>
-          <p:cNvPr id="9" name="Picture 2" descr="crown, king icon"/>
-          <p:cNvPicPr>
-            <a:picLocks noChangeAspect="1" noChangeArrowheads="1"/>
-          </p:cNvPicPr>
-          <p:nvPr/>
-        </p:nvPicPr>
-        <p:blipFill>
-          <a:blip r:embed="rId4"/>
-          <a:srcRect/>
-          <a:stretch>
-            <a:fillRect/>
-          </a:stretch>
-        </p:blipFill>
-        <p:spPr bwMode="auto">
-          <a:xfrm>
-            <a:off x="1168400" y="1295400"/>
-            <a:ext cx="1447800" cy="1447801"/>
-          </a:xfrm>
-          <a:prstGeom prst="rect">
-            <a:avLst/>
-          </a:prstGeom>
-          <a:noFill/>
-        </p:spPr>
-      </p:pic>
       <p:sp>
         <p:nvSpPr>
           <p:cNvPr id="10" name="Rectangle 9"/>
@@ -13159,6 +13388,32 @@
           </a:p>
         </p:txBody>
       </p:sp>
+      <p:pic>
+        <p:nvPicPr>
+          <p:cNvPr id="72706" name="Picture 2" descr="toolbox icon"/>
+          <p:cNvPicPr>
+            <a:picLocks noChangeAspect="1" noChangeArrowheads="1"/>
+          </p:cNvPicPr>
+          <p:nvPr/>
+        </p:nvPicPr>
+        <p:blipFill>
+          <a:blip r:embed="rId4"/>
+          <a:srcRect/>
+          <a:stretch>
+            <a:fillRect/>
+          </a:stretch>
+        </p:blipFill>
+        <p:spPr bwMode="auto">
+          <a:xfrm>
+            <a:off x="515040" y="1143000"/>
+            <a:ext cx="1676400" cy="1676401"/>
+          </a:xfrm>
+          <a:prstGeom prst="rect">
+            <a:avLst/>
+          </a:prstGeom>
+          <a:noFill/>
+        </p:spPr>
+      </p:pic>
     </p:spTree>
   </p:cSld>
   <p:clrMapOvr>
@@ -13303,43 +13558,6 @@
           </a:p>
         </p:txBody>
       </p:sp>
-      <p:sp>
-        <p:nvSpPr>
-          <p:cNvPr id="7" name="Rectangle 6"/>
-          <p:cNvSpPr/>
-          <p:nvPr/>
-        </p:nvSpPr>
-        <p:spPr>
-          <a:xfrm>
-            <a:off x="2870139" y="1438870"/>
-            <a:ext cx="8807219" cy="923330"/>
-          </a:xfrm>
-          <a:prstGeom prst="rect">
-            <a:avLst/>
-          </a:prstGeom>
-        </p:spPr>
-        <p:txBody>
-          <a:bodyPr wrap="none">
-            <a:spAutoFit/>
-          </a:bodyPr>
-          <a:lstStyle/>
-          <a:p>
-            <a:pPr algn="ctr"/>
-            <a:r>
-              <a:rPr lang="en-US" sz="5400" b="1" kern="0" dirty="0" smtClean="0">
-                <a:solidFill>
-                  <a:srgbClr val="0C0F20"/>
-                </a:solidFill>
-                <a:latin typeface="Lucida Handwriting" pitchFamily="66" charset="0"/>
-                <a:cs typeface="+mj-cs"/>
-                <a:sym typeface="Arial" charset="0"/>
-              </a:rPr>
-              <a:t>The  king of all tricks</a:t>
-            </a:r>
-            <a:endParaRPr lang="en-US" dirty="0"/>
-          </a:p>
-        </p:txBody>
-      </p:sp>
       <p:pic>
         <p:nvPicPr>
           <p:cNvPr id="8" name="Picture 10" descr="http://knowledgehub.zeus.com/media/Scala_Logo2008.png"/>
@@ -13531,9 +13749,46 @@
           </a:p>
         </p:txBody>
       </p:sp>
+      <p:sp>
+        <p:nvSpPr>
+          <p:cNvPr id="14" name="Rectangle 13"/>
+          <p:cNvSpPr/>
+          <p:nvPr/>
+        </p:nvSpPr>
+        <p:spPr>
+          <a:xfrm>
+            <a:off x="2572440" y="1600200"/>
+            <a:ext cx="9416360" cy="923330"/>
+          </a:xfrm>
+          <a:prstGeom prst="rect">
+            <a:avLst/>
+          </a:prstGeom>
+        </p:spPr>
+        <p:txBody>
+          <a:bodyPr wrap="none">
+            <a:spAutoFit/>
+          </a:bodyPr>
+          <a:lstStyle/>
+          <a:p>
+            <a:pPr algn="ctr"/>
+            <a:r>
+              <a:rPr lang="en-US" sz="5400" b="1" kern="0" dirty="0" smtClean="0">
+                <a:solidFill>
+                  <a:srgbClr val="0C0F20"/>
+                </a:solidFill>
+                <a:latin typeface="Lucida Handwriting" pitchFamily="66" charset="0"/>
+                <a:cs typeface="+mj-cs"/>
+                <a:sym typeface="Arial" charset="0"/>
+              </a:rPr>
+              <a:t>The  best tool in the box</a:t>
+            </a:r>
+            <a:endParaRPr lang="en-US" dirty="0"/>
+          </a:p>
+        </p:txBody>
+      </p:sp>
       <p:pic>
         <p:nvPicPr>
-          <p:cNvPr id="13" name="Picture 2" descr="crown, king icon"/>
+          <p:cNvPr id="15" name="Picture 2" descr="toolbox icon"/>
           <p:cNvPicPr>
             <a:picLocks noChangeAspect="1" noChangeArrowheads="1"/>
           </p:cNvPicPr>
@@ -13548,8 +13803,8 @@
         </p:blipFill>
         <p:spPr bwMode="auto">
           <a:xfrm>
-            <a:off x="1168400" y="1295400"/>
-            <a:ext cx="1447800" cy="1447801"/>
+            <a:off x="515040" y="1143000"/>
+            <a:ext cx="1676400" cy="1676401"/>
           </a:xfrm>
           <a:prstGeom prst="rect">
             <a:avLst/>
@@ -16570,6 +16825,1705 @@
     <p:tnLst>
       <p:par>
         <p:cTn id="1" dur="indefinite" restart="never" nodeType="tmRoot"/>
+      </p:par>
+    </p:tnLst>
+  </p:timing>
+</p:sld>
+</file>
+
+<file path=ppt/slides/slide30.xml><?xml version="1.0" encoding="utf-8"?>
+<p:sld xmlns:a="http://schemas.openxmlformats.org/drawingml/2006/main" xmlns:r="http://schemas.openxmlformats.org/officeDocument/2006/relationships" xmlns:p="http://schemas.openxmlformats.org/presentationml/2006/main">
+  <p:cSld>
+    <p:spTree>
+      <p:nvGrpSpPr>
+        <p:cNvPr id="1" name=""/>
+        <p:cNvGrpSpPr/>
+        <p:nvPr/>
+      </p:nvGrpSpPr>
+      <p:grpSpPr>
+        <a:xfrm>
+          <a:off x="0" y="0"/>
+          <a:ext cx="0" cy="0"/>
+          <a:chOff x="0" y="0"/>
+          <a:chExt cx="0" cy="0"/>
+        </a:xfrm>
+      </p:grpSpPr>
+      <p:sp>
+        <p:nvSpPr>
+          <p:cNvPr id="8193" name="Rectangle 1"/>
+          <p:cNvSpPr>
+            <a:spLocks noGrp="1" noChangeArrowheads="1"/>
+          </p:cNvSpPr>
+          <p:nvPr>
+            <p:ph type="title"/>
+          </p:nvPr>
+        </p:nvSpPr>
+        <p:spPr>
+          <a:xfrm>
+            <a:off x="711200" y="0"/>
+            <a:ext cx="12509500" cy="914400"/>
+          </a:xfrm>
+          <a:ln/>
+        </p:spPr>
+        <p:txBody>
+          <a:bodyPr/>
+          <a:lstStyle/>
+          <a:p>
+            <a:pPr lvl="0"/>
+            <a:r>
+              <a:rPr lang="en-US" sz="5400" dirty="0" smtClean="0">
+                <a:latin typeface="Lucida Handwriting" pitchFamily="66" charset="0"/>
+              </a:rPr>
+              <a:t>     </a:t>
+            </a:r>
+            <a:r>
+              <a:rPr lang="en-US" sz="5400" dirty="0" smtClean="0">
+                <a:latin typeface="Lucida Handwriting" pitchFamily="66" charset="0"/>
+              </a:rPr>
+              <a:t>DSL</a:t>
+            </a:r>
+            <a:endParaRPr lang="en-US" dirty="0"/>
+          </a:p>
+        </p:txBody>
+      </p:sp>
+      <p:sp>
+        <p:nvSpPr>
+          <p:cNvPr id="7" name="Rectangle 6"/>
+          <p:cNvSpPr/>
+          <p:nvPr/>
+        </p:nvSpPr>
+        <p:spPr>
+          <a:xfrm>
+            <a:off x="2870139" y="1295400"/>
+            <a:ext cx="8727069" cy="923330"/>
+          </a:xfrm>
+          <a:prstGeom prst="rect">
+            <a:avLst/>
+          </a:prstGeom>
+        </p:spPr>
+        <p:txBody>
+          <a:bodyPr wrap="none">
+            <a:spAutoFit/>
+          </a:bodyPr>
+          <a:lstStyle/>
+          <a:p>
+            <a:pPr algn="ctr"/>
+            <a:r>
+              <a:rPr lang="en-US" sz="5400" b="1" kern="0" dirty="0" smtClean="0">
+                <a:solidFill>
+                  <a:srgbClr val="00CC66"/>
+                </a:solidFill>
+                <a:latin typeface="Lucida Handwriting" pitchFamily="66" charset="0"/>
+                <a:cs typeface="+mj-cs"/>
+                <a:sym typeface="Arial" charset="0"/>
+              </a:rPr>
+              <a:t>By name  parameters </a:t>
+            </a:r>
+          </a:p>
+        </p:txBody>
+      </p:sp>
+      <p:pic>
+        <p:nvPicPr>
+          <p:cNvPr id="8" name="Picture 10" descr="http://knowledgehub.zeus.com/media/Scala_Logo2008.png"/>
+          <p:cNvPicPr>
+            <a:picLocks noChangeAspect="1" noChangeArrowheads="1"/>
+          </p:cNvPicPr>
+          <p:nvPr/>
+        </p:nvPicPr>
+        <p:blipFill>
+          <a:blip r:embed="rId3"/>
+          <a:srcRect/>
+          <a:stretch>
+            <a:fillRect/>
+          </a:stretch>
+        </p:blipFill>
+        <p:spPr bwMode="auto">
+          <a:xfrm>
+            <a:off x="4140200" y="76200"/>
+            <a:ext cx="2279542" cy="679257"/>
+          </a:xfrm>
+          <a:prstGeom prst="rect">
+            <a:avLst/>
+          </a:prstGeom>
+          <a:noFill/>
+        </p:spPr>
+      </p:pic>
+      <p:sp>
+        <p:nvSpPr>
+          <p:cNvPr id="11" name="Rectangle 10"/>
+          <p:cNvSpPr/>
+          <p:nvPr/>
+        </p:nvSpPr>
+        <p:spPr>
+          <a:xfrm>
+            <a:off x="254000" y="3318570"/>
+            <a:ext cx="12674600" cy="3539430"/>
+          </a:xfrm>
+          <a:prstGeom prst="rect">
+            <a:avLst/>
+          </a:prstGeom>
+          <a:solidFill>
+            <a:schemeClr val="bg1"/>
+          </a:solidFill>
+          <a:ln>
+            <a:solidFill>
+              <a:schemeClr val="tx1"/>
+            </a:solidFill>
+            <a:prstDash val="dash"/>
+          </a:ln>
+        </p:spPr>
+        <p:txBody>
+          <a:bodyPr wrap="square">
+            <a:spAutoFit/>
+          </a:bodyPr>
+          <a:lstStyle/>
+          <a:p>
+            <a:r>
+              <a:rPr lang="en-US" sz="3200" b="1" dirty="0" smtClean="0">
+                <a:solidFill>
+                  <a:srgbClr val="7F0055"/>
+                </a:solidFill>
+                <a:latin typeface="Courier New"/>
+              </a:rPr>
+              <a:t>class</a:t>
+            </a:r>
+            <a:r>
+              <a:rPr lang="en-US" sz="3200" b="1" dirty="0" smtClean="0">
+                <a:latin typeface="Courier New"/>
+              </a:rPr>
+              <a:t> </a:t>
+            </a:r>
+            <a:r>
+              <a:rPr lang="en-US" sz="3200" b="1" dirty="0" err="1" smtClean="0">
+                <a:latin typeface="Courier New"/>
+              </a:rPr>
+              <a:t>EqualMatcher</a:t>
+            </a:r>
+            <a:r>
+              <a:rPr lang="en-US" sz="3200" b="1" dirty="0" smtClean="0">
+                <a:latin typeface="Courier New"/>
+              </a:rPr>
+              <a:t>[T](x: </a:t>
+            </a:r>
+            <a:r>
+              <a:rPr lang="en-US" sz="3200" b="1" dirty="0" smtClean="0">
+                <a:latin typeface="Courier New"/>
+              </a:rPr>
+              <a:t>=&gt;T</a:t>
+            </a:r>
+            <a:r>
+              <a:rPr lang="en-US" sz="3200" b="1" dirty="0" smtClean="0">
+                <a:latin typeface="Courier New"/>
+              </a:rPr>
+              <a:t>) </a:t>
+            </a:r>
+            <a:r>
+              <a:rPr lang="en-US" sz="3200" b="1" dirty="0" smtClean="0">
+                <a:solidFill>
+                  <a:srgbClr val="7F0055"/>
+                </a:solidFill>
+                <a:latin typeface="Courier New"/>
+              </a:rPr>
+              <a:t>extends</a:t>
+            </a:r>
+            <a:r>
+              <a:rPr lang="en-US" sz="3200" b="1" dirty="0" smtClean="0">
+                <a:latin typeface="Courier New"/>
+              </a:rPr>
+              <a:t> Matcher[T] { </a:t>
+            </a:r>
+          </a:p>
+          <a:p>
+            <a:r>
+              <a:rPr lang="en-US" sz="3200" dirty="0" smtClean="0">
+                <a:latin typeface="Courier New"/>
+              </a:rPr>
+              <a:t>  </a:t>
+            </a:r>
+            <a:r>
+              <a:rPr lang="en-US" sz="3200" b="1" dirty="0" smtClean="0">
+                <a:solidFill>
+                  <a:srgbClr val="7F0055"/>
+                </a:solidFill>
+                <a:latin typeface="Courier New"/>
+              </a:rPr>
+              <a:t>def</a:t>
+            </a:r>
+            <a:r>
+              <a:rPr lang="en-US" sz="3200" b="1" dirty="0" smtClean="0">
+                <a:latin typeface="Courier New"/>
+              </a:rPr>
+              <a:t> apply(y: =&gt;T) = {</a:t>
+            </a:r>
+          </a:p>
+          <a:p>
+            <a:r>
+              <a:rPr lang="es-ES" sz="3200" dirty="0" smtClean="0">
+                <a:latin typeface="Courier New"/>
+              </a:rPr>
+              <a:t>    </a:t>
+            </a:r>
+            <a:r>
+              <a:rPr lang="es-ES" sz="3200" b="1" dirty="0" smtClean="0">
+                <a:solidFill>
+                  <a:srgbClr val="7F0055"/>
+                </a:solidFill>
+                <a:latin typeface="Courier New"/>
+              </a:rPr>
+              <a:t>val</a:t>
+            </a:r>
+            <a:r>
+              <a:rPr lang="es-ES" sz="3200" b="1" dirty="0" smtClean="0">
+                <a:latin typeface="Courier New"/>
+              </a:rPr>
+              <a:t> (a, b) = (x, y)</a:t>
+            </a:r>
+          </a:p>
+          <a:p>
+            <a:r>
+              <a:rPr lang="en-US" sz="3200" dirty="0" smtClean="0">
+                <a:latin typeface="Courier New"/>
+              </a:rPr>
+              <a:t>    (a == b, a + </a:t>
+            </a:r>
+            <a:r>
+              <a:rPr lang="en-US" sz="3200" dirty="0" smtClean="0">
+                <a:solidFill>
+                  <a:srgbClr val="2A00FF"/>
+                </a:solidFill>
+                <a:latin typeface="Courier New"/>
+              </a:rPr>
+              <a:t>" is equal to "</a:t>
+            </a:r>
+            <a:r>
+              <a:rPr lang="en-US" sz="3200" dirty="0" smtClean="0">
+                <a:latin typeface="Courier New"/>
+              </a:rPr>
+              <a:t> + b, </a:t>
+            </a:r>
+            <a:endParaRPr lang="en-US" sz="3200" dirty="0" smtClean="0">
+              <a:latin typeface="Courier New"/>
+            </a:endParaRPr>
+          </a:p>
+          <a:p>
+            <a:r>
+              <a:rPr lang="en-US" sz="3200" dirty="0" smtClean="0">
+                <a:latin typeface="Courier New"/>
+              </a:rPr>
+              <a:t> </a:t>
+            </a:r>
+            <a:r>
+              <a:rPr lang="en-US" sz="3200" dirty="0" smtClean="0">
+                <a:latin typeface="Courier New"/>
+              </a:rPr>
+              <a:t>            a </a:t>
+            </a:r>
+            <a:r>
+              <a:rPr lang="en-US" sz="3200" dirty="0" smtClean="0">
+                <a:latin typeface="Courier New"/>
+              </a:rPr>
+              <a:t>+ </a:t>
+            </a:r>
+            <a:r>
+              <a:rPr lang="en-US" sz="3200" dirty="0" smtClean="0">
+                <a:solidFill>
+                  <a:srgbClr val="2A00FF"/>
+                </a:solidFill>
+                <a:latin typeface="Courier New"/>
+              </a:rPr>
+              <a:t>" is not equal to "</a:t>
+            </a:r>
+            <a:r>
+              <a:rPr lang="en-US" sz="3200" dirty="0" smtClean="0">
+                <a:latin typeface="Courier New"/>
+              </a:rPr>
+              <a:t> + b)</a:t>
+            </a:r>
+          </a:p>
+          <a:p>
+            <a:r>
+              <a:rPr lang="en-US" sz="3200" dirty="0" smtClean="0">
+                <a:latin typeface="Courier New"/>
+              </a:rPr>
+              <a:t>  }</a:t>
+            </a:r>
+          </a:p>
+          <a:p>
+            <a:r>
+              <a:rPr lang="en-US" sz="3200" dirty="0" smtClean="0">
+                <a:latin typeface="Courier New"/>
+              </a:rPr>
+              <a:t>}</a:t>
+            </a:r>
+            <a:endParaRPr lang="en-US" sz="3200" b="1" dirty="0" smtClean="0">
+              <a:latin typeface="Courier New"/>
+            </a:endParaRPr>
+          </a:p>
+        </p:txBody>
+      </p:sp>
+      <p:pic>
+        <p:nvPicPr>
+          <p:cNvPr id="70662" name="Picture 6" descr="magic, wizard icon"/>
+          <p:cNvPicPr>
+            <a:picLocks noChangeAspect="1" noChangeArrowheads="1"/>
+          </p:cNvPicPr>
+          <p:nvPr/>
+        </p:nvPicPr>
+        <p:blipFill>
+          <a:blip r:embed="rId4"/>
+          <a:srcRect/>
+          <a:stretch>
+            <a:fillRect/>
+          </a:stretch>
+        </p:blipFill>
+        <p:spPr bwMode="auto">
+          <a:xfrm>
+            <a:off x="635000" y="1143000"/>
+            <a:ext cx="1295400" cy="1295401"/>
+          </a:xfrm>
+          <a:prstGeom prst="rect">
+            <a:avLst/>
+          </a:prstGeom>
+          <a:noFill/>
+        </p:spPr>
+      </p:pic>
+      <p:sp>
+        <p:nvSpPr>
+          <p:cNvPr id="9" name="Rectangle 1"/>
+          <p:cNvSpPr txBox="1">
+            <a:spLocks noChangeArrowheads="1"/>
+          </p:cNvSpPr>
+          <p:nvPr/>
+        </p:nvSpPr>
+        <p:spPr bwMode="auto">
+          <a:xfrm>
+            <a:off x="6654800" y="2209800"/>
+            <a:ext cx="4876800" cy="685800"/>
+          </a:xfrm>
+          <a:prstGeom prst="rect">
+            <a:avLst/>
+          </a:prstGeom>
+          <a:noFill/>
+          <a:ln w="12700">
+            <a:noFill/>
+            <a:miter lim="800000"/>
+            <a:headEnd/>
+            <a:tailEnd/>
+          </a:ln>
+          <a:effectLst/>
+        </p:spPr>
+        <p:txBody>
+          <a:bodyPr vert="horz" wrap="square" lIns="50800" tIns="50800" rIns="50800" bIns="50800" numCol="1" anchor="ctr" anchorCtr="0" compatLnSpc="1">
+            <a:prstTxWarp prst="textNoShape">
+              <a:avLst/>
+            </a:prstTxWarp>
+          </a:bodyPr>
+          <a:lstStyle/>
+          <a:p>
+            <a:pPr lvl="0" algn="r"/>
+            <a:r>
+              <a:rPr kumimoji="0" lang="en-US" sz="4400" b="1" i="0" u="none" strike="noStrike" kern="0" cap="none" spc="0" normalizeH="0" baseline="0" noProof="0" dirty="0" smtClean="0">
+                <a:ln>
+                  <a:noFill/>
+                </a:ln>
+                <a:solidFill>
+                  <a:srgbClr val="FF0000"/>
+                </a:solidFill>
+                <a:effectLst/>
+                <a:uLnTx/>
+                <a:uFillTx/>
+                <a:latin typeface="Candara" pitchFamily="34" charset="0"/>
+                <a:ea typeface="+mj-ea"/>
+                <a:cs typeface="+mj-cs"/>
+                <a:sym typeface="Wingdings"/>
+              </a:rPr>
+              <a:t></a:t>
+            </a:r>
+            <a:r>
+              <a:rPr kumimoji="0" lang="en-US" sz="4400" b="1" i="0" u="none" strike="noStrike" kern="0" cap="none" spc="0" normalizeH="0" baseline="0" noProof="0" dirty="0" smtClean="0">
+                <a:ln>
+                  <a:noFill/>
+                </a:ln>
+                <a:solidFill>
+                  <a:srgbClr val="FF0000"/>
+                </a:solidFill>
+                <a:effectLst/>
+                <a:uLnTx/>
+                <a:uFillTx/>
+                <a:latin typeface="Candara" pitchFamily="34" charset="0"/>
+                <a:ea typeface="+mj-ea"/>
+                <a:cs typeface="+mj-cs"/>
+                <a:sym typeface="Arial" charset="0"/>
+              </a:rPr>
+              <a:t> Evaluate once!</a:t>
+            </a:r>
+            <a:endParaRPr kumimoji="0" lang="en-US" sz="4400" b="1" i="0" u="none" strike="noStrike" kern="0" cap="none" spc="0" normalizeH="0" baseline="0" noProof="0" dirty="0">
+              <a:ln>
+                <a:noFill/>
+              </a:ln>
+              <a:solidFill>
+                <a:srgbClr val="E75145"/>
+              </a:solidFill>
+              <a:effectLst/>
+              <a:uLnTx/>
+              <a:uFillTx/>
+              <a:latin typeface="Candara" pitchFamily="34" charset="0"/>
+              <a:ea typeface="+mj-ea"/>
+              <a:cs typeface="+mj-cs"/>
+              <a:sym typeface="Arial" charset="0"/>
+            </a:endParaRPr>
+          </a:p>
+        </p:txBody>
+      </p:sp>
+    </p:spTree>
+  </p:cSld>
+  <p:clrMapOvr>
+    <a:masterClrMapping/>
+  </p:clrMapOvr>
+  <p:transition>
+    <p:fade/>
+  </p:transition>
+  <p:timing>
+    <p:tnLst>
+      <p:par>
+        <p:cTn id="1" dur="indefinite" restart="never" nodeType="tmRoot">
+          <p:childTnLst>
+            <p:seq concurrent="1" nextAc="seek">
+              <p:cTn id="2" dur="indefinite" nodeType="mainSeq">
+                <p:childTnLst>
+                  <p:par>
+                    <p:cTn id="3" fill="hold">
+                      <p:stCondLst>
+                        <p:cond delay="indefinite"/>
+                        <p:cond evt="onBegin" delay="0">
+                          <p:tn val="2"/>
+                        </p:cond>
+                      </p:stCondLst>
+                      <p:childTnLst>
+                        <p:par>
+                          <p:cTn id="4" fill="hold">
+                            <p:stCondLst>
+                              <p:cond delay="0"/>
+                            </p:stCondLst>
+                            <p:childTnLst>
+                              <p:par>
+                                <p:cTn id="5" presetID="1" presetClass="entr" presetSubtype="0" fill="hold" nodeType="withEffect">
+                                  <p:stCondLst>
+                                    <p:cond delay="0"/>
+                                  </p:stCondLst>
+                                  <p:childTnLst>
+                                    <p:set>
+                                      <p:cBhvr>
+                                        <p:cTn id="6" dur="1" fill="hold">
+                                          <p:stCondLst>
+                                            <p:cond delay="0"/>
+                                          </p:stCondLst>
+                                        </p:cTn>
+                                        <p:tgtEl>
+                                          <p:spTgt spid="8"/>
+                                        </p:tgtEl>
+                                        <p:attrNameLst>
+                                          <p:attrName>style.visibility</p:attrName>
+                                        </p:attrNameLst>
+                                      </p:cBhvr>
+                                      <p:to>
+                                        <p:strVal val="visible"/>
+                                      </p:to>
+                                    </p:set>
+                                  </p:childTnLst>
+                                </p:cTn>
+                              </p:par>
+                            </p:childTnLst>
+                          </p:cTn>
+                        </p:par>
+                      </p:childTnLst>
+                    </p:cTn>
+                  </p:par>
+                </p:childTnLst>
+              </p:cTn>
+              <p:prevCondLst>
+                <p:cond evt="onPrev" delay="0">
+                  <p:tgtEl>
+                    <p:sldTgt/>
+                  </p:tgtEl>
+                </p:cond>
+              </p:prevCondLst>
+              <p:nextCondLst>
+                <p:cond evt="onNext" delay="0">
+                  <p:tgtEl>
+                    <p:sldTgt/>
+                  </p:tgtEl>
+                </p:cond>
+              </p:nextCondLst>
+            </p:seq>
+          </p:childTnLst>
+        </p:cTn>
+      </p:par>
+    </p:tnLst>
+  </p:timing>
+</p:sld>
+</file>
+
+<file path=ppt/slides/slide31.xml><?xml version="1.0" encoding="utf-8"?>
+<p:sld xmlns:a="http://schemas.openxmlformats.org/drawingml/2006/main" xmlns:r="http://schemas.openxmlformats.org/officeDocument/2006/relationships" xmlns:p="http://schemas.openxmlformats.org/presentationml/2006/main">
+  <p:cSld>
+    <p:spTree>
+      <p:nvGrpSpPr>
+        <p:cNvPr id="1" name=""/>
+        <p:cNvGrpSpPr/>
+        <p:nvPr/>
+      </p:nvGrpSpPr>
+      <p:grpSpPr>
+        <a:xfrm>
+          <a:off x="0" y="0"/>
+          <a:ext cx="0" cy="0"/>
+          <a:chOff x="0" y="0"/>
+          <a:chExt cx="0" cy="0"/>
+        </a:xfrm>
+      </p:grpSpPr>
+      <p:sp>
+        <p:nvSpPr>
+          <p:cNvPr id="8193" name="Rectangle 1"/>
+          <p:cNvSpPr>
+            <a:spLocks noGrp="1" noChangeArrowheads="1"/>
+          </p:cNvSpPr>
+          <p:nvPr>
+            <p:ph type="title"/>
+          </p:nvPr>
+        </p:nvSpPr>
+        <p:spPr>
+          <a:xfrm>
+            <a:off x="711200" y="0"/>
+            <a:ext cx="12509500" cy="914400"/>
+          </a:xfrm>
+          <a:ln/>
+        </p:spPr>
+        <p:txBody>
+          <a:bodyPr/>
+          <a:lstStyle/>
+          <a:p>
+            <a:pPr lvl="0"/>
+            <a:r>
+              <a:rPr lang="en-US" sz="5400" dirty="0" smtClean="0">
+                <a:latin typeface="Lucida Handwriting" pitchFamily="66" charset="0"/>
+              </a:rPr>
+              <a:t>     </a:t>
+            </a:r>
+            <a:r>
+              <a:rPr lang="en-US" sz="5400" dirty="0" smtClean="0">
+                <a:latin typeface="Lucida Handwriting" pitchFamily="66" charset="0"/>
+              </a:rPr>
+              <a:t>DSL</a:t>
+            </a:r>
+            <a:endParaRPr lang="en-US" dirty="0"/>
+          </a:p>
+        </p:txBody>
+      </p:sp>
+      <p:sp>
+        <p:nvSpPr>
+          <p:cNvPr id="7" name="Rectangle 6"/>
+          <p:cNvSpPr/>
+          <p:nvPr/>
+        </p:nvSpPr>
+        <p:spPr>
+          <a:xfrm>
+            <a:off x="2870139" y="1295400"/>
+            <a:ext cx="8727069" cy="923330"/>
+          </a:xfrm>
+          <a:prstGeom prst="rect">
+            <a:avLst/>
+          </a:prstGeom>
+        </p:spPr>
+        <p:txBody>
+          <a:bodyPr wrap="none">
+            <a:spAutoFit/>
+          </a:bodyPr>
+          <a:lstStyle/>
+          <a:p>
+            <a:pPr algn="ctr"/>
+            <a:r>
+              <a:rPr lang="en-US" sz="5400" b="1" kern="0" dirty="0" smtClean="0">
+                <a:solidFill>
+                  <a:srgbClr val="00CC66"/>
+                </a:solidFill>
+                <a:latin typeface="Lucida Handwriting" pitchFamily="66" charset="0"/>
+                <a:cs typeface="+mj-cs"/>
+                <a:sym typeface="Arial" charset="0"/>
+              </a:rPr>
+              <a:t>By name  parameters </a:t>
+            </a:r>
+          </a:p>
+        </p:txBody>
+      </p:sp>
+      <p:pic>
+        <p:nvPicPr>
+          <p:cNvPr id="8" name="Picture 10" descr="http://knowledgehub.zeus.com/media/Scala_Logo2008.png"/>
+          <p:cNvPicPr>
+            <a:picLocks noChangeAspect="1" noChangeArrowheads="1"/>
+          </p:cNvPicPr>
+          <p:nvPr/>
+        </p:nvPicPr>
+        <p:blipFill>
+          <a:blip r:embed="rId3"/>
+          <a:srcRect/>
+          <a:stretch>
+            <a:fillRect/>
+          </a:stretch>
+        </p:blipFill>
+        <p:spPr bwMode="auto">
+          <a:xfrm>
+            <a:off x="4140200" y="76200"/>
+            <a:ext cx="2279542" cy="679257"/>
+          </a:xfrm>
+          <a:prstGeom prst="rect">
+            <a:avLst/>
+          </a:prstGeom>
+          <a:noFill/>
+        </p:spPr>
+      </p:pic>
+      <p:sp>
+        <p:nvSpPr>
+          <p:cNvPr id="11" name="Rectangle 10"/>
+          <p:cNvSpPr/>
+          <p:nvPr/>
+        </p:nvSpPr>
+        <p:spPr>
+          <a:xfrm>
+            <a:off x="254000" y="3048000"/>
+            <a:ext cx="12674600" cy="5509200"/>
+          </a:xfrm>
+          <a:prstGeom prst="rect">
+            <a:avLst/>
+          </a:prstGeom>
+          <a:solidFill>
+            <a:schemeClr val="bg1"/>
+          </a:solidFill>
+          <a:ln>
+            <a:solidFill>
+              <a:schemeClr val="tx1"/>
+            </a:solidFill>
+            <a:prstDash val="dash"/>
+          </a:ln>
+        </p:spPr>
+        <p:txBody>
+          <a:bodyPr wrap="square">
+            <a:spAutoFit/>
+          </a:bodyPr>
+          <a:lstStyle/>
+          <a:p>
+            <a:r>
+              <a:rPr lang="en-US" sz="3200" b="1" dirty="0" smtClean="0">
+                <a:solidFill>
+                  <a:srgbClr val="7F0055"/>
+                </a:solidFill>
+                <a:latin typeface="Courier New"/>
+              </a:rPr>
+              <a:t>implicit</a:t>
+            </a:r>
+            <a:r>
+              <a:rPr lang="en-US" sz="3200" b="1" dirty="0" smtClean="0">
+                <a:latin typeface="Courier New"/>
+              </a:rPr>
+              <a:t> </a:t>
+            </a:r>
+            <a:r>
+              <a:rPr lang="en-US" sz="3200" b="1" dirty="0" smtClean="0">
+                <a:solidFill>
+                  <a:srgbClr val="7F0055"/>
+                </a:solidFill>
+                <a:latin typeface="Courier New"/>
+              </a:rPr>
+              <a:t>def</a:t>
+            </a:r>
+            <a:r>
+              <a:rPr lang="en-US" sz="3200" b="1" dirty="0" smtClean="0">
+                <a:latin typeface="Courier New"/>
+              </a:rPr>
+              <a:t> </a:t>
+            </a:r>
+            <a:r>
+              <a:rPr lang="en-US" sz="3200" b="1" dirty="0" err="1" smtClean="0">
+                <a:latin typeface="Courier New"/>
+              </a:rPr>
+              <a:t>toLazyParameter</a:t>
+            </a:r>
+            <a:r>
+              <a:rPr lang="en-US" sz="3200" b="1" dirty="0" smtClean="0">
+                <a:latin typeface="Courier New"/>
+              </a:rPr>
+              <a:t>[T](value: =&gt;T</a:t>
+            </a:r>
+            <a:r>
+              <a:rPr lang="en-US" sz="3200" b="1" dirty="0" smtClean="0">
+                <a:latin typeface="Courier New"/>
+              </a:rPr>
+              <a:t>): … </a:t>
+            </a:r>
+            <a:r>
+              <a:rPr lang="en-US" sz="3200" b="1" dirty="0" smtClean="0">
+                <a:latin typeface="Courier New"/>
+              </a:rPr>
+              <a:t>= </a:t>
+            </a:r>
+            <a:r>
+              <a:rPr lang="en-US" sz="3200" b="1" dirty="0" smtClean="0">
+                <a:latin typeface="Courier New"/>
+              </a:rPr>
+              <a:t>   </a:t>
+            </a:r>
+          </a:p>
+          <a:p>
+            <a:r>
+              <a:rPr lang="en-US" sz="3200" b="1" dirty="0" smtClean="0">
+                <a:solidFill>
+                  <a:srgbClr val="7F0055"/>
+                </a:solidFill>
+                <a:latin typeface="Courier New"/>
+              </a:rPr>
+              <a:t> </a:t>
+            </a:r>
+            <a:r>
+              <a:rPr lang="en-US" sz="3200" b="1" dirty="0" smtClean="0">
+                <a:solidFill>
+                  <a:srgbClr val="7F0055"/>
+                </a:solidFill>
+                <a:latin typeface="Courier New"/>
+              </a:rPr>
+              <a:t>            new</a:t>
+            </a:r>
+            <a:r>
+              <a:rPr lang="en-US" sz="3200" b="1" dirty="0" smtClean="0">
+                <a:latin typeface="Courier New"/>
+              </a:rPr>
+              <a:t> </a:t>
+            </a:r>
+            <a:r>
+              <a:rPr lang="en-US" sz="3200" b="1" dirty="0" err="1" smtClean="0">
+                <a:latin typeface="Courier New"/>
+              </a:rPr>
+              <a:t>LazyParameter</a:t>
+            </a:r>
+            <a:r>
+              <a:rPr lang="en-US" sz="3200" b="1" dirty="0" smtClean="0">
+                <a:latin typeface="Courier New"/>
+              </a:rPr>
+              <a:t>(() =&gt; value)</a:t>
+            </a:r>
+          </a:p>
+          <a:p>
+            <a:endParaRPr lang="en-US" sz="3200" dirty="0" smtClean="0">
+              <a:latin typeface="Courier New"/>
+            </a:endParaRPr>
+          </a:p>
+          <a:p>
+            <a:r>
+              <a:rPr lang="en-US" sz="3200" b="1" dirty="0" smtClean="0">
+                <a:solidFill>
+                  <a:srgbClr val="7F0055"/>
+                </a:solidFill>
+                <a:latin typeface="Courier New"/>
+              </a:rPr>
+              <a:t>class</a:t>
+            </a:r>
+            <a:r>
+              <a:rPr lang="en-US" sz="3200" b="1" dirty="0" smtClean="0">
+                <a:latin typeface="Courier New"/>
+              </a:rPr>
+              <a:t> </a:t>
+            </a:r>
+            <a:r>
+              <a:rPr lang="en-US" sz="3200" b="1" dirty="0" err="1" smtClean="0">
+                <a:latin typeface="Courier New"/>
+              </a:rPr>
+              <a:t>LazyParameter</a:t>
+            </a:r>
+            <a:r>
+              <a:rPr lang="en-US" sz="3200" b="1" dirty="0" smtClean="0">
+                <a:latin typeface="Courier New"/>
+              </a:rPr>
+              <a:t>[T](value</a:t>
+            </a:r>
+            <a:r>
+              <a:rPr lang="en-US" sz="3200" b="1" dirty="0" smtClean="0">
+                <a:latin typeface="Courier New"/>
+              </a:rPr>
+              <a:t>: () =&gt; T</a:t>
+            </a:r>
+            <a:r>
+              <a:rPr lang="en-US" sz="3200" b="1" dirty="0" smtClean="0">
+                <a:latin typeface="Courier New"/>
+              </a:rPr>
+              <a:t>) {</a:t>
+            </a:r>
+          </a:p>
+          <a:p>
+            <a:r>
+              <a:rPr lang="en-US" sz="3200" dirty="0" smtClean="0">
+                <a:latin typeface="Courier New"/>
+              </a:rPr>
+              <a:t>  </a:t>
+            </a:r>
+            <a:r>
+              <a:rPr lang="en-US" sz="3200" b="1" dirty="0" smtClean="0">
+                <a:solidFill>
+                  <a:srgbClr val="7F0055"/>
+                </a:solidFill>
+                <a:latin typeface="Courier New"/>
+              </a:rPr>
+              <a:t>lazy</a:t>
+            </a:r>
+            <a:r>
+              <a:rPr lang="en-US" sz="3200" b="1" dirty="0" smtClean="0">
+                <a:latin typeface="Courier New"/>
+              </a:rPr>
+              <a:t> </a:t>
+            </a:r>
+            <a:r>
+              <a:rPr lang="en-US" sz="3200" b="1" dirty="0" err="1" smtClean="0">
+                <a:solidFill>
+                  <a:srgbClr val="7F0055"/>
+                </a:solidFill>
+                <a:latin typeface="Courier New"/>
+              </a:rPr>
+              <a:t>val</a:t>
+            </a:r>
+            <a:r>
+              <a:rPr lang="en-US" sz="3200" b="1" dirty="0" smtClean="0">
+                <a:latin typeface="Courier New"/>
+              </a:rPr>
+              <a:t> v = value()</a:t>
+            </a:r>
+          </a:p>
+          <a:p>
+            <a:r>
+              <a:rPr lang="en-US" sz="3200" dirty="0" smtClean="0">
+                <a:latin typeface="Courier New"/>
+              </a:rPr>
+              <a:t>  </a:t>
+            </a:r>
+            <a:r>
+              <a:rPr lang="en-US" sz="3200" b="1" dirty="0" smtClean="0">
+                <a:solidFill>
+                  <a:srgbClr val="7F0055"/>
+                </a:solidFill>
+                <a:latin typeface="Courier New"/>
+              </a:rPr>
+              <a:t>def</a:t>
+            </a:r>
+            <a:r>
+              <a:rPr lang="en-US" sz="3200" b="1" dirty="0" smtClean="0">
+                <a:latin typeface="Courier New"/>
+              </a:rPr>
+              <a:t> apply() = v</a:t>
+            </a:r>
+          </a:p>
+          <a:p>
+            <a:r>
+              <a:rPr lang="en-US" sz="3200" dirty="0" smtClean="0">
+                <a:latin typeface="Courier New"/>
+              </a:rPr>
+              <a:t>}</a:t>
+            </a:r>
+          </a:p>
+          <a:p>
+            <a:r>
+              <a:rPr lang="en-US" sz="3200" b="1" dirty="0" smtClean="0">
+                <a:solidFill>
+                  <a:srgbClr val="7F0055"/>
+                </a:solidFill>
+                <a:latin typeface="Courier New"/>
+              </a:rPr>
+              <a:t>def</a:t>
+            </a:r>
+            <a:r>
+              <a:rPr lang="en-US" sz="3200" b="1" dirty="0" smtClean="0">
+                <a:latin typeface="Courier New"/>
+              </a:rPr>
+              <a:t> method[T](</a:t>
+            </a:r>
+            <a:r>
+              <a:rPr lang="en-US" sz="3200" b="1" dirty="0" err="1" smtClean="0">
+                <a:latin typeface="Courier New"/>
+              </a:rPr>
+              <a:t>params</a:t>
+            </a:r>
+            <a:r>
+              <a:rPr lang="en-US" sz="3200" b="1" dirty="0" smtClean="0">
+                <a:latin typeface="Courier New"/>
+              </a:rPr>
+              <a:t>: </a:t>
+            </a:r>
+            <a:r>
+              <a:rPr lang="en-US" sz="3200" b="1" dirty="0" err="1" smtClean="0">
+                <a:latin typeface="Courier New"/>
+              </a:rPr>
+              <a:t>LazyParameter</a:t>
+            </a:r>
+            <a:r>
+              <a:rPr lang="en-US" sz="3200" b="1" dirty="0" smtClean="0">
+                <a:latin typeface="Courier New"/>
+              </a:rPr>
+              <a:t>[T</a:t>
+            </a:r>
+            <a:r>
+              <a:rPr lang="en-US" sz="3200" b="1" dirty="0" smtClean="0">
+                <a:latin typeface="Courier New"/>
+              </a:rPr>
+              <a:t>]*) </a:t>
+            </a:r>
+            <a:r>
+              <a:rPr lang="en-US" sz="3200" b="1" dirty="0" smtClean="0">
+                <a:latin typeface="Courier New"/>
+              </a:rPr>
+              <a:t>= </a:t>
+            </a:r>
+            <a:r>
+              <a:rPr lang="en-US" sz="3200" b="1" dirty="0" smtClean="0">
+                <a:latin typeface="Courier New"/>
+              </a:rPr>
+              <a:t>    </a:t>
+            </a:r>
+          </a:p>
+          <a:p>
+            <a:r>
+              <a:rPr lang="en-US" sz="3200" b="1" dirty="0" smtClean="0">
+                <a:latin typeface="Courier New"/>
+              </a:rPr>
+              <a:t> </a:t>
+            </a:r>
+            <a:r>
+              <a:rPr lang="en-US" sz="3200" b="1" dirty="0" smtClean="0">
+                <a:latin typeface="Courier New"/>
+              </a:rPr>
+              <a:t>                               </a:t>
+            </a:r>
+            <a:r>
+              <a:rPr lang="en-US" sz="3200" b="1" dirty="0" err="1" smtClean="0">
+                <a:latin typeface="Courier New"/>
+              </a:rPr>
+              <a:t>params.toStream</a:t>
+            </a:r>
+            <a:endParaRPr lang="en-US" sz="3200" b="1" dirty="0" smtClean="0">
+              <a:latin typeface="Courier New"/>
+            </a:endParaRPr>
+          </a:p>
+          <a:p>
+            <a:endParaRPr lang="en-US" sz="3200" dirty="0" smtClean="0">
+              <a:latin typeface="Courier New"/>
+            </a:endParaRPr>
+          </a:p>
+          <a:p>
+            <a:r>
+              <a:rPr lang="en-US" sz="3200" dirty="0" smtClean="0">
+                <a:latin typeface="Courier New"/>
+              </a:rPr>
+              <a:t>method(1</a:t>
+            </a:r>
+            <a:r>
+              <a:rPr lang="en-US" sz="3200" dirty="0" smtClean="0">
+                <a:latin typeface="Courier New"/>
+              </a:rPr>
+              <a:t>., 2., </a:t>
+            </a:r>
+            <a:r>
+              <a:rPr lang="en-US" sz="3200" dirty="0" err="1" smtClean="0">
+                <a:latin typeface="Courier New"/>
+              </a:rPr>
+              <a:t>math.pow</a:t>
+            </a:r>
+            <a:r>
+              <a:rPr lang="en-US" sz="3200" dirty="0" smtClean="0">
+                <a:latin typeface="Courier New"/>
+              </a:rPr>
+              <a:t>(100, 100))</a:t>
+            </a:r>
+            <a:endParaRPr lang="en-US" sz="3200" dirty="0" smtClean="0">
+              <a:latin typeface="Courier New"/>
+            </a:endParaRPr>
+          </a:p>
+        </p:txBody>
+      </p:sp>
+      <p:pic>
+        <p:nvPicPr>
+          <p:cNvPr id="70662" name="Picture 6" descr="magic, wizard icon"/>
+          <p:cNvPicPr>
+            <a:picLocks noChangeAspect="1" noChangeArrowheads="1"/>
+          </p:cNvPicPr>
+          <p:nvPr/>
+        </p:nvPicPr>
+        <p:blipFill>
+          <a:blip r:embed="rId4"/>
+          <a:srcRect/>
+          <a:stretch>
+            <a:fillRect/>
+          </a:stretch>
+        </p:blipFill>
+        <p:spPr bwMode="auto">
+          <a:xfrm>
+            <a:off x="635000" y="1143000"/>
+            <a:ext cx="1295400" cy="1295401"/>
+          </a:xfrm>
+          <a:prstGeom prst="rect">
+            <a:avLst/>
+          </a:prstGeom>
+          <a:noFill/>
+        </p:spPr>
+      </p:pic>
+      <p:sp>
+        <p:nvSpPr>
+          <p:cNvPr id="9" name="Rectangle 1"/>
+          <p:cNvSpPr txBox="1">
+            <a:spLocks noChangeArrowheads="1"/>
+          </p:cNvSpPr>
+          <p:nvPr/>
+        </p:nvSpPr>
+        <p:spPr bwMode="auto">
+          <a:xfrm>
+            <a:off x="6654800" y="2209800"/>
+            <a:ext cx="4876800" cy="685800"/>
+          </a:xfrm>
+          <a:prstGeom prst="rect">
+            <a:avLst/>
+          </a:prstGeom>
+          <a:noFill/>
+          <a:ln w="12700">
+            <a:noFill/>
+            <a:miter lim="800000"/>
+            <a:headEnd/>
+            <a:tailEnd/>
+          </a:ln>
+          <a:effectLst/>
+        </p:spPr>
+        <p:txBody>
+          <a:bodyPr vert="horz" wrap="square" lIns="50800" tIns="50800" rIns="50800" bIns="50800" numCol="1" anchor="ctr" anchorCtr="0" compatLnSpc="1">
+            <a:prstTxWarp prst="textNoShape">
+              <a:avLst/>
+            </a:prstTxWarp>
+          </a:bodyPr>
+          <a:lstStyle/>
+          <a:p>
+            <a:pPr lvl="0" algn="r"/>
+            <a:r>
+              <a:rPr kumimoji="0" lang="en-US" sz="4400" b="1" i="0" u="none" strike="noStrike" kern="0" cap="none" spc="0" normalizeH="0" baseline="0" noProof="0" dirty="0" smtClean="0">
+                <a:ln>
+                  <a:noFill/>
+                </a:ln>
+                <a:solidFill>
+                  <a:srgbClr val="FF0000"/>
+                </a:solidFill>
+                <a:effectLst/>
+                <a:uLnTx/>
+                <a:uFillTx/>
+                <a:latin typeface="Candara" pitchFamily="34" charset="0"/>
+                <a:ea typeface="+mj-ea"/>
+                <a:cs typeface="+mj-cs"/>
+                <a:sym typeface="Wingdings"/>
+              </a:rPr>
+              <a:t></a:t>
+            </a:r>
+            <a:r>
+              <a:rPr kumimoji="0" lang="en-US" sz="4400" b="1" i="0" u="none" strike="noStrike" kern="0" cap="none" spc="0" normalizeH="0" baseline="0" noProof="0" dirty="0" smtClean="0">
+                <a:ln>
+                  <a:noFill/>
+                </a:ln>
+                <a:solidFill>
+                  <a:srgbClr val="FF0000"/>
+                </a:solidFill>
+                <a:effectLst/>
+                <a:uLnTx/>
+                <a:uFillTx/>
+                <a:latin typeface="Candara" pitchFamily="34" charset="0"/>
+                <a:ea typeface="+mj-ea"/>
+                <a:cs typeface="+mj-cs"/>
+                <a:sym typeface="Arial" charset="0"/>
+              </a:rPr>
+              <a:t> With </a:t>
+            </a:r>
+            <a:r>
+              <a:rPr kumimoji="0" lang="en-US" sz="4400" b="1" i="0" u="none" strike="noStrike" kern="0" cap="none" spc="0" normalizeH="0" baseline="0" noProof="0" dirty="0" err="1" smtClean="0">
+                <a:ln>
+                  <a:noFill/>
+                </a:ln>
+                <a:solidFill>
+                  <a:srgbClr val="FF0000"/>
+                </a:solidFill>
+                <a:effectLst/>
+                <a:uLnTx/>
+                <a:uFillTx/>
+                <a:latin typeface="Candara" pitchFamily="34" charset="0"/>
+                <a:ea typeface="+mj-ea"/>
+                <a:cs typeface="+mj-cs"/>
+                <a:sym typeface="Arial" charset="0"/>
+              </a:rPr>
+              <a:t>varags</a:t>
+            </a:r>
+            <a:r>
+              <a:rPr kumimoji="0" lang="en-US" sz="4400" b="1" i="0" u="none" strike="noStrike" kern="0" cap="none" spc="0" normalizeH="0" baseline="0" noProof="0" dirty="0" smtClean="0">
+                <a:ln>
+                  <a:noFill/>
+                </a:ln>
+                <a:solidFill>
+                  <a:srgbClr val="FF0000"/>
+                </a:solidFill>
+                <a:effectLst/>
+                <a:uLnTx/>
+                <a:uFillTx/>
+                <a:latin typeface="Candara" pitchFamily="34" charset="0"/>
+                <a:ea typeface="+mj-ea"/>
+                <a:cs typeface="+mj-cs"/>
+                <a:sym typeface="Arial" charset="0"/>
+              </a:rPr>
+              <a:t>!</a:t>
+            </a:r>
+            <a:endParaRPr kumimoji="0" lang="en-US" sz="4400" b="1" i="0" u="none" strike="noStrike" kern="0" cap="none" spc="0" normalizeH="0" baseline="0" noProof="0" dirty="0">
+              <a:ln>
+                <a:noFill/>
+              </a:ln>
+              <a:solidFill>
+                <a:srgbClr val="E75145"/>
+              </a:solidFill>
+              <a:effectLst/>
+              <a:uLnTx/>
+              <a:uFillTx/>
+              <a:latin typeface="Candara" pitchFamily="34" charset="0"/>
+              <a:ea typeface="+mj-ea"/>
+              <a:cs typeface="+mj-cs"/>
+              <a:sym typeface="Arial" charset="0"/>
+            </a:endParaRPr>
+          </a:p>
+        </p:txBody>
+      </p:sp>
+    </p:spTree>
+  </p:cSld>
+  <p:clrMapOvr>
+    <a:masterClrMapping/>
+  </p:clrMapOvr>
+  <p:transition>
+    <p:fade/>
+  </p:transition>
+  <p:timing>
+    <p:tnLst>
+      <p:par>
+        <p:cTn id="1" dur="indefinite" restart="never" nodeType="tmRoot">
+          <p:childTnLst>
+            <p:seq concurrent="1" nextAc="seek">
+              <p:cTn id="2" dur="indefinite" nodeType="mainSeq">
+                <p:childTnLst>
+                  <p:par>
+                    <p:cTn id="3" fill="hold">
+                      <p:stCondLst>
+                        <p:cond delay="indefinite"/>
+                        <p:cond evt="onBegin" delay="0">
+                          <p:tn val="2"/>
+                        </p:cond>
+                      </p:stCondLst>
+                      <p:childTnLst>
+                        <p:par>
+                          <p:cTn id="4" fill="hold">
+                            <p:stCondLst>
+                              <p:cond delay="0"/>
+                            </p:stCondLst>
+                            <p:childTnLst>
+                              <p:par>
+                                <p:cTn id="5" presetID="1" presetClass="entr" presetSubtype="0" fill="hold" nodeType="withEffect">
+                                  <p:stCondLst>
+                                    <p:cond delay="0"/>
+                                  </p:stCondLst>
+                                  <p:childTnLst>
+                                    <p:set>
+                                      <p:cBhvr>
+                                        <p:cTn id="6" dur="1" fill="hold">
+                                          <p:stCondLst>
+                                            <p:cond delay="0"/>
+                                          </p:stCondLst>
+                                        </p:cTn>
+                                        <p:tgtEl>
+                                          <p:spTgt spid="8"/>
+                                        </p:tgtEl>
+                                        <p:attrNameLst>
+                                          <p:attrName>style.visibility</p:attrName>
+                                        </p:attrNameLst>
+                                      </p:cBhvr>
+                                      <p:to>
+                                        <p:strVal val="visible"/>
+                                      </p:to>
+                                    </p:set>
+                                  </p:childTnLst>
+                                </p:cTn>
+                              </p:par>
+                            </p:childTnLst>
+                          </p:cTn>
+                        </p:par>
+                      </p:childTnLst>
+                    </p:cTn>
+                  </p:par>
+                </p:childTnLst>
+              </p:cTn>
+              <p:prevCondLst>
+                <p:cond evt="onPrev" delay="0">
+                  <p:tgtEl>
+                    <p:sldTgt/>
+                  </p:tgtEl>
+                </p:cond>
+              </p:prevCondLst>
+              <p:nextCondLst>
+                <p:cond evt="onNext" delay="0">
+                  <p:tgtEl>
+                    <p:sldTgt/>
+                  </p:tgtEl>
+                </p:cond>
+              </p:nextCondLst>
+            </p:seq>
+          </p:childTnLst>
+        </p:cTn>
+      </p:par>
+    </p:tnLst>
+  </p:timing>
+</p:sld>
+</file>
+
+<file path=ppt/slides/slide32.xml><?xml version="1.0" encoding="utf-8"?>
+<p:sld xmlns:a="http://schemas.openxmlformats.org/drawingml/2006/main" xmlns:r="http://schemas.openxmlformats.org/officeDocument/2006/relationships" xmlns:p="http://schemas.openxmlformats.org/presentationml/2006/main">
+  <p:cSld>
+    <p:spTree>
+      <p:nvGrpSpPr>
+        <p:cNvPr id="1" name=""/>
+        <p:cNvGrpSpPr/>
+        <p:nvPr/>
+      </p:nvGrpSpPr>
+      <p:grpSpPr>
+        <a:xfrm>
+          <a:off x="0" y="0"/>
+          <a:ext cx="0" cy="0"/>
+          <a:chOff x="0" y="0"/>
+          <a:chExt cx="0" cy="0"/>
+        </a:xfrm>
+      </p:grpSpPr>
+      <p:sp>
+        <p:nvSpPr>
+          <p:cNvPr id="8193" name="Rectangle 1"/>
+          <p:cNvSpPr>
+            <a:spLocks noGrp="1" noChangeArrowheads="1"/>
+          </p:cNvSpPr>
+          <p:nvPr>
+            <p:ph type="title"/>
+          </p:nvPr>
+        </p:nvSpPr>
+        <p:spPr>
+          <a:xfrm>
+            <a:off x="711200" y="0"/>
+            <a:ext cx="12509500" cy="914400"/>
+          </a:xfrm>
+          <a:ln/>
+        </p:spPr>
+        <p:txBody>
+          <a:bodyPr/>
+          <a:lstStyle/>
+          <a:p>
+            <a:pPr lvl="0"/>
+            <a:r>
+              <a:rPr lang="en-US" sz="5400" dirty="0" smtClean="0">
+                <a:latin typeface="Lucida Handwriting" pitchFamily="66" charset="0"/>
+              </a:rPr>
+              <a:t>     </a:t>
+            </a:r>
+            <a:r>
+              <a:rPr lang="en-US" sz="5400" dirty="0" smtClean="0">
+                <a:latin typeface="Lucida Handwriting" pitchFamily="66" charset="0"/>
+              </a:rPr>
+              <a:t>DSL</a:t>
+            </a:r>
+            <a:endParaRPr lang="en-US" dirty="0"/>
+          </a:p>
+        </p:txBody>
+      </p:sp>
+      <p:sp>
+        <p:nvSpPr>
+          <p:cNvPr id="7" name="Rectangle 6"/>
+          <p:cNvSpPr/>
+          <p:nvPr/>
+        </p:nvSpPr>
+        <p:spPr>
+          <a:xfrm>
+            <a:off x="4872690" y="1286470"/>
+            <a:ext cx="5973110" cy="923330"/>
+          </a:xfrm>
+          <a:prstGeom prst="rect">
+            <a:avLst/>
+          </a:prstGeom>
+        </p:spPr>
+        <p:txBody>
+          <a:bodyPr wrap="none">
+            <a:spAutoFit/>
+          </a:bodyPr>
+          <a:lstStyle/>
+          <a:p>
+            <a:pPr algn="ctr"/>
+            <a:r>
+              <a:rPr lang="en-US" sz="5400" b="1" kern="0" dirty="0" smtClean="0">
+                <a:solidFill>
+                  <a:srgbClr val="00CC66"/>
+                </a:solidFill>
+                <a:latin typeface="Lucida Handwriting" pitchFamily="66" charset="0"/>
+                <a:cs typeface="+mj-cs"/>
+                <a:sym typeface="Arial" charset="0"/>
+              </a:rPr>
+              <a:t>Some examples</a:t>
+            </a:r>
+          </a:p>
+        </p:txBody>
+      </p:sp>
+      <p:pic>
+        <p:nvPicPr>
+          <p:cNvPr id="8" name="Picture 10" descr="http://knowledgehub.zeus.com/media/Scala_Logo2008.png"/>
+          <p:cNvPicPr>
+            <a:picLocks noChangeAspect="1" noChangeArrowheads="1"/>
+          </p:cNvPicPr>
+          <p:nvPr/>
+        </p:nvPicPr>
+        <p:blipFill>
+          <a:blip r:embed="rId3"/>
+          <a:srcRect/>
+          <a:stretch>
+            <a:fillRect/>
+          </a:stretch>
+        </p:blipFill>
+        <p:spPr bwMode="auto">
+          <a:xfrm>
+            <a:off x="4140200" y="76200"/>
+            <a:ext cx="2279542" cy="679257"/>
+          </a:xfrm>
+          <a:prstGeom prst="rect">
+            <a:avLst/>
+          </a:prstGeom>
+          <a:noFill/>
+        </p:spPr>
+      </p:pic>
+      <p:sp>
+        <p:nvSpPr>
+          <p:cNvPr id="11" name="Rectangle 10"/>
+          <p:cNvSpPr/>
+          <p:nvPr/>
+        </p:nvSpPr>
+        <p:spPr>
+          <a:xfrm>
+            <a:off x="330200" y="3200400"/>
+            <a:ext cx="12344400" cy="3539430"/>
+          </a:xfrm>
+          <a:prstGeom prst="rect">
+            <a:avLst/>
+          </a:prstGeom>
+          <a:solidFill>
+            <a:schemeClr val="bg1"/>
+          </a:solidFill>
+          <a:ln>
+            <a:solidFill>
+              <a:schemeClr val="tx1"/>
+            </a:solidFill>
+            <a:prstDash val="dash"/>
+          </a:ln>
+        </p:spPr>
+        <p:txBody>
+          <a:bodyPr wrap="square">
+            <a:spAutoFit/>
+          </a:bodyPr>
+          <a:lstStyle/>
+          <a:p>
+            <a:r>
+              <a:rPr lang="en-US" sz="3200" dirty="0" smtClean="0">
+                <a:solidFill>
+                  <a:srgbClr val="2A00FF"/>
+                </a:solidFill>
+                <a:latin typeface="Courier New"/>
+              </a:rPr>
+              <a:t>"This is true"</a:t>
+            </a:r>
+            <a:r>
+              <a:rPr lang="en-US" sz="3200" dirty="0" smtClean="0">
+                <a:latin typeface="Courier New"/>
+              </a:rPr>
+              <a:t> in { </a:t>
+            </a:r>
+            <a:r>
+              <a:rPr lang="en-US" sz="3200" b="1" dirty="0" smtClean="0">
+                <a:solidFill>
+                  <a:srgbClr val="7F0055"/>
+                </a:solidFill>
+                <a:latin typeface="Courier New"/>
+              </a:rPr>
+              <a:t>true</a:t>
+            </a:r>
+            <a:r>
+              <a:rPr lang="en-US" sz="3200" b="1" dirty="0" smtClean="0">
+                <a:latin typeface="Courier New"/>
+              </a:rPr>
+              <a:t> must </a:t>
+            </a:r>
+            <a:r>
+              <a:rPr lang="en-US" sz="3200" b="1" dirty="0" err="1" smtClean="0">
+                <a:latin typeface="Courier New"/>
+              </a:rPr>
+              <a:t>beTrue</a:t>
+            </a:r>
+            <a:r>
+              <a:rPr lang="en-US" sz="3200" b="1" dirty="0" smtClean="0">
+                <a:latin typeface="Courier New"/>
+              </a:rPr>
+              <a:t> }</a:t>
+            </a:r>
+          </a:p>
+          <a:p>
+            <a:r>
+              <a:rPr lang="en-US" sz="3200" dirty="0" smtClean="0">
+                <a:latin typeface="Courier New"/>
+              </a:rPr>
+              <a:t>3.Seconds</a:t>
+            </a:r>
+            <a:endParaRPr lang="en-US" sz="3200" dirty="0" smtClean="0">
+              <a:latin typeface="Courier New"/>
+            </a:endParaRPr>
+          </a:p>
+          <a:p>
+            <a:r>
+              <a:rPr lang="en-US" sz="3200" dirty="0" smtClean="0">
+                <a:latin typeface="Courier New"/>
+              </a:rPr>
+              <a:t>3 </a:t>
+            </a:r>
+            <a:r>
+              <a:rPr lang="en-US" sz="3200" dirty="0" smtClean="0">
+                <a:latin typeface="Courier New"/>
+              </a:rPr>
+              <a:t>seconds</a:t>
+            </a:r>
+          </a:p>
+          <a:p>
+            <a:r>
+              <a:rPr lang="en-US" sz="3200" dirty="0" smtClean="0">
+                <a:latin typeface="Courier New"/>
+              </a:rPr>
+              <a:t>3 </a:t>
+            </a:r>
+            <a:r>
+              <a:rPr lang="en-US" sz="3200" dirty="0" smtClean="0">
+                <a:latin typeface="Courier New"/>
+              </a:rPr>
+              <a:t>times { </a:t>
+            </a:r>
+            <a:r>
+              <a:rPr lang="en-US" sz="3200" dirty="0" err="1" smtClean="0">
+                <a:latin typeface="Courier New"/>
+              </a:rPr>
+              <a:t>i</a:t>
+            </a:r>
+            <a:r>
+              <a:rPr lang="en-US" sz="3200" dirty="0" smtClean="0">
+                <a:latin typeface="Courier New"/>
+              </a:rPr>
+              <a:t> =&gt; </a:t>
+            </a:r>
+            <a:r>
+              <a:rPr lang="en-US" sz="3200" dirty="0" err="1" smtClean="0">
+                <a:latin typeface="Courier New"/>
+              </a:rPr>
+              <a:t>println</a:t>
+            </a:r>
+            <a:r>
+              <a:rPr lang="en-US" sz="3200" dirty="0" smtClean="0">
+                <a:latin typeface="Courier New"/>
+              </a:rPr>
+              <a:t>(</a:t>
+            </a:r>
+            <a:r>
+              <a:rPr lang="en-US" sz="3200" dirty="0" err="1" smtClean="0">
+                <a:latin typeface="Courier New"/>
+              </a:rPr>
+              <a:t>i</a:t>
+            </a:r>
+            <a:r>
+              <a:rPr lang="en-US" sz="3200" dirty="0" smtClean="0">
+                <a:latin typeface="Courier New"/>
+              </a:rPr>
+              <a:t>) }</a:t>
+            </a:r>
+          </a:p>
+          <a:p>
+            <a:r>
+              <a:rPr lang="en-US" sz="3200" dirty="0" smtClean="0">
+                <a:latin typeface="Courier New"/>
+              </a:rPr>
+              <a:t>  </a:t>
+            </a:r>
+          </a:p>
+          <a:p>
+            <a:r>
+              <a:rPr lang="en-US" sz="3200" dirty="0" smtClean="0">
+                <a:latin typeface="Courier New"/>
+              </a:rPr>
+              <a:t>3.pp </a:t>
+            </a:r>
+            <a:r>
+              <a:rPr lang="en-US" sz="3200" dirty="0" smtClean="0">
+                <a:latin typeface="Courier New"/>
+              </a:rPr>
+              <a:t>+ 1 </a:t>
+            </a:r>
+            <a:r>
+              <a:rPr lang="en-US" sz="3200" dirty="0" smtClean="0">
+                <a:solidFill>
+                  <a:srgbClr val="3F7F5F"/>
+                </a:solidFill>
+                <a:latin typeface="Courier New"/>
+              </a:rPr>
+              <a:t>// print and pass</a:t>
+            </a:r>
+          </a:p>
+          <a:p>
+            <a:r>
+              <a:rPr lang="en-US" sz="3200" dirty="0" smtClean="0">
+                <a:latin typeface="Courier New"/>
+              </a:rPr>
+              <a:t>1 </a:t>
+            </a:r>
+            <a:r>
+              <a:rPr lang="en-US" sz="3200" dirty="0" smtClean="0">
+                <a:latin typeface="Courier New"/>
+              </a:rPr>
+              <a:t>aka </a:t>
+            </a:r>
+            <a:r>
+              <a:rPr lang="en-US" sz="3200" dirty="0" smtClean="0">
+                <a:solidFill>
+                  <a:srgbClr val="2A00FF"/>
+                </a:solidFill>
+                <a:latin typeface="Courier New"/>
+              </a:rPr>
+              <a:t>"The number one"</a:t>
+            </a:r>
+            <a:r>
+              <a:rPr lang="en-US" sz="3200" dirty="0" smtClean="0">
+                <a:latin typeface="Courier New"/>
+              </a:rPr>
+              <a:t> must_== 1</a:t>
+            </a:r>
+            <a:endParaRPr lang="en-US" sz="3200" b="1" dirty="0" smtClean="0">
+              <a:solidFill>
+                <a:srgbClr val="7F0055"/>
+              </a:solidFill>
+              <a:latin typeface="Courier New"/>
+            </a:endParaRPr>
+          </a:p>
+        </p:txBody>
+      </p:sp>
+      <p:pic>
+        <p:nvPicPr>
+          <p:cNvPr id="74758" name="Picture 6" descr="film, film roll, media, picture, video icon"/>
+          <p:cNvPicPr>
+            <a:picLocks noChangeAspect="1" noChangeArrowheads="1"/>
+          </p:cNvPicPr>
+          <p:nvPr/>
+        </p:nvPicPr>
+        <p:blipFill>
+          <a:blip r:embed="rId4"/>
+          <a:srcRect b="25000"/>
+          <a:stretch>
+            <a:fillRect/>
+          </a:stretch>
+        </p:blipFill>
+        <p:spPr bwMode="auto">
+          <a:xfrm>
+            <a:off x="863600" y="1066800"/>
+            <a:ext cx="1828800" cy="1371600"/>
+          </a:xfrm>
+          <a:prstGeom prst="rect">
+            <a:avLst/>
+          </a:prstGeom>
+          <a:noFill/>
+        </p:spPr>
+      </p:pic>
+    </p:spTree>
+  </p:cSld>
+  <p:clrMapOvr>
+    <a:masterClrMapping/>
+  </p:clrMapOvr>
+  <p:transition>
+    <p:fade/>
+  </p:transition>
+  <p:timing>
+    <p:tnLst>
+      <p:par>
+        <p:cTn id="1" dur="indefinite" restart="never" nodeType="tmRoot">
+          <p:childTnLst>
+            <p:seq concurrent="1" nextAc="seek">
+              <p:cTn id="2" dur="indefinite" nodeType="mainSeq">
+                <p:childTnLst>
+                  <p:par>
+                    <p:cTn id="3" fill="hold">
+                      <p:stCondLst>
+                        <p:cond delay="indefinite"/>
+                        <p:cond evt="onBegin" delay="0">
+                          <p:tn val="2"/>
+                        </p:cond>
+                      </p:stCondLst>
+                      <p:childTnLst>
+                        <p:par>
+                          <p:cTn id="4" fill="hold">
+                            <p:stCondLst>
+                              <p:cond delay="0"/>
+                            </p:stCondLst>
+                            <p:childTnLst>
+                              <p:par>
+                                <p:cTn id="5" presetID="1" presetClass="entr" presetSubtype="0" fill="hold" nodeType="withEffect">
+                                  <p:stCondLst>
+                                    <p:cond delay="0"/>
+                                  </p:stCondLst>
+                                  <p:childTnLst>
+                                    <p:set>
+                                      <p:cBhvr>
+                                        <p:cTn id="6" dur="1" fill="hold">
+                                          <p:stCondLst>
+                                            <p:cond delay="0"/>
+                                          </p:stCondLst>
+                                        </p:cTn>
+                                        <p:tgtEl>
+                                          <p:spTgt spid="8"/>
+                                        </p:tgtEl>
+                                        <p:attrNameLst>
+                                          <p:attrName>style.visibility</p:attrName>
+                                        </p:attrNameLst>
+                                      </p:cBhvr>
+                                      <p:to>
+                                        <p:strVal val="visible"/>
+                                      </p:to>
+                                    </p:set>
+                                  </p:childTnLst>
+                                </p:cTn>
+                              </p:par>
+                            </p:childTnLst>
+                          </p:cTn>
+                        </p:par>
+                      </p:childTnLst>
+                    </p:cTn>
+                  </p:par>
+                </p:childTnLst>
+              </p:cTn>
+              <p:prevCondLst>
+                <p:cond evt="onPrev" delay="0">
+                  <p:tgtEl>
+                    <p:sldTgt/>
+                  </p:tgtEl>
+                </p:cond>
+              </p:prevCondLst>
+              <p:nextCondLst>
+                <p:cond evt="onNext" delay="0">
+                  <p:tgtEl>
+                    <p:sldTgt/>
+                  </p:tgtEl>
+                </p:cond>
+              </p:nextCondLst>
+            </p:seq>
+          </p:childTnLst>
+        </p:cTn>
       </p:par>
     </p:tnLst>
   </p:timing>

</xml_diff>

<commit_message>
added a variance example
</commit_message>
<xml_diff>
--- a/src/main/resources/oscon_2010_specs.pptx
+++ b/src/main/resources/oscon_2010_specs.pptx
@@ -6,7 +6,7 @@
     <p:sldMasterId id="2147483651" r:id="rId2"/>
   </p:sldMasterIdLst>
   <p:notesMasterIdLst>
-    <p:notesMasterId r:id="rId35"/>
+    <p:notesMasterId r:id="rId36"/>
   </p:notesMasterIdLst>
   <p:sldIdLst>
     <p:sldId id="258" r:id="rId3"/>
@@ -40,7 +40,8 @@
     <p:sldId id="286" r:id="rId31"/>
     <p:sldId id="288" r:id="rId32"/>
     <p:sldId id="289" r:id="rId33"/>
-    <p:sldId id="287" r:id="rId34"/>
+    <p:sldId id="290" r:id="rId34"/>
+    <p:sldId id="287" r:id="rId35"/>
   </p:sldIdLst>
   <p:sldSz cx="13004800" cy="9753600"/>
   <p:notesSz cx="6858000" cy="9144000"/>
@@ -2750,6 +2751,90 @@
               <a:rPr lang="en-US"/>
               <a:pPr/>
               <a:t>32</a:t>
+            </a:fld>
+            <a:endParaRPr lang="en-US"/>
+          </a:p>
+        </p:txBody>
+      </p:sp>
+      <p:sp>
+        <p:nvSpPr>
+          <p:cNvPr id="19458" name="Rectangle 2"/>
+          <p:cNvSpPr>
+            <a:spLocks noGrp="1" noRot="1" noChangeAspect="1" noChangeArrowheads="1" noTextEdit="1"/>
+          </p:cNvSpPr>
+          <p:nvPr>
+            <p:ph type="sldImg"/>
+          </p:nvPr>
+        </p:nvSpPr>
+        <p:spPr>
+          <a:ln/>
+        </p:spPr>
+      </p:sp>
+      <p:sp>
+        <p:nvSpPr>
+          <p:cNvPr id="19459" name="Rectangle 3"/>
+          <p:cNvSpPr>
+            <a:spLocks noGrp="1"/>
+          </p:cNvSpPr>
+          <p:nvPr>
+            <p:ph type="body" idx="1"/>
+          </p:nvPr>
+        </p:nvSpPr>
+        <p:spPr/>
+        <p:txBody>
+          <a:bodyPr/>
+          <a:lstStyle/>
+          <a:p>
+            <a:endParaRPr lang="en-US"/>
+          </a:p>
+        </p:txBody>
+      </p:sp>
+    </p:spTree>
+  </p:cSld>
+  <p:clrMapOvr>
+    <a:masterClrMapping/>
+  </p:clrMapOvr>
+</p:notes>
+</file>
+
+<file path=ppt/notesSlides/notesSlide33.xml><?xml version="1.0" encoding="utf-8"?>
+<p:notes xmlns:a="http://schemas.openxmlformats.org/drawingml/2006/main" xmlns:r="http://schemas.openxmlformats.org/officeDocument/2006/relationships" xmlns:p="http://schemas.openxmlformats.org/presentationml/2006/main">
+  <p:cSld>
+    <p:spTree>
+      <p:nvGrpSpPr>
+        <p:cNvPr id="1" name=""/>
+        <p:cNvGrpSpPr/>
+        <p:nvPr/>
+      </p:nvGrpSpPr>
+      <p:grpSpPr>
+        <a:xfrm>
+          <a:off x="0" y="0"/>
+          <a:ext cx="0" cy="0"/>
+          <a:chOff x="0" y="0"/>
+          <a:chExt cx="0" cy="0"/>
+        </a:xfrm>
+      </p:grpSpPr>
+      <p:sp>
+        <p:nvSpPr>
+          <p:cNvPr id="7" name="Rectangle 7"/>
+          <p:cNvSpPr>
+            <a:spLocks noGrp="1"/>
+          </p:cNvSpPr>
+          <p:nvPr>
+            <p:ph type="sldNum" sz="quarter" idx="5"/>
+          </p:nvPr>
+        </p:nvSpPr>
+        <p:spPr>
+          <a:ln/>
+        </p:spPr>
+        <p:txBody>
+          <a:bodyPr/>
+          <a:lstStyle/>
+          <a:p>
+            <a:fld id="{27AEA7DA-096A-4FB7-B4B3-D12717EF4BDD}" type="slidenum">
+              <a:rPr lang="en-US"/>
+              <a:pPr/>
+              <a:t>33</a:t>
             </a:fld>
             <a:endParaRPr lang="en-US"/>
           </a:p>
@@ -8187,7 +8272,7 @@
         </p:blipFill>
         <p:spPr bwMode="auto">
           <a:xfrm>
-            <a:off x="4597400" y="2667000"/>
+            <a:off x="4920662" y="2667000"/>
             <a:ext cx="2362200" cy="2362202"/>
           </a:xfrm>
           <a:prstGeom prst="rect">
@@ -8554,8 +8639,8 @@
         </p:nvSpPr>
         <p:spPr>
           <a:xfrm>
-            <a:off x="3911600" y="4724400"/>
-            <a:ext cx="3639138" cy="923330"/>
+            <a:off x="4234862" y="4724400"/>
+            <a:ext cx="3772186" cy="923330"/>
           </a:xfrm>
           <a:prstGeom prst="rect">
             <a:avLst/>
@@ -8569,7 +8654,7 @@
           <a:p>
             <a:pPr algn="ctr"/>
             <a:r>
-              <a:rPr lang="en-US" sz="5400" b="1" kern="0" dirty="0" err="1" smtClean="0">
+              <a:rPr lang="en-US" sz="5400" b="1" kern="0" dirty="0" smtClean="0">
                 <a:solidFill>
                   <a:srgbClr val="0C0F20"/>
                 </a:solidFill>
@@ -8577,7 +8662,7 @@
                 <a:cs typeface="+mj-cs"/>
                 <a:sym typeface="Arial" charset="0"/>
               </a:rPr>
-              <a:t>organise</a:t>
+              <a:t>organize</a:t>
             </a:r>
             <a:endParaRPr lang="en-US" dirty="0"/>
           </a:p>
@@ -17714,7 +17799,19 @@
               <a:rPr lang="en-US" sz="3200" b="1" dirty="0" smtClean="0">
                 <a:latin typeface="Courier New"/>
               </a:rPr>
-              <a:t> apply() = v</a:t>
+              <a:t> </a:t>
+            </a:r>
+            <a:r>
+              <a:rPr lang="en-US" sz="3200" b="1" dirty="0" smtClean="0">
+                <a:latin typeface="Courier New"/>
+              </a:rPr>
+              <a:t>get() </a:t>
+            </a:r>
+            <a:r>
+              <a:rPr lang="en-US" sz="3200" b="1" dirty="0" smtClean="0">
+                <a:latin typeface="Courier New"/>
+              </a:rPr>
+              <a:t>= v</a:t>
             </a:r>
           </a:p>
           <a:p>
@@ -17955,7 +18052,7 @@
                 <a:cs typeface="+mj-cs"/>
                 <a:sym typeface="Arial" charset="0"/>
               </a:rPr>
-              <a:t>varags</a:t>
+              <a:t>varargs</a:t>
             </a:r>
             <a:r>
               <a:rPr kumimoji="0" lang="en-US" sz="4400" b="1" i="0" u="none" strike="noStrike" kern="0" cap="none" spc="0" normalizeH="0" baseline="0" noProof="0" dirty="0" smtClean="0">
@@ -18083,6 +18180,816 @@
 </file>
 
 <file path=ppt/slides/slide32.xml><?xml version="1.0" encoding="utf-8"?>
+<p:sld xmlns:a="http://schemas.openxmlformats.org/drawingml/2006/main" xmlns:r="http://schemas.openxmlformats.org/officeDocument/2006/relationships" xmlns:p="http://schemas.openxmlformats.org/presentationml/2006/main">
+  <p:cSld>
+    <p:spTree>
+      <p:nvGrpSpPr>
+        <p:cNvPr id="1" name=""/>
+        <p:cNvGrpSpPr/>
+        <p:nvPr/>
+      </p:nvGrpSpPr>
+      <p:grpSpPr>
+        <a:xfrm>
+          <a:off x="0" y="0"/>
+          <a:ext cx="0" cy="0"/>
+          <a:chOff x="0" y="0"/>
+          <a:chExt cx="0" cy="0"/>
+        </a:xfrm>
+      </p:grpSpPr>
+      <p:sp>
+        <p:nvSpPr>
+          <p:cNvPr id="8193" name="Rectangle 1"/>
+          <p:cNvSpPr>
+            <a:spLocks noGrp="1" noChangeArrowheads="1"/>
+          </p:cNvSpPr>
+          <p:nvPr>
+            <p:ph type="title"/>
+          </p:nvPr>
+        </p:nvSpPr>
+        <p:spPr>
+          <a:xfrm>
+            <a:off x="711200" y="0"/>
+            <a:ext cx="12509500" cy="914400"/>
+          </a:xfrm>
+          <a:ln/>
+        </p:spPr>
+        <p:txBody>
+          <a:bodyPr/>
+          <a:lstStyle/>
+          <a:p>
+            <a:pPr lvl="0"/>
+            <a:r>
+              <a:rPr lang="en-US" sz="5400" dirty="0" smtClean="0">
+                <a:latin typeface="Lucida Handwriting" pitchFamily="66" charset="0"/>
+              </a:rPr>
+              <a:t>     </a:t>
+            </a:r>
+            <a:r>
+              <a:rPr lang="en-US" sz="5400" dirty="0" smtClean="0">
+                <a:latin typeface="Lucida Handwriting" pitchFamily="66" charset="0"/>
+              </a:rPr>
+              <a:t>DSL</a:t>
+            </a:r>
+            <a:endParaRPr lang="en-US" dirty="0"/>
+          </a:p>
+        </p:txBody>
+      </p:sp>
+      <p:sp>
+        <p:nvSpPr>
+          <p:cNvPr id="7" name="Rectangle 6"/>
+          <p:cNvSpPr/>
+          <p:nvPr/>
+        </p:nvSpPr>
+        <p:spPr>
+          <a:xfrm>
+            <a:off x="2997200" y="1438870"/>
+            <a:ext cx="3789820" cy="923330"/>
+          </a:xfrm>
+          <a:prstGeom prst="rect">
+            <a:avLst/>
+          </a:prstGeom>
+        </p:spPr>
+        <p:txBody>
+          <a:bodyPr wrap="none">
+            <a:spAutoFit/>
+          </a:bodyPr>
+          <a:lstStyle/>
+          <a:p>
+            <a:pPr algn="ctr"/>
+            <a:r>
+              <a:rPr lang="en-US" sz="5400" b="1" kern="0" dirty="0" smtClean="0">
+                <a:solidFill>
+                  <a:srgbClr val="00CC66"/>
+                </a:solidFill>
+                <a:latin typeface="Lucida Handwriting" pitchFamily="66" charset="0"/>
+                <a:cs typeface="+mj-cs"/>
+                <a:sym typeface="Arial" charset="0"/>
+              </a:rPr>
+              <a:t>Variance</a:t>
+            </a:r>
+          </a:p>
+        </p:txBody>
+      </p:sp>
+      <p:pic>
+        <p:nvPicPr>
+          <p:cNvPr id="8" name="Picture 10" descr="http://knowledgehub.zeus.com/media/Scala_Logo2008.png"/>
+          <p:cNvPicPr>
+            <a:picLocks noChangeAspect="1" noChangeArrowheads="1"/>
+          </p:cNvPicPr>
+          <p:nvPr/>
+        </p:nvPicPr>
+        <p:blipFill>
+          <a:blip r:embed="rId3"/>
+          <a:srcRect/>
+          <a:stretch>
+            <a:fillRect/>
+          </a:stretch>
+        </p:blipFill>
+        <p:spPr bwMode="auto">
+          <a:xfrm>
+            <a:off x="4140200" y="76200"/>
+            <a:ext cx="2279542" cy="679257"/>
+          </a:xfrm>
+          <a:prstGeom prst="rect">
+            <a:avLst/>
+          </a:prstGeom>
+          <a:noFill/>
+        </p:spPr>
+      </p:pic>
+      <p:sp>
+        <p:nvSpPr>
+          <p:cNvPr id="11" name="Rectangle 10"/>
+          <p:cNvSpPr/>
+          <p:nvPr/>
+        </p:nvSpPr>
+        <p:spPr>
+          <a:xfrm>
+            <a:off x="330200" y="2590800"/>
+            <a:ext cx="12344400" cy="6001643"/>
+          </a:xfrm>
+          <a:prstGeom prst="rect">
+            <a:avLst/>
+          </a:prstGeom>
+          <a:solidFill>
+            <a:schemeClr val="bg1"/>
+          </a:solidFill>
+          <a:ln>
+            <a:solidFill>
+              <a:schemeClr val="tx1"/>
+            </a:solidFill>
+            <a:prstDash val="dash"/>
+          </a:ln>
+        </p:spPr>
+        <p:txBody>
+          <a:bodyPr wrap="square">
+            <a:spAutoFit/>
+          </a:bodyPr>
+          <a:lstStyle/>
+          <a:p>
+            <a:r>
+              <a:rPr lang="en-US" sz="3200" b="1" dirty="0" smtClean="0">
+                <a:solidFill>
+                  <a:srgbClr val="7F0055"/>
+                </a:solidFill>
+                <a:latin typeface="Courier New"/>
+              </a:rPr>
+              <a:t>trait</a:t>
+            </a:r>
+            <a:r>
+              <a:rPr lang="en-US" sz="3200" b="1" dirty="0" smtClean="0">
+                <a:latin typeface="Courier New"/>
+              </a:rPr>
+              <a:t> Matcher[-T] { </a:t>
+            </a:r>
+            <a:r>
+              <a:rPr lang="en-US" sz="3200" b="1" dirty="0" smtClean="0">
+                <a:solidFill>
+                  <a:srgbClr val="7F0055"/>
+                </a:solidFill>
+                <a:latin typeface="Courier New"/>
+              </a:rPr>
+              <a:t>def</a:t>
+            </a:r>
+            <a:r>
+              <a:rPr lang="en-US" sz="3200" b="1" dirty="0" smtClean="0">
+                <a:latin typeface="Courier New"/>
+              </a:rPr>
+              <a:t> apply(y: =&gt;T): </a:t>
+            </a:r>
+            <a:r>
+              <a:rPr lang="en-US" sz="3200" b="1" dirty="0" smtClean="0">
+                <a:solidFill>
+                  <a:srgbClr val="7F0055"/>
+                </a:solidFill>
+                <a:latin typeface="Courier New"/>
+              </a:rPr>
+              <a:t>Boolean</a:t>
+            </a:r>
+            <a:r>
+              <a:rPr lang="en-US" sz="3200" b="1" dirty="0" smtClean="0">
+                <a:latin typeface="Courier New"/>
+              </a:rPr>
+              <a:t> }</a:t>
+            </a:r>
+          </a:p>
+          <a:p>
+            <a:r>
+              <a:rPr lang="en-US" sz="3200" b="1" dirty="0" smtClean="0">
+                <a:solidFill>
+                  <a:srgbClr val="7F0055"/>
+                </a:solidFill>
+                <a:latin typeface="Courier New"/>
+              </a:rPr>
+              <a:t>class</a:t>
+            </a:r>
+            <a:r>
+              <a:rPr lang="en-US" sz="3200" b="1" dirty="0" smtClean="0">
+                <a:latin typeface="Courier New"/>
+              </a:rPr>
+              <a:t> </a:t>
+            </a:r>
+            <a:r>
+              <a:rPr lang="en-US" sz="3200" b="1" dirty="0" err="1" smtClean="0">
+                <a:latin typeface="Courier New"/>
+              </a:rPr>
+              <a:t>EqualMatcher</a:t>
+            </a:r>
+            <a:r>
+              <a:rPr lang="en-US" sz="3200" b="1" dirty="0" smtClean="0">
+                <a:latin typeface="Courier New"/>
+              </a:rPr>
+              <a:t>(x: </a:t>
+            </a:r>
+            <a:r>
+              <a:rPr lang="en-US" sz="3200" b="1" dirty="0" smtClean="0">
+                <a:solidFill>
+                  <a:srgbClr val="7F0055"/>
+                </a:solidFill>
+                <a:latin typeface="Courier New"/>
+              </a:rPr>
+              <a:t>Any</a:t>
+            </a:r>
+            <a:r>
+              <a:rPr lang="en-US" sz="3200" b="1" dirty="0" smtClean="0">
+                <a:latin typeface="Courier New"/>
+              </a:rPr>
+              <a:t>) </a:t>
+            </a:r>
+            <a:r>
+              <a:rPr lang="en-US" sz="3200" b="1" dirty="0" smtClean="0">
+                <a:solidFill>
+                  <a:srgbClr val="7F0055"/>
+                </a:solidFill>
+                <a:latin typeface="Courier New"/>
+              </a:rPr>
+              <a:t>extends</a:t>
+            </a:r>
+            <a:r>
+              <a:rPr lang="en-US" sz="3200" b="1" dirty="0" smtClean="0">
+                <a:latin typeface="Courier New"/>
+              </a:rPr>
+              <a:t> Matcher[</a:t>
+            </a:r>
+            <a:r>
+              <a:rPr lang="en-US" sz="3200" b="1" dirty="0" smtClean="0">
+                <a:solidFill>
+                  <a:srgbClr val="7F0055"/>
+                </a:solidFill>
+                <a:latin typeface="Courier New"/>
+              </a:rPr>
+              <a:t>Any</a:t>
+            </a:r>
+            <a:r>
+              <a:rPr lang="en-US" sz="3200" b="1" dirty="0" smtClean="0">
+                <a:latin typeface="Courier New"/>
+              </a:rPr>
+              <a:t>] { </a:t>
+            </a:r>
+          </a:p>
+          <a:p>
+            <a:r>
+              <a:rPr lang="en-US" sz="3200" b="1" dirty="0" smtClean="0">
+                <a:solidFill>
+                  <a:srgbClr val="7F0055"/>
+                </a:solidFill>
+                <a:latin typeface="Courier New"/>
+              </a:rPr>
+              <a:t>  def</a:t>
+            </a:r>
+            <a:r>
+              <a:rPr lang="en-US" sz="3200" b="1" dirty="0" smtClean="0">
+                <a:latin typeface="Courier New"/>
+              </a:rPr>
+              <a:t> </a:t>
+            </a:r>
+            <a:r>
+              <a:rPr lang="en-US" sz="3200" b="1" dirty="0" smtClean="0">
+                <a:latin typeface="Courier New"/>
+              </a:rPr>
+              <a:t>apply(y: =&gt;</a:t>
+            </a:r>
+            <a:r>
+              <a:rPr lang="en-US" sz="3200" b="1" dirty="0" smtClean="0">
+                <a:solidFill>
+                  <a:srgbClr val="7F0055"/>
+                </a:solidFill>
+                <a:latin typeface="Courier New"/>
+              </a:rPr>
+              <a:t>Any</a:t>
+            </a:r>
+            <a:r>
+              <a:rPr lang="en-US" sz="3200" b="1" dirty="0" smtClean="0">
+                <a:latin typeface="Courier New"/>
+              </a:rPr>
+              <a:t>) = x == y</a:t>
+            </a:r>
+          </a:p>
+          <a:p>
+            <a:r>
+              <a:rPr lang="en-US" sz="3200" dirty="0" smtClean="0">
+                <a:latin typeface="Courier New"/>
+              </a:rPr>
+              <a:t>}</a:t>
+            </a:r>
+            <a:endParaRPr lang="en-US" sz="3200" dirty="0" smtClean="0">
+              <a:latin typeface="Courier New"/>
+            </a:endParaRPr>
+          </a:p>
+          <a:p>
+            <a:r>
+              <a:rPr lang="en-US" sz="3200" b="1" dirty="0" smtClean="0">
+                <a:solidFill>
+                  <a:srgbClr val="7F0055"/>
+                </a:solidFill>
+                <a:latin typeface="Courier New"/>
+              </a:rPr>
+              <a:t>class</a:t>
+            </a:r>
+            <a:r>
+              <a:rPr lang="en-US" sz="3200" b="1" dirty="0" smtClean="0">
+                <a:latin typeface="Courier New"/>
+              </a:rPr>
+              <a:t> </a:t>
+            </a:r>
+            <a:r>
+              <a:rPr lang="en-US" sz="3200" b="1" dirty="0" err="1" smtClean="0">
+                <a:latin typeface="Courier New"/>
+              </a:rPr>
+              <a:t>HelloMatcher</a:t>
+            </a:r>
+            <a:r>
+              <a:rPr lang="en-US" sz="3200" b="1" dirty="0" smtClean="0">
+                <a:latin typeface="Courier New"/>
+              </a:rPr>
+              <a:t> </a:t>
+            </a:r>
+            <a:r>
+              <a:rPr lang="en-US" sz="3200" b="1" dirty="0" smtClean="0">
+                <a:solidFill>
+                  <a:srgbClr val="7F0055"/>
+                </a:solidFill>
+                <a:latin typeface="Courier New"/>
+              </a:rPr>
+              <a:t>extends</a:t>
+            </a:r>
+            <a:r>
+              <a:rPr lang="en-US" sz="3200" b="1" dirty="0" smtClean="0">
+                <a:latin typeface="Courier New"/>
+              </a:rPr>
+              <a:t> Matcher[String] { </a:t>
+            </a:r>
+          </a:p>
+          <a:p>
+            <a:r>
+              <a:rPr lang="en-US" sz="3200" b="1" dirty="0" smtClean="0">
+                <a:solidFill>
+                  <a:srgbClr val="7F0055"/>
+                </a:solidFill>
+                <a:latin typeface="Courier New"/>
+              </a:rPr>
+              <a:t>  def</a:t>
+            </a:r>
+            <a:r>
+              <a:rPr lang="en-US" sz="3200" b="1" dirty="0" smtClean="0">
+                <a:latin typeface="Courier New"/>
+              </a:rPr>
+              <a:t> </a:t>
+            </a:r>
+            <a:r>
+              <a:rPr lang="en-US" sz="3200" b="1" dirty="0" smtClean="0">
+                <a:latin typeface="Courier New"/>
+              </a:rPr>
+              <a:t>apply(x: =&gt;String) = x == </a:t>
+            </a:r>
+            <a:r>
+              <a:rPr lang="en-US" sz="3200" b="1" dirty="0" smtClean="0">
+                <a:solidFill>
+                  <a:srgbClr val="2A00FF"/>
+                </a:solidFill>
+                <a:latin typeface="Courier New"/>
+              </a:rPr>
+              <a:t>"hello"</a:t>
+            </a:r>
+          </a:p>
+          <a:p>
+            <a:r>
+              <a:rPr lang="en-US" sz="3200" dirty="0" smtClean="0">
+                <a:latin typeface="Courier New"/>
+              </a:rPr>
+              <a:t>}</a:t>
+            </a:r>
+            <a:endParaRPr lang="en-US" sz="3200" dirty="0" smtClean="0">
+              <a:latin typeface="Courier New"/>
+            </a:endParaRPr>
+          </a:p>
+          <a:p>
+            <a:r>
+              <a:rPr lang="en-US" sz="3200" b="1" dirty="0" err="1" smtClean="0">
+                <a:solidFill>
+                  <a:srgbClr val="7F0055"/>
+                </a:solidFill>
+                <a:latin typeface="Courier New"/>
+              </a:rPr>
+              <a:t>val</a:t>
+            </a:r>
+            <a:r>
+              <a:rPr lang="en-US" sz="3200" b="1" dirty="0" smtClean="0">
+                <a:latin typeface="Courier New"/>
+              </a:rPr>
+              <a:t> </a:t>
+            </a:r>
+            <a:r>
+              <a:rPr lang="en-US" sz="3200" b="1" dirty="0" err="1" smtClean="0">
+                <a:latin typeface="Courier New"/>
+              </a:rPr>
+              <a:t>beHello</a:t>
+            </a:r>
+            <a:r>
+              <a:rPr lang="en-US" sz="3200" b="1" dirty="0" smtClean="0">
+                <a:latin typeface="Courier New"/>
+              </a:rPr>
+              <a:t> = </a:t>
+            </a:r>
+            <a:r>
+              <a:rPr lang="en-US" sz="3200" b="1" dirty="0" smtClean="0">
+                <a:solidFill>
+                  <a:srgbClr val="7F0055"/>
+                </a:solidFill>
+                <a:latin typeface="Courier New"/>
+              </a:rPr>
+              <a:t>new</a:t>
+            </a:r>
+            <a:r>
+              <a:rPr lang="en-US" sz="3200" b="1" dirty="0" smtClean="0">
+                <a:latin typeface="Courier New"/>
+              </a:rPr>
+              <a:t> </a:t>
+            </a:r>
+            <a:r>
+              <a:rPr lang="en-US" sz="3200" b="1" dirty="0" err="1" smtClean="0">
+                <a:latin typeface="Courier New"/>
+              </a:rPr>
+              <a:t>HelloMatcher</a:t>
+            </a:r>
+            <a:endParaRPr lang="en-US" sz="3200" b="1" dirty="0" smtClean="0">
+              <a:latin typeface="Courier New"/>
+            </a:endParaRPr>
+          </a:p>
+          <a:p>
+            <a:r>
+              <a:rPr lang="en-US" sz="3200" b="1" dirty="0" err="1" smtClean="0">
+                <a:solidFill>
+                  <a:srgbClr val="7F0055"/>
+                </a:solidFill>
+                <a:latin typeface="Courier New"/>
+              </a:rPr>
+              <a:t>val</a:t>
+            </a:r>
+            <a:r>
+              <a:rPr lang="en-US" sz="3200" b="1" dirty="0" smtClean="0">
+                <a:latin typeface="Courier New"/>
+              </a:rPr>
+              <a:t> </a:t>
+            </a:r>
+            <a:r>
+              <a:rPr lang="en-US" sz="3200" b="1" dirty="0" err="1" smtClean="0">
+                <a:latin typeface="Courier New"/>
+              </a:rPr>
+              <a:t>equalToHello</a:t>
+            </a:r>
+            <a:r>
+              <a:rPr lang="en-US" sz="3200" b="1" dirty="0" smtClean="0">
+                <a:latin typeface="Courier New"/>
+              </a:rPr>
+              <a:t> = </a:t>
+            </a:r>
+            <a:r>
+              <a:rPr lang="en-US" sz="3200" b="1" dirty="0" smtClean="0">
+                <a:solidFill>
+                  <a:srgbClr val="7F0055"/>
+                </a:solidFill>
+                <a:latin typeface="Courier New"/>
+              </a:rPr>
+              <a:t>new</a:t>
+            </a:r>
+            <a:r>
+              <a:rPr lang="en-US" sz="3200" b="1" dirty="0" smtClean="0">
+                <a:latin typeface="Courier New"/>
+              </a:rPr>
+              <a:t> </a:t>
+            </a:r>
+            <a:r>
+              <a:rPr lang="en-US" sz="3200" b="1" dirty="0" err="1" smtClean="0">
+                <a:latin typeface="Courier New"/>
+              </a:rPr>
+              <a:t>EqualMatcher</a:t>
+            </a:r>
+            <a:r>
+              <a:rPr lang="en-US" sz="3200" b="1" dirty="0" smtClean="0">
+                <a:latin typeface="Courier New"/>
+              </a:rPr>
+              <a:t>(</a:t>
+            </a:r>
+            <a:r>
+              <a:rPr lang="en-US" sz="3200" b="1" dirty="0" smtClean="0">
+                <a:solidFill>
+                  <a:srgbClr val="2A00FF"/>
+                </a:solidFill>
+                <a:latin typeface="Courier New"/>
+              </a:rPr>
+              <a:t>"hello"</a:t>
+            </a:r>
+            <a:r>
+              <a:rPr lang="en-US" sz="3200" b="1" dirty="0" smtClean="0">
+                <a:latin typeface="Courier New"/>
+              </a:rPr>
+              <a:t>)</a:t>
+            </a:r>
+          </a:p>
+          <a:p>
+            <a:endParaRPr lang="en-US" sz="3200" dirty="0" smtClean="0">
+              <a:latin typeface="Courier New"/>
+            </a:endParaRPr>
+          </a:p>
+          <a:p>
+            <a:r>
+              <a:rPr lang="en-US" sz="3200" dirty="0" smtClean="0">
+                <a:solidFill>
+                  <a:srgbClr val="2A00FF"/>
+                </a:solidFill>
+                <a:latin typeface="Courier New"/>
+              </a:rPr>
+              <a:t>"</a:t>
+            </a:r>
+            <a:r>
+              <a:rPr lang="en-US" sz="3200" dirty="0" smtClean="0">
+                <a:solidFill>
+                  <a:srgbClr val="2A00FF"/>
+                </a:solidFill>
+                <a:latin typeface="Courier New"/>
+              </a:rPr>
+              <a:t>hello"</a:t>
+            </a:r>
+            <a:r>
+              <a:rPr lang="en-US" sz="3200" dirty="0" smtClean="0">
+                <a:latin typeface="Courier New"/>
+              </a:rPr>
+              <a:t> must </a:t>
+            </a:r>
+            <a:r>
+              <a:rPr lang="en-US" sz="3200" dirty="0" err="1" smtClean="0">
+                <a:latin typeface="Courier New"/>
+              </a:rPr>
+              <a:t>beHello</a:t>
+            </a:r>
+            <a:endParaRPr lang="en-US" sz="3200" dirty="0" smtClean="0">
+              <a:latin typeface="Courier New"/>
+            </a:endParaRPr>
+          </a:p>
+          <a:p>
+            <a:r>
+              <a:rPr lang="en-US" sz="3200" dirty="0" smtClean="0">
+                <a:solidFill>
+                  <a:srgbClr val="2A00FF"/>
+                </a:solidFill>
+                <a:latin typeface="Courier New"/>
+              </a:rPr>
+              <a:t>"</a:t>
+            </a:r>
+            <a:r>
+              <a:rPr lang="en-US" sz="3200" dirty="0" smtClean="0">
+                <a:solidFill>
+                  <a:srgbClr val="2A00FF"/>
+                </a:solidFill>
+                <a:latin typeface="Courier New"/>
+              </a:rPr>
+              <a:t>hello"</a:t>
+            </a:r>
+            <a:r>
+              <a:rPr lang="en-US" sz="3200" dirty="0" smtClean="0">
+                <a:latin typeface="Courier New"/>
+              </a:rPr>
+              <a:t> must </a:t>
+            </a:r>
+            <a:r>
+              <a:rPr lang="en-US" sz="3200" dirty="0" err="1" smtClean="0">
+                <a:latin typeface="Courier New"/>
+              </a:rPr>
+              <a:t>equalToHello</a:t>
+            </a:r>
+            <a:endParaRPr lang="en-US" sz="3200" b="1" dirty="0" smtClean="0">
+              <a:solidFill>
+                <a:srgbClr val="7F0055"/>
+              </a:solidFill>
+              <a:latin typeface="Courier New"/>
+            </a:endParaRPr>
+          </a:p>
+        </p:txBody>
+      </p:sp>
+      <p:pic>
+        <p:nvPicPr>
+          <p:cNvPr id="70662" name="Picture 6" descr="magic, wizard icon"/>
+          <p:cNvPicPr>
+            <a:picLocks noChangeAspect="1" noChangeArrowheads="1"/>
+          </p:cNvPicPr>
+          <p:nvPr/>
+        </p:nvPicPr>
+        <p:blipFill>
+          <a:blip r:embed="rId4"/>
+          <a:srcRect/>
+          <a:stretch>
+            <a:fillRect/>
+          </a:stretch>
+        </p:blipFill>
+        <p:spPr bwMode="auto">
+          <a:xfrm>
+            <a:off x="635000" y="1143000"/>
+            <a:ext cx="1295400" cy="1295401"/>
+          </a:xfrm>
+          <a:prstGeom prst="rect">
+            <a:avLst/>
+          </a:prstGeom>
+          <a:noFill/>
+        </p:spPr>
+      </p:pic>
+      <p:sp>
+        <p:nvSpPr>
+          <p:cNvPr id="9" name="Rectangle 1"/>
+          <p:cNvSpPr txBox="1">
+            <a:spLocks noChangeArrowheads="1"/>
+          </p:cNvSpPr>
+          <p:nvPr/>
+        </p:nvSpPr>
+        <p:spPr bwMode="auto">
+          <a:xfrm>
+            <a:off x="5283200" y="1600200"/>
+            <a:ext cx="7086600" cy="685800"/>
+          </a:xfrm>
+          <a:prstGeom prst="rect">
+            <a:avLst/>
+          </a:prstGeom>
+          <a:noFill/>
+          <a:ln w="12700">
+            <a:noFill/>
+            <a:miter lim="800000"/>
+            <a:headEnd/>
+            <a:tailEnd/>
+          </a:ln>
+          <a:effectLst/>
+        </p:spPr>
+        <p:txBody>
+          <a:bodyPr vert="horz" wrap="square" lIns="50800" tIns="50800" rIns="50800" bIns="50800" numCol="1" anchor="ctr" anchorCtr="0" compatLnSpc="1">
+            <a:prstTxWarp prst="textNoShape">
+              <a:avLst/>
+            </a:prstTxWarp>
+          </a:bodyPr>
+          <a:lstStyle/>
+          <a:p>
+            <a:pPr lvl="0" algn="r"/>
+            <a:r>
+              <a:rPr kumimoji="0" lang="en-US" sz="4400" b="1" i="0" u="none" strike="noStrike" kern="0" cap="none" spc="0" normalizeH="0" baseline="0" noProof="0" dirty="0" smtClean="0">
+                <a:ln>
+                  <a:noFill/>
+                </a:ln>
+                <a:solidFill>
+                  <a:srgbClr val="FF0000"/>
+                </a:solidFill>
+                <a:effectLst/>
+                <a:uLnTx/>
+                <a:uFillTx/>
+                <a:latin typeface="Candara" pitchFamily="34" charset="0"/>
+                <a:ea typeface="+mj-ea"/>
+                <a:cs typeface="+mj-cs"/>
+                <a:sym typeface="Wingdings"/>
+              </a:rPr>
+              <a:t></a:t>
+            </a:r>
+            <a:r>
+              <a:rPr kumimoji="0" lang="en-US" sz="4400" b="1" i="0" u="none" strike="noStrike" kern="0" cap="none" spc="0" normalizeH="0" baseline="0" noProof="0" dirty="0" smtClean="0">
+                <a:ln>
+                  <a:noFill/>
+                </a:ln>
+                <a:solidFill>
+                  <a:srgbClr val="FF0000"/>
+                </a:solidFill>
+                <a:effectLst/>
+                <a:uLnTx/>
+                <a:uFillTx/>
+                <a:latin typeface="Candara" pitchFamily="34" charset="0"/>
+                <a:ea typeface="+mj-ea"/>
+                <a:cs typeface="+mj-cs"/>
+                <a:sym typeface="Arial" charset="0"/>
+              </a:rPr>
+              <a:t> Know the rules!</a:t>
+            </a:r>
+            <a:endParaRPr kumimoji="0" lang="en-US" sz="4400" b="1" i="0" u="none" strike="noStrike" kern="0" cap="none" spc="0" normalizeH="0" baseline="0" noProof="0" dirty="0">
+              <a:ln>
+                <a:noFill/>
+              </a:ln>
+              <a:solidFill>
+                <a:srgbClr val="E75145"/>
+              </a:solidFill>
+              <a:effectLst/>
+              <a:uLnTx/>
+              <a:uFillTx/>
+              <a:latin typeface="Candara" pitchFamily="34" charset="0"/>
+              <a:ea typeface="+mj-ea"/>
+              <a:cs typeface="+mj-cs"/>
+              <a:sym typeface="Arial" charset="0"/>
+            </a:endParaRPr>
+          </a:p>
+        </p:txBody>
+      </p:sp>
+    </p:spTree>
+  </p:cSld>
+  <p:clrMapOvr>
+    <a:masterClrMapping/>
+  </p:clrMapOvr>
+  <p:transition>
+    <p:fade/>
+  </p:transition>
+  <p:timing>
+    <p:tnLst>
+      <p:par>
+        <p:cTn id="1" dur="indefinite" restart="never" nodeType="tmRoot">
+          <p:childTnLst>
+            <p:seq concurrent="1" nextAc="seek">
+              <p:cTn id="2" dur="indefinite" nodeType="mainSeq">
+                <p:childTnLst>
+                  <p:par>
+                    <p:cTn id="3" fill="hold">
+                      <p:stCondLst>
+                        <p:cond delay="indefinite"/>
+                        <p:cond evt="onBegin" delay="0">
+                          <p:tn val="2"/>
+                        </p:cond>
+                      </p:stCondLst>
+                      <p:childTnLst>
+                        <p:par>
+                          <p:cTn id="4" fill="hold">
+                            <p:stCondLst>
+                              <p:cond delay="0"/>
+                            </p:stCondLst>
+                            <p:childTnLst>
+                              <p:par>
+                                <p:cTn id="5" presetID="1" presetClass="entr" presetSubtype="0" fill="hold" nodeType="withEffect">
+                                  <p:stCondLst>
+                                    <p:cond delay="0"/>
+                                  </p:stCondLst>
+                                  <p:childTnLst>
+                                    <p:set>
+                                      <p:cBhvr>
+                                        <p:cTn id="6" dur="1" fill="hold">
+                                          <p:stCondLst>
+                                            <p:cond delay="0"/>
+                                          </p:stCondLst>
+                                        </p:cTn>
+                                        <p:tgtEl>
+                                          <p:spTgt spid="8"/>
+                                        </p:tgtEl>
+                                        <p:attrNameLst>
+                                          <p:attrName>style.visibility</p:attrName>
+                                        </p:attrNameLst>
+                                      </p:cBhvr>
+                                      <p:to>
+                                        <p:strVal val="visible"/>
+                                      </p:to>
+                                    </p:set>
+                                  </p:childTnLst>
+                                </p:cTn>
+                              </p:par>
+                            </p:childTnLst>
+                          </p:cTn>
+                        </p:par>
+                      </p:childTnLst>
+                    </p:cTn>
+                  </p:par>
+                </p:childTnLst>
+              </p:cTn>
+              <p:prevCondLst>
+                <p:cond evt="onPrev" delay="0">
+                  <p:tgtEl>
+                    <p:sldTgt/>
+                  </p:tgtEl>
+                </p:cond>
+              </p:prevCondLst>
+              <p:nextCondLst>
+                <p:cond evt="onNext" delay="0">
+                  <p:tgtEl>
+                    <p:sldTgt/>
+                  </p:tgtEl>
+                </p:cond>
+              </p:nextCondLst>
+            </p:seq>
+          </p:childTnLst>
+        </p:cTn>
+      </p:par>
+    </p:tnLst>
+  </p:timing>
+</p:sld>
+</file>
+
+<file path=ppt/slides/slide33.xml><?xml version="1.0" encoding="utf-8"?>
 <p:sld xmlns:a="http://schemas.openxmlformats.org/drawingml/2006/main" xmlns:r="http://schemas.openxmlformats.org/officeDocument/2006/relationships" xmlns:p="http://schemas.openxmlformats.org/presentationml/2006/main">
   <p:cSld>
     <p:spTree>

</xml_diff>

<commit_message>
added datatables and operators
</commit_message>
<xml_diff>
--- a/src/main/resources/oscon_2010_specs.pptx
+++ b/src/main/resources/oscon_2010_specs.pptx
@@ -6,7 +6,7 @@
     <p:sldMasterId id="2147483651" r:id="rId2"/>
   </p:sldMasterIdLst>
   <p:notesMasterIdLst>
-    <p:notesMasterId r:id="rId36"/>
+    <p:notesMasterId r:id="rId39"/>
   </p:notesMasterIdLst>
   <p:sldIdLst>
     <p:sldId id="258" r:id="rId3"/>
@@ -42,6 +42,9 @@
     <p:sldId id="289" r:id="rId33"/>
     <p:sldId id="290" r:id="rId34"/>
     <p:sldId id="287" r:id="rId35"/>
+    <p:sldId id="291" r:id="rId36"/>
+    <p:sldId id="292" r:id="rId37"/>
+    <p:sldId id="293" r:id="rId38"/>
   </p:sldIdLst>
   <p:sldSz cx="13004800" cy="9753600"/>
   <p:notesSz cx="6858000" cy="9144000"/>
@@ -2835,6 +2838,258 @@
               <a:rPr lang="en-US"/>
               <a:pPr/>
               <a:t>33</a:t>
+            </a:fld>
+            <a:endParaRPr lang="en-US"/>
+          </a:p>
+        </p:txBody>
+      </p:sp>
+      <p:sp>
+        <p:nvSpPr>
+          <p:cNvPr id="19458" name="Rectangle 2"/>
+          <p:cNvSpPr>
+            <a:spLocks noGrp="1" noRot="1" noChangeAspect="1" noChangeArrowheads="1" noTextEdit="1"/>
+          </p:cNvSpPr>
+          <p:nvPr>
+            <p:ph type="sldImg"/>
+          </p:nvPr>
+        </p:nvSpPr>
+        <p:spPr>
+          <a:ln/>
+        </p:spPr>
+      </p:sp>
+      <p:sp>
+        <p:nvSpPr>
+          <p:cNvPr id="19459" name="Rectangle 3"/>
+          <p:cNvSpPr>
+            <a:spLocks noGrp="1"/>
+          </p:cNvSpPr>
+          <p:nvPr>
+            <p:ph type="body" idx="1"/>
+          </p:nvPr>
+        </p:nvSpPr>
+        <p:spPr/>
+        <p:txBody>
+          <a:bodyPr/>
+          <a:lstStyle/>
+          <a:p>
+            <a:endParaRPr lang="en-US"/>
+          </a:p>
+        </p:txBody>
+      </p:sp>
+    </p:spTree>
+  </p:cSld>
+  <p:clrMapOvr>
+    <a:masterClrMapping/>
+  </p:clrMapOvr>
+</p:notes>
+</file>
+
+<file path=ppt/notesSlides/notesSlide34.xml><?xml version="1.0" encoding="utf-8"?>
+<p:notes xmlns:a="http://schemas.openxmlformats.org/drawingml/2006/main" xmlns:r="http://schemas.openxmlformats.org/officeDocument/2006/relationships" xmlns:p="http://schemas.openxmlformats.org/presentationml/2006/main">
+  <p:cSld>
+    <p:spTree>
+      <p:nvGrpSpPr>
+        <p:cNvPr id="1" name=""/>
+        <p:cNvGrpSpPr/>
+        <p:nvPr/>
+      </p:nvGrpSpPr>
+      <p:grpSpPr>
+        <a:xfrm>
+          <a:off x="0" y="0"/>
+          <a:ext cx="0" cy="0"/>
+          <a:chOff x="0" y="0"/>
+          <a:chExt cx="0" cy="0"/>
+        </a:xfrm>
+      </p:grpSpPr>
+      <p:sp>
+        <p:nvSpPr>
+          <p:cNvPr id="7" name="Rectangle 7"/>
+          <p:cNvSpPr>
+            <a:spLocks noGrp="1"/>
+          </p:cNvSpPr>
+          <p:nvPr>
+            <p:ph type="sldNum" sz="quarter" idx="5"/>
+          </p:nvPr>
+        </p:nvSpPr>
+        <p:spPr>
+          <a:ln/>
+        </p:spPr>
+        <p:txBody>
+          <a:bodyPr/>
+          <a:lstStyle/>
+          <a:p>
+            <a:fld id="{27AEA7DA-096A-4FB7-B4B3-D12717EF4BDD}" type="slidenum">
+              <a:rPr lang="en-US"/>
+              <a:pPr/>
+              <a:t>34</a:t>
+            </a:fld>
+            <a:endParaRPr lang="en-US"/>
+          </a:p>
+        </p:txBody>
+      </p:sp>
+      <p:sp>
+        <p:nvSpPr>
+          <p:cNvPr id="19458" name="Rectangle 2"/>
+          <p:cNvSpPr>
+            <a:spLocks noGrp="1" noRot="1" noChangeAspect="1" noChangeArrowheads="1" noTextEdit="1"/>
+          </p:cNvSpPr>
+          <p:nvPr>
+            <p:ph type="sldImg"/>
+          </p:nvPr>
+        </p:nvSpPr>
+        <p:spPr>
+          <a:ln/>
+        </p:spPr>
+      </p:sp>
+      <p:sp>
+        <p:nvSpPr>
+          <p:cNvPr id="19459" name="Rectangle 3"/>
+          <p:cNvSpPr>
+            <a:spLocks noGrp="1"/>
+          </p:cNvSpPr>
+          <p:nvPr>
+            <p:ph type="body" idx="1"/>
+          </p:nvPr>
+        </p:nvSpPr>
+        <p:spPr/>
+        <p:txBody>
+          <a:bodyPr/>
+          <a:lstStyle/>
+          <a:p>
+            <a:endParaRPr lang="en-US"/>
+          </a:p>
+        </p:txBody>
+      </p:sp>
+    </p:spTree>
+  </p:cSld>
+  <p:clrMapOvr>
+    <a:masterClrMapping/>
+  </p:clrMapOvr>
+</p:notes>
+</file>
+
+<file path=ppt/notesSlides/notesSlide35.xml><?xml version="1.0" encoding="utf-8"?>
+<p:notes xmlns:a="http://schemas.openxmlformats.org/drawingml/2006/main" xmlns:r="http://schemas.openxmlformats.org/officeDocument/2006/relationships" xmlns:p="http://schemas.openxmlformats.org/presentationml/2006/main">
+  <p:cSld>
+    <p:spTree>
+      <p:nvGrpSpPr>
+        <p:cNvPr id="1" name=""/>
+        <p:cNvGrpSpPr/>
+        <p:nvPr/>
+      </p:nvGrpSpPr>
+      <p:grpSpPr>
+        <a:xfrm>
+          <a:off x="0" y="0"/>
+          <a:ext cx="0" cy="0"/>
+          <a:chOff x="0" y="0"/>
+          <a:chExt cx="0" cy="0"/>
+        </a:xfrm>
+      </p:grpSpPr>
+      <p:sp>
+        <p:nvSpPr>
+          <p:cNvPr id="7" name="Rectangle 7"/>
+          <p:cNvSpPr>
+            <a:spLocks noGrp="1"/>
+          </p:cNvSpPr>
+          <p:nvPr>
+            <p:ph type="sldNum" sz="quarter" idx="5"/>
+          </p:nvPr>
+        </p:nvSpPr>
+        <p:spPr>
+          <a:ln/>
+        </p:spPr>
+        <p:txBody>
+          <a:bodyPr/>
+          <a:lstStyle/>
+          <a:p>
+            <a:fld id="{27AEA7DA-096A-4FB7-B4B3-D12717EF4BDD}" type="slidenum">
+              <a:rPr lang="en-US"/>
+              <a:pPr/>
+              <a:t>35</a:t>
+            </a:fld>
+            <a:endParaRPr lang="en-US"/>
+          </a:p>
+        </p:txBody>
+      </p:sp>
+      <p:sp>
+        <p:nvSpPr>
+          <p:cNvPr id="19458" name="Rectangle 2"/>
+          <p:cNvSpPr>
+            <a:spLocks noGrp="1" noRot="1" noChangeAspect="1" noChangeArrowheads="1" noTextEdit="1"/>
+          </p:cNvSpPr>
+          <p:nvPr>
+            <p:ph type="sldImg"/>
+          </p:nvPr>
+        </p:nvSpPr>
+        <p:spPr>
+          <a:ln/>
+        </p:spPr>
+      </p:sp>
+      <p:sp>
+        <p:nvSpPr>
+          <p:cNvPr id="19459" name="Rectangle 3"/>
+          <p:cNvSpPr>
+            <a:spLocks noGrp="1"/>
+          </p:cNvSpPr>
+          <p:nvPr>
+            <p:ph type="body" idx="1"/>
+          </p:nvPr>
+        </p:nvSpPr>
+        <p:spPr/>
+        <p:txBody>
+          <a:bodyPr/>
+          <a:lstStyle/>
+          <a:p>
+            <a:endParaRPr lang="en-US"/>
+          </a:p>
+        </p:txBody>
+      </p:sp>
+    </p:spTree>
+  </p:cSld>
+  <p:clrMapOvr>
+    <a:masterClrMapping/>
+  </p:clrMapOvr>
+</p:notes>
+</file>
+
+<file path=ppt/notesSlides/notesSlide36.xml><?xml version="1.0" encoding="utf-8"?>
+<p:notes xmlns:a="http://schemas.openxmlformats.org/drawingml/2006/main" xmlns:r="http://schemas.openxmlformats.org/officeDocument/2006/relationships" xmlns:p="http://schemas.openxmlformats.org/presentationml/2006/main">
+  <p:cSld>
+    <p:spTree>
+      <p:nvGrpSpPr>
+        <p:cNvPr id="1" name=""/>
+        <p:cNvGrpSpPr/>
+        <p:nvPr/>
+      </p:nvGrpSpPr>
+      <p:grpSpPr>
+        <a:xfrm>
+          <a:off x="0" y="0"/>
+          <a:ext cx="0" cy="0"/>
+          <a:chOff x="0" y="0"/>
+          <a:chExt cx="0" cy="0"/>
+        </a:xfrm>
+      </p:grpSpPr>
+      <p:sp>
+        <p:nvSpPr>
+          <p:cNvPr id="7" name="Rectangle 7"/>
+          <p:cNvSpPr>
+            <a:spLocks noGrp="1"/>
+          </p:cNvSpPr>
+          <p:nvPr>
+            <p:ph type="sldNum" sz="quarter" idx="5"/>
+          </p:nvPr>
+        </p:nvSpPr>
+        <p:spPr>
+          <a:ln/>
+        </p:spPr>
+        <p:txBody>
+          <a:bodyPr/>
+          <a:lstStyle/>
+          <a:p>
+            <a:fld id="{27AEA7DA-096A-4FB7-B4B3-D12717EF4BDD}" type="slidenum">
+              <a:rPr lang="en-US"/>
+              <a:pPr/>
+              <a:t>36</a:t>
             </a:fld>
             <a:endParaRPr lang="en-US"/>
           </a:p>
@@ -19184,7 +19439,7 @@
               <a:rPr lang="en-US" sz="3200" dirty="0" smtClean="0">
                 <a:latin typeface="Courier New"/>
               </a:rPr>
-              <a:t>3.Seconds</a:t>
+              <a:t>3.seconds</a:t>
             </a:r>
             <a:endParaRPr lang="en-US" sz="3200" dirty="0" smtClean="0">
               <a:latin typeface="Courier New"/>
@@ -19312,6 +19567,1841 @@
                 <a:latin typeface="Courier New"/>
               </a:rPr>
               <a:t> must_== 1</a:t>
+            </a:r>
+            <a:endParaRPr lang="en-US" sz="3200" b="1" dirty="0" smtClean="0">
+              <a:solidFill>
+                <a:srgbClr val="7F0055"/>
+              </a:solidFill>
+              <a:latin typeface="Courier New"/>
+            </a:endParaRPr>
+          </a:p>
+        </p:txBody>
+      </p:sp>
+      <p:pic>
+        <p:nvPicPr>
+          <p:cNvPr id="74758" name="Picture 6" descr="film, film roll, media, picture, video icon"/>
+          <p:cNvPicPr>
+            <a:picLocks noChangeAspect="1" noChangeArrowheads="1"/>
+          </p:cNvPicPr>
+          <p:nvPr/>
+        </p:nvPicPr>
+        <p:blipFill>
+          <a:blip r:embed="rId4"/>
+          <a:srcRect b="25000"/>
+          <a:stretch>
+            <a:fillRect/>
+          </a:stretch>
+        </p:blipFill>
+        <p:spPr bwMode="auto">
+          <a:xfrm>
+            <a:off x="863600" y="1066800"/>
+            <a:ext cx="1828800" cy="1371600"/>
+          </a:xfrm>
+          <a:prstGeom prst="rect">
+            <a:avLst/>
+          </a:prstGeom>
+          <a:noFill/>
+        </p:spPr>
+      </p:pic>
+    </p:spTree>
+  </p:cSld>
+  <p:clrMapOvr>
+    <a:masterClrMapping/>
+  </p:clrMapOvr>
+  <p:transition>
+    <p:fade/>
+  </p:transition>
+  <p:timing>
+    <p:tnLst>
+      <p:par>
+        <p:cTn id="1" dur="indefinite" restart="never" nodeType="tmRoot">
+          <p:childTnLst>
+            <p:seq concurrent="1" nextAc="seek">
+              <p:cTn id="2" dur="indefinite" nodeType="mainSeq">
+                <p:childTnLst>
+                  <p:par>
+                    <p:cTn id="3" fill="hold">
+                      <p:stCondLst>
+                        <p:cond delay="indefinite"/>
+                        <p:cond evt="onBegin" delay="0">
+                          <p:tn val="2"/>
+                        </p:cond>
+                      </p:stCondLst>
+                      <p:childTnLst>
+                        <p:par>
+                          <p:cTn id="4" fill="hold">
+                            <p:stCondLst>
+                              <p:cond delay="0"/>
+                            </p:stCondLst>
+                            <p:childTnLst>
+                              <p:par>
+                                <p:cTn id="5" presetID="1" presetClass="entr" presetSubtype="0" fill="hold" nodeType="withEffect">
+                                  <p:stCondLst>
+                                    <p:cond delay="0"/>
+                                  </p:stCondLst>
+                                  <p:childTnLst>
+                                    <p:set>
+                                      <p:cBhvr>
+                                        <p:cTn id="6" dur="1" fill="hold">
+                                          <p:stCondLst>
+                                            <p:cond delay="0"/>
+                                          </p:stCondLst>
+                                        </p:cTn>
+                                        <p:tgtEl>
+                                          <p:spTgt spid="8"/>
+                                        </p:tgtEl>
+                                        <p:attrNameLst>
+                                          <p:attrName>style.visibility</p:attrName>
+                                        </p:attrNameLst>
+                                      </p:cBhvr>
+                                      <p:to>
+                                        <p:strVal val="visible"/>
+                                      </p:to>
+                                    </p:set>
+                                  </p:childTnLst>
+                                </p:cTn>
+                              </p:par>
+                            </p:childTnLst>
+                          </p:cTn>
+                        </p:par>
+                      </p:childTnLst>
+                    </p:cTn>
+                  </p:par>
+                </p:childTnLst>
+              </p:cTn>
+              <p:prevCondLst>
+                <p:cond evt="onPrev" delay="0">
+                  <p:tgtEl>
+                    <p:sldTgt/>
+                  </p:tgtEl>
+                </p:cond>
+              </p:prevCondLst>
+              <p:nextCondLst>
+                <p:cond evt="onNext" delay="0">
+                  <p:tgtEl>
+                    <p:sldTgt/>
+                  </p:tgtEl>
+                </p:cond>
+              </p:nextCondLst>
+            </p:seq>
+          </p:childTnLst>
+        </p:cTn>
+      </p:par>
+    </p:tnLst>
+  </p:timing>
+</p:sld>
+</file>
+
+<file path=ppt/slides/slide34.xml><?xml version="1.0" encoding="utf-8"?>
+<p:sld xmlns:a="http://schemas.openxmlformats.org/drawingml/2006/main" xmlns:r="http://schemas.openxmlformats.org/officeDocument/2006/relationships" xmlns:p="http://schemas.openxmlformats.org/presentationml/2006/main">
+  <p:cSld>
+    <p:spTree>
+      <p:nvGrpSpPr>
+        <p:cNvPr id="1" name=""/>
+        <p:cNvGrpSpPr/>
+        <p:nvPr/>
+      </p:nvGrpSpPr>
+      <p:grpSpPr>
+        <a:xfrm>
+          <a:off x="0" y="0"/>
+          <a:ext cx="0" cy="0"/>
+          <a:chOff x="0" y="0"/>
+          <a:chExt cx="0" cy="0"/>
+        </a:xfrm>
+      </p:grpSpPr>
+      <p:sp>
+        <p:nvSpPr>
+          <p:cNvPr id="8193" name="Rectangle 1"/>
+          <p:cNvSpPr>
+            <a:spLocks noGrp="1" noChangeArrowheads="1"/>
+          </p:cNvSpPr>
+          <p:nvPr>
+            <p:ph type="title"/>
+          </p:nvPr>
+        </p:nvSpPr>
+        <p:spPr>
+          <a:xfrm>
+            <a:off x="711200" y="0"/>
+            <a:ext cx="12509500" cy="914400"/>
+          </a:xfrm>
+          <a:ln/>
+        </p:spPr>
+        <p:txBody>
+          <a:bodyPr/>
+          <a:lstStyle/>
+          <a:p>
+            <a:pPr lvl="0"/>
+            <a:r>
+              <a:rPr lang="en-US" sz="5400" dirty="0" smtClean="0">
+                <a:latin typeface="Lucida Handwriting" pitchFamily="66" charset="0"/>
+              </a:rPr>
+              <a:t>     </a:t>
+            </a:r>
+            <a:r>
+              <a:rPr lang="en-US" sz="5400" dirty="0" smtClean="0">
+                <a:latin typeface="Lucida Handwriting" pitchFamily="66" charset="0"/>
+              </a:rPr>
+              <a:t>DSL</a:t>
+            </a:r>
+            <a:endParaRPr lang="en-US" dirty="0"/>
+          </a:p>
+        </p:txBody>
+      </p:sp>
+      <p:pic>
+        <p:nvPicPr>
+          <p:cNvPr id="8" name="Picture 10" descr="http://knowledgehub.zeus.com/media/Scala_Logo2008.png"/>
+          <p:cNvPicPr>
+            <a:picLocks noChangeAspect="1" noChangeArrowheads="1"/>
+          </p:cNvPicPr>
+          <p:nvPr/>
+        </p:nvPicPr>
+        <p:blipFill>
+          <a:blip r:embed="rId3"/>
+          <a:srcRect/>
+          <a:stretch>
+            <a:fillRect/>
+          </a:stretch>
+        </p:blipFill>
+        <p:spPr bwMode="auto">
+          <a:xfrm>
+            <a:off x="4140200" y="76200"/>
+            <a:ext cx="2279542" cy="679257"/>
+          </a:xfrm>
+          <a:prstGeom prst="rect">
+            <a:avLst/>
+          </a:prstGeom>
+          <a:noFill/>
+        </p:spPr>
+      </p:pic>
+      <p:sp>
+        <p:nvSpPr>
+          <p:cNvPr id="11" name="Rectangle 10"/>
+          <p:cNvSpPr/>
+          <p:nvPr/>
+        </p:nvSpPr>
+        <p:spPr>
+          <a:xfrm>
+            <a:off x="330200" y="2971800"/>
+            <a:ext cx="12344400" cy="5693866"/>
+          </a:xfrm>
+          <a:prstGeom prst="rect">
+            <a:avLst/>
+          </a:prstGeom>
+          <a:ln>
+            <a:solidFill>
+              <a:schemeClr val="tx1"/>
+            </a:solidFill>
+            <a:prstDash val="dash"/>
+          </a:ln>
+        </p:spPr>
+        <p:txBody>
+          <a:bodyPr wrap="square">
+            <a:spAutoFit/>
+          </a:bodyPr>
+          <a:lstStyle/>
+          <a:p>
+            <a:r>
+              <a:rPr lang="en-US" sz="2800" b="1" dirty="0" smtClean="0">
+                <a:solidFill>
+                  <a:srgbClr val="7F0055"/>
+                </a:solidFill>
+                <a:latin typeface="Courier New"/>
+              </a:rPr>
+              <a:t>class</a:t>
+            </a:r>
+            <a:r>
+              <a:rPr lang="en-US" sz="2800" b="1" dirty="0" smtClean="0">
+                <a:latin typeface="Courier New"/>
+              </a:rPr>
+              <a:t> </a:t>
+            </a:r>
+            <a:r>
+              <a:rPr lang="en-US" sz="2800" b="1" dirty="0" err="1" smtClean="0">
+                <a:latin typeface="Courier New"/>
+              </a:rPr>
+              <a:t>ExampleDesc</a:t>
+            </a:r>
+            <a:r>
+              <a:rPr lang="en-US" sz="2800" b="1" dirty="0" smtClean="0">
+                <a:latin typeface="Courier New"/>
+              </a:rPr>
+              <a:t>(d: </a:t>
+            </a:r>
+            <a:r>
+              <a:rPr lang="en-US" sz="2800" b="1" dirty="0" smtClean="0">
+                <a:latin typeface="Courier New"/>
+              </a:rPr>
+              <a:t>String) {</a:t>
+            </a:r>
+          </a:p>
+          <a:p>
+            <a:r>
+              <a:rPr lang="en-US" sz="2800" b="1" dirty="0" smtClean="0">
+                <a:solidFill>
+                  <a:srgbClr val="7F0055"/>
+                </a:solidFill>
+                <a:latin typeface="Courier New"/>
+              </a:rPr>
+              <a:t>  def</a:t>
+            </a:r>
+            <a:r>
+              <a:rPr lang="en-US" sz="2800" b="1" dirty="0" smtClean="0">
+                <a:latin typeface="Courier New"/>
+              </a:rPr>
+              <a:t> </a:t>
+            </a:r>
+            <a:r>
+              <a:rPr lang="en-US" sz="2800" b="1" dirty="0" smtClean="0">
+                <a:latin typeface="Courier New"/>
+              </a:rPr>
+              <a:t>&gt;&gt;(e: =&gt;</a:t>
+            </a:r>
+            <a:r>
+              <a:rPr lang="en-US" sz="2800" b="1" dirty="0" smtClean="0">
+                <a:solidFill>
+                  <a:srgbClr val="7F0055"/>
+                </a:solidFill>
+                <a:latin typeface="Courier New"/>
+              </a:rPr>
+              <a:t>Any</a:t>
+            </a:r>
+            <a:r>
+              <a:rPr lang="en-US" sz="2800" b="1" dirty="0" smtClean="0">
+                <a:latin typeface="Courier New"/>
+              </a:rPr>
+              <a:t>): Example = </a:t>
+            </a:r>
+            <a:r>
+              <a:rPr lang="en-US" sz="2800" b="1" dirty="0" smtClean="0">
+                <a:solidFill>
+                  <a:srgbClr val="7F0055"/>
+                </a:solidFill>
+                <a:latin typeface="Courier New"/>
+              </a:rPr>
+              <a:t>new</a:t>
+            </a:r>
+            <a:r>
+              <a:rPr lang="en-US" sz="2800" b="1" dirty="0" smtClean="0">
+                <a:latin typeface="Courier New"/>
+              </a:rPr>
+              <a:t> </a:t>
+            </a:r>
+            <a:r>
+              <a:rPr lang="en-US" sz="2800" b="1" dirty="0" smtClean="0">
+                <a:latin typeface="Courier New"/>
+              </a:rPr>
+              <a:t>Example(d, </a:t>
+            </a:r>
+            <a:r>
+              <a:rPr lang="en-US" sz="2800" b="1" dirty="0" smtClean="0">
+                <a:latin typeface="Courier New"/>
+              </a:rPr>
+              <a:t>e)</a:t>
+            </a:r>
+          </a:p>
+          <a:p>
+            <a:r>
+              <a:rPr lang="en-US" sz="2800" dirty="0" smtClean="0">
+                <a:latin typeface="Courier New"/>
+              </a:rPr>
+              <a:t>}</a:t>
+            </a:r>
+            <a:endParaRPr lang="en-US" sz="2800" dirty="0" smtClean="0">
+              <a:latin typeface="Courier New"/>
+            </a:endParaRPr>
+          </a:p>
+          <a:p>
+            <a:r>
+              <a:rPr lang="en-US" sz="2800" b="1" dirty="0" smtClean="0">
+                <a:solidFill>
+                  <a:srgbClr val="7F0055"/>
+                </a:solidFill>
+                <a:latin typeface="Courier New"/>
+              </a:rPr>
+              <a:t>class</a:t>
+            </a:r>
+            <a:r>
+              <a:rPr lang="en-US" sz="2800" b="1" dirty="0" smtClean="0">
+                <a:latin typeface="Courier New"/>
+              </a:rPr>
+              <a:t> Example(d: </a:t>
+            </a:r>
+            <a:r>
+              <a:rPr lang="en-US" sz="2800" b="1" dirty="0" smtClean="0">
+                <a:latin typeface="Courier New"/>
+              </a:rPr>
+              <a:t>String, </a:t>
+            </a:r>
+            <a:r>
+              <a:rPr lang="en-US" sz="2800" b="1" dirty="0" smtClean="0">
+                <a:latin typeface="Courier New"/>
+              </a:rPr>
+              <a:t>e: </a:t>
+            </a:r>
+            <a:r>
+              <a:rPr lang="en-US" sz="2800" b="1" dirty="0" smtClean="0">
+                <a:latin typeface="Courier New"/>
+              </a:rPr>
+              <a:t>=&gt;</a:t>
+            </a:r>
+            <a:r>
+              <a:rPr lang="en-US" sz="2800" b="1" dirty="0" smtClean="0">
+                <a:solidFill>
+                  <a:srgbClr val="7F0055"/>
+                </a:solidFill>
+                <a:latin typeface="Courier New"/>
+              </a:rPr>
+              <a:t>Any</a:t>
+            </a:r>
+            <a:r>
+              <a:rPr lang="en-US" sz="2800" b="1" dirty="0" smtClean="0">
+                <a:latin typeface="Courier New"/>
+              </a:rPr>
+              <a:t>) {</a:t>
+            </a:r>
+          </a:p>
+          <a:p>
+            <a:r>
+              <a:rPr lang="en-US" sz="2800" b="1" dirty="0" smtClean="0">
+                <a:solidFill>
+                  <a:srgbClr val="7F0055"/>
+                </a:solidFill>
+                <a:latin typeface="Courier New"/>
+              </a:rPr>
+              <a:t>  def</a:t>
+            </a:r>
+            <a:r>
+              <a:rPr lang="en-US" sz="2800" b="1" dirty="0" smtClean="0">
+                <a:latin typeface="Courier New"/>
+              </a:rPr>
+              <a:t> </a:t>
+            </a:r>
+            <a:r>
+              <a:rPr lang="en-US" sz="2800" b="1" dirty="0" smtClean="0">
+                <a:latin typeface="Courier New"/>
+              </a:rPr>
+              <a:t>&gt;&gt;(e: =&gt;</a:t>
+            </a:r>
+            <a:r>
+              <a:rPr lang="en-US" sz="2800" b="1" dirty="0" smtClean="0">
+                <a:solidFill>
+                  <a:srgbClr val="7F0055"/>
+                </a:solidFill>
+                <a:latin typeface="Courier New"/>
+              </a:rPr>
+              <a:t>Any</a:t>
+            </a:r>
+            <a:r>
+              <a:rPr lang="en-US" sz="2800" b="1" dirty="0" smtClean="0">
+                <a:latin typeface="Courier New"/>
+              </a:rPr>
+              <a:t>): Example = </a:t>
+            </a:r>
+            <a:r>
+              <a:rPr lang="en-US" sz="2800" b="1" dirty="0" smtClean="0">
+                <a:solidFill>
+                  <a:srgbClr val="7F0055"/>
+                </a:solidFill>
+                <a:latin typeface="Courier New"/>
+              </a:rPr>
+              <a:t>new</a:t>
+            </a:r>
+            <a:r>
+              <a:rPr lang="en-US" sz="2800" b="1" dirty="0" smtClean="0">
+                <a:latin typeface="Courier New"/>
+              </a:rPr>
+              <a:t> </a:t>
+            </a:r>
+            <a:r>
+              <a:rPr lang="en-US" sz="2800" b="1" dirty="0" smtClean="0">
+                <a:latin typeface="Courier New"/>
+              </a:rPr>
+              <a:t>Example(d, </a:t>
+            </a:r>
+            <a:r>
+              <a:rPr lang="en-US" sz="2800" b="1" dirty="0" smtClean="0">
+                <a:latin typeface="Courier New"/>
+              </a:rPr>
+              <a:t>e)</a:t>
+            </a:r>
+          </a:p>
+          <a:p>
+            <a:r>
+              <a:rPr lang="en-US" sz="2800" dirty="0" smtClean="0">
+                <a:latin typeface="Courier New"/>
+              </a:rPr>
+              <a:t>}</a:t>
+            </a:r>
+            <a:endParaRPr lang="en-US" sz="2800" dirty="0" smtClean="0">
+              <a:latin typeface="Courier New"/>
+            </a:endParaRPr>
+          </a:p>
+          <a:p>
+            <a:endParaRPr lang="en-US" sz="2800" dirty="0" smtClean="0">
+              <a:solidFill>
+                <a:srgbClr val="2A00FF"/>
+              </a:solidFill>
+              <a:latin typeface="Courier New"/>
+            </a:endParaRPr>
+          </a:p>
+          <a:p>
+            <a:r>
+              <a:rPr lang="en-US" sz="2800" dirty="0" smtClean="0">
+                <a:solidFill>
+                  <a:srgbClr val="2A00FF"/>
+                </a:solidFill>
+                <a:latin typeface="Courier New"/>
+              </a:rPr>
+              <a:t>"</a:t>
+            </a:r>
+            <a:r>
+              <a:rPr lang="en-US" sz="2800" dirty="0" smtClean="0">
+                <a:solidFill>
+                  <a:srgbClr val="2A00FF"/>
+                </a:solidFill>
+                <a:latin typeface="Courier New"/>
+              </a:rPr>
+              <a:t>When I setup the system"</a:t>
+            </a:r>
+            <a:r>
+              <a:rPr lang="en-US" sz="2800" dirty="0" smtClean="0">
+                <a:latin typeface="Courier New"/>
+              </a:rPr>
+              <a:t> &gt;&gt; {</a:t>
+            </a:r>
+          </a:p>
+          <a:p>
+            <a:r>
+              <a:rPr lang="en-US" sz="2800" dirty="0" smtClean="0">
+                <a:solidFill>
+                  <a:srgbClr val="2A00FF"/>
+                </a:solidFill>
+                <a:latin typeface="Courier New"/>
+              </a:rPr>
+              <a:t>  "</a:t>
+            </a:r>
+            <a:r>
+              <a:rPr lang="en-US" sz="2800" dirty="0" smtClean="0">
+                <a:solidFill>
+                  <a:srgbClr val="2A00FF"/>
+                </a:solidFill>
+                <a:latin typeface="Courier New"/>
+              </a:rPr>
+              <a:t>And a customer is entered"</a:t>
+            </a:r>
+            <a:r>
+              <a:rPr lang="en-US" sz="2800" dirty="0" smtClean="0">
+                <a:latin typeface="Courier New"/>
+              </a:rPr>
+              <a:t> &gt;&gt; {</a:t>
+            </a:r>
+          </a:p>
+          <a:p>
+            <a:r>
+              <a:rPr lang="en-US" sz="2800" dirty="0" smtClean="0">
+                <a:latin typeface="Courier New"/>
+              </a:rPr>
+              <a:t>  </a:t>
+            </a:r>
+            <a:r>
+              <a:rPr lang="en-US" sz="2800" dirty="0" smtClean="0">
+                <a:latin typeface="Courier New"/>
+              </a:rPr>
+              <a:t>  </a:t>
+            </a:r>
+            <a:r>
+              <a:rPr lang="en-US" sz="2800" dirty="0" smtClean="0">
+                <a:solidFill>
+                  <a:srgbClr val="2A00FF"/>
+                </a:solidFill>
+                <a:latin typeface="Courier New"/>
+              </a:rPr>
+              <a:t>"</a:t>
+            </a:r>
+            <a:r>
+              <a:rPr lang="en-US" sz="2800" dirty="0" smtClean="0">
+                <a:solidFill>
+                  <a:srgbClr val="2A00FF"/>
+                </a:solidFill>
+                <a:latin typeface="Courier New"/>
+              </a:rPr>
+              <a:t>if he has a discount"</a:t>
+            </a:r>
+            <a:r>
+              <a:rPr lang="en-US" sz="2800" dirty="0" smtClean="0">
+                <a:latin typeface="Courier New"/>
+              </a:rPr>
+              <a:t> &gt;&gt; {}</a:t>
+            </a:r>
+          </a:p>
+          <a:p>
+            <a:r>
+              <a:rPr lang="en-US" sz="2800" dirty="0" smtClean="0">
+                <a:latin typeface="Courier New"/>
+              </a:rPr>
+              <a:t>  </a:t>
+            </a:r>
+            <a:r>
+              <a:rPr lang="en-US" sz="2800" dirty="0" smtClean="0">
+                <a:latin typeface="Courier New"/>
+              </a:rPr>
+              <a:t>  </a:t>
+            </a:r>
+            <a:r>
+              <a:rPr lang="en-US" sz="2800" dirty="0" smtClean="0">
+                <a:solidFill>
+                  <a:srgbClr val="2A00FF"/>
+                </a:solidFill>
+                <a:latin typeface="Courier New"/>
+              </a:rPr>
+              <a:t>"</a:t>
+            </a:r>
+            <a:r>
+              <a:rPr lang="en-US" sz="2800" dirty="0" smtClean="0">
+                <a:solidFill>
+                  <a:srgbClr val="2A00FF"/>
+                </a:solidFill>
+                <a:latin typeface="Courier New"/>
+              </a:rPr>
+              <a:t>if he doesn't have a discount"</a:t>
+            </a:r>
+            <a:r>
+              <a:rPr lang="en-US" sz="2800" dirty="0" smtClean="0">
+                <a:latin typeface="Courier New"/>
+              </a:rPr>
+              <a:t> &gt;&gt; {}</a:t>
+            </a:r>
+          </a:p>
+          <a:p>
+            <a:r>
+              <a:rPr lang="en-US" sz="2800" dirty="0" smtClean="0">
+                <a:latin typeface="Courier New"/>
+              </a:rPr>
+              <a:t>  }</a:t>
+            </a:r>
+            <a:endParaRPr lang="en-US" sz="2800" dirty="0" smtClean="0">
+              <a:latin typeface="Courier New"/>
+            </a:endParaRPr>
+          </a:p>
+          <a:p>
+            <a:r>
+              <a:rPr lang="en-US" sz="2800" dirty="0" smtClean="0">
+                <a:latin typeface="Courier New"/>
+              </a:rPr>
+              <a:t>}</a:t>
+            </a:r>
+            <a:endParaRPr lang="en-US" sz="2800" b="1" dirty="0" smtClean="0">
+              <a:solidFill>
+                <a:srgbClr val="7F0055"/>
+              </a:solidFill>
+              <a:latin typeface="Courier New"/>
+            </a:endParaRPr>
+          </a:p>
+        </p:txBody>
+      </p:sp>
+      <p:sp>
+        <p:nvSpPr>
+          <p:cNvPr id="14" name="Rectangle 13"/>
+          <p:cNvSpPr/>
+          <p:nvPr/>
+        </p:nvSpPr>
+        <p:spPr>
+          <a:xfrm>
+            <a:off x="3759200" y="1447800"/>
+            <a:ext cx="3978973" cy="923330"/>
+          </a:xfrm>
+          <a:prstGeom prst="rect">
+            <a:avLst/>
+          </a:prstGeom>
+        </p:spPr>
+        <p:txBody>
+          <a:bodyPr wrap="none">
+            <a:spAutoFit/>
+          </a:bodyPr>
+          <a:lstStyle/>
+          <a:p>
+            <a:pPr algn="ctr"/>
+            <a:r>
+              <a:rPr lang="en-US" sz="5400" b="1" kern="0" dirty="0" smtClean="0">
+                <a:solidFill>
+                  <a:srgbClr val="0C0F20"/>
+                </a:solidFill>
+                <a:latin typeface="Lucida Handwriting" pitchFamily="66" charset="0"/>
+                <a:cs typeface="+mj-cs"/>
+                <a:sym typeface="Arial" charset="0"/>
+              </a:rPr>
+              <a:t>Operators</a:t>
+            </a:r>
+            <a:endParaRPr lang="en-US" dirty="0"/>
+          </a:p>
+        </p:txBody>
+      </p:sp>
+      <p:pic>
+        <p:nvPicPr>
+          <p:cNvPr id="15" name="Picture 2" descr="toolbox icon"/>
+          <p:cNvPicPr>
+            <a:picLocks noChangeAspect="1" noChangeArrowheads="1"/>
+          </p:cNvPicPr>
+          <p:nvPr/>
+        </p:nvPicPr>
+        <p:blipFill>
+          <a:blip r:embed="rId4"/>
+          <a:srcRect/>
+          <a:stretch>
+            <a:fillRect/>
+          </a:stretch>
+        </p:blipFill>
+        <p:spPr bwMode="auto">
+          <a:xfrm>
+            <a:off x="515040" y="1066800"/>
+            <a:ext cx="1676400" cy="1676401"/>
+          </a:xfrm>
+          <a:prstGeom prst="rect">
+            <a:avLst/>
+          </a:prstGeom>
+          <a:noFill/>
+        </p:spPr>
+      </p:pic>
+    </p:spTree>
+  </p:cSld>
+  <p:clrMapOvr>
+    <a:masterClrMapping/>
+  </p:clrMapOvr>
+  <p:transition>
+    <p:fade/>
+  </p:transition>
+  <p:timing>
+    <p:tnLst>
+      <p:par>
+        <p:cTn id="1" dur="indefinite" restart="never" nodeType="tmRoot">
+          <p:childTnLst>
+            <p:seq concurrent="1" nextAc="seek">
+              <p:cTn id="2" dur="indefinite" nodeType="mainSeq">
+                <p:childTnLst>
+                  <p:par>
+                    <p:cTn id="3" fill="hold">
+                      <p:stCondLst>
+                        <p:cond delay="indefinite"/>
+                        <p:cond evt="onBegin" delay="0">
+                          <p:tn val="2"/>
+                        </p:cond>
+                      </p:stCondLst>
+                      <p:childTnLst>
+                        <p:par>
+                          <p:cTn id="4" fill="hold">
+                            <p:stCondLst>
+                              <p:cond delay="0"/>
+                            </p:stCondLst>
+                            <p:childTnLst>
+                              <p:par>
+                                <p:cTn id="5" presetID="1" presetClass="entr" presetSubtype="0" fill="hold" nodeType="withEffect">
+                                  <p:stCondLst>
+                                    <p:cond delay="0"/>
+                                  </p:stCondLst>
+                                  <p:childTnLst>
+                                    <p:set>
+                                      <p:cBhvr>
+                                        <p:cTn id="6" dur="1" fill="hold">
+                                          <p:stCondLst>
+                                            <p:cond delay="0"/>
+                                          </p:stCondLst>
+                                        </p:cTn>
+                                        <p:tgtEl>
+                                          <p:spTgt spid="8"/>
+                                        </p:tgtEl>
+                                        <p:attrNameLst>
+                                          <p:attrName>style.visibility</p:attrName>
+                                        </p:attrNameLst>
+                                      </p:cBhvr>
+                                      <p:to>
+                                        <p:strVal val="visible"/>
+                                      </p:to>
+                                    </p:set>
+                                  </p:childTnLst>
+                                </p:cTn>
+                              </p:par>
+                            </p:childTnLst>
+                          </p:cTn>
+                        </p:par>
+                      </p:childTnLst>
+                    </p:cTn>
+                  </p:par>
+                </p:childTnLst>
+              </p:cTn>
+              <p:prevCondLst>
+                <p:cond evt="onPrev" delay="0">
+                  <p:tgtEl>
+                    <p:sldTgt/>
+                  </p:tgtEl>
+                </p:cond>
+              </p:prevCondLst>
+              <p:nextCondLst>
+                <p:cond evt="onNext" delay="0">
+                  <p:tgtEl>
+                    <p:sldTgt/>
+                  </p:tgtEl>
+                </p:cond>
+              </p:nextCondLst>
+            </p:seq>
+          </p:childTnLst>
+        </p:cTn>
+      </p:par>
+    </p:tnLst>
+  </p:timing>
+</p:sld>
+</file>
+
+<file path=ppt/slides/slide35.xml><?xml version="1.0" encoding="utf-8"?>
+<p:sld xmlns:a="http://schemas.openxmlformats.org/drawingml/2006/main" xmlns:r="http://schemas.openxmlformats.org/officeDocument/2006/relationships" xmlns:p="http://schemas.openxmlformats.org/presentationml/2006/main">
+  <p:cSld>
+    <p:spTree>
+      <p:nvGrpSpPr>
+        <p:cNvPr id="1" name=""/>
+        <p:cNvGrpSpPr/>
+        <p:nvPr/>
+      </p:nvGrpSpPr>
+      <p:grpSpPr>
+        <a:xfrm>
+          <a:off x="0" y="0"/>
+          <a:ext cx="0" cy="0"/>
+          <a:chOff x="0" y="0"/>
+          <a:chExt cx="0" cy="0"/>
+        </a:xfrm>
+      </p:grpSpPr>
+      <p:sp>
+        <p:nvSpPr>
+          <p:cNvPr id="8193" name="Rectangle 1"/>
+          <p:cNvSpPr>
+            <a:spLocks noGrp="1" noChangeArrowheads="1"/>
+          </p:cNvSpPr>
+          <p:nvPr>
+            <p:ph type="title"/>
+          </p:nvPr>
+        </p:nvSpPr>
+        <p:spPr>
+          <a:xfrm>
+            <a:off x="711200" y="0"/>
+            <a:ext cx="12509500" cy="914400"/>
+          </a:xfrm>
+          <a:ln/>
+        </p:spPr>
+        <p:txBody>
+          <a:bodyPr/>
+          <a:lstStyle/>
+          <a:p>
+            <a:pPr lvl="0"/>
+            <a:r>
+              <a:rPr lang="en-US" sz="5400" dirty="0" smtClean="0">
+                <a:latin typeface="Lucida Handwriting" pitchFamily="66" charset="0"/>
+              </a:rPr>
+              <a:t>     </a:t>
+            </a:r>
+            <a:r>
+              <a:rPr lang="en-US" sz="5400" dirty="0" smtClean="0">
+                <a:latin typeface="Lucida Handwriting" pitchFamily="66" charset="0"/>
+              </a:rPr>
+              <a:t>DSL</a:t>
+            </a:r>
+            <a:endParaRPr lang="en-US" dirty="0"/>
+          </a:p>
+        </p:txBody>
+      </p:sp>
+      <p:sp>
+        <p:nvSpPr>
+          <p:cNvPr id="7" name="Rectangle 6"/>
+          <p:cNvSpPr/>
+          <p:nvPr/>
+        </p:nvSpPr>
+        <p:spPr>
+          <a:xfrm>
+            <a:off x="4510641" y="1438870"/>
+            <a:ext cx="4503156" cy="923330"/>
+          </a:xfrm>
+          <a:prstGeom prst="rect">
+            <a:avLst/>
+          </a:prstGeom>
+        </p:spPr>
+        <p:txBody>
+          <a:bodyPr wrap="none">
+            <a:spAutoFit/>
+          </a:bodyPr>
+          <a:lstStyle/>
+          <a:p>
+            <a:pPr algn="ctr"/>
+            <a:r>
+              <a:rPr lang="en-US" sz="5400" b="1" kern="0" dirty="0" smtClean="0">
+                <a:solidFill>
+                  <a:srgbClr val="00CC66"/>
+                </a:solidFill>
+                <a:latin typeface="Lucida Handwriting" pitchFamily="66" charset="0"/>
+                <a:cs typeface="+mj-cs"/>
+                <a:sym typeface="Arial" charset="0"/>
+              </a:rPr>
+              <a:t>precedence</a:t>
+            </a:r>
+            <a:endParaRPr lang="en-US" dirty="0">
+              <a:solidFill>
+                <a:srgbClr val="00CC66"/>
+              </a:solidFill>
+            </a:endParaRPr>
+          </a:p>
+        </p:txBody>
+      </p:sp>
+      <p:pic>
+        <p:nvPicPr>
+          <p:cNvPr id="8" name="Picture 10" descr="http://knowledgehub.zeus.com/media/Scala_Logo2008.png"/>
+          <p:cNvPicPr>
+            <a:picLocks noChangeAspect="1" noChangeArrowheads="1"/>
+          </p:cNvPicPr>
+          <p:nvPr/>
+        </p:nvPicPr>
+        <p:blipFill>
+          <a:blip r:embed="rId3"/>
+          <a:srcRect/>
+          <a:stretch>
+            <a:fillRect/>
+          </a:stretch>
+        </p:blipFill>
+        <p:spPr bwMode="auto">
+          <a:xfrm>
+            <a:off x="4140200" y="76200"/>
+            <a:ext cx="2279542" cy="679257"/>
+          </a:xfrm>
+          <a:prstGeom prst="rect">
+            <a:avLst/>
+          </a:prstGeom>
+          <a:noFill/>
+        </p:spPr>
+      </p:pic>
+      <p:sp>
+        <p:nvSpPr>
+          <p:cNvPr id="11" name="Rectangle 10"/>
+          <p:cNvSpPr/>
+          <p:nvPr/>
+        </p:nvSpPr>
+        <p:spPr>
+          <a:xfrm>
+            <a:off x="330200" y="2819400"/>
+            <a:ext cx="12344400" cy="3539430"/>
+          </a:xfrm>
+          <a:prstGeom prst="rect">
+            <a:avLst/>
+          </a:prstGeom>
+          <a:solidFill>
+            <a:schemeClr val="bg1"/>
+          </a:solidFill>
+          <a:ln>
+            <a:solidFill>
+              <a:schemeClr val="tx1"/>
+            </a:solidFill>
+            <a:prstDash val="dash"/>
+          </a:ln>
+        </p:spPr>
+        <p:txBody>
+          <a:bodyPr wrap="square">
+            <a:spAutoFit/>
+          </a:bodyPr>
+          <a:lstStyle/>
+          <a:p>
+            <a:r>
+              <a:rPr lang="en-US" sz="3200" dirty="0" smtClean="0">
+                <a:solidFill>
+                  <a:srgbClr val="3F5FBF"/>
+                </a:solidFill>
+                <a:latin typeface="Courier New"/>
+              </a:rPr>
+              <a:t>/**</a:t>
+            </a:r>
+            <a:endParaRPr lang="en-US" sz="3200" dirty="0" smtClean="0">
+              <a:solidFill>
+                <a:srgbClr val="3F5FBF"/>
+              </a:solidFill>
+              <a:latin typeface="Courier New"/>
+            </a:endParaRPr>
+          </a:p>
+          <a:p>
+            <a:r>
+              <a:rPr lang="en-US" sz="3200" dirty="0" smtClean="0">
+                <a:solidFill>
+                  <a:srgbClr val="3F5FBF"/>
+                </a:solidFill>
+                <a:latin typeface="Courier New"/>
+              </a:rPr>
+              <a:t> </a:t>
+            </a:r>
+            <a:r>
+              <a:rPr lang="en-US" sz="3200" dirty="0" smtClean="0">
+                <a:solidFill>
+                  <a:srgbClr val="3F5FBF"/>
+                </a:solidFill>
+                <a:latin typeface="Courier New"/>
+              </a:rPr>
+              <a:t>* Fit</a:t>
+            </a:r>
+            <a:r>
+              <a:rPr lang="en-US" sz="3200" dirty="0" smtClean="0">
+                <a:solidFill>
+                  <a:srgbClr val="7F7F9F"/>
+                </a:solidFill>
+                <a:latin typeface="Courier New"/>
+              </a:rPr>
+              <a:t>-</a:t>
+            </a:r>
+            <a:r>
+              <a:rPr lang="en-US" sz="3200" dirty="0" smtClean="0">
+                <a:solidFill>
+                  <a:srgbClr val="3F5FBF"/>
+                </a:solidFill>
+                <a:latin typeface="Courier New"/>
+              </a:rPr>
+              <a:t>like table in </a:t>
+            </a:r>
+            <a:r>
+              <a:rPr lang="en-US" sz="3200" dirty="0" err="1" smtClean="0">
+                <a:solidFill>
+                  <a:srgbClr val="3F5FBF"/>
+                </a:solidFill>
+                <a:latin typeface="Courier New"/>
+              </a:rPr>
+              <a:t>Scala</a:t>
+            </a:r>
+            <a:r>
+              <a:rPr lang="en-US" sz="3200" dirty="0" smtClean="0">
+                <a:solidFill>
+                  <a:srgbClr val="3F5FBF"/>
+                </a:solidFill>
+                <a:latin typeface="Courier New"/>
+              </a:rPr>
+              <a:t>?</a:t>
+            </a:r>
+          </a:p>
+          <a:p>
+            <a:r>
+              <a:rPr lang="en-US" sz="3200" dirty="0" smtClean="0">
+                <a:solidFill>
+                  <a:srgbClr val="3F5FBF"/>
+                </a:solidFill>
+                <a:latin typeface="Courier New"/>
+              </a:rPr>
+              <a:t> </a:t>
+            </a:r>
+            <a:r>
+              <a:rPr lang="en-US" sz="3200" dirty="0" smtClean="0">
+                <a:solidFill>
+                  <a:srgbClr val="3F5FBF"/>
+                </a:solidFill>
+                <a:latin typeface="Courier New"/>
+              </a:rPr>
+              <a:t>* </a:t>
+            </a:r>
+          </a:p>
+          <a:p>
+            <a:r>
+              <a:rPr lang="en-US" sz="3200" dirty="0" smtClean="0">
+                <a:solidFill>
+                  <a:srgbClr val="3F5FBF"/>
+                </a:solidFill>
+                <a:latin typeface="Courier New"/>
+              </a:rPr>
+              <a:t> </a:t>
+            </a:r>
+            <a:r>
+              <a:rPr lang="en-US" sz="3200" dirty="0" smtClean="0">
+                <a:solidFill>
+                  <a:srgbClr val="3F5FBF"/>
+                </a:solidFill>
+                <a:latin typeface="Courier New"/>
+              </a:rPr>
+              <a:t>*  | a | b | c |</a:t>
+            </a:r>
+          </a:p>
+          <a:p>
+            <a:r>
+              <a:rPr lang="en-US" sz="3200" dirty="0" smtClean="0">
+                <a:solidFill>
+                  <a:srgbClr val="3F5FBF"/>
+                </a:solidFill>
+                <a:latin typeface="Courier New"/>
+              </a:rPr>
+              <a:t> </a:t>
+            </a:r>
+            <a:r>
+              <a:rPr lang="en-US" sz="3200" dirty="0" smtClean="0">
+                <a:solidFill>
+                  <a:srgbClr val="3F5FBF"/>
+                </a:solidFill>
+                <a:latin typeface="Courier New"/>
+              </a:rPr>
+              <a:t>*  | 1 | 2 | 3 |</a:t>
+            </a:r>
+          </a:p>
+          <a:p>
+            <a:r>
+              <a:rPr lang="en-US" sz="3200" dirty="0" smtClean="0">
+                <a:solidFill>
+                  <a:srgbClr val="3F5FBF"/>
+                </a:solidFill>
+                <a:latin typeface="Courier New"/>
+              </a:rPr>
+              <a:t> </a:t>
+            </a:r>
+            <a:r>
+              <a:rPr lang="en-US" sz="3200" dirty="0" smtClean="0">
+                <a:solidFill>
+                  <a:srgbClr val="3F5FBF"/>
+                </a:solidFill>
+                <a:latin typeface="Courier New"/>
+              </a:rPr>
+              <a:t>*  | 2 | 2 | 4 |</a:t>
+            </a:r>
+          </a:p>
+          <a:p>
+            <a:r>
+              <a:rPr lang="en-US" sz="3200" dirty="0" smtClean="0">
+                <a:solidFill>
+                  <a:srgbClr val="3F5FBF"/>
+                </a:solidFill>
+                <a:latin typeface="Courier New"/>
+              </a:rPr>
+              <a:t> </a:t>
+            </a:r>
+            <a:r>
+              <a:rPr lang="en-US" sz="3200" dirty="0" smtClean="0">
+                <a:solidFill>
+                  <a:srgbClr val="3F5FBF"/>
+                </a:solidFill>
+                <a:latin typeface="Courier New"/>
+              </a:rPr>
+              <a:t>*/</a:t>
+            </a:r>
+            <a:endParaRPr lang="en-US" sz="3200" b="1" dirty="0" smtClean="0">
+              <a:solidFill>
+                <a:srgbClr val="7F0055"/>
+              </a:solidFill>
+              <a:latin typeface="Courier New"/>
+            </a:endParaRPr>
+          </a:p>
+        </p:txBody>
+      </p:sp>
+      <p:pic>
+        <p:nvPicPr>
+          <p:cNvPr id="70662" name="Picture 6" descr="magic, wizard icon"/>
+          <p:cNvPicPr>
+            <a:picLocks noChangeAspect="1" noChangeArrowheads="1"/>
+          </p:cNvPicPr>
+          <p:nvPr/>
+        </p:nvPicPr>
+        <p:blipFill>
+          <a:blip r:embed="rId4"/>
+          <a:srcRect/>
+          <a:stretch>
+            <a:fillRect/>
+          </a:stretch>
+        </p:blipFill>
+        <p:spPr bwMode="auto">
+          <a:xfrm>
+            <a:off x="635000" y="1143000"/>
+            <a:ext cx="1295400" cy="1295401"/>
+          </a:xfrm>
+          <a:prstGeom prst="rect">
+            <a:avLst/>
+          </a:prstGeom>
+          <a:noFill/>
+        </p:spPr>
+      </p:pic>
+      <p:sp>
+        <p:nvSpPr>
+          <p:cNvPr id="10" name="Rectangle 1"/>
+          <p:cNvSpPr txBox="1">
+            <a:spLocks noChangeArrowheads="1"/>
+          </p:cNvSpPr>
+          <p:nvPr/>
+        </p:nvSpPr>
+        <p:spPr bwMode="auto">
+          <a:xfrm>
+            <a:off x="3683000" y="6629400"/>
+            <a:ext cx="8686800" cy="1295400"/>
+          </a:xfrm>
+          <a:prstGeom prst="rect">
+            <a:avLst/>
+          </a:prstGeom>
+          <a:noFill/>
+          <a:ln w="12700">
+            <a:noFill/>
+            <a:miter lim="800000"/>
+            <a:headEnd/>
+            <a:tailEnd/>
+          </a:ln>
+          <a:effectLst/>
+        </p:spPr>
+        <p:txBody>
+          <a:bodyPr vert="horz" wrap="square" lIns="50800" tIns="50800" rIns="50800" bIns="50800" numCol="1" anchor="ctr" anchorCtr="0" compatLnSpc="1">
+            <a:prstTxWarp prst="textNoShape">
+              <a:avLst/>
+            </a:prstTxWarp>
+          </a:bodyPr>
+          <a:lstStyle/>
+          <a:p>
+            <a:pPr lvl="0"/>
+            <a:r>
+              <a:rPr lang="en-US" sz="4400" b="1" kern="0" dirty="0" smtClean="0">
+                <a:solidFill>
+                  <a:srgbClr val="FF0000"/>
+                </a:solidFill>
+                <a:latin typeface="Candara" pitchFamily="34" charset="0"/>
+                <a:ea typeface="+mj-ea"/>
+                <a:cs typeface="+mj-cs"/>
+                <a:sym typeface="Arial" charset="0"/>
+              </a:rPr>
+              <a:t>   Use </a:t>
+            </a:r>
+            <a:r>
+              <a:rPr lang="en-US" sz="4400" b="1" kern="0" dirty="0" smtClean="0">
+                <a:solidFill>
+                  <a:srgbClr val="FF0000"/>
+                </a:solidFill>
+                <a:latin typeface="Courier New" pitchFamily="49" charset="0"/>
+                <a:ea typeface="+mj-ea"/>
+                <a:cs typeface="Courier New" pitchFamily="49" charset="0"/>
+                <a:sym typeface="Arial" charset="0"/>
+              </a:rPr>
+              <a:t>‘!</a:t>
+            </a:r>
+            <a:r>
+              <a:rPr lang="en-US" sz="4400" b="1" kern="0" dirty="0" smtClean="0">
+                <a:solidFill>
+                  <a:srgbClr val="FF0000"/>
+                </a:solidFill>
+                <a:latin typeface="Courier New" pitchFamily="49" charset="0"/>
+                <a:cs typeface="Courier New" pitchFamily="49" charset="0"/>
+                <a:sym typeface="Arial" charset="0"/>
+              </a:rPr>
+              <a:t>‘</a:t>
+            </a:r>
+            <a:r>
+              <a:rPr lang="en-US" sz="4400" b="1" kern="0" dirty="0" smtClean="0">
+                <a:solidFill>
+                  <a:srgbClr val="FF0000"/>
+                </a:solidFill>
+                <a:latin typeface="Candara" pitchFamily="34" charset="0"/>
+                <a:ea typeface="+mj-ea"/>
+                <a:cs typeface="+mj-cs"/>
+                <a:sym typeface="Arial" charset="0"/>
+              </a:rPr>
+              <a:t>  to separate cells and</a:t>
+            </a:r>
+          </a:p>
+          <a:p>
+            <a:pPr lvl="0"/>
+            <a:r>
+              <a:rPr lang="en-US" sz="4400" b="1" kern="0" dirty="0" smtClean="0">
+                <a:solidFill>
+                  <a:srgbClr val="FF0000"/>
+                </a:solidFill>
+                <a:latin typeface="Candara" pitchFamily="34" charset="0"/>
+                <a:ea typeface="+mj-ea"/>
+                <a:cs typeface="+mj-cs"/>
+                <a:sym typeface="Arial" charset="0"/>
+              </a:rPr>
+              <a:t>           </a:t>
+            </a:r>
+            <a:r>
+              <a:rPr lang="en-US" sz="4400" b="1" kern="0" dirty="0" smtClean="0">
+                <a:solidFill>
+                  <a:srgbClr val="FF0000"/>
+                </a:solidFill>
+                <a:latin typeface="Courier New" pitchFamily="49" charset="0"/>
+                <a:cs typeface="Courier New" pitchFamily="49" charset="0"/>
+                <a:sym typeface="Arial" charset="0"/>
+              </a:rPr>
+              <a:t>‘</a:t>
+            </a:r>
+            <a:r>
+              <a:rPr lang="en-US" sz="4400" b="1" kern="0" dirty="0" smtClean="0">
+                <a:solidFill>
+                  <a:srgbClr val="FF0000"/>
+                </a:solidFill>
+                <a:latin typeface="Courier New" pitchFamily="49" charset="0"/>
+                <a:ea typeface="+mj-ea"/>
+                <a:cs typeface="Courier New" pitchFamily="49" charset="0"/>
+                <a:sym typeface="Arial" charset="0"/>
+              </a:rPr>
+              <a:t>|</a:t>
+            </a:r>
+            <a:r>
+              <a:rPr lang="en-US" sz="4400" b="1" kern="0" dirty="0" smtClean="0">
+                <a:solidFill>
+                  <a:srgbClr val="FF0000"/>
+                </a:solidFill>
+                <a:latin typeface="Courier New" pitchFamily="49" charset="0"/>
+                <a:cs typeface="Courier New" pitchFamily="49" charset="0"/>
+                <a:sym typeface="Arial" charset="0"/>
+              </a:rPr>
+              <a:t>‘</a:t>
+            </a:r>
+            <a:r>
+              <a:rPr lang="en-US" sz="4400" b="1" kern="0" dirty="0" smtClean="0">
+                <a:solidFill>
+                  <a:srgbClr val="FF0000"/>
+                </a:solidFill>
+                <a:latin typeface="Candara" pitchFamily="34" charset="0"/>
+                <a:ea typeface="+mj-ea"/>
+                <a:cs typeface="+mj-cs"/>
+                <a:sym typeface="Arial" charset="0"/>
+              </a:rPr>
+              <a:t>  to separate rows</a:t>
+            </a:r>
+            <a:endParaRPr kumimoji="0" lang="en-US" sz="4400" b="1" i="0" u="none" strike="noStrike" kern="0" cap="none" spc="0" normalizeH="0" baseline="0" noProof="0" dirty="0">
+              <a:ln>
+                <a:noFill/>
+              </a:ln>
+              <a:solidFill>
+                <a:srgbClr val="E75145"/>
+              </a:solidFill>
+              <a:effectLst/>
+              <a:uLnTx/>
+              <a:uFillTx/>
+              <a:latin typeface="Candara" pitchFamily="34" charset="0"/>
+              <a:ea typeface="+mj-ea"/>
+              <a:cs typeface="+mj-cs"/>
+              <a:sym typeface="Arial" charset="0"/>
+            </a:endParaRPr>
+          </a:p>
+        </p:txBody>
+      </p:sp>
+    </p:spTree>
+  </p:cSld>
+  <p:clrMapOvr>
+    <a:masterClrMapping/>
+  </p:clrMapOvr>
+  <p:transition>
+    <p:fade/>
+  </p:transition>
+  <p:timing>
+    <p:tnLst>
+      <p:par>
+        <p:cTn id="1" dur="indefinite" restart="never" nodeType="tmRoot">
+          <p:childTnLst>
+            <p:seq concurrent="1" nextAc="seek">
+              <p:cTn id="2" dur="indefinite" nodeType="mainSeq">
+                <p:childTnLst>
+                  <p:par>
+                    <p:cTn id="3" fill="hold">
+                      <p:stCondLst>
+                        <p:cond delay="indefinite"/>
+                        <p:cond evt="onBegin" delay="0">
+                          <p:tn val="2"/>
+                        </p:cond>
+                      </p:stCondLst>
+                      <p:childTnLst>
+                        <p:par>
+                          <p:cTn id="4" fill="hold">
+                            <p:stCondLst>
+                              <p:cond delay="0"/>
+                            </p:stCondLst>
+                            <p:childTnLst>
+                              <p:par>
+                                <p:cTn id="5" presetID="1" presetClass="entr" presetSubtype="0" fill="hold" nodeType="withEffect">
+                                  <p:stCondLst>
+                                    <p:cond delay="0"/>
+                                  </p:stCondLst>
+                                  <p:childTnLst>
+                                    <p:set>
+                                      <p:cBhvr>
+                                        <p:cTn id="6" dur="1" fill="hold">
+                                          <p:stCondLst>
+                                            <p:cond delay="0"/>
+                                          </p:stCondLst>
+                                        </p:cTn>
+                                        <p:tgtEl>
+                                          <p:spTgt spid="8"/>
+                                        </p:tgtEl>
+                                        <p:attrNameLst>
+                                          <p:attrName>style.visibility</p:attrName>
+                                        </p:attrNameLst>
+                                      </p:cBhvr>
+                                      <p:to>
+                                        <p:strVal val="visible"/>
+                                      </p:to>
+                                    </p:set>
+                                  </p:childTnLst>
+                                </p:cTn>
+                              </p:par>
+                            </p:childTnLst>
+                          </p:cTn>
+                        </p:par>
+                      </p:childTnLst>
+                    </p:cTn>
+                  </p:par>
+                </p:childTnLst>
+              </p:cTn>
+              <p:prevCondLst>
+                <p:cond evt="onPrev" delay="0">
+                  <p:tgtEl>
+                    <p:sldTgt/>
+                  </p:tgtEl>
+                </p:cond>
+              </p:prevCondLst>
+              <p:nextCondLst>
+                <p:cond evt="onNext" delay="0">
+                  <p:tgtEl>
+                    <p:sldTgt/>
+                  </p:tgtEl>
+                </p:cond>
+              </p:nextCondLst>
+            </p:seq>
+          </p:childTnLst>
+        </p:cTn>
+      </p:par>
+    </p:tnLst>
+  </p:timing>
+</p:sld>
+</file>
+
+<file path=ppt/slides/slide36.xml><?xml version="1.0" encoding="utf-8"?>
+<p:sld xmlns:a="http://schemas.openxmlformats.org/drawingml/2006/main" xmlns:r="http://schemas.openxmlformats.org/officeDocument/2006/relationships" xmlns:p="http://schemas.openxmlformats.org/presentationml/2006/main">
+  <p:cSld>
+    <p:spTree>
+      <p:nvGrpSpPr>
+        <p:cNvPr id="1" name=""/>
+        <p:cNvGrpSpPr/>
+        <p:nvPr/>
+      </p:nvGrpSpPr>
+      <p:grpSpPr>
+        <a:xfrm>
+          <a:off x="0" y="0"/>
+          <a:ext cx="0" cy="0"/>
+          <a:chOff x="0" y="0"/>
+          <a:chExt cx="0" cy="0"/>
+        </a:xfrm>
+      </p:grpSpPr>
+      <p:sp>
+        <p:nvSpPr>
+          <p:cNvPr id="8193" name="Rectangle 1"/>
+          <p:cNvSpPr>
+            <a:spLocks noGrp="1" noChangeArrowheads="1"/>
+          </p:cNvSpPr>
+          <p:nvPr>
+            <p:ph type="title"/>
+          </p:nvPr>
+        </p:nvSpPr>
+        <p:spPr>
+          <a:xfrm>
+            <a:off x="711200" y="0"/>
+            <a:ext cx="12509500" cy="914400"/>
+          </a:xfrm>
+          <a:ln/>
+        </p:spPr>
+        <p:txBody>
+          <a:bodyPr/>
+          <a:lstStyle/>
+          <a:p>
+            <a:pPr lvl="0"/>
+            <a:r>
+              <a:rPr lang="en-US" sz="5400" dirty="0" smtClean="0">
+                <a:latin typeface="Lucida Handwriting" pitchFamily="66" charset="0"/>
+              </a:rPr>
+              <a:t>     </a:t>
+            </a:r>
+            <a:r>
+              <a:rPr lang="en-US" sz="5400" dirty="0" smtClean="0">
+                <a:latin typeface="Lucida Handwriting" pitchFamily="66" charset="0"/>
+              </a:rPr>
+              <a:t>DSL</a:t>
+            </a:r>
+            <a:endParaRPr lang="en-US" dirty="0"/>
+          </a:p>
+        </p:txBody>
+      </p:sp>
+      <p:sp>
+        <p:nvSpPr>
+          <p:cNvPr id="7" name="Rectangle 6"/>
+          <p:cNvSpPr/>
+          <p:nvPr/>
+        </p:nvSpPr>
+        <p:spPr>
+          <a:xfrm>
+            <a:off x="4872690" y="1286470"/>
+            <a:ext cx="4634602" cy="923330"/>
+          </a:xfrm>
+          <a:prstGeom prst="rect">
+            <a:avLst/>
+          </a:prstGeom>
+        </p:spPr>
+        <p:txBody>
+          <a:bodyPr wrap="none">
+            <a:spAutoFit/>
+          </a:bodyPr>
+          <a:lstStyle/>
+          <a:p>
+            <a:pPr algn="ctr"/>
+            <a:r>
+              <a:rPr lang="en-US" sz="5400" b="1" kern="0" smtClean="0">
+                <a:solidFill>
+                  <a:srgbClr val="00CC66"/>
+                </a:solidFill>
+                <a:latin typeface="Lucida Handwriting" pitchFamily="66" charset="0"/>
+                <a:cs typeface="+mj-cs"/>
+                <a:sym typeface="Arial" charset="0"/>
+              </a:rPr>
+              <a:t>DataTables</a:t>
+            </a:r>
+            <a:endParaRPr lang="en-US" sz="5400" b="1" kern="0" dirty="0" smtClean="0">
+              <a:solidFill>
+                <a:srgbClr val="00CC66"/>
+              </a:solidFill>
+              <a:latin typeface="Lucida Handwriting" pitchFamily="66" charset="0"/>
+              <a:cs typeface="+mj-cs"/>
+              <a:sym typeface="Arial" charset="0"/>
+            </a:endParaRPr>
+          </a:p>
+        </p:txBody>
+      </p:sp>
+      <p:pic>
+        <p:nvPicPr>
+          <p:cNvPr id="8" name="Picture 10" descr="http://knowledgehub.zeus.com/media/Scala_Logo2008.png"/>
+          <p:cNvPicPr>
+            <a:picLocks noChangeAspect="1" noChangeArrowheads="1"/>
+          </p:cNvPicPr>
+          <p:nvPr/>
+        </p:nvPicPr>
+        <p:blipFill>
+          <a:blip r:embed="rId3"/>
+          <a:srcRect/>
+          <a:stretch>
+            <a:fillRect/>
+          </a:stretch>
+        </p:blipFill>
+        <p:spPr bwMode="auto">
+          <a:xfrm>
+            <a:off x="4140200" y="76200"/>
+            <a:ext cx="2279542" cy="679257"/>
+          </a:xfrm>
+          <a:prstGeom prst="rect">
+            <a:avLst/>
+          </a:prstGeom>
+          <a:noFill/>
+        </p:spPr>
+      </p:pic>
+      <p:sp>
+        <p:nvSpPr>
+          <p:cNvPr id="11" name="Rectangle 10"/>
+          <p:cNvSpPr/>
+          <p:nvPr/>
+        </p:nvSpPr>
+        <p:spPr>
+          <a:xfrm>
+            <a:off x="406400" y="2667000"/>
+            <a:ext cx="12344400" cy="5509200"/>
+          </a:xfrm>
+          <a:prstGeom prst="rect">
+            <a:avLst/>
+          </a:prstGeom>
+          <a:solidFill>
+            <a:schemeClr val="bg1"/>
+          </a:solidFill>
+          <a:ln>
+            <a:solidFill>
+              <a:schemeClr val="tx1"/>
+            </a:solidFill>
+            <a:prstDash val="dash"/>
+          </a:ln>
+        </p:spPr>
+        <p:txBody>
+          <a:bodyPr wrap="square">
+            <a:spAutoFit/>
+          </a:bodyPr>
+          <a:lstStyle/>
+          <a:p>
+            <a:r>
+              <a:rPr lang="en-US" sz="3200" b="1" dirty="0" smtClean="0">
+                <a:solidFill>
+                  <a:srgbClr val="7F0055"/>
+                </a:solidFill>
+                <a:latin typeface="Courier New"/>
+              </a:rPr>
+              <a:t>class</a:t>
+            </a:r>
+            <a:r>
+              <a:rPr lang="en-US" sz="3200" b="1" dirty="0" smtClean="0">
+                <a:latin typeface="Courier New"/>
+              </a:rPr>
+              <a:t> </a:t>
+            </a:r>
+            <a:r>
+              <a:rPr lang="en-US" sz="3200" b="1" dirty="0" err="1" smtClean="0">
+                <a:latin typeface="Courier New"/>
+              </a:rPr>
+              <a:t>DataTablesSpec</a:t>
+            </a:r>
+            <a:r>
+              <a:rPr lang="en-US" sz="3200" b="1" dirty="0" smtClean="0">
+                <a:latin typeface="Courier New"/>
+              </a:rPr>
+              <a:t> </a:t>
+            </a:r>
+            <a:r>
+              <a:rPr lang="en-US" sz="3200" b="1" dirty="0" smtClean="0">
+                <a:solidFill>
+                  <a:srgbClr val="7F0055"/>
+                </a:solidFill>
+                <a:latin typeface="Courier New"/>
+              </a:rPr>
+              <a:t>extends</a:t>
+            </a:r>
+            <a:r>
+              <a:rPr lang="en-US" sz="3200" b="1" dirty="0" smtClean="0">
+                <a:latin typeface="Courier New"/>
+              </a:rPr>
+              <a:t> Specification </a:t>
+            </a:r>
+            <a:r>
+              <a:rPr lang="en-US" sz="3200" b="1" dirty="0" smtClean="0">
+                <a:solidFill>
+                  <a:srgbClr val="7F0055"/>
+                </a:solidFill>
+                <a:latin typeface="Courier New"/>
+              </a:rPr>
+              <a:t>with</a:t>
+            </a:r>
+            <a:r>
+              <a:rPr lang="en-US" sz="3200" b="1" dirty="0" smtClean="0">
+                <a:latin typeface="Courier New"/>
+              </a:rPr>
+              <a:t> </a:t>
+            </a:r>
+            <a:r>
+              <a:rPr lang="en-US" sz="3200" b="1" dirty="0" smtClean="0">
+                <a:latin typeface="Courier New"/>
+              </a:rPr>
+              <a:t> </a:t>
+            </a:r>
+          </a:p>
+          <a:p>
+            <a:r>
+              <a:rPr lang="en-US" sz="3200" b="1" dirty="0" smtClean="0">
+                <a:latin typeface="Courier New"/>
+              </a:rPr>
+              <a:t>                                     </a:t>
+            </a:r>
+            <a:r>
+              <a:rPr lang="en-US" sz="3200" b="1" dirty="0" err="1" smtClean="0">
+                <a:latin typeface="Courier New"/>
+              </a:rPr>
+              <a:t>DataTables</a:t>
+            </a:r>
+            <a:r>
+              <a:rPr lang="en-US" sz="3200" b="1" dirty="0" smtClean="0">
+                <a:latin typeface="Courier New"/>
+              </a:rPr>
+              <a:t> </a:t>
+            </a:r>
+            <a:r>
+              <a:rPr lang="en-US" sz="3200" b="1" dirty="0" smtClean="0">
+                <a:latin typeface="Courier New"/>
+              </a:rPr>
+              <a:t>{</a:t>
+            </a:r>
+          </a:p>
+          <a:p>
+            <a:r>
+              <a:rPr lang="en-US" sz="3200" dirty="0" smtClean="0">
+                <a:solidFill>
+                  <a:srgbClr val="2A00FF"/>
+                </a:solidFill>
+                <a:latin typeface="Courier New"/>
+              </a:rPr>
+              <a:t>  "</a:t>
+            </a:r>
+            <a:r>
+              <a:rPr lang="en-US" sz="3200" dirty="0" smtClean="0">
+                <a:solidFill>
+                  <a:srgbClr val="2A00FF"/>
+                </a:solidFill>
+                <a:latin typeface="Courier New"/>
+              </a:rPr>
+              <a:t>lots of examples"</a:t>
+            </a:r>
+            <a:r>
+              <a:rPr lang="en-US" sz="3200" dirty="0" smtClean="0">
+                <a:latin typeface="Courier New"/>
+              </a:rPr>
+              <a:t> &gt;&gt; {</a:t>
+            </a:r>
+          </a:p>
+          <a:p>
+            <a:r>
+              <a:rPr lang="en-US" sz="3200" dirty="0" smtClean="0">
+                <a:latin typeface="Courier New"/>
+              </a:rPr>
+              <a:t>    </a:t>
+            </a:r>
+            <a:r>
+              <a:rPr lang="en-US" sz="3200" dirty="0" smtClean="0">
+                <a:solidFill>
+                  <a:srgbClr val="2A00FF"/>
+                </a:solidFill>
+                <a:latin typeface="Courier New"/>
+              </a:rPr>
+              <a:t>"a"</a:t>
+            </a:r>
+            <a:r>
+              <a:rPr lang="en-US" sz="3200" dirty="0" smtClean="0">
+                <a:latin typeface="Courier New"/>
+              </a:rPr>
+              <a:t> | </a:t>
+            </a:r>
+            <a:r>
+              <a:rPr lang="en-US" sz="3200" dirty="0" smtClean="0">
+                <a:solidFill>
+                  <a:srgbClr val="2A00FF"/>
+                </a:solidFill>
+                <a:latin typeface="Courier New"/>
+              </a:rPr>
+              <a:t>"b"</a:t>
+            </a:r>
+            <a:r>
+              <a:rPr lang="en-US" sz="3200" dirty="0" smtClean="0">
+                <a:latin typeface="Courier New"/>
+              </a:rPr>
+              <a:t> | </a:t>
+            </a:r>
+            <a:r>
+              <a:rPr lang="en-US" sz="3200" dirty="0" smtClean="0">
+                <a:solidFill>
+                  <a:srgbClr val="2A00FF"/>
+                </a:solidFill>
+                <a:latin typeface="Courier New"/>
+              </a:rPr>
+              <a:t>"a + b"</a:t>
+            </a:r>
+            <a:r>
+              <a:rPr lang="en-US" sz="3200" dirty="0" smtClean="0">
+                <a:latin typeface="Courier New"/>
+              </a:rPr>
+              <a:t> |</a:t>
+            </a:r>
+          </a:p>
+          <a:p>
+            <a:r>
+              <a:rPr lang="en-US" sz="3200" dirty="0" smtClean="0">
+                <a:latin typeface="Courier New"/>
+              </a:rPr>
+              <a:t>  </a:t>
+            </a:r>
+            <a:r>
+              <a:rPr lang="en-US" sz="3200" dirty="0" smtClean="0">
+                <a:latin typeface="Courier New"/>
+              </a:rPr>
+              <a:t>   1  </a:t>
+            </a:r>
+            <a:r>
+              <a:rPr lang="en-US" sz="3200" dirty="0" smtClean="0">
+                <a:latin typeface="Courier New"/>
+              </a:rPr>
+              <a:t>!  2  !    3    |</a:t>
+            </a:r>
+          </a:p>
+          <a:p>
+            <a:r>
+              <a:rPr lang="en-US" sz="3200" dirty="0" smtClean="0">
+                <a:latin typeface="Courier New"/>
+              </a:rPr>
+              <a:t>  </a:t>
+            </a:r>
+            <a:r>
+              <a:rPr lang="en-US" sz="3200" dirty="0" smtClean="0">
+                <a:latin typeface="Courier New"/>
+              </a:rPr>
+              <a:t>   2  </a:t>
+            </a:r>
+            <a:r>
+              <a:rPr lang="en-US" sz="3200" dirty="0" smtClean="0">
+                <a:latin typeface="Courier New"/>
+              </a:rPr>
+              <a:t>!  2  !    4    |</a:t>
+            </a:r>
+          </a:p>
+          <a:p>
+            <a:r>
+              <a:rPr lang="pt-BR" sz="3200" dirty="0" smtClean="0">
+                <a:latin typeface="Courier New"/>
+              </a:rPr>
+              <a:t>  </a:t>
+            </a:r>
+            <a:r>
+              <a:rPr lang="pt-BR" sz="3200" dirty="0" smtClean="0">
+                <a:latin typeface="Courier New"/>
+              </a:rPr>
+              <a:t>   2  </a:t>
+            </a:r>
+            <a:r>
+              <a:rPr lang="pt-BR" sz="3200" dirty="0" smtClean="0">
+                <a:latin typeface="Courier New"/>
+              </a:rPr>
+              <a:t>!  3  !    4    |&gt; { (a, b, c) =&gt;</a:t>
+            </a:r>
+          </a:p>
+          <a:p>
+            <a:r>
+              <a:rPr lang="en-US" sz="3200" dirty="0" smtClean="0">
+                <a:latin typeface="Courier New"/>
+              </a:rPr>
+              <a:t>   </a:t>
+            </a:r>
+            <a:r>
+              <a:rPr lang="en-US" sz="3200" dirty="0" smtClean="0">
+                <a:latin typeface="Courier New"/>
+              </a:rPr>
+              <a:t>    a </a:t>
+            </a:r>
+            <a:r>
+              <a:rPr lang="en-US" sz="3200" dirty="0" smtClean="0">
+                <a:latin typeface="Courier New"/>
+              </a:rPr>
+              <a:t>+ b must_== c</a:t>
+            </a:r>
+          </a:p>
+          <a:p>
+            <a:r>
+              <a:rPr lang="en-US" sz="3200" dirty="0" smtClean="0">
+                <a:latin typeface="Courier New"/>
+              </a:rPr>
+              <a:t> </a:t>
+            </a:r>
+            <a:r>
+              <a:rPr lang="en-US" sz="3200" dirty="0" smtClean="0">
+                <a:latin typeface="Courier New"/>
+              </a:rPr>
+              <a:t>   }</a:t>
+            </a:r>
+            <a:endParaRPr lang="en-US" sz="3200" dirty="0" smtClean="0">
+              <a:latin typeface="Courier New"/>
+            </a:endParaRPr>
+          </a:p>
+          <a:p>
+            <a:r>
+              <a:rPr lang="en-US" sz="3200" dirty="0" smtClean="0">
+                <a:latin typeface="Courier New"/>
+              </a:rPr>
+              <a:t>  </a:t>
+            </a:r>
+            <a:r>
+              <a:rPr lang="en-US" sz="3200" dirty="0" smtClean="0">
+                <a:latin typeface="Courier New"/>
+              </a:rPr>
+              <a:t>}</a:t>
+            </a:r>
+            <a:endParaRPr lang="en-US" sz="3200" dirty="0" smtClean="0">
+              <a:latin typeface="Courier New"/>
+            </a:endParaRPr>
+          </a:p>
+          <a:p>
+            <a:r>
+              <a:rPr lang="en-US" sz="3200" dirty="0" smtClean="0">
+                <a:latin typeface="Courier New"/>
+              </a:rPr>
+              <a:t>}</a:t>
             </a:r>
             <a:endParaRPr lang="en-US" sz="3200" b="1" dirty="0" smtClean="0">
               <a:solidFill>

</xml_diff>

<commit_message>
added slides for apply and implicit parameters
</commit_message>
<xml_diff>
--- a/src/main/resources/oscon_2010_specs.pptx
+++ b/src/main/resources/oscon_2010_specs.pptx
@@ -6,7 +6,7 @@
     <p:sldMasterId id="2147483651" r:id="rId2"/>
   </p:sldMasterIdLst>
   <p:notesMasterIdLst>
-    <p:notesMasterId r:id="rId49"/>
+    <p:notesMasterId r:id="rId51"/>
   </p:notesMasterIdLst>
   <p:sldIdLst>
     <p:sldId id="258" r:id="rId3"/>
@@ -54,7 +54,9 @@
     <p:sldId id="301" r:id="rId45"/>
     <p:sldId id="302" r:id="rId46"/>
     <p:sldId id="298" r:id="rId47"/>
-    <p:sldId id="299" r:id="rId48"/>
+    <p:sldId id="306" r:id="rId48"/>
+    <p:sldId id="307" r:id="rId49"/>
+    <p:sldId id="308" r:id="rId50"/>
   </p:sldIdLst>
   <p:sldSz cx="13004800" cy="9753600"/>
   <p:notesSz cx="6858000" cy="9144000"/>
@@ -4024,6 +4026,174 @@
               <a:rPr lang="en-US"/>
               <a:pPr/>
               <a:t>46</a:t>
+            </a:fld>
+            <a:endParaRPr lang="en-US"/>
+          </a:p>
+        </p:txBody>
+      </p:sp>
+      <p:sp>
+        <p:nvSpPr>
+          <p:cNvPr id="19458" name="Rectangle 2"/>
+          <p:cNvSpPr>
+            <a:spLocks noGrp="1" noRot="1" noChangeAspect="1" noChangeArrowheads="1" noTextEdit="1"/>
+          </p:cNvSpPr>
+          <p:nvPr>
+            <p:ph type="sldImg"/>
+          </p:nvPr>
+        </p:nvSpPr>
+        <p:spPr>
+          <a:ln/>
+        </p:spPr>
+      </p:sp>
+      <p:sp>
+        <p:nvSpPr>
+          <p:cNvPr id="19459" name="Rectangle 3"/>
+          <p:cNvSpPr>
+            <a:spLocks noGrp="1"/>
+          </p:cNvSpPr>
+          <p:nvPr>
+            <p:ph type="body" idx="1"/>
+          </p:nvPr>
+        </p:nvSpPr>
+        <p:spPr/>
+        <p:txBody>
+          <a:bodyPr/>
+          <a:lstStyle/>
+          <a:p>
+            <a:endParaRPr lang="en-US"/>
+          </a:p>
+        </p:txBody>
+      </p:sp>
+    </p:spTree>
+  </p:cSld>
+  <p:clrMapOvr>
+    <a:masterClrMapping/>
+  </p:clrMapOvr>
+</p:notes>
+</file>
+
+<file path=ppt/notesSlides/notesSlide47.xml><?xml version="1.0" encoding="utf-8"?>
+<p:notes xmlns:a="http://schemas.openxmlformats.org/drawingml/2006/main" xmlns:r="http://schemas.openxmlformats.org/officeDocument/2006/relationships" xmlns:p="http://schemas.openxmlformats.org/presentationml/2006/main">
+  <p:cSld>
+    <p:spTree>
+      <p:nvGrpSpPr>
+        <p:cNvPr id="1" name=""/>
+        <p:cNvGrpSpPr/>
+        <p:nvPr/>
+      </p:nvGrpSpPr>
+      <p:grpSpPr>
+        <a:xfrm>
+          <a:off x="0" y="0"/>
+          <a:ext cx="0" cy="0"/>
+          <a:chOff x="0" y="0"/>
+          <a:chExt cx="0" cy="0"/>
+        </a:xfrm>
+      </p:grpSpPr>
+      <p:sp>
+        <p:nvSpPr>
+          <p:cNvPr id="7" name="Rectangle 7"/>
+          <p:cNvSpPr>
+            <a:spLocks noGrp="1"/>
+          </p:cNvSpPr>
+          <p:nvPr>
+            <p:ph type="sldNum" sz="quarter" idx="5"/>
+          </p:nvPr>
+        </p:nvSpPr>
+        <p:spPr>
+          <a:ln/>
+        </p:spPr>
+        <p:txBody>
+          <a:bodyPr/>
+          <a:lstStyle/>
+          <a:p>
+            <a:fld id="{27AEA7DA-096A-4FB7-B4B3-D12717EF4BDD}" type="slidenum">
+              <a:rPr lang="en-US"/>
+              <a:pPr/>
+              <a:t>47</a:t>
+            </a:fld>
+            <a:endParaRPr lang="en-US"/>
+          </a:p>
+        </p:txBody>
+      </p:sp>
+      <p:sp>
+        <p:nvSpPr>
+          <p:cNvPr id="19458" name="Rectangle 2"/>
+          <p:cNvSpPr>
+            <a:spLocks noGrp="1" noRot="1" noChangeAspect="1" noChangeArrowheads="1" noTextEdit="1"/>
+          </p:cNvSpPr>
+          <p:nvPr>
+            <p:ph type="sldImg"/>
+          </p:nvPr>
+        </p:nvSpPr>
+        <p:spPr>
+          <a:ln/>
+        </p:spPr>
+      </p:sp>
+      <p:sp>
+        <p:nvSpPr>
+          <p:cNvPr id="19459" name="Rectangle 3"/>
+          <p:cNvSpPr>
+            <a:spLocks noGrp="1"/>
+          </p:cNvSpPr>
+          <p:nvPr>
+            <p:ph type="body" idx="1"/>
+          </p:nvPr>
+        </p:nvSpPr>
+        <p:spPr/>
+        <p:txBody>
+          <a:bodyPr/>
+          <a:lstStyle/>
+          <a:p>
+            <a:endParaRPr lang="en-US"/>
+          </a:p>
+        </p:txBody>
+      </p:sp>
+    </p:spTree>
+  </p:cSld>
+  <p:clrMapOvr>
+    <a:masterClrMapping/>
+  </p:clrMapOvr>
+</p:notes>
+</file>
+
+<file path=ppt/notesSlides/notesSlide48.xml><?xml version="1.0" encoding="utf-8"?>
+<p:notes xmlns:a="http://schemas.openxmlformats.org/drawingml/2006/main" xmlns:r="http://schemas.openxmlformats.org/officeDocument/2006/relationships" xmlns:p="http://schemas.openxmlformats.org/presentationml/2006/main">
+  <p:cSld>
+    <p:spTree>
+      <p:nvGrpSpPr>
+        <p:cNvPr id="1" name=""/>
+        <p:cNvGrpSpPr/>
+        <p:nvPr/>
+      </p:nvGrpSpPr>
+      <p:grpSpPr>
+        <a:xfrm>
+          <a:off x="0" y="0"/>
+          <a:ext cx="0" cy="0"/>
+          <a:chOff x="0" y="0"/>
+          <a:chExt cx="0" cy="0"/>
+        </a:xfrm>
+      </p:grpSpPr>
+      <p:sp>
+        <p:nvSpPr>
+          <p:cNvPr id="7" name="Rectangle 7"/>
+          <p:cNvSpPr>
+            <a:spLocks noGrp="1"/>
+          </p:cNvSpPr>
+          <p:nvPr>
+            <p:ph type="sldNum" sz="quarter" idx="5"/>
+          </p:nvPr>
+        </p:nvSpPr>
+        <p:spPr>
+          <a:ln/>
+        </p:spPr>
+        <p:txBody>
+          <a:bodyPr/>
+          <a:lstStyle/>
+          <a:p>
+            <a:fld id="{27AEA7DA-096A-4FB7-B4B3-D12717EF4BDD}" type="slidenum">
+              <a:rPr lang="en-US"/>
+              <a:pPr/>
+              <a:t>48</a:t>
             </a:fld>
             <a:endParaRPr lang="en-US"/>
           </a:p>
@@ -27923,9 +28093,476 @@
           <a:noFill/>
         </p:spPr>
       </p:pic>
+      <p:sp>
+        <p:nvSpPr>
+          <p:cNvPr id="11" name="Rectangle 10"/>
+          <p:cNvSpPr/>
+          <p:nvPr/>
+        </p:nvSpPr>
+        <p:spPr>
+          <a:xfrm>
+            <a:off x="330200" y="2819400"/>
+            <a:ext cx="12344400" cy="5262979"/>
+          </a:xfrm>
+          <a:prstGeom prst="rect">
+            <a:avLst/>
+          </a:prstGeom>
+          <a:ln>
+            <a:solidFill>
+              <a:schemeClr val="tx1"/>
+            </a:solidFill>
+            <a:prstDash val="dash"/>
+          </a:ln>
+        </p:spPr>
+        <p:txBody>
+          <a:bodyPr wrap="square">
+            <a:spAutoFit/>
+          </a:bodyPr>
+          <a:lstStyle/>
+          <a:p>
+            <a:r>
+              <a:rPr lang="en-US" sz="2800" b="1" dirty="0" smtClean="0">
+                <a:solidFill>
+                  <a:srgbClr val="7F0055"/>
+                </a:solidFill>
+                <a:latin typeface="Courier New"/>
+              </a:rPr>
+              <a:t>object</a:t>
+            </a:r>
+            <a:r>
+              <a:rPr lang="en-US" sz="2800" b="1" dirty="0" smtClean="0">
+                <a:latin typeface="Courier New"/>
+              </a:rPr>
+              <a:t> </a:t>
+            </a:r>
+            <a:r>
+              <a:rPr lang="en-US" sz="2800" b="1" dirty="0" err="1" smtClean="0">
+                <a:latin typeface="Courier New"/>
+              </a:rPr>
+              <a:t>DBContext</a:t>
+            </a:r>
+            <a:r>
+              <a:rPr lang="en-US" sz="2800" b="1" dirty="0" smtClean="0">
+                <a:latin typeface="Courier New"/>
+              </a:rPr>
+              <a:t> </a:t>
+            </a:r>
+            <a:r>
+              <a:rPr lang="en-US" sz="2800" b="1" dirty="0" smtClean="0">
+                <a:solidFill>
+                  <a:srgbClr val="7F0055"/>
+                </a:solidFill>
+                <a:latin typeface="Courier New"/>
+              </a:rPr>
+              <a:t>extends</a:t>
+            </a:r>
+            <a:r>
+              <a:rPr lang="en-US" sz="2800" b="1" dirty="0" smtClean="0">
+                <a:latin typeface="Courier New"/>
+              </a:rPr>
+              <a:t> Specification {</a:t>
+            </a:r>
+          </a:p>
+          <a:p>
+            <a:r>
+              <a:rPr lang="en-US" sz="2800" dirty="0" smtClean="0">
+                <a:latin typeface="Courier New"/>
+              </a:rPr>
+              <a:t>  </a:t>
+            </a:r>
+            <a:r>
+              <a:rPr lang="en-US" sz="2800" b="1" dirty="0" err="1" smtClean="0">
+                <a:solidFill>
+                  <a:srgbClr val="7F0055"/>
+                </a:solidFill>
+                <a:latin typeface="Courier New"/>
+              </a:rPr>
+              <a:t>val</a:t>
+            </a:r>
+            <a:r>
+              <a:rPr lang="en-US" sz="2800" b="1" dirty="0" smtClean="0">
+                <a:latin typeface="Courier New"/>
+              </a:rPr>
+              <a:t> </a:t>
+            </a:r>
+            <a:r>
+              <a:rPr lang="en-US" sz="2800" b="1" dirty="0" smtClean="0">
+                <a:latin typeface="Courier New"/>
+              </a:rPr>
+              <a:t>setup = </a:t>
+            </a:r>
+            <a:r>
+              <a:rPr lang="en-US" sz="2800" b="1" dirty="0" smtClean="0">
+                <a:solidFill>
+                  <a:srgbClr val="7F0055"/>
+                </a:solidFill>
+                <a:latin typeface="Courier New"/>
+              </a:rPr>
+              <a:t>new</a:t>
+            </a:r>
+            <a:r>
+              <a:rPr lang="en-US" sz="2800" b="1" dirty="0" smtClean="0">
+                <a:latin typeface="Courier New"/>
+              </a:rPr>
+              <a:t> </a:t>
+            </a:r>
+            <a:r>
+              <a:rPr lang="en-US" sz="2800" b="1" dirty="0" err="1" smtClean="0">
+                <a:latin typeface="Courier New"/>
+              </a:rPr>
+              <a:t>SpecContext</a:t>
+            </a:r>
+            <a:r>
+              <a:rPr lang="en-US" sz="2800" b="1" dirty="0" smtClean="0">
+                <a:latin typeface="Courier New"/>
+              </a:rPr>
+              <a:t> {</a:t>
+            </a:r>
+          </a:p>
+          <a:p>
+            <a:r>
+              <a:rPr lang="en-US" sz="2800" dirty="0" smtClean="0">
+                <a:latin typeface="Courier New"/>
+              </a:rPr>
+              <a:t>    </a:t>
+            </a:r>
+            <a:r>
+              <a:rPr lang="en-US" sz="2800" dirty="0" err="1" smtClean="0">
+                <a:latin typeface="Courier New"/>
+              </a:rPr>
+              <a:t>beforeExample</a:t>
+            </a:r>
+            <a:r>
+              <a:rPr lang="en-US" sz="2800" dirty="0" smtClean="0">
+                <a:latin typeface="Courier New"/>
+              </a:rPr>
+              <a:t>(</a:t>
+            </a:r>
+            <a:r>
+              <a:rPr lang="en-US" sz="2800" dirty="0" err="1" smtClean="0">
+                <a:latin typeface="Courier New"/>
+              </a:rPr>
+              <a:t>deleteUsersTable</a:t>
+            </a:r>
+            <a:r>
+              <a:rPr lang="en-US" sz="2800" dirty="0" smtClean="0">
+                <a:latin typeface="Courier New"/>
+              </a:rPr>
+              <a:t>)</a:t>
+            </a:r>
+          </a:p>
+          <a:p>
+            <a:r>
+              <a:rPr lang="en-US" sz="2800" dirty="0" smtClean="0">
+                <a:latin typeface="Courier New"/>
+              </a:rPr>
+              <a:t>    </a:t>
+            </a:r>
+            <a:r>
+              <a:rPr lang="en-US" sz="2800" dirty="0" err="1" smtClean="0">
+                <a:latin typeface="Courier New"/>
+              </a:rPr>
+              <a:t>aroundExpectations</a:t>
+            </a:r>
+            <a:r>
+              <a:rPr lang="en-US" sz="2800" dirty="0" smtClean="0">
+                <a:latin typeface="Courier New"/>
+              </a:rPr>
+              <a:t>(</a:t>
+            </a:r>
+            <a:r>
+              <a:rPr lang="en-US" sz="2800" dirty="0" err="1" smtClean="0">
+                <a:latin typeface="Courier New"/>
+              </a:rPr>
+              <a:t>inDatabaseSession</a:t>
+            </a:r>
+            <a:r>
+              <a:rPr lang="en-US" sz="2800" dirty="0" smtClean="0">
+                <a:latin typeface="Courier New"/>
+              </a:rPr>
+              <a:t>(_)) </a:t>
+            </a:r>
+          </a:p>
+          <a:p>
+            <a:r>
+              <a:rPr lang="en-US" sz="2800" dirty="0" smtClean="0">
+                <a:latin typeface="Courier New"/>
+              </a:rPr>
+              <a:t>  </a:t>
+            </a:r>
+            <a:r>
+              <a:rPr lang="en-US" sz="2800" dirty="0" smtClean="0">
+                <a:latin typeface="Courier New"/>
+              </a:rPr>
+              <a:t>}</a:t>
+            </a:r>
+            <a:endParaRPr lang="en-US" sz="2800" dirty="0" smtClean="0">
+              <a:latin typeface="Courier New"/>
+            </a:endParaRPr>
+          </a:p>
+          <a:p>
+            <a:r>
+              <a:rPr lang="en-US" sz="2800" dirty="0" smtClean="0">
+                <a:latin typeface="Courier New"/>
+              </a:rPr>
+              <a:t>}</a:t>
+            </a:r>
+            <a:endParaRPr lang="en-US" sz="2800" dirty="0" smtClean="0">
+              <a:latin typeface="Courier New"/>
+            </a:endParaRPr>
+          </a:p>
+          <a:p>
+            <a:endParaRPr lang="en-US" sz="2800" b="1" dirty="0" smtClean="0">
+              <a:solidFill>
+                <a:srgbClr val="7F0055"/>
+              </a:solidFill>
+              <a:latin typeface="Courier New"/>
+            </a:endParaRPr>
+          </a:p>
+          <a:p>
+            <a:r>
+              <a:rPr lang="en-US" sz="2800" b="1" dirty="0" smtClean="0">
+                <a:solidFill>
+                  <a:srgbClr val="7F0055"/>
+                </a:solidFill>
+                <a:latin typeface="Courier New"/>
+              </a:rPr>
+              <a:t>object</a:t>
+            </a:r>
+            <a:r>
+              <a:rPr lang="en-US" sz="2800" b="1" dirty="0" smtClean="0">
+                <a:latin typeface="Courier New"/>
+              </a:rPr>
+              <a:t> </a:t>
+            </a:r>
+            <a:r>
+              <a:rPr lang="en-US" sz="2800" b="1" dirty="0" err="1" smtClean="0">
+                <a:latin typeface="Courier New"/>
+              </a:rPr>
+              <a:t>RepositorySpecification</a:t>
+            </a:r>
+            <a:r>
+              <a:rPr lang="en-US" sz="2800" b="1" dirty="0" smtClean="0">
+                <a:latin typeface="Courier New"/>
+              </a:rPr>
+              <a:t> </a:t>
+            </a:r>
+            <a:r>
+              <a:rPr lang="en-US" sz="2800" b="1" dirty="0" smtClean="0">
+                <a:solidFill>
+                  <a:srgbClr val="7F0055"/>
+                </a:solidFill>
+                <a:latin typeface="Courier New"/>
+              </a:rPr>
+              <a:t>extends</a:t>
+            </a:r>
+            <a:r>
+              <a:rPr lang="en-US" sz="2800" b="1" dirty="0" smtClean="0">
+                <a:latin typeface="Courier New"/>
+              </a:rPr>
+              <a:t> Specification {</a:t>
+            </a:r>
+          </a:p>
+          <a:p>
+            <a:r>
+              <a:rPr lang="en-US" sz="2800" dirty="0" smtClean="0">
+                <a:latin typeface="Courier New"/>
+              </a:rPr>
+              <a:t>  </a:t>
+            </a:r>
+            <a:r>
+              <a:rPr lang="en-US" sz="2800" dirty="0" smtClean="0">
+                <a:solidFill>
+                  <a:srgbClr val="3F7F5F"/>
+                </a:solidFill>
+                <a:latin typeface="Courier New"/>
+              </a:rPr>
+              <a:t>// </a:t>
+            </a:r>
+            <a:r>
+              <a:rPr lang="en-US" sz="2800" dirty="0" smtClean="0">
+                <a:solidFill>
+                  <a:srgbClr val="3F7F5F"/>
+                </a:solidFill>
+                <a:latin typeface="Courier New"/>
+              </a:rPr>
+              <a:t>equivalent to: </a:t>
+            </a:r>
+            <a:r>
+              <a:rPr lang="en-US" sz="2800" b="1" dirty="0" err="1" smtClean="0">
+                <a:solidFill>
+                  <a:srgbClr val="3F7F5F"/>
+                </a:solidFill>
+                <a:latin typeface="Courier New"/>
+              </a:rPr>
+              <a:t>DBContext.setup.apply</a:t>
+            </a:r>
+            <a:r>
+              <a:rPr lang="en-US" sz="2800" b="1" dirty="0" smtClean="0">
+                <a:solidFill>
+                  <a:srgbClr val="3F7F5F"/>
+                </a:solidFill>
+                <a:latin typeface="Courier New"/>
+              </a:rPr>
+              <a:t>(this)</a:t>
+            </a:r>
+            <a:r>
+              <a:rPr lang="en-US" sz="2800" dirty="0" smtClean="0">
+                <a:solidFill>
+                  <a:srgbClr val="3F7F5F"/>
+                </a:solidFill>
+                <a:latin typeface="Courier New"/>
+              </a:rPr>
+              <a:t>    </a:t>
+            </a:r>
+          </a:p>
+          <a:p>
+            <a:r>
+              <a:rPr lang="en-US" sz="2800" dirty="0" smtClean="0">
+                <a:latin typeface="Courier New"/>
+              </a:rPr>
+              <a:t>  </a:t>
+            </a:r>
+            <a:r>
+              <a:rPr lang="en-US" sz="2800" dirty="0" err="1" smtClean="0">
+                <a:latin typeface="Courier New"/>
+              </a:rPr>
+              <a:t>DBContext.setup</a:t>
+            </a:r>
+            <a:r>
+              <a:rPr lang="en-US" sz="2800" dirty="0" smtClean="0">
+                <a:latin typeface="Courier New"/>
+              </a:rPr>
+              <a:t>(</a:t>
+            </a:r>
+            <a:r>
+              <a:rPr lang="en-US" sz="2800" b="1" dirty="0" smtClean="0">
+                <a:solidFill>
+                  <a:srgbClr val="7F0055"/>
+                </a:solidFill>
+                <a:latin typeface="Courier New"/>
+              </a:rPr>
+              <a:t>this</a:t>
+            </a:r>
+            <a:r>
+              <a:rPr lang="en-US" sz="2800" b="1" dirty="0" smtClean="0">
+                <a:latin typeface="Courier New"/>
+              </a:rPr>
+              <a:t>)</a:t>
+            </a:r>
+          </a:p>
+          <a:p>
+            <a:r>
+              <a:rPr lang="en-US" sz="2800" dirty="0" smtClean="0">
+                <a:latin typeface="Courier New"/>
+              </a:rPr>
+              <a:t>  </a:t>
+            </a:r>
+            <a:r>
+              <a:rPr lang="en-US" sz="2800" dirty="0" smtClean="0">
+                <a:solidFill>
+                  <a:srgbClr val="2A00FF"/>
+                </a:solidFill>
+                <a:latin typeface="Courier New"/>
+              </a:rPr>
+              <a:t>"</a:t>
+            </a:r>
+            <a:r>
+              <a:rPr lang="en-US" sz="2800" dirty="0" smtClean="0">
+                <a:solidFill>
+                  <a:srgbClr val="2A00FF"/>
+                </a:solidFill>
+                <a:latin typeface="Courier New"/>
+              </a:rPr>
+              <a:t>A Users repository"</a:t>
+            </a:r>
+            <a:r>
+              <a:rPr lang="en-US" sz="2800" dirty="0" smtClean="0">
+                <a:latin typeface="Courier New"/>
+              </a:rPr>
+              <a:t> can </a:t>
+            </a:r>
+            <a:r>
+              <a:rPr lang="en-US" sz="2800" dirty="0" smtClean="0">
+                <a:latin typeface="Courier New"/>
+              </a:rPr>
+              <a:t>{ </a:t>
+            </a:r>
+            <a:r>
+              <a:rPr lang="en-US" sz="2800" dirty="0" smtClean="0">
+                <a:solidFill>
+                  <a:srgbClr val="3F7F5F"/>
+                </a:solidFill>
+                <a:latin typeface="Courier New"/>
+              </a:rPr>
+              <a:t>/*...*/ </a:t>
+            </a:r>
+            <a:r>
+              <a:rPr lang="en-US" sz="2800" dirty="0" smtClean="0">
+                <a:latin typeface="Courier New"/>
+              </a:rPr>
+              <a:t>}</a:t>
+            </a:r>
+            <a:endParaRPr lang="en-US" sz="2800" dirty="0" smtClean="0">
+              <a:latin typeface="Courier New"/>
+            </a:endParaRPr>
+          </a:p>
+          <a:p>
+            <a:r>
+              <a:rPr lang="en-US" sz="2800" dirty="0" smtClean="0">
+                <a:latin typeface="Courier New"/>
+              </a:rPr>
+              <a:t>}</a:t>
+            </a:r>
+            <a:endParaRPr lang="en-US" sz="2800" b="1" dirty="0" smtClean="0">
+              <a:solidFill>
+                <a:srgbClr val="7F0055"/>
+              </a:solidFill>
+              <a:latin typeface="Courier New"/>
+            </a:endParaRPr>
+          </a:p>
+        </p:txBody>
+      </p:sp>
+      <p:sp>
+        <p:nvSpPr>
+          <p:cNvPr id="14" name="Rectangle 13"/>
+          <p:cNvSpPr/>
+          <p:nvPr/>
+        </p:nvSpPr>
+        <p:spPr>
+          <a:xfrm>
+            <a:off x="5156245" y="1447800"/>
+            <a:ext cx="2260555" cy="923330"/>
+          </a:xfrm>
+          <a:prstGeom prst="rect">
+            <a:avLst/>
+          </a:prstGeom>
+        </p:spPr>
+        <p:txBody>
+          <a:bodyPr wrap="none">
+            <a:spAutoFit/>
+          </a:bodyPr>
+          <a:lstStyle/>
+          <a:p>
+            <a:pPr algn="ctr"/>
+            <a:r>
+              <a:rPr lang="en-US" sz="5400" b="1" kern="0" dirty="0" smtClean="0">
+                <a:solidFill>
+                  <a:srgbClr val="0C0F20"/>
+                </a:solidFill>
+                <a:latin typeface="Lucida Handwriting" pitchFamily="66" charset="0"/>
+                <a:cs typeface="+mj-cs"/>
+                <a:sym typeface="Arial" charset="0"/>
+              </a:rPr>
+              <a:t>apply</a:t>
+            </a:r>
+            <a:endParaRPr lang="en-US" dirty="0"/>
+          </a:p>
+        </p:txBody>
+      </p:sp>
       <p:pic>
         <p:nvPicPr>
-          <p:cNvPr id="9" name="Picture 6" descr="magic, wizard icon"/>
+          <p:cNvPr id="15" name="Picture 2" descr="toolbox icon"/>
           <p:cNvPicPr>
             <a:picLocks noChangeAspect="1" noChangeArrowheads="1"/>
           </p:cNvPicPr>
@@ -27940,8 +28577,8 @@
         </p:blipFill>
         <p:spPr bwMode="auto">
           <a:xfrm>
-            <a:off x="635000" y="1143000"/>
-            <a:ext cx="1295400" cy="1295401"/>
+            <a:off x="558800" y="1066800"/>
+            <a:ext cx="1676400" cy="1676401"/>
           </a:xfrm>
           <a:prstGeom prst="rect">
             <a:avLst/>
@@ -27951,14 +28588,769 @@
       </p:pic>
       <p:sp>
         <p:nvSpPr>
-          <p:cNvPr id="10" name="Rectangle 9"/>
+          <p:cNvPr id="7" name="Rectangle 1"/>
+          <p:cNvSpPr txBox="1">
+            <a:spLocks noChangeArrowheads="1"/>
+          </p:cNvSpPr>
+          <p:nvPr/>
+        </p:nvSpPr>
+        <p:spPr bwMode="auto">
+          <a:xfrm>
+            <a:off x="3302000" y="7696200"/>
+            <a:ext cx="9067800" cy="685800"/>
+          </a:xfrm>
+          <a:prstGeom prst="rect">
+            <a:avLst/>
+          </a:prstGeom>
+          <a:solidFill>
+            <a:schemeClr val="bg1"/>
+          </a:solidFill>
+          <a:ln w="12700">
+            <a:noFill/>
+            <a:miter lim="800000"/>
+            <a:headEnd/>
+            <a:tailEnd/>
+          </a:ln>
+          <a:effectLst/>
+        </p:spPr>
+        <p:txBody>
+          <a:bodyPr vert="horz" wrap="square" lIns="50800" tIns="50800" rIns="50800" bIns="50800" numCol="1" anchor="ctr" anchorCtr="0" compatLnSpc="1">
+            <a:prstTxWarp prst="textNoShape">
+              <a:avLst/>
+            </a:prstTxWarp>
+          </a:bodyPr>
+          <a:lstStyle/>
+          <a:p>
+            <a:pPr lvl="0"/>
+            <a:r>
+              <a:rPr lang="en-US" sz="4400" b="1" kern="0" dirty="0" err="1" smtClean="0">
+                <a:solidFill>
+                  <a:srgbClr val="FF0000"/>
+                </a:solidFill>
+                <a:latin typeface="Candara" pitchFamily="34" charset="0"/>
+                <a:ea typeface="+mj-ea"/>
+                <a:cs typeface="+mj-cs"/>
+                <a:sym typeface="Wingdings"/>
+              </a:rPr>
+              <a:t>object.apply</a:t>
+            </a:r>
+            <a:r>
+              <a:rPr lang="en-US" sz="4400" b="1" kern="0" dirty="0" smtClean="0">
+                <a:solidFill>
+                  <a:srgbClr val="FF0000"/>
+                </a:solidFill>
+                <a:latin typeface="Candara" pitchFamily="34" charset="0"/>
+                <a:ea typeface="+mj-ea"/>
+                <a:cs typeface="+mj-cs"/>
+                <a:sym typeface="Wingdings"/>
+              </a:rPr>
+              <a:t>(object)  verb(object)</a:t>
+            </a:r>
+            <a:endParaRPr kumimoji="0" lang="en-US" sz="4400" b="1" i="0" u="none" strike="noStrike" kern="0" cap="none" spc="0" normalizeH="0" baseline="0" noProof="0" dirty="0">
+              <a:ln>
+                <a:noFill/>
+              </a:ln>
+              <a:solidFill>
+                <a:srgbClr val="E75145"/>
+              </a:solidFill>
+              <a:effectLst/>
+              <a:uLnTx/>
+              <a:uFillTx/>
+              <a:latin typeface="Candara" pitchFamily="34" charset="0"/>
+              <a:ea typeface="+mj-ea"/>
+              <a:cs typeface="+mj-cs"/>
+              <a:sym typeface="Arial" charset="0"/>
+            </a:endParaRPr>
+          </a:p>
+        </p:txBody>
+      </p:sp>
+    </p:spTree>
+  </p:cSld>
+  <p:clrMapOvr>
+    <a:masterClrMapping/>
+  </p:clrMapOvr>
+  <p:transition>
+    <p:fade/>
+  </p:transition>
+  <p:timing>
+    <p:tnLst>
+      <p:par>
+        <p:cTn id="1" dur="indefinite" restart="never" nodeType="tmRoot">
+          <p:childTnLst>
+            <p:seq concurrent="1" nextAc="seek">
+              <p:cTn id="2" dur="indefinite" nodeType="mainSeq">
+                <p:childTnLst>
+                  <p:par>
+                    <p:cTn id="3" fill="hold">
+                      <p:stCondLst>
+                        <p:cond delay="indefinite"/>
+                        <p:cond evt="onBegin" delay="0">
+                          <p:tn val="2"/>
+                        </p:cond>
+                      </p:stCondLst>
+                      <p:childTnLst>
+                        <p:par>
+                          <p:cTn id="4" fill="hold">
+                            <p:stCondLst>
+                              <p:cond delay="0"/>
+                            </p:stCondLst>
+                            <p:childTnLst>
+                              <p:par>
+                                <p:cTn id="5" presetID="1" presetClass="entr" presetSubtype="0" fill="hold" nodeType="withEffect">
+                                  <p:stCondLst>
+                                    <p:cond delay="0"/>
+                                  </p:stCondLst>
+                                  <p:childTnLst>
+                                    <p:set>
+                                      <p:cBhvr>
+                                        <p:cTn id="6" dur="1" fill="hold">
+                                          <p:stCondLst>
+                                            <p:cond delay="0"/>
+                                          </p:stCondLst>
+                                        </p:cTn>
+                                        <p:tgtEl>
+                                          <p:spTgt spid="8"/>
+                                        </p:tgtEl>
+                                        <p:attrNameLst>
+                                          <p:attrName>style.visibility</p:attrName>
+                                        </p:attrNameLst>
+                                      </p:cBhvr>
+                                      <p:to>
+                                        <p:strVal val="visible"/>
+                                      </p:to>
+                                    </p:set>
+                                  </p:childTnLst>
+                                </p:cTn>
+                              </p:par>
+                            </p:childTnLst>
+                          </p:cTn>
+                        </p:par>
+                      </p:childTnLst>
+                    </p:cTn>
+                  </p:par>
+                </p:childTnLst>
+              </p:cTn>
+              <p:prevCondLst>
+                <p:cond evt="onPrev" delay="0">
+                  <p:tgtEl>
+                    <p:sldTgt/>
+                  </p:tgtEl>
+                </p:cond>
+              </p:prevCondLst>
+              <p:nextCondLst>
+                <p:cond evt="onNext" delay="0">
+                  <p:tgtEl>
+                    <p:sldTgt/>
+                  </p:tgtEl>
+                </p:cond>
+              </p:nextCondLst>
+            </p:seq>
+          </p:childTnLst>
+        </p:cTn>
+      </p:par>
+    </p:tnLst>
+  </p:timing>
+</p:sld>
+</file>
+
+<file path=ppt/slides/slide47.xml><?xml version="1.0" encoding="utf-8"?>
+<p:sld xmlns:a="http://schemas.openxmlformats.org/drawingml/2006/main" xmlns:r="http://schemas.openxmlformats.org/officeDocument/2006/relationships" xmlns:p="http://schemas.openxmlformats.org/presentationml/2006/main">
+  <p:cSld>
+    <p:spTree>
+      <p:nvGrpSpPr>
+        <p:cNvPr id="1" name=""/>
+        <p:cNvGrpSpPr/>
+        <p:nvPr/>
+      </p:nvGrpSpPr>
+      <p:grpSpPr>
+        <a:xfrm>
+          <a:off x="0" y="0"/>
+          <a:ext cx="0" cy="0"/>
+          <a:chOff x="0" y="0"/>
+          <a:chExt cx="0" cy="0"/>
+        </a:xfrm>
+      </p:grpSpPr>
+      <p:sp>
+        <p:nvSpPr>
+          <p:cNvPr id="8193" name="Rectangle 1"/>
+          <p:cNvSpPr>
+            <a:spLocks noGrp="1" noChangeArrowheads="1"/>
+          </p:cNvSpPr>
+          <p:nvPr>
+            <p:ph type="title"/>
+          </p:nvPr>
+        </p:nvSpPr>
+        <p:spPr>
+          <a:xfrm>
+            <a:off x="711200" y="0"/>
+            <a:ext cx="12509500" cy="914400"/>
+          </a:xfrm>
+          <a:ln/>
+        </p:spPr>
+        <p:txBody>
+          <a:bodyPr/>
+          <a:lstStyle/>
+          <a:p>
+            <a:pPr lvl="0"/>
+            <a:r>
+              <a:rPr lang="en-US" sz="5400" dirty="0" smtClean="0">
+                <a:latin typeface="Lucida Handwriting" pitchFamily="66" charset="0"/>
+              </a:rPr>
+              <a:t>     </a:t>
+            </a:r>
+            <a:r>
+              <a:rPr lang="en-US" sz="5400" dirty="0" smtClean="0">
+                <a:latin typeface="Lucida Handwriting" pitchFamily="66" charset="0"/>
+              </a:rPr>
+              <a:t>DSL</a:t>
+            </a:r>
+            <a:endParaRPr lang="en-US" dirty="0"/>
+          </a:p>
+        </p:txBody>
+      </p:sp>
+      <p:pic>
+        <p:nvPicPr>
+          <p:cNvPr id="8" name="Picture 10" descr="http://knowledgehub.zeus.com/media/Scala_Logo2008.png"/>
+          <p:cNvPicPr>
+            <a:picLocks noChangeAspect="1" noChangeArrowheads="1"/>
+          </p:cNvPicPr>
+          <p:nvPr/>
+        </p:nvPicPr>
+        <p:blipFill>
+          <a:blip r:embed="rId3"/>
+          <a:srcRect/>
+          <a:stretch>
+            <a:fillRect/>
+          </a:stretch>
+        </p:blipFill>
+        <p:spPr bwMode="auto">
+          <a:xfrm>
+            <a:off x="4140200" y="76200"/>
+            <a:ext cx="2279542" cy="679257"/>
+          </a:xfrm>
+          <a:prstGeom prst="rect">
+            <a:avLst/>
+          </a:prstGeom>
+          <a:noFill/>
+        </p:spPr>
+      </p:pic>
+      <p:sp>
+        <p:nvSpPr>
+          <p:cNvPr id="11" name="Rectangle 10"/>
           <p:cNvSpPr/>
           <p:nvPr/>
         </p:nvSpPr>
         <p:spPr>
           <a:xfrm>
-            <a:off x="7416800" y="914400"/>
-            <a:ext cx="3562193" cy="1754326"/>
+            <a:off x="330200" y="2819400"/>
+            <a:ext cx="12344400" cy="5632311"/>
+          </a:xfrm>
+          <a:prstGeom prst="rect">
+            <a:avLst/>
+          </a:prstGeom>
+          <a:ln>
+            <a:solidFill>
+              <a:schemeClr val="tx1"/>
+            </a:solidFill>
+            <a:prstDash val="dash"/>
+          </a:ln>
+        </p:spPr>
+        <p:txBody>
+          <a:bodyPr wrap="square">
+            <a:spAutoFit/>
+          </a:bodyPr>
+          <a:lstStyle/>
+          <a:p>
+            <a:r>
+              <a:rPr lang="en-US" sz="2800" dirty="0" smtClean="0">
+                <a:solidFill>
+                  <a:srgbClr val="3F5FBF"/>
+                </a:solidFill>
+                <a:latin typeface="Courier New"/>
+              </a:rPr>
+              <a:t>/**</a:t>
+            </a:r>
+          </a:p>
+          <a:p>
+            <a:r>
+              <a:rPr lang="en-US" sz="2800" dirty="0" smtClean="0">
+                <a:solidFill>
+                  <a:srgbClr val="3F5FBF"/>
+                </a:solidFill>
+                <a:latin typeface="Courier New"/>
+              </a:rPr>
+              <a:t> </a:t>
+            </a:r>
+            <a:r>
+              <a:rPr lang="en-US" sz="2800" dirty="0" smtClean="0">
+                <a:solidFill>
+                  <a:srgbClr val="3F5FBF"/>
+                </a:solidFill>
+                <a:latin typeface="Courier New"/>
+              </a:rPr>
+              <a:t>* </a:t>
+            </a:r>
+            <a:r>
+              <a:rPr lang="en-US" sz="2800" dirty="0" smtClean="0">
+                <a:solidFill>
+                  <a:srgbClr val="3F5FBF"/>
+                </a:solidFill>
+                <a:latin typeface="Courier New"/>
+              </a:rPr>
+              <a:t>default parameters. </a:t>
+            </a:r>
+            <a:endParaRPr lang="en-US" sz="2800" dirty="0" smtClean="0">
+              <a:solidFill>
+                <a:srgbClr val="3F5FBF"/>
+              </a:solidFill>
+              <a:latin typeface="Courier New"/>
+            </a:endParaRPr>
+          </a:p>
+          <a:p>
+            <a:r>
+              <a:rPr lang="en-US" sz="2800" dirty="0" smtClean="0">
+                <a:solidFill>
+                  <a:srgbClr val="3F5FBF"/>
+                </a:solidFill>
+                <a:latin typeface="Courier New"/>
+              </a:rPr>
+              <a:t> </a:t>
+            </a:r>
+            <a:r>
+              <a:rPr lang="en-US" sz="2800" dirty="0" smtClean="0">
+                <a:solidFill>
+                  <a:srgbClr val="3F5FBF"/>
+                </a:solidFill>
+                <a:latin typeface="Courier New"/>
+              </a:rPr>
+              <a:t>* Uses </a:t>
+            </a:r>
+            <a:r>
+              <a:rPr lang="en-US" sz="2800" dirty="0" err="1" smtClean="0">
+                <a:solidFill>
+                  <a:srgbClr val="3F5FBF"/>
+                </a:solidFill>
+                <a:latin typeface="Courier New"/>
+              </a:rPr>
+              <a:t>ScalaCheck</a:t>
+            </a:r>
+            <a:r>
+              <a:rPr lang="en-US" sz="2800" dirty="0" smtClean="0">
+                <a:solidFill>
+                  <a:srgbClr val="3F5FBF"/>
+                </a:solidFill>
+                <a:latin typeface="Courier New"/>
+              </a:rPr>
+              <a:t> default values and doesn't print </a:t>
+            </a:r>
+            <a:r>
+              <a:rPr lang="en-US" sz="2800" dirty="0" smtClean="0">
+                <a:solidFill>
+                  <a:srgbClr val="3F5FBF"/>
+                </a:solidFill>
+                <a:latin typeface="Courier New"/>
+              </a:rPr>
+              <a:t> </a:t>
+            </a:r>
+          </a:p>
+          <a:p>
+            <a:r>
+              <a:rPr lang="en-US" sz="2800" dirty="0" smtClean="0">
+                <a:solidFill>
+                  <a:srgbClr val="3F5FBF"/>
+                </a:solidFill>
+                <a:latin typeface="Courier New"/>
+              </a:rPr>
+              <a:t> </a:t>
+            </a:r>
+            <a:r>
+              <a:rPr lang="en-US" sz="2800" dirty="0" smtClean="0">
+                <a:solidFill>
+                  <a:srgbClr val="3F5FBF"/>
+                </a:solidFill>
+                <a:latin typeface="Courier New"/>
+              </a:rPr>
+              <a:t>* anything </a:t>
+            </a:r>
+            <a:r>
+              <a:rPr lang="en-US" sz="2800" dirty="0" smtClean="0">
+                <a:solidFill>
+                  <a:srgbClr val="3F5FBF"/>
+                </a:solidFill>
+                <a:latin typeface="Courier New"/>
+              </a:rPr>
+              <a:t>to the console</a:t>
+            </a:r>
+          </a:p>
+          <a:p>
+            <a:r>
+              <a:rPr lang="en-US" sz="2800" dirty="0" smtClean="0">
+                <a:solidFill>
+                  <a:srgbClr val="3F5FBF"/>
+                </a:solidFill>
+                <a:latin typeface="Courier New"/>
+              </a:rPr>
+              <a:t> </a:t>
+            </a:r>
+            <a:r>
+              <a:rPr lang="en-US" sz="2800" dirty="0" smtClean="0">
+                <a:solidFill>
+                  <a:srgbClr val="3F5FBF"/>
+                </a:solidFill>
+                <a:latin typeface="Courier New"/>
+              </a:rPr>
+              <a:t>*/</a:t>
+            </a:r>
+            <a:endParaRPr lang="en-US" sz="2800" dirty="0" smtClean="0">
+              <a:solidFill>
+                <a:srgbClr val="3F5FBF"/>
+              </a:solidFill>
+              <a:latin typeface="Courier New"/>
+            </a:endParaRPr>
+          </a:p>
+          <a:p>
+            <a:r>
+              <a:rPr lang="en-US" sz="2800" b="1" dirty="0" smtClean="0">
+                <a:solidFill>
+                  <a:srgbClr val="7F0055"/>
+                </a:solidFill>
+                <a:latin typeface="Courier New"/>
+              </a:rPr>
+              <a:t>implicit</a:t>
+            </a:r>
+            <a:r>
+              <a:rPr lang="en-US" sz="2800" b="1" dirty="0" smtClean="0">
+                <a:latin typeface="Courier New"/>
+              </a:rPr>
+              <a:t> </a:t>
+            </a:r>
+            <a:r>
+              <a:rPr lang="en-US" sz="2800" b="1" dirty="0" smtClean="0">
+                <a:solidFill>
+                  <a:srgbClr val="7F0055"/>
+                </a:solidFill>
+                <a:latin typeface="Courier New"/>
+              </a:rPr>
+              <a:t>def</a:t>
+            </a:r>
+            <a:r>
+              <a:rPr lang="en-US" sz="2800" b="1" dirty="0" smtClean="0">
+                <a:latin typeface="Courier New"/>
+              </a:rPr>
+              <a:t> </a:t>
+            </a:r>
+            <a:r>
+              <a:rPr lang="en-US" sz="2800" b="1" dirty="0" err="1" smtClean="0">
+                <a:latin typeface="Courier New"/>
+              </a:rPr>
+              <a:t>defaultParameters</a:t>
+            </a:r>
+            <a:r>
+              <a:rPr lang="en-US" sz="2800" b="1" dirty="0" smtClean="0">
+                <a:latin typeface="Courier New"/>
+              </a:rPr>
+              <a:t> = </a:t>
+            </a:r>
+            <a:r>
+              <a:rPr lang="en-US" sz="2800" b="1" dirty="0" smtClean="0">
+                <a:solidFill>
+                  <a:srgbClr val="7F0055"/>
+                </a:solidFill>
+                <a:latin typeface="Courier New"/>
+              </a:rPr>
+              <a:t>new</a:t>
+            </a:r>
+            <a:r>
+              <a:rPr lang="en-US" sz="2800" b="1" dirty="0" smtClean="0">
+                <a:latin typeface="Courier New"/>
+              </a:rPr>
+              <a:t> </a:t>
+            </a:r>
+            <a:r>
+              <a:rPr lang="en-US" sz="2800" b="1" dirty="0" smtClean="0">
+                <a:latin typeface="Courier New"/>
+              </a:rPr>
+              <a:t>Parameters()</a:t>
+            </a:r>
+            <a:endParaRPr lang="en-US" sz="2800" b="1" dirty="0" smtClean="0">
+              <a:solidFill>
+                <a:srgbClr val="7F0055"/>
+              </a:solidFill>
+              <a:latin typeface="Courier New"/>
+            </a:endParaRPr>
+          </a:p>
+          <a:p>
+            <a:r>
+              <a:rPr lang="en-US" sz="2800" b="1" dirty="0" smtClean="0">
+                <a:solidFill>
+                  <a:srgbClr val="7F0055"/>
+                </a:solidFill>
+                <a:latin typeface="Courier New"/>
+              </a:rPr>
+              <a:t>object</a:t>
+            </a:r>
+            <a:r>
+              <a:rPr lang="en-US" sz="2800" b="1" dirty="0" smtClean="0">
+                <a:latin typeface="Courier New"/>
+              </a:rPr>
+              <a:t> set </a:t>
+            </a:r>
+            <a:r>
+              <a:rPr lang="en-US" sz="2800" b="1" dirty="0" smtClean="0">
+                <a:solidFill>
+                  <a:srgbClr val="7F0055"/>
+                </a:solidFill>
+                <a:latin typeface="Courier New"/>
+              </a:rPr>
+              <a:t>extends</a:t>
+            </a:r>
+            <a:r>
+              <a:rPr lang="en-US" sz="2800" b="1" dirty="0" smtClean="0">
+                <a:latin typeface="Courier New"/>
+              </a:rPr>
+              <a:t> </a:t>
+            </a:r>
+            <a:r>
+              <a:rPr lang="en-US" sz="2800" b="1" dirty="0" smtClean="0">
+                <a:latin typeface="Courier New"/>
+              </a:rPr>
+              <a:t>Parameters </a:t>
+            </a:r>
+            <a:r>
+              <a:rPr lang="en-US" sz="2800" b="1" dirty="0" smtClean="0">
+                <a:latin typeface="Courier New"/>
+              </a:rPr>
+              <a:t>{</a:t>
+            </a:r>
+          </a:p>
+          <a:p>
+            <a:r>
+              <a:rPr lang="en-US" sz="2400" dirty="0" smtClean="0">
+                <a:latin typeface="Courier New"/>
+              </a:rPr>
+              <a:t>  </a:t>
+            </a:r>
+            <a:r>
+              <a:rPr lang="en-US" sz="2400" b="1" dirty="0" smtClean="0">
+                <a:solidFill>
+                  <a:srgbClr val="7F0055"/>
+                </a:solidFill>
+                <a:latin typeface="Courier New"/>
+              </a:rPr>
+              <a:t>def</a:t>
+            </a:r>
+            <a:r>
+              <a:rPr lang="en-US" sz="2400" b="1" dirty="0" smtClean="0">
+                <a:latin typeface="Courier New"/>
+              </a:rPr>
+              <a:t> apply(p</a:t>
+            </a:r>
+            <a:r>
+              <a:rPr lang="en-US" sz="2400" b="1" smtClean="0">
+                <a:latin typeface="Courier New"/>
+              </a:rPr>
+              <a:t>: </a:t>
+            </a:r>
+            <a:r>
+              <a:rPr lang="en-US" sz="2400" b="1" smtClean="0">
+                <a:latin typeface="Courier New"/>
+              </a:rPr>
+              <a:t>(Symbol</a:t>
+            </a:r>
+            <a:r>
+              <a:rPr lang="en-US" sz="2400" b="1" dirty="0" smtClean="0">
+                <a:latin typeface="Courier New"/>
+              </a:rPr>
+              <a:t>, </a:t>
+            </a:r>
+            <a:r>
+              <a:rPr lang="en-US" sz="2400" b="1" dirty="0" err="1" smtClean="0">
+                <a:solidFill>
+                  <a:srgbClr val="7F0055"/>
+                </a:solidFill>
+                <a:latin typeface="Courier New"/>
+              </a:rPr>
+              <a:t>Int</a:t>
+            </a:r>
+            <a:r>
+              <a:rPr lang="en-US" sz="2400" b="1" dirty="0" smtClean="0">
+                <a:latin typeface="Courier New"/>
+              </a:rPr>
+              <a:t>)*) = </a:t>
+            </a:r>
+            <a:r>
+              <a:rPr lang="en-US" sz="2400" b="1" dirty="0" smtClean="0">
+                <a:solidFill>
+                  <a:srgbClr val="7F0055"/>
+                </a:solidFill>
+                <a:latin typeface="Courier New"/>
+              </a:rPr>
+              <a:t>new</a:t>
+            </a:r>
+            <a:r>
+              <a:rPr lang="en-US" sz="2400" b="1" dirty="0" smtClean="0">
+                <a:latin typeface="Courier New"/>
+              </a:rPr>
+              <a:t> Parameters(</a:t>
+            </a:r>
+            <a:r>
+              <a:rPr lang="en-US" sz="2400" b="1" dirty="0" err="1" smtClean="0">
+                <a:latin typeface="Courier New"/>
+              </a:rPr>
+              <a:t>setParams</a:t>
+            </a:r>
+            <a:r>
+              <a:rPr lang="en-US" sz="2400" b="1" dirty="0" smtClean="0">
+                <a:latin typeface="Courier New"/>
+              </a:rPr>
+              <a:t>(p))</a:t>
+            </a:r>
+          </a:p>
+          <a:p>
+            <a:r>
+              <a:rPr lang="en-US" sz="2800" dirty="0" smtClean="0">
+                <a:latin typeface="Courier New"/>
+              </a:rPr>
+              <a:t>}</a:t>
+            </a:r>
+          </a:p>
+          <a:p>
+            <a:endParaRPr lang="en-US" sz="2800" dirty="0" smtClean="0">
+              <a:latin typeface="Courier New"/>
+            </a:endParaRPr>
+          </a:p>
+          <a:p>
+            <a:r>
+              <a:rPr lang="en-US" sz="2800" b="1" dirty="0" smtClean="0">
+                <a:solidFill>
+                  <a:srgbClr val="7F0055"/>
+                </a:solidFill>
+                <a:latin typeface="Courier New"/>
+              </a:rPr>
+              <a:t>def</a:t>
+            </a:r>
+            <a:r>
+              <a:rPr lang="en-US" sz="2800" b="1" dirty="0" smtClean="0">
+                <a:latin typeface="Courier New"/>
+              </a:rPr>
+              <a:t> </a:t>
+            </a:r>
+            <a:r>
+              <a:rPr lang="en-US" sz="2800" b="1" dirty="0" smtClean="0">
+                <a:latin typeface="Courier New"/>
+              </a:rPr>
+              <a:t>pass(</a:t>
+            </a:r>
+            <a:r>
+              <a:rPr lang="en-US" sz="2800" b="1" dirty="0" smtClean="0">
+                <a:solidFill>
+                  <a:srgbClr val="7F0055"/>
+                </a:solidFill>
+                <a:latin typeface="Courier New"/>
+              </a:rPr>
+              <a:t>implicit</a:t>
+            </a:r>
+            <a:r>
+              <a:rPr lang="en-US" sz="2800" b="1" dirty="0" smtClean="0">
+                <a:latin typeface="Courier New"/>
+              </a:rPr>
+              <a:t> </a:t>
+            </a:r>
+            <a:r>
+              <a:rPr lang="en-US" sz="2800" b="1" dirty="0" smtClean="0">
+                <a:latin typeface="Courier New"/>
+              </a:rPr>
+              <a:t>p: </a:t>
+            </a:r>
+            <a:r>
+              <a:rPr lang="en-US" sz="2800" b="1" dirty="0" smtClean="0">
+                <a:latin typeface="Courier New"/>
+              </a:rPr>
+              <a:t>Parameters) = </a:t>
+            </a:r>
+            <a:r>
+              <a:rPr lang="en-US" sz="2800" b="1" dirty="0" smtClean="0">
+                <a:solidFill>
+                  <a:srgbClr val="7F0055"/>
+                </a:solidFill>
+                <a:latin typeface="Courier New"/>
+              </a:rPr>
+              <a:t>new</a:t>
+            </a:r>
+            <a:r>
+              <a:rPr lang="en-US" sz="2800" b="1" dirty="0" smtClean="0">
+                <a:latin typeface="Courier New"/>
+              </a:rPr>
+              <a:t> </a:t>
+            </a:r>
+            <a:r>
+              <a:rPr lang="en-US" sz="2800" b="1" dirty="0" smtClean="0">
+                <a:latin typeface="Courier New"/>
+              </a:rPr>
+              <a:t>Matcher[Prop](){</a:t>
+            </a:r>
+          </a:p>
+          <a:p>
+            <a:r>
+              <a:rPr lang="en-US" sz="2800" b="1" dirty="0" smtClean="0">
+                <a:solidFill>
+                  <a:srgbClr val="7F0055"/>
+                </a:solidFill>
+                <a:latin typeface="Courier New"/>
+              </a:rPr>
+              <a:t>  def</a:t>
+            </a:r>
+            <a:r>
+              <a:rPr lang="en-US" sz="2800" b="1" dirty="0" smtClean="0">
+                <a:latin typeface="Courier New"/>
+              </a:rPr>
+              <a:t> apply(prop: </a:t>
+            </a:r>
+            <a:r>
+              <a:rPr lang="en-US" sz="2800" b="1" dirty="0" smtClean="0">
+                <a:latin typeface="Courier New"/>
+              </a:rPr>
+              <a:t>=&gt; Prop) = </a:t>
+            </a:r>
+            <a:r>
+              <a:rPr lang="en-US" sz="2800" b="1" dirty="0" err="1" smtClean="0">
+                <a:latin typeface="Courier New"/>
+              </a:rPr>
+              <a:t>checkProperty</a:t>
+            </a:r>
+            <a:r>
+              <a:rPr lang="en-US" sz="2800" b="1" dirty="0" smtClean="0">
+                <a:latin typeface="Courier New"/>
+              </a:rPr>
+              <a:t>(prop)(p)</a:t>
+            </a:r>
+            <a:endParaRPr lang="en-US" sz="2800" b="1" dirty="0" smtClean="0">
+              <a:latin typeface="Courier New"/>
+            </a:endParaRPr>
+          </a:p>
+          <a:p>
+            <a:r>
+              <a:rPr lang="en-US" sz="2800" dirty="0" smtClean="0">
+                <a:latin typeface="Courier New"/>
+              </a:rPr>
+              <a:t>}</a:t>
+            </a:r>
+            <a:endParaRPr lang="en-US" sz="2800" dirty="0" smtClean="0">
+              <a:latin typeface="Courier New"/>
+            </a:endParaRPr>
+          </a:p>
+        </p:txBody>
+      </p:sp>
+      <p:sp>
+        <p:nvSpPr>
+          <p:cNvPr id="14" name="Rectangle 13"/>
+          <p:cNvSpPr/>
+          <p:nvPr/>
+        </p:nvSpPr>
+        <p:spPr>
+          <a:xfrm>
+            <a:off x="4749800" y="1447800"/>
+            <a:ext cx="6732933" cy="923330"/>
           </a:xfrm>
           <a:prstGeom prst="rect">
             <a:avLst/>
@@ -27974,21 +29366,18 @@
             <a:r>
               <a:rPr lang="en-US" sz="5400" b="1" kern="0" dirty="0" smtClean="0">
                 <a:solidFill>
-                  <a:srgbClr val="00CC66"/>
+                  <a:srgbClr val="0C0F20"/>
                 </a:solidFill>
                 <a:latin typeface="Lucida Handwriting" pitchFamily="66" charset="0"/>
                 <a:cs typeface="+mj-cs"/>
                 <a:sym typeface="Arial" charset="0"/>
               </a:rPr>
-              <a:t>Implicit </a:t>
-            </a:r>
-          </a:p>
-          <a:p>
-            <a:pPr algn="ctr"/>
+              <a:t>Implicit  </a:t>
+            </a:r>
             <a:r>
               <a:rPr lang="en-US" sz="5400" b="1" kern="0" dirty="0" err="1" smtClean="0">
                 <a:solidFill>
-                  <a:srgbClr val="00CC66"/>
+                  <a:srgbClr val="0C0F20"/>
                 </a:solidFill>
                 <a:latin typeface="Lucida Handwriting" pitchFamily="66" charset="0"/>
                 <a:cs typeface="+mj-cs"/>
@@ -27996,24 +29385,539 @@
               </a:rPr>
               <a:t>params</a:t>
             </a:r>
-            <a:endParaRPr lang="en-US" dirty="0">
-              <a:solidFill>
-                <a:srgbClr val="00CC66"/>
-              </a:solidFill>
-            </a:endParaRPr>
+            <a:endParaRPr lang="en-US" dirty="0"/>
           </a:p>
         </p:txBody>
       </p:sp>
-      <p:sp>
-        <p:nvSpPr>
-          <p:cNvPr id="12" name="Rectangle 11"/>
+      <p:pic>
+        <p:nvPicPr>
+          <p:cNvPr id="15" name="Picture 2" descr="toolbox icon"/>
+          <p:cNvPicPr>
+            <a:picLocks noChangeAspect="1" noChangeArrowheads="1"/>
+          </p:cNvPicPr>
+          <p:nvPr/>
+        </p:nvPicPr>
+        <p:blipFill>
+          <a:blip r:embed="rId4"/>
+          <a:srcRect/>
+          <a:stretch>
+            <a:fillRect/>
+          </a:stretch>
+        </p:blipFill>
+        <p:spPr bwMode="auto">
+          <a:xfrm>
+            <a:off x="558800" y="1066800"/>
+            <a:ext cx="1676400" cy="1676401"/>
+          </a:xfrm>
+          <a:prstGeom prst="rect">
+            <a:avLst/>
+          </a:prstGeom>
+          <a:noFill/>
+        </p:spPr>
+      </p:pic>
+    </p:spTree>
+  </p:cSld>
+  <p:clrMapOvr>
+    <a:masterClrMapping/>
+  </p:clrMapOvr>
+  <p:transition>
+    <p:fade/>
+  </p:transition>
+  <p:timing>
+    <p:tnLst>
+      <p:par>
+        <p:cTn id="1" dur="indefinite" restart="never" nodeType="tmRoot">
+          <p:childTnLst>
+            <p:seq concurrent="1" nextAc="seek">
+              <p:cTn id="2" dur="indefinite" nodeType="mainSeq">
+                <p:childTnLst>
+                  <p:par>
+                    <p:cTn id="3" fill="hold">
+                      <p:stCondLst>
+                        <p:cond delay="indefinite"/>
+                        <p:cond evt="onBegin" delay="0">
+                          <p:tn val="2"/>
+                        </p:cond>
+                      </p:stCondLst>
+                      <p:childTnLst>
+                        <p:par>
+                          <p:cTn id="4" fill="hold">
+                            <p:stCondLst>
+                              <p:cond delay="0"/>
+                            </p:stCondLst>
+                            <p:childTnLst>
+                              <p:par>
+                                <p:cTn id="5" presetID="1" presetClass="entr" presetSubtype="0" fill="hold" nodeType="withEffect">
+                                  <p:stCondLst>
+                                    <p:cond delay="0"/>
+                                  </p:stCondLst>
+                                  <p:childTnLst>
+                                    <p:set>
+                                      <p:cBhvr>
+                                        <p:cTn id="6" dur="1" fill="hold">
+                                          <p:stCondLst>
+                                            <p:cond delay="0"/>
+                                          </p:stCondLst>
+                                        </p:cTn>
+                                        <p:tgtEl>
+                                          <p:spTgt spid="8"/>
+                                        </p:tgtEl>
+                                        <p:attrNameLst>
+                                          <p:attrName>style.visibility</p:attrName>
+                                        </p:attrNameLst>
+                                      </p:cBhvr>
+                                      <p:to>
+                                        <p:strVal val="visible"/>
+                                      </p:to>
+                                    </p:set>
+                                  </p:childTnLst>
+                                </p:cTn>
+                              </p:par>
+                            </p:childTnLst>
+                          </p:cTn>
+                        </p:par>
+                      </p:childTnLst>
+                    </p:cTn>
+                  </p:par>
+                </p:childTnLst>
+              </p:cTn>
+              <p:prevCondLst>
+                <p:cond evt="onPrev" delay="0">
+                  <p:tgtEl>
+                    <p:sldTgt/>
+                  </p:tgtEl>
+                </p:cond>
+              </p:prevCondLst>
+              <p:nextCondLst>
+                <p:cond evt="onNext" delay="0">
+                  <p:tgtEl>
+                    <p:sldTgt/>
+                  </p:tgtEl>
+                </p:cond>
+              </p:nextCondLst>
+            </p:seq>
+          </p:childTnLst>
+        </p:cTn>
+      </p:par>
+    </p:tnLst>
+  </p:timing>
+</p:sld>
+</file>
+
+<file path=ppt/slides/slide48.xml><?xml version="1.0" encoding="utf-8"?>
+<p:sld xmlns:a="http://schemas.openxmlformats.org/drawingml/2006/main" xmlns:r="http://schemas.openxmlformats.org/officeDocument/2006/relationships" xmlns:p="http://schemas.openxmlformats.org/presentationml/2006/main">
+  <p:cSld>
+    <p:spTree>
+      <p:nvGrpSpPr>
+        <p:cNvPr id="1" name=""/>
+        <p:cNvGrpSpPr/>
+        <p:nvPr/>
+      </p:nvGrpSpPr>
+      <p:grpSpPr>
+        <a:xfrm>
+          <a:off x="0" y="0"/>
+          <a:ext cx="0" cy="0"/>
+          <a:chOff x="0" y="0"/>
+          <a:chExt cx="0" cy="0"/>
+        </a:xfrm>
+      </p:grpSpPr>
+      <p:sp>
+        <p:nvSpPr>
+          <p:cNvPr id="8193" name="Rectangle 1"/>
+          <p:cNvSpPr>
+            <a:spLocks noGrp="1" noChangeArrowheads="1"/>
+          </p:cNvSpPr>
+          <p:nvPr>
+            <p:ph type="title"/>
+          </p:nvPr>
+        </p:nvSpPr>
+        <p:spPr>
+          <a:xfrm>
+            <a:off x="711200" y="0"/>
+            <a:ext cx="12509500" cy="914400"/>
+          </a:xfrm>
+          <a:ln/>
+        </p:spPr>
+        <p:txBody>
+          <a:bodyPr/>
+          <a:lstStyle/>
+          <a:p>
+            <a:pPr lvl="0"/>
+            <a:r>
+              <a:rPr lang="en-US" sz="5400" dirty="0" smtClean="0">
+                <a:latin typeface="Lucida Handwriting" pitchFamily="66" charset="0"/>
+              </a:rPr>
+              <a:t>     </a:t>
+            </a:r>
+            <a:r>
+              <a:rPr lang="en-US" sz="5400" dirty="0" smtClean="0">
+                <a:latin typeface="Lucida Handwriting" pitchFamily="66" charset="0"/>
+              </a:rPr>
+              <a:t>DSL</a:t>
+            </a:r>
+            <a:endParaRPr lang="en-US" dirty="0"/>
+          </a:p>
+        </p:txBody>
+      </p:sp>
+      <p:pic>
+        <p:nvPicPr>
+          <p:cNvPr id="8" name="Picture 10" descr="http://knowledgehub.zeus.com/media/Scala_Logo2008.png"/>
+          <p:cNvPicPr>
+            <a:picLocks noChangeAspect="1" noChangeArrowheads="1"/>
+          </p:cNvPicPr>
+          <p:nvPr/>
+        </p:nvPicPr>
+        <p:blipFill>
+          <a:blip r:embed="rId3"/>
+          <a:srcRect/>
+          <a:stretch>
+            <a:fillRect/>
+          </a:stretch>
+        </p:blipFill>
+        <p:spPr bwMode="auto">
+          <a:xfrm>
+            <a:off x="4140200" y="76200"/>
+            <a:ext cx="2279542" cy="679257"/>
+          </a:xfrm>
+          <a:prstGeom prst="rect">
+            <a:avLst/>
+          </a:prstGeom>
+          <a:noFill/>
+        </p:spPr>
+      </p:pic>
+      <p:sp>
+        <p:nvSpPr>
+          <p:cNvPr id="11" name="Rectangle 10"/>
           <p:cNvSpPr/>
           <p:nvPr/>
         </p:nvSpPr>
         <p:spPr>
           <a:xfrm>
-            <a:off x="2387600" y="1600200"/>
-            <a:ext cx="2260555" cy="923330"/>
+            <a:off x="330200" y="2819400"/>
+            <a:ext cx="12344400" cy="4832092"/>
+          </a:xfrm>
+          <a:prstGeom prst="rect">
+            <a:avLst/>
+          </a:prstGeom>
+          <a:ln>
+            <a:solidFill>
+              <a:schemeClr val="tx1"/>
+            </a:solidFill>
+            <a:prstDash val="dash"/>
+          </a:ln>
+        </p:spPr>
+        <p:txBody>
+          <a:bodyPr wrap="square">
+            <a:spAutoFit/>
+          </a:bodyPr>
+          <a:lstStyle/>
+          <a:p>
+            <a:r>
+              <a:rPr lang="en-US" sz="2800" b="1" dirty="0" err="1" smtClean="0">
+                <a:solidFill>
+                  <a:srgbClr val="7F0055"/>
+                </a:solidFill>
+                <a:latin typeface="Courier New"/>
+              </a:rPr>
+              <a:t>val</a:t>
+            </a:r>
+            <a:r>
+              <a:rPr lang="en-US" sz="2800" b="1" dirty="0" smtClean="0">
+                <a:latin typeface="Courier New"/>
+              </a:rPr>
+              <a:t> prop = </a:t>
+            </a:r>
+            <a:r>
+              <a:rPr lang="en-US" sz="2800" b="1" dirty="0" err="1" smtClean="0">
+                <a:latin typeface="Courier New"/>
+              </a:rPr>
+              <a:t>forAll</a:t>
+            </a:r>
+            <a:r>
+              <a:rPr lang="en-US" sz="2800" b="1" dirty="0" smtClean="0">
+                <a:latin typeface="Courier New"/>
+              </a:rPr>
+              <a:t> { </a:t>
+            </a:r>
+            <a:r>
+              <a:rPr lang="en-US" sz="2800" b="1" dirty="0" smtClean="0">
+                <a:latin typeface="Courier New"/>
+              </a:rPr>
+              <a:t>(s: String) =&gt; reverse(reverse(s)) </a:t>
+            </a:r>
+            <a:endParaRPr lang="en-US" sz="2800" b="1" dirty="0" smtClean="0">
+              <a:latin typeface="Courier New"/>
+            </a:endParaRPr>
+          </a:p>
+          <a:p>
+            <a:r>
+              <a:rPr lang="en-US" sz="2800" b="1" dirty="0" smtClean="0">
+                <a:latin typeface="Courier New"/>
+              </a:rPr>
+              <a:t> </a:t>
+            </a:r>
+            <a:r>
+              <a:rPr lang="en-US" sz="2800" b="1" dirty="0" smtClean="0">
+                <a:latin typeface="Courier New"/>
+              </a:rPr>
+              <a:t>                                  == </a:t>
+            </a:r>
+            <a:r>
+              <a:rPr lang="en-US" sz="2800" b="1" dirty="0" smtClean="0">
+                <a:latin typeface="Courier New"/>
+              </a:rPr>
+              <a:t>s } </a:t>
+            </a:r>
+          </a:p>
+          <a:p>
+            <a:r>
+              <a:rPr lang="en-US" sz="2800" dirty="0" smtClean="0">
+                <a:solidFill>
+                  <a:srgbClr val="2A00FF"/>
+                </a:solidFill>
+                <a:latin typeface="Courier New"/>
+              </a:rPr>
+              <a:t>"</a:t>
+            </a:r>
+            <a:r>
+              <a:rPr lang="en-US" sz="2800" dirty="0" smtClean="0">
+                <a:solidFill>
+                  <a:srgbClr val="2A00FF"/>
+                </a:solidFill>
+                <a:latin typeface="Courier New"/>
+              </a:rPr>
+              <a:t>The default configuration doesn't display anything"</a:t>
+            </a:r>
+            <a:r>
+              <a:rPr lang="en-US" sz="2800" dirty="0" smtClean="0">
+                <a:latin typeface="Courier New"/>
+              </a:rPr>
+              <a:t> in {</a:t>
+            </a:r>
+          </a:p>
+          <a:p>
+            <a:r>
+              <a:rPr lang="en-US" sz="2800" dirty="0" smtClean="0">
+                <a:latin typeface="Courier New"/>
+              </a:rPr>
+              <a:t>  prop </a:t>
+            </a:r>
+            <a:r>
+              <a:rPr lang="en-US" sz="2800" dirty="0" smtClean="0">
+                <a:latin typeface="Courier New"/>
+              </a:rPr>
+              <a:t>must pass</a:t>
+            </a:r>
+          </a:p>
+          <a:p>
+            <a:r>
+              <a:rPr lang="en-US" sz="2800" dirty="0" smtClean="0">
+                <a:latin typeface="Courier New"/>
+              </a:rPr>
+              <a:t>}</a:t>
+            </a:r>
+            <a:endParaRPr lang="en-US" sz="2800" dirty="0" smtClean="0">
+              <a:latin typeface="Courier New"/>
+            </a:endParaRPr>
+          </a:p>
+          <a:p>
+            <a:r>
+              <a:rPr lang="en-US" sz="2800" dirty="0" smtClean="0">
+                <a:solidFill>
+                  <a:srgbClr val="2A00FF"/>
+                </a:solidFill>
+                <a:latin typeface="Courier New"/>
+              </a:rPr>
+              <a:t>"</a:t>
+            </a:r>
+            <a:r>
+              <a:rPr lang="en-US" sz="2800" dirty="0" smtClean="0">
+                <a:solidFill>
+                  <a:srgbClr val="2A00FF"/>
+                </a:solidFill>
+                <a:latin typeface="Courier New"/>
+              </a:rPr>
+              <a:t>The default configuration can be </a:t>
+            </a:r>
+            <a:r>
+              <a:rPr lang="en-US" sz="2800" dirty="0" err="1" smtClean="0">
+                <a:solidFill>
+                  <a:srgbClr val="2A00FF"/>
+                </a:solidFill>
+                <a:latin typeface="Courier New"/>
+              </a:rPr>
+              <a:t>overriden</a:t>
+            </a:r>
+            <a:r>
+              <a:rPr lang="en-US" sz="2800" dirty="0" smtClean="0">
+                <a:solidFill>
+                  <a:srgbClr val="2A00FF"/>
+                </a:solidFill>
+                <a:latin typeface="Courier New"/>
+              </a:rPr>
+              <a:t>"</a:t>
+            </a:r>
+            <a:r>
+              <a:rPr lang="en-US" sz="2800" dirty="0" smtClean="0">
+                <a:latin typeface="Courier New"/>
+              </a:rPr>
+              <a:t> </a:t>
+            </a:r>
+            <a:r>
+              <a:rPr lang="en-US" sz="2800" dirty="0" smtClean="0">
+                <a:latin typeface="Courier New"/>
+              </a:rPr>
+              <a:t>in {</a:t>
+            </a:r>
+          </a:p>
+          <a:p>
+            <a:r>
+              <a:rPr lang="en-US" sz="2800" dirty="0" smtClean="0">
+                <a:latin typeface="Courier New"/>
+              </a:rPr>
+              <a:t>  prop </a:t>
+            </a:r>
+            <a:r>
+              <a:rPr lang="en-US" sz="2800" dirty="0" smtClean="0">
+                <a:latin typeface="Courier New"/>
+              </a:rPr>
+              <a:t>must pass(set(</a:t>
+            </a:r>
+            <a:r>
+              <a:rPr lang="en-US" sz="2800" dirty="0" err="1" smtClean="0">
+                <a:latin typeface="Courier New"/>
+              </a:rPr>
+              <a:t>minTestsOk</a:t>
+            </a:r>
+            <a:r>
+              <a:rPr lang="en-US" sz="2800" dirty="0" smtClean="0">
+                <a:latin typeface="Courier New"/>
+              </a:rPr>
+              <a:t> -&gt; 3))</a:t>
+            </a:r>
+          </a:p>
+          <a:p>
+            <a:r>
+              <a:rPr lang="en-US" sz="2800" dirty="0" smtClean="0">
+                <a:latin typeface="Courier New"/>
+              </a:rPr>
+              <a:t>}</a:t>
+            </a:r>
+            <a:endParaRPr lang="en-US" sz="2800" dirty="0" smtClean="0">
+              <a:latin typeface="Courier New"/>
+            </a:endParaRPr>
+          </a:p>
+          <a:p>
+            <a:r>
+              <a:rPr lang="en-US" sz="2800" dirty="0" smtClean="0">
+                <a:solidFill>
+                  <a:srgbClr val="2A00FF"/>
+                </a:solidFill>
+                <a:latin typeface="Courier New"/>
+              </a:rPr>
+              <a:t>"</a:t>
+            </a:r>
+            <a:r>
+              <a:rPr lang="en-US" sz="2800" dirty="0" smtClean="0">
+                <a:solidFill>
+                  <a:srgbClr val="2A00FF"/>
+                </a:solidFill>
+                <a:latin typeface="Courier New"/>
+              </a:rPr>
+              <a:t>The default configuration can be </a:t>
+            </a:r>
+            <a:r>
+              <a:rPr lang="en-US" sz="2800" dirty="0" err="1" smtClean="0">
+                <a:solidFill>
+                  <a:srgbClr val="2A00FF"/>
+                </a:solidFill>
+                <a:latin typeface="Courier New"/>
+              </a:rPr>
+              <a:t>overriden</a:t>
+            </a:r>
+            <a:r>
+              <a:rPr lang="en-US" sz="2800" dirty="0" smtClean="0">
+                <a:solidFill>
+                  <a:srgbClr val="2A00FF"/>
+                </a:solidFill>
+                <a:latin typeface="Courier New"/>
+              </a:rPr>
+              <a:t> </a:t>
+            </a:r>
+            <a:r>
+              <a:rPr lang="en-US" sz="2800" dirty="0" smtClean="0">
+                <a:solidFill>
+                  <a:srgbClr val="2A00FF"/>
+                </a:solidFill>
+                <a:latin typeface="Courier New"/>
+              </a:rPr>
+              <a:t>- 2"</a:t>
+            </a:r>
+            <a:r>
+              <a:rPr lang="en-US" sz="2800" dirty="0" smtClean="0">
+                <a:latin typeface="Courier New"/>
+              </a:rPr>
+              <a:t> </a:t>
+            </a:r>
+            <a:r>
+              <a:rPr lang="en-US" sz="2800" dirty="0" smtClean="0">
+                <a:latin typeface="Courier New"/>
+              </a:rPr>
+              <a:t>in {</a:t>
+            </a:r>
+          </a:p>
+          <a:p>
+            <a:r>
+              <a:rPr lang="en-US" sz="2800" dirty="0" smtClean="0">
+                <a:latin typeface="Courier New"/>
+              </a:rPr>
+              <a:t>  prop </a:t>
+            </a:r>
+            <a:r>
+              <a:rPr lang="en-US" sz="2800" dirty="0" smtClean="0">
+                <a:latin typeface="Courier New"/>
+              </a:rPr>
+              <a:t>must pass(display(</a:t>
+            </a:r>
+            <a:r>
+              <a:rPr lang="en-US" sz="2800" dirty="0" err="1" smtClean="0">
+                <a:latin typeface="Courier New"/>
+              </a:rPr>
+              <a:t>minTestsOk</a:t>
+            </a:r>
+            <a:r>
+              <a:rPr lang="en-US" sz="2800" dirty="0" smtClean="0">
+                <a:latin typeface="Courier New"/>
+              </a:rPr>
+              <a:t> -&gt; 3))</a:t>
+            </a:r>
+          </a:p>
+          <a:p>
+            <a:r>
+              <a:rPr lang="en-US" sz="2800" dirty="0" smtClean="0">
+                <a:latin typeface="Courier New"/>
+              </a:rPr>
+              <a:t>}</a:t>
+            </a:r>
+            <a:endParaRPr lang="en-US" sz="2800" b="1" dirty="0" smtClean="0">
+              <a:solidFill>
+                <a:srgbClr val="7F0055"/>
+              </a:solidFill>
+              <a:latin typeface="Courier New"/>
+            </a:endParaRPr>
+          </a:p>
+        </p:txBody>
+      </p:sp>
+      <p:sp>
+        <p:nvSpPr>
+          <p:cNvPr id="7" name="Rectangle 6"/>
+          <p:cNvSpPr/>
+          <p:nvPr/>
+        </p:nvSpPr>
+        <p:spPr>
+          <a:xfrm>
+            <a:off x="4872690" y="1286470"/>
+            <a:ext cx="5759910" cy="923330"/>
           </a:xfrm>
           <a:prstGeom prst="rect">
             <a:avLst/>
@@ -28035,16 +29939,37 @@
                 <a:cs typeface="+mj-cs"/>
                 <a:sym typeface="Arial" charset="0"/>
               </a:rPr>
-              <a:t>apply</a:t>
-            </a:r>
-            <a:endParaRPr lang="en-US" dirty="0">
-              <a:solidFill>
-                <a:srgbClr val="00CC66"/>
-              </a:solidFill>
-            </a:endParaRPr>
+              <a:t>configuration</a:t>
+            </a:r>
           </a:p>
         </p:txBody>
       </p:sp>
+      <p:pic>
+        <p:nvPicPr>
+          <p:cNvPr id="9" name="Picture 6" descr="film, film roll, media, picture, video icon"/>
+          <p:cNvPicPr>
+            <a:picLocks noChangeAspect="1" noChangeArrowheads="1"/>
+          </p:cNvPicPr>
+          <p:nvPr/>
+        </p:nvPicPr>
+        <p:blipFill>
+          <a:blip r:embed="rId4"/>
+          <a:srcRect b="25000"/>
+          <a:stretch>
+            <a:fillRect/>
+          </a:stretch>
+        </p:blipFill>
+        <p:spPr bwMode="auto">
+          <a:xfrm>
+            <a:off x="863600" y="1066800"/>
+            <a:ext cx="1828800" cy="1371600"/>
+          </a:xfrm>
+          <a:prstGeom prst="rect">
+            <a:avLst/>
+          </a:prstGeom>
+          <a:noFill/>
+        </p:spPr>
+      </p:pic>
     </p:spTree>
   </p:cSld>
   <p:clrMapOvr>

</xml_diff>

<commit_message>
added a Scala inside
</commit_message>
<xml_diff>
--- a/src/main/resources/oscon_2010_specs.pptx
+++ b/src/main/resources/oscon_2010_specs.pptx
@@ -16310,7 +16310,7 @@
                 <a:buNone/>
                 <a:tabLst/>
               </a:pPr>
-              <a:t>Tuesday, July 13, 2010</a:t>
+              <a:t>Sunday, July 18, 2010</a:t>
             </a:fld>
             <a:endParaRPr kumimoji="0" lang="en-US" sz="4000" b="0" i="0" u="none" strike="noStrike" cap="none" normalizeH="0" baseline="0" dirty="0" smtClean="0">
               <a:ln>
@@ -20777,7 +20777,7 @@
                 <a:buNone/>
                 <a:tabLst/>
               </a:pPr>
-              <a:t>Tuesday, July 13, 2010</a:t>
+              <a:t>Sunday, July 18, 2010</a:t>
             </a:fld>
             <a:endParaRPr kumimoji="0" lang="en-US" sz="4000" b="0" i="0" u="none" strike="noStrike" cap="none" normalizeH="0" baseline="0" dirty="0" smtClean="0">
               <a:ln>
@@ -21644,7 +21644,7 @@
           </a:p>
           <a:p>
             <a:r>
-              <a:rPr lang="en-US" sz="4400" dirty="0" smtClean="0">
+              <a:rPr lang="en-US" sz="4400" b="1" dirty="0" smtClean="0">
                 <a:latin typeface="Courier New"/>
               </a:rPr>
               <a:t>}</a:t>
@@ -22356,28 +22356,13 @@
                 </a:solidFill>
                 <a:latin typeface="Courier New"/>
               </a:rPr>
-              <a:t> </a:t>
+              <a:t>  def</a:t>
             </a:r>
             <a:r>
               <a:rPr lang="en-US" sz="3600" b="1" dirty="0" smtClean="0">
-                <a:solidFill>
-                  <a:srgbClr val="7F0055"/>
-                </a:solidFill>
-                <a:latin typeface="Courier New"/>
-              </a:rPr>
-              <a:t> def</a:t>
-            </a:r>
-            <a:r>
-              <a:rPr lang="en-US" sz="3600" b="1" dirty="0" smtClean="0">
-                <a:latin typeface="Courier New"/>
-              </a:rPr>
-              <a:t> </a:t>
-            </a:r>
-            <a:r>
-              <a:rPr lang="en-US" sz="3600" b="1" dirty="0" smtClean="0">
-                <a:latin typeface="Courier New"/>
-              </a:rPr>
-              <a:t>tag(t: </a:t>
+                <a:latin typeface="Courier New"/>
+              </a:rPr>
+              <a:t> tag(t: </a:t>
             </a:r>
             <a:r>
               <a:rPr lang="en-US" sz="3600" b="1" dirty="0" smtClean="0">
@@ -30501,13 +30486,7 @@
               <a:rPr lang="es-ES" sz="4000" b="1" dirty="0" smtClean="0">
                 <a:latin typeface="Courier New"/>
               </a:rPr>
-              <a:t> </a:t>
-            </a:r>
-            <a:r>
-              <a:rPr lang="es-ES" sz="4000" b="1" dirty="0" smtClean="0">
-                <a:latin typeface="Courier New"/>
-              </a:rPr>
-              <a:t>(a, b) = (x, y)</a:t>
+              <a:t> (a, b) = (x, y)</a:t>
             </a:r>
           </a:p>
           <a:p>
@@ -32485,7 +32464,7 @@
                 <a:buNone/>
                 <a:tabLst/>
               </a:pPr>
-              <a:t>Tuesday, July 13, 2010</a:t>
+              <a:t>Sunday, July 18, 2010</a:t>
             </a:fld>
             <a:endParaRPr kumimoji="0" lang="en-US" sz="4000" b="0" i="0" u="none" strike="noStrike" cap="none" normalizeH="0" baseline="0" dirty="0" smtClean="0">
               <a:ln>
@@ -33038,13 +33017,7 @@
               <a:rPr lang="en-US" sz="3200" b="1" dirty="0" smtClean="0">
                 <a:latin typeface="Courier New"/>
               </a:rPr>
-              <a:t>) </a:t>
-            </a:r>
-            <a:r>
-              <a:rPr lang="en-US" sz="3200" b="1" dirty="0" smtClean="0">
-                <a:latin typeface="Courier New"/>
-              </a:rPr>
-              <a:t>= </a:t>
+              <a:t>) = </a:t>
             </a:r>
             <a:r>
               <a:rPr lang="en-US" sz="3200" b="1" dirty="0" smtClean="0">
@@ -34890,31 +34863,7 @@
               <a:rPr lang="pt-BR" sz="4000" b="1" dirty="0" smtClean="0">
                 <a:latin typeface="Courier New"/>
               </a:rPr>
-              <a:t> 2  !  3  ! </a:t>
-            </a:r>
-            <a:r>
-              <a:rPr lang="pt-BR" sz="4000" b="1" dirty="0" smtClean="0">
-                <a:latin typeface="Courier New"/>
-              </a:rPr>
-              <a:t> </a:t>
-            </a:r>
-            <a:r>
-              <a:rPr lang="pt-BR" sz="4000" b="1" dirty="0" smtClean="0">
-                <a:latin typeface="Courier New"/>
-              </a:rPr>
-              <a:t>4 </a:t>
-            </a:r>
-            <a:r>
-              <a:rPr lang="pt-BR" sz="4000" b="1" dirty="0" smtClean="0">
-                <a:latin typeface="Courier New"/>
-              </a:rPr>
-              <a:t>  </a:t>
-            </a:r>
-            <a:r>
-              <a:rPr lang="pt-BR" sz="4000" b="1" dirty="0" smtClean="0">
-                <a:latin typeface="Courier New"/>
-              </a:rPr>
-              <a:t>|&gt; { (a, b, c) =&gt;</a:t>
+              <a:t> 2  !  3  !  4   |&gt; { (a, b, c) =&gt;</a:t>
             </a:r>
           </a:p>
           <a:p>
@@ -36903,7 +36852,7 @@
                 <a:buNone/>
                 <a:tabLst/>
               </a:pPr>
-              <a:t>Tuesday, July 13, 2010</a:t>
+              <a:t>Sunday, July 18, 2010</a:t>
             </a:fld>
             <a:endParaRPr kumimoji="0" lang="en-US" sz="4000" b="0" i="0" u="none" strike="noStrike" cap="none" normalizeH="0" baseline="0" dirty="0" smtClean="0">
               <a:ln>
@@ -37453,6 +37402,453 @@
           <a:noFill/>
         </p:spPr>
       </p:pic>
+      <p:sp>
+        <p:nvSpPr>
+          <p:cNvPr id="12290" name="AutoShape 2" descr="data:image/jpg;base64,/9j/4AAQSkZJRgABAQAAAQABAAD/2wBDAAkGBwgHBgkIBwgKCgkLDRYPDQwMDRsUFRAWIB0iIiAdHx8kKDQsJCYxJx8fLT0tMTU3Ojo6Iys/RD84QzQ5Ojf/2wBDAQoKCg0MDRoPDxo3JR8lNzc3Nzc3Nzc3Nzc3Nzc3Nzc3Nzc3Nzc3Nzc3Nzc3Nzc3Nzc3Nzc3Nzc3Nzc3Nzc3Nzf/wAARCABeAGQDASIAAhEBAxEB/8QAHAAAAgIDAQEAAAAAAAAAAAAABgcABQEDBAII/8QAPxAAAQMDAQQHBQUGBgMAAAAAAQIDBAAFEQYSITFBBxMiUWGBoRQycZGxFSMzQtEWQ1JjovA0U2RyweFzwtL/xAAaAQACAwEBAAAAAAAAAAAAAAADBAACBQEG/8QALREAAQQBAwMDAwMFAAAAAAAAAQACAxEEEiExBUFRMmGRIiNxExSBQqGxwfD/2gAMAwEAAhEDEQA/AHjUqVgnFRRZryeNeXXm2W1OOrShtAKlKUcAAcyaXOpulKLGUpixNCU4N3XuZDfkOKvQUxj4s2Q7TE20OSRsYtxTGWtCEFS1JSlO8lRwBQ5ddd6dtpKHbgl50cW46S4fTcPnSWut9vOoHgmZKekFR7LKNyfJI3fU1uh6Su8oD7hLSP5pwfkMn6VtN6LDCNWVKB7BJnLe8/baj6X0twkKIh2uQ6O91xLfoNqqt7pcuKifZ7XEQP5jilfTFVH7COspSqfcmGQo4GQBk92VEVaM9G6XG0rTLeUFAEFKE4OaNo6NFubPyq3luNLWOli9jeqFbyPAL/8AquuL0uyxul2lhXi08U/UGqleiYa31x416ZL6FbKmipBUCN2MBWar7lom8QgVNtpkpH8Bwr5H/g0cRdIk2rT8hU1ZTe9p36eurd7tUe4stKaS8nOwsgqTvI34+FWQoU6Om1sacitrBBDaeyRgg8T9aKxXlJmtbK5reAStNhJaCVmpUqUNWWK5bjOjW+G7LmOhphpO0tZ5f3w866VZ2TSW6SdRu3+9Cz28qcjR3NgJT++d4E/AbwPM03hYhypdHAG5PgIU0ojbfdcGrtW3DVMz2SIl1ELaw3GT7zh5FWOJ8OA9a6rJoN6TsuXFw78fctn6q/SinRWkm4TSVKSFvqH3jpHoPCiy8uuWSxyplvhiS+wjbS3vG0Ofpk1pzdSEdY+Hs3z5S7McH7kptB09Nl0U1GTLjOpEkkAR2wpRAxkqJIPPxo0tTdtlRGJMXDjT6A42VDBIPPFJDVmpLlqNbD1xjtsttBXUhtspzkjO8nfwrMNyfp+XDdgSNq5SGkpaCe0G217gMHdk/IYosnSHOia5z/uG+9j57e6o3KDXkAbBHfTOwgWe2uJQBsySNw70H9Kt+i19TmkorS8kNhWySeA21bvKlxd9S3C+6XXHu6w7Ihzmyl3ZAKklDiSDjdkEetMXoqGNMMZ/hJ/qVQsuF0HTxG/kO/0rRPD5yRwQgXVDUGHcr0m5RFhxyRIUguMEh4LH3ZSvGE7Kt57/AEqjsuq7vZ1AR5KnWOcd/toPwBOR5Yp+3C2RrgkCQjO7HCg6/dG9vmJW5DSGHTwU2Nn5jgamH1LGDf08hlg178KS4z71MKsdE6ptd8ZWzHR7LMT23IqlZ3d6TzH050WpOa+dbhbrrpG7MrUSy80rbYfT7qsf3vB5eFPHSV9Z1DZmZzXZcPZeb/y1jiPoR4EUt1LBZDU0Jth/siY8xd9L/UFd1KxUrKTSHtc3k2PTUuS2rD6khpnwWrcD5bz5Uu+jSw9coT5CSVOHDeeOz+Y+ZyKtOmSQp9+z2tB/FcU4R47kp+qqNdL29uHBaCEbKUpCEjuA3Vq6/wBtgAN5kJv8BK1+pMb4CXip09iTqZKL63JjGM4Wm2H9otkHcQn8uOG6hCFf71DgvIhz5aGS6lbjiXFEg4IAzyB7vAVthIIul7yN7ceWPUirWzQEyOj68upQOsbUXCefZKf+Aa3WshgZ9bQ4EtHA8JIl7+9crl1NLVctMWWa+srk7b7TyjuyUkYPy9a5bgt8XyIWnWmVojMBtx04SgdUN5PLn51iQhbmi4qkpUoNznQSBnilP6UfK0bH1Fp23vqK2prLSUbSRgrRj3SD3En1rkmRFiAB3FuH4XRG6Ukj2QIXIZ0xNixttx1mQ044+RgOgq2cjmOPP9aanRcMaYjf7f8A2VXFa9DQRbXIDzS+pcKStZVhS1Dgc+HyrXp+6SLLqlOmPYNmElsbL5JJ93IOeBSTkd+aycvJZlROjivY6t/H/dk1FGY3Bzu6Ops2LAZL02Q1HayBtuuBCc8hk17jvtSWEvR3EOtLGUrQoKSoeBHGgTpkKP2bjgqSFCUkgZ342VZqt07q+NpnRNvElovvL2g0yggEjaJJJ5Ck2YDpMdsrNyTVIpnDZC09ke6hskW+2x6HKQntJ7C8b0K5KFLLozmSLFq2VY5hx1xU2U8utQTg+Yz86PdGasj6pivLbYUw8woBxorCtx4EHmOPIUC6uZ9k6U4brG5T/Uuq+OFJPoimsMPAlxJRWxNeCN0KUglsrU3xvqV4ZVttIV3gGpWLRTdpXdJ52da2Fah2dhPH/wAhz9RTMggJiNbsdml90zQXVQ7ddGU/4ZxSFqHLawUn5p9aMNJ3Nq8WCJKaUDtIwsZ91Q4g1p5I14cMg7WD82l4zUr2nvRS501YZLWsbo1c4a0svFxI209lxKl8jzGDRrE0/brDb7g2poC2KaWp1JUVEpxv554CiNyGy48l4pHWJ/NVfqyW5b9N3KWyhta2mFKCHE5SfAjuoMuVLkyC9uNldsbY2n+UBWq/WCzaddlwIkp2A7ILHUqwHELI2snJPId9W1p6QtPMsRWlmQyZA2lJUjaDR2iMKIPhncOFLeVP9s0q40IrEZLU5BCY6SlKsoXvwSd+7v51y3W0Lt9st0tSiVS0qKhjck7iMeR9K3h0yCQkSkhxJ7+yS/cPHoG1K61Xe7tqjUD0SEt0sMPKEdps7ITsnBWT35Gc8sjFbze7h+3ShKmSFx25CttouFSQ2E5IAO4bhyrmu8RzTv2Zfbc+kGYjbLCzntYBUMc0HO/uJrU+oXHWE56MgjrmXHEI5jaY4f1UdkcRYA1o0aSPe9rtD1ODrve1W3eVNva5l5lOFQ61KEhSjgZ4JT3YArwmQG59uW40p8MMoKWgPeO9QHzrUiW6qzKgIZGwl3rnF8+ASPh/3RKdLXCTZ7bebO4OsDKUOgK2SkjgoHhw3U0+SOFga+gNwPjZDDXPO25RD0UxDGkynFOI9qWrD7KVAqbTvwCORz+nfXJcXftjpTeW1hbcNHVgjvSnB/qUr5Vqs6HNDW2Vc5DiXJ0pHVoRnIKjvAB544k+FdvRfa3FJVPkbSnZK9vbPEp7/M5PwxWJLTTNkh1g/SD5vmvYJ1oJ0x17posgBpAHJIqVsAwMVK8/unlxXa3R7pbZECUnaZeQUqHd4jxB30pNMXeToHUcm0XYKMJahtqAyEjglxPeCOPPzGKc54UM610pH1LBxkNzWQSy6B/Se8Gn8LJYy4ZvQ7n2PYoE0ZNObyERMPtvtIeZWlba0hSVpOQQeYNVGtxtaRu4/wBKv6UqbPqC/aEmm3zWFORQo/cOHsnxQrl8PSmBE1jpvUsB2HIlCP7Q2W1syD1ZwRggKO4+RokvT5cd4kb9TObCq2dr2lp2KWFos0u66VkpgNF1xExLhRkAlISQcZ3fmFFV9sE246FtyIscuS4a09YgEZA2MH5UWaP0+zYutYjLU7GWStK1KztZx3DHKiVphppBS2gBKuI5UXJ6o8zamcB1j/CqzHboo+KSUZ0pdbhPiKuS8xUNISlIVvCQPcA5b+J8aZUXTMbbYmJYablpGOs2O0U4wBnj4VfoiMISAG04ByM99ctxvdstTe1PnR447lrAJ+A4nypSbMnySB47BFZEyMWqyTpC2POyMRmENSfxkJbCdr5Y5760yJtt0XZ1JlrAbHZjsJOVOAcAAfqdw50O6i6VGG0qZsEdTyzu9ofSQkfBPEn44oWg2C7amm/aF6dd2VkHK/xFDuA/KP7xTcWC/Try3aWeDyfwgumF6YhZXhP2hrm9dfJT1UJtWyEJGEtp/hT3qPM/9U5NPwEw4qcJ2eyAlOMYHKuHT9gYgMNpQ2G20JwlA+vjREkAYxwxSmblichrBTG8BGhi0bncnleqlSpSSMpWDwrNYNRRVl6skK8x1MzGULB5kZpbXzowU2ortzpCTv2V9pP6/Wm5WMU1j5s+MftuoIb4WSeoL59c0zqC3KPs7boIPGM9j0BFaVnVDZ2FuXfw+9cOfWvoN2Ky777aT5VzKtENX7vHwrSb1x59cbT/AAljhN7OISFRC1NJOyftJQPJb6wPPJqyt2g58heZbyGgriEdtR8+H1p0C0RB+7rpaiste42kVWTrc5FRtDfwutw2f1ElAtg0NEhKS4hjLgH4ru9Xl3eVGUK2sRQCBlXeeVdtZrJlmkldqebKaaxrRTVAKzUqUNWUqVKlRRf/2Q=="/>
+          <p:cNvSpPr>
+            <a:spLocks noChangeAspect="1" noChangeArrowheads="1"/>
+          </p:cNvSpPr>
+          <p:nvPr/>
+        </p:nvSpPr>
+        <p:spPr bwMode="auto">
+          <a:xfrm>
+            <a:off x="155575" y="-144463"/>
+            <a:ext cx="304800" cy="304801"/>
+          </a:xfrm>
+          <a:prstGeom prst="rect">
+            <a:avLst/>
+          </a:prstGeom>
+          <a:noFill/>
+        </p:spPr>
+        <p:txBody>
+          <a:bodyPr vert="horz" wrap="square" lIns="91440" tIns="45720" rIns="91440" bIns="45720" numCol="1" anchor="t" anchorCtr="0" compatLnSpc="1">
+            <a:prstTxWarp prst="textNoShape">
+              <a:avLst/>
+            </a:prstTxWarp>
+          </a:bodyPr>
+          <a:lstStyle/>
+          <a:p>
+            <a:endParaRPr lang="en-US"/>
+          </a:p>
+        </p:txBody>
+      </p:sp>
+      <p:sp>
+        <p:nvSpPr>
+          <p:cNvPr id="12292" name="AutoShape 4" descr="data:image/jpg;base64,/9j/4AAQSkZJRgABAQAAAQABAAD/2wBDAAkGBwgHBgkIBwgKCgkLDRYPDQwMDRsUFRAWIB0iIiAdHx8kKDQsJCYxJx8fLT0tMTU3Ojo6Iys/RD84QzQ5Ojf/2wBDAQoKCg0MDRoPDxo3JR8lNzc3Nzc3Nzc3Nzc3Nzc3Nzc3Nzc3Nzc3Nzc3Nzc3Nzc3Nzc3Nzc3Nzc3Nzc3Nzc3Nzf/wAARCABeAGQDASIAAhEBAxEB/8QAHAAAAgIDAQEAAAAAAAAAAAAABgcABQEDBAII/8QAPxAAAQMDAQQHBQUGBgMAAAAAAQIDBAAFEQYSITFBBxMiUWGBoRQycZGxFSMzQtEWQ1JjovA0U2RyweFzwtL/xAAaAQACAwEBAAAAAAAAAAAAAAADBAACBQEG/8QALREAAQQBAwMDAwMFAAAAAAAAAQACAxEEEiExBUFRMmGRIiNxExSBQqGxwfD/2gAMAwEAAhEDEQA/AHjUqVgnFRRZryeNeXXm2W1OOrShtAKlKUcAAcyaXOpulKLGUpixNCU4N3XuZDfkOKvQUxj4s2Q7TE20OSRsYtxTGWtCEFS1JSlO8lRwBQ5ddd6dtpKHbgl50cW46S4fTcPnSWut9vOoHgmZKekFR7LKNyfJI3fU1uh6Su8oD7hLSP5pwfkMn6VtN6LDCNWVKB7BJnLe8/baj6X0twkKIh2uQ6O91xLfoNqqt7pcuKifZ7XEQP5jilfTFVH7COspSqfcmGQo4GQBk92VEVaM9G6XG0rTLeUFAEFKE4OaNo6NFubPyq3luNLWOli9jeqFbyPAL/8AquuL0uyxul2lhXi08U/UGqleiYa31x416ZL6FbKmipBUCN2MBWar7lom8QgVNtpkpH8Bwr5H/g0cRdIk2rT8hU1ZTe9p36eurd7tUe4stKaS8nOwsgqTvI34+FWQoU6Om1sacitrBBDaeyRgg8T9aKxXlJmtbK5reAStNhJaCVmpUqUNWWK5bjOjW+G7LmOhphpO0tZ5f3w866VZ2TSW6SdRu3+9Cz28qcjR3NgJT++d4E/AbwPM03hYhypdHAG5PgIU0ojbfdcGrtW3DVMz2SIl1ELaw3GT7zh5FWOJ8OA9a6rJoN6TsuXFw78fctn6q/SinRWkm4TSVKSFvqH3jpHoPCiy8uuWSxyplvhiS+wjbS3vG0Ofpk1pzdSEdY+Hs3z5S7McH7kptB09Nl0U1GTLjOpEkkAR2wpRAxkqJIPPxo0tTdtlRGJMXDjT6A42VDBIPPFJDVmpLlqNbD1xjtsttBXUhtspzkjO8nfwrMNyfp+XDdgSNq5SGkpaCe0G217gMHdk/IYosnSHOia5z/uG+9j57e6o3KDXkAbBHfTOwgWe2uJQBsySNw70H9Kt+i19TmkorS8kNhWySeA21bvKlxd9S3C+6XXHu6w7Ihzmyl3ZAKklDiSDjdkEetMXoqGNMMZ/hJ/qVQsuF0HTxG/kO/0rRPD5yRwQgXVDUGHcr0m5RFhxyRIUguMEh4LH3ZSvGE7Kt57/AEqjsuq7vZ1AR5KnWOcd/toPwBOR5Yp+3C2RrgkCQjO7HCg6/dG9vmJW5DSGHTwU2Nn5jgamH1LGDf08hlg178KS4z71MKsdE6ptd8ZWzHR7LMT23IqlZ3d6TzH050WpOa+dbhbrrpG7MrUSy80rbYfT7qsf3vB5eFPHSV9Z1DZmZzXZcPZeb/y1jiPoR4EUt1LBZDU0Jth/siY8xd9L/UFd1KxUrKTSHtc3k2PTUuS2rD6khpnwWrcD5bz5Uu+jSw9coT5CSVOHDeeOz+Y+ZyKtOmSQp9+z2tB/FcU4R47kp+qqNdL29uHBaCEbKUpCEjuA3Vq6/wBtgAN5kJv8BK1+pMb4CXip09iTqZKL63JjGM4Wm2H9otkHcQn8uOG6hCFf71DgvIhz5aGS6lbjiXFEg4IAzyB7vAVthIIul7yN7ceWPUirWzQEyOj68upQOsbUXCefZKf+Aa3WshgZ9bQ4EtHA8JIl7+9crl1NLVctMWWa+srk7b7TyjuyUkYPy9a5bgt8XyIWnWmVojMBtx04SgdUN5PLn51iQhbmi4qkpUoNznQSBnilP6UfK0bH1Fp23vqK2prLSUbSRgrRj3SD3En1rkmRFiAB3FuH4XRG6Ukj2QIXIZ0xNixttx1mQ044+RgOgq2cjmOPP9aanRcMaYjf7f8A2VXFa9DQRbXIDzS+pcKStZVhS1Dgc+HyrXp+6SLLqlOmPYNmElsbL5JJ93IOeBSTkd+aycvJZlROjivY6t/H/dk1FGY3Bzu6Ops2LAZL02Q1HayBtuuBCc8hk17jvtSWEvR3EOtLGUrQoKSoeBHGgTpkKP2bjgqSFCUkgZ342VZqt07q+NpnRNvElovvL2g0yggEjaJJJ5Ck2YDpMdsrNyTVIpnDZC09ke6hskW+2x6HKQntJ7C8b0K5KFLLozmSLFq2VY5hx1xU2U8utQTg+Yz86PdGasj6pivLbYUw8woBxorCtx4EHmOPIUC6uZ9k6U4brG5T/Uuq+OFJPoimsMPAlxJRWxNeCN0KUglsrU3xvqV4ZVttIV3gGpWLRTdpXdJ52da2Fah2dhPH/wAhz9RTMggJiNbsdml90zQXVQ7ddGU/4ZxSFqHLawUn5p9aMNJ3Nq8WCJKaUDtIwsZ91Q4g1p5I14cMg7WD82l4zUr2nvRS501YZLWsbo1c4a0svFxI209lxKl8jzGDRrE0/brDb7g2poC2KaWp1JUVEpxv554CiNyGy48l4pHWJ/NVfqyW5b9N3KWyhta2mFKCHE5SfAjuoMuVLkyC9uNldsbY2n+UBWq/WCzaddlwIkp2A7ILHUqwHELI2snJPId9W1p6QtPMsRWlmQyZA2lJUjaDR2iMKIPhncOFLeVP9s0q40IrEZLU5BCY6SlKsoXvwSd+7v51y3W0Lt9st0tSiVS0qKhjck7iMeR9K3h0yCQkSkhxJ7+yS/cPHoG1K61Xe7tqjUD0SEt0sMPKEdps7ITsnBWT35Gc8sjFbze7h+3ShKmSFx25CttouFSQ2E5IAO4bhyrmu8RzTv2Zfbc+kGYjbLCzntYBUMc0HO/uJrU+oXHWE56MgjrmXHEI5jaY4f1UdkcRYA1o0aSPe9rtD1ODrve1W3eVNva5l5lOFQ61KEhSjgZ4JT3YArwmQG59uW40p8MMoKWgPeO9QHzrUiW6qzKgIZGwl3rnF8+ASPh/3RKdLXCTZ7bebO4OsDKUOgK2SkjgoHhw3U0+SOFga+gNwPjZDDXPO25RD0UxDGkynFOI9qWrD7KVAqbTvwCORz+nfXJcXftjpTeW1hbcNHVgjvSnB/qUr5Vqs6HNDW2Vc5DiXJ0pHVoRnIKjvAB544k+FdvRfa3FJVPkbSnZK9vbPEp7/M5PwxWJLTTNkh1g/SD5vmvYJ1oJ0x17posgBpAHJIqVsAwMVK8/unlxXa3R7pbZECUnaZeQUqHd4jxB30pNMXeToHUcm0XYKMJahtqAyEjglxPeCOPPzGKc54UM610pH1LBxkNzWQSy6B/Se8Gn8LJYy4ZvQ7n2PYoE0ZNObyERMPtvtIeZWlba0hSVpOQQeYNVGtxtaRu4/wBKv6UqbPqC/aEmm3zWFORQo/cOHsnxQrl8PSmBE1jpvUsB2HIlCP7Q2W1syD1ZwRggKO4+RokvT5cd4kb9TObCq2dr2lp2KWFos0u66VkpgNF1xExLhRkAlISQcZ3fmFFV9sE246FtyIscuS4a09YgEZA2MH5UWaP0+zYutYjLU7GWStK1KztZx3DHKiVphppBS2gBKuI5UXJ6o8zamcB1j/CqzHboo+KSUZ0pdbhPiKuS8xUNISlIVvCQPcA5b+J8aZUXTMbbYmJYablpGOs2O0U4wBnj4VfoiMISAG04ByM99ctxvdstTe1PnR447lrAJ+A4nypSbMnySB47BFZEyMWqyTpC2POyMRmENSfxkJbCdr5Y5760yJtt0XZ1JlrAbHZjsJOVOAcAAfqdw50O6i6VGG0qZsEdTyzu9ofSQkfBPEn44oWg2C7amm/aF6dd2VkHK/xFDuA/KP7xTcWC/Try3aWeDyfwgumF6YhZXhP2hrm9dfJT1UJtWyEJGEtp/hT3qPM/9U5NPwEw4qcJ2eyAlOMYHKuHT9gYgMNpQ2G20JwlA+vjREkAYxwxSmblichrBTG8BGhi0bncnleqlSpSSMpWDwrNYNRRVl6skK8x1MzGULB5kZpbXzowU2ortzpCTv2V9pP6/Wm5WMU1j5s+MftuoIb4WSeoL59c0zqC3KPs7boIPGM9j0BFaVnVDZ2FuXfw+9cOfWvoN2Ky777aT5VzKtENX7vHwrSb1x59cbT/AAljhN7OISFRC1NJOyftJQPJb6wPPJqyt2g58heZbyGgriEdtR8+H1p0C0RB+7rpaiste42kVWTrc5FRtDfwutw2f1ElAtg0NEhKS4hjLgH4ru9Xl3eVGUK2sRQCBlXeeVdtZrJlmkldqebKaaxrRTVAKzUqUNWUqVKlRRf/2Q=="/>
+          <p:cNvSpPr>
+            <a:spLocks noChangeAspect="1" noChangeArrowheads="1"/>
+          </p:cNvSpPr>
+          <p:nvPr/>
+        </p:nvSpPr>
+        <p:spPr bwMode="auto">
+          <a:xfrm>
+            <a:off x="155575" y="-144463"/>
+            <a:ext cx="304800" cy="304801"/>
+          </a:xfrm>
+          <a:prstGeom prst="rect">
+            <a:avLst/>
+          </a:prstGeom>
+          <a:noFill/>
+        </p:spPr>
+        <p:txBody>
+          <a:bodyPr vert="horz" wrap="square" lIns="91440" tIns="45720" rIns="91440" bIns="45720" numCol="1" anchor="t" anchorCtr="0" compatLnSpc="1">
+            <a:prstTxWarp prst="textNoShape">
+              <a:avLst/>
+            </a:prstTxWarp>
+          </a:bodyPr>
+          <a:lstStyle/>
+          <a:p>
+            <a:endParaRPr lang="en-US"/>
+          </a:p>
+        </p:txBody>
+      </p:sp>
+      <p:grpSp>
+        <p:nvGrpSpPr>
+          <p:cNvPr id="20" name="Group 19"/>
+          <p:cNvGrpSpPr/>
+          <p:nvPr/>
+        </p:nvGrpSpPr>
+        <p:grpSpPr>
+          <a:xfrm>
+            <a:off x="9017000" y="5105400"/>
+            <a:ext cx="3329098" cy="3133598"/>
+            <a:chOff x="9169400" y="5105400"/>
+            <a:chExt cx="3329098" cy="3133598"/>
+          </a:xfrm>
+        </p:grpSpPr>
+        <p:pic>
+          <p:nvPicPr>
+            <p:cNvPr id="12294" name="Picture 6" descr="http://paulcomputers.com/NewFiles/IntelInside.jpg"/>
+            <p:cNvPicPr>
+              <a:picLocks noChangeAspect="1" noChangeArrowheads="1"/>
+            </p:cNvPicPr>
+            <p:nvPr/>
+          </p:nvPicPr>
+          <p:blipFill>
+            <a:blip r:embed="rId6"/>
+            <a:srcRect/>
+            <a:stretch>
+              <a:fillRect/>
+            </a:stretch>
+          </p:blipFill>
+          <p:spPr bwMode="auto">
+            <a:xfrm>
+              <a:off x="9169400" y="5105400"/>
+              <a:ext cx="3329098" cy="3133598"/>
+            </a:xfrm>
+            <a:prstGeom prst="rect">
+              <a:avLst/>
+            </a:prstGeom>
+            <a:noFill/>
+          </p:spPr>
+        </p:pic>
+        <p:sp>
+          <p:nvSpPr>
+            <p:cNvPr id="13" name="Oval 12"/>
+            <p:cNvSpPr/>
+            <p:nvPr/>
+          </p:nvSpPr>
+          <p:spPr bwMode="auto">
+            <a:xfrm rot="20057683">
+              <a:off x="10587860" y="6323598"/>
+              <a:ext cx="1529755" cy="565100"/>
+            </a:xfrm>
+            <a:prstGeom prst="ellipse">
+              <a:avLst/>
+            </a:prstGeom>
+            <a:solidFill>
+              <a:schemeClr val="bg1"/>
+            </a:solidFill>
+            <a:ln w="25400" cap="flat" cmpd="sng" algn="ctr">
+              <a:solidFill>
+                <a:schemeClr val="bg1"/>
+              </a:solidFill>
+              <a:prstDash val="solid"/>
+              <a:round/>
+              <a:headEnd type="none" w="med" len="med"/>
+              <a:tailEnd type="none" w="med" len="med"/>
+            </a:ln>
+            <a:effectLst/>
+          </p:spPr>
+          <p:txBody>
+            <a:bodyPr vert="horz" wrap="square" lIns="91440" tIns="45720" rIns="91440" bIns="45720" numCol="1" rtlCol="0" anchor="t" anchorCtr="0" compatLnSpc="1">
+              <a:prstTxWarp prst="textNoShape">
+                <a:avLst/>
+              </a:prstTxWarp>
+            </a:bodyPr>
+            <a:lstStyle/>
+            <a:p>
+              <a:pPr marL="0" marR="0" indent="0" algn="l" defTabSz="914400" rtl="0" eaLnBrk="1" fontAlgn="base" latinLnBrk="0" hangingPunct="1">
+                <a:lnSpc>
+                  <a:spcPct val="100000"/>
+                </a:lnSpc>
+                <a:spcBef>
+                  <a:spcPct val="0"/>
+                </a:spcBef>
+                <a:spcAft>
+                  <a:spcPct val="0"/>
+                </a:spcAft>
+                <a:buClrTx/>
+                <a:buSzTx/>
+                <a:buFontTx/>
+                <a:buNone/>
+                <a:tabLst/>
+              </a:pPr>
+              <a:endParaRPr kumimoji="0" lang="en-US" sz="4800" b="0" i="0" u="none" strike="noStrike" cap="none" normalizeH="0" baseline="0" smtClean="0">
+                <a:ln>
+                  <a:noFill/>
+                </a:ln>
+                <a:solidFill>
+                  <a:srgbClr val="000000"/>
+                </a:solidFill>
+                <a:effectLst/>
+                <a:latin typeface="Gill Sans" pitchFamily="1" charset="0"/>
+                <a:ea typeface="ヒラギノ角ゴ ProN W3" pitchFamily="1" charset="-128"/>
+                <a:sym typeface="Gill Sans" pitchFamily="1" charset="0"/>
+              </a:endParaRPr>
+            </a:p>
+          </p:txBody>
+        </p:sp>
+        <p:sp>
+          <p:nvSpPr>
+            <p:cNvPr id="16" name="Oval 15"/>
+            <p:cNvSpPr/>
+            <p:nvPr/>
+          </p:nvSpPr>
+          <p:spPr bwMode="auto">
+            <a:xfrm rot="20057683">
+              <a:off x="9818360" y="5701739"/>
+              <a:ext cx="1595857" cy="1012674"/>
+            </a:xfrm>
+            <a:prstGeom prst="ellipse">
+              <a:avLst/>
+            </a:prstGeom>
+            <a:solidFill>
+              <a:schemeClr val="bg1"/>
+            </a:solidFill>
+            <a:ln w="25400" cap="flat" cmpd="sng" algn="ctr">
+              <a:solidFill>
+                <a:schemeClr val="bg1"/>
+              </a:solidFill>
+              <a:prstDash val="solid"/>
+              <a:round/>
+              <a:headEnd type="none" w="med" len="med"/>
+              <a:tailEnd type="none" w="med" len="med"/>
+            </a:ln>
+            <a:effectLst/>
+          </p:spPr>
+          <p:txBody>
+            <a:bodyPr vert="horz" wrap="square" lIns="91440" tIns="45720" rIns="91440" bIns="45720" numCol="1" rtlCol="0" anchor="t" anchorCtr="0" compatLnSpc="1">
+              <a:prstTxWarp prst="textNoShape">
+                <a:avLst/>
+              </a:prstTxWarp>
+            </a:bodyPr>
+            <a:lstStyle/>
+            <a:p>
+              <a:pPr marL="0" marR="0" indent="0" algn="l" defTabSz="914400" rtl="0" eaLnBrk="1" fontAlgn="base" latinLnBrk="0" hangingPunct="1">
+                <a:lnSpc>
+                  <a:spcPct val="100000"/>
+                </a:lnSpc>
+                <a:spcBef>
+                  <a:spcPct val="0"/>
+                </a:spcBef>
+                <a:spcAft>
+                  <a:spcPct val="0"/>
+                </a:spcAft>
+                <a:buClrTx/>
+                <a:buSzTx/>
+                <a:buFontTx/>
+                <a:buNone/>
+                <a:tabLst/>
+              </a:pPr>
+              <a:endParaRPr kumimoji="0" lang="en-US" sz="4800" b="0" i="0" u="none" strike="noStrike" cap="none" normalizeH="0" baseline="0" smtClean="0">
+                <a:ln>
+                  <a:noFill/>
+                </a:ln>
+                <a:solidFill>
+                  <a:srgbClr val="000000"/>
+                </a:solidFill>
+                <a:effectLst/>
+                <a:latin typeface="Gill Sans" pitchFamily="1" charset="0"/>
+                <a:ea typeface="ヒラギノ角ゴ ProN W3" pitchFamily="1" charset="-128"/>
+                <a:sym typeface="Gill Sans" pitchFamily="1" charset="0"/>
+              </a:endParaRPr>
+            </a:p>
+          </p:txBody>
+        </p:sp>
+        <p:sp>
+          <p:nvSpPr>
+            <p:cNvPr id="17" name="Oval 16"/>
+            <p:cNvSpPr/>
+            <p:nvPr/>
+          </p:nvSpPr>
+          <p:spPr bwMode="auto">
+            <a:xfrm rot="20057683">
+              <a:off x="10008393" y="6444295"/>
+              <a:ext cx="2234873" cy="1216294"/>
+            </a:xfrm>
+            <a:prstGeom prst="ellipse">
+              <a:avLst/>
+            </a:prstGeom>
+            <a:solidFill>
+              <a:schemeClr val="bg1"/>
+            </a:solidFill>
+            <a:ln w="25400" cap="flat" cmpd="sng" algn="ctr">
+              <a:solidFill>
+                <a:schemeClr val="bg1"/>
+              </a:solidFill>
+              <a:prstDash val="solid"/>
+              <a:round/>
+              <a:headEnd type="none" w="med" len="med"/>
+              <a:tailEnd type="none" w="med" len="med"/>
+            </a:ln>
+            <a:effectLst/>
+          </p:spPr>
+          <p:txBody>
+            <a:bodyPr vert="horz" wrap="square" lIns="91440" tIns="45720" rIns="91440" bIns="45720" numCol="1" rtlCol="0" anchor="t" anchorCtr="0" compatLnSpc="1">
+              <a:prstTxWarp prst="textNoShape">
+                <a:avLst/>
+              </a:prstTxWarp>
+            </a:bodyPr>
+            <a:lstStyle/>
+            <a:p>
+              <a:pPr marL="0" marR="0" indent="0" algn="l" defTabSz="914400" rtl="0" eaLnBrk="1" fontAlgn="base" latinLnBrk="0" hangingPunct="1">
+                <a:lnSpc>
+                  <a:spcPct val="100000"/>
+                </a:lnSpc>
+                <a:spcBef>
+                  <a:spcPct val="0"/>
+                </a:spcBef>
+                <a:spcAft>
+                  <a:spcPct val="0"/>
+                </a:spcAft>
+                <a:buClrTx/>
+                <a:buSzTx/>
+                <a:buFontTx/>
+                <a:buNone/>
+                <a:tabLst/>
+              </a:pPr>
+              <a:endParaRPr kumimoji="0" lang="en-US" sz="4800" b="0" i="0" u="none" strike="noStrike" cap="none" normalizeH="0" baseline="0" smtClean="0">
+                <a:ln>
+                  <a:noFill/>
+                </a:ln>
+                <a:solidFill>
+                  <a:srgbClr val="000000"/>
+                </a:solidFill>
+                <a:effectLst/>
+                <a:latin typeface="Gill Sans" pitchFamily="1" charset="0"/>
+                <a:ea typeface="ヒラギノ角ゴ ProN W3" pitchFamily="1" charset="-128"/>
+                <a:sym typeface="Gill Sans" pitchFamily="1" charset="0"/>
+              </a:endParaRPr>
+            </a:p>
+          </p:txBody>
+        </p:sp>
+        <p:sp>
+          <p:nvSpPr>
+            <p:cNvPr id="19" name="Oval 18"/>
+            <p:cNvSpPr/>
+            <p:nvPr/>
+          </p:nvSpPr>
+          <p:spPr bwMode="auto">
+            <a:xfrm rot="20057683">
+              <a:off x="9485748" y="5946858"/>
+              <a:ext cx="1651517" cy="1012674"/>
+            </a:xfrm>
+            <a:prstGeom prst="ellipse">
+              <a:avLst/>
+            </a:prstGeom>
+            <a:solidFill>
+              <a:schemeClr val="bg1"/>
+            </a:solidFill>
+            <a:ln w="25400" cap="flat" cmpd="sng" algn="ctr">
+              <a:solidFill>
+                <a:schemeClr val="bg1"/>
+              </a:solidFill>
+              <a:prstDash val="solid"/>
+              <a:round/>
+              <a:headEnd type="none" w="med" len="med"/>
+              <a:tailEnd type="none" w="med" len="med"/>
+            </a:ln>
+            <a:effectLst/>
+          </p:spPr>
+          <p:txBody>
+            <a:bodyPr vert="horz" wrap="square" lIns="91440" tIns="45720" rIns="91440" bIns="45720" numCol="1" rtlCol="0" anchor="t" anchorCtr="0" compatLnSpc="1">
+              <a:prstTxWarp prst="textNoShape">
+                <a:avLst/>
+              </a:prstTxWarp>
+            </a:bodyPr>
+            <a:lstStyle/>
+            <a:p>
+              <a:pPr marL="0" marR="0" indent="0" algn="l" defTabSz="914400" rtl="0" eaLnBrk="1" fontAlgn="base" latinLnBrk="0" hangingPunct="1">
+                <a:lnSpc>
+                  <a:spcPct val="100000"/>
+                </a:lnSpc>
+                <a:spcBef>
+                  <a:spcPct val="0"/>
+                </a:spcBef>
+                <a:spcAft>
+                  <a:spcPct val="0"/>
+                </a:spcAft>
+                <a:buClrTx/>
+                <a:buSzTx/>
+                <a:buFontTx/>
+                <a:buNone/>
+                <a:tabLst/>
+              </a:pPr>
+              <a:endParaRPr kumimoji="0" lang="en-US" sz="4800" b="0" i="0" u="none" strike="noStrike" cap="none" normalizeH="0" baseline="0" smtClean="0">
+                <a:ln>
+                  <a:noFill/>
+                </a:ln>
+                <a:solidFill>
+                  <a:srgbClr val="000000"/>
+                </a:solidFill>
+                <a:effectLst/>
+                <a:latin typeface="Gill Sans" pitchFamily="1" charset="0"/>
+                <a:ea typeface="ヒラギノ角ゴ ProN W3" pitchFamily="1" charset="-128"/>
+                <a:sym typeface="Gill Sans" pitchFamily="1" charset="0"/>
+              </a:endParaRPr>
+            </a:p>
+          </p:txBody>
+        </p:sp>
+        <p:sp>
+          <p:nvSpPr>
+            <p:cNvPr id="18" name="Rectangle 17"/>
+            <p:cNvSpPr/>
+            <p:nvPr/>
+          </p:nvSpPr>
+          <p:spPr>
+            <a:xfrm rot="19907933">
+              <a:off x="9397705" y="5735926"/>
+              <a:ext cx="2834582" cy="1938992"/>
+            </a:xfrm>
+            <a:prstGeom prst="rect">
+              <a:avLst/>
+            </a:prstGeom>
+          </p:spPr>
+          <p:txBody>
+            <a:bodyPr wrap="square">
+              <a:spAutoFit/>
+            </a:bodyPr>
+            <a:lstStyle/>
+            <a:p>
+              <a:pPr lvl="0" algn="ctr"/>
+              <a:r>
+                <a:rPr lang="en-US" sz="4000" b="1" dirty="0" err="1" smtClean="0">
+                  <a:solidFill>
+                    <a:srgbClr val="0000FF"/>
+                  </a:solidFill>
+                  <a:latin typeface="Comic Sans MS" pitchFamily="66" charset="0"/>
+                  <a:cs typeface="Tahoma" pitchFamily="34" charset="0"/>
+                </a:rPr>
+                <a:t>Scala</a:t>
+              </a:r>
+              <a:r>
+                <a:rPr lang="en-US" sz="4000" b="1" dirty="0" smtClean="0">
+                  <a:solidFill>
+                    <a:srgbClr val="0000FF"/>
+                  </a:solidFill>
+                  <a:latin typeface="Comic Sans MS" pitchFamily="66" charset="0"/>
+                  <a:cs typeface="Tahoma" pitchFamily="34" charset="0"/>
+                </a:rPr>
+                <a:t> </a:t>
+              </a:r>
+              <a:r>
+                <a:rPr lang="en-US" sz="4000" b="1" dirty="0" smtClean="0">
+                  <a:solidFill>
+                    <a:srgbClr val="0000FF"/>
+                  </a:solidFill>
+                  <a:latin typeface="Comic Sans MS" pitchFamily="66" charset="0"/>
+                  <a:cs typeface="Tahoma" pitchFamily="34" charset="0"/>
+                </a:rPr>
+                <a:t>2.8.0</a:t>
+              </a:r>
+            </a:p>
+            <a:p>
+              <a:pPr lvl="0" algn="ctr"/>
+              <a:r>
+                <a:rPr lang="en-US" sz="4000" b="1" dirty="0" smtClean="0">
+                  <a:solidFill>
+                    <a:srgbClr val="0000FF"/>
+                  </a:solidFill>
+                  <a:latin typeface="Comic Sans MS" pitchFamily="66" charset="0"/>
+                  <a:cs typeface="Tahoma" pitchFamily="34" charset="0"/>
+                </a:rPr>
+                <a:t> </a:t>
+              </a:r>
+              <a:r>
+                <a:rPr lang="en-US" sz="4000" b="1" dirty="0" smtClean="0">
+                  <a:solidFill>
+                    <a:srgbClr val="0000FF"/>
+                  </a:solidFill>
+                  <a:latin typeface="Comic Sans MS" pitchFamily="66" charset="0"/>
+                  <a:cs typeface="Tahoma" pitchFamily="34" charset="0"/>
+                </a:rPr>
+                <a:t>inside !</a:t>
+              </a:r>
+            </a:p>
+          </p:txBody>
+        </p:sp>
+      </p:grpSp>
     </p:spTree>
   </p:cSld>
   <p:clrMapOvr>
@@ -44629,17 +45025,8 @@
               <a:rPr lang="en-US" sz="3600" b="1" dirty="0" smtClean="0">
                 <a:latin typeface="Courier New"/>
               </a:rPr>
-              <a:t> </a:t>
-            </a:r>
-            <a:r>
-              <a:rPr lang="en-US" sz="3600" b="1" dirty="0" smtClean="0">
-                <a:latin typeface="Courier New"/>
-              </a:rPr>
-              <a:t>in {</a:t>
-            </a:r>
-            <a:endParaRPr lang="en-US" sz="3600" b="1" dirty="0" smtClean="0">
-              <a:latin typeface="Courier New"/>
-            </a:endParaRPr>
+              <a:t> in {</a:t>
+            </a:r>
           </a:p>
           <a:p>
             <a:r>

</xml_diff>

<commit_message>
created a BFG version of the talk
</commit_message>
<xml_diff>
--- a/src/main/resources/oscon_2010_specs.pptx
+++ b/src/main/resources/oscon_2010_specs.pptx
@@ -10377,7 +10377,7 @@
     <p:bg>
       <p:bgPr>
         <a:blipFill dpi="0" rotWithShape="0">
-          <a:blip r:embed="rId13"/>
+          <a:blip r:embed="rId13" cstate="print"/>
           <a:srcRect/>
           <a:stretch>
             <a:fillRect/>
@@ -10945,7 +10945,7 @@
     <p:bg>
       <p:bgPr>
         <a:blipFill dpi="0" rotWithShape="0">
-          <a:blip r:embed="rId13"/>
+          <a:blip r:embed="rId13" cstate="print"/>
           <a:srcRect/>
           <a:stretch>
             <a:fillRect/>
@@ -11733,7 +11733,7 @@
           <p:nvPr/>
         </p:nvPicPr>
         <p:blipFill>
-          <a:blip r:embed="rId3"/>
+          <a:blip r:embed="rId3" cstate="print"/>
           <a:srcRect/>
           <a:stretch>
             <a:fillRect/>
@@ -12031,7 +12031,7 @@
           <p:nvPr/>
         </p:nvPicPr>
         <p:blipFill>
-          <a:blip r:embed="rId3"/>
+          <a:blip r:embed="rId3" cstate="print"/>
           <a:srcRect/>
           <a:stretch>
             <a:fillRect/>
@@ -12275,7 +12275,7 @@
           <p:nvPr/>
         </p:nvPicPr>
         <p:blipFill>
-          <a:blip r:embed="rId4"/>
+          <a:blip r:embed="rId4" cstate="print"/>
           <a:srcRect/>
           <a:stretch>
             <a:fillRect/>
@@ -13440,7 +13440,7 @@
           <p:nvPr/>
         </p:nvPicPr>
         <p:blipFill>
-          <a:blip r:embed="rId3"/>
+          <a:blip r:embed="rId3" cstate="print"/>
           <a:srcRect/>
           <a:stretch>
             <a:fillRect/>
@@ -13986,7 +13986,7 @@
           <p:nvPr/>
         </p:nvPicPr>
         <p:blipFill>
-          <a:blip r:embed="rId3"/>
+          <a:blip r:embed="rId3" cstate="print"/>
           <a:srcRect/>
           <a:stretch>
             <a:fillRect/>
@@ -14266,7 +14266,7 @@
           <p:nvPr/>
         </p:nvPicPr>
         <p:blipFill>
-          <a:blip r:embed="rId3"/>
+          <a:blip r:embed="rId3" cstate="print"/>
           <a:srcRect/>
           <a:stretch>
             <a:fillRect/>
@@ -14292,7 +14292,7 @@
           <p:nvPr/>
         </p:nvPicPr>
         <p:blipFill>
-          <a:blip r:embed="rId4"/>
+          <a:blip r:embed="rId4" cstate="print"/>
           <a:srcRect l="2477" t="18307" r="71667" b="65217"/>
           <a:stretch>
             <a:fillRect/>
@@ -14394,7 +14394,7 @@
           <p:nvPr/>
         </p:nvPicPr>
         <p:blipFill>
-          <a:blip r:embed="rId3"/>
+          <a:blip r:embed="rId3" cstate="print"/>
           <a:srcRect/>
           <a:stretch>
             <a:fillRect/>
@@ -14500,7 +14500,7 @@
           <p:nvPr/>
         </p:nvPicPr>
         <p:blipFill>
-          <a:blip r:embed="rId4"/>
+          <a:blip r:embed="rId4" cstate="print"/>
           <a:srcRect l="17647" t="35294" r="17647" b="35294"/>
           <a:stretch>
             <a:fillRect/>
@@ -14526,7 +14526,7 @@
           <p:nvPr/>
         </p:nvPicPr>
         <p:blipFill>
-          <a:blip r:embed="rId5"/>
+          <a:blip r:embed="rId5" cstate="print"/>
           <a:srcRect/>
           <a:stretch>
             <a:fillRect/>
@@ -14552,7 +14552,7 @@
           <p:nvPr/>
         </p:nvPicPr>
         <p:blipFill>
-          <a:blip r:embed="rId4"/>
+          <a:blip r:embed="rId4" cstate="print"/>
           <a:srcRect l="17647" t="35294" r="17647" b="35294"/>
           <a:stretch>
             <a:fillRect/>
@@ -14578,7 +14578,7 @@
           <p:nvPr/>
         </p:nvPicPr>
         <p:blipFill>
-          <a:blip r:embed="rId4"/>
+          <a:blip r:embed="rId4" cstate="print"/>
           <a:srcRect l="17647" t="35294" r="17647" b="35294"/>
           <a:stretch>
             <a:fillRect/>
@@ -14880,7 +14880,7 @@
           <p:nvPr/>
         </p:nvPicPr>
         <p:blipFill>
-          <a:blip r:embed="rId3"/>
+          <a:blip r:embed="rId3" cstate="print"/>
           <a:srcRect/>
           <a:stretch>
             <a:fillRect/>
@@ -15259,7 +15259,7 @@
           <p:nvPr/>
         </p:nvPicPr>
         <p:blipFill>
-          <a:blip r:embed="rId3"/>
+          <a:blip r:embed="rId3" cstate="print"/>
           <a:srcRect/>
           <a:stretch>
             <a:fillRect/>
@@ -15443,7 +15443,7 @@
           <p:nvPr/>
         </p:nvPicPr>
         <p:blipFill>
-          <a:blip r:embed="rId3"/>
+          <a:blip r:embed="rId3" cstate="print"/>
           <a:srcRect/>
           <a:stretch>
             <a:fillRect/>
@@ -15588,7 +15588,7 @@
           <p:nvPr/>
         </p:nvPicPr>
         <p:blipFill>
-          <a:blip r:embed="rId4"/>
+          <a:blip r:embed="rId4" cstate="print"/>
           <a:srcRect/>
           <a:stretch>
             <a:fillRect/>
@@ -15614,7 +15614,7 @@
           <p:nvPr/>
         </p:nvPicPr>
         <p:blipFill>
-          <a:blip r:embed="rId5"/>
+          <a:blip r:embed="rId5" cstate="print"/>
           <a:srcRect/>
           <a:stretch>
             <a:fillRect/>
@@ -15823,7 +15823,7 @@
           <p:nvPr/>
         </p:nvPicPr>
         <p:blipFill>
-          <a:blip r:embed="rId3"/>
+          <a:blip r:embed="rId3" cstate="print"/>
           <a:srcRect/>
           <a:stretch>
             <a:fillRect/>
@@ -16213,7 +16213,7 @@
           <p:nvPr/>
         </p:nvPicPr>
         <p:blipFill>
-          <a:blip r:embed="rId3"/>
+          <a:blip r:embed="rId3" cstate="print"/>
           <a:srcRect r="25286"/>
           <a:stretch>
             <a:fillRect/>
@@ -16310,7 +16310,7 @@
                 <a:buNone/>
                 <a:tabLst/>
               </a:pPr>
-              <a:t>Sunday, July 18, 2010</a:t>
+              <a:t>Tuesday, September 21, 2010</a:t>
             </a:fld>
             <a:endParaRPr kumimoji="0" lang="en-US" sz="4000" b="0" i="0" u="none" strike="noStrike" cap="none" normalizeH="0" baseline="0" dirty="0" smtClean="0">
               <a:ln>
@@ -16762,7 +16762,7 @@
           <p:nvPr/>
         </p:nvPicPr>
         <p:blipFill>
-          <a:blip r:embed="rId3"/>
+          <a:blip r:embed="rId3" cstate="print"/>
           <a:srcRect/>
           <a:stretch>
             <a:fillRect/>
@@ -16991,7 +16991,7 @@
           <p:nvPr/>
         </p:nvPicPr>
         <p:blipFill>
-          <a:blip r:embed="rId3"/>
+          <a:blip r:embed="rId3" cstate="print"/>
           <a:srcRect/>
           <a:stretch>
             <a:fillRect/>
@@ -17223,7 +17223,7 @@
           <p:nvPr/>
         </p:nvPicPr>
         <p:blipFill>
-          <a:blip r:embed="rId3"/>
+          <a:blip r:embed="rId3" cstate="print"/>
           <a:srcRect/>
           <a:stretch>
             <a:fillRect/>
@@ -17368,7 +17368,7 @@
           <p:nvPr/>
         </p:nvPicPr>
         <p:blipFill>
-          <a:blip r:embed="rId4"/>
+          <a:blip r:embed="rId4" cstate="print"/>
           <a:srcRect/>
           <a:stretch>
             <a:fillRect/>
@@ -17394,7 +17394,7 @@
           <p:nvPr/>
         </p:nvPicPr>
         <p:blipFill>
-          <a:blip r:embed="rId5"/>
+          <a:blip r:embed="rId5" cstate="print"/>
           <a:srcRect/>
           <a:stretch>
             <a:fillRect/>
@@ -17599,7 +17599,7 @@
           <p:nvPr/>
         </p:nvPicPr>
         <p:blipFill>
-          <a:blip r:embed="rId3"/>
+          <a:blip r:embed="rId3" cstate="print"/>
           <a:srcRect/>
           <a:stretch>
             <a:fillRect/>
@@ -17975,7 +17975,7 @@
           <p:nvPr/>
         </p:nvPicPr>
         <p:blipFill>
-          <a:blip r:embed="rId3"/>
+          <a:blip r:embed="rId3" cstate="print"/>
           <a:srcRect/>
           <a:stretch>
             <a:fillRect/>
@@ -18470,7 +18470,7 @@
           <p:nvPr/>
         </p:nvPicPr>
         <p:blipFill>
-          <a:blip r:embed="rId3"/>
+          <a:blip r:embed="rId3" cstate="print"/>
           <a:srcRect/>
           <a:stretch>
             <a:fillRect/>
@@ -18759,7 +18759,7 @@
           <p:nvPr/>
         </p:nvPicPr>
         <p:blipFill>
-          <a:blip r:embed="rId3"/>
+          <a:blip r:embed="rId3" cstate="print"/>
           <a:srcRect/>
           <a:stretch>
             <a:fillRect/>
@@ -18824,7 +18824,7 @@
           <p:nvPr/>
         </p:nvPicPr>
         <p:blipFill>
-          <a:blip r:embed="rId4"/>
+          <a:blip r:embed="rId4" cstate="print"/>
           <a:srcRect/>
           <a:stretch>
             <a:fillRect/>
@@ -18956,7 +18956,7 @@
           <p:nvPr/>
         </p:nvPicPr>
         <p:blipFill>
-          <a:blip r:embed="rId3"/>
+          <a:blip r:embed="rId3" cstate="print"/>
           <a:srcRect/>
           <a:stretch>
             <a:fillRect/>
@@ -19231,7 +19231,7 @@
           <p:nvPr/>
         </p:nvPicPr>
         <p:blipFill>
-          <a:blip r:embed="rId4"/>
+          <a:blip r:embed="rId4" cstate="print"/>
           <a:srcRect/>
           <a:stretch>
             <a:fillRect/>
@@ -19475,7 +19475,7 @@
           <p:nvPr/>
         </p:nvPicPr>
         <p:blipFill>
-          <a:blip r:embed="rId3"/>
+          <a:blip r:embed="rId3" cstate="print"/>
           <a:srcRect/>
           <a:stretch>
             <a:fillRect/>
@@ -19676,7 +19676,7 @@
           <p:nvPr/>
         </p:nvPicPr>
         <p:blipFill>
-          <a:blip r:embed="rId4"/>
+          <a:blip r:embed="rId4" cstate="print"/>
           <a:srcRect/>
           <a:stretch>
             <a:fillRect/>
@@ -19850,7 +19850,7 @@
           <p:nvPr/>
         </p:nvPicPr>
         <p:blipFill>
-          <a:blip r:embed="rId3"/>
+          <a:blip r:embed="rId3" cstate="print"/>
           <a:srcRect/>
           <a:stretch>
             <a:fillRect/>
@@ -19876,7 +19876,7 @@
           <p:nvPr/>
         </p:nvPicPr>
         <p:blipFill>
-          <a:blip r:embed="rId4"/>
+          <a:blip r:embed="rId4" cstate="print"/>
           <a:srcRect/>
           <a:stretch>
             <a:fillRect/>
@@ -20051,7 +20051,7 @@
           <p:nvPr/>
         </p:nvPicPr>
         <p:blipFill>
-          <a:blip r:embed="rId3"/>
+          <a:blip r:embed="rId3" cstate="print"/>
           <a:srcRect/>
           <a:stretch>
             <a:fillRect/>
@@ -20079,7 +20079,7 @@
           </p:nvPr>
         </p:nvPicPr>
         <p:blipFill>
-          <a:blip r:embed="rId4"/>
+          <a:blip r:embed="rId4" cstate="print"/>
           <a:srcRect/>
           <a:stretch>
             <a:fillRect/>
@@ -20208,7 +20208,7 @@
           <p:nvPr/>
         </p:nvPicPr>
         <p:blipFill>
-          <a:blip r:embed="rId3"/>
+          <a:blip r:embed="rId3" cstate="print"/>
           <a:srcRect/>
           <a:stretch>
             <a:fillRect/>
@@ -20400,7 +20400,7 @@
           <p:nvPr/>
         </p:nvPicPr>
         <p:blipFill>
-          <a:blip r:embed="rId4"/>
+          <a:blip r:embed="rId4" cstate="print"/>
           <a:srcRect b="25000"/>
           <a:stretch>
             <a:fillRect/>
@@ -20680,7 +20680,7 @@
           <p:nvPr/>
         </p:nvPicPr>
         <p:blipFill>
-          <a:blip r:embed="rId3"/>
+          <a:blip r:embed="rId3" cstate="print"/>
           <a:srcRect r="25286"/>
           <a:stretch>
             <a:fillRect/>
@@ -20777,7 +20777,7 @@
                 <a:buNone/>
                 <a:tabLst/>
               </a:pPr>
-              <a:t>Sunday, July 18, 2010</a:t>
+              <a:t>Tuesday, September 21, 2010</a:t>
             </a:fld>
             <a:endParaRPr kumimoji="0" lang="en-US" sz="4000" b="0" i="0" u="none" strike="noStrike" cap="none" normalizeH="0" baseline="0" dirty="0" smtClean="0">
               <a:ln>
@@ -21271,7 +21271,7 @@
           <p:nvPr/>
         </p:nvPicPr>
         <p:blipFill>
-          <a:blip r:embed="rId3"/>
+          <a:blip r:embed="rId3" cstate="print"/>
           <a:srcRect/>
           <a:stretch>
             <a:fillRect/>
@@ -21297,7 +21297,7 @@
           <p:nvPr/>
         </p:nvPicPr>
         <p:blipFill>
-          <a:blip r:embed="rId4"/>
+          <a:blip r:embed="rId4" cstate="print"/>
           <a:srcRect/>
           <a:stretch>
             <a:fillRect/>
@@ -21323,7 +21323,7 @@
           <p:nvPr/>
         </p:nvPicPr>
         <p:blipFill>
-          <a:blip r:embed="rId5"/>
+          <a:blip r:embed="rId5" cstate="print"/>
           <a:srcRect/>
           <a:stretch>
             <a:fillRect/>
@@ -21530,7 +21530,7 @@
           <p:nvPr/>
         </p:nvPicPr>
         <p:blipFill>
-          <a:blip r:embed="rId3"/>
+          <a:blip r:embed="rId3" cstate="print"/>
           <a:srcRect/>
           <a:stretch>
             <a:fillRect/>
@@ -21667,7 +21667,7 @@
           <p:nvPr/>
         </p:nvPicPr>
         <p:blipFill>
-          <a:blip r:embed="rId4"/>
+          <a:blip r:embed="rId4" cstate="print"/>
           <a:srcRect/>
           <a:stretch>
             <a:fillRect/>
@@ -21802,7 +21802,7 @@
           <p:nvPr/>
         </p:nvPicPr>
         <p:blipFill>
-          <a:blip r:embed="rId3"/>
+          <a:blip r:embed="rId3" cstate="print"/>
           <a:srcRect/>
           <a:stretch>
             <a:fillRect/>
@@ -21932,7 +21932,7 @@
           <p:nvPr/>
         </p:nvPicPr>
         <p:blipFill>
-          <a:blip r:embed="rId4"/>
+          <a:blip r:embed="rId4" cstate="print"/>
           <a:srcRect/>
           <a:stretch>
             <a:fillRect/>
@@ -22139,7 +22139,7 @@
           <p:nvPr/>
         </p:nvPicPr>
         <p:blipFill>
-          <a:blip r:embed="rId3"/>
+          <a:blip r:embed="rId3" cstate="print"/>
           <a:srcRect/>
           <a:stretch>
             <a:fillRect/>
@@ -22422,7 +22422,7 @@
           <p:nvPr/>
         </p:nvPicPr>
         <p:blipFill>
-          <a:blip r:embed="rId4"/>
+          <a:blip r:embed="rId4" cstate="print"/>
           <a:srcRect/>
           <a:stretch>
             <a:fillRect/>
@@ -22557,7 +22557,7 @@
           <p:nvPr/>
         </p:nvPicPr>
         <p:blipFill>
-          <a:blip r:embed="rId3"/>
+          <a:blip r:embed="rId3" cstate="print"/>
           <a:srcRect/>
           <a:stretch>
             <a:fillRect/>
@@ -22583,7 +22583,7 @@
           <p:nvPr/>
         </p:nvPicPr>
         <p:blipFill>
-          <a:blip r:embed="rId4"/>
+          <a:blip r:embed="rId4" cstate="print"/>
           <a:srcRect/>
           <a:stretch>
             <a:fillRect/>
@@ -22609,7 +22609,7 @@
           <p:nvPr/>
         </p:nvPicPr>
         <p:blipFill>
-          <a:blip r:embed="rId5"/>
+          <a:blip r:embed="rId5" cstate="print"/>
           <a:srcRect/>
           <a:stretch>
             <a:fillRect/>
@@ -22744,7 +22744,7 @@
           <p:nvPr/>
         </p:nvPicPr>
         <p:blipFill>
-          <a:blip r:embed="rId3"/>
+          <a:blip r:embed="rId3" cstate="print"/>
           <a:srcRect/>
           <a:stretch>
             <a:fillRect/>
@@ -23170,7 +23170,7 @@
           <p:nvPr/>
         </p:nvPicPr>
         <p:blipFill>
-          <a:blip r:embed="rId4"/>
+          <a:blip r:embed="rId4" cstate="print"/>
           <a:srcRect/>
           <a:stretch>
             <a:fillRect/>
@@ -23341,7 +23341,7 @@
           <p:nvPr/>
         </p:nvPicPr>
         <p:blipFill>
-          <a:blip r:embed="rId3"/>
+          <a:blip r:embed="rId3" cstate="print"/>
           <a:srcRect/>
           <a:stretch>
             <a:fillRect/>
@@ -23611,7 +23611,7 @@
           <p:nvPr/>
         </p:nvPicPr>
         <p:blipFill>
-          <a:blip r:embed="rId4"/>
+          <a:blip r:embed="rId4" cstate="print"/>
           <a:srcRect b="25000"/>
           <a:stretch>
             <a:fillRect/>
@@ -23923,7 +23923,7 @@
           <p:nvPr/>
         </p:nvPicPr>
         <p:blipFill>
-          <a:blip r:embed="rId3"/>
+          <a:blip r:embed="rId3" cstate="print"/>
           <a:srcRect/>
           <a:stretch>
             <a:fillRect/>
@@ -23991,7 +23991,7 @@
           <p:nvPr/>
         </p:nvPicPr>
         <p:blipFill>
-          <a:blip r:embed="rId4"/>
+          <a:blip r:embed="rId4" cstate="print"/>
           <a:srcRect/>
           <a:stretch>
             <a:fillRect/>
@@ -24017,7 +24017,7 @@
           <p:nvPr/>
         </p:nvPicPr>
         <p:blipFill>
-          <a:blip r:embed="rId5"/>
+          <a:blip r:embed="rId5" cstate="print"/>
           <a:srcRect/>
           <a:stretch>
             <a:fillRect/>
@@ -24190,7 +24190,7 @@
           <p:nvPr/>
         </p:nvPicPr>
         <p:blipFill>
-          <a:blip r:embed="rId3"/>
+          <a:blip r:embed="rId3" cstate="print"/>
           <a:srcRect/>
           <a:stretch>
             <a:fillRect/>
@@ -24218,7 +24218,7 @@
           </p:nvPr>
         </p:nvPicPr>
         <p:blipFill>
-          <a:blip r:embed="rId4"/>
+          <a:blip r:embed="rId4" cstate="print"/>
           <a:srcRect/>
           <a:stretch>
             <a:fillRect/>
@@ -24347,7 +24347,7 @@
           <p:nvPr/>
         </p:nvPicPr>
         <p:blipFill>
-          <a:blip r:embed="rId3"/>
+          <a:blip r:embed="rId3" cstate="print"/>
           <a:srcRect/>
           <a:stretch>
             <a:fillRect/>
@@ -24445,7 +24445,7 @@
           <p:nvPr/>
         </p:nvPicPr>
         <p:blipFill>
-          <a:blip r:embed="rId4"/>
+          <a:blip r:embed="rId4" cstate="print"/>
           <a:srcRect/>
           <a:stretch>
             <a:fillRect/>
@@ -24695,7 +24695,7 @@
           <p:nvPr/>
         </p:nvPicPr>
         <p:blipFill>
-          <a:blip r:embed="rId3"/>
+          <a:blip r:embed="rId3" cstate="print"/>
           <a:srcRect/>
           <a:stretch>
             <a:fillRect/>
@@ -24837,7 +24837,7 @@
           <p:nvPr/>
         </p:nvPicPr>
         <p:blipFill>
-          <a:blip r:embed="rId4"/>
+          <a:blip r:embed="rId4" cstate="print"/>
           <a:srcRect b="25000"/>
           <a:stretch>
             <a:fillRect/>
@@ -25038,7 +25038,7 @@
           <p:nvPr/>
         </p:nvPicPr>
         <p:blipFill>
-          <a:blip r:embed="rId3"/>
+          <a:blip r:embed="rId3" cstate="print"/>
           <a:srcRect/>
           <a:stretch>
             <a:fillRect/>
@@ -25189,7 +25189,7 @@
           <p:nvPr/>
         </p:nvPicPr>
         <p:blipFill>
-          <a:blip r:embed="rId4"/>
+          <a:blip r:embed="rId4" cstate="print"/>
           <a:srcRect b="25000"/>
           <a:stretch>
             <a:fillRect/>
@@ -25532,7 +25532,7 @@
           <p:nvPr/>
         </p:nvPicPr>
         <p:blipFill>
-          <a:blip r:embed="rId3"/>
+          <a:blip r:embed="rId3" cstate="print"/>
           <a:srcRect/>
           <a:stretch>
             <a:fillRect/>
@@ -25805,7 +25805,7 @@
           <p:nvPr/>
         </p:nvPicPr>
         <p:blipFill>
-          <a:blip r:embed="rId4"/>
+          <a:blip r:embed="rId4" cstate="print"/>
           <a:srcRect/>
           <a:stretch>
             <a:fillRect/>
@@ -25898,7 +25898,7 @@
           <p:nvPr/>
         </p:nvPicPr>
         <p:blipFill>
-          <a:blip r:embed="rId3"/>
+          <a:blip r:embed="rId3" cstate="print"/>
           <a:srcRect/>
           <a:stretch>
             <a:fillRect/>
@@ -26058,7 +26058,7 @@
           <p:nvPr/>
         </p:nvPicPr>
         <p:blipFill>
-          <a:blip r:embed="rId4"/>
+          <a:blip r:embed="rId4" cstate="print"/>
           <a:srcRect/>
           <a:stretch>
             <a:fillRect/>
@@ -26365,7 +26365,7 @@
           <p:nvPr/>
         </p:nvPicPr>
         <p:blipFill>
-          <a:blip r:embed="rId3"/>
+          <a:blip r:embed="rId3" cstate="print"/>
           <a:srcRect/>
           <a:stretch>
             <a:fillRect/>
@@ -26391,7 +26391,7 @@
           <p:nvPr/>
         </p:nvPicPr>
         <p:blipFill>
-          <a:blip r:embed="rId4"/>
+          <a:blip r:embed="rId4" cstate="print"/>
           <a:srcRect/>
           <a:stretch>
             <a:fillRect/>
@@ -26660,7 +26660,7 @@
           <p:nvPr/>
         </p:nvPicPr>
         <p:blipFill>
-          <a:blip r:embed="rId3"/>
+          <a:blip r:embed="rId3" cstate="print"/>
           <a:srcRect/>
           <a:stretch>
             <a:fillRect/>
@@ -26686,7 +26686,7 @@
           <p:nvPr/>
         </p:nvPicPr>
         <p:blipFill>
-          <a:blip r:embed="rId4"/>
+          <a:blip r:embed="rId4" cstate="print"/>
           <a:srcRect/>
           <a:stretch>
             <a:fillRect/>
@@ -27051,7 +27051,7 @@
           <p:nvPr/>
         </p:nvPicPr>
         <p:blipFill>
-          <a:blip r:embed="rId3"/>
+          <a:blip r:embed="rId3" cstate="print"/>
           <a:srcRect/>
           <a:stretch>
             <a:fillRect/>
@@ -27238,7 +27238,7 @@
           <p:nvPr/>
         </p:nvPicPr>
         <p:blipFill>
-          <a:blip r:embed="rId4"/>
+          <a:blip r:embed="rId4" cstate="print"/>
           <a:srcRect b="25000"/>
           <a:stretch>
             <a:fillRect/>
@@ -27331,7 +27331,7 @@
           <p:nvPr/>
         </p:nvPicPr>
         <p:blipFill>
-          <a:blip r:embed="rId3"/>
+          <a:blip r:embed="rId3" cstate="print"/>
           <a:srcRect/>
           <a:stretch>
             <a:fillRect/>
@@ -27532,7 +27532,7 @@
           <p:nvPr/>
         </p:nvPicPr>
         <p:blipFill>
-          <a:blip r:embed="rId4"/>
+          <a:blip r:embed="rId4" cstate="print"/>
           <a:srcRect b="25000"/>
           <a:stretch>
             <a:fillRect/>
@@ -27870,7 +27870,7 @@
           <p:nvPr/>
         </p:nvPicPr>
         <p:blipFill>
-          <a:blip r:embed="rId3"/>
+          <a:blip r:embed="rId3" cstate="print"/>
           <a:srcRect/>
           <a:stretch>
             <a:fillRect/>
@@ -28161,7 +28161,7 @@
           <p:nvPr/>
         </p:nvPicPr>
         <p:blipFill>
-          <a:blip r:embed="rId4"/>
+          <a:blip r:embed="rId4" cstate="print"/>
           <a:srcRect/>
           <a:stretch>
             <a:fillRect/>
@@ -28250,7 +28250,7 @@
           <p:nvPr/>
         </p:nvPicPr>
         <p:blipFill>
-          <a:blip r:embed="rId3"/>
+          <a:blip r:embed="rId3" cstate="print"/>
           <a:srcRect/>
           <a:stretch>
             <a:fillRect/>
@@ -28276,7 +28276,7 @@
           <p:nvPr/>
         </p:nvPicPr>
         <p:blipFill>
-          <a:blip r:embed="rId4"/>
+          <a:blip r:embed="rId4" cstate="print"/>
           <a:srcRect/>
           <a:stretch>
             <a:fillRect/>
@@ -28302,7 +28302,7 @@
           <p:nvPr/>
         </p:nvPicPr>
         <p:blipFill>
-          <a:blip r:embed="rId5"/>
+          <a:blip r:embed="rId5" cstate="print"/>
           <a:srcRect/>
           <a:stretch>
             <a:fillRect/>
@@ -28407,7 +28407,7 @@
             <p:nvPr/>
           </p:nvPicPr>
           <p:blipFill>
-            <a:blip r:embed="rId6"/>
+            <a:blip r:embed="rId6" cstate="print"/>
             <a:srcRect/>
             <a:stretch>
               <a:fillRect/>
@@ -28436,7 +28436,7 @@
           <p:nvPr/>
         </p:nvPicPr>
         <p:blipFill>
-          <a:blip r:embed="rId7"/>
+          <a:blip r:embed="rId7" cstate="print"/>
           <a:srcRect/>
           <a:stretch>
             <a:fillRect/>
@@ -28468,7 +28468,7 @@
           <p:nvPr/>
         </p:nvPicPr>
         <p:blipFill>
-          <a:blip r:embed="rId8"/>
+          <a:blip r:embed="rId8" cstate="print"/>
           <a:srcRect/>
           <a:stretch>
             <a:fillRect/>
@@ -28494,7 +28494,7 @@
           <p:nvPr/>
         </p:nvPicPr>
         <p:blipFill>
-          <a:blip r:embed="rId9"/>
+          <a:blip r:embed="rId9" cstate="print"/>
           <a:srcRect/>
           <a:stretch>
             <a:fillRect/>
@@ -28520,7 +28520,7 @@
           <p:nvPr/>
         </p:nvPicPr>
         <p:blipFill>
-          <a:blip r:embed="rId10"/>
+          <a:blip r:embed="rId10" cstate="print"/>
           <a:srcRect/>
           <a:stretch>
             <a:fillRect/>
@@ -29084,7 +29084,7 @@
           <p:nvPr/>
         </p:nvPicPr>
         <p:blipFill>
-          <a:blip r:embed="rId3"/>
+          <a:blip r:embed="rId3" cstate="print"/>
           <a:srcRect/>
           <a:stretch>
             <a:fillRect/>
@@ -29174,7 +29174,7 @@
           <p:nvPr/>
         </p:nvPicPr>
         <p:blipFill>
-          <a:blip r:embed="rId4"/>
+          <a:blip r:embed="rId4" cstate="print"/>
           <a:srcRect/>
           <a:stretch>
             <a:fillRect/>
@@ -29200,7 +29200,7 @@
           <p:nvPr/>
         </p:nvPicPr>
         <p:blipFill>
-          <a:blip r:embed="rId5"/>
+          <a:blip r:embed="rId5" cstate="print"/>
           <a:srcRect/>
           <a:stretch>
             <a:fillRect/>
@@ -29419,7 +29419,7 @@
           <p:nvPr/>
         </p:nvPicPr>
         <p:blipFill>
-          <a:blip r:embed="rId3"/>
+          <a:blip r:embed="rId3" cstate="print"/>
           <a:srcRect/>
           <a:stretch>
             <a:fillRect/>
@@ -29558,7 +29558,7 @@
           <p:nvPr/>
         </p:nvPicPr>
         <p:blipFill>
-          <a:blip r:embed="rId4"/>
+          <a:blip r:embed="rId4" cstate="print"/>
           <a:srcRect/>
           <a:stretch>
             <a:fillRect/>
@@ -29765,7 +29765,7 @@
           <p:nvPr/>
         </p:nvPicPr>
         <p:blipFill>
-          <a:blip r:embed="rId3"/>
+          <a:blip r:embed="rId3" cstate="print"/>
           <a:srcRect/>
           <a:stretch>
             <a:fillRect/>
@@ -29971,7 +29971,7 @@
           <p:nvPr/>
         </p:nvPicPr>
         <p:blipFill>
-          <a:blip r:embed="rId4"/>
+          <a:blip r:embed="rId4" cstate="print"/>
           <a:srcRect/>
           <a:stretch>
             <a:fillRect/>
@@ -30106,7 +30106,7 @@
           <p:nvPr/>
         </p:nvPicPr>
         <p:blipFill>
-          <a:blip r:embed="rId3"/>
+          <a:blip r:embed="rId3" cstate="print"/>
           <a:srcRect/>
           <a:stretch>
             <a:fillRect/>
@@ -30247,7 +30247,7 @@
           <p:nvPr/>
         </p:nvPicPr>
         <p:blipFill>
-          <a:blip r:embed="rId4"/>
+          <a:blip r:embed="rId4" cstate="print"/>
           <a:srcRect/>
           <a:stretch>
             <a:fillRect/>
@@ -30340,7 +30340,7 @@
           <p:nvPr/>
         </p:nvPicPr>
         <p:blipFill>
-          <a:blip r:embed="rId3"/>
+          <a:blip r:embed="rId3" cstate="print"/>
           <a:srcRect/>
           <a:stretch>
             <a:fillRect/>
@@ -30572,7 +30572,7 @@
           <p:nvPr/>
         </p:nvPicPr>
         <p:blipFill>
-          <a:blip r:embed="rId4"/>
+          <a:blip r:embed="rId4" cstate="print"/>
           <a:srcRect/>
           <a:stretch>
             <a:fillRect/>
@@ -30825,7 +30825,7 @@
           <p:nvPr/>
         </p:nvPicPr>
         <p:blipFill>
-          <a:blip r:embed="rId3"/>
+          <a:blip r:embed="rId3" cstate="print"/>
           <a:srcRect/>
           <a:stretch>
             <a:fillRect/>
@@ -30980,7 +30980,7 @@
           <p:nvPr/>
         </p:nvPicPr>
         <p:blipFill>
-          <a:blip r:embed="rId4"/>
+          <a:blip r:embed="rId4" cstate="print"/>
           <a:srcRect/>
           <a:stretch>
             <a:fillRect/>
@@ -31348,7 +31348,7 @@
           <p:nvPr/>
         </p:nvPicPr>
         <p:blipFill>
-          <a:blip r:embed="rId3"/>
+          <a:blip r:embed="rId3" cstate="print"/>
           <a:srcRect/>
           <a:stretch>
             <a:fillRect/>
@@ -31558,7 +31558,7 @@
           <p:nvPr/>
         </p:nvPicPr>
         <p:blipFill>
-          <a:blip r:embed="rId4"/>
+          <a:blip r:embed="rId4" cstate="print"/>
           <a:srcRect/>
           <a:stretch>
             <a:fillRect/>
@@ -31976,7 +31976,7 @@
           <p:nvPr/>
         </p:nvPicPr>
         <p:blipFill>
-          <a:blip r:embed="rId3"/>
+          <a:blip r:embed="rId3" cstate="print"/>
           <a:srcRect/>
           <a:stretch>
             <a:fillRect/>
@@ -32110,7 +32110,7 @@
           <p:nvPr/>
         </p:nvPicPr>
         <p:blipFill>
-          <a:blip r:embed="rId4"/>
+          <a:blip r:embed="rId4" cstate="print"/>
           <a:srcRect/>
           <a:stretch>
             <a:fillRect/>
@@ -32367,7 +32367,7 @@
           <p:nvPr/>
         </p:nvPicPr>
         <p:blipFill>
-          <a:blip r:embed="rId3"/>
+          <a:blip r:embed="rId3" cstate="print"/>
           <a:srcRect r="25286"/>
           <a:stretch>
             <a:fillRect/>
@@ -32464,7 +32464,7 @@
                 <a:buNone/>
                 <a:tabLst/>
               </a:pPr>
-              <a:t>Sunday, July 18, 2010</a:t>
+              <a:t>Tuesday, September 21, 2010</a:t>
             </a:fld>
             <a:endParaRPr kumimoji="0" lang="en-US" sz="4000" b="0" i="0" u="none" strike="noStrike" cap="none" normalizeH="0" baseline="0" dirty="0" smtClean="0">
               <a:ln>
@@ -32916,7 +32916,7 @@
           <p:nvPr/>
         </p:nvPicPr>
         <p:blipFill>
-          <a:blip r:embed="rId3"/>
+          <a:blip r:embed="rId3" cstate="print"/>
           <a:srcRect/>
           <a:stretch>
             <a:fillRect/>
@@ -33206,7 +33206,7 @@
           <p:nvPr/>
         </p:nvPicPr>
         <p:blipFill>
-          <a:blip r:embed="rId4"/>
+          <a:blip r:embed="rId4" cstate="print"/>
           <a:srcRect/>
           <a:stretch>
             <a:fillRect/>
@@ -33299,7 +33299,7 @@
           <p:nvPr/>
         </p:nvPicPr>
         <p:blipFill>
-          <a:blip r:embed="rId3"/>
+          <a:blip r:embed="rId3" cstate="print"/>
           <a:srcRect/>
           <a:stretch>
             <a:fillRect/>
@@ -33325,7 +33325,7 @@
           <p:nvPr/>
         </p:nvPicPr>
         <p:blipFill>
-          <a:blip r:embed="rId4"/>
+          <a:blip r:embed="rId4" cstate="print"/>
           <a:srcRect/>
           <a:stretch>
             <a:fillRect/>
@@ -33418,7 +33418,7 @@
           <p:nvPr/>
         </p:nvPicPr>
         <p:blipFill>
-          <a:blip r:embed="rId3"/>
+          <a:blip r:embed="rId3" cstate="print"/>
           <a:srcRect/>
           <a:stretch>
             <a:fillRect/>
@@ -33693,7 +33693,7 @@
           <p:nvPr/>
         </p:nvPicPr>
         <p:blipFill>
-          <a:blip r:embed="rId4"/>
+          <a:blip r:embed="rId4" cstate="print"/>
           <a:srcRect/>
           <a:stretch>
             <a:fillRect/>
@@ -33827,7 +33827,7 @@
           <p:nvPr/>
         </p:nvPicPr>
         <p:blipFill>
-          <a:blip r:embed="rId3"/>
+          <a:blip r:embed="rId3" cstate="print"/>
           <a:srcRect/>
           <a:stretch>
             <a:fillRect/>
@@ -34014,7 +34014,7 @@
           <p:nvPr/>
         </p:nvPicPr>
         <p:blipFill>
-          <a:blip r:embed="rId4"/>
+          <a:blip r:embed="rId4" cstate="print"/>
           <a:srcRect/>
           <a:stretch>
             <a:fillRect/>
@@ -34382,7 +34382,7 @@
           <p:nvPr/>
         </p:nvPicPr>
         <p:blipFill>
-          <a:blip r:embed="rId3"/>
+          <a:blip r:embed="rId3" cstate="print"/>
           <a:srcRect/>
           <a:stretch>
             <a:fillRect/>
@@ -34645,7 +34645,7 @@
           <p:nvPr/>
         </p:nvPicPr>
         <p:blipFill>
-          <a:blip r:embed="rId4"/>
+          <a:blip r:embed="rId4" cstate="print"/>
           <a:srcRect b="25000"/>
           <a:stretch>
             <a:fillRect/>
@@ -34782,7 +34782,7 @@
           <p:nvPr/>
         </p:nvPicPr>
         <p:blipFill>
-          <a:blip r:embed="rId3"/>
+          <a:blip r:embed="rId3" cstate="print"/>
           <a:srcRect/>
           <a:stretch>
             <a:fillRect/>
@@ -34901,7 +34901,7 @@
           <p:nvPr/>
         </p:nvPicPr>
         <p:blipFill>
-          <a:blip r:embed="rId4"/>
+          <a:blip r:embed="rId4" cstate="print"/>
           <a:srcRect b="25000"/>
           <a:stretch>
             <a:fillRect/>
@@ -34994,7 +34994,7 @@
           <p:nvPr/>
         </p:nvPicPr>
         <p:blipFill>
-          <a:blip r:embed="rId3"/>
+          <a:blip r:embed="rId3" cstate="print"/>
           <a:srcRect/>
           <a:stretch>
             <a:fillRect/>
@@ -35239,7 +35239,7 @@
           <p:nvPr/>
         </p:nvPicPr>
         <p:blipFill>
-          <a:blip r:embed="rId4"/>
+          <a:blip r:embed="rId4" cstate="print"/>
           <a:srcRect/>
           <a:stretch>
             <a:fillRect/>
@@ -35453,7 +35453,7 @@
           <p:nvPr/>
         </p:nvPicPr>
         <p:blipFill>
-          <a:blip r:embed="rId3"/>
+          <a:blip r:embed="rId3" cstate="print"/>
           <a:srcRect/>
           <a:stretch>
             <a:fillRect/>
@@ -35746,7 +35746,7 @@
           <p:nvPr/>
         </p:nvPicPr>
         <p:blipFill>
-          <a:blip r:embed="rId4"/>
+          <a:blip r:embed="rId4" cstate="print"/>
           <a:srcRect/>
           <a:stretch>
             <a:fillRect/>
@@ -36077,7 +36077,7 @@
           <p:nvPr/>
         </p:nvPicPr>
         <p:blipFill>
-          <a:blip r:embed="rId3"/>
+          <a:blip r:embed="rId3" cstate="print"/>
           <a:srcRect/>
           <a:stretch>
             <a:fillRect/>
@@ -36252,7 +36252,7 @@
           <p:nvPr/>
         </p:nvPicPr>
         <p:blipFill>
-          <a:blip r:embed="rId4"/>
+          <a:blip r:embed="rId4" cstate="print"/>
           <a:srcRect/>
           <a:stretch>
             <a:fillRect/>
@@ -36436,7 +36436,7 @@
           <p:nvPr/>
         </p:nvPicPr>
         <p:blipFill>
-          <a:blip r:embed="rId3"/>
+          <a:blip r:embed="rId3" cstate="print"/>
           <a:srcRect/>
           <a:stretch>
             <a:fillRect/>
@@ -36652,7 +36652,7 @@
           <p:nvPr/>
         </p:nvPicPr>
         <p:blipFill>
-          <a:blip r:embed="rId4"/>
+          <a:blip r:embed="rId4" cstate="print"/>
           <a:srcRect/>
           <a:stretch>
             <a:fillRect/>
@@ -36755,7 +36755,7 @@
           <p:nvPr/>
         </p:nvPicPr>
         <p:blipFill>
-          <a:blip r:embed="rId3"/>
+          <a:blip r:embed="rId3" cstate="print"/>
           <a:srcRect r="25286"/>
           <a:stretch>
             <a:fillRect/>
@@ -36852,7 +36852,7 @@
                 <a:buNone/>
                 <a:tabLst/>
               </a:pPr>
-              <a:t>Sunday, July 18, 2010</a:t>
+              <a:t>Tuesday, September 21, 2010</a:t>
             </a:fld>
             <a:endParaRPr kumimoji="0" lang="en-US" sz="4000" b="0" i="0" u="none" strike="noStrike" cap="none" normalizeH="0" baseline="0" dirty="0" smtClean="0">
               <a:ln>
@@ -37304,7 +37304,7 @@
           <p:nvPr/>
         </p:nvPicPr>
         <p:blipFill>
-          <a:blip r:embed="rId3"/>
+          <a:blip r:embed="rId3" cstate="print"/>
           <a:srcRect/>
           <a:stretch>
             <a:fillRect/>
@@ -37385,7 +37385,7 @@
           <p:nvPr/>
         </p:nvPicPr>
         <p:blipFill>
-          <a:blip r:embed="rId5"/>
+          <a:blip r:embed="rId5" cstate="print"/>
           <a:srcRect/>
           <a:stretch>
             <a:fillRect/>
@@ -37485,7 +37485,7 @@
             <p:nvPr/>
           </p:nvPicPr>
           <p:blipFill>
-            <a:blip r:embed="rId6"/>
+            <a:blip r:embed="rId6" cstate="print"/>
             <a:srcRect/>
             <a:stretch>
               <a:fillRect/>
@@ -37810,17 +37810,7 @@
                   <a:latin typeface="Comic Sans MS" pitchFamily="66" charset="0"/>
                   <a:cs typeface="Tahoma" pitchFamily="34" charset="0"/>
                 </a:rPr>
-                <a:t> </a:t>
-              </a:r>
-              <a:r>
-                <a:rPr lang="en-US" sz="4000" b="1" dirty="0" smtClean="0">
-                  <a:solidFill>
-                    <a:srgbClr val="0000FF"/>
-                  </a:solidFill>
-                  <a:latin typeface="Comic Sans MS" pitchFamily="66" charset="0"/>
-                  <a:cs typeface="Tahoma" pitchFamily="34" charset="0"/>
-                </a:rPr>
-                <a:t>2.8.0</a:t>
+                <a:t> 2.8.0</a:t>
               </a:r>
             </a:p>
             <a:p>
@@ -37833,17 +37823,7 @@
                   <a:latin typeface="Comic Sans MS" pitchFamily="66" charset="0"/>
                   <a:cs typeface="Tahoma" pitchFamily="34" charset="0"/>
                 </a:rPr>
-                <a:t> </a:t>
-              </a:r>
-              <a:r>
-                <a:rPr lang="en-US" sz="4000" b="1" dirty="0" smtClean="0">
-                  <a:solidFill>
-                    <a:srgbClr val="0000FF"/>
-                  </a:solidFill>
-                  <a:latin typeface="Comic Sans MS" pitchFamily="66" charset="0"/>
-                  <a:cs typeface="Tahoma" pitchFamily="34" charset="0"/>
-                </a:rPr>
-                <a:t>inside !</a:t>
+                <a:t> inside !</a:t>
               </a:r>
             </a:p>
           </p:txBody>
@@ -37925,7 +37905,7 @@
           <p:nvPr/>
         </p:nvPicPr>
         <p:blipFill>
-          <a:blip r:embed="rId3"/>
+          <a:blip r:embed="rId3" cstate="print"/>
           <a:srcRect/>
           <a:stretch>
             <a:fillRect/>
@@ -37951,7 +37931,7 @@
           <p:nvPr/>
         </p:nvPicPr>
         <p:blipFill>
-          <a:blip r:embed="rId4"/>
+          <a:blip r:embed="rId4" cstate="print"/>
           <a:srcRect/>
           <a:stretch>
             <a:fillRect/>
@@ -40756,7 +40736,7 @@
           <p:nvPr/>
         </p:nvPicPr>
         <p:blipFill>
-          <a:blip r:embed="rId3"/>
+          <a:blip r:embed="rId3" cstate="print"/>
           <a:srcRect/>
           <a:stretch>
             <a:fillRect/>
@@ -40824,7 +40804,7 @@
           <p:nvPr/>
         </p:nvPicPr>
         <p:blipFill>
-          <a:blip r:embed="rId4"/>
+          <a:blip r:embed="rId4" cstate="print"/>
           <a:srcRect/>
           <a:stretch>
             <a:fillRect/>
@@ -40850,7 +40830,7 @@
           <p:nvPr/>
         </p:nvPicPr>
         <p:blipFill>
-          <a:blip r:embed="rId5"/>
+          <a:blip r:embed="rId5" cstate="print"/>
           <a:srcRect/>
           <a:stretch>
             <a:fillRect/>
@@ -40979,7 +40959,7 @@
           <p:nvPr/>
         </p:nvPicPr>
         <p:blipFill>
-          <a:blip r:embed="rId3"/>
+          <a:blip r:embed="rId3" cstate="print"/>
           <a:srcRect/>
           <a:stretch>
             <a:fillRect/>
@@ -41101,7 +41081,7 @@
           <p:nvPr/>
         </p:nvPicPr>
         <p:blipFill>
-          <a:blip r:embed="rId4"/>
+          <a:blip r:embed="rId4" cstate="print"/>
           <a:srcRect/>
           <a:stretch>
             <a:fillRect/>
@@ -41479,7 +41459,7 @@
           <p:nvPr/>
         </p:nvPicPr>
         <p:blipFill>
-          <a:blip r:embed="rId3"/>
+          <a:blip r:embed="rId3" cstate="print"/>
           <a:srcRect/>
           <a:stretch>
             <a:fillRect/>
@@ -41587,7 +41567,7 @@
           <p:nvPr/>
         </p:nvPicPr>
         <p:blipFill>
-          <a:blip r:embed="rId4"/>
+          <a:blip r:embed="rId4" cstate="print"/>
           <a:srcRect b="25000"/>
           <a:stretch>
             <a:fillRect/>
@@ -41907,7 +41887,7 @@
           <p:nvPr/>
         </p:nvPicPr>
         <p:blipFill>
-          <a:blip r:embed="rId3"/>
+          <a:blip r:embed="rId3" cstate="print"/>
           <a:srcRect/>
           <a:stretch>
             <a:fillRect/>
@@ -42339,7 +42319,7 @@
           <p:nvPr/>
         </p:nvPicPr>
         <p:blipFill>
-          <a:blip r:embed="rId4"/>
+          <a:blip r:embed="rId4" cstate="print"/>
           <a:srcRect/>
           <a:stretch>
             <a:fillRect/>
@@ -42539,7 +42519,7 @@
           <p:nvPr/>
         </p:nvPicPr>
         <p:blipFill>
-          <a:blip r:embed="rId3"/>
+          <a:blip r:embed="rId3" cstate="print"/>
           <a:srcRect/>
           <a:stretch>
             <a:fillRect/>
@@ -42987,7 +42967,7 @@
           <p:nvPr/>
         </p:nvPicPr>
         <p:blipFill>
-          <a:blip r:embed="rId4"/>
+          <a:blip r:embed="rId4" cstate="print"/>
           <a:srcRect/>
           <a:stretch>
             <a:fillRect/>
@@ -43265,7 +43245,7 @@
           <p:nvPr/>
         </p:nvPicPr>
         <p:blipFill>
-          <a:blip r:embed="rId3"/>
+          <a:blip r:embed="rId3" cstate="print"/>
           <a:srcRect/>
           <a:stretch>
             <a:fillRect/>
@@ -43745,7 +43725,7 @@
           <p:nvPr/>
         </p:nvPicPr>
         <p:blipFill>
-          <a:blip r:embed="rId4"/>
+          <a:blip r:embed="rId4" cstate="print"/>
           <a:srcRect/>
           <a:stretch>
             <a:fillRect/>
@@ -44039,7 +44019,7 @@
           <p:nvPr/>
         </p:nvPicPr>
         <p:blipFill>
-          <a:blip r:embed="rId3"/>
+          <a:blip r:embed="rId3" cstate="print"/>
           <a:srcRect/>
           <a:stretch>
             <a:fillRect/>
@@ -44161,7 +44141,7 @@
           <p:nvPr/>
         </p:nvPicPr>
         <p:blipFill>
-          <a:blip r:embed="rId4"/>
+          <a:blip r:embed="rId4" cstate="print"/>
           <a:srcRect/>
           <a:stretch>
             <a:fillRect/>
@@ -44356,7 +44336,7 @@
           <p:nvPr/>
         </p:nvPicPr>
         <p:blipFill>
-          <a:blip r:embed="rId3"/>
+          <a:blip r:embed="rId3" cstate="print"/>
           <a:srcRect/>
           <a:stretch>
             <a:fillRect/>
@@ -44936,7 +44916,7 @@
           <p:nvPr/>
         </p:nvPicPr>
         <p:blipFill>
-          <a:blip r:embed="rId3"/>
+          <a:blip r:embed="rId3" cstate="print"/>
           <a:srcRect/>
           <a:stretch>
             <a:fillRect/>

</xml_diff>